<commit_message>
Changed title slide, introduced sections
</commit_message>
<xml_diff>
--- a/Optimization/hpc_efficiency.pptx
+++ b/Optimization/hpc_efficiency.pptx
@@ -5,17 +5,18 @@
     <p:sldMasterId id="2147483648" r:id="rId1"/>
   </p:sldMasterIdLst>
   <p:sldIdLst>
-    <p:sldId id="256" r:id="rId2"/>
-    <p:sldId id="257" r:id="rId3"/>
-    <p:sldId id="258" r:id="rId4"/>
-    <p:sldId id="259" r:id="rId5"/>
-    <p:sldId id="260" r:id="rId6"/>
-    <p:sldId id="261" r:id="rId7"/>
-    <p:sldId id="262" r:id="rId8"/>
-    <p:sldId id="263" r:id="rId9"/>
-    <p:sldId id="264" r:id="rId10"/>
-    <p:sldId id="265" r:id="rId11"/>
-    <p:sldId id="266" r:id="rId12"/>
+    <p:sldId id="267" r:id="rId2"/>
+    <p:sldId id="268" r:id="rId3"/>
+    <p:sldId id="257" r:id="rId4"/>
+    <p:sldId id="258" r:id="rId5"/>
+    <p:sldId id="259" r:id="rId6"/>
+    <p:sldId id="260" r:id="rId7"/>
+    <p:sldId id="261" r:id="rId8"/>
+    <p:sldId id="262" r:id="rId9"/>
+    <p:sldId id="263" r:id="rId10"/>
+    <p:sldId id="264" r:id="rId11"/>
+    <p:sldId id="265" r:id="rId12"/>
+    <p:sldId id="266" r:id="rId13"/>
   </p:sldIdLst>
   <p:sldSz cx="9144000" cy="6858000" type="screen4x3"/>
   <p:notesSz cx="6858000" cy="9144000"/>
@@ -4291,7 +4292,7 @@
           <a:p>
             <a:r>
               <a:rPr lang="en-US" dirty="0" smtClean="0"/>
-              <a:t>Scaling</a:t>
+              <a:t>HPC efficiency considerations</a:t>
             </a:r>
             <a:endParaRPr lang="nl-BE" dirty="0"/>
           </a:p>
@@ -4307,14 +4308,113 @@
             <p:ph type="subTitle" idx="1"/>
           </p:nvPr>
         </p:nvSpPr>
+        <p:spPr>
+          <a:xfrm>
+            <a:off x="1371600" y="3886200"/>
+            <a:ext cx="6400800" cy="1415008"/>
+          </a:xfrm>
+        </p:spPr>
+        <p:txBody>
+          <a:bodyPr>
+            <a:normAutofit/>
+          </a:bodyPr>
+          <a:lstStyle/>
+          <a:p>
+            <a:r>
+              <a:rPr lang="en-US" dirty="0" smtClean="0"/>
+              <a:t>Geert Jan Bex</a:t>
+            </a:r>
+            <a:br>
+              <a:rPr lang="en-US" dirty="0" smtClean="0"/>
+            </a:br>
+            <a:r>
+              <a:rPr lang="en-US" dirty="0" smtClean="0"/>
+              <a:t> (</a:t>
+            </a:r>
+            <a:r>
+              <a:rPr lang="en-US" dirty="0" smtClean="0">
+                <a:hlinkClick r:id="rId2"/>
+              </a:rPr>
+              <a:t>geertjan.bex@uhasselt.be</a:t>
+            </a:r>
+            <a:r>
+              <a:rPr lang="en-US" dirty="0" smtClean="0"/>
+              <a:t>)</a:t>
+            </a:r>
+          </a:p>
+        </p:txBody>
+      </p:sp>
+      <p:sp>
+        <p:nvSpPr>
+          <p:cNvPr id="4" name="Slide Number Placeholder 3"/>
+          <p:cNvSpPr>
+            <a:spLocks noGrp="1"/>
+          </p:cNvSpPr>
+          <p:nvPr>
+            <p:ph type="sldNum" sz="quarter" idx="12"/>
+          </p:nvPr>
+        </p:nvSpPr>
         <p:spPr/>
         <p:txBody>
           <a:bodyPr/>
           <a:lstStyle/>
           <a:p>
+            <a:fld id="{5A209D72-2E9D-49B0-8977-41DCCC66C0BB}" type="slidenum">
+              <a:rPr lang="nl-BE" smtClean="0"/>
+              <a:t>1</a:t>
+            </a:fld>
+            <a:endParaRPr lang="nl-BE"/>
+          </a:p>
+        </p:txBody>
+      </p:sp>
+      <p:sp>
+        <p:nvSpPr>
+          <p:cNvPr id="5" name="TextBox 4"/>
+          <p:cNvSpPr txBox="1"/>
+          <p:nvPr/>
+        </p:nvSpPr>
+        <p:spPr>
+          <a:xfrm>
+            <a:off x="1775204" y="5445224"/>
+            <a:ext cx="6869573" cy="646331"/>
+          </a:xfrm>
+          <a:prstGeom prst="rect">
+            <a:avLst/>
+          </a:prstGeom>
+          <a:noFill/>
+        </p:spPr>
+        <p:txBody>
+          <a:bodyPr wrap="none" rtlCol="0">
+            <a:spAutoFit/>
+          </a:bodyPr>
+          <a:lstStyle/>
+          <a:p>
+            <a:r>
+              <a:rPr lang="en-US" b="1" dirty="0" smtClean="0"/>
+              <a:t>License</a:t>
+            </a:r>
             <a:r>
               <a:rPr lang="en-US" dirty="0" smtClean="0"/>
-              <a:t>Geert Jan Bex</a:t>
+              <a:t>: this presentation is released under the Creative Commons, see</a:t>
+            </a:r>
+            <a:br>
+              <a:rPr lang="en-US" dirty="0" smtClean="0"/>
+            </a:br>
+            <a:r>
+              <a:rPr lang="nl-BE" dirty="0">
+                <a:hlinkClick r:id="rId3"/>
+              </a:rPr>
+              <a:t>http://creativecommons.org/publicdomain/zero/1.0</a:t>
+            </a:r>
+            <a:r>
+              <a:rPr lang="nl-BE" dirty="0" smtClean="0">
+                <a:hlinkClick r:id="rId3"/>
+              </a:rPr>
+              <a:t>/</a:t>
+            </a:r>
+            <a:r>
+              <a:rPr lang="nl-BE" dirty="0" smtClean="0"/>
+              <a:t> </a:t>
             </a:r>
             <a:endParaRPr lang="nl-BE" dirty="0"/>
           </a:p>
@@ -4323,7 +4423,7 @@
     </p:spTree>
     <p:extLst>
       <p:ext uri="{BB962C8B-B14F-4D97-AF65-F5344CB8AC3E}">
-        <p14:creationId xmlns:p14="http://schemas.microsoft.com/office/powerpoint/2010/main" val="2879720112"/>
+        <p14:creationId xmlns:p14="http://schemas.microsoft.com/office/powerpoint/2010/main" val="2849504813"/>
       </p:ext>
     </p:extLst>
   </p:cSld>
@@ -4374,60 +4474,890 @@
           <a:p>
             <a:r>
               <a:rPr lang="en-US" dirty="0" smtClean="0"/>
-              <a:t>We love Gustafson</a:t>
+              <a:t>Weak scaling</a:t>
             </a:r>
             <a:endParaRPr lang="nl-BE" dirty="0"/>
           </a:p>
         </p:txBody>
       </p:sp>
+      <mc:AlternateContent xmlns:mc="http://schemas.openxmlformats.org/markup-compatibility/2006" xmlns:a14="http://schemas.microsoft.com/office/drawing/2010/main">
+        <mc:Choice Requires="a14">
+          <p:sp>
+            <p:nvSpPr>
+              <p:cNvPr id="3" name="Content Placeholder 2"/>
+              <p:cNvSpPr>
+                <a:spLocks noGrp="1"/>
+              </p:cNvSpPr>
+              <p:nvPr>
+                <p:ph idx="1"/>
+              </p:nvPr>
+            </p:nvSpPr>
+            <p:spPr/>
+            <p:txBody>
+              <a:bodyPr/>
+              <a:lstStyle/>
+              <a:p>
+                <a:r>
+                  <a:rPr lang="en-US" dirty="0" smtClean="0"/>
+                  <a:t>Consider a system of "size" </a:t>
+                </a:r>
+                <a14:m>
+                  <m:oMath xmlns:m="http://schemas.openxmlformats.org/officeDocument/2006/math">
+                    <m:r>
+                      <a:rPr lang="en-US" i="1" dirty="0" smtClean="0">
+                        <a:latin typeface="Cambria Math"/>
+                      </a:rPr>
+                      <m:t>𝑁</m:t>
+                    </m:r>
+                  </m:oMath>
+                </a14:m>
+                <a:endParaRPr lang="en-US" dirty="0" smtClean="0"/>
+              </a:p>
+              <a:p>
+                <a:pPr lvl="1"/>
+                <a:r>
+                  <a:rPr lang="en-US" dirty="0" smtClean="0"/>
+                  <a:t>as before </a:t>
+                </a:r>
+                <a14:m>
+                  <m:oMath xmlns:m="http://schemas.openxmlformats.org/officeDocument/2006/math">
+                    <m:sSub>
+                      <m:sSubPr>
+                        <m:ctrlPr>
+                          <a:rPr lang="en-US" i="1" smtClean="0">
+                            <a:latin typeface="Cambria Math" panose="02040503050406030204" pitchFamily="18" charset="0"/>
+                          </a:rPr>
+                        </m:ctrlPr>
+                      </m:sSubPr>
+                      <m:e>
+                        <m:r>
+                          <a:rPr lang="en-US" b="0" i="1" smtClean="0">
+                            <a:latin typeface="Cambria Math"/>
+                          </a:rPr>
+                          <m:t>𝑇</m:t>
+                        </m:r>
+                      </m:e>
+                      <m:sub>
+                        <m:r>
+                          <a:rPr lang="en-US" b="0" i="1" smtClean="0">
+                            <a:latin typeface="Cambria Math"/>
+                          </a:rPr>
+                          <m:t>1</m:t>
+                        </m:r>
+                      </m:sub>
+                    </m:sSub>
+                    <m:r>
+                      <a:rPr lang="en-US" b="0" i="1" smtClean="0">
+                        <a:latin typeface="Cambria Math"/>
+                      </a:rPr>
+                      <m:t>=</m:t>
+                    </m:r>
+                    <m:sSub>
+                      <m:sSubPr>
+                        <m:ctrlPr>
+                          <a:rPr lang="en-US" b="0" i="1" smtClean="0">
+                            <a:latin typeface="Cambria Math" panose="02040503050406030204" pitchFamily="18" charset="0"/>
+                          </a:rPr>
+                        </m:ctrlPr>
+                      </m:sSubPr>
+                      <m:e>
+                        <m:r>
+                          <a:rPr lang="en-US" b="0" i="1" smtClean="0">
+                            <a:latin typeface="Cambria Math"/>
+                          </a:rPr>
+                          <m:t>𝑇</m:t>
+                        </m:r>
+                      </m:e>
+                      <m:sub>
+                        <m:r>
+                          <a:rPr lang="en-US" b="0" i="1" smtClean="0">
+                            <a:latin typeface="Cambria Math"/>
+                          </a:rPr>
+                          <m:t>𝑠</m:t>
+                        </m:r>
+                      </m:sub>
+                    </m:sSub>
+                    <m:r>
+                      <a:rPr lang="en-US" b="0" i="1" smtClean="0">
+                        <a:latin typeface="Cambria Math"/>
+                      </a:rPr>
+                      <m:t>+</m:t>
+                    </m:r>
+                    <m:sSub>
+                      <m:sSubPr>
+                        <m:ctrlPr>
+                          <a:rPr lang="en-US" b="0" i="1" smtClean="0">
+                            <a:latin typeface="Cambria Math" panose="02040503050406030204" pitchFamily="18" charset="0"/>
+                          </a:rPr>
+                        </m:ctrlPr>
+                      </m:sSubPr>
+                      <m:e>
+                        <m:r>
+                          <a:rPr lang="en-US" b="0" i="1" smtClean="0">
+                            <a:latin typeface="Cambria Math"/>
+                          </a:rPr>
+                          <m:t>𝑇</m:t>
+                        </m:r>
+                      </m:e>
+                      <m:sub>
+                        <m:r>
+                          <a:rPr lang="en-US" b="0" i="1" smtClean="0">
+                            <a:latin typeface="Cambria Math"/>
+                          </a:rPr>
+                          <m:t>𝑝</m:t>
+                        </m:r>
+                      </m:sub>
+                    </m:sSub>
+                  </m:oMath>
+                </a14:m>
+                <a:endParaRPr lang="en-US" b="0" dirty="0" smtClean="0"/>
+              </a:p>
+              <a:p>
+                <a:pPr lvl="1"/>
+                <a:r>
+                  <a:rPr lang="en-US" dirty="0" smtClean="0"/>
+                  <a:t>but now assume </a:t>
+                </a:r>
+                <a14:m>
+                  <m:oMath xmlns:m="http://schemas.openxmlformats.org/officeDocument/2006/math">
+                    <m:sSub>
+                      <m:sSubPr>
+                        <m:ctrlPr>
+                          <a:rPr lang="en-US" b="0" i="1" smtClean="0">
+                            <a:latin typeface="Cambria Math" panose="02040503050406030204" pitchFamily="18" charset="0"/>
+                          </a:rPr>
+                        </m:ctrlPr>
+                      </m:sSubPr>
+                      <m:e>
+                        <m:r>
+                          <a:rPr lang="en-US" b="0" i="1" smtClean="0">
+                            <a:latin typeface="Cambria Math"/>
+                          </a:rPr>
+                          <m:t>𝑇</m:t>
+                        </m:r>
+                      </m:e>
+                      <m:sub>
+                        <m:r>
+                          <a:rPr lang="en-US" b="0" i="1" smtClean="0">
+                            <a:latin typeface="Cambria Math"/>
+                          </a:rPr>
+                          <m:t>𝑠</m:t>
+                        </m:r>
+                      </m:sub>
+                    </m:sSub>
+                  </m:oMath>
+                </a14:m>
+                <a:r>
+                  <a:rPr lang="en-US" dirty="0" smtClean="0"/>
+                  <a:t> is independent of </a:t>
+                </a:r>
+                <a14:m>
+                  <m:oMath xmlns:m="http://schemas.openxmlformats.org/officeDocument/2006/math">
+                    <m:r>
+                      <a:rPr lang="en-US" i="1" dirty="0" smtClean="0">
+                        <a:latin typeface="Cambria Math"/>
+                      </a:rPr>
+                      <m:t>𝑁</m:t>
+                    </m:r>
+                  </m:oMath>
+                </a14:m>
+                <a:r>
+                  <a:rPr lang="en-US" dirty="0" smtClean="0"/>
+                  <a:t>, but</a:t>
+                </a:r>
+                <a14:m>
+                  <m:oMath xmlns:m="http://schemas.openxmlformats.org/officeDocument/2006/math">
+                    <m:r>
+                      <a:rPr lang="en-US" b="0" i="0" smtClean="0">
+                        <a:latin typeface="Cambria Math"/>
+                      </a:rPr>
+                      <m:t> </m:t>
+                    </m:r>
+                    <m:sSub>
+                      <m:sSubPr>
+                        <m:ctrlPr>
+                          <a:rPr lang="en-US" i="1" smtClean="0">
+                            <a:latin typeface="Cambria Math" panose="02040503050406030204" pitchFamily="18" charset="0"/>
+                          </a:rPr>
+                        </m:ctrlPr>
+                      </m:sSubPr>
+                      <m:e>
+                        <m:r>
+                          <a:rPr lang="en-US" b="0" i="1" smtClean="0">
+                            <a:latin typeface="Cambria Math"/>
+                          </a:rPr>
+                          <m:t>𝑇</m:t>
+                        </m:r>
+                      </m:e>
+                      <m:sub>
+                        <m:r>
+                          <a:rPr lang="en-US" b="0" i="1" smtClean="0">
+                            <a:latin typeface="Cambria Math"/>
+                          </a:rPr>
+                          <m:t>𝑝</m:t>
+                        </m:r>
+                      </m:sub>
+                    </m:sSub>
+                    <m:r>
+                      <a:rPr lang="en-US" b="0" i="1" smtClean="0">
+                        <a:latin typeface="Cambria Math"/>
+                      </a:rPr>
+                      <m:t>=</m:t>
+                    </m:r>
+                    <m:r>
+                      <a:rPr lang="en-US" b="0" i="1" smtClean="0">
+                        <a:latin typeface="Cambria Math"/>
+                      </a:rPr>
+                      <m:t>𝑁</m:t>
+                    </m:r>
+                    <m:r>
+                      <a:rPr lang="en-US" b="0" i="1" smtClean="0">
+                        <a:latin typeface="Cambria Math"/>
+                        <a:ea typeface="Cambria Math"/>
+                      </a:rPr>
+                      <m:t>𝜏</m:t>
+                    </m:r>
+                  </m:oMath>
+                </a14:m>
+                <a:endParaRPr lang="en-US" b="0" dirty="0" smtClean="0"/>
+              </a:p>
+              <a:p>
+                <a:pPr lvl="1"/>
+                <a:r>
+                  <a:rPr lang="en-US" dirty="0" smtClean="0"/>
+                  <a:t>now choose the number of processes </a:t>
+                </a:r>
+                <a14:m>
+                  <m:oMath xmlns:m="http://schemas.openxmlformats.org/officeDocument/2006/math">
+                    <m:r>
+                      <a:rPr lang="en-US" b="0" i="1" smtClean="0">
+                        <a:latin typeface="Cambria Math"/>
+                        <a:ea typeface="Cambria Math"/>
+                      </a:rPr>
+                      <m:t>𝑛</m:t>
+                    </m:r>
+                    <m:r>
+                      <a:rPr lang="en-US" b="0" i="1" smtClean="0">
+                        <a:latin typeface="Cambria Math"/>
+                        <a:ea typeface="Cambria Math"/>
+                      </a:rPr>
+                      <m:t>=</m:t>
+                    </m:r>
+                    <m:r>
+                      <a:rPr lang="en-US" b="0" i="1" smtClean="0">
+                        <a:latin typeface="Cambria Math"/>
+                        <a:ea typeface="Cambria Math"/>
+                      </a:rPr>
+                      <m:t>𝑐𝑁</m:t>
+                    </m:r>
+                  </m:oMath>
+                </a14:m>
+                <a:endParaRPr lang="en-US" dirty="0" smtClean="0"/>
+              </a:p>
+              <a:p>
+                <a:pPr lvl="1"/>
+                <a:r>
+                  <a:rPr lang="en-US" dirty="0" smtClean="0"/>
+                  <a:t>and hence </a:t>
+                </a:r>
+                <a14:m>
+                  <m:oMath xmlns:m="http://schemas.openxmlformats.org/officeDocument/2006/math">
+                    <m:r>
+                      <a:rPr lang="en-US" b="0" i="1" smtClean="0">
+                        <a:latin typeface="Cambria Math"/>
+                      </a:rPr>
+                      <m:t>𝑆</m:t>
+                    </m:r>
+                    <m:d>
+                      <m:dPr>
+                        <m:ctrlPr>
+                          <a:rPr lang="en-US" b="0" i="1" smtClean="0">
+                            <a:latin typeface="Cambria Math" panose="02040503050406030204" pitchFamily="18" charset="0"/>
+                          </a:rPr>
+                        </m:ctrlPr>
+                      </m:dPr>
+                      <m:e>
+                        <m:r>
+                          <a:rPr lang="en-US" b="0" i="1" smtClean="0">
+                            <a:latin typeface="Cambria Math"/>
+                          </a:rPr>
+                          <m:t>𝑛</m:t>
+                        </m:r>
+                      </m:e>
+                    </m:d>
+                    <m:r>
+                      <a:rPr lang="en-US" b="0" i="1" smtClean="0">
+                        <a:latin typeface="Cambria Math"/>
+                      </a:rPr>
+                      <m:t>=</m:t>
+                    </m:r>
+                    <m:f>
+                      <m:fPr>
+                        <m:ctrlPr>
+                          <a:rPr lang="en-US" b="0" i="1" smtClean="0">
+                            <a:latin typeface="Cambria Math" panose="02040503050406030204" pitchFamily="18" charset="0"/>
+                          </a:rPr>
+                        </m:ctrlPr>
+                      </m:fPr>
+                      <m:num>
+                        <m:sSub>
+                          <m:sSubPr>
+                            <m:ctrlPr>
+                              <a:rPr lang="en-US" b="0" i="1" smtClean="0">
+                                <a:latin typeface="Cambria Math" panose="02040503050406030204" pitchFamily="18" charset="0"/>
+                              </a:rPr>
+                            </m:ctrlPr>
+                          </m:sSubPr>
+                          <m:e>
+                            <m:r>
+                              <a:rPr lang="en-US" b="0" i="1" smtClean="0">
+                                <a:latin typeface="Cambria Math"/>
+                              </a:rPr>
+                              <m:t>𝑇</m:t>
+                            </m:r>
+                          </m:e>
+                          <m:sub>
+                            <m:r>
+                              <a:rPr lang="en-US" b="0" i="1" smtClean="0">
+                                <a:latin typeface="Cambria Math"/>
+                              </a:rPr>
+                              <m:t>𝑠</m:t>
+                            </m:r>
+                          </m:sub>
+                        </m:sSub>
+                        <m:r>
+                          <a:rPr lang="en-US" b="0" i="1" smtClean="0">
+                            <a:latin typeface="Cambria Math"/>
+                          </a:rPr>
+                          <m:t>+</m:t>
+                        </m:r>
+                        <m:sSub>
+                          <m:sSubPr>
+                            <m:ctrlPr>
+                              <a:rPr lang="en-US" b="0" i="1" smtClean="0">
+                                <a:latin typeface="Cambria Math" panose="02040503050406030204" pitchFamily="18" charset="0"/>
+                              </a:rPr>
+                            </m:ctrlPr>
+                          </m:sSubPr>
+                          <m:e>
+                            <m:r>
+                              <a:rPr lang="en-US" b="0" i="1" smtClean="0">
+                                <a:latin typeface="Cambria Math"/>
+                              </a:rPr>
+                              <m:t>𝑇</m:t>
+                            </m:r>
+                          </m:e>
+                          <m:sub>
+                            <m:r>
+                              <a:rPr lang="en-US" b="0" i="1" smtClean="0">
+                                <a:latin typeface="Cambria Math"/>
+                              </a:rPr>
+                              <m:t>𝑝</m:t>
+                            </m:r>
+                          </m:sub>
+                        </m:sSub>
+                      </m:num>
+                      <m:den>
+                        <m:sSub>
+                          <m:sSubPr>
+                            <m:ctrlPr>
+                              <a:rPr lang="en-US" b="0" i="1" smtClean="0">
+                                <a:latin typeface="Cambria Math" panose="02040503050406030204" pitchFamily="18" charset="0"/>
+                              </a:rPr>
+                            </m:ctrlPr>
+                          </m:sSubPr>
+                          <m:e>
+                            <m:r>
+                              <a:rPr lang="en-US" b="0" i="1" smtClean="0">
+                                <a:latin typeface="Cambria Math"/>
+                              </a:rPr>
+                              <m:t>𝑇</m:t>
+                            </m:r>
+                          </m:e>
+                          <m:sub>
+                            <m:r>
+                              <a:rPr lang="en-US" b="0" i="1" smtClean="0">
+                                <a:latin typeface="Cambria Math"/>
+                              </a:rPr>
+                              <m:t>𝑠</m:t>
+                            </m:r>
+                          </m:sub>
+                        </m:sSub>
+                        <m:r>
+                          <a:rPr lang="en-US" b="0" i="1" smtClean="0">
+                            <a:latin typeface="Cambria Math"/>
+                          </a:rPr>
+                          <m:t>+</m:t>
+                        </m:r>
+                        <m:f>
+                          <m:fPr>
+                            <m:ctrlPr>
+                              <a:rPr lang="en-US" b="0" i="1" smtClean="0">
+                                <a:latin typeface="Cambria Math" panose="02040503050406030204" pitchFamily="18" charset="0"/>
+                              </a:rPr>
+                            </m:ctrlPr>
+                          </m:fPr>
+                          <m:num>
+                            <m:sSub>
+                              <m:sSubPr>
+                                <m:ctrlPr>
+                                  <a:rPr lang="en-US" b="0" i="1" smtClean="0">
+                                    <a:latin typeface="Cambria Math" panose="02040503050406030204" pitchFamily="18" charset="0"/>
+                                  </a:rPr>
+                                </m:ctrlPr>
+                              </m:sSubPr>
+                              <m:e>
+                                <m:r>
+                                  <a:rPr lang="en-US" b="0" i="1" smtClean="0">
+                                    <a:latin typeface="Cambria Math"/>
+                                  </a:rPr>
+                                  <m:t>𝑇</m:t>
+                                </m:r>
+                              </m:e>
+                              <m:sub>
+                                <m:r>
+                                  <a:rPr lang="en-US" b="0" i="1" smtClean="0">
+                                    <a:latin typeface="Cambria Math"/>
+                                  </a:rPr>
+                                  <m:t>𝑝</m:t>
+                                </m:r>
+                              </m:sub>
+                            </m:sSub>
+                          </m:num>
+                          <m:den>
+                            <m:r>
+                              <a:rPr lang="en-US" b="0" i="1" smtClean="0">
+                                <a:latin typeface="Cambria Math"/>
+                              </a:rPr>
+                              <m:t>𝑛</m:t>
+                            </m:r>
+                          </m:den>
+                        </m:f>
+                      </m:den>
+                    </m:f>
+                    <m:r>
+                      <a:rPr lang="en-US" b="0" i="1" smtClean="0">
+                        <a:latin typeface="Cambria Math"/>
+                      </a:rPr>
+                      <m:t>=</m:t>
+                    </m:r>
+                    <m:f>
+                      <m:fPr>
+                        <m:ctrlPr>
+                          <a:rPr lang="en-US" b="0" i="1" smtClean="0">
+                            <a:latin typeface="Cambria Math" panose="02040503050406030204" pitchFamily="18" charset="0"/>
+                          </a:rPr>
+                        </m:ctrlPr>
+                      </m:fPr>
+                      <m:num>
+                        <m:sSub>
+                          <m:sSubPr>
+                            <m:ctrlPr>
+                              <a:rPr lang="en-US" b="0" i="1" smtClean="0">
+                                <a:latin typeface="Cambria Math" panose="02040503050406030204" pitchFamily="18" charset="0"/>
+                              </a:rPr>
+                            </m:ctrlPr>
+                          </m:sSubPr>
+                          <m:e>
+                            <m:r>
+                              <a:rPr lang="en-US" b="0" i="1" smtClean="0">
+                                <a:latin typeface="Cambria Math"/>
+                              </a:rPr>
+                              <m:t>𝑇</m:t>
+                            </m:r>
+                          </m:e>
+                          <m:sub>
+                            <m:r>
+                              <a:rPr lang="en-US" b="0" i="1" smtClean="0">
+                                <a:latin typeface="Cambria Math"/>
+                              </a:rPr>
+                              <m:t>𝑠</m:t>
+                            </m:r>
+                          </m:sub>
+                        </m:sSub>
+                        <m:r>
+                          <a:rPr lang="en-US" b="0" i="1" smtClean="0">
+                            <a:latin typeface="Cambria Math"/>
+                          </a:rPr>
+                          <m:t>+</m:t>
+                        </m:r>
+                        <m:f>
+                          <m:fPr>
+                            <m:ctrlPr>
+                              <a:rPr lang="en-US" b="0" i="1" smtClean="0">
+                                <a:latin typeface="Cambria Math" panose="02040503050406030204" pitchFamily="18" charset="0"/>
+                              </a:rPr>
+                            </m:ctrlPr>
+                          </m:fPr>
+                          <m:num>
+                            <m:r>
+                              <a:rPr lang="en-US" b="0" i="1" smtClean="0">
+                                <a:latin typeface="Cambria Math"/>
+                              </a:rPr>
+                              <m:t>𝑛</m:t>
+                            </m:r>
+                            <m:r>
+                              <a:rPr lang="en-US" b="0" i="1" smtClean="0">
+                                <a:latin typeface="Cambria Math"/>
+                                <a:ea typeface="Cambria Math"/>
+                              </a:rPr>
+                              <m:t>𝜏</m:t>
+                            </m:r>
+                          </m:num>
+                          <m:den>
+                            <m:r>
+                              <a:rPr lang="en-US" b="0" i="1" smtClean="0">
+                                <a:latin typeface="Cambria Math"/>
+                              </a:rPr>
+                              <m:t>𝑐</m:t>
+                            </m:r>
+                          </m:den>
+                        </m:f>
+                      </m:num>
+                      <m:den>
+                        <m:sSub>
+                          <m:sSubPr>
+                            <m:ctrlPr>
+                              <a:rPr lang="en-US" b="0" i="1" smtClean="0">
+                                <a:latin typeface="Cambria Math" panose="02040503050406030204" pitchFamily="18" charset="0"/>
+                              </a:rPr>
+                            </m:ctrlPr>
+                          </m:sSubPr>
+                          <m:e>
+                            <m:r>
+                              <a:rPr lang="en-US" b="0" i="1" smtClean="0">
+                                <a:latin typeface="Cambria Math"/>
+                              </a:rPr>
+                              <m:t>𝑇</m:t>
+                            </m:r>
+                          </m:e>
+                          <m:sub>
+                            <m:r>
+                              <a:rPr lang="en-US" b="0" i="1" smtClean="0">
+                                <a:latin typeface="Cambria Math"/>
+                              </a:rPr>
+                              <m:t>𝑠</m:t>
+                            </m:r>
+                          </m:sub>
+                        </m:sSub>
+                        <m:r>
+                          <a:rPr lang="en-US" b="0" i="1" smtClean="0">
+                            <a:latin typeface="Cambria Math"/>
+                          </a:rPr>
+                          <m:t>+</m:t>
+                        </m:r>
+                        <m:f>
+                          <m:fPr>
+                            <m:ctrlPr>
+                              <a:rPr lang="en-US" b="0" i="1" smtClean="0">
+                                <a:latin typeface="Cambria Math" panose="02040503050406030204" pitchFamily="18" charset="0"/>
+                              </a:rPr>
+                            </m:ctrlPr>
+                          </m:fPr>
+                          <m:num>
+                            <m:r>
+                              <a:rPr lang="en-US" b="0" i="1" smtClean="0">
+                                <a:latin typeface="Cambria Math"/>
+                                <a:ea typeface="Cambria Math"/>
+                              </a:rPr>
+                              <m:t>𝜏</m:t>
+                            </m:r>
+                          </m:num>
+                          <m:den>
+                            <m:r>
+                              <a:rPr lang="en-US" b="0" i="1" smtClean="0">
+                                <a:latin typeface="Cambria Math"/>
+                              </a:rPr>
+                              <m:t>𝑐</m:t>
+                            </m:r>
+                          </m:den>
+                        </m:f>
+                      </m:den>
+                    </m:f>
+                    <m:r>
+                      <a:rPr lang="en-US" b="0" i="1" smtClean="0">
+                        <a:latin typeface="Cambria Math"/>
+                        <a:ea typeface="Cambria Math"/>
+                      </a:rPr>
+                      <m:t>~</m:t>
+                    </m:r>
+                    <m:r>
+                      <a:rPr lang="en-US" b="0" i="1" smtClean="0">
+                        <a:latin typeface="Cambria Math"/>
+                        <a:ea typeface="Cambria Math"/>
+                      </a:rPr>
+                      <m:t>𝑛</m:t>
+                    </m:r>
+                  </m:oMath>
+                </a14:m>
+                <a:endParaRPr lang="nl-BE" dirty="0"/>
+              </a:p>
+            </p:txBody>
+          </p:sp>
+        </mc:Choice>
+        <mc:Fallback xmlns="">
+          <p:sp>
+            <p:nvSpPr>
+              <p:cNvPr id="3" name="Content Placeholder 2"/>
+              <p:cNvSpPr>
+                <a:spLocks noGrp="1" noRot="1" noChangeAspect="1" noMove="1" noResize="1" noEditPoints="1" noAdjustHandles="1" noChangeArrowheads="1" noChangeShapeType="1" noTextEdit="1"/>
+              </p:cNvSpPr>
+              <p:nvPr>
+                <p:ph idx="1"/>
+              </p:nvPr>
+            </p:nvSpPr>
+            <p:spPr>
+              <a:blipFill rotWithShape="1">
+                <a:blip r:embed="rId2"/>
+                <a:stretch>
+                  <a:fillRect l="-1630" t="-1617"/>
+                </a:stretch>
+              </a:blipFill>
+            </p:spPr>
+            <p:txBody>
+              <a:bodyPr/>
+              <a:lstStyle/>
+              <a:p>
+                <a:r>
+                  <a:rPr lang="nl-BE">
+                    <a:noFill/>
+                  </a:rPr>
+                  <a:t> </a:t>
+                </a:r>
+              </a:p>
+            </p:txBody>
+          </p:sp>
+        </mc:Fallback>
+      </mc:AlternateContent>
+      <mc:AlternateContent xmlns:mc="http://schemas.openxmlformats.org/markup-compatibility/2006" xmlns:a14="http://schemas.microsoft.com/office/drawing/2010/main">
+        <mc:Choice Requires="a14">
+          <p:sp>
+            <p:nvSpPr>
+              <p:cNvPr id="4" name="TextBox 3"/>
+              <p:cNvSpPr txBox="1"/>
+              <p:nvPr/>
+            </p:nvSpPr>
+            <p:spPr>
+              <a:xfrm>
+                <a:off x="539552" y="5733256"/>
+                <a:ext cx="5307479" cy="523220"/>
+              </a:xfrm>
+              <a:prstGeom prst="rect">
+                <a:avLst/>
+              </a:prstGeom>
+              <a:noFill/>
+              <a:ln>
+                <a:solidFill>
+                  <a:schemeClr val="tx1"/>
+                </a:solidFill>
+              </a:ln>
+            </p:spPr>
+            <p:txBody>
+              <a:bodyPr wrap="none" rtlCol="0">
+                <a:spAutoFit/>
+              </a:bodyPr>
+              <a:lstStyle/>
+              <a:p>
+                <a:r>
+                  <a:rPr lang="en-US" sz="2800" dirty="0" smtClean="0"/>
+                  <a:t>Gustafson's law: </a:t>
+                </a:r>
+                <a14:m>
+                  <m:oMath xmlns:m="http://schemas.openxmlformats.org/officeDocument/2006/math">
+                    <m:sSub>
+                      <m:sSubPr>
+                        <m:ctrlPr>
+                          <a:rPr lang="en-US" sz="2800" i="1" smtClean="0">
+                            <a:latin typeface="Cambria Math" panose="02040503050406030204" pitchFamily="18" charset="0"/>
+                          </a:rPr>
+                        </m:ctrlPr>
+                      </m:sSubPr>
+                      <m:e>
+                        <m:r>
+                          <a:rPr lang="en-US" sz="2800" b="0" i="1" smtClean="0">
+                            <a:latin typeface="Cambria Math"/>
+                          </a:rPr>
+                          <m:t>𝑇</m:t>
+                        </m:r>
+                      </m:e>
+                      <m:sub>
+                        <m:r>
+                          <a:rPr lang="en-US" sz="2800" b="0" i="1" smtClean="0">
+                            <a:latin typeface="Cambria Math"/>
+                          </a:rPr>
+                          <m:t>𝑛</m:t>
+                        </m:r>
+                      </m:sub>
+                    </m:sSub>
+                    <m:d>
+                      <m:dPr>
+                        <m:ctrlPr>
+                          <a:rPr lang="en-US" sz="2800" b="0" i="1" smtClean="0">
+                            <a:latin typeface="Cambria Math" panose="02040503050406030204" pitchFamily="18" charset="0"/>
+                          </a:rPr>
+                        </m:ctrlPr>
+                      </m:dPr>
+                      <m:e>
+                        <m:r>
+                          <a:rPr lang="en-US" sz="2800" b="0" i="1" smtClean="0">
+                            <a:latin typeface="Cambria Math"/>
+                          </a:rPr>
+                          <m:t>𝑁</m:t>
+                        </m:r>
+                      </m:e>
+                    </m:d>
+                    <m:r>
+                      <a:rPr lang="en-US" sz="2800" b="0" i="1" smtClean="0">
+                        <a:latin typeface="Cambria Math"/>
+                      </a:rPr>
+                      <m:t>=</m:t>
+                    </m:r>
+                    <m:sSub>
+                      <m:sSubPr>
+                        <m:ctrlPr>
+                          <a:rPr lang="en-US" sz="2800" b="0" i="1" smtClean="0">
+                            <a:latin typeface="Cambria Math" panose="02040503050406030204" pitchFamily="18" charset="0"/>
+                          </a:rPr>
+                        </m:ctrlPr>
+                      </m:sSubPr>
+                      <m:e>
+                        <m:r>
+                          <a:rPr lang="en-US" sz="2800" b="0" i="1" smtClean="0">
+                            <a:latin typeface="Cambria Math"/>
+                          </a:rPr>
+                          <m:t>𝑇</m:t>
+                        </m:r>
+                      </m:e>
+                      <m:sub>
+                        <m:r>
+                          <a:rPr lang="en-US" sz="2800" b="0" i="1" smtClean="0">
+                            <a:latin typeface="Cambria Math"/>
+                          </a:rPr>
+                          <m:t>2</m:t>
+                        </m:r>
+                        <m:r>
+                          <a:rPr lang="en-US" sz="2800" b="0" i="1" smtClean="0">
+                            <a:latin typeface="Cambria Math"/>
+                          </a:rPr>
+                          <m:t>𝑛</m:t>
+                        </m:r>
+                      </m:sub>
+                    </m:sSub>
+                    <m:r>
+                      <a:rPr lang="en-US" sz="2800" b="0" i="1" smtClean="0">
+                        <a:latin typeface="Cambria Math"/>
+                      </a:rPr>
+                      <m:t>(2</m:t>
+                    </m:r>
+                    <m:r>
+                      <a:rPr lang="en-US" sz="2800" b="0" i="1" smtClean="0">
+                        <a:latin typeface="Cambria Math"/>
+                      </a:rPr>
+                      <m:t>𝑁</m:t>
+                    </m:r>
+                    <m:r>
+                      <a:rPr lang="en-US" sz="2800" b="0" i="1" smtClean="0">
+                        <a:latin typeface="Cambria Math"/>
+                      </a:rPr>
+                      <m:t>)</m:t>
+                    </m:r>
+                  </m:oMath>
+                </a14:m>
+                <a:endParaRPr lang="nl-BE" dirty="0"/>
+              </a:p>
+            </p:txBody>
+          </p:sp>
+        </mc:Choice>
+        <mc:Fallback xmlns="">
+          <p:sp>
+            <p:nvSpPr>
+              <p:cNvPr id="4" name="TextBox 3"/>
+              <p:cNvSpPr txBox="1">
+                <a:spLocks noRot="1" noChangeAspect="1" noMove="1" noResize="1" noEditPoints="1" noAdjustHandles="1" noChangeArrowheads="1" noChangeShapeType="1" noTextEdit="1"/>
+              </p:cNvSpPr>
+              <p:nvPr/>
+            </p:nvSpPr>
+            <p:spPr>
+              <a:xfrm>
+                <a:off x="539552" y="5733256"/>
+                <a:ext cx="5307479" cy="523220"/>
+              </a:xfrm>
+              <a:prstGeom prst="rect">
+                <a:avLst/>
+              </a:prstGeom>
+              <a:blipFill rotWithShape="1">
+                <a:blip r:embed="rId3"/>
+                <a:stretch>
+                  <a:fillRect l="-2294" t="-9091" b="-30682"/>
+                </a:stretch>
+              </a:blipFill>
+              <a:ln>
+                <a:solidFill>
+                  <a:schemeClr val="tx1"/>
+                </a:solidFill>
+              </a:ln>
+            </p:spPr>
+            <p:txBody>
+              <a:bodyPr/>
+              <a:lstStyle/>
+              <a:p>
+                <a:r>
+                  <a:rPr lang="nl-BE">
+                    <a:noFill/>
+                  </a:rPr>
+                  <a:t> </a:t>
+                </a:r>
+              </a:p>
+            </p:txBody>
+          </p:sp>
+        </mc:Fallback>
+      </mc:AlternateContent>
       <p:sp>
         <p:nvSpPr>
-          <p:cNvPr id="3" name="Content Placeholder 2"/>
-          <p:cNvSpPr>
-            <a:spLocks noGrp="1"/>
-          </p:cNvSpPr>
-          <p:nvPr>
-            <p:ph idx="1"/>
-          </p:nvPr>
+          <p:cNvPr id="5" name="TextBox 4"/>
+          <p:cNvSpPr txBox="1"/>
+          <p:nvPr/>
         </p:nvSpPr>
-        <p:spPr/>
+        <p:spPr>
+          <a:xfrm>
+            <a:off x="6444208" y="5661248"/>
+            <a:ext cx="1848198" cy="1077218"/>
+          </a:xfrm>
+          <a:prstGeom prst="rect">
+            <a:avLst/>
+          </a:prstGeom>
+          <a:noFill/>
+          <a:ln>
+            <a:solidFill>
+              <a:schemeClr val="tx1"/>
+            </a:solidFill>
+          </a:ln>
+        </p:spPr>
         <p:txBody>
-          <a:bodyPr/>
+          <a:bodyPr wrap="none" rtlCol="0">
+            <a:spAutoFit/>
+          </a:bodyPr>
           <a:lstStyle/>
           <a:p>
             <a:r>
-              <a:rPr lang="en-US" dirty="0" smtClean="0"/>
-              <a:t>Scientist are interested in</a:t>
-            </a:r>
-          </a:p>
-          <a:p>
-            <a:pPr lvl="1"/>
-            <a:r>
-              <a:rPr lang="en-US" dirty="0" smtClean="0"/>
-              <a:t>studying larger systems/bigger data sets</a:t>
-            </a:r>
-          </a:p>
-          <a:p>
-            <a:pPr lvl="1"/>
-            <a:r>
-              <a:rPr lang="en-US" dirty="0" smtClean="0"/>
-              <a:t>increasing precision/resolution</a:t>
-            </a:r>
-          </a:p>
-          <a:p>
-            <a:pPr lvl="1"/>
-            <a:r>
-              <a:rPr lang="en-US" dirty="0" smtClean="0"/>
-              <a:t>…</a:t>
-            </a:r>
-            <a:endParaRPr lang="nl-BE" dirty="0"/>
+              <a:rPr lang="en-US" sz="3200" dirty="0" smtClean="0"/>
+              <a:t>Nice for</a:t>
+            </a:r>
+            <a:br>
+              <a:rPr lang="en-US" sz="3200" dirty="0" smtClean="0"/>
+            </a:br>
+            <a:r>
+              <a:rPr lang="en-US" sz="3200" dirty="0" smtClean="0"/>
+              <a:t>scientists!</a:t>
+            </a:r>
+            <a:endParaRPr lang="nl-BE" sz="3200" dirty="0"/>
           </a:p>
         </p:txBody>
       </p:sp>
     </p:spTree>
     <p:extLst>
       <p:ext uri="{BB962C8B-B14F-4D97-AF65-F5344CB8AC3E}">
-        <p14:creationId xmlns:p14="http://schemas.microsoft.com/office/powerpoint/2010/main" val="3599898149"/>
+        <p14:creationId xmlns:p14="http://schemas.microsoft.com/office/powerpoint/2010/main" val="3119421013"/>
       </p:ext>
     </p:extLst>
   </p:cSld>
@@ -4437,9 +5367,375 @@
   <p:timing>
     <p:tnLst>
       <p:par>
-        <p:cTn id="1" dur="indefinite" restart="never" nodeType="tmRoot"/>
+        <p:cTn id="1" dur="indefinite" restart="never" nodeType="tmRoot">
+          <p:childTnLst>
+            <p:seq concurrent="1" nextAc="seek">
+              <p:cTn id="2" dur="indefinite" nodeType="mainSeq">
+                <p:childTnLst>
+                  <p:par>
+                    <p:cTn id="3" fill="hold">
+                      <p:stCondLst>
+                        <p:cond delay="indefinite"/>
+                        <p:cond evt="onBegin" delay="0">
+                          <p:tn val="2"/>
+                        </p:cond>
+                      </p:stCondLst>
+                      <p:childTnLst>
+                        <p:par>
+                          <p:cTn id="4" fill="hold">
+                            <p:stCondLst>
+                              <p:cond delay="0"/>
+                            </p:stCondLst>
+                            <p:childTnLst>
+                              <p:par>
+                                <p:cTn id="5" presetID="1" presetClass="entr" presetSubtype="0" fill="hold" grpId="0" nodeType="withEffect">
+                                  <p:stCondLst>
+                                    <p:cond delay="0"/>
+                                  </p:stCondLst>
+                                  <p:childTnLst>
+                                    <p:set>
+                                      <p:cBhvr>
+                                        <p:cTn id="6" dur="1" fill="hold">
+                                          <p:stCondLst>
+                                            <p:cond delay="0"/>
+                                          </p:stCondLst>
+                                        </p:cTn>
+                                        <p:tgtEl>
+                                          <p:spTgt spid="3">
+                                            <p:txEl>
+                                              <p:pRg st="0" end="0"/>
+                                            </p:txEl>
+                                          </p:spTgt>
+                                        </p:tgtEl>
+                                        <p:attrNameLst>
+                                          <p:attrName>style.visibility</p:attrName>
+                                        </p:attrNameLst>
+                                      </p:cBhvr>
+                                      <p:to>
+                                        <p:strVal val="visible"/>
+                                      </p:to>
+                                    </p:set>
+                                  </p:childTnLst>
+                                </p:cTn>
+                              </p:par>
+                            </p:childTnLst>
+                          </p:cTn>
+                        </p:par>
+                      </p:childTnLst>
+                    </p:cTn>
+                  </p:par>
+                  <p:par>
+                    <p:cTn id="7" fill="hold">
+                      <p:stCondLst>
+                        <p:cond delay="indefinite"/>
+                      </p:stCondLst>
+                      <p:childTnLst>
+                        <p:par>
+                          <p:cTn id="8" fill="hold">
+                            <p:stCondLst>
+                              <p:cond delay="0"/>
+                            </p:stCondLst>
+                            <p:childTnLst>
+                              <p:par>
+                                <p:cTn id="9" presetID="1" presetClass="entr" presetSubtype="0" fill="hold" grpId="0" nodeType="clickEffect">
+                                  <p:stCondLst>
+                                    <p:cond delay="0"/>
+                                  </p:stCondLst>
+                                  <p:childTnLst>
+                                    <p:set>
+                                      <p:cBhvr>
+                                        <p:cTn id="10" dur="1" fill="hold">
+                                          <p:stCondLst>
+                                            <p:cond delay="0"/>
+                                          </p:stCondLst>
+                                        </p:cTn>
+                                        <p:tgtEl>
+                                          <p:spTgt spid="3">
+                                            <p:txEl>
+                                              <p:pRg st="1" end="1"/>
+                                            </p:txEl>
+                                          </p:spTgt>
+                                        </p:tgtEl>
+                                        <p:attrNameLst>
+                                          <p:attrName>style.visibility</p:attrName>
+                                        </p:attrNameLst>
+                                      </p:cBhvr>
+                                      <p:to>
+                                        <p:strVal val="visible"/>
+                                      </p:to>
+                                    </p:set>
+                                  </p:childTnLst>
+                                </p:cTn>
+                              </p:par>
+                            </p:childTnLst>
+                          </p:cTn>
+                        </p:par>
+                      </p:childTnLst>
+                    </p:cTn>
+                  </p:par>
+                  <p:par>
+                    <p:cTn id="11" fill="hold">
+                      <p:stCondLst>
+                        <p:cond delay="indefinite"/>
+                      </p:stCondLst>
+                      <p:childTnLst>
+                        <p:par>
+                          <p:cTn id="12" fill="hold">
+                            <p:stCondLst>
+                              <p:cond delay="0"/>
+                            </p:stCondLst>
+                            <p:childTnLst>
+                              <p:par>
+                                <p:cTn id="13" presetID="1" presetClass="entr" presetSubtype="0" fill="hold" grpId="0" nodeType="clickEffect">
+                                  <p:stCondLst>
+                                    <p:cond delay="0"/>
+                                  </p:stCondLst>
+                                  <p:childTnLst>
+                                    <p:set>
+                                      <p:cBhvr>
+                                        <p:cTn id="14" dur="1" fill="hold">
+                                          <p:stCondLst>
+                                            <p:cond delay="0"/>
+                                          </p:stCondLst>
+                                        </p:cTn>
+                                        <p:tgtEl>
+                                          <p:spTgt spid="3">
+                                            <p:txEl>
+                                              <p:pRg st="2" end="2"/>
+                                            </p:txEl>
+                                          </p:spTgt>
+                                        </p:tgtEl>
+                                        <p:attrNameLst>
+                                          <p:attrName>style.visibility</p:attrName>
+                                        </p:attrNameLst>
+                                      </p:cBhvr>
+                                      <p:to>
+                                        <p:strVal val="visible"/>
+                                      </p:to>
+                                    </p:set>
+                                  </p:childTnLst>
+                                </p:cTn>
+                              </p:par>
+                            </p:childTnLst>
+                          </p:cTn>
+                        </p:par>
+                      </p:childTnLst>
+                    </p:cTn>
+                  </p:par>
+                  <p:par>
+                    <p:cTn id="15" fill="hold">
+                      <p:stCondLst>
+                        <p:cond delay="indefinite"/>
+                      </p:stCondLst>
+                      <p:childTnLst>
+                        <p:par>
+                          <p:cTn id="16" fill="hold">
+                            <p:stCondLst>
+                              <p:cond delay="0"/>
+                            </p:stCondLst>
+                            <p:childTnLst>
+                              <p:par>
+                                <p:cTn id="17" presetID="1" presetClass="entr" presetSubtype="0" fill="hold" grpId="0" nodeType="clickEffect">
+                                  <p:stCondLst>
+                                    <p:cond delay="0"/>
+                                  </p:stCondLst>
+                                  <p:childTnLst>
+                                    <p:set>
+                                      <p:cBhvr>
+                                        <p:cTn id="18" dur="1" fill="hold">
+                                          <p:stCondLst>
+                                            <p:cond delay="0"/>
+                                          </p:stCondLst>
+                                        </p:cTn>
+                                        <p:tgtEl>
+                                          <p:spTgt spid="3">
+                                            <p:txEl>
+                                              <p:pRg st="3" end="3"/>
+                                            </p:txEl>
+                                          </p:spTgt>
+                                        </p:tgtEl>
+                                        <p:attrNameLst>
+                                          <p:attrName>style.visibility</p:attrName>
+                                        </p:attrNameLst>
+                                      </p:cBhvr>
+                                      <p:to>
+                                        <p:strVal val="visible"/>
+                                      </p:to>
+                                    </p:set>
+                                  </p:childTnLst>
+                                </p:cTn>
+                              </p:par>
+                            </p:childTnLst>
+                          </p:cTn>
+                        </p:par>
+                      </p:childTnLst>
+                    </p:cTn>
+                  </p:par>
+                  <p:par>
+                    <p:cTn id="19" fill="hold">
+                      <p:stCondLst>
+                        <p:cond delay="indefinite"/>
+                      </p:stCondLst>
+                      <p:childTnLst>
+                        <p:par>
+                          <p:cTn id="20" fill="hold">
+                            <p:stCondLst>
+                              <p:cond delay="0"/>
+                            </p:stCondLst>
+                            <p:childTnLst>
+                              <p:par>
+                                <p:cTn id="21" presetID="1" presetClass="entr" presetSubtype="0" fill="hold" grpId="0" nodeType="clickEffect">
+                                  <p:stCondLst>
+                                    <p:cond delay="0"/>
+                                  </p:stCondLst>
+                                  <p:childTnLst>
+                                    <p:set>
+                                      <p:cBhvr>
+                                        <p:cTn id="22" dur="1" fill="hold">
+                                          <p:stCondLst>
+                                            <p:cond delay="0"/>
+                                          </p:stCondLst>
+                                        </p:cTn>
+                                        <p:tgtEl>
+                                          <p:spTgt spid="3">
+                                            <p:txEl>
+                                              <p:pRg st="4" end="4"/>
+                                            </p:txEl>
+                                          </p:spTgt>
+                                        </p:tgtEl>
+                                        <p:attrNameLst>
+                                          <p:attrName>style.visibility</p:attrName>
+                                        </p:attrNameLst>
+                                      </p:cBhvr>
+                                      <p:to>
+                                        <p:strVal val="visible"/>
+                                      </p:to>
+                                    </p:set>
+                                  </p:childTnLst>
+                                </p:cTn>
+                              </p:par>
+                            </p:childTnLst>
+                          </p:cTn>
+                        </p:par>
+                      </p:childTnLst>
+                    </p:cTn>
+                  </p:par>
+                  <p:par>
+                    <p:cTn id="23" fill="hold">
+                      <p:stCondLst>
+                        <p:cond delay="indefinite"/>
+                      </p:stCondLst>
+                      <p:childTnLst>
+                        <p:par>
+                          <p:cTn id="24" fill="hold">
+                            <p:stCondLst>
+                              <p:cond delay="0"/>
+                            </p:stCondLst>
+                            <p:childTnLst>
+                              <p:par>
+                                <p:cTn id="25" presetID="1" presetClass="entr" presetSubtype="0" fill="hold" grpId="0" nodeType="clickEffect">
+                                  <p:stCondLst>
+                                    <p:cond delay="0"/>
+                                  </p:stCondLst>
+                                  <p:childTnLst>
+                                    <p:set>
+                                      <p:cBhvr>
+                                        <p:cTn id="26" dur="1" fill="hold">
+                                          <p:stCondLst>
+                                            <p:cond delay="0"/>
+                                          </p:stCondLst>
+                                        </p:cTn>
+                                        <p:tgtEl>
+                                          <p:spTgt spid="4"/>
+                                        </p:tgtEl>
+                                        <p:attrNameLst>
+                                          <p:attrName>style.visibility</p:attrName>
+                                        </p:attrNameLst>
+                                      </p:cBhvr>
+                                      <p:to>
+                                        <p:strVal val="visible"/>
+                                      </p:to>
+                                    </p:set>
+                                  </p:childTnLst>
+                                </p:cTn>
+                              </p:par>
+                            </p:childTnLst>
+                          </p:cTn>
+                        </p:par>
+                      </p:childTnLst>
+                    </p:cTn>
+                  </p:par>
+                  <p:par>
+                    <p:cTn id="27" fill="hold">
+                      <p:stCondLst>
+                        <p:cond delay="indefinite"/>
+                      </p:stCondLst>
+                      <p:childTnLst>
+                        <p:par>
+                          <p:cTn id="28" fill="hold">
+                            <p:stCondLst>
+                              <p:cond delay="0"/>
+                            </p:stCondLst>
+                            <p:childTnLst>
+                              <p:par>
+                                <p:cTn id="29" presetID="1" presetClass="entr" presetSubtype="0" fill="hold" grpId="0" nodeType="clickEffect">
+                                  <p:stCondLst>
+                                    <p:cond delay="0"/>
+                                  </p:stCondLst>
+                                  <p:childTnLst>
+                                    <p:set>
+                                      <p:cBhvr>
+                                        <p:cTn id="30" dur="1" fill="hold">
+                                          <p:stCondLst>
+                                            <p:cond delay="0"/>
+                                          </p:stCondLst>
+                                        </p:cTn>
+                                        <p:tgtEl>
+                                          <p:spTgt spid="5"/>
+                                        </p:tgtEl>
+                                        <p:attrNameLst>
+                                          <p:attrName>style.visibility</p:attrName>
+                                        </p:attrNameLst>
+                                      </p:cBhvr>
+                                      <p:to>
+                                        <p:strVal val="visible"/>
+                                      </p:to>
+                                    </p:set>
+                                  </p:childTnLst>
+                                </p:cTn>
+                              </p:par>
+                            </p:childTnLst>
+                          </p:cTn>
+                        </p:par>
+                      </p:childTnLst>
+                    </p:cTn>
+                  </p:par>
+                </p:childTnLst>
+              </p:cTn>
+              <p:prevCondLst>
+                <p:cond evt="onPrev" delay="0">
+                  <p:tgtEl>
+                    <p:sldTgt/>
+                  </p:tgtEl>
+                </p:cond>
+              </p:prevCondLst>
+              <p:nextCondLst>
+                <p:cond evt="onNext" delay="0">
+                  <p:tgtEl>
+                    <p:sldTgt/>
+                  </p:tgtEl>
+                </p:cond>
+              </p:nextCondLst>
+            </p:seq>
+          </p:childTnLst>
+        </p:cTn>
       </p:par>
     </p:tnLst>
+    <p:bldLst>
+      <p:bldP spid="3" grpId="0" uiExpand="1" build="p"/>
+      <p:bldP spid="4" grpId="0" animBg="1"/>
+      <p:bldP spid="5" grpId="0" animBg="1"/>
+    </p:bldLst>
   </p:timing>
 </p:sld>
 </file>
@@ -4478,6 +5774,110 @@
           <a:p>
             <a:r>
               <a:rPr lang="en-US" dirty="0" smtClean="0"/>
+              <a:t>We love Gustafson</a:t>
+            </a:r>
+            <a:endParaRPr lang="nl-BE" dirty="0"/>
+          </a:p>
+        </p:txBody>
+      </p:sp>
+      <p:sp>
+        <p:nvSpPr>
+          <p:cNvPr id="3" name="Content Placeholder 2"/>
+          <p:cNvSpPr>
+            <a:spLocks noGrp="1"/>
+          </p:cNvSpPr>
+          <p:nvPr>
+            <p:ph idx="1"/>
+          </p:nvPr>
+        </p:nvSpPr>
+        <p:spPr/>
+        <p:txBody>
+          <a:bodyPr/>
+          <a:lstStyle/>
+          <a:p>
+            <a:r>
+              <a:rPr lang="en-US" dirty="0" smtClean="0"/>
+              <a:t>Scientist are interested in</a:t>
+            </a:r>
+          </a:p>
+          <a:p>
+            <a:pPr lvl="1"/>
+            <a:r>
+              <a:rPr lang="en-US" dirty="0" smtClean="0"/>
+              <a:t>studying larger systems/bigger data sets</a:t>
+            </a:r>
+          </a:p>
+          <a:p>
+            <a:pPr lvl="1"/>
+            <a:r>
+              <a:rPr lang="en-US" dirty="0" smtClean="0"/>
+              <a:t>increasing precision/resolution</a:t>
+            </a:r>
+          </a:p>
+          <a:p>
+            <a:pPr lvl="1"/>
+            <a:r>
+              <a:rPr lang="en-US" dirty="0" smtClean="0"/>
+              <a:t>…</a:t>
+            </a:r>
+            <a:endParaRPr lang="nl-BE" dirty="0"/>
+          </a:p>
+        </p:txBody>
+      </p:sp>
+    </p:spTree>
+    <p:extLst>
+      <p:ext uri="{BB962C8B-B14F-4D97-AF65-F5344CB8AC3E}">
+        <p14:creationId xmlns:p14="http://schemas.microsoft.com/office/powerpoint/2010/main" val="3599898149"/>
+      </p:ext>
+    </p:extLst>
+  </p:cSld>
+  <p:clrMapOvr>
+    <a:masterClrMapping/>
+  </p:clrMapOvr>
+  <p:timing>
+    <p:tnLst>
+      <p:par>
+        <p:cTn id="1" dur="indefinite" restart="never" nodeType="tmRoot"/>
+      </p:par>
+    </p:tnLst>
+  </p:timing>
+</p:sld>
+</file>
+
+<file path=ppt/slides/slide12.xml><?xml version="1.0" encoding="utf-8"?>
+<p:sld xmlns:a="http://schemas.openxmlformats.org/drawingml/2006/main" xmlns:r="http://schemas.openxmlformats.org/officeDocument/2006/relationships" xmlns:p="http://schemas.openxmlformats.org/presentationml/2006/main">
+  <p:cSld>
+    <p:spTree>
+      <p:nvGrpSpPr>
+        <p:cNvPr id="1" name=""/>
+        <p:cNvGrpSpPr/>
+        <p:nvPr/>
+      </p:nvGrpSpPr>
+      <p:grpSpPr>
+        <a:xfrm>
+          <a:off x="0" y="0"/>
+          <a:ext cx="0" cy="0"/>
+          <a:chOff x="0" y="0"/>
+          <a:chExt cx="0" cy="0"/>
+        </a:xfrm>
+      </p:grpSpPr>
+      <p:sp>
+        <p:nvSpPr>
+          <p:cNvPr id="2" name="Title 1"/>
+          <p:cNvSpPr>
+            <a:spLocks noGrp="1"/>
+          </p:cNvSpPr>
+          <p:nvPr>
+            <p:ph type="title"/>
+          </p:nvPr>
+        </p:nvSpPr>
+        <p:spPr/>
+        <p:txBody>
+          <a:bodyPr/>
+          <a:lstStyle/>
+          <a:p>
+            <a:r>
+              <a:rPr lang="en-US" dirty="0" smtClean="0"/>
               <a:t>Throughput computing</a:t>
             </a:r>
             <a:endParaRPr lang="en-US" dirty="0"/>
@@ -4593,7 +5993,7 @@
           <a:graphicData uri="http://schemas.openxmlformats.org/presentationml/2006/ole">
             <mc:AlternateContent xmlns:mc="http://schemas.openxmlformats.org/markup-compatibility/2006">
               <mc:Choice xmlns:v="urn:schemas-microsoft-com:vml" Requires="v">
-                <p:oleObj spid="_x0000_s1030" name="Equation" r:id="rId3" imgW="812520" imgH="393480" progId="Equation.3">
+                <p:oleObj spid="_x0000_s1032" name="Equation" r:id="rId3" imgW="812520" imgH="393480" progId="Equation.3">
                   <p:embed/>
                 </p:oleObj>
               </mc:Choice>
@@ -4650,7 +6050,7 @@
           <a:graphicData uri="http://schemas.openxmlformats.org/presentationml/2006/ole">
             <mc:AlternateContent xmlns:mc="http://schemas.openxmlformats.org/markup-compatibility/2006">
               <mc:Choice xmlns:v="urn:schemas-microsoft-com:vml" Requires="v">
-                <p:oleObj spid="_x0000_s1031" name="Equation" r:id="rId5" imgW="2489040" imgH="431640" progId="Equation.3">
+                <p:oleObj spid="_x0000_s1033" name="Equation" r:id="rId5" imgW="2489040" imgH="431640" progId="Equation.3">
                   <p:embed/>
                 </p:oleObj>
               </mc:Choice>
@@ -5184,6 +6584,85 @@
           <a:p>
             <a:r>
               <a:rPr lang="en-US" dirty="0" smtClean="0"/>
+              <a:t>Parallel scaling</a:t>
+            </a:r>
+            <a:endParaRPr lang="en-US" dirty="0"/>
+          </a:p>
+        </p:txBody>
+      </p:sp>
+      <p:sp>
+        <p:nvSpPr>
+          <p:cNvPr id="3" name="Text Placeholder 2"/>
+          <p:cNvSpPr>
+            <a:spLocks noGrp="1"/>
+          </p:cNvSpPr>
+          <p:nvPr>
+            <p:ph type="body" idx="1"/>
+          </p:nvPr>
+        </p:nvSpPr>
+        <p:spPr/>
+        <p:txBody>
+          <a:bodyPr/>
+          <a:lstStyle/>
+          <a:p>
+            <a:endParaRPr lang="en-US"/>
+          </a:p>
+        </p:txBody>
+      </p:sp>
+    </p:spTree>
+    <p:extLst>
+      <p:ext uri="{BB962C8B-B14F-4D97-AF65-F5344CB8AC3E}">
+        <p14:creationId xmlns:p14="http://schemas.microsoft.com/office/powerpoint/2010/main" val="703705777"/>
+      </p:ext>
+    </p:extLst>
+  </p:cSld>
+  <p:clrMapOvr>
+    <a:masterClrMapping/>
+  </p:clrMapOvr>
+  <p:timing>
+    <p:tnLst>
+      <p:par>
+        <p:cTn id="1" dur="indefinite" restart="never" nodeType="tmRoot"/>
+      </p:par>
+    </p:tnLst>
+  </p:timing>
+</p:sld>
+</file>
+
+<file path=ppt/slides/slide3.xml><?xml version="1.0" encoding="utf-8"?>
+<p:sld xmlns:a="http://schemas.openxmlformats.org/drawingml/2006/main" xmlns:r="http://schemas.openxmlformats.org/officeDocument/2006/relationships" xmlns:p="http://schemas.openxmlformats.org/presentationml/2006/main">
+  <p:cSld>
+    <p:spTree>
+      <p:nvGrpSpPr>
+        <p:cNvPr id="1" name=""/>
+        <p:cNvGrpSpPr/>
+        <p:nvPr/>
+      </p:nvGrpSpPr>
+      <p:grpSpPr>
+        <a:xfrm>
+          <a:off x="0" y="0"/>
+          <a:ext cx="0" cy="0"/>
+          <a:chOff x="0" y="0"/>
+          <a:chExt cx="0" cy="0"/>
+        </a:xfrm>
+      </p:grpSpPr>
+      <p:sp>
+        <p:nvSpPr>
+          <p:cNvPr id="2" name="Title 1"/>
+          <p:cNvSpPr>
+            <a:spLocks noGrp="1"/>
+          </p:cNvSpPr>
+          <p:nvPr>
+            <p:ph type="title"/>
+          </p:nvPr>
+        </p:nvSpPr>
+        <p:spPr/>
+        <p:txBody>
+          <a:bodyPr/>
+          <a:lstStyle/>
+          <a:p>
+            <a:r>
+              <a:rPr lang="en-US" dirty="0" smtClean="0"/>
               <a:t>Dimensions for scaling</a:t>
             </a:r>
             <a:endParaRPr lang="nl-BE" dirty="0"/>
@@ -5511,7 +6990,7 @@
 </p:sld>
 </file>
 
-<file path=ppt/slides/slide3.xml><?xml version="1.0" encoding="utf-8"?>
+<file path=ppt/slides/slide4.xml><?xml version="1.0" encoding="utf-8"?>
 <p:sld xmlns:a="http://schemas.openxmlformats.org/drawingml/2006/main" xmlns:r="http://schemas.openxmlformats.org/officeDocument/2006/relationships" xmlns:p="http://schemas.openxmlformats.org/presentationml/2006/main">
   <p:cSld>
     <p:spTree>
@@ -6052,7 +7531,7 @@
 </p:sld>
 </file>
 
-<file path=ppt/slides/slide4.xml><?xml version="1.0" encoding="utf-8"?>
+<file path=ppt/slides/slide5.xml><?xml version="1.0" encoding="utf-8"?>
 <p:sld xmlns:a="http://schemas.openxmlformats.org/drawingml/2006/main" xmlns:r="http://schemas.openxmlformats.org/officeDocument/2006/relationships" xmlns:p="http://schemas.openxmlformats.org/presentationml/2006/main">
   <p:cSld>
     <p:spTree>
@@ -7088,7 +8567,7 @@
 </p:sld>
 </file>
 
-<file path=ppt/slides/slide5.xml><?xml version="1.0" encoding="utf-8"?>
+<file path=ppt/slides/slide6.xml><?xml version="1.0" encoding="utf-8"?>
 <p:sld xmlns:a="http://schemas.openxmlformats.org/drawingml/2006/main" xmlns:r="http://schemas.openxmlformats.org/officeDocument/2006/relationships" xmlns:p="http://schemas.openxmlformats.org/presentationml/2006/main">
   <p:cSld>
     <p:spTree>
@@ -8251,7 +9730,7 @@
 </p:sld>
 </file>
 
-<file path=ppt/slides/slide6.xml><?xml version="1.0" encoding="utf-8"?>
+<file path=ppt/slides/slide7.xml><?xml version="1.0" encoding="utf-8"?>
 <p:sld xmlns:a="http://schemas.openxmlformats.org/drawingml/2006/main" xmlns:r="http://schemas.openxmlformats.org/officeDocument/2006/relationships" xmlns:p="http://schemas.openxmlformats.org/presentationml/2006/main">
   <p:cSld>
     <p:spTree>
@@ -8874,7 +10353,7 @@
 </p:sld>
 </file>
 
-<file path=ppt/slides/slide7.xml><?xml version="1.0" encoding="utf-8"?>
+<file path=ppt/slides/slide8.xml><?xml version="1.0" encoding="utf-8"?>
 <p:sld xmlns:a="http://schemas.openxmlformats.org/drawingml/2006/main" xmlns:r="http://schemas.openxmlformats.org/officeDocument/2006/relationships" xmlns:p="http://schemas.openxmlformats.org/presentationml/2006/main">
   <p:cSld>
     <p:spTree>
@@ -9403,7 +10882,7 @@
 </p:sld>
 </file>
 
-<file path=ppt/slides/slide8.xml><?xml version="1.0" encoding="utf-8"?>
+<file path=ppt/slides/slide9.xml><?xml version="1.0" encoding="utf-8"?>
 <p:sld xmlns:a="http://schemas.openxmlformats.org/drawingml/2006/main" xmlns:r="http://schemas.openxmlformats.org/officeDocument/2006/relationships" xmlns:p="http://schemas.openxmlformats.org/presentationml/2006/main">
   <p:cSld>
     <p:spTree>
@@ -10230,1306 +11709,6 @@
 </p:sld>
 </file>
 
-<file path=ppt/slides/slide9.xml><?xml version="1.0" encoding="utf-8"?>
-<p:sld xmlns:a="http://schemas.openxmlformats.org/drawingml/2006/main" xmlns:r="http://schemas.openxmlformats.org/officeDocument/2006/relationships" xmlns:p="http://schemas.openxmlformats.org/presentationml/2006/main">
-  <p:cSld>
-    <p:spTree>
-      <p:nvGrpSpPr>
-        <p:cNvPr id="1" name=""/>
-        <p:cNvGrpSpPr/>
-        <p:nvPr/>
-      </p:nvGrpSpPr>
-      <p:grpSpPr>
-        <a:xfrm>
-          <a:off x="0" y="0"/>
-          <a:ext cx="0" cy="0"/>
-          <a:chOff x="0" y="0"/>
-          <a:chExt cx="0" cy="0"/>
-        </a:xfrm>
-      </p:grpSpPr>
-      <p:sp>
-        <p:nvSpPr>
-          <p:cNvPr id="2" name="Title 1"/>
-          <p:cNvSpPr>
-            <a:spLocks noGrp="1"/>
-          </p:cNvSpPr>
-          <p:nvPr>
-            <p:ph type="title"/>
-          </p:nvPr>
-        </p:nvSpPr>
-        <p:spPr/>
-        <p:txBody>
-          <a:bodyPr/>
-          <a:lstStyle/>
-          <a:p>
-            <a:r>
-              <a:rPr lang="en-US" dirty="0" smtClean="0"/>
-              <a:t>Weak scaling</a:t>
-            </a:r>
-            <a:endParaRPr lang="nl-BE" dirty="0"/>
-          </a:p>
-        </p:txBody>
-      </p:sp>
-      <mc:AlternateContent xmlns:mc="http://schemas.openxmlformats.org/markup-compatibility/2006" xmlns:a14="http://schemas.microsoft.com/office/drawing/2010/main">
-        <mc:Choice Requires="a14">
-          <p:sp>
-            <p:nvSpPr>
-              <p:cNvPr id="3" name="Content Placeholder 2"/>
-              <p:cNvSpPr>
-                <a:spLocks noGrp="1"/>
-              </p:cNvSpPr>
-              <p:nvPr>
-                <p:ph idx="1"/>
-              </p:nvPr>
-            </p:nvSpPr>
-            <p:spPr/>
-            <p:txBody>
-              <a:bodyPr/>
-              <a:lstStyle/>
-              <a:p>
-                <a:r>
-                  <a:rPr lang="en-US" dirty="0" smtClean="0"/>
-                  <a:t>Consider a system of "size" </a:t>
-                </a:r>
-                <a14:m>
-                  <m:oMath xmlns:m="http://schemas.openxmlformats.org/officeDocument/2006/math">
-                    <m:r>
-                      <a:rPr lang="en-US" i="1" dirty="0" smtClean="0">
-                        <a:latin typeface="Cambria Math"/>
-                      </a:rPr>
-                      <m:t>𝑁</m:t>
-                    </m:r>
-                  </m:oMath>
-                </a14:m>
-                <a:endParaRPr lang="en-US" dirty="0" smtClean="0"/>
-              </a:p>
-              <a:p>
-                <a:pPr lvl="1"/>
-                <a:r>
-                  <a:rPr lang="en-US" dirty="0" smtClean="0"/>
-                  <a:t>as before </a:t>
-                </a:r>
-                <a14:m>
-                  <m:oMath xmlns:m="http://schemas.openxmlformats.org/officeDocument/2006/math">
-                    <m:sSub>
-                      <m:sSubPr>
-                        <m:ctrlPr>
-                          <a:rPr lang="en-US" i="1" smtClean="0">
-                            <a:latin typeface="Cambria Math" panose="02040503050406030204" pitchFamily="18" charset="0"/>
-                          </a:rPr>
-                        </m:ctrlPr>
-                      </m:sSubPr>
-                      <m:e>
-                        <m:r>
-                          <a:rPr lang="en-US" b="0" i="1" smtClean="0">
-                            <a:latin typeface="Cambria Math"/>
-                          </a:rPr>
-                          <m:t>𝑇</m:t>
-                        </m:r>
-                      </m:e>
-                      <m:sub>
-                        <m:r>
-                          <a:rPr lang="en-US" b="0" i="1" smtClean="0">
-                            <a:latin typeface="Cambria Math"/>
-                          </a:rPr>
-                          <m:t>1</m:t>
-                        </m:r>
-                      </m:sub>
-                    </m:sSub>
-                    <m:r>
-                      <a:rPr lang="en-US" b="0" i="1" smtClean="0">
-                        <a:latin typeface="Cambria Math"/>
-                      </a:rPr>
-                      <m:t>=</m:t>
-                    </m:r>
-                    <m:sSub>
-                      <m:sSubPr>
-                        <m:ctrlPr>
-                          <a:rPr lang="en-US" b="0" i="1" smtClean="0">
-                            <a:latin typeface="Cambria Math" panose="02040503050406030204" pitchFamily="18" charset="0"/>
-                          </a:rPr>
-                        </m:ctrlPr>
-                      </m:sSubPr>
-                      <m:e>
-                        <m:r>
-                          <a:rPr lang="en-US" b="0" i="1" smtClean="0">
-                            <a:latin typeface="Cambria Math"/>
-                          </a:rPr>
-                          <m:t>𝑇</m:t>
-                        </m:r>
-                      </m:e>
-                      <m:sub>
-                        <m:r>
-                          <a:rPr lang="en-US" b="0" i="1" smtClean="0">
-                            <a:latin typeface="Cambria Math"/>
-                          </a:rPr>
-                          <m:t>𝑠</m:t>
-                        </m:r>
-                      </m:sub>
-                    </m:sSub>
-                    <m:r>
-                      <a:rPr lang="en-US" b="0" i="1" smtClean="0">
-                        <a:latin typeface="Cambria Math"/>
-                      </a:rPr>
-                      <m:t>+</m:t>
-                    </m:r>
-                    <m:sSub>
-                      <m:sSubPr>
-                        <m:ctrlPr>
-                          <a:rPr lang="en-US" b="0" i="1" smtClean="0">
-                            <a:latin typeface="Cambria Math" panose="02040503050406030204" pitchFamily="18" charset="0"/>
-                          </a:rPr>
-                        </m:ctrlPr>
-                      </m:sSubPr>
-                      <m:e>
-                        <m:r>
-                          <a:rPr lang="en-US" b="0" i="1" smtClean="0">
-                            <a:latin typeface="Cambria Math"/>
-                          </a:rPr>
-                          <m:t>𝑇</m:t>
-                        </m:r>
-                      </m:e>
-                      <m:sub>
-                        <m:r>
-                          <a:rPr lang="en-US" b="0" i="1" smtClean="0">
-                            <a:latin typeface="Cambria Math"/>
-                          </a:rPr>
-                          <m:t>𝑝</m:t>
-                        </m:r>
-                      </m:sub>
-                    </m:sSub>
-                  </m:oMath>
-                </a14:m>
-                <a:endParaRPr lang="en-US" b="0" dirty="0" smtClean="0"/>
-              </a:p>
-              <a:p>
-                <a:pPr lvl="1"/>
-                <a:r>
-                  <a:rPr lang="en-US" dirty="0" smtClean="0"/>
-                  <a:t>but now assume </a:t>
-                </a:r>
-                <a14:m>
-                  <m:oMath xmlns:m="http://schemas.openxmlformats.org/officeDocument/2006/math">
-                    <m:sSub>
-                      <m:sSubPr>
-                        <m:ctrlPr>
-                          <a:rPr lang="en-US" b="0" i="1" smtClean="0">
-                            <a:latin typeface="Cambria Math" panose="02040503050406030204" pitchFamily="18" charset="0"/>
-                          </a:rPr>
-                        </m:ctrlPr>
-                      </m:sSubPr>
-                      <m:e>
-                        <m:r>
-                          <a:rPr lang="en-US" b="0" i="1" smtClean="0">
-                            <a:latin typeface="Cambria Math"/>
-                          </a:rPr>
-                          <m:t>𝑇</m:t>
-                        </m:r>
-                      </m:e>
-                      <m:sub>
-                        <m:r>
-                          <a:rPr lang="en-US" b="0" i="1" smtClean="0">
-                            <a:latin typeface="Cambria Math"/>
-                          </a:rPr>
-                          <m:t>𝑠</m:t>
-                        </m:r>
-                      </m:sub>
-                    </m:sSub>
-                  </m:oMath>
-                </a14:m>
-                <a:r>
-                  <a:rPr lang="en-US" dirty="0" smtClean="0"/>
-                  <a:t> is independent of </a:t>
-                </a:r>
-                <a14:m>
-                  <m:oMath xmlns:m="http://schemas.openxmlformats.org/officeDocument/2006/math">
-                    <m:r>
-                      <a:rPr lang="en-US" i="1" dirty="0" smtClean="0">
-                        <a:latin typeface="Cambria Math"/>
-                      </a:rPr>
-                      <m:t>𝑁</m:t>
-                    </m:r>
-                  </m:oMath>
-                </a14:m>
-                <a:r>
-                  <a:rPr lang="en-US" dirty="0" smtClean="0"/>
-                  <a:t>, but</a:t>
-                </a:r>
-                <a14:m>
-                  <m:oMath xmlns:m="http://schemas.openxmlformats.org/officeDocument/2006/math">
-                    <m:r>
-                      <a:rPr lang="en-US" b="0" i="0" smtClean="0">
-                        <a:latin typeface="Cambria Math"/>
-                      </a:rPr>
-                      <m:t> </m:t>
-                    </m:r>
-                    <m:sSub>
-                      <m:sSubPr>
-                        <m:ctrlPr>
-                          <a:rPr lang="en-US" i="1" smtClean="0">
-                            <a:latin typeface="Cambria Math" panose="02040503050406030204" pitchFamily="18" charset="0"/>
-                          </a:rPr>
-                        </m:ctrlPr>
-                      </m:sSubPr>
-                      <m:e>
-                        <m:r>
-                          <a:rPr lang="en-US" b="0" i="1" smtClean="0">
-                            <a:latin typeface="Cambria Math"/>
-                          </a:rPr>
-                          <m:t>𝑇</m:t>
-                        </m:r>
-                      </m:e>
-                      <m:sub>
-                        <m:r>
-                          <a:rPr lang="en-US" b="0" i="1" smtClean="0">
-                            <a:latin typeface="Cambria Math"/>
-                          </a:rPr>
-                          <m:t>𝑝</m:t>
-                        </m:r>
-                      </m:sub>
-                    </m:sSub>
-                    <m:r>
-                      <a:rPr lang="en-US" b="0" i="1" smtClean="0">
-                        <a:latin typeface="Cambria Math"/>
-                      </a:rPr>
-                      <m:t>=</m:t>
-                    </m:r>
-                    <m:r>
-                      <a:rPr lang="en-US" b="0" i="1" smtClean="0">
-                        <a:latin typeface="Cambria Math"/>
-                      </a:rPr>
-                      <m:t>𝑁</m:t>
-                    </m:r>
-                    <m:r>
-                      <a:rPr lang="en-US" b="0" i="1" smtClean="0">
-                        <a:latin typeface="Cambria Math"/>
-                        <a:ea typeface="Cambria Math"/>
-                      </a:rPr>
-                      <m:t>𝜏</m:t>
-                    </m:r>
-                  </m:oMath>
-                </a14:m>
-                <a:endParaRPr lang="en-US" b="0" dirty="0" smtClean="0"/>
-              </a:p>
-              <a:p>
-                <a:pPr lvl="1"/>
-                <a:r>
-                  <a:rPr lang="en-US" dirty="0" smtClean="0"/>
-                  <a:t>now choose the number of processes </a:t>
-                </a:r>
-                <a14:m>
-                  <m:oMath xmlns:m="http://schemas.openxmlformats.org/officeDocument/2006/math">
-                    <m:r>
-                      <a:rPr lang="en-US" b="0" i="1" smtClean="0">
-                        <a:latin typeface="Cambria Math"/>
-                        <a:ea typeface="Cambria Math"/>
-                      </a:rPr>
-                      <m:t>𝑛</m:t>
-                    </m:r>
-                    <m:r>
-                      <a:rPr lang="en-US" b="0" i="1" smtClean="0">
-                        <a:latin typeface="Cambria Math"/>
-                        <a:ea typeface="Cambria Math"/>
-                      </a:rPr>
-                      <m:t>=</m:t>
-                    </m:r>
-                    <m:r>
-                      <a:rPr lang="en-US" b="0" i="1" smtClean="0">
-                        <a:latin typeface="Cambria Math"/>
-                        <a:ea typeface="Cambria Math"/>
-                      </a:rPr>
-                      <m:t>𝑐𝑁</m:t>
-                    </m:r>
-                  </m:oMath>
-                </a14:m>
-                <a:endParaRPr lang="en-US" dirty="0" smtClean="0"/>
-              </a:p>
-              <a:p>
-                <a:pPr lvl="1"/>
-                <a:r>
-                  <a:rPr lang="en-US" dirty="0" smtClean="0"/>
-                  <a:t>and hence </a:t>
-                </a:r>
-                <a14:m>
-                  <m:oMath xmlns:m="http://schemas.openxmlformats.org/officeDocument/2006/math">
-                    <m:r>
-                      <a:rPr lang="en-US" b="0" i="1" smtClean="0">
-                        <a:latin typeface="Cambria Math"/>
-                      </a:rPr>
-                      <m:t>𝑆</m:t>
-                    </m:r>
-                    <m:d>
-                      <m:dPr>
-                        <m:ctrlPr>
-                          <a:rPr lang="en-US" b="0" i="1" smtClean="0">
-                            <a:latin typeface="Cambria Math" panose="02040503050406030204" pitchFamily="18" charset="0"/>
-                          </a:rPr>
-                        </m:ctrlPr>
-                      </m:dPr>
-                      <m:e>
-                        <m:r>
-                          <a:rPr lang="en-US" b="0" i="1" smtClean="0">
-                            <a:latin typeface="Cambria Math"/>
-                          </a:rPr>
-                          <m:t>𝑛</m:t>
-                        </m:r>
-                      </m:e>
-                    </m:d>
-                    <m:r>
-                      <a:rPr lang="en-US" b="0" i="1" smtClean="0">
-                        <a:latin typeface="Cambria Math"/>
-                      </a:rPr>
-                      <m:t>=</m:t>
-                    </m:r>
-                    <m:f>
-                      <m:fPr>
-                        <m:ctrlPr>
-                          <a:rPr lang="en-US" b="0" i="1" smtClean="0">
-                            <a:latin typeface="Cambria Math" panose="02040503050406030204" pitchFamily="18" charset="0"/>
-                          </a:rPr>
-                        </m:ctrlPr>
-                      </m:fPr>
-                      <m:num>
-                        <m:sSub>
-                          <m:sSubPr>
-                            <m:ctrlPr>
-                              <a:rPr lang="en-US" b="0" i="1" smtClean="0">
-                                <a:latin typeface="Cambria Math" panose="02040503050406030204" pitchFamily="18" charset="0"/>
-                              </a:rPr>
-                            </m:ctrlPr>
-                          </m:sSubPr>
-                          <m:e>
-                            <m:r>
-                              <a:rPr lang="en-US" b="0" i="1" smtClean="0">
-                                <a:latin typeface="Cambria Math"/>
-                              </a:rPr>
-                              <m:t>𝑇</m:t>
-                            </m:r>
-                          </m:e>
-                          <m:sub>
-                            <m:r>
-                              <a:rPr lang="en-US" b="0" i="1" smtClean="0">
-                                <a:latin typeface="Cambria Math"/>
-                              </a:rPr>
-                              <m:t>𝑠</m:t>
-                            </m:r>
-                          </m:sub>
-                        </m:sSub>
-                        <m:r>
-                          <a:rPr lang="en-US" b="0" i="1" smtClean="0">
-                            <a:latin typeface="Cambria Math"/>
-                          </a:rPr>
-                          <m:t>+</m:t>
-                        </m:r>
-                        <m:sSub>
-                          <m:sSubPr>
-                            <m:ctrlPr>
-                              <a:rPr lang="en-US" b="0" i="1" smtClean="0">
-                                <a:latin typeface="Cambria Math" panose="02040503050406030204" pitchFamily="18" charset="0"/>
-                              </a:rPr>
-                            </m:ctrlPr>
-                          </m:sSubPr>
-                          <m:e>
-                            <m:r>
-                              <a:rPr lang="en-US" b="0" i="1" smtClean="0">
-                                <a:latin typeface="Cambria Math"/>
-                              </a:rPr>
-                              <m:t>𝑇</m:t>
-                            </m:r>
-                          </m:e>
-                          <m:sub>
-                            <m:r>
-                              <a:rPr lang="en-US" b="0" i="1" smtClean="0">
-                                <a:latin typeface="Cambria Math"/>
-                              </a:rPr>
-                              <m:t>𝑝</m:t>
-                            </m:r>
-                          </m:sub>
-                        </m:sSub>
-                      </m:num>
-                      <m:den>
-                        <m:sSub>
-                          <m:sSubPr>
-                            <m:ctrlPr>
-                              <a:rPr lang="en-US" b="0" i="1" smtClean="0">
-                                <a:latin typeface="Cambria Math" panose="02040503050406030204" pitchFamily="18" charset="0"/>
-                              </a:rPr>
-                            </m:ctrlPr>
-                          </m:sSubPr>
-                          <m:e>
-                            <m:r>
-                              <a:rPr lang="en-US" b="0" i="1" smtClean="0">
-                                <a:latin typeface="Cambria Math"/>
-                              </a:rPr>
-                              <m:t>𝑇</m:t>
-                            </m:r>
-                          </m:e>
-                          <m:sub>
-                            <m:r>
-                              <a:rPr lang="en-US" b="0" i="1" smtClean="0">
-                                <a:latin typeface="Cambria Math"/>
-                              </a:rPr>
-                              <m:t>𝑠</m:t>
-                            </m:r>
-                          </m:sub>
-                        </m:sSub>
-                        <m:r>
-                          <a:rPr lang="en-US" b="0" i="1" smtClean="0">
-                            <a:latin typeface="Cambria Math"/>
-                          </a:rPr>
-                          <m:t>+</m:t>
-                        </m:r>
-                        <m:f>
-                          <m:fPr>
-                            <m:ctrlPr>
-                              <a:rPr lang="en-US" b="0" i="1" smtClean="0">
-                                <a:latin typeface="Cambria Math" panose="02040503050406030204" pitchFamily="18" charset="0"/>
-                              </a:rPr>
-                            </m:ctrlPr>
-                          </m:fPr>
-                          <m:num>
-                            <m:sSub>
-                              <m:sSubPr>
-                                <m:ctrlPr>
-                                  <a:rPr lang="en-US" b="0" i="1" smtClean="0">
-                                    <a:latin typeface="Cambria Math" panose="02040503050406030204" pitchFamily="18" charset="0"/>
-                                  </a:rPr>
-                                </m:ctrlPr>
-                              </m:sSubPr>
-                              <m:e>
-                                <m:r>
-                                  <a:rPr lang="en-US" b="0" i="1" smtClean="0">
-                                    <a:latin typeface="Cambria Math"/>
-                                  </a:rPr>
-                                  <m:t>𝑇</m:t>
-                                </m:r>
-                              </m:e>
-                              <m:sub>
-                                <m:r>
-                                  <a:rPr lang="en-US" b="0" i="1" smtClean="0">
-                                    <a:latin typeface="Cambria Math"/>
-                                  </a:rPr>
-                                  <m:t>𝑝</m:t>
-                                </m:r>
-                              </m:sub>
-                            </m:sSub>
-                          </m:num>
-                          <m:den>
-                            <m:r>
-                              <a:rPr lang="en-US" b="0" i="1" smtClean="0">
-                                <a:latin typeface="Cambria Math"/>
-                              </a:rPr>
-                              <m:t>𝑛</m:t>
-                            </m:r>
-                          </m:den>
-                        </m:f>
-                      </m:den>
-                    </m:f>
-                    <m:r>
-                      <a:rPr lang="en-US" b="0" i="1" smtClean="0">
-                        <a:latin typeface="Cambria Math"/>
-                      </a:rPr>
-                      <m:t>=</m:t>
-                    </m:r>
-                    <m:f>
-                      <m:fPr>
-                        <m:ctrlPr>
-                          <a:rPr lang="en-US" b="0" i="1" smtClean="0">
-                            <a:latin typeface="Cambria Math" panose="02040503050406030204" pitchFamily="18" charset="0"/>
-                          </a:rPr>
-                        </m:ctrlPr>
-                      </m:fPr>
-                      <m:num>
-                        <m:sSub>
-                          <m:sSubPr>
-                            <m:ctrlPr>
-                              <a:rPr lang="en-US" b="0" i="1" smtClean="0">
-                                <a:latin typeface="Cambria Math" panose="02040503050406030204" pitchFamily="18" charset="0"/>
-                              </a:rPr>
-                            </m:ctrlPr>
-                          </m:sSubPr>
-                          <m:e>
-                            <m:r>
-                              <a:rPr lang="en-US" b="0" i="1" smtClean="0">
-                                <a:latin typeface="Cambria Math"/>
-                              </a:rPr>
-                              <m:t>𝑇</m:t>
-                            </m:r>
-                          </m:e>
-                          <m:sub>
-                            <m:r>
-                              <a:rPr lang="en-US" b="0" i="1" smtClean="0">
-                                <a:latin typeface="Cambria Math"/>
-                              </a:rPr>
-                              <m:t>𝑠</m:t>
-                            </m:r>
-                          </m:sub>
-                        </m:sSub>
-                        <m:r>
-                          <a:rPr lang="en-US" b="0" i="1" smtClean="0">
-                            <a:latin typeface="Cambria Math"/>
-                          </a:rPr>
-                          <m:t>+</m:t>
-                        </m:r>
-                        <m:f>
-                          <m:fPr>
-                            <m:ctrlPr>
-                              <a:rPr lang="en-US" b="0" i="1" smtClean="0">
-                                <a:latin typeface="Cambria Math" panose="02040503050406030204" pitchFamily="18" charset="0"/>
-                              </a:rPr>
-                            </m:ctrlPr>
-                          </m:fPr>
-                          <m:num>
-                            <m:r>
-                              <a:rPr lang="en-US" b="0" i="1" smtClean="0">
-                                <a:latin typeface="Cambria Math"/>
-                              </a:rPr>
-                              <m:t>𝑛</m:t>
-                            </m:r>
-                            <m:r>
-                              <a:rPr lang="en-US" b="0" i="1" smtClean="0">
-                                <a:latin typeface="Cambria Math"/>
-                                <a:ea typeface="Cambria Math"/>
-                              </a:rPr>
-                              <m:t>𝜏</m:t>
-                            </m:r>
-                          </m:num>
-                          <m:den>
-                            <m:r>
-                              <a:rPr lang="en-US" b="0" i="1" smtClean="0">
-                                <a:latin typeface="Cambria Math"/>
-                              </a:rPr>
-                              <m:t>𝑐</m:t>
-                            </m:r>
-                          </m:den>
-                        </m:f>
-                      </m:num>
-                      <m:den>
-                        <m:sSub>
-                          <m:sSubPr>
-                            <m:ctrlPr>
-                              <a:rPr lang="en-US" b="0" i="1" smtClean="0">
-                                <a:latin typeface="Cambria Math" panose="02040503050406030204" pitchFamily="18" charset="0"/>
-                              </a:rPr>
-                            </m:ctrlPr>
-                          </m:sSubPr>
-                          <m:e>
-                            <m:r>
-                              <a:rPr lang="en-US" b="0" i="1" smtClean="0">
-                                <a:latin typeface="Cambria Math"/>
-                              </a:rPr>
-                              <m:t>𝑇</m:t>
-                            </m:r>
-                          </m:e>
-                          <m:sub>
-                            <m:r>
-                              <a:rPr lang="en-US" b="0" i="1" smtClean="0">
-                                <a:latin typeface="Cambria Math"/>
-                              </a:rPr>
-                              <m:t>𝑠</m:t>
-                            </m:r>
-                          </m:sub>
-                        </m:sSub>
-                        <m:r>
-                          <a:rPr lang="en-US" b="0" i="1" smtClean="0">
-                            <a:latin typeface="Cambria Math"/>
-                          </a:rPr>
-                          <m:t>+</m:t>
-                        </m:r>
-                        <m:f>
-                          <m:fPr>
-                            <m:ctrlPr>
-                              <a:rPr lang="en-US" b="0" i="1" smtClean="0">
-                                <a:latin typeface="Cambria Math" panose="02040503050406030204" pitchFamily="18" charset="0"/>
-                              </a:rPr>
-                            </m:ctrlPr>
-                          </m:fPr>
-                          <m:num>
-                            <m:r>
-                              <a:rPr lang="en-US" b="0" i="1" smtClean="0">
-                                <a:latin typeface="Cambria Math"/>
-                                <a:ea typeface="Cambria Math"/>
-                              </a:rPr>
-                              <m:t>𝜏</m:t>
-                            </m:r>
-                          </m:num>
-                          <m:den>
-                            <m:r>
-                              <a:rPr lang="en-US" b="0" i="1" smtClean="0">
-                                <a:latin typeface="Cambria Math"/>
-                              </a:rPr>
-                              <m:t>𝑐</m:t>
-                            </m:r>
-                          </m:den>
-                        </m:f>
-                      </m:den>
-                    </m:f>
-                    <m:r>
-                      <a:rPr lang="en-US" b="0" i="1" smtClean="0">
-                        <a:latin typeface="Cambria Math"/>
-                        <a:ea typeface="Cambria Math"/>
-                      </a:rPr>
-                      <m:t>~</m:t>
-                    </m:r>
-                    <m:r>
-                      <a:rPr lang="en-US" b="0" i="1" smtClean="0">
-                        <a:latin typeface="Cambria Math"/>
-                        <a:ea typeface="Cambria Math"/>
-                      </a:rPr>
-                      <m:t>𝑛</m:t>
-                    </m:r>
-                  </m:oMath>
-                </a14:m>
-                <a:endParaRPr lang="nl-BE" dirty="0"/>
-              </a:p>
-            </p:txBody>
-          </p:sp>
-        </mc:Choice>
-        <mc:Fallback xmlns="">
-          <p:sp>
-            <p:nvSpPr>
-              <p:cNvPr id="3" name="Content Placeholder 2"/>
-              <p:cNvSpPr>
-                <a:spLocks noGrp="1" noRot="1" noChangeAspect="1" noMove="1" noResize="1" noEditPoints="1" noAdjustHandles="1" noChangeArrowheads="1" noChangeShapeType="1" noTextEdit="1"/>
-              </p:cNvSpPr>
-              <p:nvPr>
-                <p:ph idx="1"/>
-              </p:nvPr>
-            </p:nvSpPr>
-            <p:spPr>
-              <a:blipFill rotWithShape="1">
-                <a:blip r:embed="rId2"/>
-                <a:stretch>
-                  <a:fillRect l="-1630" t="-1617"/>
-                </a:stretch>
-              </a:blipFill>
-            </p:spPr>
-            <p:txBody>
-              <a:bodyPr/>
-              <a:lstStyle/>
-              <a:p>
-                <a:r>
-                  <a:rPr lang="nl-BE">
-                    <a:noFill/>
-                  </a:rPr>
-                  <a:t> </a:t>
-                </a:r>
-              </a:p>
-            </p:txBody>
-          </p:sp>
-        </mc:Fallback>
-      </mc:AlternateContent>
-      <mc:AlternateContent xmlns:mc="http://schemas.openxmlformats.org/markup-compatibility/2006" xmlns:a14="http://schemas.microsoft.com/office/drawing/2010/main">
-        <mc:Choice Requires="a14">
-          <p:sp>
-            <p:nvSpPr>
-              <p:cNvPr id="4" name="TextBox 3"/>
-              <p:cNvSpPr txBox="1"/>
-              <p:nvPr/>
-            </p:nvSpPr>
-            <p:spPr>
-              <a:xfrm>
-                <a:off x="539552" y="5733256"/>
-                <a:ext cx="5307479" cy="523220"/>
-              </a:xfrm>
-              <a:prstGeom prst="rect">
-                <a:avLst/>
-              </a:prstGeom>
-              <a:noFill/>
-              <a:ln>
-                <a:solidFill>
-                  <a:schemeClr val="tx1"/>
-                </a:solidFill>
-              </a:ln>
-            </p:spPr>
-            <p:txBody>
-              <a:bodyPr wrap="none" rtlCol="0">
-                <a:spAutoFit/>
-              </a:bodyPr>
-              <a:lstStyle/>
-              <a:p>
-                <a:r>
-                  <a:rPr lang="en-US" sz="2800" dirty="0" smtClean="0"/>
-                  <a:t>Gustafson's law: </a:t>
-                </a:r>
-                <a14:m>
-                  <m:oMath xmlns:m="http://schemas.openxmlformats.org/officeDocument/2006/math">
-                    <m:sSub>
-                      <m:sSubPr>
-                        <m:ctrlPr>
-                          <a:rPr lang="en-US" sz="2800" i="1" smtClean="0">
-                            <a:latin typeface="Cambria Math" panose="02040503050406030204" pitchFamily="18" charset="0"/>
-                          </a:rPr>
-                        </m:ctrlPr>
-                      </m:sSubPr>
-                      <m:e>
-                        <m:r>
-                          <a:rPr lang="en-US" sz="2800" b="0" i="1" smtClean="0">
-                            <a:latin typeface="Cambria Math"/>
-                          </a:rPr>
-                          <m:t>𝑇</m:t>
-                        </m:r>
-                      </m:e>
-                      <m:sub>
-                        <m:r>
-                          <a:rPr lang="en-US" sz="2800" b="0" i="1" smtClean="0">
-                            <a:latin typeface="Cambria Math"/>
-                          </a:rPr>
-                          <m:t>𝑛</m:t>
-                        </m:r>
-                      </m:sub>
-                    </m:sSub>
-                    <m:d>
-                      <m:dPr>
-                        <m:ctrlPr>
-                          <a:rPr lang="en-US" sz="2800" b="0" i="1" smtClean="0">
-                            <a:latin typeface="Cambria Math" panose="02040503050406030204" pitchFamily="18" charset="0"/>
-                          </a:rPr>
-                        </m:ctrlPr>
-                      </m:dPr>
-                      <m:e>
-                        <m:r>
-                          <a:rPr lang="en-US" sz="2800" b="0" i="1" smtClean="0">
-                            <a:latin typeface="Cambria Math"/>
-                          </a:rPr>
-                          <m:t>𝑁</m:t>
-                        </m:r>
-                      </m:e>
-                    </m:d>
-                    <m:r>
-                      <a:rPr lang="en-US" sz="2800" b="0" i="1" smtClean="0">
-                        <a:latin typeface="Cambria Math"/>
-                      </a:rPr>
-                      <m:t>=</m:t>
-                    </m:r>
-                    <m:sSub>
-                      <m:sSubPr>
-                        <m:ctrlPr>
-                          <a:rPr lang="en-US" sz="2800" b="0" i="1" smtClean="0">
-                            <a:latin typeface="Cambria Math" panose="02040503050406030204" pitchFamily="18" charset="0"/>
-                          </a:rPr>
-                        </m:ctrlPr>
-                      </m:sSubPr>
-                      <m:e>
-                        <m:r>
-                          <a:rPr lang="en-US" sz="2800" b="0" i="1" smtClean="0">
-                            <a:latin typeface="Cambria Math"/>
-                          </a:rPr>
-                          <m:t>𝑇</m:t>
-                        </m:r>
-                      </m:e>
-                      <m:sub>
-                        <m:r>
-                          <a:rPr lang="en-US" sz="2800" b="0" i="1" smtClean="0">
-                            <a:latin typeface="Cambria Math"/>
-                          </a:rPr>
-                          <m:t>2</m:t>
-                        </m:r>
-                        <m:r>
-                          <a:rPr lang="en-US" sz="2800" b="0" i="1" smtClean="0">
-                            <a:latin typeface="Cambria Math"/>
-                          </a:rPr>
-                          <m:t>𝑛</m:t>
-                        </m:r>
-                      </m:sub>
-                    </m:sSub>
-                    <m:r>
-                      <a:rPr lang="en-US" sz="2800" b="0" i="1" smtClean="0">
-                        <a:latin typeface="Cambria Math"/>
-                      </a:rPr>
-                      <m:t>(2</m:t>
-                    </m:r>
-                    <m:r>
-                      <a:rPr lang="en-US" sz="2800" b="0" i="1" smtClean="0">
-                        <a:latin typeface="Cambria Math"/>
-                      </a:rPr>
-                      <m:t>𝑁</m:t>
-                    </m:r>
-                    <m:r>
-                      <a:rPr lang="en-US" sz="2800" b="0" i="1" smtClean="0">
-                        <a:latin typeface="Cambria Math"/>
-                      </a:rPr>
-                      <m:t>)</m:t>
-                    </m:r>
-                  </m:oMath>
-                </a14:m>
-                <a:endParaRPr lang="nl-BE" dirty="0"/>
-              </a:p>
-            </p:txBody>
-          </p:sp>
-        </mc:Choice>
-        <mc:Fallback xmlns="">
-          <p:sp>
-            <p:nvSpPr>
-              <p:cNvPr id="4" name="TextBox 3"/>
-              <p:cNvSpPr txBox="1">
-                <a:spLocks noRot="1" noChangeAspect="1" noMove="1" noResize="1" noEditPoints="1" noAdjustHandles="1" noChangeArrowheads="1" noChangeShapeType="1" noTextEdit="1"/>
-              </p:cNvSpPr>
-              <p:nvPr/>
-            </p:nvSpPr>
-            <p:spPr>
-              <a:xfrm>
-                <a:off x="539552" y="5733256"/>
-                <a:ext cx="5307479" cy="523220"/>
-              </a:xfrm>
-              <a:prstGeom prst="rect">
-                <a:avLst/>
-              </a:prstGeom>
-              <a:blipFill rotWithShape="1">
-                <a:blip r:embed="rId3"/>
-                <a:stretch>
-                  <a:fillRect l="-2294" t="-9091" b="-30682"/>
-                </a:stretch>
-              </a:blipFill>
-              <a:ln>
-                <a:solidFill>
-                  <a:schemeClr val="tx1"/>
-                </a:solidFill>
-              </a:ln>
-            </p:spPr>
-            <p:txBody>
-              <a:bodyPr/>
-              <a:lstStyle/>
-              <a:p>
-                <a:r>
-                  <a:rPr lang="nl-BE">
-                    <a:noFill/>
-                  </a:rPr>
-                  <a:t> </a:t>
-                </a:r>
-              </a:p>
-            </p:txBody>
-          </p:sp>
-        </mc:Fallback>
-      </mc:AlternateContent>
-      <p:sp>
-        <p:nvSpPr>
-          <p:cNvPr id="5" name="TextBox 4"/>
-          <p:cNvSpPr txBox="1"/>
-          <p:nvPr/>
-        </p:nvSpPr>
-        <p:spPr>
-          <a:xfrm>
-            <a:off x="6444208" y="5661248"/>
-            <a:ext cx="1848198" cy="1077218"/>
-          </a:xfrm>
-          <a:prstGeom prst="rect">
-            <a:avLst/>
-          </a:prstGeom>
-          <a:noFill/>
-          <a:ln>
-            <a:solidFill>
-              <a:schemeClr val="tx1"/>
-            </a:solidFill>
-          </a:ln>
-        </p:spPr>
-        <p:txBody>
-          <a:bodyPr wrap="none" rtlCol="0">
-            <a:spAutoFit/>
-          </a:bodyPr>
-          <a:lstStyle/>
-          <a:p>
-            <a:r>
-              <a:rPr lang="en-US" sz="3200" dirty="0" smtClean="0"/>
-              <a:t>Nice for</a:t>
-            </a:r>
-            <a:br>
-              <a:rPr lang="en-US" sz="3200" dirty="0" smtClean="0"/>
-            </a:br>
-            <a:r>
-              <a:rPr lang="en-US" sz="3200" dirty="0" smtClean="0"/>
-              <a:t>scientists!</a:t>
-            </a:r>
-            <a:endParaRPr lang="nl-BE" sz="3200" dirty="0"/>
-          </a:p>
-        </p:txBody>
-      </p:sp>
-    </p:spTree>
-    <p:extLst>
-      <p:ext uri="{BB962C8B-B14F-4D97-AF65-F5344CB8AC3E}">
-        <p14:creationId xmlns:p14="http://schemas.microsoft.com/office/powerpoint/2010/main" val="3119421013"/>
-      </p:ext>
-    </p:extLst>
-  </p:cSld>
-  <p:clrMapOvr>
-    <a:masterClrMapping/>
-  </p:clrMapOvr>
-  <p:timing>
-    <p:tnLst>
-      <p:par>
-        <p:cTn id="1" dur="indefinite" restart="never" nodeType="tmRoot">
-          <p:childTnLst>
-            <p:seq concurrent="1" nextAc="seek">
-              <p:cTn id="2" dur="indefinite" nodeType="mainSeq">
-                <p:childTnLst>
-                  <p:par>
-                    <p:cTn id="3" fill="hold">
-                      <p:stCondLst>
-                        <p:cond delay="indefinite"/>
-                        <p:cond evt="onBegin" delay="0">
-                          <p:tn val="2"/>
-                        </p:cond>
-                      </p:stCondLst>
-                      <p:childTnLst>
-                        <p:par>
-                          <p:cTn id="4" fill="hold">
-                            <p:stCondLst>
-                              <p:cond delay="0"/>
-                            </p:stCondLst>
-                            <p:childTnLst>
-                              <p:par>
-                                <p:cTn id="5" presetID="1" presetClass="entr" presetSubtype="0" fill="hold" grpId="0" nodeType="withEffect">
-                                  <p:stCondLst>
-                                    <p:cond delay="0"/>
-                                  </p:stCondLst>
-                                  <p:childTnLst>
-                                    <p:set>
-                                      <p:cBhvr>
-                                        <p:cTn id="6" dur="1" fill="hold">
-                                          <p:stCondLst>
-                                            <p:cond delay="0"/>
-                                          </p:stCondLst>
-                                        </p:cTn>
-                                        <p:tgtEl>
-                                          <p:spTgt spid="3">
-                                            <p:txEl>
-                                              <p:pRg st="0" end="0"/>
-                                            </p:txEl>
-                                          </p:spTgt>
-                                        </p:tgtEl>
-                                        <p:attrNameLst>
-                                          <p:attrName>style.visibility</p:attrName>
-                                        </p:attrNameLst>
-                                      </p:cBhvr>
-                                      <p:to>
-                                        <p:strVal val="visible"/>
-                                      </p:to>
-                                    </p:set>
-                                  </p:childTnLst>
-                                </p:cTn>
-                              </p:par>
-                            </p:childTnLst>
-                          </p:cTn>
-                        </p:par>
-                      </p:childTnLst>
-                    </p:cTn>
-                  </p:par>
-                  <p:par>
-                    <p:cTn id="7" fill="hold">
-                      <p:stCondLst>
-                        <p:cond delay="indefinite"/>
-                      </p:stCondLst>
-                      <p:childTnLst>
-                        <p:par>
-                          <p:cTn id="8" fill="hold">
-                            <p:stCondLst>
-                              <p:cond delay="0"/>
-                            </p:stCondLst>
-                            <p:childTnLst>
-                              <p:par>
-                                <p:cTn id="9" presetID="1" presetClass="entr" presetSubtype="0" fill="hold" grpId="0" nodeType="clickEffect">
-                                  <p:stCondLst>
-                                    <p:cond delay="0"/>
-                                  </p:stCondLst>
-                                  <p:childTnLst>
-                                    <p:set>
-                                      <p:cBhvr>
-                                        <p:cTn id="10" dur="1" fill="hold">
-                                          <p:stCondLst>
-                                            <p:cond delay="0"/>
-                                          </p:stCondLst>
-                                        </p:cTn>
-                                        <p:tgtEl>
-                                          <p:spTgt spid="3">
-                                            <p:txEl>
-                                              <p:pRg st="1" end="1"/>
-                                            </p:txEl>
-                                          </p:spTgt>
-                                        </p:tgtEl>
-                                        <p:attrNameLst>
-                                          <p:attrName>style.visibility</p:attrName>
-                                        </p:attrNameLst>
-                                      </p:cBhvr>
-                                      <p:to>
-                                        <p:strVal val="visible"/>
-                                      </p:to>
-                                    </p:set>
-                                  </p:childTnLst>
-                                </p:cTn>
-                              </p:par>
-                            </p:childTnLst>
-                          </p:cTn>
-                        </p:par>
-                      </p:childTnLst>
-                    </p:cTn>
-                  </p:par>
-                  <p:par>
-                    <p:cTn id="11" fill="hold">
-                      <p:stCondLst>
-                        <p:cond delay="indefinite"/>
-                      </p:stCondLst>
-                      <p:childTnLst>
-                        <p:par>
-                          <p:cTn id="12" fill="hold">
-                            <p:stCondLst>
-                              <p:cond delay="0"/>
-                            </p:stCondLst>
-                            <p:childTnLst>
-                              <p:par>
-                                <p:cTn id="13" presetID="1" presetClass="entr" presetSubtype="0" fill="hold" grpId="0" nodeType="clickEffect">
-                                  <p:stCondLst>
-                                    <p:cond delay="0"/>
-                                  </p:stCondLst>
-                                  <p:childTnLst>
-                                    <p:set>
-                                      <p:cBhvr>
-                                        <p:cTn id="14" dur="1" fill="hold">
-                                          <p:stCondLst>
-                                            <p:cond delay="0"/>
-                                          </p:stCondLst>
-                                        </p:cTn>
-                                        <p:tgtEl>
-                                          <p:spTgt spid="3">
-                                            <p:txEl>
-                                              <p:pRg st="2" end="2"/>
-                                            </p:txEl>
-                                          </p:spTgt>
-                                        </p:tgtEl>
-                                        <p:attrNameLst>
-                                          <p:attrName>style.visibility</p:attrName>
-                                        </p:attrNameLst>
-                                      </p:cBhvr>
-                                      <p:to>
-                                        <p:strVal val="visible"/>
-                                      </p:to>
-                                    </p:set>
-                                  </p:childTnLst>
-                                </p:cTn>
-                              </p:par>
-                            </p:childTnLst>
-                          </p:cTn>
-                        </p:par>
-                      </p:childTnLst>
-                    </p:cTn>
-                  </p:par>
-                  <p:par>
-                    <p:cTn id="15" fill="hold">
-                      <p:stCondLst>
-                        <p:cond delay="indefinite"/>
-                      </p:stCondLst>
-                      <p:childTnLst>
-                        <p:par>
-                          <p:cTn id="16" fill="hold">
-                            <p:stCondLst>
-                              <p:cond delay="0"/>
-                            </p:stCondLst>
-                            <p:childTnLst>
-                              <p:par>
-                                <p:cTn id="17" presetID="1" presetClass="entr" presetSubtype="0" fill="hold" grpId="0" nodeType="clickEffect">
-                                  <p:stCondLst>
-                                    <p:cond delay="0"/>
-                                  </p:stCondLst>
-                                  <p:childTnLst>
-                                    <p:set>
-                                      <p:cBhvr>
-                                        <p:cTn id="18" dur="1" fill="hold">
-                                          <p:stCondLst>
-                                            <p:cond delay="0"/>
-                                          </p:stCondLst>
-                                        </p:cTn>
-                                        <p:tgtEl>
-                                          <p:spTgt spid="3">
-                                            <p:txEl>
-                                              <p:pRg st="3" end="3"/>
-                                            </p:txEl>
-                                          </p:spTgt>
-                                        </p:tgtEl>
-                                        <p:attrNameLst>
-                                          <p:attrName>style.visibility</p:attrName>
-                                        </p:attrNameLst>
-                                      </p:cBhvr>
-                                      <p:to>
-                                        <p:strVal val="visible"/>
-                                      </p:to>
-                                    </p:set>
-                                  </p:childTnLst>
-                                </p:cTn>
-                              </p:par>
-                            </p:childTnLst>
-                          </p:cTn>
-                        </p:par>
-                      </p:childTnLst>
-                    </p:cTn>
-                  </p:par>
-                  <p:par>
-                    <p:cTn id="19" fill="hold">
-                      <p:stCondLst>
-                        <p:cond delay="indefinite"/>
-                      </p:stCondLst>
-                      <p:childTnLst>
-                        <p:par>
-                          <p:cTn id="20" fill="hold">
-                            <p:stCondLst>
-                              <p:cond delay="0"/>
-                            </p:stCondLst>
-                            <p:childTnLst>
-                              <p:par>
-                                <p:cTn id="21" presetID="1" presetClass="entr" presetSubtype="0" fill="hold" grpId="0" nodeType="clickEffect">
-                                  <p:stCondLst>
-                                    <p:cond delay="0"/>
-                                  </p:stCondLst>
-                                  <p:childTnLst>
-                                    <p:set>
-                                      <p:cBhvr>
-                                        <p:cTn id="22" dur="1" fill="hold">
-                                          <p:stCondLst>
-                                            <p:cond delay="0"/>
-                                          </p:stCondLst>
-                                        </p:cTn>
-                                        <p:tgtEl>
-                                          <p:spTgt spid="3">
-                                            <p:txEl>
-                                              <p:pRg st="4" end="4"/>
-                                            </p:txEl>
-                                          </p:spTgt>
-                                        </p:tgtEl>
-                                        <p:attrNameLst>
-                                          <p:attrName>style.visibility</p:attrName>
-                                        </p:attrNameLst>
-                                      </p:cBhvr>
-                                      <p:to>
-                                        <p:strVal val="visible"/>
-                                      </p:to>
-                                    </p:set>
-                                  </p:childTnLst>
-                                </p:cTn>
-                              </p:par>
-                            </p:childTnLst>
-                          </p:cTn>
-                        </p:par>
-                      </p:childTnLst>
-                    </p:cTn>
-                  </p:par>
-                  <p:par>
-                    <p:cTn id="23" fill="hold">
-                      <p:stCondLst>
-                        <p:cond delay="indefinite"/>
-                      </p:stCondLst>
-                      <p:childTnLst>
-                        <p:par>
-                          <p:cTn id="24" fill="hold">
-                            <p:stCondLst>
-                              <p:cond delay="0"/>
-                            </p:stCondLst>
-                            <p:childTnLst>
-                              <p:par>
-                                <p:cTn id="25" presetID="1" presetClass="entr" presetSubtype="0" fill="hold" grpId="0" nodeType="clickEffect">
-                                  <p:stCondLst>
-                                    <p:cond delay="0"/>
-                                  </p:stCondLst>
-                                  <p:childTnLst>
-                                    <p:set>
-                                      <p:cBhvr>
-                                        <p:cTn id="26" dur="1" fill="hold">
-                                          <p:stCondLst>
-                                            <p:cond delay="0"/>
-                                          </p:stCondLst>
-                                        </p:cTn>
-                                        <p:tgtEl>
-                                          <p:spTgt spid="4"/>
-                                        </p:tgtEl>
-                                        <p:attrNameLst>
-                                          <p:attrName>style.visibility</p:attrName>
-                                        </p:attrNameLst>
-                                      </p:cBhvr>
-                                      <p:to>
-                                        <p:strVal val="visible"/>
-                                      </p:to>
-                                    </p:set>
-                                  </p:childTnLst>
-                                </p:cTn>
-                              </p:par>
-                            </p:childTnLst>
-                          </p:cTn>
-                        </p:par>
-                      </p:childTnLst>
-                    </p:cTn>
-                  </p:par>
-                  <p:par>
-                    <p:cTn id="27" fill="hold">
-                      <p:stCondLst>
-                        <p:cond delay="indefinite"/>
-                      </p:stCondLst>
-                      <p:childTnLst>
-                        <p:par>
-                          <p:cTn id="28" fill="hold">
-                            <p:stCondLst>
-                              <p:cond delay="0"/>
-                            </p:stCondLst>
-                            <p:childTnLst>
-                              <p:par>
-                                <p:cTn id="29" presetID="1" presetClass="entr" presetSubtype="0" fill="hold" grpId="0" nodeType="clickEffect">
-                                  <p:stCondLst>
-                                    <p:cond delay="0"/>
-                                  </p:stCondLst>
-                                  <p:childTnLst>
-                                    <p:set>
-                                      <p:cBhvr>
-                                        <p:cTn id="30" dur="1" fill="hold">
-                                          <p:stCondLst>
-                                            <p:cond delay="0"/>
-                                          </p:stCondLst>
-                                        </p:cTn>
-                                        <p:tgtEl>
-                                          <p:spTgt spid="5"/>
-                                        </p:tgtEl>
-                                        <p:attrNameLst>
-                                          <p:attrName>style.visibility</p:attrName>
-                                        </p:attrNameLst>
-                                      </p:cBhvr>
-                                      <p:to>
-                                        <p:strVal val="visible"/>
-                                      </p:to>
-                                    </p:set>
-                                  </p:childTnLst>
-                                </p:cTn>
-                              </p:par>
-                            </p:childTnLst>
-                          </p:cTn>
-                        </p:par>
-                      </p:childTnLst>
-                    </p:cTn>
-                  </p:par>
-                </p:childTnLst>
-              </p:cTn>
-              <p:prevCondLst>
-                <p:cond evt="onPrev" delay="0">
-                  <p:tgtEl>
-                    <p:sldTgt/>
-                  </p:tgtEl>
-                </p:cond>
-              </p:prevCondLst>
-              <p:nextCondLst>
-                <p:cond evt="onNext" delay="0">
-                  <p:tgtEl>
-                    <p:sldTgt/>
-                  </p:tgtEl>
-                </p:cond>
-              </p:nextCondLst>
-            </p:seq>
-          </p:childTnLst>
-        </p:cTn>
-      </p:par>
-    </p:tnLst>
-    <p:bldLst>
-      <p:bldP spid="3" grpId="0" uiExpand="1" build="p"/>
-      <p:bldP spid="4" grpId="0" animBg="1"/>
-      <p:bldP spid="5" grpId="0" animBg="1"/>
-    </p:bldLst>
-  </p:timing>
-</p:sld>
-</file>
-
 <file path=ppt/theme/theme1.xml><?xml version="1.0" encoding="utf-8"?>
 <a:theme xmlns:a="http://schemas.openxmlformats.org/drawingml/2006/main" name="Office Theme">
   <a:themeElements>

</xml_diff>

<commit_message>
Added lsides on cache hierarchy
</commit_message>
<xml_diff>
--- a/Optimization/hpc_efficiency.pptx
+++ b/Optimization/hpc_efficiency.pptx
@@ -20,9 +20,12 @@
     <p:sldId id="269" r:id="rId14"/>
     <p:sldId id="270" r:id="rId15"/>
     <p:sldId id="272" r:id="rId16"/>
-    <p:sldId id="274" r:id="rId17"/>
-    <p:sldId id="273" r:id="rId18"/>
-    <p:sldId id="271" r:id="rId19"/>
+    <p:sldId id="277" r:id="rId17"/>
+    <p:sldId id="274" r:id="rId18"/>
+    <p:sldId id="275" r:id="rId19"/>
+    <p:sldId id="273" r:id="rId20"/>
+    <p:sldId id="276" r:id="rId21"/>
+    <p:sldId id="271" r:id="rId22"/>
   </p:sldIdLst>
   <p:sldSz cx="9144000" cy="6858000" type="screen4x3"/>
   <p:notesSz cx="6858000" cy="9144000"/>
@@ -6201,7 +6204,7 @@
           <a:graphicData uri="http://schemas.openxmlformats.org/presentationml/2006/ole">
             <mc:AlternateContent xmlns:mc="http://schemas.openxmlformats.org/markup-compatibility/2006">
               <mc:Choice xmlns:v="urn:schemas-microsoft-com:vml" Requires="v">
-                <p:oleObj spid="_x0000_s1040" name="Equation" r:id="rId3" imgW="812520" imgH="393480" progId="Equation.3">
+                <p:oleObj spid="_x0000_s1056" name="Equation" r:id="rId3" imgW="812520" imgH="393480" progId="Equation.3">
                   <p:embed/>
                 </p:oleObj>
               </mc:Choice>
@@ -6258,7 +6261,7 @@
           <a:graphicData uri="http://schemas.openxmlformats.org/presentationml/2006/ole">
             <mc:AlternateContent xmlns:mc="http://schemas.openxmlformats.org/markup-compatibility/2006">
               <mc:Choice xmlns:v="urn:schemas-microsoft-com:vml" Requires="v">
-                <p:oleObj spid="_x0000_s1041" name="Equation" r:id="rId5" imgW="2489040" imgH="431640" progId="Equation.3">
+                <p:oleObj spid="_x0000_s1057" name="Equation" r:id="rId5" imgW="2489040" imgH="431640" progId="Equation.3">
                   <p:embed/>
                 </p:oleObj>
               </mc:Choice>
@@ -12002,7 +12005,7 @@
           <a:p>
             <a:r>
               <a:rPr lang="en-US" dirty="0" smtClean="0"/>
-              <a:t>Cache hierarchy</a:t>
+              <a:t>Memory hierarchy</a:t>
             </a:r>
             <a:endParaRPr lang="en-US" dirty="0"/>
           </a:p>
@@ -12126,13 +12129,18 @@
         </p:nvSpPr>
         <p:spPr>
           <a:xfrm>
-            <a:off x="5220072" y="3284984"/>
-            <a:ext cx="1944763" cy="523220"/>
+            <a:off x="4644008" y="1484784"/>
+            <a:ext cx="3269998" cy="523220"/>
           </a:xfrm>
           <a:prstGeom prst="rect">
             <a:avLst/>
           </a:prstGeom>
           <a:noFill/>
+          <a:ln>
+            <a:solidFill>
+              <a:schemeClr val="tx1"/>
+            </a:solidFill>
+          </a:ln>
         </p:spPr>
         <p:txBody>
           <a:bodyPr wrap="none" rtlCol="0">
@@ -12142,12 +12150,135 @@
           <a:p>
             <a:r>
               <a:rPr lang="en-US" sz="2800" dirty="0" smtClean="0"/>
-              <a:t>Bandwidth: </a:t>
+              <a:t>Bandwidth: 130 GB/s</a:t>
             </a:r>
             <a:endParaRPr lang="en-US" sz="2800" dirty="0"/>
           </a:p>
         </p:txBody>
       </p:sp>
+      <p:sp>
+        <p:nvSpPr>
+          <p:cNvPr id="5" name="TextBox 4"/>
+          <p:cNvSpPr txBox="1"/>
+          <p:nvPr/>
+        </p:nvSpPr>
+        <p:spPr>
+          <a:xfrm>
+            <a:off x="4644008" y="2251752"/>
+            <a:ext cx="3269998" cy="523220"/>
+          </a:xfrm>
+          <a:prstGeom prst="rect">
+            <a:avLst/>
+          </a:prstGeom>
+          <a:noFill/>
+          <a:ln>
+            <a:solidFill>
+              <a:schemeClr val="tx1"/>
+            </a:solidFill>
+          </a:ln>
+        </p:spPr>
+        <p:txBody>
+          <a:bodyPr wrap="square" rtlCol="0">
+            <a:spAutoFit/>
+          </a:bodyPr>
+          <a:lstStyle/>
+          <a:p>
+            <a:r>
+              <a:rPr lang="en-US" sz="2800" dirty="0" smtClean="0"/>
+              <a:t>QPI incurs 10 % loss</a:t>
+            </a:r>
+            <a:endParaRPr lang="en-US" sz="2800" dirty="0"/>
+          </a:p>
+        </p:txBody>
+      </p:sp>
+      <p:grpSp>
+        <p:nvGrpSpPr>
+          <p:cNvPr id="8" name="Group 7"/>
+          <p:cNvGrpSpPr/>
+          <p:nvPr/>
+        </p:nvGrpSpPr>
+        <p:grpSpPr>
+          <a:xfrm>
+            <a:off x="3203848" y="3284984"/>
+            <a:ext cx="2961261" cy="504056"/>
+            <a:chOff x="3203848" y="3284984"/>
+            <a:chExt cx="2961261" cy="504056"/>
+          </a:xfrm>
+        </p:grpSpPr>
+        <p:sp>
+          <p:nvSpPr>
+            <p:cNvPr id="6" name="TextBox 5"/>
+            <p:cNvSpPr txBox="1"/>
+            <p:nvPr/>
+          </p:nvSpPr>
+          <p:spPr>
+            <a:xfrm>
+              <a:off x="3428805" y="3326918"/>
+              <a:ext cx="2736304" cy="369332"/>
+            </a:xfrm>
+            <a:prstGeom prst="rect">
+              <a:avLst/>
+            </a:prstGeom>
+            <a:noFill/>
+          </p:spPr>
+          <p:txBody>
+            <a:bodyPr wrap="square" rtlCol="0">
+              <a:spAutoFit/>
+            </a:bodyPr>
+            <a:lstStyle/>
+            <a:p>
+              <a:r>
+                <a:rPr lang="en-US" dirty="0" smtClean="0"/>
+                <a:t>on average: 3 MB/core</a:t>
+              </a:r>
+              <a:endParaRPr lang="en-US" dirty="0"/>
+            </a:p>
+          </p:txBody>
+        </p:sp>
+        <p:sp>
+          <p:nvSpPr>
+            <p:cNvPr id="7" name="Right Brace 6"/>
+            <p:cNvSpPr/>
+            <p:nvPr/>
+          </p:nvSpPr>
+          <p:spPr>
+            <a:xfrm>
+              <a:off x="3203848" y="3284984"/>
+              <a:ext cx="144016" cy="504056"/>
+            </a:xfrm>
+            <a:prstGeom prst="rightBrace">
+              <a:avLst/>
+            </a:prstGeom>
+            <a:ln w="19050">
+              <a:solidFill>
+                <a:schemeClr val="tx1"/>
+              </a:solidFill>
+            </a:ln>
+          </p:spPr>
+          <p:style>
+            <a:lnRef idx="1">
+              <a:schemeClr val="accent1"/>
+            </a:lnRef>
+            <a:fillRef idx="0">
+              <a:schemeClr val="accent1"/>
+            </a:fillRef>
+            <a:effectRef idx="0">
+              <a:schemeClr val="accent1"/>
+            </a:effectRef>
+            <a:fontRef idx="minor">
+              <a:schemeClr val="tx1"/>
+            </a:fontRef>
+          </p:style>
+          <p:txBody>
+            <a:bodyPr rtlCol="0" anchor="ctr"/>
+            <a:lstStyle/>
+            <a:p>
+              <a:pPr algn="ctr"/>
+              <a:endParaRPr lang="en-US"/>
+            </a:p>
+          </p:txBody>
+        </p:sp>
+      </p:grpSp>
     </p:spTree>
     <p:extLst>
       <p:ext uri="{BB962C8B-B14F-4D97-AF65-F5344CB8AC3E}">
@@ -12169,6 +12300,353 @@
 </file>
 
 <file path=ppt/slides/slide16.xml><?xml version="1.0" encoding="utf-8"?>
+<p:sld xmlns:a="http://schemas.openxmlformats.org/drawingml/2006/main" xmlns:r="http://schemas.openxmlformats.org/officeDocument/2006/relationships" xmlns:p="http://schemas.openxmlformats.org/presentationml/2006/main">
+  <p:cSld>
+    <p:spTree>
+      <p:nvGrpSpPr>
+        <p:cNvPr id="1" name=""/>
+        <p:cNvGrpSpPr/>
+        <p:nvPr/>
+      </p:nvGrpSpPr>
+      <p:grpSpPr>
+        <a:xfrm>
+          <a:off x="0" y="0"/>
+          <a:ext cx="0" cy="0"/>
+          <a:chOff x="0" y="0"/>
+          <a:chExt cx="0" cy="0"/>
+        </a:xfrm>
+      </p:grpSpPr>
+      <p:sp>
+        <p:nvSpPr>
+          <p:cNvPr id="2" name="Title 1"/>
+          <p:cNvSpPr>
+            <a:spLocks noGrp="1"/>
+          </p:cNvSpPr>
+          <p:nvPr>
+            <p:ph type="title"/>
+          </p:nvPr>
+        </p:nvSpPr>
+        <p:spPr/>
+        <p:txBody>
+          <a:bodyPr/>
+          <a:lstStyle/>
+          <a:p>
+            <a:r>
+              <a:rPr lang="en-US" dirty="0" smtClean="0"/>
+              <a:t>Memory hierarchy illustrated</a:t>
+            </a:r>
+            <a:endParaRPr lang="en-US" dirty="0"/>
+          </a:p>
+        </p:txBody>
+      </p:sp>
+      <p:pic>
+        <p:nvPicPr>
+          <p:cNvPr id="3" name="Picture 2"/>
+          <p:cNvPicPr>
+            <a:picLocks noChangeAspect="1"/>
+          </p:cNvPicPr>
+          <p:nvPr/>
+        </p:nvPicPr>
+        <p:blipFill>
+          <a:blip r:embed="rId2">
+            <a:extLst>
+              <a:ext uri="{28A0092B-C50C-407E-A947-70E740481C1C}">
+                <a14:useLocalDpi xmlns:a14="http://schemas.microsoft.com/office/drawing/2010/main" val="0"/>
+              </a:ext>
+            </a:extLst>
+          </a:blip>
+          <a:stretch>
+            <a:fillRect/>
+          </a:stretch>
+        </p:blipFill>
+        <p:spPr>
+          <a:xfrm>
+            <a:off x="457200" y="1268760"/>
+            <a:ext cx="7884368" cy="5434115"/>
+          </a:xfrm>
+          <a:prstGeom prst="rect">
+            <a:avLst/>
+          </a:prstGeom>
+        </p:spPr>
+      </p:pic>
+      <p:grpSp>
+        <p:nvGrpSpPr>
+          <p:cNvPr id="8" name="Group 7"/>
+          <p:cNvGrpSpPr/>
+          <p:nvPr/>
+        </p:nvGrpSpPr>
+        <p:grpSpPr>
+          <a:xfrm>
+            <a:off x="2267744" y="4797152"/>
+            <a:ext cx="1152128" cy="1008112"/>
+            <a:chOff x="2267744" y="4797152"/>
+            <a:chExt cx="1152128" cy="1008112"/>
+          </a:xfrm>
+        </p:grpSpPr>
+        <p:cxnSp>
+          <p:nvCxnSpPr>
+            <p:cNvPr id="5" name="Straight Arrow Connector 4"/>
+            <p:cNvCxnSpPr>
+              <a:stCxn id="6" idx="3"/>
+            </p:cNvCxnSpPr>
+            <p:nvPr/>
+          </p:nvCxnSpPr>
+          <p:spPr>
+            <a:xfrm>
+              <a:off x="2965371" y="4981818"/>
+              <a:ext cx="454501" cy="823446"/>
+            </a:xfrm>
+            <a:prstGeom prst="straightConnector1">
+              <a:avLst/>
+            </a:prstGeom>
+            <a:ln w="38100">
+              <a:solidFill>
+                <a:schemeClr val="tx1"/>
+              </a:solidFill>
+              <a:tailEnd type="stealth"/>
+            </a:ln>
+          </p:spPr>
+          <p:style>
+            <a:lnRef idx="1">
+              <a:schemeClr val="accent1"/>
+            </a:lnRef>
+            <a:fillRef idx="0">
+              <a:schemeClr val="accent1"/>
+            </a:fillRef>
+            <a:effectRef idx="0">
+              <a:schemeClr val="accent1"/>
+            </a:effectRef>
+            <a:fontRef idx="minor">
+              <a:schemeClr val="tx1"/>
+            </a:fontRef>
+          </p:style>
+        </p:cxnSp>
+        <p:sp>
+          <p:nvSpPr>
+            <p:cNvPr id="6" name="TextBox 5"/>
+            <p:cNvSpPr txBox="1"/>
+            <p:nvPr/>
+          </p:nvSpPr>
+          <p:spPr>
+            <a:xfrm>
+              <a:off x="2267744" y="4797152"/>
+              <a:ext cx="697627" cy="369332"/>
+            </a:xfrm>
+            <a:prstGeom prst="rect">
+              <a:avLst/>
+            </a:prstGeom>
+            <a:noFill/>
+          </p:spPr>
+          <p:txBody>
+            <a:bodyPr wrap="none" rtlCol="0">
+              <a:spAutoFit/>
+            </a:bodyPr>
+            <a:lstStyle/>
+            <a:p>
+              <a:r>
+                <a:rPr lang="en-US" dirty="0" smtClean="0"/>
+                <a:t>32 kb</a:t>
+              </a:r>
+              <a:endParaRPr lang="en-US" dirty="0"/>
+            </a:p>
+          </p:txBody>
+        </p:sp>
+      </p:grpSp>
+      <p:grpSp>
+        <p:nvGrpSpPr>
+          <p:cNvPr id="9" name="Group 8"/>
+          <p:cNvGrpSpPr/>
+          <p:nvPr/>
+        </p:nvGrpSpPr>
+        <p:grpSpPr>
+          <a:xfrm>
+            <a:off x="3402443" y="3818880"/>
+            <a:ext cx="1241565" cy="978272"/>
+            <a:chOff x="2106299" y="4826992"/>
+            <a:chExt cx="1241565" cy="978272"/>
+          </a:xfrm>
+        </p:grpSpPr>
+        <p:cxnSp>
+          <p:nvCxnSpPr>
+            <p:cNvPr id="10" name="Straight Arrow Connector 9"/>
+            <p:cNvCxnSpPr>
+              <a:stCxn id="11" idx="3"/>
+            </p:cNvCxnSpPr>
+            <p:nvPr/>
+          </p:nvCxnSpPr>
+          <p:spPr>
+            <a:xfrm>
+              <a:off x="2920946" y="5011658"/>
+              <a:ext cx="426918" cy="793606"/>
+            </a:xfrm>
+            <a:prstGeom prst="straightConnector1">
+              <a:avLst/>
+            </a:prstGeom>
+            <a:ln w="38100">
+              <a:solidFill>
+                <a:schemeClr val="tx1"/>
+              </a:solidFill>
+              <a:tailEnd type="stealth"/>
+            </a:ln>
+          </p:spPr>
+          <p:style>
+            <a:lnRef idx="1">
+              <a:schemeClr val="accent1"/>
+            </a:lnRef>
+            <a:fillRef idx="0">
+              <a:schemeClr val="accent1"/>
+            </a:fillRef>
+            <a:effectRef idx="0">
+              <a:schemeClr val="accent1"/>
+            </a:effectRef>
+            <a:fontRef idx="minor">
+              <a:schemeClr val="tx1"/>
+            </a:fontRef>
+          </p:style>
+        </p:cxnSp>
+        <p:sp>
+          <p:nvSpPr>
+            <p:cNvPr id="11" name="TextBox 10"/>
+            <p:cNvSpPr txBox="1"/>
+            <p:nvPr/>
+          </p:nvSpPr>
+          <p:spPr>
+            <a:xfrm>
+              <a:off x="2106299" y="4826992"/>
+              <a:ext cx="814647" cy="369332"/>
+            </a:xfrm>
+            <a:prstGeom prst="rect">
+              <a:avLst/>
+            </a:prstGeom>
+            <a:noFill/>
+          </p:spPr>
+          <p:txBody>
+            <a:bodyPr wrap="none" rtlCol="0">
+              <a:spAutoFit/>
+            </a:bodyPr>
+            <a:lstStyle/>
+            <a:p>
+              <a:r>
+                <a:rPr lang="en-US" dirty="0" smtClean="0"/>
+                <a:t>256 kb</a:t>
+              </a:r>
+              <a:endParaRPr lang="en-US" dirty="0"/>
+            </a:p>
+          </p:txBody>
+        </p:sp>
+      </p:grpSp>
+      <p:grpSp>
+        <p:nvGrpSpPr>
+          <p:cNvPr id="14" name="Group 13"/>
+          <p:cNvGrpSpPr/>
+          <p:nvPr/>
+        </p:nvGrpSpPr>
+        <p:grpSpPr>
+          <a:xfrm>
+            <a:off x="6028598" y="3318851"/>
+            <a:ext cx="1241565" cy="978272"/>
+            <a:chOff x="2106299" y="4826992"/>
+            <a:chExt cx="1241565" cy="978272"/>
+          </a:xfrm>
+        </p:grpSpPr>
+        <p:cxnSp>
+          <p:nvCxnSpPr>
+            <p:cNvPr id="15" name="Straight Arrow Connector 14"/>
+            <p:cNvCxnSpPr>
+              <a:stCxn id="16" idx="3"/>
+            </p:cNvCxnSpPr>
+            <p:nvPr/>
+          </p:nvCxnSpPr>
+          <p:spPr>
+            <a:xfrm>
+              <a:off x="2896900" y="5011658"/>
+              <a:ext cx="450964" cy="793606"/>
+            </a:xfrm>
+            <a:prstGeom prst="straightConnector1">
+              <a:avLst/>
+            </a:prstGeom>
+            <a:ln w="38100">
+              <a:solidFill>
+                <a:schemeClr val="tx1"/>
+              </a:solidFill>
+              <a:tailEnd type="stealth"/>
+            </a:ln>
+          </p:spPr>
+          <p:style>
+            <a:lnRef idx="1">
+              <a:schemeClr val="accent1"/>
+            </a:lnRef>
+            <a:fillRef idx="0">
+              <a:schemeClr val="accent1"/>
+            </a:fillRef>
+            <a:effectRef idx="0">
+              <a:schemeClr val="accent1"/>
+            </a:effectRef>
+            <a:fontRef idx="minor">
+              <a:schemeClr val="tx1"/>
+            </a:fontRef>
+          </p:style>
+        </p:cxnSp>
+        <p:sp>
+          <p:nvSpPr>
+            <p:cNvPr id="16" name="TextBox 15"/>
+            <p:cNvSpPr txBox="1"/>
+            <p:nvPr/>
+          </p:nvSpPr>
+          <p:spPr>
+            <a:xfrm>
+              <a:off x="2106299" y="4826992"/>
+              <a:ext cx="790601" cy="369332"/>
+            </a:xfrm>
+            <a:prstGeom prst="rect">
+              <a:avLst/>
+            </a:prstGeom>
+            <a:noFill/>
+          </p:spPr>
+          <p:txBody>
+            <a:bodyPr wrap="none" rtlCol="0">
+              <a:spAutoFit/>
+            </a:bodyPr>
+            <a:lstStyle/>
+            <a:p>
+              <a:r>
+                <a:rPr lang="en-US" dirty="0" smtClean="0"/>
+                <a:t>16 </a:t>
+              </a:r>
+              <a:r>
+                <a:rPr lang="en-US" dirty="0"/>
+                <a:t>M</a:t>
+              </a:r>
+              <a:r>
+                <a:rPr lang="en-US" dirty="0" smtClean="0"/>
+                <a:t>b</a:t>
+              </a:r>
+              <a:endParaRPr lang="en-US" dirty="0"/>
+            </a:p>
+          </p:txBody>
+        </p:sp>
+      </p:grpSp>
+    </p:spTree>
+    <p:extLst>
+      <p:ext uri="{BB962C8B-B14F-4D97-AF65-F5344CB8AC3E}">
+        <p14:creationId xmlns:p14="http://schemas.microsoft.com/office/powerpoint/2010/main" val="679391558"/>
+      </p:ext>
+    </p:extLst>
+  </p:cSld>
+  <p:clrMapOvr>
+    <a:masterClrMapping/>
+  </p:clrMapOvr>
+  <p:timing>
+    <p:tnLst>
+      <p:par>
+        <p:cTn id="1" dur="indefinite" restart="never" nodeType="tmRoot"/>
+      </p:par>
+    </p:tnLst>
+  </p:timing>
+</p:sld>
+</file>
+
+<file path=ppt/slides/slide17.xml><?xml version="1.0" encoding="utf-8"?>
 <p:sld xmlns:a="http://schemas.openxmlformats.org/drawingml/2006/main" xmlns:r="http://schemas.openxmlformats.org/officeDocument/2006/relationships" xmlns:p="http://schemas.openxmlformats.org/presentationml/2006/main">
   <p:cSld>
     <p:spTree>
@@ -12247,7 +12725,86 @@
 </p:sld>
 </file>
 
-<file path=ppt/slides/slide17.xml><?xml version="1.0" encoding="utf-8"?>
+<file path=ppt/slides/slide18.xml><?xml version="1.0" encoding="utf-8"?>
+<p:sld xmlns:a="http://schemas.openxmlformats.org/drawingml/2006/main" xmlns:r="http://schemas.openxmlformats.org/officeDocument/2006/relationships" xmlns:p="http://schemas.openxmlformats.org/presentationml/2006/main">
+  <p:cSld>
+    <p:spTree>
+      <p:nvGrpSpPr>
+        <p:cNvPr id="1" name=""/>
+        <p:cNvGrpSpPr/>
+        <p:nvPr/>
+      </p:nvGrpSpPr>
+      <p:grpSpPr>
+        <a:xfrm>
+          <a:off x="0" y="0"/>
+          <a:ext cx="0" cy="0"/>
+          <a:chOff x="0" y="0"/>
+          <a:chExt cx="0" cy="0"/>
+        </a:xfrm>
+      </p:grpSpPr>
+      <p:sp>
+        <p:nvSpPr>
+          <p:cNvPr id="2" name="Title 1"/>
+          <p:cNvSpPr>
+            <a:spLocks noGrp="1"/>
+          </p:cNvSpPr>
+          <p:nvPr>
+            <p:ph type="title"/>
+          </p:nvPr>
+        </p:nvSpPr>
+        <p:spPr/>
+        <p:txBody>
+          <a:bodyPr/>
+          <a:lstStyle/>
+          <a:p>
+            <a:r>
+              <a:rPr lang="en-US" dirty="0" smtClean="0"/>
+              <a:t>Vectorization</a:t>
+            </a:r>
+            <a:endParaRPr lang="en-US" dirty="0"/>
+          </a:p>
+        </p:txBody>
+      </p:sp>
+      <p:sp>
+        <p:nvSpPr>
+          <p:cNvPr id="3" name="Content Placeholder 2"/>
+          <p:cNvSpPr>
+            <a:spLocks noGrp="1"/>
+          </p:cNvSpPr>
+          <p:nvPr>
+            <p:ph idx="1"/>
+          </p:nvPr>
+        </p:nvSpPr>
+        <p:spPr/>
+        <p:txBody>
+          <a:bodyPr/>
+          <a:lstStyle/>
+          <a:p>
+            <a:endParaRPr lang="en-US"/>
+          </a:p>
+        </p:txBody>
+      </p:sp>
+    </p:spTree>
+    <p:extLst>
+      <p:ext uri="{BB962C8B-B14F-4D97-AF65-F5344CB8AC3E}">
+        <p14:creationId xmlns:p14="http://schemas.microsoft.com/office/powerpoint/2010/main" val="78468918"/>
+      </p:ext>
+    </p:extLst>
+  </p:cSld>
+  <p:clrMapOvr>
+    <a:masterClrMapping/>
+  </p:clrMapOvr>
+  <p:timing>
+    <p:tnLst>
+      <p:par>
+        <p:cTn id="1" dur="indefinite" restart="never" nodeType="tmRoot"/>
+      </p:par>
+    </p:tnLst>
+  </p:timing>
+</p:sld>
+</file>
+
+<file path=ppt/slides/slide19.xml><?xml version="1.0" encoding="utf-8"?>
 <p:sld xmlns:a="http://schemas.openxmlformats.org/drawingml/2006/main" xmlns:r="http://schemas.openxmlformats.org/officeDocument/2006/relationships" xmlns:p="http://schemas.openxmlformats.org/presentationml/2006/main">
   <p:cSld>
     <p:spTree>
@@ -12302,7 +12859,958 @@
           <a:bodyPr/>
           <a:lstStyle/>
           <a:p>
-            <a:endParaRPr lang="en-US"/>
+            <a:r>
+              <a:rPr lang="en-US" dirty="0" smtClean="0"/>
+              <a:t>Transport 64 byte at once:</a:t>
+            </a:r>
+            <a:br>
+              <a:rPr lang="en-US" dirty="0" smtClean="0"/>
+            </a:br>
+            <a:r>
+              <a:rPr lang="en-US" dirty="0" smtClean="0"/>
+              <a:t>RAM </a:t>
+            </a:r>
+            <a:r>
+              <a:rPr lang="en-US" dirty="0" smtClean="0">
+                <a:sym typeface="Symbol" panose="05050102010706020507" pitchFamily="18" charset="2"/>
+              </a:rPr>
+              <a:t></a:t>
+            </a:r>
+            <a:r>
+              <a:rPr lang="en-US" dirty="0" smtClean="0"/>
+              <a:t> L3 </a:t>
+            </a:r>
+            <a:r>
+              <a:rPr lang="en-US" dirty="0">
+                <a:sym typeface="Symbol" panose="05050102010706020507" pitchFamily="18" charset="2"/>
+              </a:rPr>
+              <a:t></a:t>
+            </a:r>
+            <a:r>
+              <a:rPr lang="en-US" dirty="0" smtClean="0"/>
+              <a:t> L2 </a:t>
+            </a:r>
+            <a:r>
+              <a:rPr lang="en-US" dirty="0">
+                <a:sym typeface="Symbol" panose="05050102010706020507" pitchFamily="18" charset="2"/>
+              </a:rPr>
+              <a:t></a:t>
+            </a:r>
+            <a:r>
+              <a:rPr lang="en-US" dirty="0" smtClean="0"/>
+              <a:t> L1</a:t>
+            </a:r>
+          </a:p>
+          <a:p>
+            <a:pPr lvl="1"/>
+            <a:r>
+              <a:rPr lang="en-US" dirty="0" smtClean="0"/>
+              <a:t>cache line</a:t>
+            </a:r>
+          </a:p>
+          <a:p>
+            <a:pPr lvl="1"/>
+            <a:r>
+              <a:rPr lang="en-US" dirty="0" smtClean="0"/>
+              <a:t>8 double or 16 single precision</a:t>
+            </a:r>
+          </a:p>
+          <a:p>
+            <a:r>
+              <a:rPr lang="en-US" dirty="0" smtClean="0"/>
+              <a:t>Data structure layout is critical!</a:t>
+            </a:r>
+          </a:p>
+          <a:p>
+            <a:pPr lvl="1"/>
+            <a:r>
+              <a:rPr lang="en-US" dirty="0" smtClean="0"/>
+              <a:t>access to contiguous data, e.g., </a:t>
+            </a:r>
+            <a:r>
+              <a:rPr lang="en-US" dirty="0" err="1" smtClean="0"/>
+              <a:t>AoS</a:t>
+            </a:r>
+            <a:r>
+              <a:rPr lang="en-US" dirty="0" smtClean="0"/>
+              <a:t> vs. </a:t>
+            </a:r>
+            <a:r>
+              <a:rPr lang="en-US" dirty="0" err="1" smtClean="0"/>
+              <a:t>SoA</a:t>
+            </a:r>
+            <a:endParaRPr lang="en-US" dirty="0"/>
+          </a:p>
+        </p:txBody>
+      </p:sp>
+      <p:grpSp>
+        <p:nvGrpSpPr>
+          <p:cNvPr id="25" name="Group 24"/>
+          <p:cNvGrpSpPr/>
+          <p:nvPr/>
+        </p:nvGrpSpPr>
+        <p:grpSpPr>
+          <a:xfrm>
+            <a:off x="3491880" y="5085184"/>
+            <a:ext cx="4917326" cy="411266"/>
+            <a:chOff x="2483768" y="4745926"/>
+            <a:chExt cx="4917326" cy="411266"/>
+          </a:xfrm>
+        </p:grpSpPr>
+        <p:sp>
+          <p:nvSpPr>
+            <p:cNvPr id="4" name="Rectangle 3"/>
+            <p:cNvSpPr/>
+            <p:nvPr/>
+          </p:nvSpPr>
+          <p:spPr>
+            <a:xfrm>
+              <a:off x="2483768" y="4787860"/>
+              <a:ext cx="4896544" cy="369332"/>
+            </a:xfrm>
+            <a:prstGeom prst="rect">
+              <a:avLst/>
+            </a:prstGeom>
+            <a:solidFill>
+              <a:schemeClr val="bg1">
+                <a:lumMod val="85000"/>
+              </a:schemeClr>
+            </a:solidFill>
+            <a:ln>
+              <a:noFill/>
+            </a:ln>
+          </p:spPr>
+          <p:style>
+            <a:lnRef idx="2">
+              <a:schemeClr val="accent1">
+                <a:shade val="50000"/>
+              </a:schemeClr>
+            </a:lnRef>
+            <a:fillRef idx="1">
+              <a:schemeClr val="accent1"/>
+            </a:fillRef>
+            <a:effectRef idx="0">
+              <a:schemeClr val="accent1"/>
+            </a:effectRef>
+            <a:fontRef idx="minor">
+              <a:schemeClr val="lt1"/>
+            </a:fontRef>
+          </p:style>
+          <p:txBody>
+            <a:bodyPr rtlCol="0" anchor="ctr"/>
+            <a:lstStyle/>
+            <a:p>
+              <a:pPr algn="ctr"/>
+              <a:endParaRPr lang="en-US"/>
+            </a:p>
+          </p:txBody>
+        </p:sp>
+        <p:sp>
+          <p:nvSpPr>
+            <p:cNvPr id="5" name="TextBox 4"/>
+            <p:cNvSpPr txBox="1"/>
+            <p:nvPr/>
+          </p:nvSpPr>
+          <p:spPr>
+            <a:xfrm>
+              <a:off x="3082342" y="4787860"/>
+              <a:ext cx="676788" cy="369332"/>
+            </a:xfrm>
+            <a:prstGeom prst="rect">
+              <a:avLst/>
+            </a:prstGeom>
+            <a:noFill/>
+          </p:spPr>
+          <p:txBody>
+            <a:bodyPr wrap="none" rtlCol="0">
+              <a:spAutoFit/>
+            </a:bodyPr>
+            <a:lstStyle/>
+            <a:p>
+              <a:r>
+                <a:rPr lang="en-US" dirty="0" smtClean="0"/>
+                <a:t>a[i-1]</a:t>
+              </a:r>
+              <a:endParaRPr lang="en-US" dirty="0"/>
+            </a:p>
+          </p:txBody>
+        </p:sp>
+        <p:sp>
+          <p:nvSpPr>
+            <p:cNvPr id="6" name="TextBox 5"/>
+            <p:cNvSpPr txBox="1"/>
+            <p:nvPr/>
+          </p:nvSpPr>
+          <p:spPr>
+            <a:xfrm>
+              <a:off x="3722724" y="4787860"/>
+              <a:ext cx="489236" cy="369332"/>
+            </a:xfrm>
+            <a:prstGeom prst="rect">
+              <a:avLst/>
+            </a:prstGeom>
+            <a:noFill/>
+          </p:spPr>
+          <p:txBody>
+            <a:bodyPr wrap="none" rtlCol="0">
+              <a:spAutoFit/>
+            </a:bodyPr>
+            <a:lstStyle/>
+            <a:p>
+              <a:r>
+                <a:rPr lang="en-US" dirty="0" smtClean="0"/>
+                <a:t>a[</a:t>
+              </a:r>
+              <a:r>
+                <a:rPr lang="en-US" dirty="0" err="1" smtClean="0"/>
+                <a:t>i</a:t>
+              </a:r>
+              <a:r>
+                <a:rPr lang="en-US" dirty="0" smtClean="0"/>
+                <a:t>]</a:t>
+              </a:r>
+              <a:endParaRPr lang="en-US" dirty="0"/>
+            </a:p>
+          </p:txBody>
+        </p:sp>
+        <p:sp>
+          <p:nvSpPr>
+            <p:cNvPr id="7" name="TextBox 6"/>
+            <p:cNvSpPr txBox="1"/>
+            <p:nvPr/>
+          </p:nvSpPr>
+          <p:spPr>
+            <a:xfrm>
+              <a:off x="4211960" y="4787860"/>
+              <a:ext cx="721672" cy="369332"/>
+            </a:xfrm>
+            <a:prstGeom prst="rect">
+              <a:avLst/>
+            </a:prstGeom>
+            <a:noFill/>
+          </p:spPr>
+          <p:txBody>
+            <a:bodyPr wrap="none" rtlCol="0">
+              <a:spAutoFit/>
+            </a:bodyPr>
+            <a:lstStyle/>
+            <a:p>
+              <a:r>
+                <a:rPr lang="en-US" dirty="0" smtClean="0"/>
+                <a:t>a[i+1]</a:t>
+              </a:r>
+              <a:endParaRPr lang="en-US" dirty="0"/>
+            </a:p>
+          </p:txBody>
+        </p:sp>
+        <p:sp>
+          <p:nvSpPr>
+            <p:cNvPr id="8" name="TextBox 7"/>
+            <p:cNvSpPr txBox="1"/>
+            <p:nvPr/>
+          </p:nvSpPr>
+          <p:spPr>
+            <a:xfrm>
+              <a:off x="5434504" y="4787860"/>
+              <a:ext cx="721672" cy="369332"/>
+            </a:xfrm>
+            <a:prstGeom prst="rect">
+              <a:avLst/>
+            </a:prstGeom>
+            <a:noFill/>
+          </p:spPr>
+          <p:txBody>
+            <a:bodyPr wrap="none" rtlCol="0">
+              <a:spAutoFit/>
+            </a:bodyPr>
+            <a:lstStyle/>
+            <a:p>
+              <a:r>
+                <a:rPr lang="en-US" dirty="0" smtClean="0"/>
+                <a:t>a[i+7]</a:t>
+              </a:r>
+              <a:endParaRPr lang="en-US" dirty="0"/>
+            </a:p>
+          </p:txBody>
+        </p:sp>
+        <p:sp>
+          <p:nvSpPr>
+            <p:cNvPr id="9" name="TextBox 8"/>
+            <p:cNvSpPr txBox="1"/>
+            <p:nvPr/>
+          </p:nvSpPr>
+          <p:spPr>
+            <a:xfrm>
+              <a:off x="6030621" y="4787860"/>
+              <a:ext cx="721672" cy="369332"/>
+            </a:xfrm>
+            <a:prstGeom prst="rect">
+              <a:avLst/>
+            </a:prstGeom>
+            <a:noFill/>
+          </p:spPr>
+          <p:txBody>
+            <a:bodyPr wrap="none" rtlCol="0">
+              <a:spAutoFit/>
+            </a:bodyPr>
+            <a:lstStyle/>
+            <a:p>
+              <a:r>
+                <a:rPr lang="en-US" dirty="0" smtClean="0"/>
+                <a:t>a[i+8]</a:t>
+              </a:r>
+              <a:endParaRPr lang="en-US" dirty="0"/>
+            </a:p>
+          </p:txBody>
+        </p:sp>
+        <p:cxnSp>
+          <p:nvCxnSpPr>
+            <p:cNvPr id="11" name="Straight Connector 10"/>
+            <p:cNvCxnSpPr/>
+            <p:nvPr/>
+          </p:nvCxnSpPr>
+          <p:spPr>
+            <a:xfrm>
+              <a:off x="3687122" y="4777469"/>
+              <a:ext cx="0" cy="369332"/>
+            </a:xfrm>
+            <a:prstGeom prst="line">
+              <a:avLst/>
+            </a:prstGeom>
+            <a:ln w="19050">
+              <a:solidFill>
+                <a:schemeClr val="tx1"/>
+              </a:solidFill>
+            </a:ln>
+          </p:spPr>
+          <p:style>
+            <a:lnRef idx="1">
+              <a:schemeClr val="accent1"/>
+            </a:lnRef>
+            <a:fillRef idx="0">
+              <a:schemeClr val="accent1"/>
+            </a:fillRef>
+            <a:effectRef idx="0">
+              <a:schemeClr val="accent1"/>
+            </a:effectRef>
+            <a:fontRef idx="minor">
+              <a:schemeClr val="tx1"/>
+            </a:fontRef>
+          </p:style>
+        </p:cxnSp>
+        <p:cxnSp>
+          <p:nvCxnSpPr>
+            <p:cNvPr id="12" name="Straight Connector 11"/>
+            <p:cNvCxnSpPr/>
+            <p:nvPr/>
+          </p:nvCxnSpPr>
+          <p:spPr>
+            <a:xfrm>
+              <a:off x="4283968" y="4776370"/>
+              <a:ext cx="0" cy="369332"/>
+            </a:xfrm>
+            <a:prstGeom prst="line">
+              <a:avLst/>
+            </a:prstGeom>
+            <a:ln w="19050">
+              <a:solidFill>
+                <a:schemeClr val="tx1"/>
+              </a:solidFill>
+            </a:ln>
+          </p:spPr>
+          <p:style>
+            <a:lnRef idx="1">
+              <a:schemeClr val="accent1"/>
+            </a:lnRef>
+            <a:fillRef idx="0">
+              <a:schemeClr val="accent1"/>
+            </a:fillRef>
+            <a:effectRef idx="0">
+              <a:schemeClr val="accent1"/>
+            </a:effectRef>
+            <a:fontRef idx="minor">
+              <a:schemeClr val="tx1"/>
+            </a:fontRef>
+          </p:style>
+        </p:cxnSp>
+        <p:cxnSp>
+          <p:nvCxnSpPr>
+            <p:cNvPr id="13" name="Straight Connector 12"/>
+            <p:cNvCxnSpPr/>
+            <p:nvPr/>
+          </p:nvCxnSpPr>
+          <p:spPr>
+            <a:xfrm>
+              <a:off x="4860032" y="4776370"/>
+              <a:ext cx="0" cy="369332"/>
+            </a:xfrm>
+            <a:prstGeom prst="line">
+              <a:avLst/>
+            </a:prstGeom>
+            <a:ln w="19050">
+              <a:solidFill>
+                <a:schemeClr val="tx1"/>
+              </a:solidFill>
+            </a:ln>
+          </p:spPr>
+          <p:style>
+            <a:lnRef idx="1">
+              <a:schemeClr val="accent1"/>
+            </a:lnRef>
+            <a:fillRef idx="0">
+              <a:schemeClr val="accent1"/>
+            </a:fillRef>
+            <a:effectRef idx="0">
+              <a:schemeClr val="accent1"/>
+            </a:effectRef>
+            <a:fontRef idx="minor">
+              <a:schemeClr val="tx1"/>
+            </a:fontRef>
+          </p:style>
+        </p:cxnSp>
+        <p:cxnSp>
+          <p:nvCxnSpPr>
+            <p:cNvPr id="14" name="Straight Connector 13"/>
+            <p:cNvCxnSpPr/>
+            <p:nvPr/>
+          </p:nvCxnSpPr>
+          <p:spPr>
+            <a:xfrm>
+              <a:off x="3131840" y="4786761"/>
+              <a:ext cx="0" cy="369332"/>
+            </a:xfrm>
+            <a:prstGeom prst="line">
+              <a:avLst/>
+            </a:prstGeom>
+            <a:ln w="19050">
+              <a:solidFill>
+                <a:schemeClr val="tx1"/>
+              </a:solidFill>
+            </a:ln>
+          </p:spPr>
+          <p:style>
+            <a:lnRef idx="1">
+              <a:schemeClr val="accent1"/>
+            </a:lnRef>
+            <a:fillRef idx="0">
+              <a:schemeClr val="accent1"/>
+            </a:fillRef>
+            <a:effectRef idx="0">
+              <a:schemeClr val="accent1"/>
+            </a:effectRef>
+            <a:fontRef idx="minor">
+              <a:schemeClr val="tx1"/>
+            </a:fontRef>
+          </p:style>
+        </p:cxnSp>
+        <p:cxnSp>
+          <p:nvCxnSpPr>
+            <p:cNvPr id="15" name="Straight Connector 14"/>
+            <p:cNvCxnSpPr/>
+            <p:nvPr/>
+          </p:nvCxnSpPr>
+          <p:spPr>
+            <a:xfrm>
+              <a:off x="5497713" y="4776370"/>
+              <a:ext cx="0" cy="369332"/>
+            </a:xfrm>
+            <a:prstGeom prst="line">
+              <a:avLst/>
+            </a:prstGeom>
+            <a:ln w="19050">
+              <a:solidFill>
+                <a:schemeClr val="tx1"/>
+              </a:solidFill>
+            </a:ln>
+          </p:spPr>
+          <p:style>
+            <a:lnRef idx="1">
+              <a:schemeClr val="accent1"/>
+            </a:lnRef>
+            <a:fillRef idx="0">
+              <a:schemeClr val="accent1"/>
+            </a:fillRef>
+            <a:effectRef idx="0">
+              <a:schemeClr val="accent1"/>
+            </a:effectRef>
+            <a:fontRef idx="minor">
+              <a:schemeClr val="tx1"/>
+            </a:fontRef>
+          </p:style>
+        </p:cxnSp>
+        <p:cxnSp>
+          <p:nvCxnSpPr>
+            <p:cNvPr id="16" name="Straight Connector 15"/>
+            <p:cNvCxnSpPr/>
+            <p:nvPr/>
+          </p:nvCxnSpPr>
+          <p:spPr>
+            <a:xfrm>
+              <a:off x="6084168" y="4776370"/>
+              <a:ext cx="0" cy="369332"/>
+            </a:xfrm>
+            <a:prstGeom prst="line">
+              <a:avLst/>
+            </a:prstGeom>
+            <a:ln w="19050">
+              <a:solidFill>
+                <a:schemeClr val="tx1"/>
+              </a:solidFill>
+            </a:ln>
+          </p:spPr>
+          <p:style>
+            <a:lnRef idx="1">
+              <a:schemeClr val="accent1"/>
+            </a:lnRef>
+            <a:fillRef idx="0">
+              <a:schemeClr val="accent1"/>
+            </a:fillRef>
+            <a:effectRef idx="0">
+              <a:schemeClr val="accent1"/>
+            </a:effectRef>
+            <a:fontRef idx="minor">
+              <a:schemeClr val="tx1"/>
+            </a:fontRef>
+          </p:style>
+        </p:cxnSp>
+        <p:cxnSp>
+          <p:nvCxnSpPr>
+            <p:cNvPr id="17" name="Straight Connector 16"/>
+            <p:cNvCxnSpPr/>
+            <p:nvPr/>
+          </p:nvCxnSpPr>
+          <p:spPr>
+            <a:xfrm>
+              <a:off x="6690676" y="4787860"/>
+              <a:ext cx="0" cy="369332"/>
+            </a:xfrm>
+            <a:prstGeom prst="line">
+              <a:avLst/>
+            </a:prstGeom>
+            <a:ln w="19050">
+              <a:solidFill>
+                <a:schemeClr val="tx1"/>
+              </a:solidFill>
+            </a:ln>
+          </p:spPr>
+          <p:style>
+            <a:lnRef idx="1">
+              <a:schemeClr val="accent1"/>
+            </a:lnRef>
+            <a:fillRef idx="0">
+              <a:schemeClr val="accent1"/>
+            </a:fillRef>
+            <a:effectRef idx="0">
+              <a:schemeClr val="accent1"/>
+            </a:effectRef>
+            <a:fontRef idx="minor">
+              <a:schemeClr val="tx1"/>
+            </a:fontRef>
+          </p:style>
+        </p:cxnSp>
+        <p:sp>
+          <p:nvSpPr>
+            <p:cNvPr id="18" name="TextBox 17"/>
+            <p:cNvSpPr txBox="1"/>
+            <p:nvPr/>
+          </p:nvSpPr>
+          <p:spPr>
+            <a:xfrm>
+              <a:off x="5020724" y="4745926"/>
+              <a:ext cx="343364" cy="369332"/>
+            </a:xfrm>
+            <a:prstGeom prst="rect">
+              <a:avLst/>
+            </a:prstGeom>
+            <a:noFill/>
+          </p:spPr>
+          <p:txBody>
+            <a:bodyPr wrap="none" rtlCol="0">
+              <a:spAutoFit/>
+            </a:bodyPr>
+            <a:lstStyle/>
+            <a:p>
+              <a:r>
+                <a:rPr lang="en-US" dirty="0" smtClean="0"/>
+                <a:t>…</a:t>
+              </a:r>
+              <a:endParaRPr lang="en-US" dirty="0"/>
+            </a:p>
+          </p:txBody>
+        </p:sp>
+        <p:cxnSp>
+          <p:nvCxnSpPr>
+            <p:cNvPr id="20" name="Straight Connector 19"/>
+            <p:cNvCxnSpPr/>
+            <p:nvPr/>
+          </p:nvCxnSpPr>
+          <p:spPr>
+            <a:xfrm>
+              <a:off x="2483768" y="4786761"/>
+              <a:ext cx="4896544" cy="0"/>
+            </a:xfrm>
+            <a:prstGeom prst="line">
+              <a:avLst/>
+            </a:prstGeom>
+            <a:ln w="19050">
+              <a:solidFill>
+                <a:schemeClr val="tx1"/>
+              </a:solidFill>
+            </a:ln>
+          </p:spPr>
+          <p:style>
+            <a:lnRef idx="1">
+              <a:schemeClr val="accent1"/>
+            </a:lnRef>
+            <a:fillRef idx="0">
+              <a:schemeClr val="accent1"/>
+            </a:fillRef>
+            <a:effectRef idx="0">
+              <a:schemeClr val="accent1"/>
+            </a:effectRef>
+            <a:fontRef idx="minor">
+              <a:schemeClr val="tx1"/>
+            </a:fontRef>
+          </p:style>
+        </p:cxnSp>
+        <p:cxnSp>
+          <p:nvCxnSpPr>
+            <p:cNvPr id="22" name="Straight Connector 21"/>
+            <p:cNvCxnSpPr/>
+            <p:nvPr/>
+          </p:nvCxnSpPr>
+          <p:spPr>
+            <a:xfrm>
+              <a:off x="2504550" y="5157192"/>
+              <a:ext cx="4896544" cy="0"/>
+            </a:xfrm>
+            <a:prstGeom prst="line">
+              <a:avLst/>
+            </a:prstGeom>
+            <a:ln w="19050">
+              <a:solidFill>
+                <a:schemeClr val="tx1"/>
+              </a:solidFill>
+            </a:ln>
+          </p:spPr>
+          <p:style>
+            <a:lnRef idx="1">
+              <a:schemeClr val="accent1"/>
+            </a:lnRef>
+            <a:fillRef idx="0">
+              <a:schemeClr val="accent1"/>
+            </a:fillRef>
+            <a:effectRef idx="0">
+              <a:schemeClr val="accent1"/>
+            </a:effectRef>
+            <a:fontRef idx="minor">
+              <a:schemeClr val="tx1"/>
+            </a:fontRef>
+          </p:style>
+        </p:cxnSp>
+        <p:sp>
+          <p:nvSpPr>
+            <p:cNvPr id="23" name="TextBox 22"/>
+            <p:cNvSpPr txBox="1"/>
+            <p:nvPr/>
+          </p:nvSpPr>
+          <p:spPr>
+            <a:xfrm>
+              <a:off x="6892932" y="4745926"/>
+              <a:ext cx="343364" cy="369332"/>
+            </a:xfrm>
+            <a:prstGeom prst="rect">
+              <a:avLst/>
+            </a:prstGeom>
+            <a:noFill/>
+          </p:spPr>
+          <p:txBody>
+            <a:bodyPr wrap="none" rtlCol="0">
+              <a:spAutoFit/>
+            </a:bodyPr>
+            <a:lstStyle/>
+            <a:p>
+              <a:r>
+                <a:rPr lang="en-US" dirty="0" smtClean="0"/>
+                <a:t>…</a:t>
+              </a:r>
+              <a:endParaRPr lang="en-US" dirty="0"/>
+            </a:p>
+          </p:txBody>
+        </p:sp>
+        <p:sp>
+          <p:nvSpPr>
+            <p:cNvPr id="24" name="TextBox 23"/>
+            <p:cNvSpPr txBox="1"/>
+            <p:nvPr/>
+          </p:nvSpPr>
+          <p:spPr>
+            <a:xfrm>
+              <a:off x="2627784" y="4745926"/>
+              <a:ext cx="343364" cy="369332"/>
+            </a:xfrm>
+            <a:prstGeom prst="rect">
+              <a:avLst/>
+            </a:prstGeom>
+            <a:noFill/>
+          </p:spPr>
+          <p:txBody>
+            <a:bodyPr wrap="none" rtlCol="0">
+              <a:spAutoFit/>
+            </a:bodyPr>
+            <a:lstStyle/>
+            <a:p>
+              <a:r>
+                <a:rPr lang="en-US" dirty="0" smtClean="0"/>
+                <a:t>…</a:t>
+              </a:r>
+              <a:endParaRPr lang="en-US" dirty="0"/>
+            </a:p>
+          </p:txBody>
+        </p:sp>
+      </p:grpSp>
+      <p:sp>
+        <p:nvSpPr>
+          <p:cNvPr id="26" name="TextBox 25"/>
+          <p:cNvSpPr txBox="1"/>
+          <p:nvPr/>
+        </p:nvSpPr>
+        <p:spPr>
+          <a:xfrm>
+            <a:off x="705402" y="5013176"/>
+            <a:ext cx="2138406" cy="1323439"/>
+          </a:xfrm>
+          <a:prstGeom prst="rect">
+            <a:avLst/>
+          </a:prstGeom>
+          <a:noFill/>
+          <a:ln>
+            <a:solidFill>
+              <a:schemeClr val="tx1"/>
+            </a:solidFill>
+          </a:ln>
+        </p:spPr>
+        <p:txBody>
+          <a:bodyPr wrap="none" rtlCol="0">
+            <a:spAutoFit/>
+          </a:bodyPr>
+          <a:lstStyle/>
+          <a:p>
+            <a:r>
+              <a:rPr lang="en-US" sz="2000" dirty="0" smtClean="0"/>
+              <a:t>double a[n];</a:t>
+            </a:r>
+          </a:p>
+          <a:p>
+            <a:r>
+              <a:rPr lang="en-US" sz="2000" dirty="0" smtClean="0"/>
+              <a:t>…</a:t>
+            </a:r>
+          </a:p>
+          <a:p>
+            <a:r>
+              <a:rPr lang="en-US" sz="2000" dirty="0" smtClean="0"/>
+              <a:t>for (</a:t>
+            </a:r>
+            <a:r>
+              <a:rPr lang="en-US" sz="2000" dirty="0" err="1" smtClean="0"/>
+              <a:t>i</a:t>
+            </a:r>
+            <a:r>
+              <a:rPr lang="en-US" sz="2000" dirty="0" smtClean="0"/>
+              <a:t> = 0; </a:t>
+            </a:r>
+            <a:r>
+              <a:rPr lang="en-US" sz="2000" dirty="0" err="1" smtClean="0"/>
+              <a:t>i</a:t>
+            </a:r>
+            <a:r>
+              <a:rPr lang="en-US" sz="2000" dirty="0"/>
+              <a:t> </a:t>
+            </a:r>
+            <a:r>
+              <a:rPr lang="en-US" sz="2000" dirty="0" smtClean="0"/>
+              <a:t>&lt; n; </a:t>
+            </a:r>
+            <a:r>
+              <a:rPr lang="en-US" sz="2000" dirty="0" err="1" smtClean="0"/>
+              <a:t>i</a:t>
+            </a:r>
+            <a:r>
+              <a:rPr lang="en-US" sz="2000" dirty="0" smtClean="0"/>
+              <a:t>++)</a:t>
+            </a:r>
+          </a:p>
+          <a:p>
+            <a:r>
+              <a:rPr lang="en-US" sz="2000" dirty="0"/>
+              <a:t> </a:t>
+            </a:r>
+            <a:r>
+              <a:rPr lang="en-US" sz="2000" dirty="0" smtClean="0"/>
+              <a:t>   f(a[</a:t>
+            </a:r>
+            <a:r>
+              <a:rPr lang="en-US" sz="2000" dirty="0" err="1" smtClean="0"/>
+              <a:t>i</a:t>
+            </a:r>
+            <a:r>
+              <a:rPr lang="en-US" sz="2000" dirty="0" smtClean="0"/>
+              <a:t>])</a:t>
+            </a:r>
+            <a:endParaRPr lang="en-US" sz="1600" dirty="0" smtClean="0"/>
+          </a:p>
+        </p:txBody>
+      </p:sp>
+      <p:grpSp>
+        <p:nvGrpSpPr>
+          <p:cNvPr id="29" name="Group 28"/>
+          <p:cNvGrpSpPr/>
+          <p:nvPr/>
+        </p:nvGrpSpPr>
+        <p:grpSpPr>
+          <a:xfrm>
+            <a:off x="4705625" y="5568458"/>
+            <a:ext cx="2386655" cy="483274"/>
+            <a:chOff x="3748739" y="5373216"/>
+            <a:chExt cx="2386655" cy="483274"/>
+          </a:xfrm>
+        </p:grpSpPr>
+        <p:sp>
+          <p:nvSpPr>
+            <p:cNvPr id="27" name="Left Brace 26"/>
+            <p:cNvSpPr/>
+            <p:nvPr/>
+          </p:nvSpPr>
+          <p:spPr>
+            <a:xfrm rot="16200000">
+              <a:off x="4870059" y="4251896"/>
+              <a:ext cx="144016" cy="2386655"/>
+            </a:xfrm>
+            <a:prstGeom prst="leftBrace">
+              <a:avLst/>
+            </a:prstGeom>
+            <a:ln w="19050">
+              <a:solidFill>
+                <a:schemeClr val="tx1"/>
+              </a:solidFill>
+            </a:ln>
+          </p:spPr>
+          <p:style>
+            <a:lnRef idx="1">
+              <a:schemeClr val="accent1"/>
+            </a:lnRef>
+            <a:fillRef idx="0">
+              <a:schemeClr val="accent1"/>
+            </a:fillRef>
+            <a:effectRef idx="0">
+              <a:schemeClr val="accent1"/>
+            </a:effectRef>
+            <a:fontRef idx="minor">
+              <a:schemeClr val="tx1"/>
+            </a:fontRef>
+          </p:style>
+          <p:txBody>
+            <a:bodyPr rtlCol="0" anchor="ctr"/>
+            <a:lstStyle/>
+            <a:p>
+              <a:pPr algn="ctr"/>
+              <a:endParaRPr lang="en-US"/>
+            </a:p>
+          </p:txBody>
+        </p:sp>
+        <p:sp>
+          <p:nvSpPr>
+            <p:cNvPr id="28" name="TextBox 27"/>
+            <p:cNvSpPr txBox="1"/>
+            <p:nvPr/>
+          </p:nvSpPr>
+          <p:spPr>
+            <a:xfrm>
+              <a:off x="4386002" y="5487158"/>
+              <a:ext cx="1122102" cy="369332"/>
+            </a:xfrm>
+            <a:prstGeom prst="rect">
+              <a:avLst/>
+            </a:prstGeom>
+            <a:noFill/>
+          </p:spPr>
+          <p:txBody>
+            <a:bodyPr wrap="none" rtlCol="0">
+              <a:spAutoFit/>
+            </a:bodyPr>
+            <a:lstStyle/>
+            <a:p>
+              <a:r>
+                <a:rPr lang="en-US" dirty="0" smtClean="0"/>
+                <a:t>cache line</a:t>
+              </a:r>
+              <a:endParaRPr lang="en-US" dirty="0"/>
+            </a:p>
+          </p:txBody>
+        </p:sp>
+      </p:grpSp>
+      <p:sp>
+        <p:nvSpPr>
+          <p:cNvPr id="30" name="TextBox 29"/>
+          <p:cNvSpPr txBox="1"/>
+          <p:nvPr/>
+        </p:nvSpPr>
+        <p:spPr>
+          <a:xfrm>
+            <a:off x="5657875" y="2204864"/>
+            <a:ext cx="3162597" cy="923330"/>
+          </a:xfrm>
+          <a:prstGeom prst="rect">
+            <a:avLst/>
+          </a:prstGeom>
+          <a:noFill/>
+          <a:ln>
+            <a:solidFill>
+              <a:schemeClr val="tx1"/>
+            </a:solidFill>
+          </a:ln>
+        </p:spPr>
+        <p:txBody>
+          <a:bodyPr wrap="none" rtlCol="0">
+            <a:spAutoFit/>
+          </a:bodyPr>
+          <a:lstStyle/>
+          <a:p>
+            <a:r>
+              <a:rPr lang="en-US" dirty="0" smtClean="0"/>
+              <a:t>not exploited: effective</a:t>
+            </a:r>
+            <a:br>
+              <a:rPr lang="en-US" dirty="0" smtClean="0"/>
+            </a:br>
+            <a:r>
+              <a:rPr lang="en-US" dirty="0" smtClean="0"/>
+              <a:t>    </a:t>
+            </a:r>
+            <a:r>
+              <a:rPr lang="en-US" dirty="0" smtClean="0">
+                <a:sym typeface="Symbol" panose="05050102010706020507" pitchFamily="18" charset="2"/>
+              </a:rPr>
+              <a:t> </a:t>
+            </a:r>
+            <a:r>
+              <a:rPr lang="en-US" dirty="0" smtClean="0"/>
+              <a:t>memory bandwidth/8 or 16</a:t>
+            </a:r>
+          </a:p>
+          <a:p>
+            <a:r>
+              <a:rPr lang="en-US" dirty="0" smtClean="0">
+                <a:sym typeface="Symbol" panose="05050102010706020507" pitchFamily="18" charset="2"/>
+              </a:rPr>
+              <a:t>     </a:t>
+            </a:r>
+            <a:r>
+              <a:rPr lang="en-US" dirty="0" smtClean="0"/>
+              <a:t>cache size/8 or 16</a:t>
+            </a:r>
+            <a:endParaRPr lang="en-US" dirty="0"/>
           </a:p>
         </p:txBody>
       </p:sp>
@@ -12326,7 +13834,165 @@
 </p:sld>
 </file>
 
-<file path=ppt/slides/slide18.xml><?xml version="1.0" encoding="utf-8"?>
+<file path=ppt/slides/slide2.xml><?xml version="1.0" encoding="utf-8"?>
+<p:sld xmlns:a="http://schemas.openxmlformats.org/drawingml/2006/main" xmlns:r="http://schemas.openxmlformats.org/officeDocument/2006/relationships" xmlns:p="http://schemas.openxmlformats.org/presentationml/2006/main">
+  <p:cSld>
+    <p:spTree>
+      <p:nvGrpSpPr>
+        <p:cNvPr id="1" name=""/>
+        <p:cNvGrpSpPr/>
+        <p:nvPr/>
+      </p:nvGrpSpPr>
+      <p:grpSpPr>
+        <a:xfrm>
+          <a:off x="0" y="0"/>
+          <a:ext cx="0" cy="0"/>
+          <a:chOff x="0" y="0"/>
+          <a:chExt cx="0" cy="0"/>
+        </a:xfrm>
+      </p:grpSpPr>
+      <p:sp>
+        <p:nvSpPr>
+          <p:cNvPr id="2" name="Title 1"/>
+          <p:cNvSpPr>
+            <a:spLocks noGrp="1"/>
+          </p:cNvSpPr>
+          <p:nvPr>
+            <p:ph type="title"/>
+          </p:nvPr>
+        </p:nvSpPr>
+        <p:spPr/>
+        <p:txBody>
+          <a:bodyPr/>
+          <a:lstStyle/>
+          <a:p>
+            <a:r>
+              <a:rPr lang="en-US" dirty="0" smtClean="0"/>
+              <a:t>Parallel scaling</a:t>
+            </a:r>
+            <a:endParaRPr lang="en-US" dirty="0"/>
+          </a:p>
+        </p:txBody>
+      </p:sp>
+      <p:sp>
+        <p:nvSpPr>
+          <p:cNvPr id="3" name="Text Placeholder 2"/>
+          <p:cNvSpPr>
+            <a:spLocks noGrp="1"/>
+          </p:cNvSpPr>
+          <p:nvPr>
+            <p:ph type="body" idx="1"/>
+          </p:nvPr>
+        </p:nvSpPr>
+        <p:spPr/>
+        <p:txBody>
+          <a:bodyPr/>
+          <a:lstStyle/>
+          <a:p>
+            <a:endParaRPr lang="en-US"/>
+          </a:p>
+        </p:txBody>
+      </p:sp>
+    </p:spTree>
+    <p:extLst>
+      <p:ext uri="{BB962C8B-B14F-4D97-AF65-F5344CB8AC3E}">
+        <p14:creationId xmlns:p14="http://schemas.microsoft.com/office/powerpoint/2010/main" val="703705777"/>
+      </p:ext>
+    </p:extLst>
+  </p:cSld>
+  <p:clrMapOvr>
+    <a:masterClrMapping/>
+  </p:clrMapOvr>
+  <p:timing>
+    <p:tnLst>
+      <p:par>
+        <p:cTn id="1" dur="indefinite" restart="never" nodeType="tmRoot"/>
+      </p:par>
+    </p:tnLst>
+  </p:timing>
+</p:sld>
+</file>
+
+<file path=ppt/slides/slide20.xml><?xml version="1.0" encoding="utf-8"?>
+<p:sld xmlns:a="http://schemas.openxmlformats.org/drawingml/2006/main" xmlns:r="http://schemas.openxmlformats.org/officeDocument/2006/relationships" xmlns:p="http://schemas.openxmlformats.org/presentationml/2006/main">
+  <p:cSld>
+    <p:spTree>
+      <p:nvGrpSpPr>
+        <p:cNvPr id="1" name=""/>
+        <p:cNvGrpSpPr/>
+        <p:nvPr/>
+      </p:nvGrpSpPr>
+      <p:grpSpPr>
+        <a:xfrm>
+          <a:off x="0" y="0"/>
+          <a:ext cx="0" cy="0"/>
+          <a:chOff x="0" y="0"/>
+          <a:chExt cx="0" cy="0"/>
+        </a:xfrm>
+      </p:grpSpPr>
+      <p:sp>
+        <p:nvSpPr>
+          <p:cNvPr id="2" name="Title 1"/>
+          <p:cNvSpPr>
+            <a:spLocks noGrp="1"/>
+          </p:cNvSpPr>
+          <p:nvPr>
+            <p:ph type="title"/>
+          </p:nvPr>
+        </p:nvSpPr>
+        <p:spPr/>
+        <p:txBody>
+          <a:bodyPr/>
+          <a:lstStyle/>
+          <a:p>
+            <a:r>
+              <a:rPr lang="en-US" dirty="0" smtClean="0"/>
+              <a:t>False sharing</a:t>
+            </a:r>
+            <a:endParaRPr lang="en-US" dirty="0"/>
+          </a:p>
+        </p:txBody>
+      </p:sp>
+      <p:sp>
+        <p:nvSpPr>
+          <p:cNvPr id="3" name="Content Placeholder 2"/>
+          <p:cNvSpPr>
+            <a:spLocks noGrp="1"/>
+          </p:cNvSpPr>
+          <p:nvPr>
+            <p:ph idx="1"/>
+          </p:nvPr>
+        </p:nvSpPr>
+        <p:spPr/>
+        <p:txBody>
+          <a:bodyPr/>
+          <a:lstStyle/>
+          <a:p>
+            <a:endParaRPr lang="en-US"/>
+          </a:p>
+        </p:txBody>
+      </p:sp>
+    </p:spTree>
+    <p:extLst>
+      <p:ext uri="{BB962C8B-B14F-4D97-AF65-F5344CB8AC3E}">
+        <p14:creationId xmlns:p14="http://schemas.microsoft.com/office/powerpoint/2010/main" val="1302518243"/>
+      </p:ext>
+    </p:extLst>
+  </p:cSld>
+  <p:clrMapOvr>
+    <a:masterClrMapping/>
+  </p:clrMapOvr>
+  <p:timing>
+    <p:tnLst>
+      <p:par>
+        <p:cTn id="1" dur="indefinite" restart="never" nodeType="tmRoot"/>
+      </p:par>
+    </p:tnLst>
+  </p:timing>
+</p:sld>
+</file>
+
+<file path=ppt/slides/slide21.xml><?xml version="1.0" encoding="utf-8"?>
 <p:sld xmlns:a="http://schemas.openxmlformats.org/drawingml/2006/main" xmlns:r="http://schemas.openxmlformats.org/officeDocument/2006/relationships" xmlns:p="http://schemas.openxmlformats.org/presentationml/2006/main">
   <p:cSld>
     <p:spTree>
@@ -14089,85 +15755,6 @@
     <p:extLst>
       <p:ext uri="{BB962C8B-B14F-4D97-AF65-F5344CB8AC3E}">
         <p14:creationId xmlns:p14="http://schemas.microsoft.com/office/powerpoint/2010/main" val="1618542681"/>
-      </p:ext>
-    </p:extLst>
-  </p:cSld>
-  <p:clrMapOvr>
-    <a:masterClrMapping/>
-  </p:clrMapOvr>
-  <p:timing>
-    <p:tnLst>
-      <p:par>
-        <p:cTn id="1" dur="indefinite" restart="never" nodeType="tmRoot"/>
-      </p:par>
-    </p:tnLst>
-  </p:timing>
-</p:sld>
-</file>
-
-<file path=ppt/slides/slide2.xml><?xml version="1.0" encoding="utf-8"?>
-<p:sld xmlns:a="http://schemas.openxmlformats.org/drawingml/2006/main" xmlns:r="http://schemas.openxmlformats.org/officeDocument/2006/relationships" xmlns:p="http://schemas.openxmlformats.org/presentationml/2006/main">
-  <p:cSld>
-    <p:spTree>
-      <p:nvGrpSpPr>
-        <p:cNvPr id="1" name=""/>
-        <p:cNvGrpSpPr/>
-        <p:nvPr/>
-      </p:nvGrpSpPr>
-      <p:grpSpPr>
-        <a:xfrm>
-          <a:off x="0" y="0"/>
-          <a:ext cx="0" cy="0"/>
-          <a:chOff x="0" y="0"/>
-          <a:chExt cx="0" cy="0"/>
-        </a:xfrm>
-      </p:grpSpPr>
-      <p:sp>
-        <p:nvSpPr>
-          <p:cNvPr id="2" name="Title 1"/>
-          <p:cNvSpPr>
-            <a:spLocks noGrp="1"/>
-          </p:cNvSpPr>
-          <p:nvPr>
-            <p:ph type="title"/>
-          </p:nvPr>
-        </p:nvSpPr>
-        <p:spPr/>
-        <p:txBody>
-          <a:bodyPr/>
-          <a:lstStyle/>
-          <a:p>
-            <a:r>
-              <a:rPr lang="en-US" dirty="0" smtClean="0"/>
-              <a:t>Parallel scaling</a:t>
-            </a:r>
-            <a:endParaRPr lang="en-US" dirty="0"/>
-          </a:p>
-        </p:txBody>
-      </p:sp>
-      <p:sp>
-        <p:nvSpPr>
-          <p:cNvPr id="3" name="Text Placeholder 2"/>
-          <p:cNvSpPr>
-            <a:spLocks noGrp="1"/>
-          </p:cNvSpPr>
-          <p:nvPr>
-            <p:ph type="body" idx="1"/>
-          </p:nvPr>
-        </p:nvSpPr>
-        <p:spPr/>
-        <p:txBody>
-          <a:bodyPr/>
-          <a:lstStyle/>
-          <a:p>
-            <a:endParaRPr lang="en-US"/>
-          </a:p>
-        </p:txBody>
-      </p:sp>
-    </p:spTree>
-    <p:extLst>
-      <p:ext uri="{BB962C8B-B14F-4D97-AF65-F5344CB8AC3E}">
-        <p14:creationId xmlns:p14="http://schemas.microsoft.com/office/powerpoint/2010/main" val="703705777"/>
       </p:ext>
     </p:extLst>
   </p:cSld>

</xml_diff>

<commit_message>
Added slides on vectorization
</commit_message>
<xml_diff>
--- a/Optimization/hpc_efficiency.pptx
+++ b/Optimization/hpc_efficiency.pptx
@@ -5,7 +5,7 @@
     <p:sldMasterId id="2147483648" r:id="rId1"/>
   </p:sldMasterIdLst>
   <p:notesMasterIdLst>
-    <p:notesMasterId r:id="rId25"/>
+    <p:notesMasterId r:id="rId26"/>
   </p:notesMasterIdLst>
   <p:sldIdLst>
     <p:sldId id="267" r:id="rId2"/>
@@ -28,9 +28,10 @@
     <p:sldId id="279" r:id="rId19"/>
     <p:sldId id="280" r:id="rId20"/>
     <p:sldId id="278" r:id="rId21"/>
-    <p:sldId id="276" r:id="rId22"/>
-    <p:sldId id="275" r:id="rId23"/>
-    <p:sldId id="271" r:id="rId24"/>
+    <p:sldId id="275" r:id="rId22"/>
+    <p:sldId id="281" r:id="rId23"/>
+    <p:sldId id="282" r:id="rId24"/>
+    <p:sldId id="271" r:id="rId25"/>
   </p:sldIdLst>
   <p:sldSz cx="9144000" cy="6858000" type="screen4x3"/>
   <p:notesSz cx="6858000" cy="9144000"/>
@@ -258,11 +259,11 @@
           <c:showPercent val="0"/>
           <c:showBubbleSize val="0"/>
         </c:dLbls>
-        <c:axId val="286587728"/>
-        <c:axId val="286591648"/>
+        <c:axId val="351961136"/>
+        <c:axId val="351966624"/>
       </c:scatterChart>
       <c:valAx>
-        <c:axId val="286587728"/>
+        <c:axId val="351961136"/>
         <c:scaling>
           <c:logBase val="2"/>
           <c:orientation val="minMax"/>
@@ -274,14 +275,14 @@
         <c:majorTickMark val="out"/>
         <c:minorTickMark val="none"/>
         <c:tickLblPos val="nextTo"/>
-        <c:crossAx val="286591648"/>
+        <c:crossAx val="351966624"/>
         <c:crosses val="autoZero"/>
         <c:crossBetween val="midCat"/>
         <c:majorUnit val="4"/>
         <c:minorUnit val="4"/>
       </c:valAx>
       <c:valAx>
-        <c:axId val="286591648"/>
+        <c:axId val="351966624"/>
         <c:scaling>
           <c:logBase val="2"/>
           <c:orientation val="minMax"/>
@@ -294,7 +295,7 @@
         <c:majorTickMark val="out"/>
         <c:minorTickMark val="none"/>
         <c:tickLblPos val="nextTo"/>
-        <c:crossAx val="286587728"/>
+        <c:crossAx val="351961136"/>
         <c:crosses val="autoZero"/>
         <c:crossBetween val="midCat"/>
         <c:majorUnit val="4"/>
@@ -667,11 +668,11 @@
           <c:showPercent val="0"/>
           <c:showBubbleSize val="0"/>
         </c:dLbls>
-        <c:axId val="351864872"/>
-        <c:axId val="351865264"/>
+        <c:axId val="351960744"/>
+        <c:axId val="351962312"/>
       </c:scatterChart>
       <c:valAx>
-        <c:axId val="351864872"/>
+        <c:axId val="351960744"/>
         <c:scaling>
           <c:logBase val="2"/>
           <c:orientation val="minMax"/>
@@ -684,14 +685,14 @@
         <c:majorTickMark val="out"/>
         <c:minorTickMark val="none"/>
         <c:tickLblPos val="nextTo"/>
-        <c:crossAx val="351865264"/>
+        <c:crossAx val="351962312"/>
         <c:crosses val="autoZero"/>
         <c:crossBetween val="midCat"/>
         <c:majorUnit val="4"/>
         <c:minorUnit val="4"/>
       </c:valAx>
       <c:valAx>
-        <c:axId val="351865264"/>
+        <c:axId val="351962312"/>
         <c:scaling>
           <c:logBase val="2"/>
           <c:orientation val="minMax"/>
@@ -705,7 +706,7 @@
         <c:majorTickMark val="out"/>
         <c:minorTickMark val="none"/>
         <c:tickLblPos val="nextTo"/>
-        <c:crossAx val="351864872"/>
+        <c:crossAx val="351960744"/>
         <c:crosses val="autoZero"/>
         <c:crossBetween val="midCat"/>
         <c:majorUnit val="4"/>
@@ -918,11 +919,11 @@
           <c:showPercent val="0"/>
           <c:showBubbleSize val="0"/>
         </c:dLbls>
-        <c:axId val="351867224"/>
-        <c:axId val="351863696"/>
+        <c:axId val="351967408"/>
+        <c:axId val="281641496"/>
       </c:scatterChart>
       <c:valAx>
-        <c:axId val="351867224"/>
+        <c:axId val="351967408"/>
         <c:scaling>
           <c:logBase val="2"/>
           <c:orientation val="minMax"/>
@@ -935,13 +936,13 @@
         <c:majorTickMark val="out"/>
         <c:minorTickMark val="none"/>
         <c:tickLblPos val="nextTo"/>
-        <c:crossAx val="351863696"/>
+        <c:crossAx val="281641496"/>
         <c:crosses val="autoZero"/>
         <c:crossBetween val="midCat"/>
         <c:minorUnit val="4"/>
       </c:valAx>
       <c:valAx>
-        <c:axId val="351863696"/>
+        <c:axId val="281641496"/>
         <c:scaling>
           <c:logBase val="2"/>
           <c:orientation val="minMax"/>
@@ -955,7 +956,7 @@
         <c:majorTickMark val="out"/>
         <c:minorTickMark val="none"/>
         <c:tickLblPos val="nextTo"/>
-        <c:crossAx val="351867224"/>
+        <c:crossAx val="351967408"/>
         <c:crosses val="autoZero"/>
         <c:crossBetween val="midCat"/>
         <c:majorUnit val="2"/>
@@ -1086,11 +1087,11 @@
           <c:showPercent val="0"/>
           <c:showBubbleSize val="0"/>
         </c:dLbls>
-        <c:axId val="351865656"/>
-        <c:axId val="351866048"/>
+        <c:axId val="354369888"/>
+        <c:axId val="354375768"/>
       </c:scatterChart>
       <c:valAx>
-        <c:axId val="351865656"/>
+        <c:axId val="354369888"/>
         <c:scaling>
           <c:logBase val="2"/>
           <c:orientation val="minMax"/>
@@ -1103,13 +1104,13 @@
         <c:majorTickMark val="out"/>
         <c:minorTickMark val="none"/>
         <c:tickLblPos val="nextTo"/>
-        <c:crossAx val="351866048"/>
+        <c:crossAx val="354375768"/>
         <c:crosses val="autoZero"/>
         <c:crossBetween val="midCat"/>
         <c:majorUnit val="4"/>
       </c:valAx>
       <c:valAx>
-        <c:axId val="351866048"/>
+        <c:axId val="354375768"/>
         <c:scaling>
           <c:logBase val="2"/>
           <c:orientation val="minMax"/>
@@ -1122,7 +1123,7 @@
         <c:majorTickMark val="out"/>
         <c:minorTickMark val="none"/>
         <c:tickLblPos val="nextTo"/>
-        <c:crossAx val="351865656"/>
+        <c:crossAx val="354369888"/>
         <c:crosses val="autoZero"/>
         <c:crossBetween val="midCat"/>
         <c:majorUnit val="2"/>
@@ -1248,11 +1249,11 @@
           <c:showPercent val="0"/>
           <c:showBubbleSize val="0"/>
         </c:dLbls>
-        <c:axId val="351867616"/>
-        <c:axId val="351861736"/>
+        <c:axId val="354373024"/>
+        <c:axId val="354370280"/>
       </c:scatterChart>
       <c:valAx>
-        <c:axId val="351867616"/>
+        <c:axId val="354373024"/>
         <c:scaling>
           <c:logBase val="2"/>
           <c:orientation val="minMax"/>
@@ -1265,14 +1266,14 @@
         <c:majorTickMark val="out"/>
         <c:minorTickMark val="none"/>
         <c:tickLblPos val="nextTo"/>
-        <c:crossAx val="351861736"/>
+        <c:crossAx val="354370280"/>
         <c:crosses val="autoZero"/>
         <c:crossBetween val="midCat"/>
         <c:majorUnit val="4"/>
         <c:minorUnit val="4"/>
       </c:valAx>
       <c:valAx>
-        <c:axId val="351861736"/>
+        <c:axId val="354370280"/>
         <c:scaling>
           <c:orientation val="minMax"/>
           <c:max val="1"/>
@@ -1284,7 +1285,7 @@
         <c:majorTickMark val="out"/>
         <c:minorTickMark val="none"/>
         <c:tickLblPos val="nextTo"/>
-        <c:crossAx val="351867616"/>
+        <c:crossAx val="354373024"/>
         <c:crosses val="autoZero"/>
         <c:crossBetween val="midCat"/>
       </c:valAx>
@@ -6687,7 +6688,7 @@
           <a:graphicData uri="http://schemas.openxmlformats.org/presentationml/2006/ole">
             <mc:AlternateContent xmlns:mc="http://schemas.openxmlformats.org/markup-compatibility/2006">
               <mc:Choice xmlns:v="urn:schemas-microsoft-com:vml" Requires="v">
-                <p:oleObj spid="_x0000_s1070" name="Equation" r:id="rId3" imgW="812520" imgH="393480" progId="Equation.3">
+                <p:oleObj spid="_x0000_s1086" name="Equation" r:id="rId3" imgW="812520" imgH="393480" progId="Equation.3">
                   <p:embed/>
                 </p:oleObj>
               </mc:Choice>
@@ -6744,7 +6745,7 @@
           <a:graphicData uri="http://schemas.openxmlformats.org/presentationml/2006/ole">
             <mc:AlternateContent xmlns:mc="http://schemas.openxmlformats.org/markup-compatibility/2006">
               <mc:Choice xmlns:v="urn:schemas-microsoft-com:vml" Requires="v">
-                <p:oleObj spid="_x0000_s1071" name="Equation" r:id="rId5" imgW="2489040" imgH="431640" progId="Equation.3">
+                <p:oleObj spid="_x0000_s1087" name="Equation" r:id="rId5" imgW="2489040" imgH="431640" progId="Equation.3">
                   <p:embed/>
                 </p:oleObj>
               </mc:Choice>
@@ -13515,11 +13516,7 @@
           <a:p>
             <a:r>
               <a:rPr lang="en-US" dirty="0" smtClean="0"/>
-              <a:t>Memory hierarchy </a:t>
-            </a:r>
-            <a:r>
-              <a:rPr lang="en-US" dirty="0" smtClean="0"/>
-              <a:t>timings</a:t>
+              <a:t>Memory hierarchy timings</a:t>
             </a:r>
             <a:endParaRPr lang="en-US" dirty="0"/>
           </a:p>
@@ -13835,6 +13832,306 @@
           </a:p>
         </p:txBody>
       </p:sp>
+      <p:grpSp>
+        <p:nvGrpSpPr>
+          <p:cNvPr id="12" name="Group 11"/>
+          <p:cNvGrpSpPr/>
+          <p:nvPr/>
+        </p:nvGrpSpPr>
+        <p:grpSpPr>
+          <a:xfrm>
+            <a:off x="899592" y="1417638"/>
+            <a:ext cx="2520279" cy="4819674"/>
+            <a:chOff x="899592" y="1417638"/>
+            <a:chExt cx="2520279" cy="4819674"/>
+          </a:xfrm>
+        </p:grpSpPr>
+        <p:sp>
+          <p:nvSpPr>
+            <p:cNvPr id="4" name="Rectangle 3"/>
+            <p:cNvSpPr/>
+            <p:nvPr/>
+          </p:nvSpPr>
+          <p:spPr>
+            <a:xfrm>
+              <a:off x="899592" y="1417638"/>
+              <a:ext cx="2520279" cy="4819674"/>
+            </a:xfrm>
+            <a:prstGeom prst="rect">
+              <a:avLst/>
+            </a:prstGeom>
+            <a:solidFill>
+              <a:srgbClr val="4F81BD">
+                <a:alpha val="21176"/>
+              </a:srgbClr>
+            </a:solidFill>
+            <a:ln>
+              <a:noFill/>
+            </a:ln>
+          </p:spPr>
+          <p:style>
+            <a:lnRef idx="2">
+              <a:schemeClr val="accent1">
+                <a:shade val="50000"/>
+              </a:schemeClr>
+            </a:lnRef>
+            <a:fillRef idx="1">
+              <a:schemeClr val="accent1"/>
+            </a:fillRef>
+            <a:effectRef idx="0">
+              <a:schemeClr val="accent1"/>
+            </a:effectRef>
+            <a:fontRef idx="minor">
+              <a:schemeClr val="lt1"/>
+            </a:fontRef>
+          </p:style>
+          <p:txBody>
+            <a:bodyPr rtlCol="0" anchor="ctr"/>
+            <a:lstStyle/>
+            <a:p>
+              <a:pPr algn="ctr"/>
+              <a:endParaRPr lang="en-US"/>
+            </a:p>
+          </p:txBody>
+        </p:sp>
+        <p:sp>
+          <p:nvSpPr>
+            <p:cNvPr id="7" name="TextBox 6"/>
+            <p:cNvSpPr txBox="1"/>
+            <p:nvPr/>
+          </p:nvSpPr>
+          <p:spPr>
+            <a:xfrm>
+              <a:off x="1979712" y="1988840"/>
+              <a:ext cx="470000" cy="461665"/>
+            </a:xfrm>
+            <a:prstGeom prst="rect">
+              <a:avLst/>
+            </a:prstGeom>
+            <a:solidFill>
+              <a:schemeClr val="bg1"/>
+            </a:solidFill>
+            <a:ln>
+              <a:solidFill>
+                <a:schemeClr val="tx1"/>
+              </a:solidFill>
+            </a:ln>
+          </p:spPr>
+          <p:txBody>
+            <a:bodyPr wrap="none" rtlCol="0">
+              <a:spAutoFit/>
+            </a:bodyPr>
+            <a:lstStyle/>
+            <a:p>
+              <a:r>
+                <a:rPr lang="en-US" sz="2400" dirty="0" smtClean="0"/>
+                <a:t>L1</a:t>
+              </a:r>
+              <a:endParaRPr lang="en-US" sz="2400" dirty="0"/>
+            </a:p>
+          </p:txBody>
+        </p:sp>
+      </p:grpSp>
+      <p:grpSp>
+        <p:nvGrpSpPr>
+          <p:cNvPr id="13" name="Group 12"/>
+          <p:cNvGrpSpPr/>
+          <p:nvPr/>
+        </p:nvGrpSpPr>
+        <p:grpSpPr>
+          <a:xfrm>
+            <a:off x="3419872" y="1412776"/>
+            <a:ext cx="1351713" cy="4819674"/>
+            <a:chOff x="3419872" y="1412776"/>
+            <a:chExt cx="1351713" cy="4819674"/>
+          </a:xfrm>
+        </p:grpSpPr>
+        <p:sp>
+          <p:nvSpPr>
+            <p:cNvPr id="18" name="Rectangle 17"/>
+            <p:cNvSpPr/>
+            <p:nvPr/>
+          </p:nvSpPr>
+          <p:spPr>
+            <a:xfrm>
+              <a:off x="3419872" y="1412776"/>
+              <a:ext cx="1351713" cy="4819674"/>
+            </a:xfrm>
+            <a:prstGeom prst="rect">
+              <a:avLst/>
+            </a:prstGeom>
+            <a:solidFill>
+              <a:srgbClr val="C00000">
+                <a:alpha val="21176"/>
+              </a:srgbClr>
+            </a:solidFill>
+            <a:ln>
+              <a:noFill/>
+            </a:ln>
+          </p:spPr>
+          <p:style>
+            <a:lnRef idx="2">
+              <a:schemeClr val="accent1">
+                <a:shade val="50000"/>
+              </a:schemeClr>
+            </a:lnRef>
+            <a:fillRef idx="1">
+              <a:schemeClr val="accent1"/>
+            </a:fillRef>
+            <a:effectRef idx="0">
+              <a:schemeClr val="accent1"/>
+            </a:effectRef>
+            <a:fontRef idx="minor">
+              <a:schemeClr val="lt1"/>
+            </a:fontRef>
+          </p:style>
+          <p:txBody>
+            <a:bodyPr rtlCol="0" anchor="ctr"/>
+            <a:lstStyle/>
+            <a:p>
+              <a:pPr algn="ctr"/>
+              <a:endParaRPr lang="en-US"/>
+            </a:p>
+          </p:txBody>
+        </p:sp>
+        <p:sp>
+          <p:nvSpPr>
+            <p:cNvPr id="20" name="TextBox 19"/>
+            <p:cNvSpPr txBox="1"/>
+            <p:nvPr/>
+          </p:nvSpPr>
+          <p:spPr>
+            <a:xfrm>
+              <a:off x="3875585" y="1988840"/>
+              <a:ext cx="470000" cy="461665"/>
+            </a:xfrm>
+            <a:prstGeom prst="rect">
+              <a:avLst/>
+            </a:prstGeom>
+            <a:solidFill>
+              <a:schemeClr val="bg1"/>
+            </a:solidFill>
+            <a:ln>
+              <a:solidFill>
+                <a:schemeClr val="tx1"/>
+              </a:solidFill>
+            </a:ln>
+          </p:spPr>
+          <p:txBody>
+            <a:bodyPr wrap="none" rtlCol="0">
+              <a:spAutoFit/>
+            </a:bodyPr>
+            <a:lstStyle/>
+            <a:p>
+              <a:r>
+                <a:rPr lang="en-US" sz="2400" dirty="0" smtClean="0"/>
+                <a:t>L2</a:t>
+              </a:r>
+              <a:endParaRPr lang="en-US" sz="2400" dirty="0"/>
+            </a:p>
+          </p:txBody>
+        </p:sp>
+      </p:grpSp>
+      <p:grpSp>
+        <p:nvGrpSpPr>
+          <p:cNvPr id="22" name="Group 21"/>
+          <p:cNvGrpSpPr/>
+          <p:nvPr/>
+        </p:nvGrpSpPr>
+        <p:grpSpPr>
+          <a:xfrm>
+            <a:off x="4767242" y="1412776"/>
+            <a:ext cx="2808312" cy="4819674"/>
+            <a:chOff x="4767242" y="1412776"/>
+            <a:chExt cx="2808312" cy="4819674"/>
+          </a:xfrm>
+        </p:grpSpPr>
+        <p:sp>
+          <p:nvSpPr>
+            <p:cNvPr id="19" name="Rectangle 18"/>
+            <p:cNvSpPr/>
+            <p:nvPr/>
+          </p:nvSpPr>
+          <p:spPr>
+            <a:xfrm>
+              <a:off x="4767242" y="1412776"/>
+              <a:ext cx="2808312" cy="4819674"/>
+            </a:xfrm>
+            <a:prstGeom prst="rect">
+              <a:avLst/>
+            </a:prstGeom>
+            <a:solidFill>
+              <a:srgbClr val="00B050">
+                <a:alpha val="21176"/>
+              </a:srgbClr>
+            </a:solidFill>
+            <a:ln>
+              <a:noFill/>
+            </a:ln>
+          </p:spPr>
+          <p:style>
+            <a:lnRef idx="2">
+              <a:schemeClr val="accent1">
+                <a:shade val="50000"/>
+              </a:schemeClr>
+            </a:lnRef>
+            <a:fillRef idx="1">
+              <a:schemeClr val="accent1"/>
+            </a:fillRef>
+            <a:effectRef idx="0">
+              <a:schemeClr val="accent1"/>
+            </a:effectRef>
+            <a:fontRef idx="minor">
+              <a:schemeClr val="lt1"/>
+            </a:fontRef>
+          </p:style>
+          <p:txBody>
+            <a:bodyPr rtlCol="0" anchor="ctr"/>
+            <a:lstStyle/>
+            <a:p>
+              <a:pPr algn="ctr"/>
+              <a:endParaRPr lang="en-US"/>
+            </a:p>
+          </p:txBody>
+        </p:sp>
+        <p:sp>
+          <p:nvSpPr>
+            <p:cNvPr id="21" name="TextBox 20"/>
+            <p:cNvSpPr txBox="1"/>
+            <p:nvPr/>
+          </p:nvSpPr>
+          <p:spPr>
+            <a:xfrm>
+              <a:off x="5940152" y="1988840"/>
+              <a:ext cx="470000" cy="461665"/>
+            </a:xfrm>
+            <a:prstGeom prst="rect">
+              <a:avLst/>
+            </a:prstGeom>
+            <a:solidFill>
+              <a:schemeClr val="bg1"/>
+            </a:solidFill>
+            <a:ln>
+              <a:solidFill>
+                <a:schemeClr val="tx1"/>
+              </a:solidFill>
+            </a:ln>
+          </p:spPr>
+          <p:txBody>
+            <a:bodyPr wrap="none" rtlCol="0">
+              <a:spAutoFit/>
+            </a:bodyPr>
+            <a:lstStyle/>
+            <a:p>
+              <a:r>
+                <a:rPr lang="en-US" sz="2400" dirty="0" smtClean="0"/>
+                <a:t>L3</a:t>
+              </a:r>
+              <a:endParaRPr lang="en-US" sz="2400" dirty="0"/>
+            </a:p>
+          </p:txBody>
+        </p:sp>
+      </p:grpSp>
     </p:spTree>
     <p:extLst>
       <p:ext uri="{BB962C8B-B14F-4D97-AF65-F5344CB8AC3E}">
@@ -13924,7 +14221,7 @@
                                           </p:stCondLst>
                                         </p:cTn>
                                         <p:tgtEl>
-                                          <p:spTgt spid="9"/>
+                                          <p:spTgt spid="12"/>
                                         </p:tgtEl>
                                         <p:attrNameLst>
                                           <p:attrName>style.visibility</p:attrName>
@@ -13969,7 +14266,142 @@
                                           </p:stCondLst>
                                         </p:cTn>
                                         <p:tgtEl>
+                                          <p:spTgt spid="9"/>
+                                        </p:tgtEl>
+                                        <p:attrNameLst>
+                                          <p:attrName>style.visibility</p:attrName>
+                                        </p:attrNameLst>
+                                      </p:cBhvr>
+                                      <p:to>
+                                        <p:strVal val="visible"/>
+                                      </p:to>
+                                    </p:set>
+                                  </p:childTnLst>
+                                </p:cTn>
+                              </p:par>
+                            </p:childTnLst>
+                          </p:cTn>
+                        </p:par>
+                      </p:childTnLst>
+                    </p:cTn>
+                  </p:par>
+                  <p:par>
+                    <p:cTn id="15" fill="hold">
+                      <p:stCondLst>
+                        <p:cond delay="indefinite"/>
+                      </p:stCondLst>
+                      <p:childTnLst>
+                        <p:par>
+                          <p:cTn id="16" fill="hold">
+                            <p:stCondLst>
+                              <p:cond delay="0"/>
+                            </p:stCondLst>
+                            <p:childTnLst>
+                              <p:par>
+                                <p:cTn id="17" presetID="1" presetClass="entr" presetSubtype="0" fill="hold" nodeType="clickEffect">
+                                  <p:stCondLst>
+                                    <p:cond delay="0"/>
+                                  </p:stCondLst>
+                                  <p:childTnLst>
+                                    <p:set>
+                                      <p:cBhvr>
+                                        <p:cTn id="18" dur="1" fill="hold">
+                                          <p:stCondLst>
+                                            <p:cond delay="0"/>
+                                          </p:stCondLst>
+                                        </p:cTn>
+                                        <p:tgtEl>
+                                          <p:spTgt spid="13"/>
+                                        </p:tgtEl>
+                                        <p:attrNameLst>
+                                          <p:attrName>style.visibility</p:attrName>
+                                        </p:attrNameLst>
+                                      </p:cBhvr>
+                                      <p:to>
+                                        <p:strVal val="visible"/>
+                                      </p:to>
+                                    </p:set>
+                                  </p:childTnLst>
+                                </p:cTn>
+                              </p:par>
+                            </p:childTnLst>
+                          </p:cTn>
+                        </p:par>
+                      </p:childTnLst>
+                    </p:cTn>
+                  </p:par>
+                  <p:par>
+                    <p:cTn id="19" fill="hold">
+                      <p:stCondLst>
+                        <p:cond delay="indefinite"/>
+                      </p:stCondLst>
+                      <p:childTnLst>
+                        <p:par>
+                          <p:cTn id="20" fill="hold">
+                            <p:stCondLst>
+                              <p:cond delay="0"/>
+                            </p:stCondLst>
+                            <p:childTnLst>
+                              <p:par>
+                                <p:cTn id="21" presetID="1" presetClass="entr" presetSubtype="0" fill="hold" nodeType="clickEffect">
+                                  <p:stCondLst>
+                                    <p:cond delay="0"/>
+                                  </p:stCondLst>
+                                  <p:childTnLst>
+                                    <p:set>
+                                      <p:cBhvr>
+                                        <p:cTn id="22" dur="1" fill="hold">
+                                          <p:stCondLst>
+                                            <p:cond delay="0"/>
+                                          </p:stCondLst>
+                                        </p:cTn>
+                                        <p:tgtEl>
                                           <p:spTgt spid="14"/>
+                                        </p:tgtEl>
+                                        <p:attrNameLst>
+                                          <p:attrName>style.visibility</p:attrName>
+                                        </p:attrNameLst>
+                                      </p:cBhvr>
+                                      <p:to>
+                                        <p:strVal val="visible"/>
+                                      </p:to>
+                                    </p:set>
+                                  </p:childTnLst>
+                                </p:cTn>
+                              </p:par>
+                            </p:childTnLst>
+                          </p:cTn>
+                        </p:par>
+                      </p:childTnLst>
+                    </p:cTn>
+                  </p:par>
+                  <p:par>
+                    <p:cTn id="23" fill="hold">
+                      <p:stCondLst>
+                        <p:cond delay="indefinite"/>
+                      </p:stCondLst>
+                      <p:childTnLst>
+                        <p:par>
+                          <p:cTn id="24" fill="hold">
+                            <p:stCondLst>
+                              <p:cond delay="0"/>
+                            </p:stCondLst>
+                            <p:childTnLst>
+                              <p:par>
+                                <p:cTn id="25" presetID="1" presetClass="entr" presetSubtype="0" fill="hold" nodeType="clickEffect">
+                                  <p:stCondLst>
+                                    <p:cond delay="0"/>
+                                  </p:stCondLst>
+                                  <p:childTnLst>
+                                    <p:set>
+                                      <p:cBhvr>
+                                        <p:cTn id="26" dur="1" fill="hold">
+                                          <p:stCondLst>
+                                            <p:cond delay="0"/>
+                                          </p:stCondLst>
+                                        </p:cTn>
+                                        <p:tgtEl>
+                                          <p:spTgt spid="22"/>
                                         </p:tgtEl>
                                         <p:attrNameLst>
                                           <p:attrName>style.visibility</p:attrName>
@@ -14276,11 +14708,7 @@
             <a:pPr lvl="1"/>
             <a:r>
               <a:rPr lang="en-US" dirty="0" smtClean="0"/>
-              <a:t>access to contiguous </a:t>
-            </a:r>
-            <a:r>
-              <a:rPr lang="en-US" dirty="0" smtClean="0"/>
-              <a:t>data</a:t>
+              <a:t>access to contiguous data</a:t>
             </a:r>
             <a:endParaRPr lang="en-US" dirty="0"/>
           </a:p>
@@ -15666,25 +16094,6 @@
       </p:sp>
       <p:sp>
         <p:nvSpPr>
-          <p:cNvPr id="3" name="Content Placeholder 2"/>
-          <p:cNvSpPr>
-            <a:spLocks noGrp="1"/>
-          </p:cNvSpPr>
-          <p:nvPr>
-            <p:ph idx="1"/>
-          </p:nvPr>
-        </p:nvSpPr>
-        <p:spPr/>
-        <p:txBody>
-          <a:bodyPr/>
-          <a:lstStyle/>
-          <a:p>
-            <a:endParaRPr lang="en-US"/>
-          </a:p>
-        </p:txBody>
-      </p:sp>
-      <p:sp>
-        <p:nvSpPr>
           <p:cNvPr id="4" name="Slide Number Placeholder 3"/>
           <p:cNvSpPr>
             <a:spLocks noGrp="1"/>
@@ -15706,6 +16115,659 @@
           </a:p>
         </p:txBody>
       </p:sp>
+      <p:pic>
+        <p:nvPicPr>
+          <p:cNvPr id="5" name="Picture 4"/>
+          <p:cNvPicPr>
+            <a:picLocks noChangeAspect="1"/>
+          </p:cNvPicPr>
+          <p:nvPr/>
+        </p:nvPicPr>
+        <p:blipFill>
+          <a:blip r:embed="rId2">
+            <a:extLst>
+              <a:ext uri="{28A0092B-C50C-407E-A947-70E740481C1C}">
+                <a14:useLocalDpi xmlns:a14="http://schemas.microsoft.com/office/drawing/2010/main" val="0"/>
+              </a:ext>
+            </a:extLst>
+          </a:blip>
+          <a:stretch>
+            <a:fillRect/>
+          </a:stretch>
+        </p:blipFill>
+        <p:spPr>
+          <a:xfrm>
+            <a:off x="323528" y="1061620"/>
+            <a:ext cx="8213003" cy="5659855"/>
+          </a:xfrm>
+          <a:prstGeom prst="rect">
+            <a:avLst/>
+          </a:prstGeom>
+        </p:spPr>
+      </p:pic>
+      <p:grpSp>
+        <p:nvGrpSpPr>
+          <p:cNvPr id="7" name="Group 6"/>
+          <p:cNvGrpSpPr/>
+          <p:nvPr/>
+        </p:nvGrpSpPr>
+        <p:grpSpPr>
+          <a:xfrm>
+            <a:off x="2339752" y="2060848"/>
+            <a:ext cx="1440160" cy="856597"/>
+            <a:chOff x="2267744" y="4309887"/>
+            <a:chExt cx="1440160" cy="856597"/>
+          </a:xfrm>
+        </p:grpSpPr>
+        <p:cxnSp>
+          <p:nvCxnSpPr>
+            <p:cNvPr id="8" name="Straight Arrow Connector 7"/>
+            <p:cNvCxnSpPr>
+              <a:stCxn id="9" idx="3"/>
+            </p:cNvCxnSpPr>
+            <p:nvPr/>
+          </p:nvCxnSpPr>
+          <p:spPr>
+            <a:xfrm flipV="1">
+              <a:off x="3273789" y="4309887"/>
+              <a:ext cx="434115" cy="671931"/>
+            </a:xfrm>
+            <a:prstGeom prst="straightConnector1">
+              <a:avLst/>
+            </a:prstGeom>
+            <a:ln w="38100">
+              <a:solidFill>
+                <a:schemeClr val="tx1"/>
+              </a:solidFill>
+              <a:tailEnd type="stealth"/>
+            </a:ln>
+          </p:spPr>
+          <p:style>
+            <a:lnRef idx="1">
+              <a:schemeClr val="accent1"/>
+            </a:lnRef>
+            <a:fillRef idx="0">
+              <a:schemeClr val="accent1"/>
+            </a:fillRef>
+            <a:effectRef idx="0">
+              <a:schemeClr val="accent1"/>
+            </a:effectRef>
+            <a:fontRef idx="minor">
+              <a:schemeClr val="tx1"/>
+            </a:fontRef>
+          </p:style>
+        </p:cxnSp>
+        <p:sp>
+          <p:nvSpPr>
+            <p:cNvPr id="9" name="TextBox 8"/>
+            <p:cNvSpPr txBox="1"/>
+            <p:nvPr/>
+          </p:nvSpPr>
+          <p:spPr>
+            <a:xfrm>
+              <a:off x="2267744" y="4797152"/>
+              <a:ext cx="1006045" cy="369332"/>
+            </a:xfrm>
+            <a:prstGeom prst="rect">
+              <a:avLst/>
+            </a:prstGeom>
+            <a:noFill/>
+          </p:spPr>
+          <p:txBody>
+            <a:bodyPr wrap="none" rtlCol="0">
+              <a:spAutoFit/>
+            </a:bodyPr>
+            <a:lstStyle/>
+            <a:p>
+              <a:r>
+                <a:rPr lang="en-US" dirty="0" smtClean="0"/>
+                <a:t>stride 16</a:t>
+              </a:r>
+              <a:endParaRPr lang="en-US" dirty="0"/>
+            </a:p>
+          </p:txBody>
+        </p:sp>
+      </p:grpSp>
+      <p:sp>
+        <p:nvSpPr>
+          <p:cNvPr id="25" name="Rectangle 24"/>
+          <p:cNvSpPr/>
+          <p:nvPr/>
+        </p:nvSpPr>
+        <p:spPr>
+          <a:xfrm>
+            <a:off x="806802" y="1227924"/>
+            <a:ext cx="3041648" cy="5009387"/>
+          </a:xfrm>
+          <a:prstGeom prst="rect">
+            <a:avLst/>
+          </a:prstGeom>
+          <a:solidFill>
+            <a:srgbClr val="C00000">
+              <a:alpha val="14118"/>
+            </a:srgbClr>
+          </a:solidFill>
+          <a:ln>
+            <a:noFill/>
+          </a:ln>
+        </p:spPr>
+        <p:style>
+          <a:lnRef idx="2">
+            <a:schemeClr val="accent1">
+              <a:shade val="50000"/>
+            </a:schemeClr>
+          </a:lnRef>
+          <a:fillRef idx="1">
+            <a:schemeClr val="accent1"/>
+          </a:fillRef>
+          <a:effectRef idx="0">
+            <a:schemeClr val="accent1"/>
+          </a:effectRef>
+          <a:fontRef idx="minor">
+            <a:schemeClr val="lt1"/>
+          </a:fontRef>
+        </p:style>
+        <p:txBody>
+          <a:bodyPr rtlCol="0" anchor="ctr"/>
+          <a:lstStyle/>
+          <a:p>
+            <a:pPr algn="ctr"/>
+            <a:endParaRPr lang="en-US"/>
+          </a:p>
+        </p:txBody>
+      </p:sp>
+      <p:grpSp>
+        <p:nvGrpSpPr>
+          <p:cNvPr id="16" name="Group 15"/>
+          <p:cNvGrpSpPr/>
+          <p:nvPr/>
+        </p:nvGrpSpPr>
+        <p:grpSpPr>
+          <a:xfrm>
+            <a:off x="817193" y="1567377"/>
+            <a:ext cx="2962719" cy="2639609"/>
+            <a:chOff x="817193" y="1567377"/>
+            <a:chExt cx="2962719" cy="2639609"/>
+          </a:xfrm>
+        </p:grpSpPr>
+        <p:sp>
+          <p:nvSpPr>
+            <p:cNvPr id="11" name="TextBox 10"/>
+            <p:cNvSpPr txBox="1"/>
+            <p:nvPr/>
+          </p:nvSpPr>
+          <p:spPr>
+            <a:xfrm>
+              <a:off x="1173079" y="3375989"/>
+              <a:ext cx="2334357" cy="830997"/>
+            </a:xfrm>
+            <a:prstGeom prst="rect">
+              <a:avLst/>
+            </a:prstGeom>
+            <a:noFill/>
+            <a:ln>
+              <a:solidFill>
+                <a:schemeClr val="tx1"/>
+              </a:solidFill>
+            </a:ln>
+          </p:spPr>
+          <p:txBody>
+            <a:bodyPr wrap="none" rtlCol="0">
+              <a:spAutoFit/>
+            </a:bodyPr>
+            <a:lstStyle/>
+            <a:p>
+              <a:r>
+                <a:rPr lang="en-US" sz="2400" dirty="0" smtClean="0"/>
+                <a:t>less work, almost</a:t>
+              </a:r>
+              <a:br>
+                <a:rPr lang="en-US" sz="2400" dirty="0" smtClean="0"/>
+              </a:br>
+              <a:r>
+                <a:rPr lang="en-US" sz="2400" dirty="0" smtClean="0"/>
+                <a:t>equal time!</a:t>
+              </a:r>
+              <a:endParaRPr lang="en-US" sz="2400" dirty="0"/>
+            </a:p>
+          </p:txBody>
+        </p:sp>
+        <p:cxnSp>
+          <p:nvCxnSpPr>
+            <p:cNvPr id="13" name="Straight Connector 12"/>
+            <p:cNvCxnSpPr/>
+            <p:nvPr/>
+          </p:nvCxnSpPr>
+          <p:spPr>
+            <a:xfrm flipH="1" flipV="1">
+              <a:off x="817193" y="1567377"/>
+              <a:ext cx="360040" cy="1808612"/>
+            </a:xfrm>
+            <a:prstGeom prst="line">
+              <a:avLst/>
+            </a:prstGeom>
+            <a:ln>
+              <a:solidFill>
+                <a:schemeClr val="tx1"/>
+              </a:solidFill>
+              <a:prstDash val="sysDot"/>
+            </a:ln>
+          </p:spPr>
+          <p:style>
+            <a:lnRef idx="1">
+              <a:schemeClr val="accent1"/>
+            </a:lnRef>
+            <a:fillRef idx="0">
+              <a:schemeClr val="accent1"/>
+            </a:fillRef>
+            <a:effectRef idx="0">
+              <a:schemeClr val="accent1"/>
+            </a:effectRef>
+            <a:fontRef idx="minor">
+              <a:schemeClr val="tx1"/>
+            </a:fontRef>
+          </p:style>
+        </p:cxnSp>
+        <p:cxnSp>
+          <p:nvCxnSpPr>
+            <p:cNvPr id="15" name="Straight Connector 14"/>
+            <p:cNvCxnSpPr/>
+            <p:nvPr/>
+          </p:nvCxnSpPr>
+          <p:spPr>
+            <a:xfrm flipV="1">
+              <a:off x="3507436" y="1935796"/>
+              <a:ext cx="272476" cy="1440193"/>
+            </a:xfrm>
+            <a:prstGeom prst="line">
+              <a:avLst/>
+            </a:prstGeom>
+            <a:ln>
+              <a:solidFill>
+                <a:schemeClr val="tx1"/>
+              </a:solidFill>
+              <a:prstDash val="sysDot"/>
+            </a:ln>
+          </p:spPr>
+          <p:style>
+            <a:lnRef idx="1">
+              <a:schemeClr val="accent1"/>
+            </a:lnRef>
+            <a:fillRef idx="0">
+              <a:schemeClr val="accent1"/>
+            </a:fillRef>
+            <a:effectRef idx="0">
+              <a:schemeClr val="accent1"/>
+            </a:effectRef>
+            <a:fontRef idx="minor">
+              <a:schemeClr val="tx1"/>
+            </a:fontRef>
+          </p:style>
+        </p:cxnSp>
+      </p:grpSp>
+      <p:sp>
+        <p:nvSpPr>
+          <p:cNvPr id="17" name="TextBox 16"/>
+          <p:cNvSpPr txBox="1"/>
+          <p:nvPr/>
+        </p:nvSpPr>
+        <p:spPr>
+          <a:xfrm>
+            <a:off x="1173078" y="4365104"/>
+            <a:ext cx="2334357" cy="1569660"/>
+          </a:xfrm>
+          <a:prstGeom prst="rect">
+            <a:avLst/>
+          </a:prstGeom>
+          <a:solidFill>
+            <a:schemeClr val="bg1"/>
+          </a:solidFill>
+          <a:ln>
+            <a:solidFill>
+              <a:schemeClr val="tx1"/>
+            </a:solidFill>
+          </a:ln>
+        </p:spPr>
+        <p:txBody>
+          <a:bodyPr wrap="square" rtlCol="0">
+            <a:spAutoFit/>
+          </a:bodyPr>
+          <a:lstStyle/>
+          <a:p>
+            <a:r>
+              <a:rPr lang="en-US" sz="2400" dirty="0" smtClean="0"/>
+              <a:t>memory bound,</a:t>
+            </a:r>
+          </a:p>
+          <a:p>
+            <a:r>
+              <a:rPr lang="en-US" sz="2400" dirty="0" smtClean="0"/>
+              <a:t>equal number</a:t>
+            </a:r>
+          </a:p>
+          <a:p>
+            <a:r>
+              <a:rPr lang="en-US" sz="2400" dirty="0" smtClean="0"/>
+              <a:t>of cache lines</a:t>
+            </a:r>
+          </a:p>
+          <a:p>
+            <a:r>
+              <a:rPr lang="en-US" sz="2400" dirty="0" smtClean="0"/>
+              <a:t>to fetch</a:t>
+            </a:r>
+            <a:endParaRPr lang="en-US" sz="2400" dirty="0"/>
+          </a:p>
+        </p:txBody>
+      </p:sp>
+      <p:sp>
+        <p:nvSpPr>
+          <p:cNvPr id="26" name="Rectangle 25"/>
+          <p:cNvSpPr/>
+          <p:nvPr/>
+        </p:nvSpPr>
+        <p:spPr>
+          <a:xfrm>
+            <a:off x="3848450" y="1227924"/>
+            <a:ext cx="4495450" cy="5009387"/>
+          </a:xfrm>
+          <a:prstGeom prst="rect">
+            <a:avLst/>
+          </a:prstGeom>
+          <a:solidFill>
+            <a:srgbClr val="00B050">
+              <a:alpha val="14118"/>
+            </a:srgbClr>
+          </a:solidFill>
+          <a:ln>
+            <a:noFill/>
+          </a:ln>
+        </p:spPr>
+        <p:style>
+          <a:lnRef idx="2">
+            <a:schemeClr val="accent1">
+              <a:shade val="50000"/>
+            </a:schemeClr>
+          </a:lnRef>
+          <a:fillRef idx="1">
+            <a:schemeClr val="accent1"/>
+          </a:fillRef>
+          <a:effectRef idx="0">
+            <a:schemeClr val="accent1"/>
+          </a:effectRef>
+          <a:fontRef idx="minor">
+            <a:schemeClr val="lt1"/>
+          </a:fontRef>
+        </p:style>
+        <p:txBody>
+          <a:bodyPr rtlCol="0" anchor="ctr"/>
+          <a:lstStyle/>
+          <a:p>
+            <a:pPr algn="ctr"/>
+            <a:endParaRPr lang="en-US"/>
+          </a:p>
+        </p:txBody>
+      </p:sp>
+      <p:sp>
+        <p:nvSpPr>
+          <p:cNvPr id="6" name="TextBox 5"/>
+          <p:cNvSpPr txBox="1"/>
+          <p:nvPr/>
+        </p:nvSpPr>
+        <p:spPr>
+          <a:xfrm>
+            <a:off x="4752025" y="1417638"/>
+            <a:ext cx="4185761" cy="1323439"/>
+          </a:xfrm>
+          <a:prstGeom prst="rect">
+            <a:avLst/>
+          </a:prstGeom>
+          <a:solidFill>
+            <a:schemeClr val="bg1">
+              <a:lumMod val="75000"/>
+            </a:schemeClr>
+          </a:solidFill>
+          <a:ln>
+            <a:solidFill>
+              <a:schemeClr val="tx1"/>
+            </a:solidFill>
+          </a:ln>
+        </p:spPr>
+        <p:txBody>
+          <a:bodyPr wrap="none" rtlCol="0">
+            <a:spAutoFit/>
+          </a:bodyPr>
+          <a:lstStyle/>
+          <a:p>
+            <a:r>
+              <a:rPr lang="en-US" sz="2000" dirty="0" err="1" smtClean="0">
+                <a:latin typeface="Courier New" panose="02070309020205020404" pitchFamily="49" charset="0"/>
+                <a:cs typeface="Courier New" panose="02070309020205020404" pitchFamily="49" charset="0"/>
+              </a:rPr>
+              <a:t>int</a:t>
+            </a:r>
+            <a:r>
+              <a:rPr lang="en-US" sz="2000" dirty="0" smtClean="0">
+                <a:latin typeface="Courier New" panose="02070309020205020404" pitchFamily="49" charset="0"/>
+                <a:cs typeface="Courier New" panose="02070309020205020404" pitchFamily="49" charset="0"/>
+              </a:rPr>
+              <a:t> a[n</a:t>
+            </a:r>
+            <a:r>
+              <a:rPr lang="en-US" sz="2000" dirty="0" smtClean="0">
+                <a:latin typeface="Courier New" panose="02070309020205020404" pitchFamily="49" charset="0"/>
+                <a:cs typeface="Courier New" panose="02070309020205020404" pitchFamily="49" charset="0"/>
+              </a:rPr>
+              <a:t>];</a:t>
+            </a:r>
+          </a:p>
+          <a:p>
+            <a:r>
+              <a:rPr lang="en-US" sz="2000" dirty="0" smtClean="0">
+                <a:latin typeface="Courier New" panose="02070309020205020404" pitchFamily="49" charset="0"/>
+                <a:cs typeface="Courier New" panose="02070309020205020404" pitchFamily="49" charset="0"/>
+              </a:rPr>
+              <a:t>…</a:t>
+            </a:r>
+          </a:p>
+          <a:p>
+            <a:r>
+              <a:rPr lang="en-US" sz="2000" dirty="0" smtClean="0">
+                <a:latin typeface="Courier New" panose="02070309020205020404" pitchFamily="49" charset="0"/>
+                <a:cs typeface="Courier New" panose="02070309020205020404" pitchFamily="49" charset="0"/>
+              </a:rPr>
+              <a:t>for (</a:t>
+            </a:r>
+            <a:r>
+              <a:rPr lang="en-US" sz="2000" dirty="0" err="1" smtClean="0">
+                <a:latin typeface="Courier New" panose="02070309020205020404" pitchFamily="49" charset="0"/>
+                <a:cs typeface="Courier New" panose="02070309020205020404" pitchFamily="49" charset="0"/>
+              </a:rPr>
+              <a:t>i</a:t>
+            </a:r>
+            <a:r>
+              <a:rPr lang="en-US" sz="2000" dirty="0" smtClean="0">
+                <a:latin typeface="Courier New" panose="02070309020205020404" pitchFamily="49" charset="0"/>
+                <a:cs typeface="Courier New" panose="02070309020205020404" pitchFamily="49" charset="0"/>
+              </a:rPr>
+              <a:t> = 0; </a:t>
+            </a:r>
+            <a:r>
+              <a:rPr lang="en-US" sz="2000" dirty="0" err="1" smtClean="0">
+                <a:latin typeface="Courier New" panose="02070309020205020404" pitchFamily="49" charset="0"/>
+                <a:cs typeface="Courier New" panose="02070309020205020404" pitchFamily="49" charset="0"/>
+              </a:rPr>
+              <a:t>i</a:t>
+            </a:r>
+            <a:r>
+              <a:rPr lang="en-US" sz="2000" dirty="0">
+                <a:latin typeface="Courier New" panose="02070309020205020404" pitchFamily="49" charset="0"/>
+                <a:cs typeface="Courier New" panose="02070309020205020404" pitchFamily="49" charset="0"/>
+              </a:rPr>
+              <a:t> </a:t>
+            </a:r>
+            <a:r>
+              <a:rPr lang="en-US" sz="2000" dirty="0" smtClean="0">
+                <a:latin typeface="Courier New" panose="02070309020205020404" pitchFamily="49" charset="0"/>
+                <a:cs typeface="Courier New" panose="02070309020205020404" pitchFamily="49" charset="0"/>
+              </a:rPr>
+              <a:t>&lt; n; </a:t>
+            </a:r>
+            <a:r>
+              <a:rPr lang="en-US" sz="2000" dirty="0" err="1">
+                <a:latin typeface="Courier New" panose="02070309020205020404" pitchFamily="49" charset="0"/>
+                <a:cs typeface="Courier New" panose="02070309020205020404" pitchFamily="49" charset="0"/>
+              </a:rPr>
+              <a:t>i</a:t>
+            </a:r>
+            <a:r>
+              <a:rPr lang="en-US" sz="2000" dirty="0" smtClean="0">
+                <a:latin typeface="Courier New" panose="02070309020205020404" pitchFamily="49" charset="0"/>
+                <a:cs typeface="Courier New" panose="02070309020205020404" pitchFamily="49" charset="0"/>
+              </a:rPr>
+              <a:t> += K)</a:t>
+            </a:r>
+            <a:endParaRPr lang="en-US" sz="2000" dirty="0" smtClean="0">
+              <a:latin typeface="Courier New" panose="02070309020205020404" pitchFamily="49" charset="0"/>
+              <a:cs typeface="Courier New" panose="02070309020205020404" pitchFamily="49" charset="0"/>
+            </a:endParaRPr>
+          </a:p>
+          <a:p>
+            <a:r>
+              <a:rPr lang="en-US" sz="2000" dirty="0">
+                <a:latin typeface="Courier New" panose="02070309020205020404" pitchFamily="49" charset="0"/>
+                <a:cs typeface="Courier New" panose="02070309020205020404" pitchFamily="49" charset="0"/>
+              </a:rPr>
+              <a:t> </a:t>
+            </a:r>
+            <a:r>
+              <a:rPr lang="en-US" sz="2000" dirty="0" smtClean="0">
+                <a:latin typeface="Courier New" panose="02070309020205020404" pitchFamily="49" charset="0"/>
+                <a:cs typeface="Courier New" panose="02070309020205020404" pitchFamily="49" charset="0"/>
+              </a:rPr>
+              <a:t>   </a:t>
+            </a:r>
+            <a:r>
+              <a:rPr lang="en-US" sz="2000" dirty="0" smtClean="0">
+                <a:latin typeface="Courier New" panose="02070309020205020404" pitchFamily="49" charset="0"/>
+                <a:cs typeface="Courier New" panose="02070309020205020404" pitchFamily="49" charset="0"/>
+              </a:rPr>
+              <a:t>a[</a:t>
+            </a:r>
+            <a:r>
+              <a:rPr lang="en-US" sz="2000" dirty="0" err="1" smtClean="0">
+                <a:latin typeface="Courier New" panose="02070309020205020404" pitchFamily="49" charset="0"/>
+                <a:cs typeface="Courier New" panose="02070309020205020404" pitchFamily="49" charset="0"/>
+              </a:rPr>
+              <a:t>i</a:t>
+            </a:r>
+            <a:r>
+              <a:rPr lang="en-US" sz="2000" dirty="0" smtClean="0">
+                <a:latin typeface="Courier New" panose="02070309020205020404" pitchFamily="49" charset="0"/>
+                <a:cs typeface="Courier New" panose="02070309020205020404" pitchFamily="49" charset="0"/>
+              </a:rPr>
+              <a:t>] *= 3</a:t>
+            </a:r>
+            <a:endParaRPr lang="en-US" sz="1600" dirty="0" smtClean="0">
+              <a:latin typeface="Courier New" panose="02070309020205020404" pitchFamily="49" charset="0"/>
+              <a:cs typeface="Courier New" panose="02070309020205020404" pitchFamily="49" charset="0"/>
+            </a:endParaRPr>
+          </a:p>
+        </p:txBody>
+      </p:sp>
+      <p:grpSp>
+        <p:nvGrpSpPr>
+          <p:cNvPr id="18" name="Group 17"/>
+          <p:cNvGrpSpPr/>
+          <p:nvPr/>
+        </p:nvGrpSpPr>
+        <p:grpSpPr>
+          <a:xfrm>
+            <a:off x="3848450" y="2060848"/>
+            <a:ext cx="3061645" cy="3839453"/>
+            <a:chOff x="609916" y="367533"/>
+            <a:chExt cx="3143228" cy="3839453"/>
+          </a:xfrm>
+        </p:grpSpPr>
+        <p:sp>
+          <p:nvSpPr>
+            <p:cNvPr id="19" name="TextBox 18"/>
+            <p:cNvSpPr txBox="1"/>
+            <p:nvPr/>
+          </p:nvSpPr>
+          <p:spPr>
+            <a:xfrm>
+              <a:off x="1173079" y="3375989"/>
+              <a:ext cx="2580065" cy="830997"/>
+            </a:xfrm>
+            <a:prstGeom prst="rect">
+              <a:avLst/>
+            </a:prstGeom>
+            <a:noFill/>
+            <a:ln>
+              <a:solidFill>
+                <a:schemeClr val="tx1"/>
+              </a:solidFill>
+            </a:ln>
+          </p:spPr>
+          <p:txBody>
+            <a:bodyPr wrap="none" rtlCol="0">
+              <a:spAutoFit/>
+            </a:bodyPr>
+            <a:lstStyle/>
+            <a:p>
+              <a:r>
+                <a:rPr lang="en-US" sz="2400" dirty="0" smtClean="0"/>
+                <a:t>less work, less</a:t>
+              </a:r>
+              <a:br>
+                <a:rPr lang="en-US" sz="2400" dirty="0" smtClean="0"/>
+              </a:br>
+              <a:r>
+                <a:rPr lang="en-US" sz="2400" dirty="0" smtClean="0"/>
+                <a:t>cache lines to fetch</a:t>
+              </a:r>
+              <a:endParaRPr lang="en-US" sz="2400" dirty="0"/>
+            </a:p>
+          </p:txBody>
+        </p:sp>
+        <p:cxnSp>
+          <p:nvCxnSpPr>
+            <p:cNvPr id="20" name="Straight Connector 19"/>
+            <p:cNvCxnSpPr/>
+            <p:nvPr/>
+          </p:nvCxnSpPr>
+          <p:spPr>
+            <a:xfrm flipH="1" flipV="1">
+              <a:off x="609916" y="367533"/>
+              <a:ext cx="567317" cy="3008457"/>
+            </a:xfrm>
+            <a:prstGeom prst="line">
+              <a:avLst/>
+            </a:prstGeom>
+            <a:ln>
+              <a:solidFill>
+                <a:schemeClr val="tx1"/>
+              </a:solidFill>
+              <a:prstDash val="sysDot"/>
+            </a:ln>
+          </p:spPr>
+          <p:style>
+            <a:lnRef idx="1">
+              <a:schemeClr val="accent1"/>
+            </a:lnRef>
+            <a:fillRef idx="0">
+              <a:schemeClr val="accent1"/>
+            </a:fillRef>
+            <a:effectRef idx="0">
+              <a:schemeClr val="accent1"/>
+            </a:effectRef>
+            <a:fontRef idx="minor">
+              <a:schemeClr val="tx1"/>
+            </a:fontRef>
+          </p:style>
+        </p:cxnSp>
+      </p:grpSp>
     </p:spTree>
     <p:extLst>
       <p:ext uri="{BB962C8B-B14F-4D97-AF65-F5344CB8AC3E}">
@@ -15719,9 +16781,271 @@
   <p:timing>
     <p:tnLst>
       <p:par>
-        <p:cTn id="1" dur="indefinite" restart="never" nodeType="tmRoot"/>
+        <p:cTn id="1" dur="indefinite" restart="never" nodeType="tmRoot">
+          <p:childTnLst>
+            <p:seq concurrent="1" nextAc="seek">
+              <p:cTn id="2" dur="indefinite" nodeType="mainSeq">
+                <p:childTnLst>
+                  <p:par>
+                    <p:cTn id="3" fill="hold">
+                      <p:stCondLst>
+                        <p:cond delay="indefinite"/>
+                      </p:stCondLst>
+                      <p:childTnLst>
+                        <p:par>
+                          <p:cTn id="4" fill="hold">
+                            <p:stCondLst>
+                              <p:cond delay="0"/>
+                            </p:stCondLst>
+                            <p:childTnLst>
+                              <p:par>
+                                <p:cTn id="5" presetID="1" presetClass="entr" presetSubtype="0" fill="hold" nodeType="clickEffect">
+                                  <p:stCondLst>
+                                    <p:cond delay="0"/>
+                                  </p:stCondLst>
+                                  <p:childTnLst>
+                                    <p:set>
+                                      <p:cBhvr>
+                                        <p:cTn id="6" dur="1" fill="hold">
+                                          <p:stCondLst>
+                                            <p:cond delay="0"/>
+                                          </p:stCondLst>
+                                        </p:cTn>
+                                        <p:tgtEl>
+                                          <p:spTgt spid="16"/>
+                                        </p:tgtEl>
+                                        <p:attrNameLst>
+                                          <p:attrName>style.visibility</p:attrName>
+                                        </p:attrNameLst>
+                                      </p:cBhvr>
+                                      <p:to>
+                                        <p:strVal val="visible"/>
+                                      </p:to>
+                                    </p:set>
+                                  </p:childTnLst>
+                                </p:cTn>
+                              </p:par>
+                              <p:par>
+                                <p:cTn id="7" presetID="1" presetClass="entr" presetSubtype="0" fill="hold" grpId="0" nodeType="withEffect">
+                                  <p:stCondLst>
+                                    <p:cond delay="0"/>
+                                  </p:stCondLst>
+                                  <p:childTnLst>
+                                    <p:set>
+                                      <p:cBhvr>
+                                        <p:cTn id="8" dur="1" fill="hold">
+                                          <p:stCondLst>
+                                            <p:cond delay="0"/>
+                                          </p:stCondLst>
+                                        </p:cTn>
+                                        <p:tgtEl>
+                                          <p:spTgt spid="25"/>
+                                        </p:tgtEl>
+                                        <p:attrNameLst>
+                                          <p:attrName>style.visibility</p:attrName>
+                                        </p:attrNameLst>
+                                      </p:cBhvr>
+                                      <p:to>
+                                        <p:strVal val="visible"/>
+                                      </p:to>
+                                    </p:set>
+                                  </p:childTnLst>
+                                </p:cTn>
+                              </p:par>
+                            </p:childTnLst>
+                          </p:cTn>
+                        </p:par>
+                      </p:childTnLst>
+                    </p:cTn>
+                  </p:par>
+                  <p:par>
+                    <p:cTn id="9" fill="hold">
+                      <p:stCondLst>
+                        <p:cond delay="indefinite"/>
+                      </p:stCondLst>
+                      <p:childTnLst>
+                        <p:par>
+                          <p:cTn id="10" fill="hold">
+                            <p:stCondLst>
+                              <p:cond delay="0"/>
+                            </p:stCondLst>
+                            <p:childTnLst>
+                              <p:par>
+                                <p:cTn id="11" presetID="1" presetClass="entr" presetSubtype="0" fill="hold" nodeType="clickEffect">
+                                  <p:stCondLst>
+                                    <p:cond delay="0"/>
+                                  </p:stCondLst>
+                                  <p:childTnLst>
+                                    <p:set>
+                                      <p:cBhvr>
+                                        <p:cTn id="12" dur="1" fill="hold">
+                                          <p:stCondLst>
+                                            <p:cond delay="0"/>
+                                          </p:stCondLst>
+                                        </p:cTn>
+                                        <p:tgtEl>
+                                          <p:spTgt spid="7"/>
+                                        </p:tgtEl>
+                                        <p:attrNameLst>
+                                          <p:attrName>style.visibility</p:attrName>
+                                        </p:attrNameLst>
+                                      </p:cBhvr>
+                                      <p:to>
+                                        <p:strVal val="visible"/>
+                                      </p:to>
+                                    </p:set>
+                                  </p:childTnLst>
+                                </p:cTn>
+                              </p:par>
+                            </p:childTnLst>
+                          </p:cTn>
+                        </p:par>
+                      </p:childTnLst>
+                    </p:cTn>
+                  </p:par>
+                  <p:par>
+                    <p:cTn id="13" fill="hold">
+                      <p:stCondLst>
+                        <p:cond delay="indefinite"/>
+                      </p:stCondLst>
+                      <p:childTnLst>
+                        <p:par>
+                          <p:cTn id="14" fill="hold">
+                            <p:stCondLst>
+                              <p:cond delay="0"/>
+                            </p:stCondLst>
+                            <p:childTnLst>
+                              <p:par>
+                                <p:cTn id="15" presetID="1" presetClass="entr" presetSubtype="0" fill="hold" grpId="0" nodeType="clickEffect">
+                                  <p:stCondLst>
+                                    <p:cond delay="0"/>
+                                  </p:stCondLst>
+                                  <p:childTnLst>
+                                    <p:set>
+                                      <p:cBhvr>
+                                        <p:cTn id="16" dur="1" fill="hold">
+                                          <p:stCondLst>
+                                            <p:cond delay="0"/>
+                                          </p:stCondLst>
+                                        </p:cTn>
+                                        <p:tgtEl>
+                                          <p:spTgt spid="17"/>
+                                        </p:tgtEl>
+                                        <p:attrNameLst>
+                                          <p:attrName>style.visibility</p:attrName>
+                                        </p:attrNameLst>
+                                      </p:cBhvr>
+                                      <p:to>
+                                        <p:strVal val="visible"/>
+                                      </p:to>
+                                    </p:set>
+                                  </p:childTnLst>
+                                </p:cTn>
+                              </p:par>
+                            </p:childTnLst>
+                          </p:cTn>
+                        </p:par>
+                      </p:childTnLst>
+                    </p:cTn>
+                  </p:par>
+                  <p:par>
+                    <p:cTn id="17" fill="hold">
+                      <p:stCondLst>
+                        <p:cond delay="indefinite"/>
+                      </p:stCondLst>
+                      <p:childTnLst>
+                        <p:par>
+                          <p:cTn id="18" fill="hold">
+                            <p:stCondLst>
+                              <p:cond delay="0"/>
+                            </p:stCondLst>
+                            <p:childTnLst>
+                              <p:par>
+                                <p:cTn id="19" presetID="1" presetClass="entr" presetSubtype="0" fill="hold" nodeType="clickEffect">
+                                  <p:stCondLst>
+                                    <p:cond delay="0"/>
+                                  </p:stCondLst>
+                                  <p:childTnLst>
+                                    <p:set>
+                                      <p:cBhvr>
+                                        <p:cTn id="20" dur="1" fill="hold">
+                                          <p:stCondLst>
+                                            <p:cond delay="0"/>
+                                          </p:stCondLst>
+                                        </p:cTn>
+                                        <p:tgtEl>
+                                          <p:spTgt spid="18"/>
+                                        </p:tgtEl>
+                                        <p:attrNameLst>
+                                          <p:attrName>style.visibility</p:attrName>
+                                        </p:attrNameLst>
+                                      </p:cBhvr>
+                                      <p:to>
+                                        <p:strVal val="visible"/>
+                                      </p:to>
+                                    </p:set>
+                                  </p:childTnLst>
+                                </p:cTn>
+                              </p:par>
+                              <p:par>
+                                <p:cTn id="21" presetID="1" presetClass="entr" presetSubtype="0" fill="hold" grpId="0" nodeType="withEffect">
+                                  <p:stCondLst>
+                                    <p:cond delay="0"/>
+                                  </p:stCondLst>
+                                  <p:childTnLst>
+                                    <p:set>
+                                      <p:cBhvr>
+                                        <p:cTn id="22" dur="1" fill="hold">
+                                          <p:stCondLst>
+                                            <p:cond delay="0"/>
+                                          </p:stCondLst>
+                                        </p:cTn>
+                                        <p:tgtEl>
+                                          <p:spTgt spid="26"/>
+                                        </p:tgtEl>
+                                        <p:attrNameLst>
+                                          <p:attrName>style.visibility</p:attrName>
+                                        </p:attrNameLst>
+                                      </p:cBhvr>
+                                      <p:to>
+                                        <p:strVal val="visible"/>
+                                      </p:to>
+                                    </p:set>
+                                  </p:childTnLst>
+                                </p:cTn>
+                              </p:par>
+                            </p:childTnLst>
+                          </p:cTn>
+                        </p:par>
+                      </p:childTnLst>
+                    </p:cTn>
+                  </p:par>
+                </p:childTnLst>
+              </p:cTn>
+              <p:prevCondLst>
+                <p:cond evt="onPrev" delay="0">
+                  <p:tgtEl>
+                    <p:sldTgt/>
+                  </p:tgtEl>
+                </p:cond>
+              </p:prevCondLst>
+              <p:nextCondLst>
+                <p:cond evt="onNext" delay="0">
+                  <p:tgtEl>
+                    <p:sldTgt/>
+                  </p:tgtEl>
+                </p:cond>
+              </p:nextCondLst>
+            </p:seq>
+          </p:childTnLst>
+        </p:cTn>
       </p:par>
     </p:tnLst>
+    <p:bldLst>
+      <p:bldP spid="25" grpId="0" animBg="1"/>
+      <p:bldP spid="17" grpId="0" animBg="1"/>
+      <p:bldP spid="26" grpId="0" animBg="1"/>
+    </p:bldLst>
   </p:timing>
 </p:sld>
 </file>
@@ -15852,7 +17176,7 @@
           <a:graphicData uri="http://schemas.openxmlformats.org/presentationml/2006/ole">
             <mc:AlternateContent xmlns:mc="http://schemas.openxmlformats.org/markup-compatibility/2006">
               <mc:Choice xmlns:v="urn:schemas-microsoft-com:vml" Requires="v">
-                <p:oleObj spid="_x0000_s2059" name="Equation" r:id="rId3" imgW="1091880" imgH="1041120" progId="Equation.3">
+                <p:oleObj spid="_x0000_s2075" name="Equation" r:id="rId3" imgW="1091880" imgH="1041120" progId="Equation.3">
                   <p:embed/>
                 </p:oleObj>
               </mc:Choice>
@@ -17223,7 +18547,7 @@
           <a:graphicData uri="http://schemas.openxmlformats.org/presentationml/2006/ole">
             <mc:AlternateContent xmlns:mc="http://schemas.openxmlformats.org/markup-compatibility/2006">
               <mc:Choice xmlns:v="urn:schemas-microsoft-com:vml" Requires="v">
-                <p:oleObj spid="_x0000_s2060" name="Equation" r:id="rId5" imgW="1091880" imgH="1041120" progId="Equation.3">
+                <p:oleObj spid="_x0000_s2076" name="Equation" r:id="rId5" imgW="1091880" imgH="1041120" progId="Equation.3">
                   <p:embed/>
                 </p:oleObj>
               </mc:Choice>
@@ -20028,7 +21352,7 @@
           <a:p>
             <a:r>
               <a:rPr lang="en-US" dirty="0" smtClean="0"/>
-              <a:t>False sharing</a:t>
+              <a:t>Vectorization</a:t>
             </a:r>
             <a:endParaRPr lang="en-US" dirty="0"/>
           </a:p>
@@ -20049,7 +21373,59 @@
           <a:bodyPr/>
           <a:lstStyle/>
           <a:p>
-            <a:endParaRPr lang="en-US"/>
+            <a:r>
+              <a:rPr lang="en-US" dirty="0" smtClean="0"/>
+              <a:t>Arithmetic operation done on registers</a:t>
+            </a:r>
+          </a:p>
+          <a:p>
+            <a:r>
+              <a:rPr lang="en-US" dirty="0" smtClean="0"/>
+              <a:t>Vector r</a:t>
+            </a:r>
+            <a:r>
+              <a:rPr lang="en-US" dirty="0" smtClean="0"/>
+              <a:t>egisters </a:t>
+            </a:r>
+            <a:r>
+              <a:rPr lang="en-US" dirty="0" smtClean="0"/>
+              <a:t>for floating </a:t>
+            </a:r>
+            <a:r>
+              <a:rPr lang="en-US" dirty="0" smtClean="0"/>
+              <a:t>point operands:</a:t>
+            </a:r>
+            <a:br>
+              <a:rPr lang="en-US" dirty="0" smtClean="0"/>
+            </a:br>
+            <a:r>
+              <a:rPr lang="en-US" dirty="0" smtClean="0"/>
+              <a:t>256 bit wide</a:t>
+            </a:r>
+            <a:endParaRPr lang="en-US" dirty="0" smtClean="0"/>
+          </a:p>
+          <a:p>
+            <a:pPr lvl="1"/>
+            <a:r>
+              <a:rPr lang="en-US" dirty="0" smtClean="0"/>
+              <a:t>4 double precision</a:t>
+            </a:r>
+          </a:p>
+          <a:p>
+            <a:pPr lvl="1"/>
+            <a:endParaRPr lang="en-US" dirty="0" smtClean="0"/>
+          </a:p>
+          <a:p>
+            <a:pPr lvl="1"/>
+            <a:r>
+              <a:rPr lang="en-US" dirty="0" smtClean="0"/>
+              <a:t>8 </a:t>
+            </a:r>
+            <a:r>
+              <a:rPr lang="en-US" dirty="0" smtClean="0"/>
+              <a:t>single precision</a:t>
+            </a:r>
+            <a:endParaRPr lang="en-US" dirty="0"/>
           </a:p>
         </p:txBody>
       </p:sp>
@@ -20076,10 +21452,326 @@
           </a:p>
         </p:txBody>
       </p:sp>
+      <p:grpSp>
+        <p:nvGrpSpPr>
+          <p:cNvPr id="7" name="Group 6"/>
+          <p:cNvGrpSpPr/>
+          <p:nvPr/>
+        </p:nvGrpSpPr>
+        <p:grpSpPr>
+          <a:xfrm>
+            <a:off x="4283968" y="3236009"/>
+            <a:ext cx="4628846" cy="523220"/>
+            <a:chOff x="4355976" y="3236009"/>
+            <a:chExt cx="4628846" cy="523220"/>
+          </a:xfrm>
+        </p:grpSpPr>
+        <p:sp>
+          <p:nvSpPr>
+            <p:cNvPr id="5" name="TextBox 4"/>
+            <p:cNvSpPr txBox="1"/>
+            <p:nvPr/>
+          </p:nvSpPr>
+          <p:spPr>
+            <a:xfrm>
+              <a:off x="5292080" y="3236009"/>
+              <a:ext cx="3692742" cy="523220"/>
+            </a:xfrm>
+            <a:prstGeom prst="rect">
+              <a:avLst/>
+            </a:prstGeom>
+            <a:noFill/>
+            <a:ln>
+              <a:solidFill>
+                <a:schemeClr val="tx1"/>
+              </a:solidFill>
+            </a:ln>
+          </p:spPr>
+          <p:txBody>
+            <a:bodyPr wrap="none" rtlCol="0">
+              <a:spAutoFit/>
+            </a:bodyPr>
+            <a:lstStyle/>
+            <a:p>
+              <a:r>
+                <a:rPr lang="en-US" sz="2800" dirty="0" smtClean="0"/>
+                <a:t>4 concurrent operations</a:t>
+              </a:r>
+              <a:endParaRPr lang="en-US" sz="2800" dirty="0"/>
+            </a:p>
+          </p:txBody>
+        </p:sp>
+        <p:sp>
+          <p:nvSpPr>
+            <p:cNvPr id="6" name="Right Arrow 5"/>
+            <p:cNvSpPr/>
+            <p:nvPr/>
+          </p:nvSpPr>
+          <p:spPr>
+            <a:xfrm>
+              <a:off x="4355976" y="3377774"/>
+              <a:ext cx="648072" cy="288032"/>
+            </a:xfrm>
+            <a:prstGeom prst="rightArrow">
+              <a:avLst/>
+            </a:prstGeom>
+            <a:solidFill>
+              <a:schemeClr val="tx1"/>
+            </a:solidFill>
+            <a:ln>
+              <a:solidFill>
+                <a:schemeClr val="tx1"/>
+              </a:solidFill>
+            </a:ln>
+          </p:spPr>
+          <p:style>
+            <a:lnRef idx="2">
+              <a:schemeClr val="accent1">
+                <a:shade val="50000"/>
+              </a:schemeClr>
+            </a:lnRef>
+            <a:fillRef idx="1">
+              <a:schemeClr val="accent1"/>
+            </a:fillRef>
+            <a:effectRef idx="0">
+              <a:schemeClr val="accent1"/>
+            </a:effectRef>
+            <a:fontRef idx="minor">
+              <a:schemeClr val="lt1"/>
+            </a:fontRef>
+          </p:style>
+          <p:txBody>
+            <a:bodyPr rtlCol="0" anchor="ctr"/>
+            <a:lstStyle/>
+            <a:p>
+              <a:pPr algn="ctr"/>
+              <a:endParaRPr lang="en-US"/>
+            </a:p>
+          </p:txBody>
+        </p:sp>
+      </p:grpSp>
+      <p:grpSp>
+        <p:nvGrpSpPr>
+          <p:cNvPr id="8" name="Group 7"/>
+          <p:cNvGrpSpPr/>
+          <p:nvPr/>
+        </p:nvGrpSpPr>
+        <p:grpSpPr>
+          <a:xfrm>
+            <a:off x="4283968" y="4221088"/>
+            <a:ext cx="4628846" cy="523220"/>
+            <a:chOff x="4355976" y="3236009"/>
+            <a:chExt cx="4628846" cy="523220"/>
+          </a:xfrm>
+        </p:grpSpPr>
+        <p:sp>
+          <p:nvSpPr>
+            <p:cNvPr id="9" name="TextBox 8"/>
+            <p:cNvSpPr txBox="1"/>
+            <p:nvPr/>
+          </p:nvSpPr>
+          <p:spPr>
+            <a:xfrm>
+              <a:off x="5292080" y="3236009"/>
+              <a:ext cx="3692742" cy="523220"/>
+            </a:xfrm>
+            <a:prstGeom prst="rect">
+              <a:avLst/>
+            </a:prstGeom>
+            <a:noFill/>
+            <a:ln>
+              <a:solidFill>
+                <a:schemeClr val="tx1"/>
+              </a:solidFill>
+            </a:ln>
+          </p:spPr>
+          <p:txBody>
+            <a:bodyPr wrap="none" rtlCol="0">
+              <a:spAutoFit/>
+            </a:bodyPr>
+            <a:lstStyle/>
+            <a:p>
+              <a:r>
+                <a:rPr lang="en-US" sz="2800" dirty="0" smtClean="0"/>
+                <a:t>8 concurrent operations</a:t>
+              </a:r>
+              <a:endParaRPr lang="en-US" sz="2800" dirty="0"/>
+            </a:p>
+          </p:txBody>
+        </p:sp>
+        <p:sp>
+          <p:nvSpPr>
+            <p:cNvPr id="10" name="Right Arrow 9"/>
+            <p:cNvSpPr/>
+            <p:nvPr/>
+          </p:nvSpPr>
+          <p:spPr>
+            <a:xfrm>
+              <a:off x="4355976" y="3377774"/>
+              <a:ext cx="648072" cy="288032"/>
+            </a:xfrm>
+            <a:prstGeom prst="rightArrow">
+              <a:avLst/>
+            </a:prstGeom>
+            <a:solidFill>
+              <a:schemeClr val="tx1"/>
+            </a:solidFill>
+            <a:ln>
+              <a:solidFill>
+                <a:schemeClr val="tx1"/>
+              </a:solidFill>
+            </a:ln>
+          </p:spPr>
+          <p:style>
+            <a:lnRef idx="2">
+              <a:schemeClr val="accent1">
+                <a:shade val="50000"/>
+              </a:schemeClr>
+            </a:lnRef>
+            <a:fillRef idx="1">
+              <a:schemeClr val="accent1"/>
+            </a:fillRef>
+            <a:effectRef idx="0">
+              <a:schemeClr val="accent1"/>
+            </a:effectRef>
+            <a:fontRef idx="minor">
+              <a:schemeClr val="lt1"/>
+            </a:fontRef>
+          </p:style>
+          <p:txBody>
+            <a:bodyPr rtlCol="0" anchor="ctr"/>
+            <a:lstStyle/>
+            <a:p>
+              <a:pPr algn="ctr"/>
+              <a:endParaRPr lang="en-US"/>
+            </a:p>
+          </p:txBody>
+        </p:sp>
+      </p:grpSp>
+      <p:sp>
+        <p:nvSpPr>
+          <p:cNvPr id="11" name="TextBox 10"/>
+          <p:cNvSpPr txBox="1"/>
+          <p:nvPr/>
+        </p:nvSpPr>
+        <p:spPr>
+          <a:xfrm>
+            <a:off x="107504" y="5229200"/>
+            <a:ext cx="8913146" cy="830997"/>
+          </a:xfrm>
+          <a:prstGeom prst="rect">
+            <a:avLst/>
+          </a:prstGeom>
+          <a:noFill/>
+        </p:spPr>
+        <p:txBody>
+          <a:bodyPr wrap="none" rtlCol="0">
+            <a:spAutoFit/>
+          </a:bodyPr>
+          <a:lstStyle/>
+          <a:p>
+            <a:r>
+              <a:rPr lang="en-US" sz="2400" dirty="0" smtClean="0"/>
+              <a:t>double precision: 4 registers  × 2.5</a:t>
+            </a:r>
+            <a:r>
+              <a:rPr lang="en-US" sz="2400" baseline="30000" dirty="0" smtClean="0"/>
+              <a:t>.</a:t>
+            </a:r>
+            <a:r>
+              <a:rPr lang="en-US" sz="2400" dirty="0" smtClean="0"/>
+              <a:t>10</a:t>
+            </a:r>
+            <a:r>
+              <a:rPr lang="en-US" sz="2400" baseline="30000" dirty="0" smtClean="0"/>
+              <a:t>9</a:t>
+            </a:r>
+            <a:r>
+              <a:rPr lang="en-US" sz="2400" dirty="0" smtClean="0"/>
+              <a:t> additions </a:t>
+            </a:r>
+            <a:r>
+              <a:rPr lang="en-US" sz="2400" dirty="0"/>
+              <a:t>×</a:t>
+            </a:r>
+            <a:r>
+              <a:rPr lang="en-US" sz="2400" dirty="0" smtClean="0"/>
+              <a:t> 18 cores </a:t>
+            </a:r>
+            <a:r>
+              <a:rPr lang="en-US" sz="2400" dirty="0"/>
+              <a:t>×</a:t>
+            </a:r>
+            <a:r>
+              <a:rPr lang="en-US" sz="2400" dirty="0" smtClean="0"/>
+              <a:t> 2 sockets</a:t>
+            </a:r>
+            <a:br>
+              <a:rPr lang="en-US" sz="2400" dirty="0" smtClean="0"/>
+            </a:br>
+            <a:r>
+              <a:rPr lang="en-US" sz="2400" dirty="0" smtClean="0"/>
+              <a:t>                                = 360 GFLOPS</a:t>
+            </a:r>
+            <a:endParaRPr lang="en-US" sz="2400" dirty="0"/>
+          </a:p>
+        </p:txBody>
+      </p:sp>
+      <p:sp>
+        <p:nvSpPr>
+          <p:cNvPr id="12" name="TextBox 11"/>
+          <p:cNvSpPr txBox="1"/>
+          <p:nvPr/>
+        </p:nvSpPr>
+        <p:spPr>
+          <a:xfrm>
+            <a:off x="4427984" y="5805264"/>
+            <a:ext cx="4047583" cy="461665"/>
+          </a:xfrm>
+          <a:prstGeom prst="rect">
+            <a:avLst/>
+          </a:prstGeom>
+          <a:noFill/>
+          <a:ln>
+            <a:solidFill>
+              <a:schemeClr val="tx1"/>
+            </a:solidFill>
+          </a:ln>
+        </p:spPr>
+        <p:txBody>
+          <a:bodyPr wrap="none" rtlCol="0">
+            <a:spAutoFit/>
+          </a:bodyPr>
+          <a:lstStyle/>
+          <a:p>
+            <a:r>
+              <a:rPr lang="en-US" sz="2400" b="1" i="1" dirty="0" smtClean="0">
+                <a:solidFill>
+                  <a:srgbClr val="C00000"/>
+                </a:solidFill>
+              </a:rPr>
+              <a:t>Theoretical</a:t>
+            </a:r>
+            <a:r>
+              <a:rPr lang="en-US" sz="2400" dirty="0" smtClean="0">
+                <a:solidFill>
+                  <a:srgbClr val="C00000"/>
+                </a:solidFill>
+              </a:rPr>
+              <a:t> </a:t>
+            </a:r>
+            <a:r>
+              <a:rPr lang="en-US" sz="2400" dirty="0" smtClean="0"/>
+              <a:t>peak performance!</a:t>
+            </a:r>
+            <a:endParaRPr lang="en-US" sz="2400" dirty="0"/>
+          </a:p>
+        </p:txBody>
+      </p:sp>
     </p:spTree>
     <p:extLst>
       <p:ext uri="{BB962C8B-B14F-4D97-AF65-F5344CB8AC3E}">
-        <p14:creationId xmlns:p14="http://schemas.microsoft.com/office/powerpoint/2010/main" val="1302518243"/>
+        <p14:creationId xmlns:p14="http://schemas.microsoft.com/office/powerpoint/2010/main" val="78468918"/>
       </p:ext>
     </p:extLst>
   </p:cSld>
@@ -20089,9 +21781,447 @@
   <p:timing>
     <p:tnLst>
       <p:par>
-        <p:cTn id="1" dur="indefinite" restart="never" nodeType="tmRoot"/>
+        <p:cTn id="1" dur="indefinite" restart="never" nodeType="tmRoot">
+          <p:childTnLst>
+            <p:seq concurrent="1" nextAc="seek">
+              <p:cTn id="2" dur="indefinite" nodeType="mainSeq">
+                <p:childTnLst>
+                  <p:par>
+                    <p:cTn id="3" fill="hold">
+                      <p:stCondLst>
+                        <p:cond delay="indefinite"/>
+                        <p:cond evt="onBegin" delay="0">
+                          <p:tn val="2"/>
+                        </p:cond>
+                      </p:stCondLst>
+                      <p:childTnLst>
+                        <p:par>
+                          <p:cTn id="4" fill="hold">
+                            <p:stCondLst>
+                              <p:cond delay="0"/>
+                            </p:stCondLst>
+                            <p:childTnLst>
+                              <p:par>
+                                <p:cTn id="5" presetID="1" presetClass="entr" presetSubtype="0" fill="hold" grpId="0" nodeType="withEffect">
+                                  <p:stCondLst>
+                                    <p:cond delay="0"/>
+                                  </p:stCondLst>
+                                  <p:childTnLst>
+                                    <p:set>
+                                      <p:cBhvr>
+                                        <p:cTn id="6" dur="1" fill="hold">
+                                          <p:stCondLst>
+                                            <p:cond delay="0"/>
+                                          </p:stCondLst>
+                                        </p:cTn>
+                                        <p:tgtEl>
+                                          <p:spTgt spid="3">
+                                            <p:txEl>
+                                              <p:pRg st="0" end="0"/>
+                                            </p:txEl>
+                                          </p:spTgt>
+                                        </p:tgtEl>
+                                        <p:attrNameLst>
+                                          <p:attrName>style.visibility</p:attrName>
+                                        </p:attrNameLst>
+                                      </p:cBhvr>
+                                      <p:to>
+                                        <p:strVal val="visible"/>
+                                      </p:to>
+                                    </p:set>
+                                  </p:childTnLst>
+                                </p:cTn>
+                              </p:par>
+                            </p:childTnLst>
+                          </p:cTn>
+                        </p:par>
+                      </p:childTnLst>
+                    </p:cTn>
+                  </p:par>
+                  <p:par>
+                    <p:cTn id="7" fill="hold">
+                      <p:stCondLst>
+                        <p:cond delay="indefinite"/>
+                      </p:stCondLst>
+                      <p:childTnLst>
+                        <p:par>
+                          <p:cTn id="8" fill="hold">
+                            <p:stCondLst>
+                              <p:cond delay="0"/>
+                            </p:stCondLst>
+                            <p:childTnLst>
+                              <p:par>
+                                <p:cTn id="9" presetID="1" presetClass="entr" presetSubtype="0" fill="hold" grpId="0" nodeType="clickEffect">
+                                  <p:stCondLst>
+                                    <p:cond delay="0"/>
+                                  </p:stCondLst>
+                                  <p:childTnLst>
+                                    <p:set>
+                                      <p:cBhvr>
+                                        <p:cTn id="10" dur="1" fill="hold">
+                                          <p:stCondLst>
+                                            <p:cond delay="0"/>
+                                          </p:stCondLst>
+                                        </p:cTn>
+                                        <p:tgtEl>
+                                          <p:spTgt spid="3">
+                                            <p:txEl>
+                                              <p:pRg st="1" end="1"/>
+                                            </p:txEl>
+                                          </p:spTgt>
+                                        </p:tgtEl>
+                                        <p:attrNameLst>
+                                          <p:attrName>style.visibility</p:attrName>
+                                        </p:attrNameLst>
+                                      </p:cBhvr>
+                                      <p:to>
+                                        <p:strVal val="visible"/>
+                                      </p:to>
+                                    </p:set>
+                                  </p:childTnLst>
+                                </p:cTn>
+                              </p:par>
+                              <p:par>
+                                <p:cTn id="11" presetID="1" presetClass="entr" presetSubtype="0" fill="hold" grpId="0" nodeType="withEffect">
+                                  <p:stCondLst>
+                                    <p:cond delay="0"/>
+                                  </p:stCondLst>
+                                  <p:childTnLst>
+                                    <p:set>
+                                      <p:cBhvr>
+                                        <p:cTn id="12" dur="1" fill="hold">
+                                          <p:stCondLst>
+                                            <p:cond delay="0"/>
+                                          </p:stCondLst>
+                                        </p:cTn>
+                                        <p:tgtEl>
+                                          <p:spTgt spid="3">
+                                            <p:txEl>
+                                              <p:pRg st="2" end="2"/>
+                                            </p:txEl>
+                                          </p:spTgt>
+                                        </p:tgtEl>
+                                        <p:attrNameLst>
+                                          <p:attrName>style.visibility</p:attrName>
+                                        </p:attrNameLst>
+                                      </p:cBhvr>
+                                      <p:to>
+                                        <p:strVal val="visible"/>
+                                      </p:to>
+                                    </p:set>
+                                  </p:childTnLst>
+                                </p:cTn>
+                              </p:par>
+                            </p:childTnLst>
+                          </p:cTn>
+                        </p:par>
+                      </p:childTnLst>
+                    </p:cTn>
+                  </p:par>
+                  <p:par>
+                    <p:cTn id="13" fill="hold">
+                      <p:stCondLst>
+                        <p:cond delay="indefinite"/>
+                      </p:stCondLst>
+                      <p:childTnLst>
+                        <p:par>
+                          <p:cTn id="14" fill="hold">
+                            <p:stCondLst>
+                              <p:cond delay="0"/>
+                            </p:stCondLst>
+                            <p:childTnLst>
+                              <p:par>
+                                <p:cTn id="15" presetID="1" presetClass="entr" presetSubtype="0" fill="hold" nodeType="clickEffect">
+                                  <p:stCondLst>
+                                    <p:cond delay="0"/>
+                                  </p:stCondLst>
+                                  <p:childTnLst>
+                                    <p:set>
+                                      <p:cBhvr>
+                                        <p:cTn id="16" dur="1" fill="hold">
+                                          <p:stCondLst>
+                                            <p:cond delay="0"/>
+                                          </p:stCondLst>
+                                        </p:cTn>
+                                        <p:tgtEl>
+                                          <p:spTgt spid="7"/>
+                                        </p:tgtEl>
+                                        <p:attrNameLst>
+                                          <p:attrName>style.visibility</p:attrName>
+                                        </p:attrNameLst>
+                                      </p:cBhvr>
+                                      <p:to>
+                                        <p:strVal val="visible"/>
+                                      </p:to>
+                                    </p:set>
+                                  </p:childTnLst>
+                                </p:cTn>
+                              </p:par>
+                            </p:childTnLst>
+                          </p:cTn>
+                        </p:par>
+                      </p:childTnLst>
+                    </p:cTn>
+                  </p:par>
+                  <p:par>
+                    <p:cTn id="17" fill="hold">
+                      <p:stCondLst>
+                        <p:cond delay="indefinite"/>
+                      </p:stCondLst>
+                      <p:childTnLst>
+                        <p:par>
+                          <p:cTn id="18" fill="hold">
+                            <p:stCondLst>
+                              <p:cond delay="0"/>
+                            </p:stCondLst>
+                            <p:childTnLst>
+                              <p:par>
+                                <p:cTn id="19" presetID="1" presetClass="entr" presetSubtype="0" fill="hold" grpId="0" nodeType="clickEffect">
+                                  <p:stCondLst>
+                                    <p:cond delay="0"/>
+                                  </p:stCondLst>
+                                  <p:childTnLst>
+                                    <p:set>
+                                      <p:cBhvr>
+                                        <p:cTn id="20" dur="1" fill="hold">
+                                          <p:stCondLst>
+                                            <p:cond delay="0"/>
+                                          </p:stCondLst>
+                                        </p:cTn>
+                                        <p:tgtEl>
+                                          <p:spTgt spid="3">
+                                            <p:txEl>
+                                              <p:pRg st="4" end="4"/>
+                                            </p:txEl>
+                                          </p:spTgt>
+                                        </p:tgtEl>
+                                        <p:attrNameLst>
+                                          <p:attrName>style.visibility</p:attrName>
+                                        </p:attrNameLst>
+                                      </p:cBhvr>
+                                      <p:to>
+                                        <p:strVal val="visible"/>
+                                      </p:to>
+                                    </p:set>
+                                  </p:childTnLst>
+                                </p:cTn>
+                              </p:par>
+                            </p:childTnLst>
+                          </p:cTn>
+                        </p:par>
+                      </p:childTnLst>
+                    </p:cTn>
+                  </p:par>
+                  <p:par>
+                    <p:cTn id="21" fill="hold">
+                      <p:stCondLst>
+                        <p:cond delay="indefinite"/>
+                      </p:stCondLst>
+                      <p:childTnLst>
+                        <p:par>
+                          <p:cTn id="22" fill="hold">
+                            <p:stCondLst>
+                              <p:cond delay="0"/>
+                            </p:stCondLst>
+                            <p:childTnLst>
+                              <p:par>
+                                <p:cTn id="23" presetID="1" presetClass="entr" presetSubtype="0" fill="hold" nodeType="clickEffect">
+                                  <p:stCondLst>
+                                    <p:cond delay="0"/>
+                                  </p:stCondLst>
+                                  <p:childTnLst>
+                                    <p:set>
+                                      <p:cBhvr>
+                                        <p:cTn id="24" dur="1" fill="hold">
+                                          <p:stCondLst>
+                                            <p:cond delay="0"/>
+                                          </p:stCondLst>
+                                        </p:cTn>
+                                        <p:tgtEl>
+                                          <p:spTgt spid="8"/>
+                                        </p:tgtEl>
+                                        <p:attrNameLst>
+                                          <p:attrName>style.visibility</p:attrName>
+                                        </p:attrNameLst>
+                                      </p:cBhvr>
+                                      <p:to>
+                                        <p:strVal val="visible"/>
+                                      </p:to>
+                                    </p:set>
+                                  </p:childTnLst>
+                                </p:cTn>
+                              </p:par>
+                            </p:childTnLst>
+                          </p:cTn>
+                        </p:par>
+                      </p:childTnLst>
+                    </p:cTn>
+                  </p:par>
+                  <p:par>
+                    <p:cTn id="25" fill="hold">
+                      <p:stCondLst>
+                        <p:cond delay="indefinite"/>
+                      </p:stCondLst>
+                      <p:childTnLst>
+                        <p:par>
+                          <p:cTn id="26" fill="hold">
+                            <p:stCondLst>
+                              <p:cond delay="0"/>
+                            </p:stCondLst>
+                            <p:childTnLst>
+                              <p:par>
+                                <p:cTn id="27" presetID="1" presetClass="entr" presetSubtype="0" fill="hold" grpId="0" nodeType="clickEffect">
+                                  <p:stCondLst>
+                                    <p:cond delay="0"/>
+                                  </p:stCondLst>
+                                  <p:childTnLst>
+                                    <p:set>
+                                      <p:cBhvr>
+                                        <p:cTn id="28" dur="1" fill="hold">
+                                          <p:stCondLst>
+                                            <p:cond delay="0"/>
+                                          </p:stCondLst>
+                                        </p:cTn>
+                                        <p:tgtEl>
+                                          <p:spTgt spid="11"/>
+                                        </p:tgtEl>
+                                        <p:attrNameLst>
+                                          <p:attrName>style.visibility</p:attrName>
+                                        </p:attrNameLst>
+                                      </p:cBhvr>
+                                      <p:to>
+                                        <p:strVal val="visible"/>
+                                      </p:to>
+                                    </p:set>
+                                  </p:childTnLst>
+                                </p:cTn>
+                              </p:par>
+                            </p:childTnLst>
+                          </p:cTn>
+                        </p:par>
+                      </p:childTnLst>
+                    </p:cTn>
+                  </p:par>
+                  <p:par>
+                    <p:cTn id="29" fill="hold">
+                      <p:stCondLst>
+                        <p:cond delay="indefinite"/>
+                      </p:stCondLst>
+                      <p:childTnLst>
+                        <p:par>
+                          <p:cTn id="30" fill="hold">
+                            <p:stCondLst>
+                              <p:cond delay="0"/>
+                            </p:stCondLst>
+                            <p:childTnLst>
+                              <p:par>
+                                <p:cTn id="31" presetID="1" presetClass="entr" presetSubtype="0" fill="hold" grpId="0" nodeType="clickEffect">
+                                  <p:stCondLst>
+                                    <p:cond delay="0"/>
+                                  </p:stCondLst>
+                                  <p:childTnLst>
+                                    <p:set>
+                                      <p:cBhvr>
+                                        <p:cTn id="32" dur="1" fill="hold">
+                                          <p:stCondLst>
+                                            <p:cond delay="0"/>
+                                          </p:stCondLst>
+                                        </p:cTn>
+                                        <p:tgtEl>
+                                          <p:spTgt spid="12"/>
+                                        </p:tgtEl>
+                                        <p:attrNameLst>
+                                          <p:attrName>style.visibility</p:attrName>
+                                        </p:attrNameLst>
+                                      </p:cBhvr>
+                                      <p:to>
+                                        <p:strVal val="visible"/>
+                                      </p:to>
+                                    </p:set>
+                                  </p:childTnLst>
+                                </p:cTn>
+                              </p:par>
+                            </p:childTnLst>
+                          </p:cTn>
+                        </p:par>
+                      </p:childTnLst>
+                    </p:cTn>
+                  </p:par>
+                  <p:par>
+                    <p:cTn id="33" fill="hold">
+                      <p:stCondLst>
+                        <p:cond delay="indefinite"/>
+                      </p:stCondLst>
+                      <p:childTnLst>
+                        <p:par>
+                          <p:cTn id="34" fill="hold">
+                            <p:stCondLst>
+                              <p:cond delay="0"/>
+                            </p:stCondLst>
+                            <p:childTnLst>
+                              <p:par>
+                                <p:cTn id="35" presetID="1" presetClass="entr" presetSubtype="0" fill="hold" nodeType="clickEffect">
+                                  <p:stCondLst>
+                                    <p:cond delay="0"/>
+                                  </p:stCondLst>
+                                  <p:childTnLst>
+                                    <p:set>
+                                      <p:cBhvr>
+                                        <p:cTn id="36" dur="1" fill="hold">
+                                          <p:stCondLst>
+                                            <p:cond delay="0"/>
+                                          </p:stCondLst>
+                                        </p:cTn>
+                                        <p:tgtEl>
+                                          <p:spTgt spid="12">
+                                            <p:txEl>
+                                              <p:pRg st="0" end="0"/>
+                                            </p:txEl>
+                                          </p:spTgt>
+                                        </p:tgtEl>
+                                        <p:attrNameLst>
+                                          <p:attrName>style.visibility</p:attrName>
+                                        </p:attrNameLst>
+                                      </p:cBhvr>
+                                      <p:to>
+                                        <p:strVal val="visible"/>
+                                      </p:to>
+                                    </p:set>
+                                  </p:childTnLst>
+                                </p:cTn>
+                              </p:par>
+                            </p:childTnLst>
+                          </p:cTn>
+                        </p:par>
+                      </p:childTnLst>
+                    </p:cTn>
+                  </p:par>
+                </p:childTnLst>
+              </p:cTn>
+              <p:prevCondLst>
+                <p:cond evt="onPrev" delay="0">
+                  <p:tgtEl>
+                    <p:sldTgt/>
+                  </p:tgtEl>
+                </p:cond>
+              </p:prevCondLst>
+              <p:nextCondLst>
+                <p:cond evt="onNext" delay="0">
+                  <p:tgtEl>
+                    <p:sldTgt/>
+                  </p:tgtEl>
+                </p:cond>
+              </p:nextCondLst>
+            </p:seq>
+          </p:childTnLst>
+        </p:cTn>
       </p:par>
     </p:tnLst>
+    <p:bldLst>
+      <p:bldP spid="3" grpId="0" uiExpand="1" build="p"/>
+      <p:bldP spid="11" grpId="0"/>
+      <p:bldP spid="12" grpId="0" animBg="1"/>
+    </p:bldLst>
   </p:timing>
 </p:sld>
 </file>
@@ -20130,7 +22260,7 @@
           <a:p>
             <a:r>
               <a:rPr lang="en-US" dirty="0" smtClean="0"/>
-              <a:t>Vectorization</a:t>
+              <a:t>AVX2</a:t>
             </a:r>
             <a:endParaRPr lang="en-US" dirty="0"/>
           </a:p>
@@ -20153,27 +22283,47 @@
           <a:p>
             <a:r>
               <a:rPr lang="en-US" dirty="0" smtClean="0"/>
-              <a:t>Arithmetic operation done on registers</a:t>
-            </a:r>
-          </a:p>
-          <a:p>
-            <a:r>
-              <a:rPr lang="en-US" dirty="0" smtClean="0"/>
-              <a:t>Registers for floating point are 256 bit</a:t>
+              <a:t>Haswell, Broadwell CPUs: AVX2 instruction set</a:t>
             </a:r>
           </a:p>
           <a:p>
             <a:pPr lvl="1"/>
             <a:r>
               <a:rPr lang="en-US" dirty="0" smtClean="0"/>
-              <a:t>4 double precision</a:t>
+              <a:t>Fused multiply/add: </a:t>
+            </a:r>
+            <a:r>
+              <a:rPr lang="en-US" dirty="0" smtClean="0">
+                <a:latin typeface="Courier New" panose="02070309020205020404" pitchFamily="49" charset="0"/>
+                <a:cs typeface="Courier New" panose="02070309020205020404" pitchFamily="49" charset="0"/>
+              </a:rPr>
+              <a:t>a*x + b</a:t>
+            </a:r>
+            <a:r>
+              <a:rPr lang="en-US" dirty="0" smtClean="0"/>
+              <a:t> is single operation</a:t>
+            </a:r>
+          </a:p>
+          <a:p>
+            <a:pPr lvl="1"/>
+            <a:endParaRPr lang="en-US" dirty="0"/>
+          </a:p>
+          <a:p>
+            <a:pPr lvl="1"/>
+            <a:endParaRPr lang="en-US" dirty="0" smtClean="0"/>
+          </a:p>
+          <a:p>
+            <a:pPr lvl="1"/>
+            <a:r>
+              <a:rPr lang="en-US" dirty="0" smtClean="0"/>
+              <a:t>Integer vector registers: 256 bit wide</a:t>
             </a:r>
           </a:p>
           <a:p>
             <a:pPr lvl="1"/>
             <a:r>
               <a:rPr lang="en-US" dirty="0" smtClean="0"/>
-              <a:t>8 single precision</a:t>
+              <a:t>Extra operations for cryptography</a:t>
             </a:r>
             <a:endParaRPr lang="en-US" dirty="0"/>
           </a:p>
@@ -20202,10 +22352,100 @@
           </a:p>
         </p:txBody>
       </p:sp>
+      <p:sp>
+        <p:nvSpPr>
+          <p:cNvPr id="6" name="TextBox 5"/>
+          <p:cNvSpPr txBox="1"/>
+          <p:nvPr/>
+        </p:nvSpPr>
+        <p:spPr>
+          <a:xfrm>
+            <a:off x="1403648" y="2924944"/>
+            <a:ext cx="6258701" cy="461665"/>
+          </a:xfrm>
+          <a:prstGeom prst="rect">
+            <a:avLst/>
+          </a:prstGeom>
+          <a:noFill/>
+          <a:ln>
+            <a:solidFill>
+              <a:schemeClr val="tx1"/>
+            </a:solidFill>
+          </a:ln>
+        </p:spPr>
+        <p:txBody>
+          <a:bodyPr wrap="none" rtlCol="0">
+            <a:spAutoFit/>
+          </a:bodyPr>
+          <a:lstStyle/>
+          <a:p>
+            <a:r>
+              <a:rPr lang="en-US" sz="2400" dirty="0" smtClean="0"/>
+              <a:t>Streaming: 1 addition </a:t>
+            </a:r>
+            <a:r>
+              <a:rPr lang="en-US" sz="2400" b="1" i="1" dirty="0" smtClean="0">
+                <a:solidFill>
+                  <a:srgbClr val="C00000"/>
+                </a:solidFill>
+              </a:rPr>
+              <a:t>and</a:t>
+            </a:r>
+            <a:r>
+              <a:rPr lang="en-US" sz="2400" dirty="0" smtClean="0">
+                <a:solidFill>
+                  <a:srgbClr val="C00000"/>
+                </a:solidFill>
+              </a:rPr>
+              <a:t> </a:t>
+            </a:r>
+            <a:r>
+              <a:rPr lang="en-US" sz="2400" dirty="0" smtClean="0"/>
+              <a:t>1 multiplication/cycle!</a:t>
+            </a:r>
+            <a:endParaRPr lang="en-US" sz="2400" dirty="0"/>
+          </a:p>
+        </p:txBody>
+      </p:sp>
+      <p:sp>
+        <p:nvSpPr>
+          <p:cNvPr id="7" name="TextBox 6"/>
+          <p:cNvSpPr txBox="1"/>
+          <p:nvPr/>
+        </p:nvSpPr>
+        <p:spPr>
+          <a:xfrm>
+            <a:off x="2843808" y="5229200"/>
+            <a:ext cx="3580211" cy="584775"/>
+          </a:xfrm>
+          <a:prstGeom prst="rect">
+            <a:avLst/>
+          </a:prstGeom>
+          <a:noFill/>
+          <a:ln>
+            <a:solidFill>
+              <a:schemeClr val="tx1"/>
+            </a:solidFill>
+          </a:ln>
+        </p:spPr>
+        <p:txBody>
+          <a:bodyPr wrap="none" rtlCol="0">
+            <a:spAutoFit/>
+          </a:bodyPr>
+          <a:lstStyle/>
+          <a:p>
+            <a:r>
+              <a:rPr lang="en-US" sz="3200" dirty="0" smtClean="0"/>
+              <a:t>Worth to recompile!</a:t>
+            </a:r>
+            <a:endParaRPr lang="en-US" sz="3200" dirty="0"/>
+          </a:p>
+        </p:txBody>
+      </p:sp>
     </p:spTree>
     <p:extLst>
       <p:ext uri="{BB962C8B-B14F-4D97-AF65-F5344CB8AC3E}">
-        <p14:creationId xmlns:p14="http://schemas.microsoft.com/office/powerpoint/2010/main" val="78468918"/>
+        <p14:creationId xmlns:p14="http://schemas.microsoft.com/office/powerpoint/2010/main" val="3126598689"/>
       </p:ext>
     </p:extLst>
   </p:cSld>
@@ -20215,14 +22455,998 @@
   <p:timing>
     <p:tnLst>
       <p:par>
-        <p:cTn id="1" dur="indefinite" restart="never" nodeType="tmRoot"/>
+        <p:cTn id="1" dur="indefinite" restart="never" nodeType="tmRoot">
+          <p:childTnLst>
+            <p:seq concurrent="1" nextAc="seek">
+              <p:cTn id="2" dur="indefinite" nodeType="mainSeq">
+                <p:childTnLst>
+                  <p:par>
+                    <p:cTn id="3" fill="hold">
+                      <p:stCondLst>
+                        <p:cond delay="indefinite"/>
+                        <p:cond evt="onBegin" delay="0">
+                          <p:tn val="2"/>
+                        </p:cond>
+                      </p:stCondLst>
+                      <p:childTnLst>
+                        <p:par>
+                          <p:cTn id="4" fill="hold">
+                            <p:stCondLst>
+                              <p:cond delay="0"/>
+                            </p:stCondLst>
+                            <p:childTnLst>
+                              <p:par>
+                                <p:cTn id="5" presetID="1" presetClass="entr" presetSubtype="0" fill="hold" grpId="0" nodeType="withEffect">
+                                  <p:stCondLst>
+                                    <p:cond delay="0"/>
+                                  </p:stCondLst>
+                                  <p:childTnLst>
+                                    <p:set>
+                                      <p:cBhvr>
+                                        <p:cTn id="6" dur="1" fill="hold">
+                                          <p:stCondLst>
+                                            <p:cond delay="0"/>
+                                          </p:stCondLst>
+                                        </p:cTn>
+                                        <p:tgtEl>
+                                          <p:spTgt spid="3">
+                                            <p:txEl>
+                                              <p:pRg st="0" end="0"/>
+                                            </p:txEl>
+                                          </p:spTgt>
+                                        </p:tgtEl>
+                                        <p:attrNameLst>
+                                          <p:attrName>style.visibility</p:attrName>
+                                        </p:attrNameLst>
+                                      </p:cBhvr>
+                                      <p:to>
+                                        <p:strVal val="visible"/>
+                                      </p:to>
+                                    </p:set>
+                                  </p:childTnLst>
+                                </p:cTn>
+                              </p:par>
+                            </p:childTnLst>
+                          </p:cTn>
+                        </p:par>
+                      </p:childTnLst>
+                    </p:cTn>
+                  </p:par>
+                  <p:par>
+                    <p:cTn id="7" fill="hold">
+                      <p:stCondLst>
+                        <p:cond delay="indefinite"/>
+                      </p:stCondLst>
+                      <p:childTnLst>
+                        <p:par>
+                          <p:cTn id="8" fill="hold">
+                            <p:stCondLst>
+                              <p:cond delay="0"/>
+                            </p:stCondLst>
+                            <p:childTnLst>
+                              <p:par>
+                                <p:cTn id="9" presetID="1" presetClass="entr" presetSubtype="0" fill="hold" grpId="0" nodeType="clickEffect">
+                                  <p:stCondLst>
+                                    <p:cond delay="0"/>
+                                  </p:stCondLst>
+                                  <p:childTnLst>
+                                    <p:set>
+                                      <p:cBhvr>
+                                        <p:cTn id="10" dur="1" fill="hold">
+                                          <p:stCondLst>
+                                            <p:cond delay="0"/>
+                                          </p:stCondLst>
+                                        </p:cTn>
+                                        <p:tgtEl>
+                                          <p:spTgt spid="3">
+                                            <p:txEl>
+                                              <p:pRg st="1" end="1"/>
+                                            </p:txEl>
+                                          </p:spTgt>
+                                        </p:tgtEl>
+                                        <p:attrNameLst>
+                                          <p:attrName>style.visibility</p:attrName>
+                                        </p:attrNameLst>
+                                      </p:cBhvr>
+                                      <p:to>
+                                        <p:strVal val="visible"/>
+                                      </p:to>
+                                    </p:set>
+                                  </p:childTnLst>
+                                </p:cTn>
+                              </p:par>
+                            </p:childTnLst>
+                          </p:cTn>
+                        </p:par>
+                      </p:childTnLst>
+                    </p:cTn>
+                  </p:par>
+                  <p:par>
+                    <p:cTn id="11" fill="hold">
+                      <p:stCondLst>
+                        <p:cond delay="indefinite"/>
+                      </p:stCondLst>
+                      <p:childTnLst>
+                        <p:par>
+                          <p:cTn id="12" fill="hold">
+                            <p:stCondLst>
+                              <p:cond delay="0"/>
+                            </p:stCondLst>
+                            <p:childTnLst>
+                              <p:par>
+                                <p:cTn id="13" presetID="1" presetClass="entr" presetSubtype="0" fill="hold" grpId="0" nodeType="clickEffect">
+                                  <p:stCondLst>
+                                    <p:cond delay="0"/>
+                                  </p:stCondLst>
+                                  <p:childTnLst>
+                                    <p:set>
+                                      <p:cBhvr>
+                                        <p:cTn id="14" dur="1" fill="hold">
+                                          <p:stCondLst>
+                                            <p:cond delay="0"/>
+                                          </p:stCondLst>
+                                        </p:cTn>
+                                        <p:tgtEl>
+                                          <p:spTgt spid="3">
+                                            <p:txEl>
+                                              <p:pRg st="4" end="4"/>
+                                            </p:txEl>
+                                          </p:spTgt>
+                                        </p:tgtEl>
+                                        <p:attrNameLst>
+                                          <p:attrName>style.visibility</p:attrName>
+                                        </p:attrNameLst>
+                                      </p:cBhvr>
+                                      <p:to>
+                                        <p:strVal val="visible"/>
+                                      </p:to>
+                                    </p:set>
+                                  </p:childTnLst>
+                                </p:cTn>
+                              </p:par>
+                            </p:childTnLst>
+                          </p:cTn>
+                        </p:par>
+                      </p:childTnLst>
+                    </p:cTn>
+                  </p:par>
+                  <p:par>
+                    <p:cTn id="15" fill="hold">
+                      <p:stCondLst>
+                        <p:cond delay="indefinite"/>
+                      </p:stCondLst>
+                      <p:childTnLst>
+                        <p:par>
+                          <p:cTn id="16" fill="hold">
+                            <p:stCondLst>
+                              <p:cond delay="0"/>
+                            </p:stCondLst>
+                            <p:childTnLst>
+                              <p:par>
+                                <p:cTn id="17" presetID="1" presetClass="entr" presetSubtype="0" fill="hold" grpId="0" nodeType="clickEffect">
+                                  <p:stCondLst>
+                                    <p:cond delay="0"/>
+                                  </p:stCondLst>
+                                  <p:childTnLst>
+                                    <p:set>
+                                      <p:cBhvr>
+                                        <p:cTn id="18" dur="1" fill="hold">
+                                          <p:stCondLst>
+                                            <p:cond delay="0"/>
+                                          </p:stCondLst>
+                                        </p:cTn>
+                                        <p:tgtEl>
+                                          <p:spTgt spid="3">
+                                            <p:txEl>
+                                              <p:pRg st="5" end="5"/>
+                                            </p:txEl>
+                                          </p:spTgt>
+                                        </p:tgtEl>
+                                        <p:attrNameLst>
+                                          <p:attrName>style.visibility</p:attrName>
+                                        </p:attrNameLst>
+                                      </p:cBhvr>
+                                      <p:to>
+                                        <p:strVal val="visible"/>
+                                      </p:to>
+                                    </p:set>
+                                  </p:childTnLst>
+                                </p:cTn>
+                              </p:par>
+                            </p:childTnLst>
+                          </p:cTn>
+                        </p:par>
+                      </p:childTnLst>
+                    </p:cTn>
+                  </p:par>
+                  <p:par>
+                    <p:cTn id="19" fill="hold">
+                      <p:stCondLst>
+                        <p:cond delay="indefinite"/>
+                      </p:stCondLst>
+                      <p:childTnLst>
+                        <p:par>
+                          <p:cTn id="20" fill="hold">
+                            <p:stCondLst>
+                              <p:cond delay="0"/>
+                            </p:stCondLst>
+                            <p:childTnLst>
+                              <p:par>
+                                <p:cTn id="21" presetID="1" presetClass="entr" presetSubtype="0" fill="hold" grpId="0" nodeType="clickEffect">
+                                  <p:stCondLst>
+                                    <p:cond delay="0"/>
+                                  </p:stCondLst>
+                                  <p:childTnLst>
+                                    <p:set>
+                                      <p:cBhvr>
+                                        <p:cTn id="22" dur="1" fill="hold">
+                                          <p:stCondLst>
+                                            <p:cond delay="0"/>
+                                          </p:stCondLst>
+                                        </p:cTn>
+                                        <p:tgtEl>
+                                          <p:spTgt spid="7"/>
+                                        </p:tgtEl>
+                                        <p:attrNameLst>
+                                          <p:attrName>style.visibility</p:attrName>
+                                        </p:attrNameLst>
+                                      </p:cBhvr>
+                                      <p:to>
+                                        <p:strVal val="visible"/>
+                                      </p:to>
+                                    </p:set>
+                                  </p:childTnLst>
+                                </p:cTn>
+                              </p:par>
+                            </p:childTnLst>
+                          </p:cTn>
+                        </p:par>
+                      </p:childTnLst>
+                    </p:cTn>
+                  </p:par>
+                </p:childTnLst>
+              </p:cTn>
+              <p:prevCondLst>
+                <p:cond evt="onPrev" delay="0">
+                  <p:tgtEl>
+                    <p:sldTgt/>
+                  </p:tgtEl>
+                </p:cond>
+              </p:prevCondLst>
+              <p:nextCondLst>
+                <p:cond evt="onNext" delay="0">
+                  <p:tgtEl>
+                    <p:sldTgt/>
+                  </p:tgtEl>
+                </p:cond>
+              </p:nextCondLst>
+            </p:seq>
+          </p:childTnLst>
+        </p:cTn>
       </p:par>
     </p:tnLst>
+    <p:bldLst>
+      <p:bldP spid="3" grpId="0" uiExpand="1" build="p" bldLvl="2"/>
+      <p:bldP spid="7" grpId="0" animBg="1"/>
+    </p:bldLst>
   </p:timing>
 </p:sld>
 </file>
 
 <file path=ppt/slides/slide23.xml><?xml version="1.0" encoding="utf-8"?>
+<p:sld xmlns:a="http://schemas.openxmlformats.org/drawingml/2006/main" xmlns:r="http://schemas.openxmlformats.org/officeDocument/2006/relationships" xmlns:p="http://schemas.openxmlformats.org/presentationml/2006/main">
+  <p:cSld>
+    <p:spTree>
+      <p:nvGrpSpPr>
+        <p:cNvPr id="1" name=""/>
+        <p:cNvGrpSpPr/>
+        <p:nvPr/>
+      </p:nvGrpSpPr>
+      <p:grpSpPr>
+        <a:xfrm>
+          <a:off x="0" y="0"/>
+          <a:ext cx="0" cy="0"/>
+          <a:chOff x="0" y="0"/>
+          <a:chExt cx="0" cy="0"/>
+        </a:xfrm>
+      </p:grpSpPr>
+      <p:sp>
+        <p:nvSpPr>
+          <p:cNvPr id="2" name="Title 1"/>
+          <p:cNvSpPr>
+            <a:spLocks noGrp="1"/>
+          </p:cNvSpPr>
+          <p:nvPr>
+            <p:ph type="title"/>
+          </p:nvPr>
+        </p:nvSpPr>
+        <p:spPr/>
+        <p:txBody>
+          <a:bodyPr/>
+          <a:lstStyle/>
+          <a:p>
+            <a:r>
+              <a:rPr lang="en-US" dirty="0" smtClean="0"/>
+              <a:t>Parallelism</a:t>
+            </a:r>
+            <a:endParaRPr lang="en-US" dirty="0"/>
+          </a:p>
+        </p:txBody>
+      </p:sp>
+      <p:sp>
+        <p:nvSpPr>
+          <p:cNvPr id="3" name="Content Placeholder 2"/>
+          <p:cNvSpPr>
+            <a:spLocks noGrp="1"/>
+          </p:cNvSpPr>
+          <p:nvPr>
+            <p:ph idx="1"/>
+          </p:nvPr>
+        </p:nvSpPr>
+        <p:spPr/>
+        <p:txBody>
+          <a:bodyPr/>
+          <a:lstStyle/>
+          <a:p>
+            <a:r>
+              <a:rPr lang="en-US" dirty="0" smtClean="0"/>
+              <a:t>Levels</a:t>
+            </a:r>
+          </a:p>
+          <a:p>
+            <a:pPr lvl="1"/>
+            <a:r>
+              <a:rPr lang="en-US" dirty="0" smtClean="0"/>
+              <a:t>vectorization</a:t>
+            </a:r>
+          </a:p>
+          <a:p>
+            <a:pPr lvl="2"/>
+            <a:r>
+              <a:rPr lang="en-US" dirty="0" smtClean="0"/>
+              <a:t>compiler flags, some help needed from programmer</a:t>
+            </a:r>
+          </a:p>
+          <a:p>
+            <a:pPr lvl="1"/>
+            <a:r>
+              <a:rPr lang="en-US" dirty="0" smtClean="0"/>
+              <a:t>multicore</a:t>
+            </a:r>
+          </a:p>
+          <a:p>
+            <a:pPr lvl="2"/>
+            <a:r>
+              <a:rPr lang="en-US" dirty="0" err="1" smtClean="0"/>
+              <a:t>OpenMP</a:t>
+            </a:r>
+            <a:r>
+              <a:rPr lang="en-US" dirty="0" smtClean="0"/>
+              <a:t>/</a:t>
+            </a:r>
+            <a:r>
+              <a:rPr lang="en-US" dirty="0" err="1" smtClean="0"/>
+              <a:t>pthreads</a:t>
+            </a:r>
+            <a:r>
+              <a:rPr lang="en-US" dirty="0" smtClean="0"/>
+              <a:t>: programmer's job</a:t>
+            </a:r>
+          </a:p>
+          <a:p>
+            <a:pPr lvl="1"/>
+            <a:r>
+              <a:rPr lang="en-US" dirty="0" smtClean="0"/>
+              <a:t>multimode, i.e., distributed</a:t>
+            </a:r>
+          </a:p>
+          <a:p>
+            <a:pPr lvl="2"/>
+            <a:r>
+              <a:rPr lang="en-US" dirty="0" smtClean="0"/>
+              <a:t>MPI: programmer's job</a:t>
+            </a:r>
+          </a:p>
+          <a:p>
+            <a:pPr lvl="1"/>
+            <a:r>
+              <a:rPr lang="en-US" dirty="0" smtClean="0"/>
+              <a:t>GPGPU</a:t>
+            </a:r>
+          </a:p>
+          <a:p>
+            <a:pPr lvl="2"/>
+            <a:r>
+              <a:rPr lang="en-US" dirty="0" smtClean="0"/>
+              <a:t>CUDA/</a:t>
+            </a:r>
+            <a:r>
+              <a:rPr lang="en-US" dirty="0" err="1" smtClean="0"/>
+              <a:t>OpenACC</a:t>
+            </a:r>
+            <a:r>
+              <a:rPr lang="en-US" dirty="0" smtClean="0"/>
+              <a:t>/OpenCL: programmer's job</a:t>
+            </a:r>
+            <a:endParaRPr lang="en-US" dirty="0"/>
+          </a:p>
+        </p:txBody>
+      </p:sp>
+      <p:sp>
+        <p:nvSpPr>
+          <p:cNvPr id="4" name="Slide Number Placeholder 3"/>
+          <p:cNvSpPr>
+            <a:spLocks noGrp="1"/>
+          </p:cNvSpPr>
+          <p:nvPr>
+            <p:ph type="sldNum" sz="quarter" idx="12"/>
+          </p:nvPr>
+        </p:nvSpPr>
+        <p:spPr/>
+        <p:txBody>
+          <a:bodyPr/>
+          <a:lstStyle/>
+          <a:p>
+            <a:fld id="{6597116C-F94B-4B5B-973A-17F07FB5C418}" type="slidenum">
+              <a:rPr lang="nl-BE" smtClean="0"/>
+              <a:t>23</a:t>
+            </a:fld>
+            <a:endParaRPr lang="nl-BE"/>
+          </a:p>
+        </p:txBody>
+      </p:sp>
+      <p:grpSp>
+        <p:nvGrpSpPr>
+          <p:cNvPr id="7" name="Group 6"/>
+          <p:cNvGrpSpPr/>
+          <p:nvPr/>
+        </p:nvGrpSpPr>
+        <p:grpSpPr>
+          <a:xfrm>
+            <a:off x="6553200" y="3284984"/>
+            <a:ext cx="1479142" cy="1656184"/>
+            <a:chOff x="6553200" y="3284984"/>
+            <a:chExt cx="1479142" cy="1656184"/>
+          </a:xfrm>
+        </p:grpSpPr>
+        <p:sp>
+          <p:nvSpPr>
+            <p:cNvPr id="5" name="Right Brace 4"/>
+            <p:cNvSpPr/>
+            <p:nvPr/>
+          </p:nvSpPr>
+          <p:spPr>
+            <a:xfrm>
+              <a:off x="6553200" y="3284984"/>
+              <a:ext cx="179040" cy="1656184"/>
+            </a:xfrm>
+            <a:prstGeom prst="rightBrace">
+              <a:avLst/>
+            </a:prstGeom>
+            <a:ln>
+              <a:solidFill>
+                <a:schemeClr val="tx1"/>
+              </a:solidFill>
+            </a:ln>
+          </p:spPr>
+          <p:style>
+            <a:lnRef idx="1">
+              <a:schemeClr val="accent1"/>
+            </a:lnRef>
+            <a:fillRef idx="0">
+              <a:schemeClr val="accent1"/>
+            </a:fillRef>
+            <a:effectRef idx="0">
+              <a:schemeClr val="accent1"/>
+            </a:effectRef>
+            <a:fontRef idx="minor">
+              <a:schemeClr val="tx1"/>
+            </a:fontRef>
+          </p:style>
+          <p:txBody>
+            <a:bodyPr rtlCol="0" anchor="ctr"/>
+            <a:lstStyle/>
+            <a:p>
+              <a:pPr algn="ctr"/>
+              <a:endParaRPr lang="en-US"/>
+            </a:p>
+          </p:txBody>
+        </p:sp>
+        <p:sp>
+          <p:nvSpPr>
+            <p:cNvPr id="6" name="TextBox 5"/>
+            <p:cNvSpPr txBox="1"/>
+            <p:nvPr/>
+          </p:nvSpPr>
+          <p:spPr>
+            <a:xfrm>
+              <a:off x="6876256" y="3851466"/>
+              <a:ext cx="1156086" cy="523220"/>
+            </a:xfrm>
+            <a:prstGeom prst="rect">
+              <a:avLst/>
+            </a:prstGeom>
+            <a:noFill/>
+          </p:spPr>
+          <p:txBody>
+            <a:bodyPr wrap="none" rtlCol="0">
+              <a:spAutoFit/>
+            </a:bodyPr>
+            <a:lstStyle/>
+            <a:p>
+              <a:r>
+                <a:rPr lang="en-US" sz="2800" dirty="0" smtClean="0"/>
+                <a:t>Hybrid</a:t>
+              </a:r>
+              <a:endParaRPr lang="en-US" sz="2800" dirty="0"/>
+            </a:p>
+          </p:txBody>
+        </p:sp>
+      </p:grpSp>
+    </p:spTree>
+    <p:extLst>
+      <p:ext uri="{BB962C8B-B14F-4D97-AF65-F5344CB8AC3E}">
+        <p14:creationId xmlns:p14="http://schemas.microsoft.com/office/powerpoint/2010/main" val="1972215598"/>
+      </p:ext>
+    </p:extLst>
+  </p:cSld>
+  <p:clrMapOvr>
+    <a:masterClrMapping/>
+  </p:clrMapOvr>
+  <p:timing>
+    <p:tnLst>
+      <p:par>
+        <p:cTn id="1" dur="indefinite" restart="never" nodeType="tmRoot">
+          <p:childTnLst>
+            <p:seq concurrent="1" nextAc="seek">
+              <p:cTn id="2" dur="indefinite" nodeType="mainSeq">
+                <p:childTnLst>
+                  <p:par>
+                    <p:cTn id="3" fill="hold">
+                      <p:stCondLst>
+                        <p:cond delay="indefinite"/>
+                        <p:cond evt="onBegin" delay="0">
+                          <p:tn val="2"/>
+                        </p:cond>
+                      </p:stCondLst>
+                      <p:childTnLst>
+                        <p:par>
+                          <p:cTn id="4" fill="hold">
+                            <p:stCondLst>
+                              <p:cond delay="0"/>
+                            </p:stCondLst>
+                            <p:childTnLst>
+                              <p:par>
+                                <p:cTn id="5" presetID="1" presetClass="entr" presetSubtype="0" fill="hold" grpId="0" nodeType="withEffect">
+                                  <p:stCondLst>
+                                    <p:cond delay="0"/>
+                                  </p:stCondLst>
+                                  <p:childTnLst>
+                                    <p:set>
+                                      <p:cBhvr>
+                                        <p:cTn id="6" dur="1" fill="hold">
+                                          <p:stCondLst>
+                                            <p:cond delay="0"/>
+                                          </p:stCondLst>
+                                        </p:cTn>
+                                        <p:tgtEl>
+                                          <p:spTgt spid="3">
+                                            <p:txEl>
+                                              <p:pRg st="0" end="0"/>
+                                            </p:txEl>
+                                          </p:spTgt>
+                                        </p:tgtEl>
+                                        <p:attrNameLst>
+                                          <p:attrName>style.visibility</p:attrName>
+                                        </p:attrNameLst>
+                                      </p:cBhvr>
+                                      <p:to>
+                                        <p:strVal val="visible"/>
+                                      </p:to>
+                                    </p:set>
+                                  </p:childTnLst>
+                                </p:cTn>
+                              </p:par>
+                            </p:childTnLst>
+                          </p:cTn>
+                        </p:par>
+                      </p:childTnLst>
+                    </p:cTn>
+                  </p:par>
+                  <p:par>
+                    <p:cTn id="7" fill="hold">
+                      <p:stCondLst>
+                        <p:cond delay="indefinite"/>
+                      </p:stCondLst>
+                      <p:childTnLst>
+                        <p:par>
+                          <p:cTn id="8" fill="hold">
+                            <p:stCondLst>
+                              <p:cond delay="0"/>
+                            </p:stCondLst>
+                            <p:childTnLst>
+                              <p:par>
+                                <p:cTn id="9" presetID="1" presetClass="entr" presetSubtype="0" fill="hold" grpId="0" nodeType="clickEffect">
+                                  <p:stCondLst>
+                                    <p:cond delay="0"/>
+                                  </p:stCondLst>
+                                  <p:childTnLst>
+                                    <p:set>
+                                      <p:cBhvr>
+                                        <p:cTn id="10" dur="1" fill="hold">
+                                          <p:stCondLst>
+                                            <p:cond delay="0"/>
+                                          </p:stCondLst>
+                                        </p:cTn>
+                                        <p:tgtEl>
+                                          <p:spTgt spid="3">
+                                            <p:txEl>
+                                              <p:pRg st="1" end="1"/>
+                                            </p:txEl>
+                                          </p:spTgt>
+                                        </p:tgtEl>
+                                        <p:attrNameLst>
+                                          <p:attrName>style.visibility</p:attrName>
+                                        </p:attrNameLst>
+                                      </p:cBhvr>
+                                      <p:to>
+                                        <p:strVal val="visible"/>
+                                      </p:to>
+                                    </p:set>
+                                  </p:childTnLst>
+                                </p:cTn>
+                              </p:par>
+                              <p:par>
+                                <p:cTn id="11" presetID="1" presetClass="entr" presetSubtype="0" fill="hold" grpId="0" nodeType="withEffect">
+                                  <p:stCondLst>
+                                    <p:cond delay="0"/>
+                                  </p:stCondLst>
+                                  <p:childTnLst>
+                                    <p:set>
+                                      <p:cBhvr>
+                                        <p:cTn id="12" dur="1" fill="hold">
+                                          <p:stCondLst>
+                                            <p:cond delay="0"/>
+                                          </p:stCondLst>
+                                        </p:cTn>
+                                        <p:tgtEl>
+                                          <p:spTgt spid="3">
+                                            <p:txEl>
+                                              <p:pRg st="2" end="2"/>
+                                            </p:txEl>
+                                          </p:spTgt>
+                                        </p:tgtEl>
+                                        <p:attrNameLst>
+                                          <p:attrName>style.visibility</p:attrName>
+                                        </p:attrNameLst>
+                                      </p:cBhvr>
+                                      <p:to>
+                                        <p:strVal val="visible"/>
+                                      </p:to>
+                                    </p:set>
+                                  </p:childTnLst>
+                                </p:cTn>
+                              </p:par>
+                            </p:childTnLst>
+                          </p:cTn>
+                        </p:par>
+                      </p:childTnLst>
+                    </p:cTn>
+                  </p:par>
+                  <p:par>
+                    <p:cTn id="13" fill="hold">
+                      <p:stCondLst>
+                        <p:cond delay="indefinite"/>
+                      </p:stCondLst>
+                      <p:childTnLst>
+                        <p:par>
+                          <p:cTn id="14" fill="hold">
+                            <p:stCondLst>
+                              <p:cond delay="0"/>
+                            </p:stCondLst>
+                            <p:childTnLst>
+                              <p:par>
+                                <p:cTn id="15" presetID="1" presetClass="entr" presetSubtype="0" fill="hold" grpId="0" nodeType="clickEffect">
+                                  <p:stCondLst>
+                                    <p:cond delay="0"/>
+                                  </p:stCondLst>
+                                  <p:childTnLst>
+                                    <p:set>
+                                      <p:cBhvr>
+                                        <p:cTn id="16" dur="1" fill="hold">
+                                          <p:stCondLst>
+                                            <p:cond delay="0"/>
+                                          </p:stCondLst>
+                                        </p:cTn>
+                                        <p:tgtEl>
+                                          <p:spTgt spid="3">
+                                            <p:txEl>
+                                              <p:pRg st="3" end="3"/>
+                                            </p:txEl>
+                                          </p:spTgt>
+                                        </p:tgtEl>
+                                        <p:attrNameLst>
+                                          <p:attrName>style.visibility</p:attrName>
+                                        </p:attrNameLst>
+                                      </p:cBhvr>
+                                      <p:to>
+                                        <p:strVal val="visible"/>
+                                      </p:to>
+                                    </p:set>
+                                  </p:childTnLst>
+                                </p:cTn>
+                              </p:par>
+                              <p:par>
+                                <p:cTn id="17" presetID="1" presetClass="entr" presetSubtype="0" fill="hold" grpId="0" nodeType="withEffect">
+                                  <p:stCondLst>
+                                    <p:cond delay="0"/>
+                                  </p:stCondLst>
+                                  <p:childTnLst>
+                                    <p:set>
+                                      <p:cBhvr>
+                                        <p:cTn id="18" dur="1" fill="hold">
+                                          <p:stCondLst>
+                                            <p:cond delay="0"/>
+                                          </p:stCondLst>
+                                        </p:cTn>
+                                        <p:tgtEl>
+                                          <p:spTgt spid="3">
+                                            <p:txEl>
+                                              <p:pRg st="4" end="4"/>
+                                            </p:txEl>
+                                          </p:spTgt>
+                                        </p:tgtEl>
+                                        <p:attrNameLst>
+                                          <p:attrName>style.visibility</p:attrName>
+                                        </p:attrNameLst>
+                                      </p:cBhvr>
+                                      <p:to>
+                                        <p:strVal val="visible"/>
+                                      </p:to>
+                                    </p:set>
+                                  </p:childTnLst>
+                                </p:cTn>
+                              </p:par>
+                            </p:childTnLst>
+                          </p:cTn>
+                        </p:par>
+                      </p:childTnLst>
+                    </p:cTn>
+                  </p:par>
+                  <p:par>
+                    <p:cTn id="19" fill="hold">
+                      <p:stCondLst>
+                        <p:cond delay="indefinite"/>
+                      </p:stCondLst>
+                      <p:childTnLst>
+                        <p:par>
+                          <p:cTn id="20" fill="hold">
+                            <p:stCondLst>
+                              <p:cond delay="0"/>
+                            </p:stCondLst>
+                            <p:childTnLst>
+                              <p:par>
+                                <p:cTn id="21" presetID="1" presetClass="entr" presetSubtype="0" fill="hold" grpId="0" nodeType="clickEffect">
+                                  <p:stCondLst>
+                                    <p:cond delay="0"/>
+                                  </p:stCondLst>
+                                  <p:childTnLst>
+                                    <p:set>
+                                      <p:cBhvr>
+                                        <p:cTn id="22" dur="1" fill="hold">
+                                          <p:stCondLst>
+                                            <p:cond delay="0"/>
+                                          </p:stCondLst>
+                                        </p:cTn>
+                                        <p:tgtEl>
+                                          <p:spTgt spid="3">
+                                            <p:txEl>
+                                              <p:pRg st="5" end="5"/>
+                                            </p:txEl>
+                                          </p:spTgt>
+                                        </p:tgtEl>
+                                        <p:attrNameLst>
+                                          <p:attrName>style.visibility</p:attrName>
+                                        </p:attrNameLst>
+                                      </p:cBhvr>
+                                      <p:to>
+                                        <p:strVal val="visible"/>
+                                      </p:to>
+                                    </p:set>
+                                  </p:childTnLst>
+                                </p:cTn>
+                              </p:par>
+                              <p:par>
+                                <p:cTn id="23" presetID="1" presetClass="entr" presetSubtype="0" fill="hold" grpId="0" nodeType="withEffect">
+                                  <p:stCondLst>
+                                    <p:cond delay="0"/>
+                                  </p:stCondLst>
+                                  <p:childTnLst>
+                                    <p:set>
+                                      <p:cBhvr>
+                                        <p:cTn id="24" dur="1" fill="hold">
+                                          <p:stCondLst>
+                                            <p:cond delay="0"/>
+                                          </p:stCondLst>
+                                        </p:cTn>
+                                        <p:tgtEl>
+                                          <p:spTgt spid="3">
+                                            <p:txEl>
+                                              <p:pRg st="6" end="6"/>
+                                            </p:txEl>
+                                          </p:spTgt>
+                                        </p:tgtEl>
+                                        <p:attrNameLst>
+                                          <p:attrName>style.visibility</p:attrName>
+                                        </p:attrNameLst>
+                                      </p:cBhvr>
+                                      <p:to>
+                                        <p:strVal val="visible"/>
+                                      </p:to>
+                                    </p:set>
+                                  </p:childTnLst>
+                                </p:cTn>
+                              </p:par>
+                            </p:childTnLst>
+                          </p:cTn>
+                        </p:par>
+                      </p:childTnLst>
+                    </p:cTn>
+                  </p:par>
+                  <p:par>
+                    <p:cTn id="25" fill="hold">
+                      <p:stCondLst>
+                        <p:cond delay="indefinite"/>
+                      </p:stCondLst>
+                      <p:childTnLst>
+                        <p:par>
+                          <p:cTn id="26" fill="hold">
+                            <p:stCondLst>
+                              <p:cond delay="0"/>
+                            </p:stCondLst>
+                            <p:childTnLst>
+                              <p:par>
+                                <p:cTn id="27" presetID="1" presetClass="entr" presetSubtype="0" fill="hold" nodeType="clickEffect">
+                                  <p:stCondLst>
+                                    <p:cond delay="0"/>
+                                  </p:stCondLst>
+                                  <p:childTnLst>
+                                    <p:set>
+                                      <p:cBhvr>
+                                        <p:cTn id="28" dur="1" fill="hold">
+                                          <p:stCondLst>
+                                            <p:cond delay="0"/>
+                                          </p:stCondLst>
+                                        </p:cTn>
+                                        <p:tgtEl>
+                                          <p:spTgt spid="7"/>
+                                        </p:tgtEl>
+                                        <p:attrNameLst>
+                                          <p:attrName>style.visibility</p:attrName>
+                                        </p:attrNameLst>
+                                      </p:cBhvr>
+                                      <p:to>
+                                        <p:strVal val="visible"/>
+                                      </p:to>
+                                    </p:set>
+                                  </p:childTnLst>
+                                </p:cTn>
+                              </p:par>
+                            </p:childTnLst>
+                          </p:cTn>
+                        </p:par>
+                      </p:childTnLst>
+                    </p:cTn>
+                  </p:par>
+                  <p:par>
+                    <p:cTn id="29" fill="hold">
+                      <p:stCondLst>
+                        <p:cond delay="indefinite"/>
+                      </p:stCondLst>
+                      <p:childTnLst>
+                        <p:par>
+                          <p:cTn id="30" fill="hold">
+                            <p:stCondLst>
+                              <p:cond delay="0"/>
+                            </p:stCondLst>
+                            <p:childTnLst>
+                              <p:par>
+                                <p:cTn id="31" presetID="1" presetClass="entr" presetSubtype="0" fill="hold" grpId="0" nodeType="clickEffect">
+                                  <p:stCondLst>
+                                    <p:cond delay="0"/>
+                                  </p:stCondLst>
+                                  <p:childTnLst>
+                                    <p:set>
+                                      <p:cBhvr>
+                                        <p:cTn id="32" dur="1" fill="hold">
+                                          <p:stCondLst>
+                                            <p:cond delay="0"/>
+                                          </p:stCondLst>
+                                        </p:cTn>
+                                        <p:tgtEl>
+                                          <p:spTgt spid="3">
+                                            <p:txEl>
+                                              <p:pRg st="7" end="7"/>
+                                            </p:txEl>
+                                          </p:spTgt>
+                                        </p:tgtEl>
+                                        <p:attrNameLst>
+                                          <p:attrName>style.visibility</p:attrName>
+                                        </p:attrNameLst>
+                                      </p:cBhvr>
+                                      <p:to>
+                                        <p:strVal val="visible"/>
+                                      </p:to>
+                                    </p:set>
+                                  </p:childTnLst>
+                                </p:cTn>
+                              </p:par>
+                              <p:par>
+                                <p:cTn id="33" presetID="1" presetClass="entr" presetSubtype="0" fill="hold" grpId="0" nodeType="withEffect">
+                                  <p:stCondLst>
+                                    <p:cond delay="0"/>
+                                  </p:stCondLst>
+                                  <p:childTnLst>
+                                    <p:set>
+                                      <p:cBhvr>
+                                        <p:cTn id="34" dur="1" fill="hold">
+                                          <p:stCondLst>
+                                            <p:cond delay="0"/>
+                                          </p:stCondLst>
+                                        </p:cTn>
+                                        <p:tgtEl>
+                                          <p:spTgt spid="3">
+                                            <p:txEl>
+                                              <p:pRg st="8" end="8"/>
+                                            </p:txEl>
+                                          </p:spTgt>
+                                        </p:tgtEl>
+                                        <p:attrNameLst>
+                                          <p:attrName>style.visibility</p:attrName>
+                                        </p:attrNameLst>
+                                      </p:cBhvr>
+                                      <p:to>
+                                        <p:strVal val="visible"/>
+                                      </p:to>
+                                    </p:set>
+                                  </p:childTnLst>
+                                </p:cTn>
+                              </p:par>
+                            </p:childTnLst>
+                          </p:cTn>
+                        </p:par>
+                      </p:childTnLst>
+                    </p:cTn>
+                  </p:par>
+                </p:childTnLst>
+              </p:cTn>
+              <p:prevCondLst>
+                <p:cond evt="onPrev" delay="0">
+                  <p:tgtEl>
+                    <p:sldTgt/>
+                  </p:tgtEl>
+                </p:cond>
+              </p:prevCondLst>
+              <p:nextCondLst>
+                <p:cond evt="onNext" delay="0">
+                  <p:tgtEl>
+                    <p:sldTgt/>
+                  </p:tgtEl>
+                </p:cond>
+              </p:nextCondLst>
+            </p:seq>
+          </p:childTnLst>
+        </p:cTn>
+      </p:par>
+    </p:tnLst>
+    <p:bldLst>
+      <p:bldP spid="3" grpId="0" uiExpand="1" build="p" bldLvl="2"/>
+    </p:bldLst>
+  </p:timing>
+</p:sld>
+</file>
+
+<file path=ppt/slides/slide24.xml><?xml version="1.0" encoding="utf-8"?>
 <p:sld xmlns:a="http://schemas.openxmlformats.org/drawingml/2006/main" xmlns:r="http://schemas.openxmlformats.org/officeDocument/2006/relationships" xmlns:p="http://schemas.openxmlformats.org/presentationml/2006/main">
   <p:cSld>
     <p:spTree>
@@ -21998,7 +25222,7 @@
           <a:p>
             <a:fld id="{6597116C-F94B-4B5B-973A-17F07FB5C418}" type="slidenum">
               <a:rPr lang="nl-BE" smtClean="0"/>
-              <a:t>23</a:t>
+              <a:t>24</a:t>
             </a:fld>
             <a:endParaRPr lang="nl-BE"/>
           </a:p>

</xml_diff>

<commit_message>
Added PCI-express (accelerator) latency
</commit_message>
<xml_diff>
--- a/Optimization/hpc_efficiency.pptx
+++ b/Optimization/hpc_efficiency.pptx
@@ -259,11 +259,11 @@
           <c:showPercent val="0"/>
           <c:showBubbleSize val="0"/>
         </c:dLbls>
-        <c:axId val="351961136"/>
-        <c:axId val="351966624"/>
+        <c:axId val="130684888"/>
+        <c:axId val="130684496"/>
       </c:scatterChart>
       <c:valAx>
-        <c:axId val="351961136"/>
+        <c:axId val="130684888"/>
         <c:scaling>
           <c:logBase val="2"/>
           <c:orientation val="minMax"/>
@@ -275,14 +275,14 @@
         <c:majorTickMark val="out"/>
         <c:minorTickMark val="none"/>
         <c:tickLblPos val="nextTo"/>
-        <c:crossAx val="351966624"/>
+        <c:crossAx val="130684496"/>
         <c:crosses val="autoZero"/>
         <c:crossBetween val="midCat"/>
         <c:majorUnit val="4"/>
         <c:minorUnit val="4"/>
       </c:valAx>
       <c:valAx>
-        <c:axId val="351966624"/>
+        <c:axId val="130684496"/>
         <c:scaling>
           <c:logBase val="2"/>
           <c:orientation val="minMax"/>
@@ -295,7 +295,7 @@
         <c:majorTickMark val="out"/>
         <c:minorTickMark val="none"/>
         <c:tickLblPos val="nextTo"/>
-        <c:crossAx val="351961136"/>
+        <c:crossAx val="130684888"/>
         <c:crosses val="autoZero"/>
         <c:crossBetween val="midCat"/>
         <c:majorUnit val="4"/>
@@ -668,11 +668,11 @@
           <c:showPercent val="0"/>
           <c:showBubbleSize val="0"/>
         </c:dLbls>
-        <c:axId val="351960744"/>
-        <c:axId val="351962312"/>
+        <c:axId val="130682536"/>
+        <c:axId val="130682144"/>
       </c:scatterChart>
       <c:valAx>
-        <c:axId val="351960744"/>
+        <c:axId val="130682536"/>
         <c:scaling>
           <c:logBase val="2"/>
           <c:orientation val="minMax"/>
@@ -685,14 +685,14 @@
         <c:majorTickMark val="out"/>
         <c:minorTickMark val="none"/>
         <c:tickLblPos val="nextTo"/>
-        <c:crossAx val="351962312"/>
+        <c:crossAx val="130682144"/>
         <c:crosses val="autoZero"/>
         <c:crossBetween val="midCat"/>
         <c:majorUnit val="4"/>
         <c:minorUnit val="4"/>
       </c:valAx>
       <c:valAx>
-        <c:axId val="351962312"/>
+        <c:axId val="130682144"/>
         <c:scaling>
           <c:logBase val="2"/>
           <c:orientation val="minMax"/>
@@ -706,7 +706,7 @@
         <c:majorTickMark val="out"/>
         <c:minorTickMark val="none"/>
         <c:tickLblPos val="nextTo"/>
-        <c:crossAx val="351960744"/>
+        <c:crossAx val="130682536"/>
         <c:crosses val="autoZero"/>
         <c:crossBetween val="midCat"/>
         <c:majorUnit val="4"/>
@@ -919,11 +919,11 @@
           <c:showPercent val="0"/>
           <c:showBubbleSize val="0"/>
         </c:dLbls>
-        <c:axId val="351967408"/>
-        <c:axId val="281641496"/>
+        <c:axId val="130681360"/>
+        <c:axId val="131163312"/>
       </c:scatterChart>
       <c:valAx>
-        <c:axId val="351967408"/>
+        <c:axId val="130681360"/>
         <c:scaling>
           <c:logBase val="2"/>
           <c:orientation val="minMax"/>
@@ -936,13 +936,13 @@
         <c:majorTickMark val="out"/>
         <c:minorTickMark val="none"/>
         <c:tickLblPos val="nextTo"/>
-        <c:crossAx val="281641496"/>
+        <c:crossAx val="131163312"/>
         <c:crosses val="autoZero"/>
         <c:crossBetween val="midCat"/>
         <c:minorUnit val="4"/>
       </c:valAx>
       <c:valAx>
-        <c:axId val="281641496"/>
+        <c:axId val="131163312"/>
         <c:scaling>
           <c:logBase val="2"/>
           <c:orientation val="minMax"/>
@@ -956,7 +956,7 @@
         <c:majorTickMark val="out"/>
         <c:minorTickMark val="none"/>
         <c:tickLblPos val="nextTo"/>
-        <c:crossAx val="351967408"/>
+        <c:crossAx val="130681360"/>
         <c:crosses val="autoZero"/>
         <c:crossBetween val="midCat"/>
         <c:majorUnit val="2"/>
@@ -1087,11 +1087,11 @@
           <c:showPercent val="0"/>
           <c:showBubbleSize val="0"/>
         </c:dLbls>
-        <c:axId val="354369888"/>
-        <c:axId val="354375768"/>
+        <c:axId val="129625160"/>
+        <c:axId val="131166448"/>
       </c:scatterChart>
       <c:valAx>
-        <c:axId val="354369888"/>
+        <c:axId val="129625160"/>
         <c:scaling>
           <c:logBase val="2"/>
           <c:orientation val="minMax"/>
@@ -1104,13 +1104,13 @@
         <c:majorTickMark val="out"/>
         <c:minorTickMark val="none"/>
         <c:tickLblPos val="nextTo"/>
-        <c:crossAx val="354375768"/>
+        <c:crossAx val="131166448"/>
         <c:crosses val="autoZero"/>
         <c:crossBetween val="midCat"/>
         <c:majorUnit val="4"/>
       </c:valAx>
       <c:valAx>
-        <c:axId val="354375768"/>
+        <c:axId val="131166448"/>
         <c:scaling>
           <c:logBase val="2"/>
           <c:orientation val="minMax"/>
@@ -1123,7 +1123,7 @@
         <c:majorTickMark val="out"/>
         <c:minorTickMark val="none"/>
         <c:tickLblPos val="nextTo"/>
-        <c:crossAx val="354369888"/>
+        <c:crossAx val="129625160"/>
         <c:crosses val="autoZero"/>
         <c:crossBetween val="midCat"/>
         <c:majorUnit val="2"/>
@@ -1249,11 +1249,11 @@
           <c:showPercent val="0"/>
           <c:showBubbleSize val="0"/>
         </c:dLbls>
-        <c:axId val="354373024"/>
-        <c:axId val="354370280"/>
+        <c:axId val="131165272"/>
+        <c:axId val="131164880"/>
       </c:scatterChart>
       <c:valAx>
-        <c:axId val="354373024"/>
+        <c:axId val="131165272"/>
         <c:scaling>
           <c:logBase val="2"/>
           <c:orientation val="minMax"/>
@@ -1266,14 +1266,14 @@
         <c:majorTickMark val="out"/>
         <c:minorTickMark val="none"/>
         <c:tickLblPos val="nextTo"/>
-        <c:crossAx val="354370280"/>
+        <c:crossAx val="131164880"/>
         <c:crosses val="autoZero"/>
         <c:crossBetween val="midCat"/>
         <c:majorUnit val="4"/>
         <c:minorUnit val="4"/>
       </c:valAx>
       <c:valAx>
-        <c:axId val="354370280"/>
+        <c:axId val="131164880"/>
         <c:scaling>
           <c:orientation val="minMax"/>
           <c:max val="1"/>
@@ -1285,7 +1285,7 @@
         <c:majorTickMark val="out"/>
         <c:minorTickMark val="none"/>
         <c:tickLblPos val="nextTo"/>
-        <c:crossAx val="354373024"/>
+        <c:crossAx val="131165272"/>
         <c:crosses val="autoZero"/>
         <c:crossBetween val="midCat"/>
       </c:valAx>
@@ -1382,7 +1382,7 @@
           <a:p>
             <a:fld id="{2E6AAE95-D4FC-4D00-935A-EAE928727A56}" type="datetimeFigureOut">
               <a:rPr lang="en-US" smtClean="0"/>
-              <a:t>2016-06-15</a:t>
+              <a:t>6/28/2016</a:t>
             </a:fld>
             <a:endParaRPr lang="en-US"/>
           </a:p>
@@ -1915,7 +1915,7 @@
           <a:p>
             <a:fld id="{1CFF3F78-F57F-4409-A41B-5EC46D4F404B}" type="datetime1">
               <a:rPr lang="nl-BE" smtClean="0"/>
-              <a:t>15/06/2016</a:t>
+              <a:t>2016-06-28</a:t>
             </a:fld>
             <a:endParaRPr lang="nl-BE"/>
           </a:p>
@@ -2085,7 +2085,7 @@
           <a:p>
             <a:fld id="{7D029E61-52E3-412C-82EB-2F81B17C0AF1}" type="datetime1">
               <a:rPr lang="nl-BE" smtClean="0"/>
-              <a:t>15/06/2016</a:t>
+              <a:t>2016-06-28</a:t>
             </a:fld>
             <a:endParaRPr lang="nl-BE"/>
           </a:p>
@@ -2265,7 +2265,7 @@
           <a:p>
             <a:fld id="{A83F1CEF-A38E-4001-89C6-F3FC7784F299}" type="datetime1">
               <a:rPr lang="nl-BE" smtClean="0"/>
-              <a:t>15/06/2016</a:t>
+              <a:t>2016-06-28</a:t>
             </a:fld>
             <a:endParaRPr lang="nl-BE"/>
           </a:p>
@@ -2391,7 +2391,7 @@
           <a:p>
             <a:fld id="{1FDE84DB-AADA-4C3F-BF46-CA664A504479}" type="datetime1">
               <a:rPr lang="nl-BE" smtClean="0"/>
-              <a:t>15/06/2016</a:t>
+              <a:t>2016-06-28</a:t>
             </a:fld>
             <a:endParaRPr lang="nl-BE" dirty="0"/>
           </a:p>
@@ -2635,7 +2635,7 @@
           <a:p>
             <a:fld id="{8CD53A43-C15C-4F05-9AD7-DB9DE837084D}" type="datetime1">
               <a:rPr lang="nl-BE" smtClean="0"/>
-              <a:t>15/06/2016</a:t>
+              <a:t>2016-06-28</a:t>
             </a:fld>
             <a:endParaRPr lang="nl-BE"/>
           </a:p>
@@ -2881,7 +2881,7 @@
           <a:p>
             <a:fld id="{8994D238-D949-4AEF-9753-A8B6EFA964A0}" type="datetime1">
               <a:rPr lang="nl-BE" smtClean="0"/>
-              <a:t>15/06/2016</a:t>
+              <a:t>2016-06-28</a:t>
             </a:fld>
             <a:endParaRPr lang="nl-BE"/>
           </a:p>
@@ -3169,7 +3169,7 @@
           <a:p>
             <a:fld id="{4D234023-BF99-4AD0-835E-8125DA2B6664}" type="datetime1">
               <a:rPr lang="nl-BE" smtClean="0"/>
-              <a:t>15/06/2016</a:t>
+              <a:t>2016-06-28</a:t>
             </a:fld>
             <a:endParaRPr lang="nl-BE"/>
           </a:p>
@@ -3591,7 +3591,7 @@
           <a:p>
             <a:fld id="{DB075A73-5C1D-406E-9444-3C5C58580E8E}" type="datetime1">
               <a:rPr lang="nl-BE" smtClean="0"/>
-              <a:t>15/06/2016</a:t>
+              <a:t>2016-06-28</a:t>
             </a:fld>
             <a:endParaRPr lang="nl-BE"/>
           </a:p>
@@ -3709,7 +3709,7 @@
           <a:p>
             <a:fld id="{E111FB2D-2E17-4D8F-A64A-4EB0C3D12494}" type="datetime1">
               <a:rPr lang="nl-BE" smtClean="0"/>
-              <a:t>15/06/2016</a:t>
+              <a:t>2016-06-28</a:t>
             </a:fld>
             <a:endParaRPr lang="nl-BE"/>
           </a:p>
@@ -3804,7 +3804,7 @@
           <a:p>
             <a:fld id="{5BE27D71-2267-4E44-9F33-05B60E5C7D9D}" type="datetime1">
               <a:rPr lang="nl-BE" smtClean="0"/>
-              <a:t>15/06/2016</a:t>
+              <a:t>2016-06-28</a:t>
             </a:fld>
             <a:endParaRPr lang="nl-BE"/>
           </a:p>
@@ -4081,7 +4081,7 @@
           <a:p>
             <a:fld id="{182F587C-96C8-4813-A767-3084061A3229}" type="datetime1">
               <a:rPr lang="nl-BE" smtClean="0"/>
-              <a:t>15/06/2016</a:t>
+              <a:t>2016-06-28</a:t>
             </a:fld>
             <a:endParaRPr lang="nl-BE"/>
           </a:p>
@@ -4334,7 +4334,7 @@
           <a:p>
             <a:fld id="{8B021CF8-BBBB-4DFA-8713-49842AA07274}" type="datetime1">
               <a:rPr lang="nl-BE" smtClean="0"/>
-              <a:t>15/06/2016</a:t>
+              <a:t>2016-06-28</a:t>
             </a:fld>
             <a:endParaRPr lang="nl-BE"/>
           </a:p>
@@ -4547,7 +4547,7 @@
           <a:p>
             <a:fld id="{CDBFABB5-0AB3-4CB6-A705-6887DEB1F9F2}" type="datetime1">
               <a:rPr lang="nl-BE" smtClean="0"/>
-              <a:t>15/06/2016</a:t>
+              <a:t>2016-06-28</a:t>
             </a:fld>
             <a:endParaRPr lang="nl-BE"/>
           </a:p>
@@ -6688,7 +6688,7 @@
           <a:graphicData uri="http://schemas.openxmlformats.org/presentationml/2006/ole">
             <mc:AlternateContent xmlns:mc="http://schemas.openxmlformats.org/markup-compatibility/2006">
               <mc:Choice xmlns:v="urn:schemas-microsoft-com:vml" Requires="v">
-                <p:oleObj spid="_x0000_s1086" name="Equation" r:id="rId3" imgW="812520" imgH="393480" progId="Equation.3">
+                <p:oleObj spid="_x0000_s1094" name="Equation" r:id="rId3" imgW="812520" imgH="393480" progId="Equation.3">
                   <p:embed/>
                 </p:oleObj>
               </mc:Choice>
@@ -6745,7 +6745,7 @@
           <a:graphicData uri="http://schemas.openxmlformats.org/presentationml/2006/ole">
             <mc:AlternateContent xmlns:mc="http://schemas.openxmlformats.org/markup-compatibility/2006">
               <mc:Choice xmlns:v="urn:schemas-microsoft-com:vml" Requires="v">
-                <p:oleObj spid="_x0000_s1087" name="Equation" r:id="rId5" imgW="2489040" imgH="431640" progId="Equation.3">
+                <p:oleObj spid="_x0000_s1095" name="Equation" r:id="rId5" imgW="2489040" imgH="431640" progId="Equation.3">
                   <p:embed/>
                 </p:oleObj>
               </mc:Choice>
@@ -16551,14 +16551,7 @@
                 <a:latin typeface="Courier New" panose="02070309020205020404" pitchFamily="49" charset="0"/>
                 <a:cs typeface="Courier New" panose="02070309020205020404" pitchFamily="49" charset="0"/>
               </a:rPr>
-              <a:t> a[n</a:t>
-            </a:r>
-            <a:r>
-              <a:rPr lang="en-US" sz="2000" dirty="0" smtClean="0">
-                <a:latin typeface="Courier New" panose="02070309020205020404" pitchFamily="49" charset="0"/>
-                <a:cs typeface="Courier New" panose="02070309020205020404" pitchFamily="49" charset="0"/>
-              </a:rPr>
-              <a:t>];</a:t>
+              <a:t> a[n];</a:t>
             </a:r>
           </a:p>
           <a:p>
@@ -16627,10 +16620,6 @@
               </a:rPr>
               <a:t> += K)</a:t>
             </a:r>
-            <a:endParaRPr lang="en-US" sz="2000" dirty="0" smtClean="0">
-              <a:latin typeface="Courier New" panose="02070309020205020404" pitchFamily="49" charset="0"/>
-              <a:cs typeface="Courier New" panose="02070309020205020404" pitchFamily="49" charset="0"/>
-            </a:endParaRPr>
           </a:p>
           <a:p>
             <a:r>
@@ -16645,14 +16634,7 @@
                 <a:latin typeface="Courier New" panose="02070309020205020404" pitchFamily="49" charset="0"/>
                 <a:cs typeface="Courier New" panose="02070309020205020404" pitchFamily="49" charset="0"/>
               </a:rPr>
-              <a:t>   </a:t>
-            </a:r>
-            <a:r>
-              <a:rPr lang="en-US" sz="2000" dirty="0" smtClean="0">
-                <a:latin typeface="Courier New" panose="02070309020205020404" pitchFamily="49" charset="0"/>
-                <a:cs typeface="Courier New" panose="02070309020205020404" pitchFamily="49" charset="0"/>
-              </a:rPr>
-              <a:t>a[</a:t>
+              <a:t>   a[</a:t>
             </a:r>
             <a:r>
               <a:rPr lang="en-US" sz="2000" dirty="0" err="1" smtClean="0">
@@ -17176,7 +17158,7 @@
           <a:graphicData uri="http://schemas.openxmlformats.org/presentationml/2006/ole">
             <mc:AlternateContent xmlns:mc="http://schemas.openxmlformats.org/markup-compatibility/2006">
               <mc:Choice xmlns:v="urn:schemas-microsoft-com:vml" Requires="v">
-                <p:oleObj spid="_x0000_s2075" name="Equation" r:id="rId3" imgW="1091880" imgH="1041120" progId="Equation.3">
+                <p:oleObj spid="_x0000_s2083" name="Equation" r:id="rId3" imgW="1091880" imgH="1041120" progId="Equation.3">
                   <p:embed/>
                 </p:oleObj>
               </mc:Choice>
@@ -18547,7 +18529,7 @@
           <a:graphicData uri="http://schemas.openxmlformats.org/presentationml/2006/ole">
             <mc:AlternateContent xmlns:mc="http://schemas.openxmlformats.org/markup-compatibility/2006">
               <mc:Choice xmlns:v="urn:schemas-microsoft-com:vml" Requires="v">
-                <p:oleObj spid="_x0000_s2076" name="Equation" r:id="rId5" imgW="1091880" imgH="1041120" progId="Equation.3">
+                <p:oleObj spid="_x0000_s2084" name="Equation" r:id="rId5" imgW="1091880" imgH="1041120" progId="Equation.3">
                   <p:embed/>
                 </p:oleObj>
               </mc:Choice>
@@ -21381,19 +21363,7 @@
           <a:p>
             <a:r>
               <a:rPr lang="en-US" dirty="0" smtClean="0"/>
-              <a:t>Vector r</a:t>
-            </a:r>
-            <a:r>
-              <a:rPr lang="en-US" dirty="0" smtClean="0"/>
-              <a:t>egisters </a:t>
-            </a:r>
-            <a:r>
-              <a:rPr lang="en-US" dirty="0" smtClean="0"/>
-              <a:t>for floating </a:t>
-            </a:r>
-            <a:r>
-              <a:rPr lang="en-US" dirty="0" smtClean="0"/>
-              <a:t>point operands:</a:t>
+              <a:t>Vector registers for floating point operands:</a:t>
             </a:r>
             <a:br>
               <a:rPr lang="en-US" dirty="0" smtClean="0"/>
@@ -21402,7 +21372,6 @@
               <a:rPr lang="en-US" dirty="0" smtClean="0"/>
               <a:t>256 bit wide</a:t>
             </a:r>
-            <a:endParaRPr lang="en-US" dirty="0" smtClean="0"/>
           </a:p>
           <a:p>
             <a:pPr lvl="1"/>
@@ -21419,11 +21388,7 @@
             <a:pPr lvl="1"/>
             <a:r>
               <a:rPr lang="en-US" dirty="0" smtClean="0"/>
-              <a:t>8 </a:t>
-            </a:r>
-            <a:r>
-              <a:rPr lang="en-US" dirty="0" smtClean="0"/>
-              <a:t>single precision</a:t>
+              <a:t>8 single precision</a:t>
             </a:r>
             <a:endParaRPr lang="en-US" dirty="0"/>
           </a:p>
@@ -25228,6 +25193,132 @@
           </a:p>
         </p:txBody>
       </p:sp>
+      <p:grpSp>
+        <p:nvGrpSpPr>
+          <p:cNvPr id="70" name="Group 69"/>
+          <p:cNvGrpSpPr/>
+          <p:nvPr/>
+        </p:nvGrpSpPr>
+        <p:grpSpPr>
+          <a:xfrm>
+            <a:off x="5067786" y="2296458"/>
+            <a:ext cx="3636429" cy="369332"/>
+            <a:chOff x="4427984" y="5656602"/>
+            <a:chExt cx="3636429" cy="369332"/>
+          </a:xfrm>
+        </p:grpSpPr>
+        <p:sp>
+          <p:nvSpPr>
+            <p:cNvPr id="71" name="TextBox 70"/>
+            <p:cNvSpPr txBox="1"/>
+            <p:nvPr/>
+          </p:nvSpPr>
+          <p:spPr>
+            <a:xfrm>
+              <a:off x="4427984" y="5656602"/>
+              <a:ext cx="861133" cy="369332"/>
+            </a:xfrm>
+            <a:prstGeom prst="rect">
+              <a:avLst/>
+            </a:prstGeom>
+            <a:noFill/>
+            <a:ln>
+              <a:solidFill>
+                <a:schemeClr val="tx1">
+                  <a:lumMod val="50000"/>
+                  <a:lumOff val="50000"/>
+                </a:schemeClr>
+              </a:solidFill>
+            </a:ln>
+          </p:spPr>
+          <p:txBody>
+            <a:bodyPr wrap="none" rtlCol="0">
+              <a:spAutoFit/>
+            </a:bodyPr>
+            <a:lstStyle/>
+            <a:p>
+              <a:r>
+                <a:rPr lang="en-US" dirty="0" smtClean="0"/>
+                <a:t>GPGPU</a:t>
+              </a:r>
+              <a:endParaRPr lang="nl-BE" dirty="0"/>
+            </a:p>
+          </p:txBody>
+        </p:sp>
+        <p:sp>
+          <p:nvSpPr>
+            <p:cNvPr id="72" name="TextBox 71"/>
+            <p:cNvSpPr txBox="1"/>
+            <p:nvPr/>
+          </p:nvSpPr>
+          <p:spPr>
+            <a:xfrm>
+              <a:off x="6686856" y="5656602"/>
+              <a:ext cx="1377557" cy="369332"/>
+            </a:xfrm>
+            <a:prstGeom prst="rect">
+              <a:avLst/>
+            </a:prstGeom>
+            <a:noFill/>
+          </p:spPr>
+          <p:txBody>
+            <a:bodyPr wrap="none" rtlCol="0">
+              <a:spAutoFit/>
+            </a:bodyPr>
+            <a:lstStyle/>
+            <a:p>
+              <a:r>
+                <a:rPr lang="en-US" dirty="0" smtClean="0"/>
+                <a:t>20</a:t>
+              </a:r>
+              <a:r>
+                <a:rPr lang="en-US" dirty="0" smtClean="0"/>
+                <a:t>000 </a:t>
+              </a:r>
+              <a:r>
+                <a:rPr lang="en-US" dirty="0" smtClean="0"/>
+                <a:t>cycles</a:t>
+              </a:r>
+              <a:endParaRPr lang="nl-BE" dirty="0"/>
+            </a:p>
+          </p:txBody>
+        </p:sp>
+        <p:cxnSp>
+          <p:nvCxnSpPr>
+            <p:cNvPr id="73" name="Straight Connector 72"/>
+            <p:cNvCxnSpPr/>
+            <p:nvPr/>
+          </p:nvCxnSpPr>
+          <p:spPr>
+            <a:xfrm>
+              <a:off x="6228184" y="5841268"/>
+              <a:ext cx="144016" cy="0"/>
+            </a:xfrm>
+            <a:prstGeom prst="line">
+              <a:avLst/>
+            </a:prstGeom>
+            <a:ln w="19050">
+              <a:solidFill>
+                <a:schemeClr val="tx1"/>
+              </a:solidFill>
+            </a:ln>
+          </p:spPr>
+          <p:style>
+            <a:lnRef idx="1">
+              <a:schemeClr val="accent1"/>
+            </a:lnRef>
+            <a:fillRef idx="0">
+              <a:schemeClr val="accent1"/>
+            </a:fillRef>
+            <a:effectRef idx="0">
+              <a:schemeClr val="accent1"/>
+            </a:effectRef>
+            <a:fontRef idx="minor">
+              <a:schemeClr val="tx1"/>
+            </a:fontRef>
+          </p:style>
+        </p:cxnSp>
+      </p:grpSp>
     </p:spTree>
     <p:extLst>
       <p:ext uri="{BB962C8B-B14F-4D97-AF65-F5344CB8AC3E}">

</xml_diff>

<commit_message>
Added slide on various bandwidth figures (to be verified)
</commit_message>
<xml_diff>
--- a/Optimization/hpc_efficiency.pptx
+++ b/Optimization/hpc_efficiency.pptx
@@ -5,7 +5,7 @@
     <p:sldMasterId id="2147483648" r:id="rId1"/>
   </p:sldMasterIdLst>
   <p:notesMasterIdLst>
-    <p:notesMasterId r:id="rId26"/>
+    <p:notesMasterId r:id="rId27"/>
   </p:notesMasterIdLst>
   <p:sldIdLst>
     <p:sldId id="267" r:id="rId2"/>
@@ -32,6 +32,7 @@
     <p:sldId id="281" r:id="rId23"/>
     <p:sldId id="282" r:id="rId24"/>
     <p:sldId id="271" r:id="rId25"/>
+    <p:sldId id="283" r:id="rId26"/>
   </p:sldIdLst>
   <p:sldSz cx="9144000" cy="6858000" type="screen4x3"/>
   <p:notesSz cx="6858000" cy="9144000"/>
@@ -259,11 +260,11 @@
           <c:showPercent val="0"/>
           <c:showBubbleSize val="0"/>
         </c:dLbls>
-        <c:axId val="130684888"/>
-        <c:axId val="130684496"/>
+        <c:axId val="163374752"/>
+        <c:axId val="163608056"/>
       </c:scatterChart>
       <c:valAx>
-        <c:axId val="130684888"/>
+        <c:axId val="163374752"/>
         <c:scaling>
           <c:logBase val="2"/>
           <c:orientation val="minMax"/>
@@ -275,14 +276,14 @@
         <c:majorTickMark val="out"/>
         <c:minorTickMark val="none"/>
         <c:tickLblPos val="nextTo"/>
-        <c:crossAx val="130684496"/>
+        <c:crossAx val="163608056"/>
         <c:crosses val="autoZero"/>
         <c:crossBetween val="midCat"/>
         <c:majorUnit val="4"/>
         <c:minorUnit val="4"/>
       </c:valAx>
       <c:valAx>
-        <c:axId val="130684496"/>
+        <c:axId val="163608056"/>
         <c:scaling>
           <c:logBase val="2"/>
           <c:orientation val="minMax"/>
@@ -295,7 +296,7 @@
         <c:majorTickMark val="out"/>
         <c:minorTickMark val="none"/>
         <c:tickLblPos val="nextTo"/>
-        <c:crossAx val="130684888"/>
+        <c:crossAx val="163374752"/>
         <c:crosses val="autoZero"/>
         <c:crossBetween val="midCat"/>
         <c:majorUnit val="4"/>
@@ -668,11 +669,11 @@
           <c:showPercent val="0"/>
           <c:showBubbleSize val="0"/>
         </c:dLbls>
-        <c:axId val="130682536"/>
-        <c:axId val="130682144"/>
+        <c:axId val="163609232"/>
+        <c:axId val="163609624"/>
       </c:scatterChart>
       <c:valAx>
-        <c:axId val="130682536"/>
+        <c:axId val="163609232"/>
         <c:scaling>
           <c:logBase val="2"/>
           <c:orientation val="minMax"/>
@@ -685,14 +686,14 @@
         <c:majorTickMark val="out"/>
         <c:minorTickMark val="none"/>
         <c:tickLblPos val="nextTo"/>
-        <c:crossAx val="130682144"/>
+        <c:crossAx val="163609624"/>
         <c:crosses val="autoZero"/>
         <c:crossBetween val="midCat"/>
         <c:majorUnit val="4"/>
         <c:minorUnit val="4"/>
       </c:valAx>
       <c:valAx>
-        <c:axId val="130682144"/>
+        <c:axId val="163609624"/>
         <c:scaling>
           <c:logBase val="2"/>
           <c:orientation val="minMax"/>
@@ -706,7 +707,7 @@
         <c:majorTickMark val="out"/>
         <c:minorTickMark val="none"/>
         <c:tickLblPos val="nextTo"/>
-        <c:crossAx val="130682536"/>
+        <c:crossAx val="163609232"/>
         <c:crosses val="autoZero"/>
         <c:crossBetween val="midCat"/>
         <c:majorUnit val="4"/>
@@ -919,11 +920,11 @@
           <c:showPercent val="0"/>
           <c:showBubbleSize val="0"/>
         </c:dLbls>
-        <c:axId val="130681360"/>
-        <c:axId val="131163312"/>
+        <c:axId val="163610408"/>
+        <c:axId val="163610800"/>
       </c:scatterChart>
       <c:valAx>
-        <c:axId val="130681360"/>
+        <c:axId val="163610408"/>
         <c:scaling>
           <c:logBase val="2"/>
           <c:orientation val="minMax"/>
@@ -936,13 +937,13 @@
         <c:majorTickMark val="out"/>
         <c:minorTickMark val="none"/>
         <c:tickLblPos val="nextTo"/>
-        <c:crossAx val="131163312"/>
+        <c:crossAx val="163610800"/>
         <c:crosses val="autoZero"/>
         <c:crossBetween val="midCat"/>
         <c:minorUnit val="4"/>
       </c:valAx>
       <c:valAx>
-        <c:axId val="131163312"/>
+        <c:axId val="163610800"/>
         <c:scaling>
           <c:logBase val="2"/>
           <c:orientation val="minMax"/>
@@ -956,7 +957,7 @@
         <c:majorTickMark val="out"/>
         <c:minorTickMark val="none"/>
         <c:tickLblPos val="nextTo"/>
-        <c:crossAx val="130681360"/>
+        <c:crossAx val="163610408"/>
         <c:crosses val="autoZero"/>
         <c:crossBetween val="midCat"/>
         <c:majorUnit val="2"/>
@@ -1087,11 +1088,11 @@
           <c:showPercent val="0"/>
           <c:showBubbleSize val="0"/>
         </c:dLbls>
-        <c:axId val="129625160"/>
-        <c:axId val="131166448"/>
+        <c:axId val="163611584"/>
+        <c:axId val="165447424"/>
       </c:scatterChart>
       <c:valAx>
-        <c:axId val="129625160"/>
+        <c:axId val="163611584"/>
         <c:scaling>
           <c:logBase val="2"/>
           <c:orientation val="minMax"/>
@@ -1104,13 +1105,13 @@
         <c:majorTickMark val="out"/>
         <c:minorTickMark val="none"/>
         <c:tickLblPos val="nextTo"/>
-        <c:crossAx val="131166448"/>
+        <c:crossAx val="165447424"/>
         <c:crosses val="autoZero"/>
         <c:crossBetween val="midCat"/>
         <c:majorUnit val="4"/>
       </c:valAx>
       <c:valAx>
-        <c:axId val="131166448"/>
+        <c:axId val="165447424"/>
         <c:scaling>
           <c:logBase val="2"/>
           <c:orientation val="minMax"/>
@@ -1123,7 +1124,7 @@
         <c:majorTickMark val="out"/>
         <c:minorTickMark val="none"/>
         <c:tickLblPos val="nextTo"/>
-        <c:crossAx val="129625160"/>
+        <c:crossAx val="163611584"/>
         <c:crosses val="autoZero"/>
         <c:crossBetween val="midCat"/>
         <c:majorUnit val="2"/>
@@ -1249,11 +1250,11 @@
           <c:showPercent val="0"/>
           <c:showBubbleSize val="0"/>
         </c:dLbls>
-        <c:axId val="131165272"/>
-        <c:axId val="131164880"/>
+        <c:axId val="165448208"/>
+        <c:axId val="165448600"/>
       </c:scatterChart>
       <c:valAx>
-        <c:axId val="131165272"/>
+        <c:axId val="165448208"/>
         <c:scaling>
           <c:logBase val="2"/>
           <c:orientation val="minMax"/>
@@ -1266,14 +1267,14 @@
         <c:majorTickMark val="out"/>
         <c:minorTickMark val="none"/>
         <c:tickLblPos val="nextTo"/>
-        <c:crossAx val="131164880"/>
+        <c:crossAx val="165448600"/>
         <c:crosses val="autoZero"/>
         <c:crossBetween val="midCat"/>
         <c:majorUnit val="4"/>
         <c:minorUnit val="4"/>
       </c:valAx>
       <c:valAx>
-        <c:axId val="131164880"/>
+        <c:axId val="165448600"/>
         <c:scaling>
           <c:orientation val="minMax"/>
           <c:max val="1"/>
@@ -1285,7 +1286,7 @@
         <c:majorTickMark val="out"/>
         <c:minorTickMark val="none"/>
         <c:tickLblPos val="nextTo"/>
-        <c:crossAx val="131165272"/>
+        <c:crossAx val="165448208"/>
         <c:crosses val="autoZero"/>
         <c:crossBetween val="midCat"/>
       </c:valAx>
@@ -1382,7 +1383,7 @@
           <a:p>
             <a:fld id="{2E6AAE95-D4FC-4D00-935A-EAE928727A56}" type="datetimeFigureOut">
               <a:rPr lang="en-US" smtClean="0"/>
-              <a:t>6/28/2016</a:t>
+              <a:t>7/15/2016</a:t>
             </a:fld>
             <a:endParaRPr lang="en-US"/>
           </a:p>
@@ -1915,7 +1916,7 @@
           <a:p>
             <a:fld id="{1CFF3F78-F57F-4409-A41B-5EC46D4F404B}" type="datetime1">
               <a:rPr lang="nl-BE" smtClean="0"/>
-              <a:t>2016-06-28</a:t>
+              <a:t>2016-07-15</a:t>
             </a:fld>
             <a:endParaRPr lang="nl-BE"/>
           </a:p>
@@ -2085,7 +2086,7 @@
           <a:p>
             <a:fld id="{7D029E61-52E3-412C-82EB-2F81B17C0AF1}" type="datetime1">
               <a:rPr lang="nl-BE" smtClean="0"/>
-              <a:t>2016-06-28</a:t>
+              <a:t>2016-07-15</a:t>
             </a:fld>
             <a:endParaRPr lang="nl-BE"/>
           </a:p>
@@ -2265,7 +2266,7 @@
           <a:p>
             <a:fld id="{A83F1CEF-A38E-4001-89C6-F3FC7784F299}" type="datetime1">
               <a:rPr lang="nl-BE" smtClean="0"/>
-              <a:t>2016-06-28</a:t>
+              <a:t>2016-07-15</a:t>
             </a:fld>
             <a:endParaRPr lang="nl-BE"/>
           </a:p>
@@ -2391,7 +2392,7 @@
           <a:p>
             <a:fld id="{1FDE84DB-AADA-4C3F-BF46-CA664A504479}" type="datetime1">
               <a:rPr lang="nl-BE" smtClean="0"/>
-              <a:t>2016-06-28</a:t>
+              <a:t>2016-07-15</a:t>
             </a:fld>
             <a:endParaRPr lang="nl-BE" dirty="0"/>
           </a:p>
@@ -2635,7 +2636,7 @@
           <a:p>
             <a:fld id="{8CD53A43-C15C-4F05-9AD7-DB9DE837084D}" type="datetime1">
               <a:rPr lang="nl-BE" smtClean="0"/>
-              <a:t>2016-06-28</a:t>
+              <a:t>2016-07-15</a:t>
             </a:fld>
             <a:endParaRPr lang="nl-BE"/>
           </a:p>
@@ -2881,7 +2882,7 @@
           <a:p>
             <a:fld id="{8994D238-D949-4AEF-9753-A8B6EFA964A0}" type="datetime1">
               <a:rPr lang="nl-BE" smtClean="0"/>
-              <a:t>2016-06-28</a:t>
+              <a:t>2016-07-15</a:t>
             </a:fld>
             <a:endParaRPr lang="nl-BE"/>
           </a:p>
@@ -3169,7 +3170,7 @@
           <a:p>
             <a:fld id="{4D234023-BF99-4AD0-835E-8125DA2B6664}" type="datetime1">
               <a:rPr lang="nl-BE" smtClean="0"/>
-              <a:t>2016-06-28</a:t>
+              <a:t>2016-07-15</a:t>
             </a:fld>
             <a:endParaRPr lang="nl-BE"/>
           </a:p>
@@ -3591,7 +3592,7 @@
           <a:p>
             <a:fld id="{DB075A73-5C1D-406E-9444-3C5C58580E8E}" type="datetime1">
               <a:rPr lang="nl-BE" smtClean="0"/>
-              <a:t>2016-06-28</a:t>
+              <a:t>2016-07-15</a:t>
             </a:fld>
             <a:endParaRPr lang="nl-BE"/>
           </a:p>
@@ -3709,7 +3710,7 @@
           <a:p>
             <a:fld id="{E111FB2D-2E17-4D8F-A64A-4EB0C3D12494}" type="datetime1">
               <a:rPr lang="nl-BE" smtClean="0"/>
-              <a:t>2016-06-28</a:t>
+              <a:t>2016-07-15</a:t>
             </a:fld>
             <a:endParaRPr lang="nl-BE"/>
           </a:p>
@@ -3804,7 +3805,7 @@
           <a:p>
             <a:fld id="{5BE27D71-2267-4E44-9F33-05B60E5C7D9D}" type="datetime1">
               <a:rPr lang="nl-BE" smtClean="0"/>
-              <a:t>2016-06-28</a:t>
+              <a:t>2016-07-15</a:t>
             </a:fld>
             <a:endParaRPr lang="nl-BE"/>
           </a:p>
@@ -4081,7 +4082,7 @@
           <a:p>
             <a:fld id="{182F587C-96C8-4813-A767-3084061A3229}" type="datetime1">
               <a:rPr lang="nl-BE" smtClean="0"/>
-              <a:t>2016-06-28</a:t>
+              <a:t>2016-07-15</a:t>
             </a:fld>
             <a:endParaRPr lang="nl-BE"/>
           </a:p>
@@ -4334,7 +4335,7 @@
           <a:p>
             <a:fld id="{8B021CF8-BBBB-4DFA-8713-49842AA07274}" type="datetime1">
               <a:rPr lang="nl-BE" smtClean="0"/>
-              <a:t>2016-06-28</a:t>
+              <a:t>2016-07-15</a:t>
             </a:fld>
             <a:endParaRPr lang="nl-BE"/>
           </a:p>
@@ -4547,7 +4548,7 @@
           <a:p>
             <a:fld id="{CDBFABB5-0AB3-4CB6-A705-6887DEB1F9F2}" type="datetime1">
               <a:rPr lang="nl-BE" smtClean="0"/>
-              <a:t>2016-06-28</a:t>
+              <a:t>2016-07-15</a:t>
             </a:fld>
             <a:endParaRPr lang="nl-BE"/>
           </a:p>
@@ -6688,7 +6689,7 @@
           <a:graphicData uri="http://schemas.openxmlformats.org/presentationml/2006/ole">
             <mc:AlternateContent xmlns:mc="http://schemas.openxmlformats.org/markup-compatibility/2006">
               <mc:Choice xmlns:v="urn:schemas-microsoft-com:vml" Requires="v">
-                <p:oleObj spid="_x0000_s1094" name="Equation" r:id="rId3" imgW="812520" imgH="393480" progId="Equation.3">
+                <p:oleObj spid="_x0000_s1104" name="Equation" r:id="rId3" imgW="812520" imgH="393480" progId="Equation.3">
                   <p:embed/>
                 </p:oleObj>
               </mc:Choice>
@@ -6745,7 +6746,7 @@
           <a:graphicData uri="http://schemas.openxmlformats.org/presentationml/2006/ole">
             <mc:AlternateContent xmlns:mc="http://schemas.openxmlformats.org/markup-compatibility/2006">
               <mc:Choice xmlns:v="urn:schemas-microsoft-com:vml" Requires="v">
-                <p:oleObj spid="_x0000_s1095" name="Equation" r:id="rId5" imgW="2489040" imgH="431640" progId="Equation.3">
+                <p:oleObj spid="_x0000_s1105" name="Equation" r:id="rId5" imgW="2489040" imgH="431640" progId="Equation.3">
                   <p:embed/>
                 </p:oleObj>
               </mc:Choice>
@@ -17158,7 +17159,7 @@
           <a:graphicData uri="http://schemas.openxmlformats.org/presentationml/2006/ole">
             <mc:AlternateContent xmlns:mc="http://schemas.openxmlformats.org/markup-compatibility/2006">
               <mc:Choice xmlns:v="urn:schemas-microsoft-com:vml" Requires="v">
-                <p:oleObj spid="_x0000_s2083" name="Equation" r:id="rId3" imgW="1091880" imgH="1041120" progId="Equation.3">
+                <p:oleObj spid="_x0000_s2093" name="Equation" r:id="rId3" imgW="1091880" imgH="1041120" progId="Equation.3">
                   <p:embed/>
                 </p:oleObj>
               </mc:Choice>
@@ -18529,7 +18530,7 @@
           <a:graphicData uri="http://schemas.openxmlformats.org/presentationml/2006/ole">
             <mc:AlternateContent xmlns:mc="http://schemas.openxmlformats.org/markup-compatibility/2006">
               <mc:Choice xmlns:v="urn:schemas-microsoft-com:vml" Requires="v">
-                <p:oleObj spid="_x0000_s2084" name="Equation" r:id="rId5" imgW="1091880" imgH="1041120" progId="Equation.3">
+                <p:oleObj spid="_x0000_s2094" name="Equation" r:id="rId5" imgW="1091880" imgH="1041120" progId="Equation.3">
                   <p:embed/>
                 </p:oleObj>
               </mc:Choice>
@@ -23459,8 +23460,8 @@
         </p:nvSpPr>
         <p:spPr>
           <a:xfrm>
-            <a:off x="5364088" y="6165304"/>
-            <a:ext cx="622478" cy="369332"/>
+            <a:off x="5074773" y="6165304"/>
+            <a:ext cx="984980" cy="369332"/>
           </a:xfrm>
           <a:prstGeom prst="rect">
             <a:avLst/>
@@ -23476,11 +23477,12 @@
           </a:ln>
         </p:spPr>
         <p:txBody>
-          <a:bodyPr wrap="none" rtlCol="0">
+          <a:bodyPr wrap="square" rtlCol="0">
             <a:spAutoFit/>
           </a:bodyPr>
           <a:lstStyle/>
           <a:p>
+            <a:pPr algn="ctr"/>
             <a:r>
               <a:rPr lang="en-US" dirty="0" smtClean="0"/>
               <a:t>Core</a:t>
@@ -23533,10 +23535,10 @@
         </p:nvGrpSpPr>
         <p:grpSpPr>
           <a:xfrm>
-            <a:off x="5148064" y="5656602"/>
-            <a:ext cx="3168352" cy="369332"/>
-            <a:chOff x="4427984" y="5656602"/>
-            <a:chExt cx="3168352" cy="369332"/>
+            <a:off x="5065891" y="5656602"/>
+            <a:ext cx="3250525" cy="369332"/>
+            <a:chOff x="4345811" y="5656602"/>
+            <a:chExt cx="3250525" cy="369332"/>
           </a:xfrm>
         </p:grpSpPr>
         <p:sp>
@@ -23547,7 +23549,7 @@
           </p:nvSpPr>
           <p:spPr>
             <a:xfrm>
-              <a:off x="4427984" y="5656602"/>
+              <a:off x="4345811" y="5656602"/>
               <a:ext cx="993862" cy="369332"/>
             </a:xfrm>
             <a:prstGeom prst="rect">
@@ -23569,6 +23571,7 @@
             </a:bodyPr>
             <a:lstStyle/>
             <a:p>
+              <a:pPr algn="ctr"/>
               <a:r>
                 <a:rPr lang="en-US" dirty="0" smtClean="0"/>
                 <a:t>L1 cache</a:t>
@@ -23651,10 +23654,10 @@
         </p:nvGrpSpPr>
         <p:grpSpPr>
           <a:xfrm>
-            <a:off x="5148064" y="5157192"/>
-            <a:ext cx="3285371" cy="369332"/>
-            <a:chOff x="4427984" y="5656602"/>
-            <a:chExt cx="3285371" cy="369332"/>
+            <a:off x="5067786" y="5147900"/>
+            <a:ext cx="3365649" cy="378624"/>
+            <a:chOff x="4347706" y="5647310"/>
+            <a:chExt cx="3365649" cy="378624"/>
           </a:xfrm>
         </p:grpSpPr>
         <p:sp>
@@ -23665,7 +23668,7 @@
           </p:nvSpPr>
           <p:spPr>
             <a:xfrm>
-              <a:off x="4427984" y="5656602"/>
+              <a:off x="4347706" y="5647310"/>
               <a:ext cx="993862" cy="369332"/>
             </a:xfrm>
             <a:prstGeom prst="rect">
@@ -23687,6 +23690,7 @@
             </a:bodyPr>
             <a:lstStyle/>
             <a:p>
+              <a:pPr algn="ctr"/>
               <a:r>
                 <a:rPr lang="en-US" dirty="0" smtClean="0"/>
                 <a:t>L2 cache</a:t>
@@ -23769,10 +23773,10 @@
         </p:nvGrpSpPr>
         <p:grpSpPr>
           <a:xfrm>
-            <a:off x="5175061" y="4509120"/>
-            <a:ext cx="3285371" cy="369332"/>
-            <a:chOff x="4427984" y="5656602"/>
-            <a:chExt cx="3285371" cy="369332"/>
+            <a:off x="5069875" y="4509120"/>
+            <a:ext cx="3390557" cy="369332"/>
+            <a:chOff x="4322798" y="5656602"/>
+            <a:chExt cx="3390557" cy="369332"/>
           </a:xfrm>
         </p:grpSpPr>
         <p:sp>
@@ -23783,7 +23787,7 @@
           </p:nvSpPr>
           <p:spPr>
             <a:xfrm>
-              <a:off x="4427984" y="5656602"/>
+              <a:off x="4322798" y="5656602"/>
               <a:ext cx="993862" cy="369332"/>
             </a:xfrm>
             <a:prstGeom prst="rect">
@@ -23805,6 +23809,7 @@
             </a:bodyPr>
             <a:lstStyle/>
             <a:p>
+              <a:pPr algn="ctr"/>
               <a:r>
                 <a:rPr lang="en-US" dirty="0" smtClean="0"/>
                 <a:t>L3 cache</a:t>
@@ -23891,10 +23896,10 @@
         </p:nvGrpSpPr>
         <p:grpSpPr>
           <a:xfrm>
-            <a:off x="5372241" y="3645024"/>
-            <a:ext cx="3178213" cy="369332"/>
-            <a:chOff x="4652161" y="5656602"/>
-            <a:chExt cx="3178213" cy="369332"/>
+            <a:off x="5068689" y="3645024"/>
+            <a:ext cx="3481765" cy="369332"/>
+            <a:chOff x="4348609" y="5656602"/>
+            <a:chExt cx="3481765" cy="369332"/>
           </a:xfrm>
         </p:grpSpPr>
         <p:sp>
@@ -23905,8 +23910,8 @@
           </p:nvSpPr>
           <p:spPr>
             <a:xfrm>
-              <a:off x="4652161" y="5656602"/>
-              <a:ext cx="639919" cy="369332"/>
+              <a:off x="4348609" y="5656602"/>
+              <a:ext cx="991064" cy="369332"/>
             </a:xfrm>
             <a:prstGeom prst="rect">
               <a:avLst/>
@@ -23922,11 +23927,12 @@
             </a:ln>
           </p:spPr>
           <p:txBody>
-            <a:bodyPr wrap="none" rtlCol="0">
+            <a:bodyPr wrap="square" rtlCol="0">
               <a:spAutoFit/>
             </a:bodyPr>
             <a:lstStyle/>
             <a:p>
+              <a:pPr algn="ctr"/>
               <a:r>
                 <a:rPr lang="en-US" dirty="0" smtClean="0"/>
                 <a:t>RAM</a:t>
@@ -24009,7 +24015,7 @@
         </p:nvGrpSpPr>
         <p:grpSpPr>
           <a:xfrm>
-            <a:off x="5076056" y="2699628"/>
+            <a:off x="5067786" y="2700038"/>
             <a:ext cx="3519410" cy="369332"/>
             <a:chOff x="4427984" y="5656602"/>
             <a:chExt cx="3519410" cy="369332"/>
@@ -24045,6 +24051,7 @@
             </a:bodyPr>
             <a:lstStyle/>
             <a:p>
+              <a:pPr algn="ctr"/>
               <a:r>
                 <a:rPr lang="en-US" dirty="0" err="1" smtClean="0"/>
                 <a:t>Infiniband</a:t>
@@ -24127,10 +24134,10 @@
         </p:nvGrpSpPr>
         <p:grpSpPr>
           <a:xfrm>
-            <a:off x="5148064" y="1340768"/>
-            <a:ext cx="3870467" cy="369332"/>
-            <a:chOff x="4427984" y="5656602"/>
-            <a:chExt cx="3870467" cy="369332"/>
+            <a:off x="5069240" y="1340768"/>
+            <a:ext cx="3949291" cy="369332"/>
+            <a:chOff x="4349160" y="5656602"/>
+            <a:chExt cx="3949291" cy="369332"/>
           </a:xfrm>
         </p:grpSpPr>
         <p:sp>
@@ -24141,8 +24148,8 @@
           </p:nvSpPr>
           <p:spPr>
             <a:xfrm>
-              <a:off x="4427984" y="5656602"/>
-              <a:ext cx="906017" cy="369332"/>
+              <a:off x="4349160" y="5656602"/>
+              <a:ext cx="1135652" cy="369332"/>
             </a:xfrm>
             <a:prstGeom prst="rect">
               <a:avLst/>
@@ -24158,11 +24165,12 @@
             </a:ln>
           </p:spPr>
           <p:txBody>
-            <a:bodyPr wrap="none" rtlCol="0">
+            <a:bodyPr wrap="square" rtlCol="0">
               <a:spAutoFit/>
             </a:bodyPr>
             <a:lstStyle/>
             <a:p>
+              <a:pPr algn="ctr"/>
               <a:r>
                 <a:rPr lang="en-US" dirty="0" smtClean="0"/>
                 <a:t>disk I/O</a:t>
@@ -25026,7 +25034,7 @@
         </p:nvGrpSpPr>
         <p:grpSpPr>
           <a:xfrm>
-            <a:off x="5076056" y="3245024"/>
+            <a:off x="5067786" y="3244448"/>
             <a:ext cx="3519410" cy="369332"/>
             <a:chOff x="4427984" y="5656602"/>
             <a:chExt cx="3519410" cy="446892"/>
@@ -25062,6 +25070,7 @@
             </a:bodyPr>
             <a:lstStyle/>
             <a:p>
+              <a:pPr algn="ctr"/>
               <a:r>
                 <a:rPr lang="en-US" dirty="0" err="1" smtClean="0"/>
                 <a:t>OpenMP</a:t>
@@ -25216,7 +25225,7 @@
           <p:spPr>
             <a:xfrm>
               <a:off x="4427984" y="5656602"/>
-              <a:ext cx="861133" cy="369332"/>
+              <a:ext cx="1137106" cy="369332"/>
             </a:xfrm>
             <a:prstGeom prst="rect">
               <a:avLst/>
@@ -25232,11 +25241,12 @@
             </a:ln>
           </p:spPr>
           <p:txBody>
-            <a:bodyPr wrap="none" rtlCol="0">
+            <a:bodyPr wrap="square" rtlCol="0">
               <a:spAutoFit/>
             </a:bodyPr>
             <a:lstStyle/>
             <a:p>
+              <a:pPr algn="ctr"/>
               <a:r>
                 <a:rPr lang="en-US" dirty="0" smtClean="0"/>
                 <a:t>GPGPU</a:t>
@@ -25269,15 +25279,7 @@
             <a:p>
               <a:r>
                 <a:rPr lang="en-US" dirty="0" smtClean="0"/>
-                <a:t>20</a:t>
-              </a:r>
-              <a:r>
-                <a:rPr lang="en-US" dirty="0" smtClean="0"/>
-                <a:t>000 </a:t>
-              </a:r>
-              <a:r>
-                <a:rPr lang="en-US" dirty="0" smtClean="0"/>
-                <a:t>cycles</a:t>
+                <a:t>20000 cycles</a:t>
               </a:r>
               <a:endParaRPr lang="nl-BE" dirty="0"/>
             </a:p>
@@ -25336,6 +25338,180 @@
       </p:par>
     </p:tnLst>
   </p:timing>
+</p:sld>
+</file>
+
+<file path=ppt/slides/slide25.xml><?xml version="1.0" encoding="utf-8"?>
+<p:sld xmlns:a="http://schemas.openxmlformats.org/drawingml/2006/main" xmlns:r="http://schemas.openxmlformats.org/officeDocument/2006/relationships" xmlns:p="http://schemas.openxmlformats.org/presentationml/2006/main">
+  <p:cSld>
+    <p:spTree>
+      <p:nvGrpSpPr>
+        <p:cNvPr id="1" name=""/>
+        <p:cNvGrpSpPr/>
+        <p:nvPr/>
+      </p:nvGrpSpPr>
+      <p:grpSpPr>
+        <a:xfrm>
+          <a:off x="0" y="0"/>
+          <a:ext cx="0" cy="0"/>
+          <a:chOff x="0" y="0"/>
+          <a:chExt cx="0" cy="0"/>
+        </a:xfrm>
+      </p:grpSpPr>
+      <p:sp>
+        <p:nvSpPr>
+          <p:cNvPr id="2" name="Title 1"/>
+          <p:cNvSpPr>
+            <a:spLocks noGrp="1"/>
+          </p:cNvSpPr>
+          <p:nvPr>
+            <p:ph type="title"/>
+          </p:nvPr>
+        </p:nvSpPr>
+        <p:spPr/>
+        <p:txBody>
+          <a:bodyPr/>
+          <a:lstStyle/>
+          <a:p>
+            <a:r>
+              <a:rPr lang="en-US" dirty="0" smtClean="0"/>
+              <a:t>Bandwidth</a:t>
+            </a:r>
+            <a:endParaRPr lang="nl-BE" dirty="0"/>
+          </a:p>
+        </p:txBody>
+      </p:sp>
+      <p:sp>
+        <p:nvSpPr>
+          <p:cNvPr id="4" name="Content Placeholder 3"/>
+          <p:cNvSpPr>
+            <a:spLocks noGrp="1"/>
+          </p:cNvSpPr>
+          <p:nvPr>
+            <p:ph idx="1"/>
+          </p:nvPr>
+        </p:nvSpPr>
+        <p:spPr/>
+        <p:txBody>
+          <a:bodyPr>
+            <a:normAutofit fontScale="92500" lnSpcReduction="20000"/>
+          </a:bodyPr>
+          <a:lstStyle/>
+          <a:p>
+            <a:r>
+              <a:rPr lang="en-US" dirty="0" smtClean="0"/>
+              <a:t>RAM (DDR4@2133MHz): </a:t>
+            </a:r>
+            <a:r>
+              <a:rPr lang="en-US" smtClean="0"/>
+              <a:t>12.0 GB/s</a:t>
+            </a:r>
+            <a:endParaRPr lang="en-US" dirty="0" smtClean="0"/>
+          </a:p>
+          <a:p>
+            <a:r>
+              <a:rPr lang="en-US" dirty="0" smtClean="0"/>
+              <a:t>GPGPU RAM (GDDR5@750MHz): 48.0 GB/s</a:t>
+            </a:r>
+          </a:p>
+          <a:p>
+            <a:r>
+              <a:rPr lang="en-US" dirty="0" smtClean="0"/>
+              <a:t>SATA revision 3: 0.6 GB/s</a:t>
+            </a:r>
+          </a:p>
+          <a:p>
+            <a:r>
+              <a:rPr lang="en-US" dirty="0" smtClean="0"/>
+              <a:t>SATA revision 3.2: 2.0 GB/s</a:t>
+            </a:r>
+          </a:p>
+          <a:p>
+            <a:r>
+              <a:rPr lang="en-US" dirty="0" smtClean="0"/>
+              <a:t>SAS 3: 1.2 GB/s</a:t>
+            </a:r>
+          </a:p>
+          <a:p>
+            <a:r>
+              <a:rPr lang="en-US" dirty="0" smtClean="0"/>
+              <a:t>QPI (</a:t>
+            </a:r>
+            <a:r>
+              <a:rPr lang="nl-BE" dirty="0" smtClean="0"/>
+              <a:t>9.6GT/s</a:t>
+            </a:r>
+            <a:r>
+              <a:rPr lang="nl-BE" dirty="0"/>
+              <a:t>, 4.8 GHz</a:t>
+            </a:r>
+            <a:r>
+              <a:rPr lang="nl-BE" dirty="0" smtClean="0"/>
+              <a:t>): 38.4 GB/s</a:t>
+            </a:r>
+          </a:p>
+          <a:p>
+            <a:r>
+              <a:rPr lang="en-US" dirty="0" smtClean="0"/>
+              <a:t>PCI Express 3.0: 31.5 GB/s</a:t>
+            </a:r>
+          </a:p>
+          <a:p>
+            <a:r>
+              <a:rPr lang="en-US" dirty="0" err="1" smtClean="0"/>
+              <a:t>Infiniband</a:t>
+            </a:r>
+            <a:r>
+              <a:rPr lang="en-US" dirty="0" smtClean="0"/>
+              <a:t> QDR 4x: 4.0 GB/s</a:t>
+            </a:r>
+          </a:p>
+          <a:p>
+            <a:r>
+              <a:rPr lang="en-US" dirty="0" err="1" smtClean="0"/>
+              <a:t>Infiniband</a:t>
+            </a:r>
+            <a:r>
+              <a:rPr lang="en-US" dirty="0" smtClean="0"/>
+              <a:t> EDR 4x: 12.5 GB/s</a:t>
+            </a:r>
+            <a:endParaRPr lang="nl-BE" dirty="0"/>
+          </a:p>
+        </p:txBody>
+      </p:sp>
+      <p:sp>
+        <p:nvSpPr>
+          <p:cNvPr id="3" name="Slide Number Placeholder 2"/>
+          <p:cNvSpPr>
+            <a:spLocks noGrp="1"/>
+          </p:cNvSpPr>
+          <p:nvPr>
+            <p:ph type="sldNum" sz="quarter" idx="12"/>
+          </p:nvPr>
+        </p:nvSpPr>
+        <p:spPr/>
+        <p:txBody>
+          <a:bodyPr/>
+          <a:lstStyle/>
+          <a:p>
+            <a:fld id="{6597116C-F94B-4B5B-973A-17F07FB5C418}" type="slidenum">
+              <a:rPr lang="nl-BE" smtClean="0"/>
+              <a:t>25</a:t>
+            </a:fld>
+            <a:endParaRPr lang="nl-BE"/>
+          </a:p>
+        </p:txBody>
+      </p:sp>
+    </p:spTree>
+    <p:extLst>
+      <p:ext uri="{BB962C8B-B14F-4D97-AF65-F5344CB8AC3E}">
+        <p14:creationId xmlns:p14="http://schemas.microsoft.com/office/powerpoint/2010/main" val="3254066855"/>
+      </p:ext>
+    </p:extLst>
+  </p:cSld>
+  <p:clrMapOvr>
+    <a:masterClrMapping/>
+  </p:clrMapOvr>
 </p:sld>
 </file>
 

</xml_diff>

<commit_message>
Updated bandwidth numbers; moved some slides
</commit_message>
<xml_diff>
--- a/Optimization/hpc_efficiency.pptx
+++ b/Optimization/hpc_efficiency.pptx
@@ -5,34 +5,37 @@
     <p:sldMasterId id="2147483648" r:id="rId1"/>
   </p:sldMasterIdLst>
   <p:notesMasterIdLst>
-    <p:notesMasterId r:id="rId27"/>
+    <p:notesMasterId r:id="rId30"/>
   </p:notesMasterIdLst>
   <p:sldIdLst>
     <p:sldId id="267" r:id="rId2"/>
-    <p:sldId id="268" r:id="rId3"/>
-    <p:sldId id="257" r:id="rId4"/>
-    <p:sldId id="258" r:id="rId5"/>
-    <p:sldId id="259" r:id="rId6"/>
-    <p:sldId id="260" r:id="rId7"/>
-    <p:sldId id="261" r:id="rId8"/>
-    <p:sldId id="262" r:id="rId9"/>
-    <p:sldId id="263" r:id="rId10"/>
-    <p:sldId id="264" r:id="rId11"/>
-    <p:sldId id="265" r:id="rId12"/>
-    <p:sldId id="266" r:id="rId13"/>
-    <p:sldId id="269" r:id="rId14"/>
-    <p:sldId id="270" r:id="rId15"/>
-    <p:sldId id="272" r:id="rId16"/>
-    <p:sldId id="277" r:id="rId17"/>
-    <p:sldId id="273" r:id="rId18"/>
-    <p:sldId id="279" r:id="rId19"/>
-    <p:sldId id="280" r:id="rId20"/>
-    <p:sldId id="278" r:id="rId21"/>
-    <p:sldId id="275" r:id="rId22"/>
-    <p:sldId id="281" r:id="rId23"/>
-    <p:sldId id="282" r:id="rId24"/>
-    <p:sldId id="271" r:id="rId25"/>
-    <p:sldId id="283" r:id="rId26"/>
+    <p:sldId id="282" r:id="rId3"/>
+    <p:sldId id="268" r:id="rId4"/>
+    <p:sldId id="257" r:id="rId5"/>
+    <p:sldId id="258" r:id="rId6"/>
+    <p:sldId id="259" r:id="rId7"/>
+    <p:sldId id="260" r:id="rId8"/>
+    <p:sldId id="261" r:id="rId9"/>
+    <p:sldId id="262" r:id="rId10"/>
+    <p:sldId id="263" r:id="rId11"/>
+    <p:sldId id="264" r:id="rId12"/>
+    <p:sldId id="265" r:id="rId13"/>
+    <p:sldId id="266" r:id="rId14"/>
+    <p:sldId id="269" r:id="rId15"/>
+    <p:sldId id="270" r:id="rId16"/>
+    <p:sldId id="284" r:id="rId17"/>
+    <p:sldId id="272" r:id="rId18"/>
+    <p:sldId id="277" r:id="rId19"/>
+    <p:sldId id="273" r:id="rId20"/>
+    <p:sldId id="279" r:id="rId21"/>
+    <p:sldId id="280" r:id="rId22"/>
+    <p:sldId id="278" r:id="rId23"/>
+    <p:sldId id="285" r:id="rId24"/>
+    <p:sldId id="275" r:id="rId25"/>
+    <p:sldId id="281" r:id="rId26"/>
+    <p:sldId id="286" r:id="rId27"/>
+    <p:sldId id="271" r:id="rId28"/>
+    <p:sldId id="283" r:id="rId29"/>
   </p:sldIdLst>
   <p:sldSz cx="9144000" cy="6858000" type="screen4x3"/>
   <p:notesSz cx="6858000" cy="9144000"/>
@@ -260,11 +263,11 @@
           <c:showPercent val="0"/>
           <c:showBubbleSize val="0"/>
         </c:dLbls>
-        <c:axId val="148190608"/>
-        <c:axId val="148190216"/>
+        <c:axId val="166192264"/>
+        <c:axId val="166191872"/>
       </c:scatterChart>
       <c:valAx>
-        <c:axId val="148190608"/>
+        <c:axId val="166192264"/>
         <c:scaling>
           <c:logBase val="2"/>
           <c:orientation val="minMax"/>
@@ -276,14 +279,14 @@
         <c:majorTickMark val="out"/>
         <c:minorTickMark val="none"/>
         <c:tickLblPos val="nextTo"/>
-        <c:crossAx val="148190216"/>
+        <c:crossAx val="166191872"/>
         <c:crosses val="autoZero"/>
         <c:crossBetween val="midCat"/>
         <c:majorUnit val="4"/>
         <c:minorUnit val="4"/>
       </c:valAx>
       <c:valAx>
-        <c:axId val="148190216"/>
+        <c:axId val="166191872"/>
         <c:scaling>
           <c:logBase val="2"/>
           <c:orientation val="minMax"/>
@@ -296,7 +299,7 @@
         <c:majorTickMark val="out"/>
         <c:minorTickMark val="none"/>
         <c:tickLblPos val="nextTo"/>
-        <c:crossAx val="148190608"/>
+        <c:crossAx val="166192264"/>
         <c:crosses val="autoZero"/>
         <c:crossBetween val="midCat"/>
         <c:majorUnit val="4"/>
@@ -669,11 +672,11 @@
           <c:showPercent val="0"/>
           <c:showBubbleSize val="0"/>
         </c:dLbls>
-        <c:axId val="148075800"/>
-        <c:axId val="148075408"/>
+        <c:axId val="166189912"/>
+        <c:axId val="166193440"/>
       </c:scatterChart>
       <c:valAx>
-        <c:axId val="148075800"/>
+        <c:axId val="166189912"/>
         <c:scaling>
           <c:logBase val="2"/>
           <c:orientation val="minMax"/>
@@ -686,14 +689,14 @@
         <c:majorTickMark val="out"/>
         <c:minorTickMark val="none"/>
         <c:tickLblPos val="nextTo"/>
-        <c:crossAx val="148075408"/>
+        <c:crossAx val="166193440"/>
         <c:crosses val="autoZero"/>
         <c:crossBetween val="midCat"/>
         <c:majorUnit val="4"/>
         <c:minorUnit val="4"/>
       </c:valAx>
       <c:valAx>
-        <c:axId val="148075408"/>
+        <c:axId val="166193440"/>
         <c:scaling>
           <c:logBase val="2"/>
           <c:orientation val="minMax"/>
@@ -707,7 +710,7 @@
         <c:majorTickMark val="out"/>
         <c:minorTickMark val="none"/>
         <c:tickLblPos val="nextTo"/>
-        <c:crossAx val="148075800"/>
+        <c:crossAx val="166189912"/>
         <c:crosses val="autoZero"/>
         <c:crossBetween val="midCat"/>
         <c:majorUnit val="4"/>
@@ -920,11 +923,11 @@
           <c:showPercent val="0"/>
           <c:showBubbleSize val="0"/>
         </c:dLbls>
-        <c:axId val="148074232"/>
-        <c:axId val="150094200"/>
+        <c:axId val="167816296"/>
+        <c:axId val="167816688"/>
       </c:scatterChart>
       <c:valAx>
-        <c:axId val="148074232"/>
+        <c:axId val="167816296"/>
         <c:scaling>
           <c:logBase val="2"/>
           <c:orientation val="minMax"/>
@@ -937,13 +940,13 @@
         <c:majorTickMark val="out"/>
         <c:minorTickMark val="none"/>
         <c:tickLblPos val="nextTo"/>
-        <c:crossAx val="150094200"/>
+        <c:crossAx val="167816688"/>
         <c:crosses val="autoZero"/>
         <c:crossBetween val="midCat"/>
         <c:minorUnit val="4"/>
       </c:valAx>
       <c:valAx>
-        <c:axId val="150094200"/>
+        <c:axId val="167816688"/>
         <c:scaling>
           <c:logBase val="2"/>
           <c:orientation val="minMax"/>
@@ -957,7 +960,7 @@
         <c:majorTickMark val="out"/>
         <c:minorTickMark val="none"/>
         <c:tickLblPos val="nextTo"/>
-        <c:crossAx val="148074232"/>
+        <c:crossAx val="167816296"/>
         <c:crosses val="autoZero"/>
         <c:crossBetween val="midCat"/>
         <c:majorUnit val="2"/>
@@ -1088,11 +1091,11 @@
           <c:showPercent val="0"/>
           <c:showBubbleSize val="0"/>
         </c:dLbls>
-        <c:axId val="150094984"/>
-        <c:axId val="150095376"/>
+        <c:axId val="167817472"/>
+        <c:axId val="167817864"/>
       </c:scatterChart>
       <c:valAx>
-        <c:axId val="150094984"/>
+        <c:axId val="167817472"/>
         <c:scaling>
           <c:logBase val="2"/>
           <c:orientation val="minMax"/>
@@ -1105,13 +1108,13 @@
         <c:majorTickMark val="out"/>
         <c:minorTickMark val="none"/>
         <c:tickLblPos val="nextTo"/>
-        <c:crossAx val="150095376"/>
+        <c:crossAx val="167817864"/>
         <c:crosses val="autoZero"/>
         <c:crossBetween val="midCat"/>
         <c:majorUnit val="4"/>
       </c:valAx>
       <c:valAx>
-        <c:axId val="150095376"/>
+        <c:axId val="167817864"/>
         <c:scaling>
           <c:logBase val="2"/>
           <c:orientation val="minMax"/>
@@ -1124,7 +1127,7 @@
         <c:majorTickMark val="out"/>
         <c:minorTickMark val="none"/>
         <c:tickLblPos val="nextTo"/>
-        <c:crossAx val="150094984"/>
+        <c:crossAx val="167817472"/>
         <c:crosses val="autoZero"/>
         <c:crossBetween val="midCat"/>
         <c:majorUnit val="2"/>
@@ -1250,11 +1253,11 @@
           <c:showPercent val="0"/>
           <c:showBubbleSize val="0"/>
         </c:dLbls>
-        <c:axId val="150096160"/>
-        <c:axId val="150096552"/>
+        <c:axId val="167818648"/>
+        <c:axId val="167819040"/>
       </c:scatterChart>
       <c:valAx>
-        <c:axId val="150096160"/>
+        <c:axId val="167818648"/>
         <c:scaling>
           <c:logBase val="2"/>
           <c:orientation val="minMax"/>
@@ -1267,14 +1270,14 @@
         <c:majorTickMark val="out"/>
         <c:minorTickMark val="none"/>
         <c:tickLblPos val="nextTo"/>
-        <c:crossAx val="150096552"/>
+        <c:crossAx val="167819040"/>
         <c:crosses val="autoZero"/>
         <c:crossBetween val="midCat"/>
         <c:majorUnit val="4"/>
         <c:minorUnit val="4"/>
       </c:valAx>
       <c:valAx>
-        <c:axId val="150096552"/>
+        <c:axId val="167819040"/>
         <c:scaling>
           <c:orientation val="minMax"/>
           <c:max val="1"/>
@@ -1286,7 +1289,7 @@
         <c:majorTickMark val="out"/>
         <c:minorTickMark val="none"/>
         <c:tickLblPos val="nextTo"/>
-        <c:crossAx val="150096160"/>
+        <c:crossAx val="167818648"/>
         <c:crosses val="autoZero"/>
         <c:crossBetween val="midCat"/>
       </c:valAx>
@@ -1716,7 +1719,7 @@
           <a:p>
             <a:fld id="{8B979C76-3FF1-40F3-8C7E-1BB6B02B1C34}" type="slidenum">
               <a:rPr lang="en-US" smtClean="0"/>
-              <a:t>16</a:t>
+              <a:t>18</a:t>
             </a:fld>
             <a:endParaRPr lang="en-US"/>
           </a:p>
@@ -5091,6 +5094,856 @@
 </file>
 
 <file path=ppt/slides/slide10.xml><?xml version="1.0" encoding="utf-8"?>
+<p:sld xmlns:a="http://schemas.openxmlformats.org/drawingml/2006/main" xmlns:r="http://schemas.openxmlformats.org/officeDocument/2006/relationships" xmlns:p="http://schemas.openxmlformats.org/presentationml/2006/main">
+  <p:cSld>
+    <p:spTree>
+      <p:nvGrpSpPr>
+        <p:cNvPr id="1" name=""/>
+        <p:cNvGrpSpPr/>
+        <p:nvPr/>
+      </p:nvGrpSpPr>
+      <p:grpSpPr>
+        <a:xfrm>
+          <a:off x="0" y="0"/>
+          <a:ext cx="0" cy="0"/>
+          <a:chOff x="0" y="0"/>
+          <a:chExt cx="0" cy="0"/>
+        </a:xfrm>
+      </p:grpSpPr>
+      <p:sp>
+        <p:nvSpPr>
+          <p:cNvPr id="2" name="Title 1"/>
+          <p:cNvSpPr>
+            <a:spLocks noGrp="1"/>
+          </p:cNvSpPr>
+          <p:nvPr>
+            <p:ph type="title"/>
+          </p:nvPr>
+        </p:nvSpPr>
+        <p:spPr/>
+        <p:txBody>
+          <a:bodyPr/>
+          <a:lstStyle/>
+          <a:p>
+            <a:r>
+              <a:rPr lang="en-US" dirty="0" smtClean="0"/>
+              <a:t>Picking the sweet spot</a:t>
+            </a:r>
+            <a:endParaRPr lang="nl-BE" dirty="0"/>
+          </a:p>
+        </p:txBody>
+      </p:sp>
+      <p:grpSp>
+        <p:nvGrpSpPr>
+          <p:cNvPr id="11" name="Group 10"/>
+          <p:cNvGrpSpPr/>
+          <p:nvPr/>
+        </p:nvGrpSpPr>
+        <p:grpSpPr>
+          <a:xfrm>
+            <a:off x="591815" y="1844824"/>
+            <a:ext cx="4039684" cy="2540025"/>
+            <a:chOff x="591815" y="1844824"/>
+            <a:chExt cx="4039684" cy="2540025"/>
+          </a:xfrm>
+        </p:grpSpPr>
+        <p:graphicFrame>
+          <p:nvGraphicFramePr>
+            <p:cNvPr id="6" name="Chart 5"/>
+            <p:cNvGraphicFramePr>
+              <a:graphicFrameLocks/>
+            </p:cNvGraphicFramePr>
+            <p:nvPr>
+              <p:extLst>
+                <p:ext uri="{D42A27DB-BD31-4B8C-83A1-F6EECF244321}">
+                  <p14:modId xmlns:p14="http://schemas.microsoft.com/office/powerpoint/2010/main" val="541164566"/>
+                </p:ext>
+              </p:extLst>
+            </p:nvPr>
+          </p:nvGraphicFramePr>
+          <p:xfrm>
+            <a:off x="899592" y="1844824"/>
+            <a:ext cx="3731907" cy="2239144"/>
+          </p:xfrm>
+          <a:graphic>
+            <a:graphicData uri="http://schemas.openxmlformats.org/drawingml/2006/chart">
+              <c:chart xmlns:c="http://schemas.openxmlformats.org/drawingml/2006/chart" xmlns:r="http://schemas.openxmlformats.org/officeDocument/2006/relationships" r:id="rId2"/>
+            </a:graphicData>
+          </a:graphic>
+        </p:graphicFrame>
+        <p:sp>
+          <p:nvSpPr>
+            <p:cNvPr id="7" name="TextBox 6"/>
+            <p:cNvSpPr txBox="1"/>
+            <p:nvPr/>
+          </p:nvSpPr>
+          <p:spPr>
+            <a:xfrm>
+              <a:off x="2339752" y="4077072"/>
+              <a:ext cx="1123897" cy="307777"/>
+            </a:xfrm>
+            <a:prstGeom prst="rect">
+              <a:avLst/>
+            </a:prstGeom>
+            <a:noFill/>
+          </p:spPr>
+          <p:txBody>
+            <a:bodyPr wrap="none" rtlCol="0">
+              <a:spAutoFit/>
+            </a:bodyPr>
+            <a:lstStyle/>
+            <a:p>
+              <a:r>
+                <a:rPr lang="en-US" sz="1400" dirty="0" smtClean="0"/>
+                <a:t>nr. processes</a:t>
+              </a:r>
+              <a:endParaRPr lang="nl-BE" sz="1400" dirty="0"/>
+            </a:p>
+          </p:txBody>
+        </p:sp>
+        <p:sp>
+          <p:nvSpPr>
+            <p:cNvPr id="8" name="TextBox 7"/>
+            <p:cNvSpPr txBox="1"/>
+            <p:nvPr/>
+          </p:nvSpPr>
+          <p:spPr>
+            <a:xfrm rot="16200000">
+              <a:off x="339182" y="2724574"/>
+              <a:ext cx="813043" cy="307777"/>
+            </a:xfrm>
+            <a:prstGeom prst="rect">
+              <a:avLst/>
+            </a:prstGeom>
+            <a:noFill/>
+          </p:spPr>
+          <p:txBody>
+            <a:bodyPr wrap="none" rtlCol="0">
+              <a:spAutoFit/>
+            </a:bodyPr>
+            <a:lstStyle/>
+            <a:p>
+              <a:r>
+                <a:rPr lang="en-US" sz="1400" dirty="0" smtClean="0"/>
+                <a:t>speedup</a:t>
+              </a:r>
+              <a:endParaRPr lang="nl-BE" sz="1400" dirty="0"/>
+            </a:p>
+          </p:txBody>
+        </p:sp>
+      </p:grpSp>
+      <p:grpSp>
+        <p:nvGrpSpPr>
+          <p:cNvPr id="12" name="Group 11"/>
+          <p:cNvGrpSpPr/>
+          <p:nvPr/>
+        </p:nvGrpSpPr>
+        <p:grpSpPr>
+          <a:xfrm>
+            <a:off x="4210472" y="3861048"/>
+            <a:ext cx="4682008" cy="2828057"/>
+            <a:chOff x="4120208" y="3861048"/>
+            <a:chExt cx="4682008" cy="2828057"/>
+          </a:xfrm>
+        </p:grpSpPr>
+        <p:graphicFrame>
+          <p:nvGraphicFramePr>
+            <p:cNvPr id="5" name="Chart 4"/>
+            <p:cNvGraphicFramePr>
+              <a:graphicFrameLocks/>
+            </p:cNvGraphicFramePr>
+            <p:nvPr>
+              <p:extLst>
+                <p:ext uri="{D42A27DB-BD31-4B8C-83A1-F6EECF244321}">
+                  <p14:modId xmlns:p14="http://schemas.microsoft.com/office/powerpoint/2010/main" val="5710521"/>
+                </p:ext>
+              </p:extLst>
+            </p:nvPr>
+          </p:nvGraphicFramePr>
+          <p:xfrm>
+            <a:off x="4499992" y="3861048"/>
+            <a:ext cx="4302224" cy="2581334"/>
+          </p:xfrm>
+          <a:graphic>
+            <a:graphicData uri="http://schemas.openxmlformats.org/drawingml/2006/chart">
+              <c:chart xmlns:c="http://schemas.openxmlformats.org/drawingml/2006/chart" xmlns:r="http://schemas.openxmlformats.org/officeDocument/2006/relationships" r:id="rId3"/>
+            </a:graphicData>
+          </a:graphic>
+        </p:graphicFrame>
+        <p:sp>
+          <p:nvSpPr>
+            <p:cNvPr id="9" name="TextBox 8"/>
+            <p:cNvSpPr txBox="1"/>
+            <p:nvPr/>
+          </p:nvSpPr>
+          <p:spPr>
+            <a:xfrm>
+              <a:off x="6400431" y="6381328"/>
+              <a:ext cx="1123897" cy="307777"/>
+            </a:xfrm>
+            <a:prstGeom prst="rect">
+              <a:avLst/>
+            </a:prstGeom>
+            <a:noFill/>
+          </p:spPr>
+          <p:txBody>
+            <a:bodyPr wrap="none" rtlCol="0">
+              <a:spAutoFit/>
+            </a:bodyPr>
+            <a:lstStyle/>
+            <a:p>
+              <a:r>
+                <a:rPr lang="en-US" sz="1400" dirty="0" smtClean="0"/>
+                <a:t>nr. processes</a:t>
+              </a:r>
+              <a:endParaRPr lang="nl-BE" sz="1400" dirty="0"/>
+            </a:p>
+          </p:txBody>
+        </p:sp>
+        <p:sp>
+          <p:nvSpPr>
+            <p:cNvPr id="10" name="TextBox 9"/>
+            <p:cNvSpPr txBox="1"/>
+            <p:nvPr/>
+          </p:nvSpPr>
+          <p:spPr>
+            <a:xfrm rot="16200000">
+              <a:off x="3833976" y="4867361"/>
+              <a:ext cx="880241" cy="307777"/>
+            </a:xfrm>
+            <a:prstGeom prst="rect">
+              <a:avLst/>
+            </a:prstGeom>
+            <a:noFill/>
+          </p:spPr>
+          <p:txBody>
+            <a:bodyPr wrap="none" rtlCol="0">
+              <a:spAutoFit/>
+            </a:bodyPr>
+            <a:lstStyle/>
+            <a:p>
+              <a:r>
+                <a:rPr lang="en-US" sz="1400" dirty="0" smtClean="0"/>
+                <a:t>efficiency</a:t>
+              </a:r>
+              <a:endParaRPr lang="nl-BE" sz="1400" dirty="0"/>
+            </a:p>
+          </p:txBody>
+        </p:sp>
+      </p:grpSp>
+      <p:grpSp>
+        <p:nvGrpSpPr>
+          <p:cNvPr id="16" name="Group 15"/>
+          <p:cNvGrpSpPr/>
+          <p:nvPr/>
+        </p:nvGrpSpPr>
+        <p:grpSpPr>
+          <a:xfrm>
+            <a:off x="3635896" y="1556792"/>
+            <a:ext cx="3357034" cy="523220"/>
+            <a:chOff x="3635896" y="1556792"/>
+            <a:chExt cx="3357034" cy="523220"/>
+          </a:xfrm>
+        </p:grpSpPr>
+        <p:sp>
+          <p:nvSpPr>
+            <p:cNvPr id="13" name="TextBox 12"/>
+            <p:cNvSpPr txBox="1"/>
+            <p:nvPr/>
+          </p:nvSpPr>
+          <p:spPr>
+            <a:xfrm>
+              <a:off x="5220072" y="1556792"/>
+              <a:ext cx="1772858" cy="523220"/>
+            </a:xfrm>
+            <a:prstGeom prst="rect">
+              <a:avLst/>
+            </a:prstGeom>
+            <a:noFill/>
+          </p:spPr>
+          <p:txBody>
+            <a:bodyPr wrap="none" rtlCol="0">
+              <a:spAutoFit/>
+            </a:bodyPr>
+            <a:lstStyle/>
+            <a:p>
+              <a:r>
+                <a:rPr lang="en-US" sz="2800" dirty="0" smtClean="0">
+                  <a:solidFill>
+                    <a:srgbClr val="FF0000"/>
+                  </a:solidFill>
+                </a:rPr>
+                <a:t>sweet spot</a:t>
+              </a:r>
+              <a:endParaRPr lang="nl-BE" sz="2800" dirty="0">
+                <a:solidFill>
+                  <a:srgbClr val="FF0000"/>
+                </a:solidFill>
+              </a:endParaRPr>
+            </a:p>
+          </p:txBody>
+        </p:sp>
+        <p:cxnSp>
+          <p:nvCxnSpPr>
+            <p:cNvPr id="15" name="Straight Arrow Connector 14"/>
+            <p:cNvCxnSpPr>
+              <a:stCxn id="13" idx="1"/>
+            </p:cNvCxnSpPr>
+            <p:nvPr/>
+          </p:nvCxnSpPr>
+          <p:spPr>
+            <a:xfrm flipH="1">
+              <a:off x="3635896" y="1818402"/>
+              <a:ext cx="1584176" cy="261610"/>
+            </a:xfrm>
+            <a:prstGeom prst="straightConnector1">
+              <a:avLst/>
+            </a:prstGeom>
+            <a:ln w="19050">
+              <a:solidFill>
+                <a:srgbClr val="FF0000"/>
+              </a:solidFill>
+              <a:tailEnd type="stealth" w="lg" len="lg"/>
+            </a:ln>
+          </p:spPr>
+          <p:style>
+            <a:lnRef idx="1">
+              <a:schemeClr val="accent1"/>
+            </a:lnRef>
+            <a:fillRef idx="0">
+              <a:schemeClr val="accent1"/>
+            </a:fillRef>
+            <a:effectRef idx="0">
+              <a:schemeClr val="accent1"/>
+            </a:effectRef>
+            <a:fontRef idx="minor">
+              <a:schemeClr val="tx1"/>
+            </a:fontRef>
+          </p:style>
+        </p:cxnSp>
+      </p:grpSp>
+      <p:sp>
+        <p:nvSpPr>
+          <p:cNvPr id="17" name="Rectangle 16"/>
+          <p:cNvSpPr/>
+          <p:nvPr/>
+        </p:nvSpPr>
+        <p:spPr>
+          <a:xfrm>
+            <a:off x="4572000" y="4725144"/>
+            <a:ext cx="4320480" cy="1296144"/>
+          </a:xfrm>
+          <a:prstGeom prst="rect">
+            <a:avLst/>
+          </a:prstGeom>
+          <a:pattFill prst="wdUpDiag">
+            <a:fgClr>
+              <a:srgbClr val="FF0000"/>
+            </a:fgClr>
+            <a:bgClr>
+              <a:schemeClr val="bg1"/>
+            </a:bgClr>
+          </a:pattFill>
+          <a:ln>
+            <a:noFill/>
+          </a:ln>
+        </p:spPr>
+        <p:style>
+          <a:lnRef idx="2">
+            <a:schemeClr val="accent1">
+              <a:shade val="50000"/>
+            </a:schemeClr>
+          </a:lnRef>
+          <a:fillRef idx="1">
+            <a:schemeClr val="accent1"/>
+          </a:fillRef>
+          <a:effectRef idx="0">
+            <a:schemeClr val="accent1"/>
+          </a:effectRef>
+          <a:fontRef idx="minor">
+            <a:schemeClr val="lt1"/>
+          </a:fontRef>
+        </p:style>
+        <p:txBody>
+          <a:bodyPr rtlCol="0" anchor="ctr"/>
+          <a:lstStyle/>
+          <a:p>
+            <a:pPr algn="ctr"/>
+            <a:endParaRPr lang="nl-BE"/>
+          </a:p>
+        </p:txBody>
+      </p:sp>
+      <p:grpSp>
+        <p:nvGrpSpPr>
+          <p:cNvPr id="18" name="Group 17"/>
+          <p:cNvGrpSpPr/>
+          <p:nvPr/>
+        </p:nvGrpSpPr>
+        <p:grpSpPr>
+          <a:xfrm>
+            <a:off x="6106501" y="2905780"/>
+            <a:ext cx="2353931" cy="1603340"/>
+            <a:chOff x="4638999" y="1556792"/>
+            <a:chExt cx="2353931" cy="1603340"/>
+          </a:xfrm>
+        </p:grpSpPr>
+        <p:sp>
+          <p:nvSpPr>
+            <p:cNvPr id="19" name="TextBox 18"/>
+            <p:cNvSpPr txBox="1"/>
+            <p:nvPr/>
+          </p:nvSpPr>
+          <p:spPr>
+            <a:xfrm>
+              <a:off x="5220072" y="1556792"/>
+              <a:ext cx="1772858" cy="523220"/>
+            </a:xfrm>
+            <a:prstGeom prst="rect">
+              <a:avLst/>
+            </a:prstGeom>
+            <a:noFill/>
+          </p:spPr>
+          <p:txBody>
+            <a:bodyPr wrap="none" rtlCol="0">
+              <a:spAutoFit/>
+            </a:bodyPr>
+            <a:lstStyle/>
+            <a:p>
+              <a:r>
+                <a:rPr lang="en-US" sz="2800" dirty="0" smtClean="0">
+                  <a:solidFill>
+                    <a:srgbClr val="00B050"/>
+                  </a:solidFill>
+                </a:rPr>
+                <a:t>sweet spot</a:t>
+              </a:r>
+              <a:endParaRPr lang="nl-BE" sz="2800" dirty="0">
+                <a:solidFill>
+                  <a:srgbClr val="00B050"/>
+                </a:solidFill>
+              </a:endParaRPr>
+            </a:p>
+          </p:txBody>
+        </p:sp>
+        <p:cxnSp>
+          <p:nvCxnSpPr>
+            <p:cNvPr id="20" name="Straight Arrow Connector 19"/>
+            <p:cNvCxnSpPr>
+              <a:stCxn id="19" idx="2"/>
+            </p:cNvCxnSpPr>
+            <p:nvPr/>
+          </p:nvCxnSpPr>
+          <p:spPr>
+            <a:xfrm flipH="1">
+              <a:off x="4638999" y="2080012"/>
+              <a:ext cx="1467502" cy="1080120"/>
+            </a:xfrm>
+            <a:prstGeom prst="straightConnector1">
+              <a:avLst/>
+            </a:prstGeom>
+            <a:ln w="19050">
+              <a:solidFill>
+                <a:srgbClr val="00B050"/>
+              </a:solidFill>
+              <a:tailEnd type="stealth" w="lg" len="lg"/>
+            </a:ln>
+          </p:spPr>
+          <p:style>
+            <a:lnRef idx="1">
+              <a:schemeClr val="accent1"/>
+            </a:lnRef>
+            <a:fillRef idx="0">
+              <a:schemeClr val="accent1"/>
+            </a:fillRef>
+            <a:effectRef idx="0">
+              <a:schemeClr val="accent1"/>
+            </a:effectRef>
+            <a:fontRef idx="minor">
+              <a:schemeClr val="tx1"/>
+            </a:fontRef>
+          </p:style>
+        </p:cxnSp>
+      </p:grpSp>
+      <p:grpSp>
+        <p:nvGrpSpPr>
+          <p:cNvPr id="26" name="Group 25"/>
+          <p:cNvGrpSpPr/>
+          <p:nvPr/>
+        </p:nvGrpSpPr>
+        <p:grpSpPr>
+          <a:xfrm>
+            <a:off x="5377646" y="1709192"/>
+            <a:ext cx="1615284" cy="360040"/>
+            <a:chOff x="744214" y="1349152"/>
+            <a:chExt cx="1615284" cy="360040"/>
+          </a:xfrm>
+        </p:grpSpPr>
+        <p:cxnSp>
+          <p:nvCxnSpPr>
+            <p:cNvPr id="24" name="Straight Connector 23"/>
+            <p:cNvCxnSpPr/>
+            <p:nvPr/>
+          </p:nvCxnSpPr>
+          <p:spPr>
+            <a:xfrm>
+              <a:off x="899592" y="1349152"/>
+              <a:ext cx="1459906" cy="360040"/>
+            </a:xfrm>
+            <a:prstGeom prst="line">
+              <a:avLst/>
+            </a:prstGeom>
+            <a:ln w="38100">
+              <a:solidFill>
+                <a:srgbClr val="FF0000"/>
+              </a:solidFill>
+            </a:ln>
+          </p:spPr>
+          <p:style>
+            <a:lnRef idx="1">
+              <a:schemeClr val="accent1"/>
+            </a:lnRef>
+            <a:fillRef idx="0">
+              <a:schemeClr val="accent1"/>
+            </a:fillRef>
+            <a:effectRef idx="0">
+              <a:schemeClr val="accent1"/>
+            </a:effectRef>
+            <a:fontRef idx="minor">
+              <a:schemeClr val="tx1"/>
+            </a:fontRef>
+          </p:style>
+        </p:cxnSp>
+        <p:cxnSp>
+          <p:nvCxnSpPr>
+            <p:cNvPr id="25" name="Straight Connector 24"/>
+            <p:cNvCxnSpPr/>
+            <p:nvPr/>
+          </p:nvCxnSpPr>
+          <p:spPr>
+            <a:xfrm flipV="1">
+              <a:off x="744214" y="1349152"/>
+              <a:ext cx="1459906" cy="360040"/>
+            </a:xfrm>
+            <a:prstGeom prst="line">
+              <a:avLst/>
+            </a:prstGeom>
+            <a:ln w="38100">
+              <a:solidFill>
+                <a:srgbClr val="FF0000"/>
+              </a:solidFill>
+            </a:ln>
+          </p:spPr>
+          <p:style>
+            <a:lnRef idx="1">
+              <a:schemeClr val="accent1"/>
+            </a:lnRef>
+            <a:fillRef idx="0">
+              <a:schemeClr val="accent1"/>
+            </a:fillRef>
+            <a:effectRef idx="0">
+              <a:schemeClr val="accent1"/>
+            </a:effectRef>
+            <a:fontRef idx="minor">
+              <a:schemeClr val="tx1"/>
+            </a:fontRef>
+          </p:style>
+        </p:cxnSp>
+      </p:grpSp>
+      <p:sp>
+        <p:nvSpPr>
+          <p:cNvPr id="3" name="Slide Number Placeholder 2"/>
+          <p:cNvSpPr>
+            <a:spLocks noGrp="1"/>
+          </p:cNvSpPr>
+          <p:nvPr>
+            <p:ph type="sldNum" sz="quarter" idx="12"/>
+          </p:nvPr>
+        </p:nvSpPr>
+        <p:spPr/>
+        <p:txBody>
+          <a:bodyPr/>
+          <a:lstStyle/>
+          <a:p>
+            <a:fld id="{6597116C-F94B-4B5B-973A-17F07FB5C418}" type="slidenum">
+              <a:rPr lang="nl-BE" smtClean="0"/>
+              <a:t>10</a:t>
+            </a:fld>
+            <a:endParaRPr lang="nl-BE"/>
+          </a:p>
+        </p:txBody>
+      </p:sp>
+    </p:spTree>
+    <p:extLst>
+      <p:ext uri="{BB962C8B-B14F-4D97-AF65-F5344CB8AC3E}">
+        <p14:creationId xmlns:p14="http://schemas.microsoft.com/office/powerpoint/2010/main" val="315378486"/>
+      </p:ext>
+    </p:extLst>
+  </p:cSld>
+  <p:clrMapOvr>
+    <a:masterClrMapping/>
+  </p:clrMapOvr>
+  <p:timing>
+    <p:tnLst>
+      <p:par>
+        <p:cTn id="1" dur="indefinite" restart="never" nodeType="tmRoot">
+          <p:childTnLst>
+            <p:seq concurrent="1" nextAc="seek">
+              <p:cTn id="2" dur="indefinite" nodeType="mainSeq">
+                <p:childTnLst>
+                  <p:par>
+                    <p:cTn id="3" fill="hold">
+                      <p:stCondLst>
+                        <p:cond delay="indefinite"/>
+                      </p:stCondLst>
+                      <p:childTnLst>
+                        <p:par>
+                          <p:cTn id="4" fill="hold">
+                            <p:stCondLst>
+                              <p:cond delay="0"/>
+                            </p:stCondLst>
+                            <p:childTnLst>
+                              <p:par>
+                                <p:cTn id="5" presetID="1" presetClass="entr" presetSubtype="0" fill="hold" nodeType="clickEffect">
+                                  <p:stCondLst>
+                                    <p:cond delay="0"/>
+                                  </p:stCondLst>
+                                  <p:childTnLst>
+                                    <p:set>
+                                      <p:cBhvr>
+                                        <p:cTn id="6" dur="1" fill="hold">
+                                          <p:stCondLst>
+                                            <p:cond delay="0"/>
+                                          </p:stCondLst>
+                                        </p:cTn>
+                                        <p:tgtEl>
+                                          <p:spTgt spid="16"/>
+                                        </p:tgtEl>
+                                        <p:attrNameLst>
+                                          <p:attrName>style.visibility</p:attrName>
+                                        </p:attrNameLst>
+                                      </p:cBhvr>
+                                      <p:to>
+                                        <p:strVal val="visible"/>
+                                      </p:to>
+                                    </p:set>
+                                  </p:childTnLst>
+                                </p:cTn>
+                              </p:par>
+                            </p:childTnLst>
+                          </p:cTn>
+                        </p:par>
+                      </p:childTnLst>
+                    </p:cTn>
+                  </p:par>
+                  <p:par>
+                    <p:cTn id="7" fill="hold">
+                      <p:stCondLst>
+                        <p:cond delay="indefinite"/>
+                      </p:stCondLst>
+                      <p:childTnLst>
+                        <p:par>
+                          <p:cTn id="8" fill="hold">
+                            <p:stCondLst>
+                              <p:cond delay="0"/>
+                            </p:stCondLst>
+                            <p:childTnLst>
+                              <p:par>
+                                <p:cTn id="9" presetID="1" presetClass="entr" presetSubtype="0" fill="hold" nodeType="clickEffect">
+                                  <p:stCondLst>
+                                    <p:cond delay="0"/>
+                                  </p:stCondLst>
+                                  <p:childTnLst>
+                                    <p:set>
+                                      <p:cBhvr>
+                                        <p:cTn id="10" dur="1" fill="hold">
+                                          <p:stCondLst>
+                                            <p:cond delay="0"/>
+                                          </p:stCondLst>
+                                        </p:cTn>
+                                        <p:tgtEl>
+                                          <p:spTgt spid="26"/>
+                                        </p:tgtEl>
+                                        <p:attrNameLst>
+                                          <p:attrName>style.visibility</p:attrName>
+                                        </p:attrNameLst>
+                                      </p:cBhvr>
+                                      <p:to>
+                                        <p:strVal val="visible"/>
+                                      </p:to>
+                                    </p:set>
+                                  </p:childTnLst>
+                                </p:cTn>
+                              </p:par>
+                            </p:childTnLst>
+                          </p:cTn>
+                        </p:par>
+                      </p:childTnLst>
+                    </p:cTn>
+                  </p:par>
+                  <p:par>
+                    <p:cTn id="11" fill="hold">
+                      <p:stCondLst>
+                        <p:cond delay="indefinite"/>
+                      </p:stCondLst>
+                      <p:childTnLst>
+                        <p:par>
+                          <p:cTn id="12" fill="hold">
+                            <p:stCondLst>
+                              <p:cond delay="0"/>
+                            </p:stCondLst>
+                            <p:childTnLst>
+                              <p:par>
+                                <p:cTn id="13" presetID="1" presetClass="entr" presetSubtype="0" fill="hold" nodeType="clickEffect">
+                                  <p:stCondLst>
+                                    <p:cond delay="0"/>
+                                  </p:stCondLst>
+                                  <p:childTnLst>
+                                    <p:set>
+                                      <p:cBhvr>
+                                        <p:cTn id="14" dur="1" fill="hold">
+                                          <p:stCondLst>
+                                            <p:cond delay="0"/>
+                                          </p:stCondLst>
+                                        </p:cTn>
+                                        <p:tgtEl>
+                                          <p:spTgt spid="12"/>
+                                        </p:tgtEl>
+                                        <p:attrNameLst>
+                                          <p:attrName>style.visibility</p:attrName>
+                                        </p:attrNameLst>
+                                      </p:cBhvr>
+                                      <p:to>
+                                        <p:strVal val="visible"/>
+                                      </p:to>
+                                    </p:set>
+                                  </p:childTnLst>
+                                </p:cTn>
+                              </p:par>
+                            </p:childTnLst>
+                          </p:cTn>
+                        </p:par>
+                      </p:childTnLst>
+                    </p:cTn>
+                  </p:par>
+                  <p:par>
+                    <p:cTn id="15" fill="hold">
+                      <p:stCondLst>
+                        <p:cond delay="indefinite"/>
+                      </p:stCondLst>
+                      <p:childTnLst>
+                        <p:par>
+                          <p:cTn id="16" fill="hold">
+                            <p:stCondLst>
+                              <p:cond delay="0"/>
+                            </p:stCondLst>
+                            <p:childTnLst>
+                              <p:par>
+                                <p:cTn id="17" presetID="1" presetClass="entr" presetSubtype="0" fill="hold" grpId="0" nodeType="clickEffect">
+                                  <p:stCondLst>
+                                    <p:cond delay="0"/>
+                                  </p:stCondLst>
+                                  <p:childTnLst>
+                                    <p:set>
+                                      <p:cBhvr>
+                                        <p:cTn id="18" dur="1" fill="hold">
+                                          <p:stCondLst>
+                                            <p:cond delay="0"/>
+                                          </p:stCondLst>
+                                        </p:cTn>
+                                        <p:tgtEl>
+                                          <p:spTgt spid="17"/>
+                                        </p:tgtEl>
+                                        <p:attrNameLst>
+                                          <p:attrName>style.visibility</p:attrName>
+                                        </p:attrNameLst>
+                                      </p:cBhvr>
+                                      <p:to>
+                                        <p:strVal val="visible"/>
+                                      </p:to>
+                                    </p:set>
+                                  </p:childTnLst>
+                                </p:cTn>
+                              </p:par>
+                            </p:childTnLst>
+                          </p:cTn>
+                        </p:par>
+                      </p:childTnLst>
+                    </p:cTn>
+                  </p:par>
+                  <p:par>
+                    <p:cTn id="19" fill="hold">
+                      <p:stCondLst>
+                        <p:cond delay="indefinite"/>
+                      </p:stCondLst>
+                      <p:childTnLst>
+                        <p:par>
+                          <p:cTn id="20" fill="hold">
+                            <p:stCondLst>
+                              <p:cond delay="0"/>
+                            </p:stCondLst>
+                            <p:childTnLst>
+                              <p:par>
+                                <p:cTn id="21" presetID="1" presetClass="entr" presetSubtype="0" fill="hold" nodeType="clickEffect">
+                                  <p:stCondLst>
+                                    <p:cond delay="0"/>
+                                  </p:stCondLst>
+                                  <p:childTnLst>
+                                    <p:set>
+                                      <p:cBhvr>
+                                        <p:cTn id="22" dur="1" fill="hold">
+                                          <p:stCondLst>
+                                            <p:cond delay="0"/>
+                                          </p:stCondLst>
+                                        </p:cTn>
+                                        <p:tgtEl>
+                                          <p:spTgt spid="18"/>
+                                        </p:tgtEl>
+                                        <p:attrNameLst>
+                                          <p:attrName>style.visibility</p:attrName>
+                                        </p:attrNameLst>
+                                      </p:cBhvr>
+                                      <p:to>
+                                        <p:strVal val="visible"/>
+                                      </p:to>
+                                    </p:set>
+                                  </p:childTnLst>
+                                </p:cTn>
+                              </p:par>
+                            </p:childTnLst>
+                          </p:cTn>
+                        </p:par>
+                      </p:childTnLst>
+                    </p:cTn>
+                  </p:par>
+                </p:childTnLst>
+              </p:cTn>
+              <p:prevCondLst>
+                <p:cond evt="onPrev" delay="0">
+                  <p:tgtEl>
+                    <p:sldTgt/>
+                  </p:tgtEl>
+                </p:cond>
+              </p:prevCondLst>
+              <p:nextCondLst>
+                <p:cond evt="onNext" delay="0">
+                  <p:tgtEl>
+                    <p:sldTgt/>
+                  </p:tgtEl>
+                </p:cond>
+              </p:nextCondLst>
+            </p:seq>
+          </p:childTnLst>
+        </p:cTn>
+      </p:par>
+    </p:tnLst>
+    <p:bldLst>
+      <p:bldP spid="17" grpId="0" animBg="1"/>
+    </p:bldLst>
+  </p:timing>
+</p:sld>
+</file>
+
+<file path=ppt/slides/slide11.xml><?xml version="1.0" encoding="utf-8"?>
 <p:sld xmlns:a="http://schemas.openxmlformats.org/drawingml/2006/main" xmlns:r="http://schemas.openxmlformats.org/officeDocument/2006/relationships" xmlns:p="http://schemas.openxmlformats.org/presentationml/2006/main">
   <p:cSld>
     <p:spTree>
@@ -6021,7 +6874,7 @@
           <a:p>
             <a:fld id="{6597116C-F94B-4B5B-973A-17F07FB5C418}" type="slidenum">
               <a:rPr lang="nl-BE" smtClean="0"/>
-              <a:t>10</a:t>
+              <a:t>11</a:t>
             </a:fld>
             <a:endParaRPr lang="nl-BE"/>
           </a:p>
@@ -6413,133 +7266,6 @@
 </p:sld>
 </file>
 
-<file path=ppt/slides/slide11.xml><?xml version="1.0" encoding="utf-8"?>
-<p:sld xmlns:a="http://schemas.openxmlformats.org/drawingml/2006/main" xmlns:r="http://schemas.openxmlformats.org/officeDocument/2006/relationships" xmlns:p="http://schemas.openxmlformats.org/presentationml/2006/main">
-  <p:cSld>
-    <p:spTree>
-      <p:nvGrpSpPr>
-        <p:cNvPr id="1" name=""/>
-        <p:cNvGrpSpPr/>
-        <p:nvPr/>
-      </p:nvGrpSpPr>
-      <p:grpSpPr>
-        <a:xfrm>
-          <a:off x="0" y="0"/>
-          <a:ext cx="0" cy="0"/>
-          <a:chOff x="0" y="0"/>
-          <a:chExt cx="0" cy="0"/>
-        </a:xfrm>
-      </p:grpSpPr>
-      <p:sp>
-        <p:nvSpPr>
-          <p:cNvPr id="2" name="Title 1"/>
-          <p:cNvSpPr>
-            <a:spLocks noGrp="1"/>
-          </p:cNvSpPr>
-          <p:nvPr>
-            <p:ph type="title"/>
-          </p:nvPr>
-        </p:nvSpPr>
-        <p:spPr/>
-        <p:txBody>
-          <a:bodyPr/>
-          <a:lstStyle/>
-          <a:p>
-            <a:r>
-              <a:rPr lang="en-US" dirty="0" smtClean="0"/>
-              <a:t>We love Gustafson</a:t>
-            </a:r>
-            <a:endParaRPr lang="nl-BE" dirty="0"/>
-          </a:p>
-        </p:txBody>
-      </p:sp>
-      <p:sp>
-        <p:nvSpPr>
-          <p:cNvPr id="3" name="Content Placeholder 2"/>
-          <p:cNvSpPr>
-            <a:spLocks noGrp="1"/>
-          </p:cNvSpPr>
-          <p:nvPr>
-            <p:ph idx="1"/>
-          </p:nvPr>
-        </p:nvSpPr>
-        <p:spPr/>
-        <p:txBody>
-          <a:bodyPr/>
-          <a:lstStyle/>
-          <a:p>
-            <a:r>
-              <a:rPr lang="en-US" dirty="0" smtClean="0"/>
-              <a:t>Scientist are interested in</a:t>
-            </a:r>
-          </a:p>
-          <a:p>
-            <a:pPr lvl="1"/>
-            <a:r>
-              <a:rPr lang="en-US" dirty="0" smtClean="0"/>
-              <a:t>studying larger systems/bigger data sets</a:t>
-            </a:r>
-          </a:p>
-          <a:p>
-            <a:pPr lvl="1"/>
-            <a:r>
-              <a:rPr lang="en-US" dirty="0" smtClean="0"/>
-              <a:t>increasing precision/resolution</a:t>
-            </a:r>
-          </a:p>
-          <a:p>
-            <a:pPr lvl="1"/>
-            <a:r>
-              <a:rPr lang="en-US" dirty="0" smtClean="0"/>
-              <a:t>…</a:t>
-            </a:r>
-            <a:endParaRPr lang="nl-BE" dirty="0"/>
-          </a:p>
-        </p:txBody>
-      </p:sp>
-      <p:sp>
-        <p:nvSpPr>
-          <p:cNvPr id="4" name="Slide Number Placeholder 3"/>
-          <p:cNvSpPr>
-            <a:spLocks noGrp="1"/>
-          </p:cNvSpPr>
-          <p:nvPr>
-            <p:ph type="sldNum" sz="quarter" idx="12"/>
-          </p:nvPr>
-        </p:nvSpPr>
-        <p:spPr/>
-        <p:txBody>
-          <a:bodyPr/>
-          <a:lstStyle/>
-          <a:p>
-            <a:fld id="{6597116C-F94B-4B5B-973A-17F07FB5C418}" type="slidenum">
-              <a:rPr lang="nl-BE" smtClean="0"/>
-              <a:t>11</a:t>
-            </a:fld>
-            <a:endParaRPr lang="nl-BE"/>
-          </a:p>
-        </p:txBody>
-      </p:sp>
-    </p:spTree>
-    <p:extLst>
-      <p:ext uri="{BB962C8B-B14F-4D97-AF65-F5344CB8AC3E}">
-        <p14:creationId xmlns:p14="http://schemas.microsoft.com/office/powerpoint/2010/main" val="3599898149"/>
-      </p:ext>
-    </p:extLst>
-  </p:cSld>
-  <p:clrMapOvr>
-    <a:masterClrMapping/>
-  </p:clrMapOvr>
-  <p:timing>
-    <p:tnLst>
-      <p:par>
-        <p:cTn id="1" dur="indefinite" restart="never" nodeType="tmRoot"/>
-      </p:par>
-    </p:tnLst>
-  </p:timing>
-</p:sld>
-</file>
-
 <file path=ppt/slides/slide12.xml><?xml version="1.0" encoding="utf-8"?>
 <p:sld xmlns:a="http://schemas.openxmlformats.org/drawingml/2006/main" xmlns:r="http://schemas.openxmlformats.org/officeDocument/2006/relationships" xmlns:p="http://schemas.openxmlformats.org/presentationml/2006/main">
   <p:cSld>
@@ -6574,6 +7300,133 @@
           <a:p>
             <a:r>
               <a:rPr lang="en-US" dirty="0" smtClean="0"/>
+              <a:t>We love Gustafson</a:t>
+            </a:r>
+            <a:endParaRPr lang="nl-BE" dirty="0"/>
+          </a:p>
+        </p:txBody>
+      </p:sp>
+      <p:sp>
+        <p:nvSpPr>
+          <p:cNvPr id="3" name="Content Placeholder 2"/>
+          <p:cNvSpPr>
+            <a:spLocks noGrp="1"/>
+          </p:cNvSpPr>
+          <p:nvPr>
+            <p:ph idx="1"/>
+          </p:nvPr>
+        </p:nvSpPr>
+        <p:spPr/>
+        <p:txBody>
+          <a:bodyPr/>
+          <a:lstStyle/>
+          <a:p>
+            <a:r>
+              <a:rPr lang="en-US" dirty="0" smtClean="0"/>
+              <a:t>Scientist are interested in</a:t>
+            </a:r>
+          </a:p>
+          <a:p>
+            <a:pPr lvl="1"/>
+            <a:r>
+              <a:rPr lang="en-US" dirty="0" smtClean="0"/>
+              <a:t>studying larger systems/bigger data sets</a:t>
+            </a:r>
+          </a:p>
+          <a:p>
+            <a:pPr lvl="1"/>
+            <a:r>
+              <a:rPr lang="en-US" dirty="0" smtClean="0"/>
+              <a:t>increasing precision/resolution</a:t>
+            </a:r>
+          </a:p>
+          <a:p>
+            <a:pPr lvl="1"/>
+            <a:r>
+              <a:rPr lang="en-US" dirty="0" smtClean="0"/>
+              <a:t>…</a:t>
+            </a:r>
+            <a:endParaRPr lang="nl-BE" dirty="0"/>
+          </a:p>
+        </p:txBody>
+      </p:sp>
+      <p:sp>
+        <p:nvSpPr>
+          <p:cNvPr id="4" name="Slide Number Placeholder 3"/>
+          <p:cNvSpPr>
+            <a:spLocks noGrp="1"/>
+          </p:cNvSpPr>
+          <p:nvPr>
+            <p:ph type="sldNum" sz="quarter" idx="12"/>
+          </p:nvPr>
+        </p:nvSpPr>
+        <p:spPr/>
+        <p:txBody>
+          <a:bodyPr/>
+          <a:lstStyle/>
+          <a:p>
+            <a:fld id="{6597116C-F94B-4B5B-973A-17F07FB5C418}" type="slidenum">
+              <a:rPr lang="nl-BE" smtClean="0"/>
+              <a:t>12</a:t>
+            </a:fld>
+            <a:endParaRPr lang="nl-BE"/>
+          </a:p>
+        </p:txBody>
+      </p:sp>
+    </p:spTree>
+    <p:extLst>
+      <p:ext uri="{BB962C8B-B14F-4D97-AF65-F5344CB8AC3E}">
+        <p14:creationId xmlns:p14="http://schemas.microsoft.com/office/powerpoint/2010/main" val="3599898149"/>
+      </p:ext>
+    </p:extLst>
+  </p:cSld>
+  <p:clrMapOvr>
+    <a:masterClrMapping/>
+  </p:clrMapOvr>
+  <p:timing>
+    <p:tnLst>
+      <p:par>
+        <p:cTn id="1" dur="indefinite" restart="never" nodeType="tmRoot"/>
+      </p:par>
+    </p:tnLst>
+  </p:timing>
+</p:sld>
+</file>
+
+<file path=ppt/slides/slide13.xml><?xml version="1.0" encoding="utf-8"?>
+<p:sld xmlns:a="http://schemas.openxmlformats.org/drawingml/2006/main" xmlns:r="http://schemas.openxmlformats.org/officeDocument/2006/relationships" xmlns:p="http://schemas.openxmlformats.org/presentationml/2006/main">
+  <p:cSld>
+    <p:spTree>
+      <p:nvGrpSpPr>
+        <p:cNvPr id="1" name=""/>
+        <p:cNvGrpSpPr/>
+        <p:nvPr/>
+      </p:nvGrpSpPr>
+      <p:grpSpPr>
+        <a:xfrm>
+          <a:off x="0" y="0"/>
+          <a:ext cx="0" cy="0"/>
+          <a:chOff x="0" y="0"/>
+          <a:chExt cx="0" cy="0"/>
+        </a:xfrm>
+      </p:grpSpPr>
+      <p:sp>
+        <p:nvSpPr>
+          <p:cNvPr id="2" name="Title 1"/>
+          <p:cNvSpPr>
+            <a:spLocks noGrp="1"/>
+          </p:cNvSpPr>
+          <p:nvPr>
+            <p:ph type="title"/>
+          </p:nvPr>
+        </p:nvSpPr>
+        <p:spPr/>
+        <p:txBody>
+          <a:bodyPr/>
+          <a:lstStyle/>
+          <a:p>
+            <a:r>
+              <a:rPr lang="en-US" dirty="0" smtClean="0"/>
               <a:t>Throughput computing</a:t>
             </a:r>
             <a:endParaRPr lang="en-US" dirty="0"/>
@@ -6689,7 +7542,7 @@
           <a:graphicData uri="http://schemas.openxmlformats.org/presentationml/2006/ole">
             <mc:AlternateContent xmlns:mc="http://schemas.openxmlformats.org/markup-compatibility/2006">
               <mc:Choice xmlns:v="urn:schemas-microsoft-com:vml" Requires="v">
-                <p:oleObj spid="_x0000_s1110" name="Equation" r:id="rId3" imgW="812520" imgH="393480" progId="Equation.3">
+                <p:oleObj spid="_x0000_s1116" name="Equation" r:id="rId3" imgW="812520" imgH="393480" progId="Equation.3">
                   <p:embed/>
                 </p:oleObj>
               </mc:Choice>
@@ -6746,7 +7599,7 @@
           <a:graphicData uri="http://schemas.openxmlformats.org/presentationml/2006/ole">
             <mc:AlternateContent xmlns:mc="http://schemas.openxmlformats.org/markup-compatibility/2006">
               <mc:Choice xmlns:v="urn:schemas-microsoft-com:vml" Requires="v">
-                <p:oleObj spid="_x0000_s1111" name="Equation" r:id="rId5" imgW="2489040" imgH="431640" progId="Equation.3">
+                <p:oleObj spid="_x0000_s1117" name="Equation" r:id="rId5" imgW="2489040" imgH="431640" progId="Equation.3">
                   <p:embed/>
                 </p:oleObj>
               </mc:Choice>
@@ -6833,7 +7686,7 @@
           <a:p>
             <a:fld id="{6597116C-F94B-4B5B-973A-17F07FB5C418}" type="slidenum">
               <a:rPr lang="nl-BE" smtClean="0"/>
-              <a:t>12</a:t>
+              <a:t>13</a:t>
             </a:fld>
             <a:endParaRPr lang="nl-BE"/>
           </a:p>
@@ -7269,7 +8122,7 @@
 </p:sld>
 </file>
 
-<file path=ppt/slides/slide13.xml><?xml version="1.0" encoding="utf-8"?>
+<file path=ppt/slides/slide14.xml><?xml version="1.0" encoding="utf-8"?>
 <p:sld xmlns:a="http://schemas.openxmlformats.org/drawingml/2006/main" xmlns:r="http://schemas.openxmlformats.org/officeDocument/2006/relationships" xmlns:p="http://schemas.openxmlformats.org/presentationml/2006/main">
   <p:cSld>
     <p:spTree>
@@ -7345,7 +8198,7 @@
           <a:p>
             <a:fld id="{6597116C-F94B-4B5B-973A-17F07FB5C418}" type="slidenum">
               <a:rPr lang="nl-BE" smtClean="0"/>
-              <a:t>13</a:t>
+              <a:t>14</a:t>
             </a:fld>
             <a:endParaRPr lang="nl-BE"/>
           </a:p>
@@ -7371,7 +8224,7 @@
 </p:sld>
 </file>
 
-<file path=ppt/slides/slide14.xml><?xml version="1.0" encoding="utf-8"?>
+<file path=ppt/slides/slide15.xml><?xml version="1.0" encoding="utf-8"?>
 <p:sld xmlns:a="http://schemas.openxmlformats.org/drawingml/2006/main" xmlns:r="http://schemas.openxmlformats.org/officeDocument/2006/relationships" xmlns:p="http://schemas.openxmlformats.org/presentationml/2006/main">
   <p:cSld>
     <p:spTree>
@@ -12492,7 +13345,7 @@
             <a:fld id="{F35D8031-C8E5-48F8-A3B6-81643B27A3AF}" type="slidenum">
               <a:rPr lang="nl-BE" smtClean="0"/>
               <a:pPr/>
-              <a:t>14</a:t>
+              <a:t>15</a:t>
             </a:fld>
             <a:endParaRPr lang="nl-BE" dirty="0"/>
           </a:p>
@@ -12518,7 +13371,102 @@
 </p:sld>
 </file>
 
-<file path=ppt/slides/slide15.xml><?xml version="1.0" encoding="utf-8"?>
+<file path=ppt/slides/slide16.xml><?xml version="1.0" encoding="utf-8"?>
+<p:sld xmlns:a="http://schemas.openxmlformats.org/drawingml/2006/main" xmlns:r="http://schemas.openxmlformats.org/officeDocument/2006/relationships" xmlns:p="http://schemas.openxmlformats.org/presentationml/2006/main">
+  <p:cSld>
+    <p:spTree>
+      <p:nvGrpSpPr>
+        <p:cNvPr id="1" name=""/>
+        <p:cNvGrpSpPr/>
+        <p:nvPr/>
+      </p:nvGrpSpPr>
+      <p:grpSpPr>
+        <a:xfrm>
+          <a:off x="0" y="0"/>
+          <a:ext cx="0" cy="0"/>
+          <a:chOff x="0" y="0"/>
+          <a:chExt cx="0" cy="0"/>
+        </a:xfrm>
+      </p:grpSpPr>
+      <p:sp>
+        <p:nvSpPr>
+          <p:cNvPr id="2" name="Title 1"/>
+          <p:cNvSpPr>
+            <a:spLocks noGrp="1"/>
+          </p:cNvSpPr>
+          <p:nvPr>
+            <p:ph type="title"/>
+          </p:nvPr>
+        </p:nvSpPr>
+        <p:spPr/>
+        <p:txBody>
+          <a:bodyPr/>
+          <a:lstStyle/>
+          <a:p>
+            <a:r>
+              <a:rPr lang="en-US" dirty="0" smtClean="0"/>
+              <a:t>Memory</a:t>
+            </a:r>
+            <a:endParaRPr lang="nl-BE" dirty="0"/>
+          </a:p>
+        </p:txBody>
+      </p:sp>
+      <p:sp>
+        <p:nvSpPr>
+          <p:cNvPr id="3" name="Text Placeholder 2"/>
+          <p:cNvSpPr>
+            <a:spLocks noGrp="1"/>
+          </p:cNvSpPr>
+          <p:nvPr>
+            <p:ph type="body" idx="1"/>
+          </p:nvPr>
+        </p:nvSpPr>
+        <p:spPr/>
+        <p:txBody>
+          <a:bodyPr/>
+          <a:lstStyle/>
+          <a:p>
+            <a:endParaRPr lang="nl-BE"/>
+          </a:p>
+        </p:txBody>
+      </p:sp>
+      <p:sp>
+        <p:nvSpPr>
+          <p:cNvPr id="4" name="Slide Number Placeholder 3"/>
+          <p:cNvSpPr>
+            <a:spLocks noGrp="1"/>
+          </p:cNvSpPr>
+          <p:nvPr>
+            <p:ph type="sldNum" sz="quarter" idx="12"/>
+          </p:nvPr>
+        </p:nvSpPr>
+        <p:spPr/>
+        <p:txBody>
+          <a:bodyPr/>
+          <a:lstStyle/>
+          <a:p>
+            <a:fld id="{6597116C-F94B-4B5B-973A-17F07FB5C418}" type="slidenum">
+              <a:rPr lang="nl-BE" smtClean="0"/>
+              <a:t>16</a:t>
+            </a:fld>
+            <a:endParaRPr lang="nl-BE"/>
+          </a:p>
+        </p:txBody>
+      </p:sp>
+    </p:spTree>
+    <p:extLst>
+      <p:ext uri="{BB962C8B-B14F-4D97-AF65-F5344CB8AC3E}">
+        <p14:creationId xmlns:p14="http://schemas.microsoft.com/office/powerpoint/2010/main" val="519922008"/>
+      </p:ext>
+    </p:extLst>
+  </p:cSld>
+  <p:clrMapOvr>
+    <a:masterClrMapping/>
+  </p:clrMapOvr>
+</p:sld>
+</file>
+
+<file path=ppt/slides/slide17.xml><?xml version="1.0" encoding="utf-8"?>
 <p:sld xmlns:a="http://schemas.openxmlformats.org/drawingml/2006/main" xmlns:r="http://schemas.openxmlformats.org/officeDocument/2006/relationships" xmlns:p="http://schemas.openxmlformats.org/presentationml/2006/main">
   <p:cSld>
     <p:spTree>
@@ -12843,7 +13791,7 @@
           <a:p>
             <a:fld id="{6597116C-F94B-4B5B-973A-17F07FB5C418}" type="slidenum">
               <a:rPr lang="nl-BE" smtClean="0"/>
-              <a:t>15</a:t>
+              <a:t>17</a:t>
             </a:fld>
             <a:endParaRPr lang="nl-BE"/>
           </a:p>
@@ -13483,7 +14431,7 @@
 </p:sld>
 </file>
 
-<file path=ppt/slides/slide16.xml><?xml version="1.0" encoding="utf-8"?>
+<file path=ppt/slides/slide18.xml><?xml version="1.0" encoding="utf-8"?>
 <p:sld xmlns:a="http://schemas.openxmlformats.org/drawingml/2006/main" xmlns:r="http://schemas.openxmlformats.org/officeDocument/2006/relationships" xmlns:p="http://schemas.openxmlformats.org/presentationml/2006/main">
   <p:cSld>
     <p:spTree>
@@ -13827,7 +14775,7 @@
           <a:p>
             <a:fld id="{6597116C-F94B-4B5B-973A-17F07FB5C418}" type="slidenum">
               <a:rPr lang="nl-BE" smtClean="0"/>
-              <a:t>16</a:t>
+              <a:t>18</a:t>
             </a:fld>
             <a:endParaRPr lang="nl-BE"/>
           </a:p>
@@ -14446,7 +15394,7 @@
 </p:sld>
 </file>
 
-<file path=ppt/slides/slide17.xml><?xml version="1.0" encoding="utf-8"?>
+<file path=ppt/slides/slide19.xml><?xml version="1.0" encoding="utf-8"?>
 <p:sld xmlns:a="http://schemas.openxmlformats.org/drawingml/2006/main" xmlns:r="http://schemas.openxmlformats.org/officeDocument/2006/relationships" xmlns:p="http://schemas.openxmlformats.org/presentationml/2006/main">
   <p:cSld>
     <p:spTree>
@@ -15510,7 +16458,7 @@
           <a:p>
             <a:fld id="{6597116C-F94B-4B5B-973A-17F07FB5C418}" type="slidenum">
               <a:rPr lang="nl-BE" smtClean="0"/>
-              <a:t>17</a:t>
+              <a:t>19</a:t>
             </a:fld>
             <a:endParaRPr lang="nl-BE"/>
           </a:p>
@@ -16053,7 +17001,7 @@
 </p:sld>
 </file>
 
-<file path=ppt/slides/slide18.xml><?xml version="1.0" encoding="utf-8"?>
+<file path=ppt/slides/slide2.xml><?xml version="1.0" encoding="utf-8"?>
 <p:sld xmlns:a="http://schemas.openxmlformats.org/drawingml/2006/main" xmlns:r="http://schemas.openxmlformats.org/officeDocument/2006/relationships" xmlns:p="http://schemas.openxmlformats.org/presentationml/2006/main">
   <p:cSld>
     <p:spTree>
@@ -16087,7 +17035,106 @@
           <a:p>
             <a:r>
               <a:rPr lang="en-US" dirty="0" smtClean="0"/>
-              <a:t>Cache line timings</a:t>
+              <a:t>Parallelism</a:t>
+            </a:r>
+            <a:endParaRPr lang="en-US" dirty="0"/>
+          </a:p>
+        </p:txBody>
+      </p:sp>
+      <p:sp>
+        <p:nvSpPr>
+          <p:cNvPr id="3" name="Content Placeholder 2"/>
+          <p:cNvSpPr>
+            <a:spLocks noGrp="1"/>
+          </p:cNvSpPr>
+          <p:nvPr>
+            <p:ph idx="1"/>
+          </p:nvPr>
+        </p:nvSpPr>
+        <p:spPr/>
+        <p:txBody>
+          <a:bodyPr/>
+          <a:lstStyle/>
+          <a:p>
+            <a:r>
+              <a:rPr lang="en-US" dirty="0" smtClean="0"/>
+              <a:t>Levels</a:t>
+            </a:r>
+          </a:p>
+          <a:p>
+            <a:pPr lvl="1"/>
+            <a:r>
+              <a:rPr lang="en-US" dirty="0" smtClean="0"/>
+              <a:t>vectorization</a:t>
+            </a:r>
+          </a:p>
+          <a:p>
+            <a:pPr lvl="2"/>
+            <a:r>
+              <a:rPr lang="en-US" dirty="0" smtClean="0"/>
+              <a:t>compiler flags, some help needed from programmer</a:t>
+            </a:r>
+          </a:p>
+          <a:p>
+            <a:pPr lvl="1"/>
+            <a:r>
+              <a:rPr lang="en-US" dirty="0" smtClean="0"/>
+              <a:t>multicore</a:t>
+            </a:r>
+          </a:p>
+          <a:p>
+            <a:pPr lvl="2"/>
+            <a:r>
+              <a:rPr lang="en-US" dirty="0" err="1" smtClean="0"/>
+              <a:t>OpenMP</a:t>
+            </a:r>
+            <a:r>
+              <a:rPr lang="en-US" dirty="0" smtClean="0"/>
+              <a:t>/</a:t>
+            </a:r>
+            <a:r>
+              <a:rPr lang="en-US" dirty="0" err="1" smtClean="0"/>
+              <a:t>pthreads</a:t>
+            </a:r>
+            <a:r>
+              <a:rPr lang="en-US" dirty="0" smtClean="0"/>
+              <a:t>: programmer's job</a:t>
+            </a:r>
+          </a:p>
+          <a:p>
+            <a:pPr lvl="1"/>
+            <a:r>
+              <a:rPr lang="en-US" dirty="0" smtClean="0"/>
+              <a:t>multiple node, i.e., distributed</a:t>
+            </a:r>
+          </a:p>
+          <a:p>
+            <a:pPr lvl="2"/>
+            <a:r>
+              <a:rPr lang="en-US" dirty="0" smtClean="0"/>
+              <a:t>MPI: programmer's job</a:t>
+            </a:r>
+          </a:p>
+          <a:p>
+            <a:pPr lvl="1"/>
+            <a:r>
+              <a:rPr lang="en-US" dirty="0" smtClean="0"/>
+              <a:t>GPGPU</a:t>
+            </a:r>
+          </a:p>
+          <a:p>
+            <a:pPr lvl="2"/>
+            <a:r>
+              <a:rPr lang="en-US" dirty="0" smtClean="0"/>
+              <a:t>CUDA/</a:t>
+            </a:r>
+            <a:r>
+              <a:rPr lang="en-US" dirty="0" err="1" smtClean="0"/>
+              <a:t>OpenACC</a:t>
+            </a:r>
+            <a:r>
+              <a:rPr lang="en-US" dirty="0" smtClean="0"/>
+              <a:t>/OpenCL: programmer's job</a:t>
             </a:r>
             <a:endParaRPr lang="en-US" dirty="0"/>
           </a:p>
@@ -16110,7 +17157,621 @@
           <a:p>
             <a:fld id="{6597116C-F94B-4B5B-973A-17F07FB5C418}" type="slidenum">
               <a:rPr lang="nl-BE" smtClean="0"/>
-              <a:t>18</a:t>
+              <a:t>2</a:t>
+            </a:fld>
+            <a:endParaRPr lang="nl-BE"/>
+          </a:p>
+        </p:txBody>
+      </p:sp>
+      <p:grpSp>
+        <p:nvGrpSpPr>
+          <p:cNvPr id="7" name="Group 6"/>
+          <p:cNvGrpSpPr/>
+          <p:nvPr/>
+        </p:nvGrpSpPr>
+        <p:grpSpPr>
+          <a:xfrm>
+            <a:off x="6553200" y="3284984"/>
+            <a:ext cx="1479142" cy="1656184"/>
+            <a:chOff x="6553200" y="3284984"/>
+            <a:chExt cx="1479142" cy="1656184"/>
+          </a:xfrm>
+        </p:grpSpPr>
+        <p:sp>
+          <p:nvSpPr>
+            <p:cNvPr id="5" name="Right Brace 4"/>
+            <p:cNvSpPr/>
+            <p:nvPr/>
+          </p:nvSpPr>
+          <p:spPr>
+            <a:xfrm>
+              <a:off x="6553200" y="3284984"/>
+              <a:ext cx="179040" cy="1656184"/>
+            </a:xfrm>
+            <a:prstGeom prst="rightBrace">
+              <a:avLst/>
+            </a:prstGeom>
+            <a:ln>
+              <a:solidFill>
+                <a:schemeClr val="tx1"/>
+              </a:solidFill>
+            </a:ln>
+          </p:spPr>
+          <p:style>
+            <a:lnRef idx="1">
+              <a:schemeClr val="accent1"/>
+            </a:lnRef>
+            <a:fillRef idx="0">
+              <a:schemeClr val="accent1"/>
+            </a:fillRef>
+            <a:effectRef idx="0">
+              <a:schemeClr val="accent1"/>
+            </a:effectRef>
+            <a:fontRef idx="minor">
+              <a:schemeClr val="tx1"/>
+            </a:fontRef>
+          </p:style>
+          <p:txBody>
+            <a:bodyPr rtlCol="0" anchor="ctr"/>
+            <a:lstStyle/>
+            <a:p>
+              <a:pPr algn="ctr"/>
+              <a:endParaRPr lang="en-US"/>
+            </a:p>
+          </p:txBody>
+        </p:sp>
+        <p:sp>
+          <p:nvSpPr>
+            <p:cNvPr id="6" name="TextBox 5"/>
+            <p:cNvSpPr txBox="1"/>
+            <p:nvPr/>
+          </p:nvSpPr>
+          <p:spPr>
+            <a:xfrm>
+              <a:off x="6876256" y="3851466"/>
+              <a:ext cx="1156086" cy="523220"/>
+            </a:xfrm>
+            <a:prstGeom prst="rect">
+              <a:avLst/>
+            </a:prstGeom>
+            <a:noFill/>
+          </p:spPr>
+          <p:txBody>
+            <a:bodyPr wrap="none" rtlCol="0">
+              <a:spAutoFit/>
+            </a:bodyPr>
+            <a:lstStyle/>
+            <a:p>
+              <a:r>
+                <a:rPr lang="en-US" sz="2800" dirty="0" smtClean="0"/>
+                <a:t>Hybrid</a:t>
+              </a:r>
+              <a:endParaRPr lang="en-US" sz="2800" dirty="0"/>
+            </a:p>
+          </p:txBody>
+        </p:sp>
+      </p:grpSp>
+    </p:spTree>
+    <p:extLst>
+      <p:ext uri="{BB962C8B-B14F-4D97-AF65-F5344CB8AC3E}">
+        <p14:creationId xmlns:p14="http://schemas.microsoft.com/office/powerpoint/2010/main" val="1972215598"/>
+      </p:ext>
+    </p:extLst>
+  </p:cSld>
+  <p:clrMapOvr>
+    <a:masterClrMapping/>
+  </p:clrMapOvr>
+  <p:timing>
+    <p:tnLst>
+      <p:par>
+        <p:cTn id="1" dur="indefinite" restart="never" nodeType="tmRoot">
+          <p:childTnLst>
+            <p:seq concurrent="1" nextAc="seek">
+              <p:cTn id="2" dur="indefinite" nodeType="mainSeq">
+                <p:childTnLst>
+                  <p:par>
+                    <p:cTn id="3" fill="hold">
+                      <p:stCondLst>
+                        <p:cond delay="indefinite"/>
+                        <p:cond evt="onBegin" delay="0">
+                          <p:tn val="2"/>
+                        </p:cond>
+                      </p:stCondLst>
+                      <p:childTnLst>
+                        <p:par>
+                          <p:cTn id="4" fill="hold">
+                            <p:stCondLst>
+                              <p:cond delay="0"/>
+                            </p:stCondLst>
+                            <p:childTnLst>
+                              <p:par>
+                                <p:cTn id="5" presetID="1" presetClass="entr" presetSubtype="0" fill="hold" grpId="0" nodeType="withEffect">
+                                  <p:stCondLst>
+                                    <p:cond delay="0"/>
+                                  </p:stCondLst>
+                                  <p:childTnLst>
+                                    <p:set>
+                                      <p:cBhvr>
+                                        <p:cTn id="6" dur="1" fill="hold">
+                                          <p:stCondLst>
+                                            <p:cond delay="0"/>
+                                          </p:stCondLst>
+                                        </p:cTn>
+                                        <p:tgtEl>
+                                          <p:spTgt spid="3">
+                                            <p:txEl>
+                                              <p:pRg st="0" end="0"/>
+                                            </p:txEl>
+                                          </p:spTgt>
+                                        </p:tgtEl>
+                                        <p:attrNameLst>
+                                          <p:attrName>style.visibility</p:attrName>
+                                        </p:attrNameLst>
+                                      </p:cBhvr>
+                                      <p:to>
+                                        <p:strVal val="visible"/>
+                                      </p:to>
+                                    </p:set>
+                                  </p:childTnLst>
+                                </p:cTn>
+                              </p:par>
+                            </p:childTnLst>
+                          </p:cTn>
+                        </p:par>
+                      </p:childTnLst>
+                    </p:cTn>
+                  </p:par>
+                  <p:par>
+                    <p:cTn id="7" fill="hold">
+                      <p:stCondLst>
+                        <p:cond delay="indefinite"/>
+                      </p:stCondLst>
+                      <p:childTnLst>
+                        <p:par>
+                          <p:cTn id="8" fill="hold">
+                            <p:stCondLst>
+                              <p:cond delay="0"/>
+                            </p:stCondLst>
+                            <p:childTnLst>
+                              <p:par>
+                                <p:cTn id="9" presetID="1" presetClass="entr" presetSubtype="0" fill="hold" grpId="0" nodeType="clickEffect">
+                                  <p:stCondLst>
+                                    <p:cond delay="0"/>
+                                  </p:stCondLst>
+                                  <p:childTnLst>
+                                    <p:set>
+                                      <p:cBhvr>
+                                        <p:cTn id="10" dur="1" fill="hold">
+                                          <p:stCondLst>
+                                            <p:cond delay="0"/>
+                                          </p:stCondLst>
+                                        </p:cTn>
+                                        <p:tgtEl>
+                                          <p:spTgt spid="3">
+                                            <p:txEl>
+                                              <p:pRg st="1" end="1"/>
+                                            </p:txEl>
+                                          </p:spTgt>
+                                        </p:tgtEl>
+                                        <p:attrNameLst>
+                                          <p:attrName>style.visibility</p:attrName>
+                                        </p:attrNameLst>
+                                      </p:cBhvr>
+                                      <p:to>
+                                        <p:strVal val="visible"/>
+                                      </p:to>
+                                    </p:set>
+                                  </p:childTnLst>
+                                </p:cTn>
+                              </p:par>
+                              <p:par>
+                                <p:cTn id="11" presetID="1" presetClass="entr" presetSubtype="0" fill="hold" grpId="0" nodeType="withEffect">
+                                  <p:stCondLst>
+                                    <p:cond delay="0"/>
+                                  </p:stCondLst>
+                                  <p:childTnLst>
+                                    <p:set>
+                                      <p:cBhvr>
+                                        <p:cTn id="12" dur="1" fill="hold">
+                                          <p:stCondLst>
+                                            <p:cond delay="0"/>
+                                          </p:stCondLst>
+                                        </p:cTn>
+                                        <p:tgtEl>
+                                          <p:spTgt spid="3">
+                                            <p:txEl>
+                                              <p:pRg st="2" end="2"/>
+                                            </p:txEl>
+                                          </p:spTgt>
+                                        </p:tgtEl>
+                                        <p:attrNameLst>
+                                          <p:attrName>style.visibility</p:attrName>
+                                        </p:attrNameLst>
+                                      </p:cBhvr>
+                                      <p:to>
+                                        <p:strVal val="visible"/>
+                                      </p:to>
+                                    </p:set>
+                                  </p:childTnLst>
+                                </p:cTn>
+                              </p:par>
+                            </p:childTnLst>
+                          </p:cTn>
+                        </p:par>
+                      </p:childTnLst>
+                    </p:cTn>
+                  </p:par>
+                  <p:par>
+                    <p:cTn id="13" fill="hold">
+                      <p:stCondLst>
+                        <p:cond delay="indefinite"/>
+                      </p:stCondLst>
+                      <p:childTnLst>
+                        <p:par>
+                          <p:cTn id="14" fill="hold">
+                            <p:stCondLst>
+                              <p:cond delay="0"/>
+                            </p:stCondLst>
+                            <p:childTnLst>
+                              <p:par>
+                                <p:cTn id="15" presetID="1" presetClass="entr" presetSubtype="0" fill="hold" grpId="0" nodeType="clickEffect">
+                                  <p:stCondLst>
+                                    <p:cond delay="0"/>
+                                  </p:stCondLst>
+                                  <p:childTnLst>
+                                    <p:set>
+                                      <p:cBhvr>
+                                        <p:cTn id="16" dur="1" fill="hold">
+                                          <p:stCondLst>
+                                            <p:cond delay="0"/>
+                                          </p:stCondLst>
+                                        </p:cTn>
+                                        <p:tgtEl>
+                                          <p:spTgt spid="3">
+                                            <p:txEl>
+                                              <p:pRg st="3" end="3"/>
+                                            </p:txEl>
+                                          </p:spTgt>
+                                        </p:tgtEl>
+                                        <p:attrNameLst>
+                                          <p:attrName>style.visibility</p:attrName>
+                                        </p:attrNameLst>
+                                      </p:cBhvr>
+                                      <p:to>
+                                        <p:strVal val="visible"/>
+                                      </p:to>
+                                    </p:set>
+                                  </p:childTnLst>
+                                </p:cTn>
+                              </p:par>
+                              <p:par>
+                                <p:cTn id="17" presetID="1" presetClass="entr" presetSubtype="0" fill="hold" grpId="0" nodeType="withEffect">
+                                  <p:stCondLst>
+                                    <p:cond delay="0"/>
+                                  </p:stCondLst>
+                                  <p:childTnLst>
+                                    <p:set>
+                                      <p:cBhvr>
+                                        <p:cTn id="18" dur="1" fill="hold">
+                                          <p:stCondLst>
+                                            <p:cond delay="0"/>
+                                          </p:stCondLst>
+                                        </p:cTn>
+                                        <p:tgtEl>
+                                          <p:spTgt spid="3">
+                                            <p:txEl>
+                                              <p:pRg st="4" end="4"/>
+                                            </p:txEl>
+                                          </p:spTgt>
+                                        </p:tgtEl>
+                                        <p:attrNameLst>
+                                          <p:attrName>style.visibility</p:attrName>
+                                        </p:attrNameLst>
+                                      </p:cBhvr>
+                                      <p:to>
+                                        <p:strVal val="visible"/>
+                                      </p:to>
+                                    </p:set>
+                                  </p:childTnLst>
+                                </p:cTn>
+                              </p:par>
+                            </p:childTnLst>
+                          </p:cTn>
+                        </p:par>
+                      </p:childTnLst>
+                    </p:cTn>
+                  </p:par>
+                  <p:par>
+                    <p:cTn id="19" fill="hold">
+                      <p:stCondLst>
+                        <p:cond delay="indefinite"/>
+                      </p:stCondLst>
+                      <p:childTnLst>
+                        <p:par>
+                          <p:cTn id="20" fill="hold">
+                            <p:stCondLst>
+                              <p:cond delay="0"/>
+                            </p:stCondLst>
+                            <p:childTnLst>
+                              <p:par>
+                                <p:cTn id="21" presetID="1" presetClass="entr" presetSubtype="0" fill="hold" grpId="0" nodeType="clickEffect">
+                                  <p:stCondLst>
+                                    <p:cond delay="0"/>
+                                  </p:stCondLst>
+                                  <p:childTnLst>
+                                    <p:set>
+                                      <p:cBhvr>
+                                        <p:cTn id="22" dur="1" fill="hold">
+                                          <p:stCondLst>
+                                            <p:cond delay="0"/>
+                                          </p:stCondLst>
+                                        </p:cTn>
+                                        <p:tgtEl>
+                                          <p:spTgt spid="3">
+                                            <p:txEl>
+                                              <p:pRg st="5" end="5"/>
+                                            </p:txEl>
+                                          </p:spTgt>
+                                        </p:tgtEl>
+                                        <p:attrNameLst>
+                                          <p:attrName>style.visibility</p:attrName>
+                                        </p:attrNameLst>
+                                      </p:cBhvr>
+                                      <p:to>
+                                        <p:strVal val="visible"/>
+                                      </p:to>
+                                    </p:set>
+                                  </p:childTnLst>
+                                </p:cTn>
+                              </p:par>
+                              <p:par>
+                                <p:cTn id="23" presetID="1" presetClass="entr" presetSubtype="0" fill="hold" grpId="0" nodeType="withEffect">
+                                  <p:stCondLst>
+                                    <p:cond delay="0"/>
+                                  </p:stCondLst>
+                                  <p:childTnLst>
+                                    <p:set>
+                                      <p:cBhvr>
+                                        <p:cTn id="24" dur="1" fill="hold">
+                                          <p:stCondLst>
+                                            <p:cond delay="0"/>
+                                          </p:stCondLst>
+                                        </p:cTn>
+                                        <p:tgtEl>
+                                          <p:spTgt spid="3">
+                                            <p:txEl>
+                                              <p:pRg st="6" end="6"/>
+                                            </p:txEl>
+                                          </p:spTgt>
+                                        </p:tgtEl>
+                                        <p:attrNameLst>
+                                          <p:attrName>style.visibility</p:attrName>
+                                        </p:attrNameLst>
+                                      </p:cBhvr>
+                                      <p:to>
+                                        <p:strVal val="visible"/>
+                                      </p:to>
+                                    </p:set>
+                                  </p:childTnLst>
+                                </p:cTn>
+                              </p:par>
+                            </p:childTnLst>
+                          </p:cTn>
+                        </p:par>
+                      </p:childTnLst>
+                    </p:cTn>
+                  </p:par>
+                  <p:par>
+                    <p:cTn id="25" fill="hold">
+                      <p:stCondLst>
+                        <p:cond delay="indefinite"/>
+                      </p:stCondLst>
+                      <p:childTnLst>
+                        <p:par>
+                          <p:cTn id="26" fill="hold">
+                            <p:stCondLst>
+                              <p:cond delay="0"/>
+                            </p:stCondLst>
+                            <p:childTnLst>
+                              <p:par>
+                                <p:cTn id="27" presetID="1" presetClass="entr" presetSubtype="0" fill="hold" nodeType="clickEffect">
+                                  <p:stCondLst>
+                                    <p:cond delay="0"/>
+                                  </p:stCondLst>
+                                  <p:childTnLst>
+                                    <p:set>
+                                      <p:cBhvr>
+                                        <p:cTn id="28" dur="1" fill="hold">
+                                          <p:stCondLst>
+                                            <p:cond delay="0"/>
+                                          </p:stCondLst>
+                                        </p:cTn>
+                                        <p:tgtEl>
+                                          <p:spTgt spid="7"/>
+                                        </p:tgtEl>
+                                        <p:attrNameLst>
+                                          <p:attrName>style.visibility</p:attrName>
+                                        </p:attrNameLst>
+                                      </p:cBhvr>
+                                      <p:to>
+                                        <p:strVal val="visible"/>
+                                      </p:to>
+                                    </p:set>
+                                  </p:childTnLst>
+                                </p:cTn>
+                              </p:par>
+                            </p:childTnLst>
+                          </p:cTn>
+                        </p:par>
+                      </p:childTnLst>
+                    </p:cTn>
+                  </p:par>
+                  <p:par>
+                    <p:cTn id="29" fill="hold">
+                      <p:stCondLst>
+                        <p:cond delay="indefinite"/>
+                      </p:stCondLst>
+                      <p:childTnLst>
+                        <p:par>
+                          <p:cTn id="30" fill="hold">
+                            <p:stCondLst>
+                              <p:cond delay="0"/>
+                            </p:stCondLst>
+                            <p:childTnLst>
+                              <p:par>
+                                <p:cTn id="31" presetID="1" presetClass="entr" presetSubtype="0" fill="hold" grpId="0" nodeType="clickEffect">
+                                  <p:stCondLst>
+                                    <p:cond delay="0"/>
+                                  </p:stCondLst>
+                                  <p:childTnLst>
+                                    <p:set>
+                                      <p:cBhvr>
+                                        <p:cTn id="32" dur="1" fill="hold">
+                                          <p:stCondLst>
+                                            <p:cond delay="0"/>
+                                          </p:stCondLst>
+                                        </p:cTn>
+                                        <p:tgtEl>
+                                          <p:spTgt spid="3">
+                                            <p:txEl>
+                                              <p:pRg st="7" end="7"/>
+                                            </p:txEl>
+                                          </p:spTgt>
+                                        </p:tgtEl>
+                                        <p:attrNameLst>
+                                          <p:attrName>style.visibility</p:attrName>
+                                        </p:attrNameLst>
+                                      </p:cBhvr>
+                                      <p:to>
+                                        <p:strVal val="visible"/>
+                                      </p:to>
+                                    </p:set>
+                                  </p:childTnLst>
+                                </p:cTn>
+                              </p:par>
+                              <p:par>
+                                <p:cTn id="33" presetID="1" presetClass="entr" presetSubtype="0" fill="hold" grpId="0" nodeType="withEffect">
+                                  <p:stCondLst>
+                                    <p:cond delay="0"/>
+                                  </p:stCondLst>
+                                  <p:childTnLst>
+                                    <p:set>
+                                      <p:cBhvr>
+                                        <p:cTn id="34" dur="1" fill="hold">
+                                          <p:stCondLst>
+                                            <p:cond delay="0"/>
+                                          </p:stCondLst>
+                                        </p:cTn>
+                                        <p:tgtEl>
+                                          <p:spTgt spid="3">
+                                            <p:txEl>
+                                              <p:pRg st="8" end="8"/>
+                                            </p:txEl>
+                                          </p:spTgt>
+                                        </p:tgtEl>
+                                        <p:attrNameLst>
+                                          <p:attrName>style.visibility</p:attrName>
+                                        </p:attrNameLst>
+                                      </p:cBhvr>
+                                      <p:to>
+                                        <p:strVal val="visible"/>
+                                      </p:to>
+                                    </p:set>
+                                  </p:childTnLst>
+                                </p:cTn>
+                              </p:par>
+                            </p:childTnLst>
+                          </p:cTn>
+                        </p:par>
+                      </p:childTnLst>
+                    </p:cTn>
+                  </p:par>
+                </p:childTnLst>
+              </p:cTn>
+              <p:prevCondLst>
+                <p:cond evt="onPrev" delay="0">
+                  <p:tgtEl>
+                    <p:sldTgt/>
+                  </p:tgtEl>
+                </p:cond>
+              </p:prevCondLst>
+              <p:nextCondLst>
+                <p:cond evt="onNext" delay="0">
+                  <p:tgtEl>
+                    <p:sldTgt/>
+                  </p:tgtEl>
+                </p:cond>
+              </p:nextCondLst>
+            </p:seq>
+          </p:childTnLst>
+        </p:cTn>
+      </p:par>
+    </p:tnLst>
+    <p:bldLst>
+      <p:bldP spid="3" grpId="0" uiExpand="1" build="p" bldLvl="2"/>
+    </p:bldLst>
+  </p:timing>
+</p:sld>
+</file>
+
+<file path=ppt/slides/slide20.xml><?xml version="1.0" encoding="utf-8"?>
+<p:sld xmlns:a="http://schemas.openxmlformats.org/drawingml/2006/main" xmlns:r="http://schemas.openxmlformats.org/officeDocument/2006/relationships" xmlns:p="http://schemas.openxmlformats.org/presentationml/2006/main">
+  <p:cSld>
+    <p:spTree>
+      <p:nvGrpSpPr>
+        <p:cNvPr id="1" name=""/>
+        <p:cNvGrpSpPr/>
+        <p:nvPr/>
+      </p:nvGrpSpPr>
+      <p:grpSpPr>
+        <a:xfrm>
+          <a:off x="0" y="0"/>
+          <a:ext cx="0" cy="0"/>
+          <a:chOff x="0" y="0"/>
+          <a:chExt cx="0" cy="0"/>
+        </a:xfrm>
+      </p:grpSpPr>
+      <p:sp>
+        <p:nvSpPr>
+          <p:cNvPr id="2" name="Title 1"/>
+          <p:cNvSpPr>
+            <a:spLocks noGrp="1"/>
+          </p:cNvSpPr>
+          <p:nvPr>
+            <p:ph type="title"/>
+          </p:nvPr>
+        </p:nvSpPr>
+        <p:spPr/>
+        <p:txBody>
+          <a:bodyPr/>
+          <a:lstStyle/>
+          <a:p>
+            <a:r>
+              <a:rPr lang="en-US" dirty="0" smtClean="0"/>
+              <a:t>Cache line timings</a:t>
+            </a:r>
+            <a:endParaRPr lang="en-US" dirty="0"/>
+          </a:p>
+        </p:txBody>
+      </p:sp>
+      <p:sp>
+        <p:nvSpPr>
+          <p:cNvPr id="4" name="Slide Number Placeholder 3"/>
+          <p:cNvSpPr>
+            <a:spLocks noGrp="1"/>
+          </p:cNvSpPr>
+          <p:nvPr>
+            <p:ph type="sldNum" sz="quarter" idx="12"/>
+          </p:nvPr>
+        </p:nvSpPr>
+        <p:spPr/>
+        <p:txBody>
+          <a:bodyPr/>
+          <a:lstStyle/>
+          <a:p>
+            <a:fld id="{6597116C-F94B-4B5B-973A-17F07FB5C418}" type="slidenum">
+              <a:rPr lang="nl-BE" smtClean="0"/>
+              <a:t>20</a:t>
             </a:fld>
             <a:endParaRPr lang="nl-BE"/>
           </a:p>
@@ -17033,7 +18694,7 @@
 </p:sld>
 </file>
 
-<file path=ppt/slides/slide19.xml><?xml version="1.0" encoding="utf-8"?>
+<file path=ppt/slides/slide21.xml><?xml version="1.0" encoding="utf-8"?>
 <p:sld xmlns:a="http://schemas.openxmlformats.org/drawingml/2006/main" xmlns:r="http://schemas.openxmlformats.org/officeDocument/2006/relationships" xmlns:p="http://schemas.openxmlformats.org/presentationml/2006/main">
   <p:cSld>
     <p:spTree>
@@ -17131,7 +18792,7 @@
           <a:p>
             <a:fld id="{6597116C-F94B-4B5B-973A-17F07FB5C418}" type="slidenum">
               <a:rPr lang="nl-BE" smtClean="0"/>
-              <a:t>19</a:t>
+              <a:t>21</a:t>
             </a:fld>
             <a:endParaRPr lang="nl-BE"/>
           </a:p>
@@ -17159,7 +18820,7 @@
           <a:graphicData uri="http://schemas.openxmlformats.org/presentationml/2006/ole">
             <mc:AlternateContent xmlns:mc="http://schemas.openxmlformats.org/markup-compatibility/2006">
               <mc:Choice xmlns:v="urn:schemas-microsoft-com:vml" Requires="v">
-                <p:oleObj spid="_x0000_s2099" name="Equation" r:id="rId3" imgW="1091880" imgH="1041120" progId="Equation.3">
+                <p:oleObj spid="_x0000_s2105" name="Equation" r:id="rId3" imgW="1091880" imgH="1041120" progId="Equation.3">
                   <p:embed/>
                 </p:oleObj>
               </mc:Choice>
@@ -18530,7 +20191,7 @@
           <a:graphicData uri="http://schemas.openxmlformats.org/presentationml/2006/ole">
             <mc:AlternateContent xmlns:mc="http://schemas.openxmlformats.org/markup-compatibility/2006">
               <mc:Choice xmlns:v="urn:schemas-microsoft-com:vml" Requires="v">
-                <p:oleObj spid="_x0000_s2100" name="Equation" r:id="rId5" imgW="1091880" imgH="1041120" progId="Equation.3">
+                <p:oleObj spid="_x0000_s2106" name="Equation" r:id="rId5" imgW="1091880" imgH="1041120" progId="Equation.3">
                   <p:embed/>
                 </p:oleObj>
               </mc:Choice>
@@ -19210,109 +20871,7 @@
 </p:sld>
 </file>
 
-<file path=ppt/slides/slide2.xml><?xml version="1.0" encoding="utf-8"?>
-<p:sld xmlns:a="http://schemas.openxmlformats.org/drawingml/2006/main" xmlns:r="http://schemas.openxmlformats.org/officeDocument/2006/relationships" xmlns:p="http://schemas.openxmlformats.org/presentationml/2006/main">
-  <p:cSld>
-    <p:spTree>
-      <p:nvGrpSpPr>
-        <p:cNvPr id="1" name=""/>
-        <p:cNvGrpSpPr/>
-        <p:nvPr/>
-      </p:nvGrpSpPr>
-      <p:grpSpPr>
-        <a:xfrm>
-          <a:off x="0" y="0"/>
-          <a:ext cx="0" cy="0"/>
-          <a:chOff x="0" y="0"/>
-          <a:chExt cx="0" cy="0"/>
-        </a:xfrm>
-      </p:grpSpPr>
-      <p:sp>
-        <p:nvSpPr>
-          <p:cNvPr id="2" name="Title 1"/>
-          <p:cNvSpPr>
-            <a:spLocks noGrp="1"/>
-          </p:cNvSpPr>
-          <p:nvPr>
-            <p:ph type="title"/>
-          </p:nvPr>
-        </p:nvSpPr>
-        <p:spPr/>
-        <p:txBody>
-          <a:bodyPr/>
-          <a:lstStyle/>
-          <a:p>
-            <a:r>
-              <a:rPr lang="en-US" dirty="0" smtClean="0"/>
-              <a:t>Parallel scaling</a:t>
-            </a:r>
-            <a:endParaRPr lang="en-US" dirty="0"/>
-          </a:p>
-        </p:txBody>
-      </p:sp>
-      <p:sp>
-        <p:nvSpPr>
-          <p:cNvPr id="3" name="Text Placeholder 2"/>
-          <p:cNvSpPr>
-            <a:spLocks noGrp="1"/>
-          </p:cNvSpPr>
-          <p:nvPr>
-            <p:ph type="body" idx="1"/>
-          </p:nvPr>
-        </p:nvSpPr>
-        <p:spPr/>
-        <p:txBody>
-          <a:bodyPr/>
-          <a:lstStyle/>
-          <a:p>
-            <a:endParaRPr lang="en-US"/>
-          </a:p>
-        </p:txBody>
-      </p:sp>
-      <p:sp>
-        <p:nvSpPr>
-          <p:cNvPr id="4" name="Slide Number Placeholder 3"/>
-          <p:cNvSpPr>
-            <a:spLocks noGrp="1"/>
-          </p:cNvSpPr>
-          <p:nvPr>
-            <p:ph type="sldNum" sz="quarter" idx="12"/>
-          </p:nvPr>
-        </p:nvSpPr>
-        <p:spPr/>
-        <p:txBody>
-          <a:bodyPr/>
-          <a:lstStyle/>
-          <a:p>
-            <a:fld id="{6597116C-F94B-4B5B-973A-17F07FB5C418}" type="slidenum">
-              <a:rPr lang="nl-BE" smtClean="0"/>
-              <a:t>2</a:t>
-            </a:fld>
-            <a:endParaRPr lang="nl-BE"/>
-          </a:p>
-        </p:txBody>
-      </p:sp>
-    </p:spTree>
-    <p:extLst>
-      <p:ext uri="{BB962C8B-B14F-4D97-AF65-F5344CB8AC3E}">
-        <p14:creationId xmlns:p14="http://schemas.microsoft.com/office/powerpoint/2010/main" val="703705777"/>
-      </p:ext>
-    </p:extLst>
-  </p:cSld>
-  <p:clrMapOvr>
-    <a:masterClrMapping/>
-  </p:clrMapOvr>
-  <p:timing>
-    <p:tnLst>
-      <p:par>
-        <p:cTn id="1" dur="indefinite" restart="never" nodeType="tmRoot"/>
-      </p:par>
-    </p:tnLst>
-  </p:timing>
-</p:sld>
-</file>
-
-<file path=ppt/slides/slide20.xml><?xml version="1.0" encoding="utf-8"?>
+<file path=ppt/slides/slide22.xml><?xml version="1.0" encoding="utf-8"?>
 <p:sld xmlns:a="http://schemas.openxmlformats.org/drawingml/2006/main" xmlns:r="http://schemas.openxmlformats.org/officeDocument/2006/relationships" xmlns:p="http://schemas.openxmlformats.org/presentationml/2006/main">
   <p:cSld>
     <p:spTree>
@@ -19539,7 +21098,7 @@
           <a:p>
             <a:fld id="{6597116C-F94B-4B5B-973A-17F07FB5C418}" type="slidenum">
               <a:rPr lang="nl-BE" smtClean="0"/>
-              <a:t>20</a:t>
+              <a:t>22</a:t>
             </a:fld>
             <a:endParaRPr lang="nl-BE"/>
           </a:p>
@@ -21301,7 +22860,7 @@
 </p:sld>
 </file>
 
-<file path=ppt/slides/slide21.xml><?xml version="1.0" encoding="utf-8"?>
+<file path=ppt/slides/slide23.xml><?xml version="1.0" encoding="utf-8"?>
 <p:sld xmlns:a="http://schemas.openxmlformats.org/drawingml/2006/main" xmlns:r="http://schemas.openxmlformats.org/officeDocument/2006/relationships" xmlns:p="http://schemas.openxmlformats.org/presentationml/2006/main">
   <p:cSld>
     <p:spTree>
@@ -21335,6 +22894,101 @@
           <a:p>
             <a:r>
               <a:rPr lang="en-US" dirty="0" smtClean="0"/>
+              <a:t>CPU</a:t>
+            </a:r>
+            <a:endParaRPr lang="nl-BE" dirty="0"/>
+          </a:p>
+        </p:txBody>
+      </p:sp>
+      <p:sp>
+        <p:nvSpPr>
+          <p:cNvPr id="3" name="Text Placeholder 2"/>
+          <p:cNvSpPr>
+            <a:spLocks noGrp="1"/>
+          </p:cNvSpPr>
+          <p:nvPr>
+            <p:ph type="body" idx="1"/>
+          </p:nvPr>
+        </p:nvSpPr>
+        <p:spPr/>
+        <p:txBody>
+          <a:bodyPr/>
+          <a:lstStyle/>
+          <a:p>
+            <a:endParaRPr lang="nl-BE"/>
+          </a:p>
+        </p:txBody>
+      </p:sp>
+      <p:sp>
+        <p:nvSpPr>
+          <p:cNvPr id="4" name="Slide Number Placeholder 3"/>
+          <p:cNvSpPr>
+            <a:spLocks noGrp="1"/>
+          </p:cNvSpPr>
+          <p:nvPr>
+            <p:ph type="sldNum" sz="quarter" idx="12"/>
+          </p:nvPr>
+        </p:nvSpPr>
+        <p:spPr/>
+        <p:txBody>
+          <a:bodyPr/>
+          <a:lstStyle/>
+          <a:p>
+            <a:fld id="{6597116C-F94B-4B5B-973A-17F07FB5C418}" type="slidenum">
+              <a:rPr lang="nl-BE" smtClean="0"/>
+              <a:t>23</a:t>
+            </a:fld>
+            <a:endParaRPr lang="nl-BE"/>
+          </a:p>
+        </p:txBody>
+      </p:sp>
+    </p:spTree>
+    <p:extLst>
+      <p:ext uri="{BB962C8B-B14F-4D97-AF65-F5344CB8AC3E}">
+        <p14:creationId xmlns:p14="http://schemas.microsoft.com/office/powerpoint/2010/main" val="818805559"/>
+      </p:ext>
+    </p:extLst>
+  </p:cSld>
+  <p:clrMapOvr>
+    <a:masterClrMapping/>
+  </p:clrMapOvr>
+</p:sld>
+</file>
+
+<file path=ppt/slides/slide24.xml><?xml version="1.0" encoding="utf-8"?>
+<p:sld xmlns:a="http://schemas.openxmlformats.org/drawingml/2006/main" xmlns:r="http://schemas.openxmlformats.org/officeDocument/2006/relationships" xmlns:p="http://schemas.openxmlformats.org/presentationml/2006/main">
+  <p:cSld>
+    <p:spTree>
+      <p:nvGrpSpPr>
+        <p:cNvPr id="1" name=""/>
+        <p:cNvGrpSpPr/>
+        <p:nvPr/>
+      </p:nvGrpSpPr>
+      <p:grpSpPr>
+        <a:xfrm>
+          <a:off x="0" y="0"/>
+          <a:ext cx="0" cy="0"/>
+          <a:chOff x="0" y="0"/>
+          <a:chExt cx="0" cy="0"/>
+        </a:xfrm>
+      </p:grpSpPr>
+      <p:sp>
+        <p:nvSpPr>
+          <p:cNvPr id="2" name="Title 1"/>
+          <p:cNvSpPr>
+            <a:spLocks noGrp="1"/>
+          </p:cNvSpPr>
+          <p:nvPr>
+            <p:ph type="title"/>
+          </p:nvPr>
+        </p:nvSpPr>
+        <p:spPr/>
+        <p:txBody>
+          <a:bodyPr/>
+          <a:lstStyle/>
+          <a:p>
+            <a:r>
+              <a:rPr lang="en-US" dirty="0" smtClean="0"/>
               <a:t>Vectorization</a:t>
             </a:r>
             <a:endParaRPr lang="en-US" dirty="0"/>
@@ -21412,7 +23066,7 @@
           <a:p>
             <a:fld id="{6597116C-F94B-4B5B-973A-17F07FB5C418}" type="slidenum">
               <a:rPr lang="nl-BE" smtClean="0"/>
-              <a:t>21</a:t>
+              <a:t>24</a:t>
             </a:fld>
             <a:endParaRPr lang="nl-BE"/>
           </a:p>
@@ -22192,7 +23846,7 @@
 </p:sld>
 </file>
 
-<file path=ppt/slides/slide22.xml><?xml version="1.0" encoding="utf-8"?>
+<file path=ppt/slides/slide25.xml><?xml version="1.0" encoding="utf-8"?>
 <p:sld xmlns:a="http://schemas.openxmlformats.org/drawingml/2006/main" xmlns:r="http://schemas.openxmlformats.org/officeDocument/2006/relationships" xmlns:p="http://schemas.openxmlformats.org/presentationml/2006/main">
   <p:cSld>
     <p:spTree>
@@ -22312,7 +23966,7 @@
           <a:p>
             <a:fld id="{6597116C-F94B-4B5B-973A-17F07FB5C418}" type="slidenum">
               <a:rPr lang="nl-BE" smtClean="0"/>
-              <a:t>22</a:t>
+              <a:t>25</a:t>
             </a:fld>
             <a:endParaRPr lang="nl-BE"/>
           </a:p>
@@ -22699,7 +24353,7 @@
 </p:sld>
 </file>
 
-<file path=ppt/slides/slide23.xml><?xml version="1.0" encoding="utf-8"?>
+<file path=ppt/slides/slide26.xml><?xml version="1.0" encoding="utf-8"?>
 <p:sld xmlns:a="http://schemas.openxmlformats.org/drawingml/2006/main" xmlns:r="http://schemas.openxmlformats.org/officeDocument/2006/relationships" xmlns:p="http://schemas.openxmlformats.org/presentationml/2006/main">
   <p:cSld>
     <p:spTree>
@@ -22733,20 +24387,20 @@
           <a:p>
             <a:r>
               <a:rPr lang="en-US" dirty="0" smtClean="0"/>
-              <a:t>Parallelism</a:t>
-            </a:r>
-            <a:endParaRPr lang="en-US" dirty="0"/>
+              <a:t>Appendix</a:t>
+            </a:r>
+            <a:endParaRPr lang="nl-BE" dirty="0"/>
           </a:p>
         </p:txBody>
       </p:sp>
       <p:sp>
         <p:nvSpPr>
-          <p:cNvPr id="3" name="Content Placeholder 2"/>
+          <p:cNvPr id="3" name="Text Placeholder 2"/>
           <p:cNvSpPr>
             <a:spLocks noGrp="1"/>
           </p:cNvSpPr>
           <p:nvPr>
-            <p:ph idx="1"/>
+            <p:ph type="body" idx="1"/>
           </p:nvPr>
         </p:nvSpPr>
         <p:spPr/>
@@ -22754,91 +24408,7 @@
           <a:bodyPr/>
           <a:lstStyle/>
           <a:p>
-            <a:r>
-              <a:rPr lang="en-US" dirty="0" smtClean="0"/>
-              <a:t>Levels</a:t>
-            </a:r>
-          </a:p>
-          <a:p>
-            <a:pPr lvl="1"/>
-            <a:r>
-              <a:rPr lang="en-US" dirty="0" smtClean="0"/>
-              <a:t>vectorization</a:t>
-            </a:r>
-          </a:p>
-          <a:p>
-            <a:pPr lvl="2"/>
-            <a:r>
-              <a:rPr lang="en-US" dirty="0" smtClean="0"/>
-              <a:t>compiler flags, some help needed from programmer</a:t>
-            </a:r>
-          </a:p>
-          <a:p>
-            <a:pPr lvl="1"/>
-            <a:r>
-              <a:rPr lang="en-US" dirty="0" smtClean="0"/>
-              <a:t>multicore</a:t>
-            </a:r>
-          </a:p>
-          <a:p>
-            <a:pPr lvl="2"/>
-            <a:r>
-              <a:rPr lang="en-US" dirty="0" err="1" smtClean="0"/>
-              <a:t>OpenMP</a:t>
-            </a:r>
-            <a:r>
-              <a:rPr lang="en-US" dirty="0" smtClean="0"/>
-              <a:t>/</a:t>
-            </a:r>
-            <a:r>
-              <a:rPr lang="en-US" dirty="0" err="1" smtClean="0"/>
-              <a:t>pthreads</a:t>
-            </a:r>
-            <a:r>
-              <a:rPr lang="en-US" dirty="0" smtClean="0"/>
-              <a:t>: programmer's job</a:t>
-            </a:r>
-          </a:p>
-          <a:p>
-            <a:pPr lvl="1"/>
-            <a:r>
-              <a:rPr lang="en-US" dirty="0" smtClean="0"/>
-              <a:t>multiple node</a:t>
-            </a:r>
-            <a:r>
-              <a:rPr lang="en-US" dirty="0" smtClean="0"/>
-              <a:t>, i.e., distributed</a:t>
-            </a:r>
-          </a:p>
-          <a:p>
-            <a:pPr lvl="2"/>
-            <a:r>
-              <a:rPr lang="en-US" dirty="0" smtClean="0"/>
-              <a:t>MPI: programmer's job</a:t>
-            </a:r>
-          </a:p>
-          <a:p>
-            <a:pPr lvl="1"/>
-            <a:r>
-              <a:rPr lang="en-US" dirty="0" smtClean="0"/>
-              <a:t>GPGPU</a:t>
-            </a:r>
-          </a:p>
-          <a:p>
-            <a:pPr lvl="2"/>
-            <a:r>
-              <a:rPr lang="en-US" dirty="0" smtClean="0"/>
-              <a:t>CUDA/</a:t>
-            </a:r>
-            <a:r>
-              <a:rPr lang="en-US" dirty="0" err="1" smtClean="0"/>
-              <a:t>OpenACC</a:t>
-            </a:r>
-            <a:r>
-              <a:rPr lang="en-US" dirty="0" smtClean="0"/>
-              <a:t>/OpenCL: programmer's job</a:t>
-            </a:r>
-            <a:endParaRPr lang="en-US" dirty="0"/>
+            <a:endParaRPr lang="nl-BE"/>
           </a:p>
         </p:txBody>
       </p:sp>
@@ -22859,564 +24429,26 @@
           <a:p>
             <a:fld id="{6597116C-F94B-4B5B-973A-17F07FB5C418}" type="slidenum">
               <a:rPr lang="nl-BE" smtClean="0"/>
-              <a:t>23</a:t>
+              <a:t>26</a:t>
             </a:fld>
             <a:endParaRPr lang="nl-BE"/>
           </a:p>
         </p:txBody>
       </p:sp>
-      <p:grpSp>
-        <p:nvGrpSpPr>
-          <p:cNvPr id="7" name="Group 6"/>
-          <p:cNvGrpSpPr/>
-          <p:nvPr/>
-        </p:nvGrpSpPr>
-        <p:grpSpPr>
-          <a:xfrm>
-            <a:off x="6553200" y="3284984"/>
-            <a:ext cx="1479142" cy="1656184"/>
-            <a:chOff x="6553200" y="3284984"/>
-            <a:chExt cx="1479142" cy="1656184"/>
-          </a:xfrm>
-        </p:grpSpPr>
-        <p:sp>
-          <p:nvSpPr>
-            <p:cNvPr id="5" name="Right Brace 4"/>
-            <p:cNvSpPr/>
-            <p:nvPr/>
-          </p:nvSpPr>
-          <p:spPr>
-            <a:xfrm>
-              <a:off x="6553200" y="3284984"/>
-              <a:ext cx="179040" cy="1656184"/>
-            </a:xfrm>
-            <a:prstGeom prst="rightBrace">
-              <a:avLst/>
-            </a:prstGeom>
-            <a:ln>
-              <a:solidFill>
-                <a:schemeClr val="tx1"/>
-              </a:solidFill>
-            </a:ln>
-          </p:spPr>
-          <p:style>
-            <a:lnRef idx="1">
-              <a:schemeClr val="accent1"/>
-            </a:lnRef>
-            <a:fillRef idx="0">
-              <a:schemeClr val="accent1"/>
-            </a:fillRef>
-            <a:effectRef idx="0">
-              <a:schemeClr val="accent1"/>
-            </a:effectRef>
-            <a:fontRef idx="minor">
-              <a:schemeClr val="tx1"/>
-            </a:fontRef>
-          </p:style>
-          <p:txBody>
-            <a:bodyPr rtlCol="0" anchor="ctr"/>
-            <a:lstStyle/>
-            <a:p>
-              <a:pPr algn="ctr"/>
-              <a:endParaRPr lang="en-US"/>
-            </a:p>
-          </p:txBody>
-        </p:sp>
-        <p:sp>
-          <p:nvSpPr>
-            <p:cNvPr id="6" name="TextBox 5"/>
-            <p:cNvSpPr txBox="1"/>
-            <p:nvPr/>
-          </p:nvSpPr>
-          <p:spPr>
-            <a:xfrm>
-              <a:off x="6876256" y="3851466"/>
-              <a:ext cx="1156086" cy="523220"/>
-            </a:xfrm>
-            <a:prstGeom prst="rect">
-              <a:avLst/>
-            </a:prstGeom>
-            <a:noFill/>
-          </p:spPr>
-          <p:txBody>
-            <a:bodyPr wrap="none" rtlCol="0">
-              <a:spAutoFit/>
-            </a:bodyPr>
-            <a:lstStyle/>
-            <a:p>
-              <a:r>
-                <a:rPr lang="en-US" sz="2800" dirty="0" smtClean="0"/>
-                <a:t>Hybrid</a:t>
-              </a:r>
-              <a:endParaRPr lang="en-US" sz="2800" dirty="0"/>
-            </a:p>
-          </p:txBody>
-        </p:sp>
-      </p:grpSp>
     </p:spTree>
     <p:extLst>
       <p:ext uri="{BB962C8B-B14F-4D97-AF65-F5344CB8AC3E}">
-        <p14:creationId xmlns:p14="http://schemas.microsoft.com/office/powerpoint/2010/main" val="1972215598"/>
+        <p14:creationId xmlns:p14="http://schemas.microsoft.com/office/powerpoint/2010/main" val="3118825235"/>
       </p:ext>
     </p:extLst>
   </p:cSld>
   <p:clrMapOvr>
     <a:masterClrMapping/>
   </p:clrMapOvr>
-  <p:timing>
-    <p:tnLst>
-      <p:par>
-        <p:cTn id="1" dur="indefinite" restart="never" nodeType="tmRoot">
-          <p:childTnLst>
-            <p:seq concurrent="1" nextAc="seek">
-              <p:cTn id="2" dur="indefinite" nodeType="mainSeq">
-                <p:childTnLst>
-                  <p:par>
-                    <p:cTn id="3" fill="hold">
-                      <p:stCondLst>
-                        <p:cond delay="indefinite"/>
-                        <p:cond evt="onBegin" delay="0">
-                          <p:tn val="2"/>
-                        </p:cond>
-                      </p:stCondLst>
-                      <p:childTnLst>
-                        <p:par>
-                          <p:cTn id="4" fill="hold">
-                            <p:stCondLst>
-                              <p:cond delay="0"/>
-                            </p:stCondLst>
-                            <p:childTnLst>
-                              <p:par>
-                                <p:cTn id="5" presetID="1" presetClass="entr" presetSubtype="0" fill="hold" grpId="0" nodeType="withEffect">
-                                  <p:stCondLst>
-                                    <p:cond delay="0"/>
-                                  </p:stCondLst>
-                                  <p:childTnLst>
-                                    <p:set>
-                                      <p:cBhvr>
-                                        <p:cTn id="6" dur="1" fill="hold">
-                                          <p:stCondLst>
-                                            <p:cond delay="0"/>
-                                          </p:stCondLst>
-                                        </p:cTn>
-                                        <p:tgtEl>
-                                          <p:spTgt spid="3">
-                                            <p:txEl>
-                                              <p:pRg st="0" end="0"/>
-                                            </p:txEl>
-                                          </p:spTgt>
-                                        </p:tgtEl>
-                                        <p:attrNameLst>
-                                          <p:attrName>style.visibility</p:attrName>
-                                        </p:attrNameLst>
-                                      </p:cBhvr>
-                                      <p:to>
-                                        <p:strVal val="visible"/>
-                                      </p:to>
-                                    </p:set>
-                                  </p:childTnLst>
-                                </p:cTn>
-                              </p:par>
-                            </p:childTnLst>
-                          </p:cTn>
-                        </p:par>
-                      </p:childTnLst>
-                    </p:cTn>
-                  </p:par>
-                  <p:par>
-                    <p:cTn id="7" fill="hold">
-                      <p:stCondLst>
-                        <p:cond delay="indefinite"/>
-                      </p:stCondLst>
-                      <p:childTnLst>
-                        <p:par>
-                          <p:cTn id="8" fill="hold">
-                            <p:stCondLst>
-                              <p:cond delay="0"/>
-                            </p:stCondLst>
-                            <p:childTnLst>
-                              <p:par>
-                                <p:cTn id="9" presetID="1" presetClass="entr" presetSubtype="0" fill="hold" grpId="0" nodeType="clickEffect">
-                                  <p:stCondLst>
-                                    <p:cond delay="0"/>
-                                  </p:stCondLst>
-                                  <p:childTnLst>
-                                    <p:set>
-                                      <p:cBhvr>
-                                        <p:cTn id="10" dur="1" fill="hold">
-                                          <p:stCondLst>
-                                            <p:cond delay="0"/>
-                                          </p:stCondLst>
-                                        </p:cTn>
-                                        <p:tgtEl>
-                                          <p:spTgt spid="3">
-                                            <p:txEl>
-                                              <p:pRg st="1" end="1"/>
-                                            </p:txEl>
-                                          </p:spTgt>
-                                        </p:tgtEl>
-                                        <p:attrNameLst>
-                                          <p:attrName>style.visibility</p:attrName>
-                                        </p:attrNameLst>
-                                      </p:cBhvr>
-                                      <p:to>
-                                        <p:strVal val="visible"/>
-                                      </p:to>
-                                    </p:set>
-                                  </p:childTnLst>
-                                </p:cTn>
-                              </p:par>
-                              <p:par>
-                                <p:cTn id="11" presetID="1" presetClass="entr" presetSubtype="0" fill="hold" grpId="0" nodeType="withEffect">
-                                  <p:stCondLst>
-                                    <p:cond delay="0"/>
-                                  </p:stCondLst>
-                                  <p:childTnLst>
-                                    <p:set>
-                                      <p:cBhvr>
-                                        <p:cTn id="12" dur="1" fill="hold">
-                                          <p:stCondLst>
-                                            <p:cond delay="0"/>
-                                          </p:stCondLst>
-                                        </p:cTn>
-                                        <p:tgtEl>
-                                          <p:spTgt spid="3">
-                                            <p:txEl>
-                                              <p:pRg st="2" end="2"/>
-                                            </p:txEl>
-                                          </p:spTgt>
-                                        </p:tgtEl>
-                                        <p:attrNameLst>
-                                          <p:attrName>style.visibility</p:attrName>
-                                        </p:attrNameLst>
-                                      </p:cBhvr>
-                                      <p:to>
-                                        <p:strVal val="visible"/>
-                                      </p:to>
-                                    </p:set>
-                                  </p:childTnLst>
-                                </p:cTn>
-                              </p:par>
-                            </p:childTnLst>
-                          </p:cTn>
-                        </p:par>
-                      </p:childTnLst>
-                    </p:cTn>
-                  </p:par>
-                  <p:par>
-                    <p:cTn id="13" fill="hold">
-                      <p:stCondLst>
-                        <p:cond delay="indefinite"/>
-                      </p:stCondLst>
-                      <p:childTnLst>
-                        <p:par>
-                          <p:cTn id="14" fill="hold">
-                            <p:stCondLst>
-                              <p:cond delay="0"/>
-                            </p:stCondLst>
-                            <p:childTnLst>
-                              <p:par>
-                                <p:cTn id="15" presetID="1" presetClass="entr" presetSubtype="0" fill="hold" grpId="0" nodeType="clickEffect">
-                                  <p:stCondLst>
-                                    <p:cond delay="0"/>
-                                  </p:stCondLst>
-                                  <p:childTnLst>
-                                    <p:set>
-                                      <p:cBhvr>
-                                        <p:cTn id="16" dur="1" fill="hold">
-                                          <p:stCondLst>
-                                            <p:cond delay="0"/>
-                                          </p:stCondLst>
-                                        </p:cTn>
-                                        <p:tgtEl>
-                                          <p:spTgt spid="3">
-                                            <p:txEl>
-                                              <p:pRg st="3" end="3"/>
-                                            </p:txEl>
-                                          </p:spTgt>
-                                        </p:tgtEl>
-                                        <p:attrNameLst>
-                                          <p:attrName>style.visibility</p:attrName>
-                                        </p:attrNameLst>
-                                      </p:cBhvr>
-                                      <p:to>
-                                        <p:strVal val="visible"/>
-                                      </p:to>
-                                    </p:set>
-                                  </p:childTnLst>
-                                </p:cTn>
-                              </p:par>
-                              <p:par>
-                                <p:cTn id="17" presetID="1" presetClass="entr" presetSubtype="0" fill="hold" grpId="0" nodeType="withEffect">
-                                  <p:stCondLst>
-                                    <p:cond delay="0"/>
-                                  </p:stCondLst>
-                                  <p:childTnLst>
-                                    <p:set>
-                                      <p:cBhvr>
-                                        <p:cTn id="18" dur="1" fill="hold">
-                                          <p:stCondLst>
-                                            <p:cond delay="0"/>
-                                          </p:stCondLst>
-                                        </p:cTn>
-                                        <p:tgtEl>
-                                          <p:spTgt spid="3">
-                                            <p:txEl>
-                                              <p:pRg st="4" end="4"/>
-                                            </p:txEl>
-                                          </p:spTgt>
-                                        </p:tgtEl>
-                                        <p:attrNameLst>
-                                          <p:attrName>style.visibility</p:attrName>
-                                        </p:attrNameLst>
-                                      </p:cBhvr>
-                                      <p:to>
-                                        <p:strVal val="visible"/>
-                                      </p:to>
-                                    </p:set>
-                                  </p:childTnLst>
-                                </p:cTn>
-                              </p:par>
-                            </p:childTnLst>
-                          </p:cTn>
-                        </p:par>
-                      </p:childTnLst>
-                    </p:cTn>
-                  </p:par>
-                  <p:par>
-                    <p:cTn id="19" fill="hold">
-                      <p:stCondLst>
-                        <p:cond delay="indefinite"/>
-                      </p:stCondLst>
-                      <p:childTnLst>
-                        <p:par>
-                          <p:cTn id="20" fill="hold">
-                            <p:stCondLst>
-                              <p:cond delay="0"/>
-                            </p:stCondLst>
-                            <p:childTnLst>
-                              <p:par>
-                                <p:cTn id="21" presetID="1" presetClass="entr" presetSubtype="0" fill="hold" grpId="0" nodeType="clickEffect">
-                                  <p:stCondLst>
-                                    <p:cond delay="0"/>
-                                  </p:stCondLst>
-                                  <p:childTnLst>
-                                    <p:set>
-                                      <p:cBhvr>
-                                        <p:cTn id="22" dur="1" fill="hold">
-                                          <p:stCondLst>
-                                            <p:cond delay="0"/>
-                                          </p:stCondLst>
-                                        </p:cTn>
-                                        <p:tgtEl>
-                                          <p:spTgt spid="3">
-                                            <p:txEl>
-                                              <p:pRg st="5" end="5"/>
-                                            </p:txEl>
-                                          </p:spTgt>
-                                        </p:tgtEl>
-                                        <p:attrNameLst>
-                                          <p:attrName>style.visibility</p:attrName>
-                                        </p:attrNameLst>
-                                      </p:cBhvr>
-                                      <p:to>
-                                        <p:strVal val="visible"/>
-                                      </p:to>
-                                    </p:set>
-                                  </p:childTnLst>
-                                </p:cTn>
-                              </p:par>
-                              <p:par>
-                                <p:cTn id="23" presetID="1" presetClass="entr" presetSubtype="0" fill="hold" grpId="0" nodeType="withEffect">
-                                  <p:stCondLst>
-                                    <p:cond delay="0"/>
-                                  </p:stCondLst>
-                                  <p:childTnLst>
-                                    <p:set>
-                                      <p:cBhvr>
-                                        <p:cTn id="24" dur="1" fill="hold">
-                                          <p:stCondLst>
-                                            <p:cond delay="0"/>
-                                          </p:stCondLst>
-                                        </p:cTn>
-                                        <p:tgtEl>
-                                          <p:spTgt spid="3">
-                                            <p:txEl>
-                                              <p:pRg st="6" end="6"/>
-                                            </p:txEl>
-                                          </p:spTgt>
-                                        </p:tgtEl>
-                                        <p:attrNameLst>
-                                          <p:attrName>style.visibility</p:attrName>
-                                        </p:attrNameLst>
-                                      </p:cBhvr>
-                                      <p:to>
-                                        <p:strVal val="visible"/>
-                                      </p:to>
-                                    </p:set>
-                                  </p:childTnLst>
-                                </p:cTn>
-                              </p:par>
-                            </p:childTnLst>
-                          </p:cTn>
-                        </p:par>
-                      </p:childTnLst>
-                    </p:cTn>
-                  </p:par>
-                  <p:par>
-                    <p:cTn id="25" fill="hold">
-                      <p:stCondLst>
-                        <p:cond delay="indefinite"/>
-                      </p:stCondLst>
-                      <p:childTnLst>
-                        <p:par>
-                          <p:cTn id="26" fill="hold">
-                            <p:stCondLst>
-                              <p:cond delay="0"/>
-                            </p:stCondLst>
-                            <p:childTnLst>
-                              <p:par>
-                                <p:cTn id="27" presetID="1" presetClass="entr" presetSubtype="0" fill="hold" nodeType="clickEffect">
-                                  <p:stCondLst>
-                                    <p:cond delay="0"/>
-                                  </p:stCondLst>
-                                  <p:childTnLst>
-                                    <p:set>
-                                      <p:cBhvr>
-                                        <p:cTn id="28" dur="1" fill="hold">
-                                          <p:stCondLst>
-                                            <p:cond delay="0"/>
-                                          </p:stCondLst>
-                                        </p:cTn>
-                                        <p:tgtEl>
-                                          <p:spTgt spid="7"/>
-                                        </p:tgtEl>
-                                        <p:attrNameLst>
-                                          <p:attrName>style.visibility</p:attrName>
-                                        </p:attrNameLst>
-                                      </p:cBhvr>
-                                      <p:to>
-                                        <p:strVal val="visible"/>
-                                      </p:to>
-                                    </p:set>
-                                  </p:childTnLst>
-                                </p:cTn>
-                              </p:par>
-                            </p:childTnLst>
-                          </p:cTn>
-                        </p:par>
-                      </p:childTnLst>
-                    </p:cTn>
-                  </p:par>
-                  <p:par>
-                    <p:cTn id="29" fill="hold">
-                      <p:stCondLst>
-                        <p:cond delay="indefinite"/>
-                      </p:stCondLst>
-                      <p:childTnLst>
-                        <p:par>
-                          <p:cTn id="30" fill="hold">
-                            <p:stCondLst>
-                              <p:cond delay="0"/>
-                            </p:stCondLst>
-                            <p:childTnLst>
-                              <p:par>
-                                <p:cTn id="31" presetID="1" presetClass="entr" presetSubtype="0" fill="hold" grpId="0" nodeType="clickEffect">
-                                  <p:stCondLst>
-                                    <p:cond delay="0"/>
-                                  </p:stCondLst>
-                                  <p:childTnLst>
-                                    <p:set>
-                                      <p:cBhvr>
-                                        <p:cTn id="32" dur="1" fill="hold">
-                                          <p:stCondLst>
-                                            <p:cond delay="0"/>
-                                          </p:stCondLst>
-                                        </p:cTn>
-                                        <p:tgtEl>
-                                          <p:spTgt spid="3">
-                                            <p:txEl>
-                                              <p:pRg st="7" end="7"/>
-                                            </p:txEl>
-                                          </p:spTgt>
-                                        </p:tgtEl>
-                                        <p:attrNameLst>
-                                          <p:attrName>style.visibility</p:attrName>
-                                        </p:attrNameLst>
-                                      </p:cBhvr>
-                                      <p:to>
-                                        <p:strVal val="visible"/>
-                                      </p:to>
-                                    </p:set>
-                                  </p:childTnLst>
-                                </p:cTn>
-                              </p:par>
-                              <p:par>
-                                <p:cTn id="33" presetID="1" presetClass="entr" presetSubtype="0" fill="hold" grpId="0" nodeType="withEffect">
-                                  <p:stCondLst>
-                                    <p:cond delay="0"/>
-                                  </p:stCondLst>
-                                  <p:childTnLst>
-                                    <p:set>
-                                      <p:cBhvr>
-                                        <p:cTn id="34" dur="1" fill="hold">
-                                          <p:stCondLst>
-                                            <p:cond delay="0"/>
-                                          </p:stCondLst>
-                                        </p:cTn>
-                                        <p:tgtEl>
-                                          <p:spTgt spid="3">
-                                            <p:txEl>
-                                              <p:pRg st="8" end="8"/>
-                                            </p:txEl>
-                                          </p:spTgt>
-                                        </p:tgtEl>
-                                        <p:attrNameLst>
-                                          <p:attrName>style.visibility</p:attrName>
-                                        </p:attrNameLst>
-                                      </p:cBhvr>
-                                      <p:to>
-                                        <p:strVal val="visible"/>
-                                      </p:to>
-                                    </p:set>
-                                  </p:childTnLst>
-                                </p:cTn>
-                              </p:par>
-                            </p:childTnLst>
-                          </p:cTn>
-                        </p:par>
-                      </p:childTnLst>
-                    </p:cTn>
-                  </p:par>
-                </p:childTnLst>
-              </p:cTn>
-              <p:prevCondLst>
-                <p:cond evt="onPrev" delay="0">
-                  <p:tgtEl>
-                    <p:sldTgt/>
-                  </p:tgtEl>
-                </p:cond>
-              </p:prevCondLst>
-              <p:nextCondLst>
-                <p:cond evt="onNext" delay="0">
-                  <p:tgtEl>
-                    <p:sldTgt/>
-                  </p:tgtEl>
-                </p:cond>
-              </p:nextCondLst>
-            </p:seq>
-          </p:childTnLst>
-        </p:cTn>
-      </p:par>
-    </p:tnLst>
-    <p:bldLst>
-      <p:bldP spid="3" grpId="0" uiExpand="1" build="p" bldLvl="2"/>
-    </p:bldLst>
-  </p:timing>
 </p:sld>
 </file>
 
-<file path=ppt/slides/slide24.xml><?xml version="1.0" encoding="utf-8"?>
+<file path=ppt/slides/slide27.xml><?xml version="1.0" encoding="utf-8"?>
 <p:sld xmlns:a="http://schemas.openxmlformats.org/drawingml/2006/main" xmlns:r="http://schemas.openxmlformats.org/officeDocument/2006/relationships" xmlns:p="http://schemas.openxmlformats.org/presentationml/2006/main">
   <p:cSld>
     <p:spTree>
@@ -25200,7 +26232,7 @@
           <a:p>
             <a:fld id="{6597116C-F94B-4B5B-973A-17F07FB5C418}" type="slidenum">
               <a:rPr lang="nl-BE" smtClean="0"/>
-              <a:t>24</a:t>
+              <a:t>27</a:t>
             </a:fld>
             <a:endParaRPr lang="nl-BE"/>
           </a:p>
@@ -25345,7 +26377,7 @@
 </p:sld>
 </file>
 
-<file path=ppt/slides/slide25.xml><?xml version="1.0" encoding="utf-8"?>
+<file path=ppt/slides/slide28.xml><?xml version="1.0" encoding="utf-8"?>
 <p:sld xmlns:a="http://schemas.openxmlformats.org/drawingml/2006/main" xmlns:r="http://schemas.openxmlformats.org/officeDocument/2006/relationships" xmlns:p="http://schemas.openxmlformats.org/presentationml/2006/main">
   <p:cSld>
     <p:spTree>
@@ -25398,7 +26430,7 @@
         <p:spPr/>
         <p:txBody>
           <a:bodyPr>
-            <a:normAutofit fontScale="85000" lnSpcReduction="20000"/>
+            <a:normAutofit fontScale="62500" lnSpcReduction="20000"/>
           </a:bodyPr>
           <a:lstStyle/>
           <a:p>
@@ -25410,15 +26442,90 @@
           <a:p>
             <a:pPr lvl="1"/>
             <a:r>
+              <a:rPr lang="en-US" dirty="0" err="1" smtClean="0"/>
+              <a:t>ivybridge</a:t>
+            </a:r>
+            <a:r>
               <a:rPr lang="en-US" dirty="0" smtClean="0"/>
-              <a:t>DDR3@1600 MHz, 1 core: 8.6 GB/s</a:t>
+              <a:t> (dual socket, 10 core): 93 </a:t>
+            </a:r>
+            <a:r>
+              <a:rPr lang="en-US" dirty="0" smtClean="0"/>
+              <a:t>GB/s</a:t>
             </a:r>
           </a:p>
           <a:p>
             <a:pPr lvl="1"/>
             <a:r>
+              <a:rPr lang="en-US" dirty="0" err="1"/>
+              <a:t>h</a:t>
+            </a:r>
+            <a:r>
+              <a:rPr lang="en-US" dirty="0" err="1" smtClean="0"/>
+              <a:t>aswell</a:t>
+            </a:r>
+            <a:r>
               <a:rPr lang="en-US" dirty="0" smtClean="0"/>
-              <a:t>DDR4@1600 MHz, 1 core: 19.5 GB/s</a:t>
+              <a:t> (dual socket, 12 core): 110 GB/s</a:t>
+            </a:r>
+          </a:p>
+          <a:p>
+            <a:pPr lvl="1"/>
+            <a:r>
+              <a:rPr lang="en-US" dirty="0" err="1" smtClean="0"/>
+              <a:t>broadwell</a:t>
+            </a:r>
+            <a:r>
+              <a:rPr lang="en-US" dirty="0" smtClean="0"/>
+              <a:t> (dual socket, 14 core): 125 GB/s</a:t>
+            </a:r>
+          </a:p>
+          <a:p>
+            <a:r>
+              <a:rPr lang="en-US" dirty="0"/>
+              <a:t>QPI</a:t>
+            </a:r>
+          </a:p>
+          <a:p>
+            <a:pPr lvl="1"/>
+            <a:r>
+              <a:rPr lang="en-US" dirty="0" err="1"/>
+              <a:t>ivybridge</a:t>
+            </a:r>
+            <a:r>
+              <a:rPr lang="en-US" dirty="0"/>
+              <a:t>: 25 </a:t>
+            </a:r>
+            <a:r>
+              <a:rPr lang="en-US" dirty="0" smtClean="0"/>
+              <a:t>GB/s</a:t>
+            </a:r>
+          </a:p>
+          <a:p>
+            <a:pPr lvl="1"/>
+            <a:r>
+              <a:rPr lang="en-US" dirty="0" err="1" smtClean="0"/>
+              <a:t>haswell</a:t>
+            </a:r>
+            <a:r>
+              <a:rPr lang="en-US" dirty="0" smtClean="0"/>
+              <a:t>: 30 GB/s</a:t>
+            </a:r>
+            <a:endParaRPr lang="nl-BE" dirty="0"/>
+          </a:p>
+          <a:p>
+            <a:pPr lvl="1"/>
+            <a:r>
+              <a:rPr lang="nl-BE" dirty="0" err="1"/>
+              <a:t>broadwell</a:t>
+            </a:r>
+            <a:r>
+              <a:rPr lang="nl-BE" dirty="0"/>
+              <a:t>: 30 </a:t>
+            </a:r>
+            <a:r>
+              <a:rPr lang="nl-BE" dirty="0" smtClean="0"/>
+              <a:t>GB/s</a:t>
             </a:r>
             <a:endParaRPr lang="en-US" dirty="0" smtClean="0"/>
           </a:p>
@@ -25449,25 +26556,11 @@
           <a:p>
             <a:r>
               <a:rPr lang="en-US" dirty="0" smtClean="0"/>
-              <a:t>QPI (</a:t>
-            </a:r>
-            <a:r>
-              <a:rPr lang="nl-BE" dirty="0" smtClean="0"/>
-              <a:t>9.6GT/s</a:t>
-            </a:r>
-            <a:r>
-              <a:rPr lang="nl-BE" dirty="0"/>
-              <a:t>, 4.8 GHz</a:t>
-            </a:r>
-            <a:r>
-              <a:rPr lang="nl-BE" dirty="0" smtClean="0"/>
-              <a:t>): 38.4 GB/s</a:t>
-            </a:r>
-          </a:p>
-          <a:p>
+              <a:t>PCI </a:t>
+            </a:r>
             <a:r>
               <a:rPr lang="en-US" dirty="0" smtClean="0"/>
-              <a:t>PCI Express 3.0: 31.5 GB/s</a:t>
+              <a:t>Express 3.0: 31.5 GB/s</a:t>
             </a:r>
           </a:p>
           <a:p>
@@ -25510,7 +26603,7 @@
           <a:p>
             <a:fld id="{6597116C-F94B-4B5B-973A-17F07FB5C418}" type="slidenum">
               <a:rPr lang="nl-BE" smtClean="0"/>
-              <a:t>25</a:t>
+              <a:t>28</a:t>
             </a:fld>
             <a:endParaRPr lang="nl-BE"/>
           </a:p>
@@ -25563,6 +26656,108 @@
           <a:p>
             <a:r>
               <a:rPr lang="en-US" dirty="0" smtClean="0"/>
+              <a:t>Parallel scaling</a:t>
+            </a:r>
+            <a:endParaRPr lang="en-US" dirty="0"/>
+          </a:p>
+        </p:txBody>
+      </p:sp>
+      <p:sp>
+        <p:nvSpPr>
+          <p:cNvPr id="3" name="Text Placeholder 2"/>
+          <p:cNvSpPr>
+            <a:spLocks noGrp="1"/>
+          </p:cNvSpPr>
+          <p:nvPr>
+            <p:ph type="body" idx="1"/>
+          </p:nvPr>
+        </p:nvSpPr>
+        <p:spPr/>
+        <p:txBody>
+          <a:bodyPr/>
+          <a:lstStyle/>
+          <a:p>
+            <a:endParaRPr lang="en-US"/>
+          </a:p>
+        </p:txBody>
+      </p:sp>
+      <p:sp>
+        <p:nvSpPr>
+          <p:cNvPr id="4" name="Slide Number Placeholder 3"/>
+          <p:cNvSpPr>
+            <a:spLocks noGrp="1"/>
+          </p:cNvSpPr>
+          <p:nvPr>
+            <p:ph type="sldNum" sz="quarter" idx="12"/>
+          </p:nvPr>
+        </p:nvSpPr>
+        <p:spPr/>
+        <p:txBody>
+          <a:bodyPr/>
+          <a:lstStyle/>
+          <a:p>
+            <a:fld id="{6597116C-F94B-4B5B-973A-17F07FB5C418}" type="slidenum">
+              <a:rPr lang="nl-BE" smtClean="0"/>
+              <a:t>3</a:t>
+            </a:fld>
+            <a:endParaRPr lang="nl-BE"/>
+          </a:p>
+        </p:txBody>
+      </p:sp>
+    </p:spTree>
+    <p:extLst>
+      <p:ext uri="{BB962C8B-B14F-4D97-AF65-F5344CB8AC3E}">
+        <p14:creationId xmlns:p14="http://schemas.microsoft.com/office/powerpoint/2010/main" val="703705777"/>
+      </p:ext>
+    </p:extLst>
+  </p:cSld>
+  <p:clrMapOvr>
+    <a:masterClrMapping/>
+  </p:clrMapOvr>
+  <p:timing>
+    <p:tnLst>
+      <p:par>
+        <p:cTn id="1" dur="indefinite" restart="never" nodeType="tmRoot"/>
+      </p:par>
+    </p:tnLst>
+  </p:timing>
+</p:sld>
+</file>
+
+<file path=ppt/slides/slide4.xml><?xml version="1.0" encoding="utf-8"?>
+<p:sld xmlns:a="http://schemas.openxmlformats.org/drawingml/2006/main" xmlns:r="http://schemas.openxmlformats.org/officeDocument/2006/relationships" xmlns:p="http://schemas.openxmlformats.org/presentationml/2006/main">
+  <p:cSld>
+    <p:spTree>
+      <p:nvGrpSpPr>
+        <p:cNvPr id="1" name=""/>
+        <p:cNvGrpSpPr/>
+        <p:nvPr/>
+      </p:nvGrpSpPr>
+      <p:grpSpPr>
+        <a:xfrm>
+          <a:off x="0" y="0"/>
+          <a:ext cx="0" cy="0"/>
+          <a:chOff x="0" y="0"/>
+          <a:chExt cx="0" cy="0"/>
+        </a:xfrm>
+      </p:grpSpPr>
+      <p:sp>
+        <p:nvSpPr>
+          <p:cNvPr id="2" name="Title 1"/>
+          <p:cNvSpPr>
+            <a:spLocks noGrp="1"/>
+          </p:cNvSpPr>
+          <p:nvPr>
+            <p:ph type="title"/>
+          </p:nvPr>
+        </p:nvSpPr>
+        <p:spPr/>
+        <p:txBody>
+          <a:bodyPr/>
+          <a:lstStyle/>
+          <a:p>
+            <a:r>
+              <a:rPr lang="en-US" dirty="0" smtClean="0"/>
               <a:t>Dimensions for scaling</a:t>
             </a:r>
             <a:endParaRPr lang="nl-BE" dirty="0"/>
@@ -25701,7 +26896,7 @@
           <a:p>
             <a:fld id="{6597116C-F94B-4B5B-973A-17F07FB5C418}" type="slidenum">
               <a:rPr lang="nl-BE" smtClean="0"/>
-              <a:t>3</a:t>
+              <a:t>4</a:t>
             </a:fld>
             <a:endParaRPr lang="nl-BE"/>
           </a:p>
@@ -25913,7 +27108,7 @@
 </p:sld>
 </file>
 
-<file path=ppt/slides/slide4.xml><?xml version="1.0" encoding="utf-8"?>
+<file path=ppt/slides/slide5.xml><?xml version="1.0" encoding="utf-8"?>
 <p:sld xmlns:a="http://schemas.openxmlformats.org/drawingml/2006/main" xmlns:r="http://schemas.openxmlformats.org/officeDocument/2006/relationships" xmlns:p="http://schemas.openxmlformats.org/presentationml/2006/main">
   <p:cSld>
     <p:spTree>
@@ -26297,7 +27492,7 @@
           <a:p>
             <a:fld id="{6597116C-F94B-4B5B-973A-17F07FB5C418}" type="slidenum">
               <a:rPr lang="nl-BE" smtClean="0"/>
-              <a:t>4</a:t>
+              <a:t>5</a:t>
             </a:fld>
             <a:endParaRPr lang="nl-BE"/>
           </a:p>
@@ -26477,7 +27672,7 @@
 </p:sld>
 </file>
 
-<file path=ppt/slides/slide5.xml><?xml version="1.0" encoding="utf-8"?>
+<file path=ppt/slides/slide6.xml><?xml version="1.0" encoding="utf-8"?>
 <p:sld xmlns:a="http://schemas.openxmlformats.org/drawingml/2006/main" xmlns:r="http://schemas.openxmlformats.org/officeDocument/2006/relationships" xmlns:p="http://schemas.openxmlformats.org/presentationml/2006/main">
   <p:cSld>
     <p:spTree>
@@ -27265,7 +28460,7 @@
           <a:p>
             <a:fld id="{6597116C-F94B-4B5B-973A-17F07FB5C418}" type="slidenum">
               <a:rPr lang="nl-BE" smtClean="0"/>
-              <a:t>5</a:t>
+              <a:t>6</a:t>
             </a:fld>
             <a:endParaRPr lang="nl-BE"/>
           </a:p>
@@ -27536,7 +28731,7 @@
 </p:sld>
 </file>
 
-<file path=ppt/slides/slide6.xml><?xml version="1.0" encoding="utf-8"?>
+<file path=ppt/slides/slide7.xml><?xml version="1.0" encoding="utf-8"?>
 <p:sld xmlns:a="http://schemas.openxmlformats.org/drawingml/2006/main" xmlns:r="http://schemas.openxmlformats.org/officeDocument/2006/relationships" xmlns:p="http://schemas.openxmlformats.org/presentationml/2006/main">
   <p:cSld>
     <p:spTree>
@@ -28376,7 +29571,7 @@
           <a:p>
             <a:fld id="{6597116C-F94B-4B5B-973A-17F07FB5C418}" type="slidenum">
               <a:rPr lang="nl-BE" smtClean="0"/>
-              <a:t>6</a:t>
+              <a:t>7</a:t>
             </a:fld>
             <a:endParaRPr lang="nl-BE"/>
           </a:p>
@@ -28722,7 +29917,7 @@
 </p:sld>
 </file>
 
-<file path=ppt/slides/slide7.xml><?xml version="1.0" encoding="utf-8"?>
+<file path=ppt/slides/slide8.xml><?xml version="1.0" encoding="utf-8"?>
 <p:sld xmlns:a="http://schemas.openxmlformats.org/drawingml/2006/main" xmlns:r="http://schemas.openxmlformats.org/officeDocument/2006/relationships" xmlns:p="http://schemas.openxmlformats.org/presentationml/2006/main">
   <p:cSld>
     <p:spTree>
@@ -29271,7 +30466,7 @@
           <a:p>
             <a:fld id="{6597116C-F94B-4B5B-973A-17F07FB5C418}" type="slidenum">
               <a:rPr lang="nl-BE" smtClean="0"/>
-              <a:t>7</a:t>
+              <a:t>8</a:t>
             </a:fld>
             <a:endParaRPr lang="nl-BE"/>
           </a:p>
@@ -29368,7 +30563,7 @@
 </p:sld>
 </file>
 
-<file path=ppt/slides/slide8.xml><?xml version="1.0" encoding="utf-8"?>
+<file path=ppt/slides/slide9.xml><?xml version="1.0" encoding="utf-8"?>
 <p:sld xmlns:a="http://schemas.openxmlformats.org/drawingml/2006/main" xmlns:r="http://schemas.openxmlformats.org/officeDocument/2006/relationships" xmlns:p="http://schemas.openxmlformats.org/presentationml/2006/main">
   <p:cSld>
     <p:spTree>
@@ -29594,7 +30789,7 @@
           <a:p>
             <a:fld id="{6597116C-F94B-4B5B-973A-17F07FB5C418}" type="slidenum">
               <a:rPr lang="nl-BE" smtClean="0"/>
-              <a:t>8</a:t>
+              <a:t>9</a:t>
             </a:fld>
             <a:endParaRPr lang="nl-BE"/>
           </a:p>
@@ -29915,856 +31110,6 @@
     </p:tnLst>
     <p:bldLst>
       <p:bldP spid="3" grpId="0" uiExpand="1" build="p"/>
-    </p:bldLst>
-  </p:timing>
-</p:sld>
-</file>
-
-<file path=ppt/slides/slide9.xml><?xml version="1.0" encoding="utf-8"?>
-<p:sld xmlns:a="http://schemas.openxmlformats.org/drawingml/2006/main" xmlns:r="http://schemas.openxmlformats.org/officeDocument/2006/relationships" xmlns:p="http://schemas.openxmlformats.org/presentationml/2006/main">
-  <p:cSld>
-    <p:spTree>
-      <p:nvGrpSpPr>
-        <p:cNvPr id="1" name=""/>
-        <p:cNvGrpSpPr/>
-        <p:nvPr/>
-      </p:nvGrpSpPr>
-      <p:grpSpPr>
-        <a:xfrm>
-          <a:off x="0" y="0"/>
-          <a:ext cx="0" cy="0"/>
-          <a:chOff x="0" y="0"/>
-          <a:chExt cx="0" cy="0"/>
-        </a:xfrm>
-      </p:grpSpPr>
-      <p:sp>
-        <p:nvSpPr>
-          <p:cNvPr id="2" name="Title 1"/>
-          <p:cNvSpPr>
-            <a:spLocks noGrp="1"/>
-          </p:cNvSpPr>
-          <p:nvPr>
-            <p:ph type="title"/>
-          </p:nvPr>
-        </p:nvSpPr>
-        <p:spPr/>
-        <p:txBody>
-          <a:bodyPr/>
-          <a:lstStyle/>
-          <a:p>
-            <a:r>
-              <a:rPr lang="en-US" dirty="0" smtClean="0"/>
-              <a:t>Picking the sweet spot</a:t>
-            </a:r>
-            <a:endParaRPr lang="nl-BE" dirty="0"/>
-          </a:p>
-        </p:txBody>
-      </p:sp>
-      <p:grpSp>
-        <p:nvGrpSpPr>
-          <p:cNvPr id="11" name="Group 10"/>
-          <p:cNvGrpSpPr/>
-          <p:nvPr/>
-        </p:nvGrpSpPr>
-        <p:grpSpPr>
-          <a:xfrm>
-            <a:off x="591815" y="1844824"/>
-            <a:ext cx="4039684" cy="2540025"/>
-            <a:chOff x="591815" y="1844824"/>
-            <a:chExt cx="4039684" cy="2540025"/>
-          </a:xfrm>
-        </p:grpSpPr>
-        <p:graphicFrame>
-          <p:nvGraphicFramePr>
-            <p:cNvPr id="6" name="Chart 5"/>
-            <p:cNvGraphicFramePr>
-              <a:graphicFrameLocks/>
-            </p:cNvGraphicFramePr>
-            <p:nvPr>
-              <p:extLst>
-                <p:ext uri="{D42A27DB-BD31-4B8C-83A1-F6EECF244321}">
-                  <p14:modId xmlns:p14="http://schemas.microsoft.com/office/powerpoint/2010/main" val="541164566"/>
-                </p:ext>
-              </p:extLst>
-            </p:nvPr>
-          </p:nvGraphicFramePr>
-          <p:xfrm>
-            <a:off x="899592" y="1844824"/>
-            <a:ext cx="3731907" cy="2239144"/>
-          </p:xfrm>
-          <a:graphic>
-            <a:graphicData uri="http://schemas.openxmlformats.org/drawingml/2006/chart">
-              <c:chart xmlns:c="http://schemas.openxmlformats.org/drawingml/2006/chart" xmlns:r="http://schemas.openxmlformats.org/officeDocument/2006/relationships" r:id="rId2"/>
-            </a:graphicData>
-          </a:graphic>
-        </p:graphicFrame>
-        <p:sp>
-          <p:nvSpPr>
-            <p:cNvPr id="7" name="TextBox 6"/>
-            <p:cNvSpPr txBox="1"/>
-            <p:nvPr/>
-          </p:nvSpPr>
-          <p:spPr>
-            <a:xfrm>
-              <a:off x="2339752" y="4077072"/>
-              <a:ext cx="1123897" cy="307777"/>
-            </a:xfrm>
-            <a:prstGeom prst="rect">
-              <a:avLst/>
-            </a:prstGeom>
-            <a:noFill/>
-          </p:spPr>
-          <p:txBody>
-            <a:bodyPr wrap="none" rtlCol="0">
-              <a:spAutoFit/>
-            </a:bodyPr>
-            <a:lstStyle/>
-            <a:p>
-              <a:r>
-                <a:rPr lang="en-US" sz="1400" dirty="0" smtClean="0"/>
-                <a:t>nr. processes</a:t>
-              </a:r>
-              <a:endParaRPr lang="nl-BE" sz="1400" dirty="0"/>
-            </a:p>
-          </p:txBody>
-        </p:sp>
-        <p:sp>
-          <p:nvSpPr>
-            <p:cNvPr id="8" name="TextBox 7"/>
-            <p:cNvSpPr txBox="1"/>
-            <p:nvPr/>
-          </p:nvSpPr>
-          <p:spPr>
-            <a:xfrm rot="16200000">
-              <a:off x="339182" y="2724574"/>
-              <a:ext cx="813043" cy="307777"/>
-            </a:xfrm>
-            <a:prstGeom prst="rect">
-              <a:avLst/>
-            </a:prstGeom>
-            <a:noFill/>
-          </p:spPr>
-          <p:txBody>
-            <a:bodyPr wrap="none" rtlCol="0">
-              <a:spAutoFit/>
-            </a:bodyPr>
-            <a:lstStyle/>
-            <a:p>
-              <a:r>
-                <a:rPr lang="en-US" sz="1400" dirty="0" smtClean="0"/>
-                <a:t>speedup</a:t>
-              </a:r>
-              <a:endParaRPr lang="nl-BE" sz="1400" dirty="0"/>
-            </a:p>
-          </p:txBody>
-        </p:sp>
-      </p:grpSp>
-      <p:grpSp>
-        <p:nvGrpSpPr>
-          <p:cNvPr id="12" name="Group 11"/>
-          <p:cNvGrpSpPr/>
-          <p:nvPr/>
-        </p:nvGrpSpPr>
-        <p:grpSpPr>
-          <a:xfrm>
-            <a:off x="4210472" y="3861048"/>
-            <a:ext cx="4682008" cy="2828057"/>
-            <a:chOff x="4120208" y="3861048"/>
-            <a:chExt cx="4682008" cy="2828057"/>
-          </a:xfrm>
-        </p:grpSpPr>
-        <p:graphicFrame>
-          <p:nvGraphicFramePr>
-            <p:cNvPr id="5" name="Chart 4"/>
-            <p:cNvGraphicFramePr>
-              <a:graphicFrameLocks/>
-            </p:cNvGraphicFramePr>
-            <p:nvPr>
-              <p:extLst>
-                <p:ext uri="{D42A27DB-BD31-4B8C-83A1-F6EECF244321}">
-                  <p14:modId xmlns:p14="http://schemas.microsoft.com/office/powerpoint/2010/main" val="5710521"/>
-                </p:ext>
-              </p:extLst>
-            </p:nvPr>
-          </p:nvGraphicFramePr>
-          <p:xfrm>
-            <a:off x="4499992" y="3861048"/>
-            <a:ext cx="4302224" cy="2581334"/>
-          </p:xfrm>
-          <a:graphic>
-            <a:graphicData uri="http://schemas.openxmlformats.org/drawingml/2006/chart">
-              <c:chart xmlns:c="http://schemas.openxmlformats.org/drawingml/2006/chart" xmlns:r="http://schemas.openxmlformats.org/officeDocument/2006/relationships" r:id="rId3"/>
-            </a:graphicData>
-          </a:graphic>
-        </p:graphicFrame>
-        <p:sp>
-          <p:nvSpPr>
-            <p:cNvPr id="9" name="TextBox 8"/>
-            <p:cNvSpPr txBox="1"/>
-            <p:nvPr/>
-          </p:nvSpPr>
-          <p:spPr>
-            <a:xfrm>
-              <a:off x="6400431" y="6381328"/>
-              <a:ext cx="1123897" cy="307777"/>
-            </a:xfrm>
-            <a:prstGeom prst="rect">
-              <a:avLst/>
-            </a:prstGeom>
-            <a:noFill/>
-          </p:spPr>
-          <p:txBody>
-            <a:bodyPr wrap="none" rtlCol="0">
-              <a:spAutoFit/>
-            </a:bodyPr>
-            <a:lstStyle/>
-            <a:p>
-              <a:r>
-                <a:rPr lang="en-US" sz="1400" dirty="0" smtClean="0"/>
-                <a:t>nr. processes</a:t>
-              </a:r>
-              <a:endParaRPr lang="nl-BE" sz="1400" dirty="0"/>
-            </a:p>
-          </p:txBody>
-        </p:sp>
-        <p:sp>
-          <p:nvSpPr>
-            <p:cNvPr id="10" name="TextBox 9"/>
-            <p:cNvSpPr txBox="1"/>
-            <p:nvPr/>
-          </p:nvSpPr>
-          <p:spPr>
-            <a:xfrm rot="16200000">
-              <a:off x="3833976" y="4867361"/>
-              <a:ext cx="880241" cy="307777"/>
-            </a:xfrm>
-            <a:prstGeom prst="rect">
-              <a:avLst/>
-            </a:prstGeom>
-            <a:noFill/>
-          </p:spPr>
-          <p:txBody>
-            <a:bodyPr wrap="none" rtlCol="0">
-              <a:spAutoFit/>
-            </a:bodyPr>
-            <a:lstStyle/>
-            <a:p>
-              <a:r>
-                <a:rPr lang="en-US" sz="1400" dirty="0" smtClean="0"/>
-                <a:t>efficiency</a:t>
-              </a:r>
-              <a:endParaRPr lang="nl-BE" sz="1400" dirty="0"/>
-            </a:p>
-          </p:txBody>
-        </p:sp>
-      </p:grpSp>
-      <p:grpSp>
-        <p:nvGrpSpPr>
-          <p:cNvPr id="16" name="Group 15"/>
-          <p:cNvGrpSpPr/>
-          <p:nvPr/>
-        </p:nvGrpSpPr>
-        <p:grpSpPr>
-          <a:xfrm>
-            <a:off x="3635896" y="1556792"/>
-            <a:ext cx="3357034" cy="523220"/>
-            <a:chOff x="3635896" y="1556792"/>
-            <a:chExt cx="3357034" cy="523220"/>
-          </a:xfrm>
-        </p:grpSpPr>
-        <p:sp>
-          <p:nvSpPr>
-            <p:cNvPr id="13" name="TextBox 12"/>
-            <p:cNvSpPr txBox="1"/>
-            <p:nvPr/>
-          </p:nvSpPr>
-          <p:spPr>
-            <a:xfrm>
-              <a:off x="5220072" y="1556792"/>
-              <a:ext cx="1772858" cy="523220"/>
-            </a:xfrm>
-            <a:prstGeom prst="rect">
-              <a:avLst/>
-            </a:prstGeom>
-            <a:noFill/>
-          </p:spPr>
-          <p:txBody>
-            <a:bodyPr wrap="none" rtlCol="0">
-              <a:spAutoFit/>
-            </a:bodyPr>
-            <a:lstStyle/>
-            <a:p>
-              <a:r>
-                <a:rPr lang="en-US" sz="2800" dirty="0" smtClean="0">
-                  <a:solidFill>
-                    <a:srgbClr val="FF0000"/>
-                  </a:solidFill>
-                </a:rPr>
-                <a:t>sweet spot</a:t>
-              </a:r>
-              <a:endParaRPr lang="nl-BE" sz="2800" dirty="0">
-                <a:solidFill>
-                  <a:srgbClr val="FF0000"/>
-                </a:solidFill>
-              </a:endParaRPr>
-            </a:p>
-          </p:txBody>
-        </p:sp>
-        <p:cxnSp>
-          <p:nvCxnSpPr>
-            <p:cNvPr id="15" name="Straight Arrow Connector 14"/>
-            <p:cNvCxnSpPr>
-              <a:stCxn id="13" idx="1"/>
-            </p:cNvCxnSpPr>
-            <p:nvPr/>
-          </p:nvCxnSpPr>
-          <p:spPr>
-            <a:xfrm flipH="1">
-              <a:off x="3635896" y="1818402"/>
-              <a:ext cx="1584176" cy="261610"/>
-            </a:xfrm>
-            <a:prstGeom prst="straightConnector1">
-              <a:avLst/>
-            </a:prstGeom>
-            <a:ln w="19050">
-              <a:solidFill>
-                <a:srgbClr val="FF0000"/>
-              </a:solidFill>
-              <a:tailEnd type="stealth" w="lg" len="lg"/>
-            </a:ln>
-          </p:spPr>
-          <p:style>
-            <a:lnRef idx="1">
-              <a:schemeClr val="accent1"/>
-            </a:lnRef>
-            <a:fillRef idx="0">
-              <a:schemeClr val="accent1"/>
-            </a:fillRef>
-            <a:effectRef idx="0">
-              <a:schemeClr val="accent1"/>
-            </a:effectRef>
-            <a:fontRef idx="minor">
-              <a:schemeClr val="tx1"/>
-            </a:fontRef>
-          </p:style>
-        </p:cxnSp>
-      </p:grpSp>
-      <p:sp>
-        <p:nvSpPr>
-          <p:cNvPr id="17" name="Rectangle 16"/>
-          <p:cNvSpPr/>
-          <p:nvPr/>
-        </p:nvSpPr>
-        <p:spPr>
-          <a:xfrm>
-            <a:off x="4572000" y="4725144"/>
-            <a:ext cx="4320480" cy="1296144"/>
-          </a:xfrm>
-          <a:prstGeom prst="rect">
-            <a:avLst/>
-          </a:prstGeom>
-          <a:pattFill prst="wdUpDiag">
-            <a:fgClr>
-              <a:srgbClr val="FF0000"/>
-            </a:fgClr>
-            <a:bgClr>
-              <a:schemeClr val="bg1"/>
-            </a:bgClr>
-          </a:pattFill>
-          <a:ln>
-            <a:noFill/>
-          </a:ln>
-        </p:spPr>
-        <p:style>
-          <a:lnRef idx="2">
-            <a:schemeClr val="accent1">
-              <a:shade val="50000"/>
-            </a:schemeClr>
-          </a:lnRef>
-          <a:fillRef idx="1">
-            <a:schemeClr val="accent1"/>
-          </a:fillRef>
-          <a:effectRef idx="0">
-            <a:schemeClr val="accent1"/>
-          </a:effectRef>
-          <a:fontRef idx="minor">
-            <a:schemeClr val="lt1"/>
-          </a:fontRef>
-        </p:style>
-        <p:txBody>
-          <a:bodyPr rtlCol="0" anchor="ctr"/>
-          <a:lstStyle/>
-          <a:p>
-            <a:pPr algn="ctr"/>
-            <a:endParaRPr lang="nl-BE"/>
-          </a:p>
-        </p:txBody>
-      </p:sp>
-      <p:grpSp>
-        <p:nvGrpSpPr>
-          <p:cNvPr id="18" name="Group 17"/>
-          <p:cNvGrpSpPr/>
-          <p:nvPr/>
-        </p:nvGrpSpPr>
-        <p:grpSpPr>
-          <a:xfrm>
-            <a:off x="6106501" y="2905780"/>
-            <a:ext cx="2353931" cy="1603340"/>
-            <a:chOff x="4638999" y="1556792"/>
-            <a:chExt cx="2353931" cy="1603340"/>
-          </a:xfrm>
-        </p:grpSpPr>
-        <p:sp>
-          <p:nvSpPr>
-            <p:cNvPr id="19" name="TextBox 18"/>
-            <p:cNvSpPr txBox="1"/>
-            <p:nvPr/>
-          </p:nvSpPr>
-          <p:spPr>
-            <a:xfrm>
-              <a:off x="5220072" y="1556792"/>
-              <a:ext cx="1772858" cy="523220"/>
-            </a:xfrm>
-            <a:prstGeom prst="rect">
-              <a:avLst/>
-            </a:prstGeom>
-            <a:noFill/>
-          </p:spPr>
-          <p:txBody>
-            <a:bodyPr wrap="none" rtlCol="0">
-              <a:spAutoFit/>
-            </a:bodyPr>
-            <a:lstStyle/>
-            <a:p>
-              <a:r>
-                <a:rPr lang="en-US" sz="2800" dirty="0" smtClean="0">
-                  <a:solidFill>
-                    <a:srgbClr val="00B050"/>
-                  </a:solidFill>
-                </a:rPr>
-                <a:t>sweet spot</a:t>
-              </a:r>
-              <a:endParaRPr lang="nl-BE" sz="2800" dirty="0">
-                <a:solidFill>
-                  <a:srgbClr val="00B050"/>
-                </a:solidFill>
-              </a:endParaRPr>
-            </a:p>
-          </p:txBody>
-        </p:sp>
-        <p:cxnSp>
-          <p:nvCxnSpPr>
-            <p:cNvPr id="20" name="Straight Arrow Connector 19"/>
-            <p:cNvCxnSpPr>
-              <a:stCxn id="19" idx="2"/>
-            </p:cNvCxnSpPr>
-            <p:nvPr/>
-          </p:nvCxnSpPr>
-          <p:spPr>
-            <a:xfrm flipH="1">
-              <a:off x="4638999" y="2080012"/>
-              <a:ext cx="1467502" cy="1080120"/>
-            </a:xfrm>
-            <a:prstGeom prst="straightConnector1">
-              <a:avLst/>
-            </a:prstGeom>
-            <a:ln w="19050">
-              <a:solidFill>
-                <a:srgbClr val="00B050"/>
-              </a:solidFill>
-              <a:tailEnd type="stealth" w="lg" len="lg"/>
-            </a:ln>
-          </p:spPr>
-          <p:style>
-            <a:lnRef idx="1">
-              <a:schemeClr val="accent1"/>
-            </a:lnRef>
-            <a:fillRef idx="0">
-              <a:schemeClr val="accent1"/>
-            </a:fillRef>
-            <a:effectRef idx="0">
-              <a:schemeClr val="accent1"/>
-            </a:effectRef>
-            <a:fontRef idx="minor">
-              <a:schemeClr val="tx1"/>
-            </a:fontRef>
-          </p:style>
-        </p:cxnSp>
-      </p:grpSp>
-      <p:grpSp>
-        <p:nvGrpSpPr>
-          <p:cNvPr id="26" name="Group 25"/>
-          <p:cNvGrpSpPr/>
-          <p:nvPr/>
-        </p:nvGrpSpPr>
-        <p:grpSpPr>
-          <a:xfrm>
-            <a:off x="5377646" y="1709192"/>
-            <a:ext cx="1615284" cy="360040"/>
-            <a:chOff x="744214" y="1349152"/>
-            <a:chExt cx="1615284" cy="360040"/>
-          </a:xfrm>
-        </p:grpSpPr>
-        <p:cxnSp>
-          <p:nvCxnSpPr>
-            <p:cNvPr id="24" name="Straight Connector 23"/>
-            <p:cNvCxnSpPr/>
-            <p:nvPr/>
-          </p:nvCxnSpPr>
-          <p:spPr>
-            <a:xfrm>
-              <a:off x="899592" y="1349152"/>
-              <a:ext cx="1459906" cy="360040"/>
-            </a:xfrm>
-            <a:prstGeom prst="line">
-              <a:avLst/>
-            </a:prstGeom>
-            <a:ln w="38100">
-              <a:solidFill>
-                <a:srgbClr val="FF0000"/>
-              </a:solidFill>
-            </a:ln>
-          </p:spPr>
-          <p:style>
-            <a:lnRef idx="1">
-              <a:schemeClr val="accent1"/>
-            </a:lnRef>
-            <a:fillRef idx="0">
-              <a:schemeClr val="accent1"/>
-            </a:fillRef>
-            <a:effectRef idx="0">
-              <a:schemeClr val="accent1"/>
-            </a:effectRef>
-            <a:fontRef idx="minor">
-              <a:schemeClr val="tx1"/>
-            </a:fontRef>
-          </p:style>
-        </p:cxnSp>
-        <p:cxnSp>
-          <p:nvCxnSpPr>
-            <p:cNvPr id="25" name="Straight Connector 24"/>
-            <p:cNvCxnSpPr/>
-            <p:nvPr/>
-          </p:nvCxnSpPr>
-          <p:spPr>
-            <a:xfrm flipV="1">
-              <a:off x="744214" y="1349152"/>
-              <a:ext cx="1459906" cy="360040"/>
-            </a:xfrm>
-            <a:prstGeom prst="line">
-              <a:avLst/>
-            </a:prstGeom>
-            <a:ln w="38100">
-              <a:solidFill>
-                <a:srgbClr val="FF0000"/>
-              </a:solidFill>
-            </a:ln>
-          </p:spPr>
-          <p:style>
-            <a:lnRef idx="1">
-              <a:schemeClr val="accent1"/>
-            </a:lnRef>
-            <a:fillRef idx="0">
-              <a:schemeClr val="accent1"/>
-            </a:fillRef>
-            <a:effectRef idx="0">
-              <a:schemeClr val="accent1"/>
-            </a:effectRef>
-            <a:fontRef idx="minor">
-              <a:schemeClr val="tx1"/>
-            </a:fontRef>
-          </p:style>
-        </p:cxnSp>
-      </p:grpSp>
-      <p:sp>
-        <p:nvSpPr>
-          <p:cNvPr id="3" name="Slide Number Placeholder 2"/>
-          <p:cNvSpPr>
-            <a:spLocks noGrp="1"/>
-          </p:cNvSpPr>
-          <p:nvPr>
-            <p:ph type="sldNum" sz="quarter" idx="12"/>
-          </p:nvPr>
-        </p:nvSpPr>
-        <p:spPr/>
-        <p:txBody>
-          <a:bodyPr/>
-          <a:lstStyle/>
-          <a:p>
-            <a:fld id="{6597116C-F94B-4B5B-973A-17F07FB5C418}" type="slidenum">
-              <a:rPr lang="nl-BE" smtClean="0"/>
-              <a:t>9</a:t>
-            </a:fld>
-            <a:endParaRPr lang="nl-BE"/>
-          </a:p>
-        </p:txBody>
-      </p:sp>
-    </p:spTree>
-    <p:extLst>
-      <p:ext uri="{BB962C8B-B14F-4D97-AF65-F5344CB8AC3E}">
-        <p14:creationId xmlns:p14="http://schemas.microsoft.com/office/powerpoint/2010/main" val="315378486"/>
-      </p:ext>
-    </p:extLst>
-  </p:cSld>
-  <p:clrMapOvr>
-    <a:masterClrMapping/>
-  </p:clrMapOvr>
-  <p:timing>
-    <p:tnLst>
-      <p:par>
-        <p:cTn id="1" dur="indefinite" restart="never" nodeType="tmRoot">
-          <p:childTnLst>
-            <p:seq concurrent="1" nextAc="seek">
-              <p:cTn id="2" dur="indefinite" nodeType="mainSeq">
-                <p:childTnLst>
-                  <p:par>
-                    <p:cTn id="3" fill="hold">
-                      <p:stCondLst>
-                        <p:cond delay="indefinite"/>
-                      </p:stCondLst>
-                      <p:childTnLst>
-                        <p:par>
-                          <p:cTn id="4" fill="hold">
-                            <p:stCondLst>
-                              <p:cond delay="0"/>
-                            </p:stCondLst>
-                            <p:childTnLst>
-                              <p:par>
-                                <p:cTn id="5" presetID="1" presetClass="entr" presetSubtype="0" fill="hold" nodeType="clickEffect">
-                                  <p:stCondLst>
-                                    <p:cond delay="0"/>
-                                  </p:stCondLst>
-                                  <p:childTnLst>
-                                    <p:set>
-                                      <p:cBhvr>
-                                        <p:cTn id="6" dur="1" fill="hold">
-                                          <p:stCondLst>
-                                            <p:cond delay="0"/>
-                                          </p:stCondLst>
-                                        </p:cTn>
-                                        <p:tgtEl>
-                                          <p:spTgt spid="16"/>
-                                        </p:tgtEl>
-                                        <p:attrNameLst>
-                                          <p:attrName>style.visibility</p:attrName>
-                                        </p:attrNameLst>
-                                      </p:cBhvr>
-                                      <p:to>
-                                        <p:strVal val="visible"/>
-                                      </p:to>
-                                    </p:set>
-                                  </p:childTnLst>
-                                </p:cTn>
-                              </p:par>
-                            </p:childTnLst>
-                          </p:cTn>
-                        </p:par>
-                      </p:childTnLst>
-                    </p:cTn>
-                  </p:par>
-                  <p:par>
-                    <p:cTn id="7" fill="hold">
-                      <p:stCondLst>
-                        <p:cond delay="indefinite"/>
-                      </p:stCondLst>
-                      <p:childTnLst>
-                        <p:par>
-                          <p:cTn id="8" fill="hold">
-                            <p:stCondLst>
-                              <p:cond delay="0"/>
-                            </p:stCondLst>
-                            <p:childTnLst>
-                              <p:par>
-                                <p:cTn id="9" presetID="1" presetClass="entr" presetSubtype="0" fill="hold" nodeType="clickEffect">
-                                  <p:stCondLst>
-                                    <p:cond delay="0"/>
-                                  </p:stCondLst>
-                                  <p:childTnLst>
-                                    <p:set>
-                                      <p:cBhvr>
-                                        <p:cTn id="10" dur="1" fill="hold">
-                                          <p:stCondLst>
-                                            <p:cond delay="0"/>
-                                          </p:stCondLst>
-                                        </p:cTn>
-                                        <p:tgtEl>
-                                          <p:spTgt spid="26"/>
-                                        </p:tgtEl>
-                                        <p:attrNameLst>
-                                          <p:attrName>style.visibility</p:attrName>
-                                        </p:attrNameLst>
-                                      </p:cBhvr>
-                                      <p:to>
-                                        <p:strVal val="visible"/>
-                                      </p:to>
-                                    </p:set>
-                                  </p:childTnLst>
-                                </p:cTn>
-                              </p:par>
-                            </p:childTnLst>
-                          </p:cTn>
-                        </p:par>
-                      </p:childTnLst>
-                    </p:cTn>
-                  </p:par>
-                  <p:par>
-                    <p:cTn id="11" fill="hold">
-                      <p:stCondLst>
-                        <p:cond delay="indefinite"/>
-                      </p:stCondLst>
-                      <p:childTnLst>
-                        <p:par>
-                          <p:cTn id="12" fill="hold">
-                            <p:stCondLst>
-                              <p:cond delay="0"/>
-                            </p:stCondLst>
-                            <p:childTnLst>
-                              <p:par>
-                                <p:cTn id="13" presetID="1" presetClass="entr" presetSubtype="0" fill="hold" nodeType="clickEffect">
-                                  <p:stCondLst>
-                                    <p:cond delay="0"/>
-                                  </p:stCondLst>
-                                  <p:childTnLst>
-                                    <p:set>
-                                      <p:cBhvr>
-                                        <p:cTn id="14" dur="1" fill="hold">
-                                          <p:stCondLst>
-                                            <p:cond delay="0"/>
-                                          </p:stCondLst>
-                                        </p:cTn>
-                                        <p:tgtEl>
-                                          <p:spTgt spid="12"/>
-                                        </p:tgtEl>
-                                        <p:attrNameLst>
-                                          <p:attrName>style.visibility</p:attrName>
-                                        </p:attrNameLst>
-                                      </p:cBhvr>
-                                      <p:to>
-                                        <p:strVal val="visible"/>
-                                      </p:to>
-                                    </p:set>
-                                  </p:childTnLst>
-                                </p:cTn>
-                              </p:par>
-                            </p:childTnLst>
-                          </p:cTn>
-                        </p:par>
-                      </p:childTnLst>
-                    </p:cTn>
-                  </p:par>
-                  <p:par>
-                    <p:cTn id="15" fill="hold">
-                      <p:stCondLst>
-                        <p:cond delay="indefinite"/>
-                      </p:stCondLst>
-                      <p:childTnLst>
-                        <p:par>
-                          <p:cTn id="16" fill="hold">
-                            <p:stCondLst>
-                              <p:cond delay="0"/>
-                            </p:stCondLst>
-                            <p:childTnLst>
-                              <p:par>
-                                <p:cTn id="17" presetID="1" presetClass="entr" presetSubtype="0" fill="hold" grpId="0" nodeType="clickEffect">
-                                  <p:stCondLst>
-                                    <p:cond delay="0"/>
-                                  </p:stCondLst>
-                                  <p:childTnLst>
-                                    <p:set>
-                                      <p:cBhvr>
-                                        <p:cTn id="18" dur="1" fill="hold">
-                                          <p:stCondLst>
-                                            <p:cond delay="0"/>
-                                          </p:stCondLst>
-                                        </p:cTn>
-                                        <p:tgtEl>
-                                          <p:spTgt spid="17"/>
-                                        </p:tgtEl>
-                                        <p:attrNameLst>
-                                          <p:attrName>style.visibility</p:attrName>
-                                        </p:attrNameLst>
-                                      </p:cBhvr>
-                                      <p:to>
-                                        <p:strVal val="visible"/>
-                                      </p:to>
-                                    </p:set>
-                                  </p:childTnLst>
-                                </p:cTn>
-                              </p:par>
-                            </p:childTnLst>
-                          </p:cTn>
-                        </p:par>
-                      </p:childTnLst>
-                    </p:cTn>
-                  </p:par>
-                  <p:par>
-                    <p:cTn id="19" fill="hold">
-                      <p:stCondLst>
-                        <p:cond delay="indefinite"/>
-                      </p:stCondLst>
-                      <p:childTnLst>
-                        <p:par>
-                          <p:cTn id="20" fill="hold">
-                            <p:stCondLst>
-                              <p:cond delay="0"/>
-                            </p:stCondLst>
-                            <p:childTnLst>
-                              <p:par>
-                                <p:cTn id="21" presetID="1" presetClass="entr" presetSubtype="0" fill="hold" nodeType="clickEffect">
-                                  <p:stCondLst>
-                                    <p:cond delay="0"/>
-                                  </p:stCondLst>
-                                  <p:childTnLst>
-                                    <p:set>
-                                      <p:cBhvr>
-                                        <p:cTn id="22" dur="1" fill="hold">
-                                          <p:stCondLst>
-                                            <p:cond delay="0"/>
-                                          </p:stCondLst>
-                                        </p:cTn>
-                                        <p:tgtEl>
-                                          <p:spTgt spid="18"/>
-                                        </p:tgtEl>
-                                        <p:attrNameLst>
-                                          <p:attrName>style.visibility</p:attrName>
-                                        </p:attrNameLst>
-                                      </p:cBhvr>
-                                      <p:to>
-                                        <p:strVal val="visible"/>
-                                      </p:to>
-                                    </p:set>
-                                  </p:childTnLst>
-                                </p:cTn>
-                              </p:par>
-                            </p:childTnLst>
-                          </p:cTn>
-                        </p:par>
-                      </p:childTnLst>
-                    </p:cTn>
-                  </p:par>
-                </p:childTnLst>
-              </p:cTn>
-              <p:prevCondLst>
-                <p:cond evt="onPrev" delay="0">
-                  <p:tgtEl>
-                    <p:sldTgt/>
-                  </p:tgtEl>
-                </p:cond>
-              </p:prevCondLst>
-              <p:nextCondLst>
-                <p:cond evt="onNext" delay="0">
-                  <p:tgtEl>
-                    <p:sldTgt/>
-                  </p:tgtEl>
-                </p:cond>
-              </p:nextCondLst>
-            </p:seq>
-          </p:childTnLst>
-        </p:cTn>
-      </p:par>
-    </p:tnLst>
-    <p:bldLst>
-      <p:bldP spid="17" grpId="0" animBg="1"/>
     </p:bldLst>
   </p:timing>
 </p:sld>

</xml_diff>

<commit_message>
Added cache associativity slide
</commit_message>
<xml_diff>
--- a/Optimization/hpc_efficiency.pptx
+++ b/Optimization/hpc_efficiency.pptx
@@ -5,7 +5,7 @@
     <p:sldMasterId id="2147483648" r:id="rId1"/>
   </p:sldMasterIdLst>
   <p:notesMasterIdLst>
-    <p:notesMasterId r:id="rId30"/>
+    <p:notesMasterId r:id="rId32"/>
   </p:notesMasterIdLst>
   <p:sldIdLst>
     <p:sldId id="267" r:id="rId2"/>
@@ -30,12 +30,14 @@
     <p:sldId id="279" r:id="rId21"/>
     <p:sldId id="280" r:id="rId22"/>
     <p:sldId id="278" r:id="rId23"/>
-    <p:sldId id="285" r:id="rId24"/>
-    <p:sldId id="275" r:id="rId25"/>
-    <p:sldId id="281" r:id="rId26"/>
-    <p:sldId id="286" r:id="rId27"/>
-    <p:sldId id="271" r:id="rId28"/>
-    <p:sldId id="283" r:id="rId29"/>
+    <p:sldId id="288" r:id="rId24"/>
+    <p:sldId id="285" r:id="rId25"/>
+    <p:sldId id="275" r:id="rId26"/>
+    <p:sldId id="281" r:id="rId27"/>
+    <p:sldId id="287" r:id="rId28"/>
+    <p:sldId id="286" r:id="rId29"/>
+    <p:sldId id="271" r:id="rId30"/>
+    <p:sldId id="283" r:id="rId31"/>
   </p:sldIdLst>
   <p:sldSz cx="9144000" cy="6858000" type="screen4x3"/>
   <p:notesSz cx="6858000" cy="9144000"/>
@@ -7542,7 +7544,7 @@
           <a:graphicData uri="http://schemas.openxmlformats.org/presentationml/2006/ole">
             <mc:AlternateContent xmlns:mc="http://schemas.openxmlformats.org/markup-compatibility/2006">
               <mc:Choice xmlns:v="urn:schemas-microsoft-com:vml" Requires="v">
-                <p:oleObj spid="_x0000_s1116" name="Equation" r:id="rId3" imgW="812520" imgH="393480" progId="Equation.3">
+                <p:oleObj spid="_x0000_s1120" name="Equation" r:id="rId3" imgW="812520" imgH="393480" progId="Equation.3">
                   <p:embed/>
                 </p:oleObj>
               </mc:Choice>
@@ -7599,7 +7601,7 @@
           <a:graphicData uri="http://schemas.openxmlformats.org/presentationml/2006/ole">
             <mc:AlternateContent xmlns:mc="http://schemas.openxmlformats.org/markup-compatibility/2006">
               <mc:Choice xmlns:v="urn:schemas-microsoft-com:vml" Requires="v">
-                <p:oleObj spid="_x0000_s1117" name="Equation" r:id="rId5" imgW="2489040" imgH="431640" progId="Equation.3">
+                <p:oleObj spid="_x0000_s1121" name="Equation" r:id="rId5" imgW="2489040" imgH="431640" progId="Equation.3">
                   <p:embed/>
                 </p:oleObj>
               </mc:Choice>
@@ -18820,7 +18822,7 @@
           <a:graphicData uri="http://schemas.openxmlformats.org/presentationml/2006/ole">
             <mc:AlternateContent xmlns:mc="http://schemas.openxmlformats.org/markup-compatibility/2006">
               <mc:Choice xmlns:v="urn:schemas-microsoft-com:vml" Requires="v">
-                <p:oleObj spid="_x0000_s2105" name="Equation" r:id="rId3" imgW="1091880" imgH="1041120" progId="Equation.3">
+                <p:oleObj spid="_x0000_s2109" name="Equation" r:id="rId3" imgW="1091880" imgH="1041120" progId="Equation.3">
                   <p:embed/>
                 </p:oleObj>
               </mc:Choice>
@@ -20191,7 +20193,7 @@
           <a:graphicData uri="http://schemas.openxmlformats.org/presentationml/2006/ole">
             <mc:AlternateContent xmlns:mc="http://schemas.openxmlformats.org/markup-compatibility/2006">
               <mc:Choice xmlns:v="urn:schemas-microsoft-com:vml" Requires="v">
-                <p:oleObj spid="_x0000_s2106" name="Equation" r:id="rId5" imgW="1091880" imgH="1041120" progId="Equation.3">
+                <p:oleObj spid="_x0000_s2110" name="Equation" r:id="rId5" imgW="1091880" imgH="1041120" progId="Equation.3">
                   <p:embed/>
                 </p:oleObj>
               </mc:Choice>
@@ -22894,7 +22896,7 @@
           <a:p>
             <a:r>
               <a:rPr lang="en-US" dirty="0" smtClean="0"/>
-              <a:t>CPU</a:t>
+              <a:t>Cache associativity</a:t>
             </a:r>
             <a:endParaRPr lang="nl-BE" dirty="0"/>
           </a:p>
@@ -22902,12 +22904,12 @@
       </p:sp>
       <p:sp>
         <p:nvSpPr>
-          <p:cNvPr id="3" name="Text Placeholder 2"/>
+          <p:cNvPr id="3" name="Content Placeholder 2"/>
           <p:cNvSpPr>
             <a:spLocks noGrp="1"/>
           </p:cNvSpPr>
           <p:nvPr>
-            <p:ph type="body" idx="1"/>
+            <p:ph idx="1"/>
           </p:nvPr>
         </p:nvSpPr>
         <p:spPr/>
@@ -22945,7 +22947,7 @@
     </p:spTree>
     <p:extLst>
       <p:ext uri="{BB962C8B-B14F-4D97-AF65-F5344CB8AC3E}">
-        <p14:creationId xmlns:p14="http://schemas.microsoft.com/office/powerpoint/2010/main" val="818805559"/>
+        <p14:creationId xmlns:p14="http://schemas.microsoft.com/office/powerpoint/2010/main" val="3560811977"/>
       </p:ext>
     </p:extLst>
   </p:cSld>
@@ -22989,6 +22991,101 @@
           <a:p>
             <a:r>
               <a:rPr lang="en-US" dirty="0" smtClean="0"/>
+              <a:t>CPU</a:t>
+            </a:r>
+            <a:endParaRPr lang="nl-BE" dirty="0"/>
+          </a:p>
+        </p:txBody>
+      </p:sp>
+      <p:sp>
+        <p:nvSpPr>
+          <p:cNvPr id="3" name="Text Placeholder 2"/>
+          <p:cNvSpPr>
+            <a:spLocks noGrp="1"/>
+          </p:cNvSpPr>
+          <p:nvPr>
+            <p:ph type="body" idx="1"/>
+          </p:nvPr>
+        </p:nvSpPr>
+        <p:spPr/>
+        <p:txBody>
+          <a:bodyPr/>
+          <a:lstStyle/>
+          <a:p>
+            <a:endParaRPr lang="nl-BE"/>
+          </a:p>
+        </p:txBody>
+      </p:sp>
+      <p:sp>
+        <p:nvSpPr>
+          <p:cNvPr id="4" name="Slide Number Placeholder 3"/>
+          <p:cNvSpPr>
+            <a:spLocks noGrp="1"/>
+          </p:cNvSpPr>
+          <p:nvPr>
+            <p:ph type="sldNum" sz="quarter" idx="12"/>
+          </p:nvPr>
+        </p:nvSpPr>
+        <p:spPr/>
+        <p:txBody>
+          <a:bodyPr/>
+          <a:lstStyle/>
+          <a:p>
+            <a:fld id="{6597116C-F94B-4B5B-973A-17F07FB5C418}" type="slidenum">
+              <a:rPr lang="nl-BE" smtClean="0"/>
+              <a:t>24</a:t>
+            </a:fld>
+            <a:endParaRPr lang="nl-BE"/>
+          </a:p>
+        </p:txBody>
+      </p:sp>
+    </p:spTree>
+    <p:extLst>
+      <p:ext uri="{BB962C8B-B14F-4D97-AF65-F5344CB8AC3E}">
+        <p14:creationId xmlns:p14="http://schemas.microsoft.com/office/powerpoint/2010/main" val="818805559"/>
+      </p:ext>
+    </p:extLst>
+  </p:cSld>
+  <p:clrMapOvr>
+    <a:masterClrMapping/>
+  </p:clrMapOvr>
+</p:sld>
+</file>
+
+<file path=ppt/slides/slide25.xml><?xml version="1.0" encoding="utf-8"?>
+<p:sld xmlns:a="http://schemas.openxmlformats.org/drawingml/2006/main" xmlns:r="http://schemas.openxmlformats.org/officeDocument/2006/relationships" xmlns:p="http://schemas.openxmlformats.org/presentationml/2006/main">
+  <p:cSld>
+    <p:spTree>
+      <p:nvGrpSpPr>
+        <p:cNvPr id="1" name=""/>
+        <p:cNvGrpSpPr/>
+        <p:nvPr/>
+      </p:nvGrpSpPr>
+      <p:grpSpPr>
+        <a:xfrm>
+          <a:off x="0" y="0"/>
+          <a:ext cx="0" cy="0"/>
+          <a:chOff x="0" y="0"/>
+          <a:chExt cx="0" cy="0"/>
+        </a:xfrm>
+      </p:grpSpPr>
+      <p:sp>
+        <p:nvSpPr>
+          <p:cNvPr id="2" name="Title 1"/>
+          <p:cNvSpPr>
+            <a:spLocks noGrp="1"/>
+          </p:cNvSpPr>
+          <p:nvPr>
+            <p:ph type="title"/>
+          </p:nvPr>
+        </p:nvSpPr>
+        <p:spPr/>
+        <p:txBody>
+          <a:bodyPr/>
+          <a:lstStyle/>
+          <a:p>
+            <a:r>
+              <a:rPr lang="en-US" dirty="0" smtClean="0"/>
               <a:t>Vectorization</a:t>
             </a:r>
             <a:endParaRPr lang="en-US" dirty="0"/>
@@ -23066,7 +23163,7 @@
           <a:p>
             <a:fld id="{6597116C-F94B-4B5B-973A-17F07FB5C418}" type="slidenum">
               <a:rPr lang="nl-BE" smtClean="0"/>
-              <a:t>24</a:t>
+              <a:t>25</a:t>
             </a:fld>
             <a:endParaRPr lang="nl-BE"/>
           </a:p>
@@ -23846,7 +23943,7 @@
 </p:sld>
 </file>
 
-<file path=ppt/slides/slide25.xml><?xml version="1.0" encoding="utf-8"?>
+<file path=ppt/slides/slide26.xml><?xml version="1.0" encoding="utf-8"?>
 <p:sld xmlns:a="http://schemas.openxmlformats.org/drawingml/2006/main" xmlns:r="http://schemas.openxmlformats.org/officeDocument/2006/relationships" xmlns:p="http://schemas.openxmlformats.org/presentationml/2006/main">
   <p:cSld>
     <p:spTree>
@@ -23966,7 +24063,7 @@
           <a:p>
             <a:fld id="{6597116C-F94B-4B5B-973A-17F07FB5C418}" type="slidenum">
               <a:rPr lang="nl-BE" smtClean="0"/>
-              <a:t>25</a:t>
+              <a:t>26</a:t>
             </a:fld>
             <a:endParaRPr lang="nl-BE"/>
           </a:p>
@@ -24353,7 +24450,7 @@
 </p:sld>
 </file>
 
-<file path=ppt/slides/slide26.xml><?xml version="1.0" encoding="utf-8"?>
+<file path=ppt/slides/slide27.xml><?xml version="1.0" encoding="utf-8"?>
 <p:sld xmlns:a="http://schemas.openxmlformats.org/drawingml/2006/main" xmlns:r="http://schemas.openxmlformats.org/officeDocument/2006/relationships" xmlns:p="http://schemas.openxmlformats.org/presentationml/2006/main">
   <p:cSld>
     <p:spTree>
@@ -24387,7 +24484,7 @@
           <a:p>
             <a:r>
               <a:rPr lang="en-US" dirty="0" smtClean="0"/>
-              <a:t>Appendix</a:t>
+              <a:t>References</a:t>
             </a:r>
             <a:endParaRPr lang="nl-BE" dirty="0"/>
           </a:p>
@@ -24429,7 +24526,102 @@
           <a:p>
             <a:fld id="{6597116C-F94B-4B5B-973A-17F07FB5C418}" type="slidenum">
               <a:rPr lang="nl-BE" smtClean="0"/>
-              <a:t>26</a:t>
+              <a:t>27</a:t>
+            </a:fld>
+            <a:endParaRPr lang="nl-BE"/>
+          </a:p>
+        </p:txBody>
+      </p:sp>
+    </p:spTree>
+    <p:extLst>
+      <p:ext uri="{BB962C8B-B14F-4D97-AF65-F5344CB8AC3E}">
+        <p14:creationId xmlns:p14="http://schemas.microsoft.com/office/powerpoint/2010/main" val="1387657132"/>
+      </p:ext>
+    </p:extLst>
+  </p:cSld>
+  <p:clrMapOvr>
+    <a:masterClrMapping/>
+  </p:clrMapOvr>
+</p:sld>
+</file>
+
+<file path=ppt/slides/slide28.xml><?xml version="1.0" encoding="utf-8"?>
+<p:sld xmlns:a="http://schemas.openxmlformats.org/drawingml/2006/main" xmlns:r="http://schemas.openxmlformats.org/officeDocument/2006/relationships" xmlns:p="http://schemas.openxmlformats.org/presentationml/2006/main">
+  <p:cSld>
+    <p:spTree>
+      <p:nvGrpSpPr>
+        <p:cNvPr id="1" name=""/>
+        <p:cNvGrpSpPr/>
+        <p:nvPr/>
+      </p:nvGrpSpPr>
+      <p:grpSpPr>
+        <a:xfrm>
+          <a:off x="0" y="0"/>
+          <a:ext cx="0" cy="0"/>
+          <a:chOff x="0" y="0"/>
+          <a:chExt cx="0" cy="0"/>
+        </a:xfrm>
+      </p:grpSpPr>
+      <p:sp>
+        <p:nvSpPr>
+          <p:cNvPr id="2" name="Title 1"/>
+          <p:cNvSpPr>
+            <a:spLocks noGrp="1"/>
+          </p:cNvSpPr>
+          <p:nvPr>
+            <p:ph type="title"/>
+          </p:nvPr>
+        </p:nvSpPr>
+        <p:spPr/>
+        <p:txBody>
+          <a:bodyPr/>
+          <a:lstStyle/>
+          <a:p>
+            <a:r>
+              <a:rPr lang="en-US" dirty="0" smtClean="0"/>
+              <a:t>Appendix</a:t>
+            </a:r>
+            <a:endParaRPr lang="nl-BE" dirty="0"/>
+          </a:p>
+        </p:txBody>
+      </p:sp>
+      <p:sp>
+        <p:nvSpPr>
+          <p:cNvPr id="3" name="Text Placeholder 2"/>
+          <p:cNvSpPr>
+            <a:spLocks noGrp="1"/>
+          </p:cNvSpPr>
+          <p:nvPr>
+            <p:ph type="body" idx="1"/>
+          </p:nvPr>
+        </p:nvSpPr>
+        <p:spPr/>
+        <p:txBody>
+          <a:bodyPr/>
+          <a:lstStyle/>
+          <a:p>
+            <a:endParaRPr lang="nl-BE"/>
+          </a:p>
+        </p:txBody>
+      </p:sp>
+      <p:sp>
+        <p:nvSpPr>
+          <p:cNvPr id="4" name="Slide Number Placeholder 3"/>
+          <p:cNvSpPr>
+            <a:spLocks noGrp="1"/>
+          </p:cNvSpPr>
+          <p:nvPr>
+            <p:ph type="sldNum" sz="quarter" idx="12"/>
+          </p:nvPr>
+        </p:nvSpPr>
+        <p:spPr/>
+        <p:txBody>
+          <a:bodyPr/>
+          <a:lstStyle/>
+          <a:p>
+            <a:fld id="{6597116C-F94B-4B5B-973A-17F07FB5C418}" type="slidenum">
+              <a:rPr lang="nl-BE" smtClean="0"/>
+              <a:t>28</a:t>
             </a:fld>
             <a:endParaRPr lang="nl-BE"/>
           </a:p>
@@ -24448,7 +24640,7 @@
 </p:sld>
 </file>
 
-<file path=ppt/slides/slide27.xml><?xml version="1.0" encoding="utf-8"?>
+<file path=ppt/slides/slide29.xml><?xml version="1.0" encoding="utf-8"?>
 <p:sld xmlns:a="http://schemas.openxmlformats.org/drawingml/2006/main" xmlns:r="http://schemas.openxmlformats.org/officeDocument/2006/relationships" xmlns:p="http://schemas.openxmlformats.org/presentationml/2006/main">
   <p:cSld>
     <p:spTree>
@@ -26232,7 +26424,7 @@
           <a:p>
             <a:fld id="{6597116C-F94B-4B5B-973A-17F07FB5C418}" type="slidenum">
               <a:rPr lang="nl-BE" smtClean="0"/>
-              <a:t>27</a:t>
+              <a:t>29</a:t>
             </a:fld>
             <a:endParaRPr lang="nl-BE"/>
           </a:p>
@@ -26377,251 +26569,6 @@
 </p:sld>
 </file>
 
-<file path=ppt/slides/slide28.xml><?xml version="1.0" encoding="utf-8"?>
-<p:sld xmlns:a="http://schemas.openxmlformats.org/drawingml/2006/main" xmlns:r="http://schemas.openxmlformats.org/officeDocument/2006/relationships" xmlns:p="http://schemas.openxmlformats.org/presentationml/2006/main">
-  <p:cSld>
-    <p:spTree>
-      <p:nvGrpSpPr>
-        <p:cNvPr id="1" name=""/>
-        <p:cNvGrpSpPr/>
-        <p:nvPr/>
-      </p:nvGrpSpPr>
-      <p:grpSpPr>
-        <a:xfrm>
-          <a:off x="0" y="0"/>
-          <a:ext cx="0" cy="0"/>
-          <a:chOff x="0" y="0"/>
-          <a:chExt cx="0" cy="0"/>
-        </a:xfrm>
-      </p:grpSpPr>
-      <p:sp>
-        <p:nvSpPr>
-          <p:cNvPr id="2" name="Title 1"/>
-          <p:cNvSpPr>
-            <a:spLocks noGrp="1"/>
-          </p:cNvSpPr>
-          <p:nvPr>
-            <p:ph type="title"/>
-          </p:nvPr>
-        </p:nvSpPr>
-        <p:spPr/>
-        <p:txBody>
-          <a:bodyPr/>
-          <a:lstStyle/>
-          <a:p>
-            <a:r>
-              <a:rPr lang="en-US" dirty="0" smtClean="0"/>
-              <a:t>Bandwidth</a:t>
-            </a:r>
-            <a:endParaRPr lang="nl-BE" dirty="0"/>
-          </a:p>
-        </p:txBody>
-      </p:sp>
-      <p:sp>
-        <p:nvSpPr>
-          <p:cNvPr id="4" name="Content Placeholder 3"/>
-          <p:cNvSpPr>
-            <a:spLocks noGrp="1"/>
-          </p:cNvSpPr>
-          <p:nvPr>
-            <p:ph idx="1"/>
-          </p:nvPr>
-        </p:nvSpPr>
-        <p:spPr/>
-        <p:txBody>
-          <a:bodyPr>
-            <a:normAutofit fontScale="62500" lnSpcReduction="20000"/>
-          </a:bodyPr>
-          <a:lstStyle/>
-          <a:p>
-            <a:r>
-              <a:rPr lang="en-US" dirty="0" smtClean="0"/>
-              <a:t>RAM</a:t>
-            </a:r>
-          </a:p>
-          <a:p>
-            <a:pPr lvl="1"/>
-            <a:r>
-              <a:rPr lang="en-US" dirty="0" err="1" smtClean="0"/>
-              <a:t>ivybridge</a:t>
-            </a:r>
-            <a:r>
-              <a:rPr lang="en-US" dirty="0" smtClean="0"/>
-              <a:t> (dual socket, 10 core): 93 </a:t>
-            </a:r>
-            <a:r>
-              <a:rPr lang="en-US" dirty="0" smtClean="0"/>
-              <a:t>GB/s</a:t>
-            </a:r>
-          </a:p>
-          <a:p>
-            <a:pPr lvl="1"/>
-            <a:r>
-              <a:rPr lang="en-US" dirty="0" err="1"/>
-              <a:t>h</a:t>
-            </a:r>
-            <a:r>
-              <a:rPr lang="en-US" dirty="0" err="1" smtClean="0"/>
-              <a:t>aswell</a:t>
-            </a:r>
-            <a:r>
-              <a:rPr lang="en-US" dirty="0" smtClean="0"/>
-              <a:t> (dual socket, 12 core): 110 GB/s</a:t>
-            </a:r>
-          </a:p>
-          <a:p>
-            <a:pPr lvl="1"/>
-            <a:r>
-              <a:rPr lang="en-US" dirty="0" err="1" smtClean="0"/>
-              <a:t>broadwell</a:t>
-            </a:r>
-            <a:r>
-              <a:rPr lang="en-US" dirty="0" smtClean="0"/>
-              <a:t> (dual socket, 14 core): 125 GB/s</a:t>
-            </a:r>
-          </a:p>
-          <a:p>
-            <a:r>
-              <a:rPr lang="en-US" dirty="0"/>
-              <a:t>QPI</a:t>
-            </a:r>
-          </a:p>
-          <a:p>
-            <a:pPr lvl="1"/>
-            <a:r>
-              <a:rPr lang="en-US" dirty="0" err="1"/>
-              <a:t>ivybridge</a:t>
-            </a:r>
-            <a:r>
-              <a:rPr lang="en-US" dirty="0"/>
-              <a:t>: 25 </a:t>
-            </a:r>
-            <a:r>
-              <a:rPr lang="en-US" dirty="0" smtClean="0"/>
-              <a:t>GB/s</a:t>
-            </a:r>
-          </a:p>
-          <a:p>
-            <a:pPr lvl="1"/>
-            <a:r>
-              <a:rPr lang="en-US" dirty="0" err="1" smtClean="0"/>
-              <a:t>haswell</a:t>
-            </a:r>
-            <a:r>
-              <a:rPr lang="en-US" dirty="0" smtClean="0"/>
-              <a:t>: 30 GB/s</a:t>
-            </a:r>
-            <a:endParaRPr lang="nl-BE" dirty="0"/>
-          </a:p>
-          <a:p>
-            <a:pPr lvl="1"/>
-            <a:r>
-              <a:rPr lang="nl-BE" dirty="0" err="1"/>
-              <a:t>broadwell</a:t>
-            </a:r>
-            <a:r>
-              <a:rPr lang="nl-BE" dirty="0"/>
-              <a:t>: 30 </a:t>
-            </a:r>
-            <a:r>
-              <a:rPr lang="nl-BE" dirty="0" smtClean="0"/>
-              <a:t>GB/s</a:t>
-            </a:r>
-            <a:endParaRPr lang="en-US" dirty="0" smtClean="0"/>
-          </a:p>
-          <a:p>
-            <a:r>
-              <a:rPr lang="en-US" dirty="0" smtClean="0"/>
-              <a:t>GPGPU RAM (GDDR5@750MHz): 48.0 GB/s</a:t>
-            </a:r>
-          </a:p>
-          <a:p>
-            <a:r>
-              <a:rPr lang="en-US" dirty="0" smtClean="0"/>
-              <a:t>SATA revision 3: 0.6 GB/s</a:t>
-            </a:r>
-          </a:p>
-          <a:p>
-            <a:r>
-              <a:rPr lang="en-US" dirty="0" smtClean="0"/>
-              <a:t>SATA revision 3.2: 2.0 GB/s</a:t>
-            </a:r>
-          </a:p>
-          <a:p>
-            <a:r>
-              <a:rPr lang="en-US" dirty="0" smtClean="0"/>
-              <a:t>SAS 3: 1.2 GB/s</a:t>
-            </a:r>
-          </a:p>
-          <a:p>
-            <a:r>
-              <a:rPr lang="en-US" dirty="0" smtClean="0"/>
-              <a:t>PCI </a:t>
-            </a:r>
-            <a:r>
-              <a:rPr lang="en-US" dirty="0" smtClean="0"/>
-              <a:t>Express 3.0: 31.5 GB/s</a:t>
-            </a:r>
-          </a:p>
-          <a:p>
-            <a:r>
-              <a:rPr lang="en-US" dirty="0" err="1" smtClean="0"/>
-              <a:t>Infiniband</a:t>
-            </a:r>
-            <a:r>
-              <a:rPr lang="en-US" dirty="0" smtClean="0"/>
-              <a:t> QDR 4x: 4.0 GB/s</a:t>
-            </a:r>
-          </a:p>
-          <a:p>
-            <a:r>
-              <a:rPr lang="en-US" dirty="0" err="1" smtClean="0"/>
-              <a:t>Infiniband</a:t>
-            </a:r>
-            <a:r>
-              <a:rPr lang="en-US" dirty="0" smtClean="0"/>
-              <a:t> EDR 4x: 12.5 GB/s</a:t>
-            </a:r>
-            <a:endParaRPr lang="nl-BE" dirty="0"/>
-          </a:p>
-        </p:txBody>
-      </p:sp>
-      <p:sp>
-        <p:nvSpPr>
-          <p:cNvPr id="3" name="Slide Number Placeholder 2"/>
-          <p:cNvSpPr>
-            <a:spLocks noGrp="1"/>
-          </p:cNvSpPr>
-          <p:nvPr>
-            <p:ph type="sldNum" sz="quarter" idx="12"/>
-          </p:nvPr>
-        </p:nvSpPr>
-        <p:spPr/>
-        <p:txBody>
-          <a:bodyPr/>
-          <a:lstStyle/>
-          <a:p>
-            <a:fld id="{6597116C-F94B-4B5B-973A-17F07FB5C418}" type="slidenum">
-              <a:rPr lang="nl-BE" smtClean="0"/>
-              <a:t>28</a:t>
-            </a:fld>
-            <a:endParaRPr lang="nl-BE"/>
-          </a:p>
-        </p:txBody>
-      </p:sp>
-    </p:spTree>
-    <p:extLst>
-      <p:ext uri="{BB962C8B-B14F-4D97-AF65-F5344CB8AC3E}">
-        <p14:creationId xmlns:p14="http://schemas.microsoft.com/office/powerpoint/2010/main" val="3254066855"/>
-      </p:ext>
-    </p:extLst>
-  </p:cSld>
-  <p:clrMapOvr>
-    <a:masterClrMapping/>
-  </p:clrMapOvr>
-</p:sld>
-</file>
-
 <file path=ppt/slides/slide3.xml><?xml version="1.0" encoding="utf-8"?>
 <p:sld xmlns:a="http://schemas.openxmlformats.org/drawingml/2006/main" xmlns:r="http://schemas.openxmlformats.org/officeDocument/2006/relationships" xmlns:p="http://schemas.openxmlformats.org/presentationml/2006/main">
   <p:cSld>
@@ -26721,6 +26668,251 @@
       </p:par>
     </p:tnLst>
   </p:timing>
+</p:sld>
+</file>
+
+<file path=ppt/slides/slide30.xml><?xml version="1.0" encoding="utf-8"?>
+<p:sld xmlns:a="http://schemas.openxmlformats.org/drawingml/2006/main" xmlns:r="http://schemas.openxmlformats.org/officeDocument/2006/relationships" xmlns:p="http://schemas.openxmlformats.org/presentationml/2006/main">
+  <p:cSld>
+    <p:spTree>
+      <p:nvGrpSpPr>
+        <p:cNvPr id="1" name=""/>
+        <p:cNvGrpSpPr/>
+        <p:nvPr/>
+      </p:nvGrpSpPr>
+      <p:grpSpPr>
+        <a:xfrm>
+          <a:off x="0" y="0"/>
+          <a:ext cx="0" cy="0"/>
+          <a:chOff x="0" y="0"/>
+          <a:chExt cx="0" cy="0"/>
+        </a:xfrm>
+      </p:grpSpPr>
+      <p:sp>
+        <p:nvSpPr>
+          <p:cNvPr id="2" name="Title 1"/>
+          <p:cNvSpPr>
+            <a:spLocks noGrp="1"/>
+          </p:cNvSpPr>
+          <p:nvPr>
+            <p:ph type="title"/>
+          </p:nvPr>
+        </p:nvSpPr>
+        <p:spPr/>
+        <p:txBody>
+          <a:bodyPr/>
+          <a:lstStyle/>
+          <a:p>
+            <a:r>
+              <a:rPr lang="en-US" dirty="0" smtClean="0"/>
+              <a:t>Bandwidth</a:t>
+            </a:r>
+            <a:endParaRPr lang="nl-BE" dirty="0"/>
+          </a:p>
+        </p:txBody>
+      </p:sp>
+      <p:sp>
+        <p:nvSpPr>
+          <p:cNvPr id="4" name="Content Placeholder 3"/>
+          <p:cNvSpPr>
+            <a:spLocks noGrp="1"/>
+          </p:cNvSpPr>
+          <p:nvPr>
+            <p:ph idx="1"/>
+          </p:nvPr>
+        </p:nvSpPr>
+        <p:spPr/>
+        <p:txBody>
+          <a:bodyPr>
+            <a:normAutofit fontScale="62500" lnSpcReduction="20000"/>
+          </a:bodyPr>
+          <a:lstStyle/>
+          <a:p>
+            <a:r>
+              <a:rPr lang="en-US" dirty="0" smtClean="0"/>
+              <a:t>RAM</a:t>
+            </a:r>
+          </a:p>
+          <a:p>
+            <a:pPr lvl="1"/>
+            <a:r>
+              <a:rPr lang="en-US" dirty="0" err="1" smtClean="0"/>
+              <a:t>ivybridge</a:t>
+            </a:r>
+            <a:r>
+              <a:rPr lang="en-US" dirty="0" smtClean="0"/>
+              <a:t> (dual socket, 10 core): 93 </a:t>
+            </a:r>
+            <a:r>
+              <a:rPr lang="en-US" dirty="0" smtClean="0"/>
+              <a:t>GB/s</a:t>
+            </a:r>
+          </a:p>
+          <a:p>
+            <a:pPr lvl="1"/>
+            <a:r>
+              <a:rPr lang="en-US" dirty="0" err="1"/>
+              <a:t>h</a:t>
+            </a:r>
+            <a:r>
+              <a:rPr lang="en-US" dirty="0" err="1" smtClean="0"/>
+              <a:t>aswell</a:t>
+            </a:r>
+            <a:r>
+              <a:rPr lang="en-US" dirty="0" smtClean="0"/>
+              <a:t> (dual socket, 12 core): 110 GB/s</a:t>
+            </a:r>
+          </a:p>
+          <a:p>
+            <a:pPr lvl="1"/>
+            <a:r>
+              <a:rPr lang="en-US" dirty="0" err="1" smtClean="0"/>
+              <a:t>broadwell</a:t>
+            </a:r>
+            <a:r>
+              <a:rPr lang="en-US" dirty="0" smtClean="0"/>
+              <a:t> (dual socket, 14 core): 125 GB/s</a:t>
+            </a:r>
+          </a:p>
+          <a:p>
+            <a:r>
+              <a:rPr lang="en-US" dirty="0"/>
+              <a:t>QPI</a:t>
+            </a:r>
+          </a:p>
+          <a:p>
+            <a:pPr lvl="1"/>
+            <a:r>
+              <a:rPr lang="en-US" dirty="0" err="1"/>
+              <a:t>ivybridge</a:t>
+            </a:r>
+            <a:r>
+              <a:rPr lang="en-US" dirty="0"/>
+              <a:t>: 25 </a:t>
+            </a:r>
+            <a:r>
+              <a:rPr lang="en-US" dirty="0" smtClean="0"/>
+              <a:t>GB/s</a:t>
+            </a:r>
+          </a:p>
+          <a:p>
+            <a:pPr lvl="1"/>
+            <a:r>
+              <a:rPr lang="en-US" dirty="0" err="1" smtClean="0"/>
+              <a:t>haswell</a:t>
+            </a:r>
+            <a:r>
+              <a:rPr lang="en-US" dirty="0" smtClean="0"/>
+              <a:t>: 30 GB/s</a:t>
+            </a:r>
+            <a:endParaRPr lang="nl-BE" dirty="0"/>
+          </a:p>
+          <a:p>
+            <a:pPr lvl="1"/>
+            <a:r>
+              <a:rPr lang="nl-BE" dirty="0" err="1"/>
+              <a:t>broadwell</a:t>
+            </a:r>
+            <a:r>
+              <a:rPr lang="nl-BE" dirty="0"/>
+              <a:t>: 30 </a:t>
+            </a:r>
+            <a:r>
+              <a:rPr lang="nl-BE" dirty="0" smtClean="0"/>
+              <a:t>GB/s</a:t>
+            </a:r>
+            <a:endParaRPr lang="en-US" dirty="0" smtClean="0"/>
+          </a:p>
+          <a:p>
+            <a:r>
+              <a:rPr lang="en-US" dirty="0" smtClean="0"/>
+              <a:t>GPGPU RAM (GDDR5@750MHz): 48.0 GB/s</a:t>
+            </a:r>
+          </a:p>
+          <a:p>
+            <a:r>
+              <a:rPr lang="en-US" dirty="0" smtClean="0"/>
+              <a:t>SATA revision 3: 0.6 GB/s</a:t>
+            </a:r>
+          </a:p>
+          <a:p>
+            <a:r>
+              <a:rPr lang="en-US" dirty="0" smtClean="0"/>
+              <a:t>SATA revision 3.2: 2.0 GB/s</a:t>
+            </a:r>
+          </a:p>
+          <a:p>
+            <a:r>
+              <a:rPr lang="en-US" dirty="0" smtClean="0"/>
+              <a:t>SAS 3: 1.2 GB/s</a:t>
+            </a:r>
+          </a:p>
+          <a:p>
+            <a:r>
+              <a:rPr lang="en-US" dirty="0" smtClean="0"/>
+              <a:t>PCI </a:t>
+            </a:r>
+            <a:r>
+              <a:rPr lang="en-US" dirty="0" smtClean="0"/>
+              <a:t>Express 3.0: 31.5 GB/s</a:t>
+            </a:r>
+          </a:p>
+          <a:p>
+            <a:r>
+              <a:rPr lang="en-US" dirty="0" err="1" smtClean="0"/>
+              <a:t>Infiniband</a:t>
+            </a:r>
+            <a:r>
+              <a:rPr lang="en-US" dirty="0" smtClean="0"/>
+              <a:t> QDR 4x: 4.0 GB/s</a:t>
+            </a:r>
+          </a:p>
+          <a:p>
+            <a:r>
+              <a:rPr lang="en-US" dirty="0" err="1" smtClean="0"/>
+              <a:t>Infiniband</a:t>
+            </a:r>
+            <a:r>
+              <a:rPr lang="en-US" dirty="0" smtClean="0"/>
+              <a:t> EDR 4x: 12.5 GB/s</a:t>
+            </a:r>
+            <a:endParaRPr lang="nl-BE" dirty="0"/>
+          </a:p>
+        </p:txBody>
+      </p:sp>
+      <p:sp>
+        <p:nvSpPr>
+          <p:cNvPr id="3" name="Slide Number Placeholder 2"/>
+          <p:cNvSpPr>
+            <a:spLocks noGrp="1"/>
+          </p:cNvSpPr>
+          <p:nvPr>
+            <p:ph type="sldNum" sz="quarter" idx="12"/>
+          </p:nvPr>
+        </p:nvSpPr>
+        <p:spPr/>
+        <p:txBody>
+          <a:bodyPr/>
+          <a:lstStyle/>
+          <a:p>
+            <a:fld id="{6597116C-F94B-4B5B-973A-17F07FB5C418}" type="slidenum">
+              <a:rPr lang="nl-BE" smtClean="0"/>
+              <a:t>30</a:t>
+            </a:fld>
+            <a:endParaRPr lang="nl-BE"/>
+          </a:p>
+        </p:txBody>
+      </p:sp>
+    </p:spTree>
+    <p:extLst>
+      <p:ext uri="{BB962C8B-B14F-4D97-AF65-F5344CB8AC3E}">
+        <p14:creationId xmlns:p14="http://schemas.microsoft.com/office/powerpoint/2010/main" val="3254066855"/>
+      </p:ext>
+    </p:extLst>
+  </p:cSld>
+  <p:clrMapOvr>
+    <a:masterClrMapping/>
+  </p:clrMapOvr>
 </p:sld>
 </file>
 

</xml_diff>

<commit_message>
Added introduction slide; slide on cache associativity
</commit_message>
<xml_diff>
--- a/Optimization/hpc_efficiency.pptx
+++ b/Optimization/hpc_efficiency.pptx
@@ -5,12 +5,12 @@
     <p:sldMasterId id="2147483648" r:id="rId1"/>
   </p:sldMasterIdLst>
   <p:notesMasterIdLst>
-    <p:notesMasterId r:id="rId38"/>
+    <p:notesMasterId r:id="rId39"/>
   </p:notesMasterIdLst>
   <p:sldIdLst>
     <p:sldId id="267" r:id="rId2"/>
     <p:sldId id="293" r:id="rId3"/>
-    <p:sldId id="294" r:id="rId4"/>
+    <p:sldId id="295" r:id="rId4"/>
     <p:sldId id="282" r:id="rId5"/>
     <p:sldId id="268" r:id="rId6"/>
     <p:sldId id="257" r:id="rId7"/>
@@ -33,17 +33,18 @@
     <p:sldId id="280" r:id="rId24"/>
     <p:sldId id="278" r:id="rId25"/>
     <p:sldId id="288" r:id="rId26"/>
-    <p:sldId id="285" r:id="rId27"/>
-    <p:sldId id="275" r:id="rId28"/>
-    <p:sldId id="291" r:id="rId29"/>
-    <p:sldId id="290" r:id="rId30"/>
-    <p:sldId id="289" r:id="rId31"/>
-    <p:sldId id="281" r:id="rId32"/>
-    <p:sldId id="287" r:id="rId33"/>
-    <p:sldId id="292" r:id="rId34"/>
-    <p:sldId id="286" r:id="rId35"/>
-    <p:sldId id="271" r:id="rId36"/>
-    <p:sldId id="283" r:id="rId37"/>
+    <p:sldId id="296" r:id="rId27"/>
+    <p:sldId id="285" r:id="rId28"/>
+    <p:sldId id="275" r:id="rId29"/>
+    <p:sldId id="291" r:id="rId30"/>
+    <p:sldId id="290" r:id="rId31"/>
+    <p:sldId id="289" r:id="rId32"/>
+    <p:sldId id="281" r:id="rId33"/>
+    <p:sldId id="287" r:id="rId34"/>
+    <p:sldId id="292" r:id="rId35"/>
+    <p:sldId id="286" r:id="rId36"/>
+    <p:sldId id="271" r:id="rId37"/>
+    <p:sldId id="283" r:id="rId38"/>
   </p:sldIdLst>
   <p:sldSz cx="9144000" cy="6858000" type="screen4x3"/>
   <p:notesSz cx="6858000" cy="9144000"/>
@@ -271,11 +272,11 @@
           <c:showPercent val="0"/>
           <c:showBubbleSize val="0"/>
         </c:dLbls>
-        <c:axId val="196961808"/>
-        <c:axId val="197014888"/>
+        <c:axId val="182369824"/>
+        <c:axId val="182366152"/>
       </c:scatterChart>
       <c:valAx>
-        <c:axId val="196961808"/>
+        <c:axId val="182369824"/>
         <c:scaling>
           <c:logBase val="2"/>
           <c:orientation val="minMax"/>
@@ -287,14 +288,14 @@
         <c:majorTickMark val="out"/>
         <c:minorTickMark val="none"/>
         <c:tickLblPos val="nextTo"/>
-        <c:crossAx val="197014888"/>
+        <c:crossAx val="182366152"/>
         <c:crosses val="autoZero"/>
         <c:crossBetween val="midCat"/>
         <c:majorUnit val="4"/>
         <c:minorUnit val="4"/>
       </c:valAx>
       <c:valAx>
-        <c:axId val="197014888"/>
+        <c:axId val="182366152"/>
         <c:scaling>
           <c:logBase val="2"/>
           <c:orientation val="minMax"/>
@@ -307,7 +308,7 @@
         <c:majorTickMark val="out"/>
         <c:minorTickMark val="none"/>
         <c:tickLblPos val="nextTo"/>
-        <c:crossAx val="196961808"/>
+        <c:crossAx val="182369824"/>
         <c:crosses val="autoZero"/>
         <c:crossBetween val="midCat"/>
         <c:majorUnit val="4"/>
@@ -680,11 +681,11 @@
           <c:showPercent val="0"/>
           <c:showBubbleSize val="0"/>
         </c:dLbls>
-        <c:axId val="196621912"/>
-        <c:axId val="195003712"/>
+        <c:axId val="182460840"/>
+        <c:axId val="179763856"/>
       </c:scatterChart>
       <c:valAx>
-        <c:axId val="196621912"/>
+        <c:axId val="182460840"/>
         <c:scaling>
           <c:logBase val="2"/>
           <c:orientation val="minMax"/>
@@ -697,14 +698,14 @@
         <c:majorTickMark val="out"/>
         <c:minorTickMark val="none"/>
         <c:tickLblPos val="nextTo"/>
-        <c:crossAx val="195003712"/>
+        <c:crossAx val="179763856"/>
         <c:crosses val="autoZero"/>
         <c:crossBetween val="midCat"/>
         <c:majorUnit val="4"/>
         <c:minorUnit val="4"/>
       </c:valAx>
       <c:valAx>
-        <c:axId val="195003712"/>
+        <c:axId val="179763856"/>
         <c:scaling>
           <c:logBase val="2"/>
           <c:orientation val="minMax"/>
@@ -718,7 +719,7 @@
         <c:majorTickMark val="out"/>
         <c:minorTickMark val="none"/>
         <c:tickLblPos val="nextTo"/>
-        <c:crossAx val="196621912"/>
+        <c:crossAx val="182460840"/>
         <c:crosses val="autoZero"/>
         <c:crossBetween val="midCat"/>
         <c:majorUnit val="4"/>
@@ -932,11 +933,11 @@
           <c:showPercent val="0"/>
           <c:showBubbleSize val="0"/>
         </c:dLbls>
-        <c:axId val="194803136"/>
-        <c:axId val="194801960"/>
+        <c:axId val="179765032"/>
+        <c:axId val="179765424"/>
       </c:scatterChart>
       <c:valAx>
-        <c:axId val="194803136"/>
+        <c:axId val="179765032"/>
         <c:scaling>
           <c:logBase val="2"/>
           <c:orientation val="minMax"/>
@@ -949,13 +950,13 @@
         <c:majorTickMark val="out"/>
         <c:minorTickMark val="none"/>
         <c:tickLblPos val="nextTo"/>
-        <c:crossAx val="194801960"/>
+        <c:crossAx val="179765424"/>
         <c:crosses val="autoZero"/>
         <c:crossBetween val="midCat"/>
         <c:minorUnit val="4"/>
       </c:valAx>
       <c:valAx>
-        <c:axId val="194801960"/>
+        <c:axId val="179765424"/>
         <c:scaling>
           <c:logBase val="2"/>
           <c:orientation val="minMax"/>
@@ -969,7 +970,7 @@
         <c:majorTickMark val="out"/>
         <c:minorTickMark val="none"/>
         <c:tickLblPos val="nextTo"/>
-        <c:crossAx val="194803136"/>
+        <c:crossAx val="179765032"/>
         <c:crosses val="autoZero"/>
         <c:crossBetween val="midCat"/>
         <c:majorUnit val="2"/>
@@ -1101,11 +1102,11 @@
           <c:showPercent val="0"/>
           <c:showBubbleSize val="0"/>
         </c:dLbls>
-        <c:axId val="194801176"/>
-        <c:axId val="194800784"/>
+        <c:axId val="144723744"/>
+        <c:axId val="182608168"/>
       </c:scatterChart>
       <c:valAx>
-        <c:axId val="194801176"/>
+        <c:axId val="144723744"/>
         <c:scaling>
           <c:logBase val="2"/>
           <c:orientation val="minMax"/>
@@ -1118,13 +1119,13 @@
         <c:majorTickMark val="out"/>
         <c:minorTickMark val="none"/>
         <c:tickLblPos val="nextTo"/>
-        <c:crossAx val="194800784"/>
+        <c:crossAx val="182608168"/>
         <c:crosses val="autoZero"/>
         <c:crossBetween val="midCat"/>
         <c:majorUnit val="4"/>
       </c:valAx>
       <c:valAx>
-        <c:axId val="194800784"/>
+        <c:axId val="182608168"/>
         <c:scaling>
           <c:logBase val="2"/>
           <c:orientation val="minMax"/>
@@ -1137,7 +1138,7 @@
         <c:majorTickMark val="out"/>
         <c:minorTickMark val="none"/>
         <c:tickLblPos val="nextTo"/>
-        <c:crossAx val="194801176"/>
+        <c:crossAx val="144723744"/>
         <c:crosses val="autoZero"/>
         <c:crossBetween val="midCat"/>
         <c:majorUnit val="2"/>
@@ -1263,11 +1264,11 @@
           <c:showPercent val="0"/>
           <c:showBubbleSize val="0"/>
         </c:dLbls>
-        <c:axId val="194802744"/>
-        <c:axId val="197556960"/>
+        <c:axId val="182608952"/>
+        <c:axId val="182609344"/>
       </c:scatterChart>
       <c:valAx>
-        <c:axId val="194802744"/>
+        <c:axId val="182608952"/>
         <c:scaling>
           <c:logBase val="2"/>
           <c:orientation val="minMax"/>
@@ -1280,14 +1281,14 @@
         <c:majorTickMark val="out"/>
         <c:minorTickMark val="none"/>
         <c:tickLblPos val="nextTo"/>
-        <c:crossAx val="197556960"/>
+        <c:crossAx val="182609344"/>
         <c:crosses val="autoZero"/>
         <c:crossBetween val="midCat"/>
         <c:majorUnit val="4"/>
         <c:minorUnit val="4"/>
       </c:valAx>
       <c:valAx>
-        <c:axId val="197556960"/>
+        <c:axId val="182609344"/>
         <c:scaling>
           <c:orientation val="minMax"/>
           <c:max val="1"/>
@@ -1299,7 +1300,7 @@
         <c:majorTickMark val="out"/>
         <c:minorTickMark val="none"/>
         <c:tickLblPos val="nextTo"/>
-        <c:crossAx val="194802744"/>
+        <c:crossAx val="182608952"/>
         <c:crosses val="autoZero"/>
         <c:crossBetween val="midCat"/>
       </c:valAx>
@@ -1396,7 +1397,7 @@
           <a:p>
             <a:fld id="{2E6AAE95-D4FC-4D00-935A-EAE928727A56}" type="datetimeFigureOut">
               <a:rPr lang="en-US" smtClean="0"/>
-              <a:t>8/1/2016</a:t>
+              <a:t>8/2/2016</a:t>
             </a:fld>
             <a:endParaRPr lang="en-US"/>
           </a:p>
@@ -1929,7 +1930,7 @@
           <a:p>
             <a:fld id="{1CFF3F78-F57F-4409-A41B-5EC46D4F404B}" type="datetime1">
               <a:rPr lang="nl-BE" smtClean="0"/>
-              <a:t>2016-08-01</a:t>
+              <a:t>2016-08-02</a:t>
             </a:fld>
             <a:endParaRPr lang="nl-BE"/>
           </a:p>
@@ -2099,7 +2100,7 @@
           <a:p>
             <a:fld id="{7D029E61-52E3-412C-82EB-2F81B17C0AF1}" type="datetime1">
               <a:rPr lang="nl-BE" smtClean="0"/>
-              <a:t>2016-08-01</a:t>
+              <a:t>2016-08-02</a:t>
             </a:fld>
             <a:endParaRPr lang="nl-BE"/>
           </a:p>
@@ -2279,7 +2280,7 @@
           <a:p>
             <a:fld id="{A83F1CEF-A38E-4001-89C6-F3FC7784F299}" type="datetime1">
               <a:rPr lang="nl-BE" smtClean="0"/>
-              <a:t>2016-08-01</a:t>
+              <a:t>2016-08-02</a:t>
             </a:fld>
             <a:endParaRPr lang="nl-BE"/>
           </a:p>
@@ -2405,7 +2406,7 @@
           <a:p>
             <a:fld id="{1FDE84DB-AADA-4C3F-BF46-CA664A504479}" type="datetime1">
               <a:rPr lang="nl-BE" smtClean="0"/>
-              <a:t>2016-08-01</a:t>
+              <a:t>2016-08-02</a:t>
             </a:fld>
             <a:endParaRPr lang="nl-BE" dirty="0"/>
           </a:p>
@@ -2649,7 +2650,7 @@
           <a:p>
             <a:fld id="{8CD53A43-C15C-4F05-9AD7-DB9DE837084D}" type="datetime1">
               <a:rPr lang="nl-BE" smtClean="0"/>
-              <a:t>2016-08-01</a:t>
+              <a:t>2016-08-02</a:t>
             </a:fld>
             <a:endParaRPr lang="nl-BE"/>
           </a:p>
@@ -2895,7 +2896,7 @@
           <a:p>
             <a:fld id="{8994D238-D949-4AEF-9753-A8B6EFA964A0}" type="datetime1">
               <a:rPr lang="nl-BE" smtClean="0"/>
-              <a:t>2016-08-01</a:t>
+              <a:t>2016-08-02</a:t>
             </a:fld>
             <a:endParaRPr lang="nl-BE"/>
           </a:p>
@@ -3183,7 +3184,7 @@
           <a:p>
             <a:fld id="{4D234023-BF99-4AD0-835E-8125DA2B6664}" type="datetime1">
               <a:rPr lang="nl-BE" smtClean="0"/>
-              <a:t>2016-08-01</a:t>
+              <a:t>2016-08-02</a:t>
             </a:fld>
             <a:endParaRPr lang="nl-BE"/>
           </a:p>
@@ -3605,7 +3606,7 @@
           <a:p>
             <a:fld id="{DB075A73-5C1D-406E-9444-3C5C58580E8E}" type="datetime1">
               <a:rPr lang="nl-BE" smtClean="0"/>
-              <a:t>2016-08-01</a:t>
+              <a:t>2016-08-02</a:t>
             </a:fld>
             <a:endParaRPr lang="nl-BE"/>
           </a:p>
@@ -3723,7 +3724,7 @@
           <a:p>
             <a:fld id="{E111FB2D-2E17-4D8F-A64A-4EB0C3D12494}" type="datetime1">
               <a:rPr lang="nl-BE" smtClean="0"/>
-              <a:t>2016-08-01</a:t>
+              <a:t>2016-08-02</a:t>
             </a:fld>
             <a:endParaRPr lang="nl-BE"/>
           </a:p>
@@ -3818,7 +3819,7 @@
           <a:p>
             <a:fld id="{5BE27D71-2267-4E44-9F33-05B60E5C7D9D}" type="datetime1">
               <a:rPr lang="nl-BE" smtClean="0"/>
-              <a:t>2016-08-01</a:t>
+              <a:t>2016-08-02</a:t>
             </a:fld>
             <a:endParaRPr lang="nl-BE"/>
           </a:p>
@@ -4095,7 +4096,7 @@
           <a:p>
             <a:fld id="{182F587C-96C8-4813-A767-3084061A3229}" type="datetime1">
               <a:rPr lang="nl-BE" smtClean="0"/>
-              <a:t>2016-08-01</a:t>
+              <a:t>2016-08-02</a:t>
             </a:fld>
             <a:endParaRPr lang="nl-BE"/>
           </a:p>
@@ -4348,7 +4349,7 @@
           <a:p>
             <a:fld id="{8B021CF8-BBBB-4DFA-8713-49842AA07274}" type="datetime1">
               <a:rPr lang="nl-BE" smtClean="0"/>
-              <a:t>2016-08-01</a:t>
+              <a:t>2016-08-02</a:t>
             </a:fld>
             <a:endParaRPr lang="nl-BE"/>
           </a:p>
@@ -4561,7 +4562,7 @@
           <a:p>
             <a:fld id="{CDBFABB5-0AB3-4CB6-A705-6887DEB1F9F2}" type="datetime1">
               <a:rPr lang="nl-BE" smtClean="0"/>
-              <a:t>2016-08-01</a:t>
+              <a:t>2016-08-02</a:t>
             </a:fld>
             <a:endParaRPr lang="nl-BE"/>
           </a:p>
@@ -8552,6 +8553,13 @@
             <a:pPr lvl="1"/>
             <a:r>
               <a:rPr lang="en-US" dirty="0" smtClean="0"/>
+              <a:t>more complex phenomena</a:t>
+            </a:r>
+          </a:p>
+          <a:p>
+            <a:pPr lvl="1"/>
+            <a:r>
+              <a:rPr lang="en-US" dirty="0" smtClean="0"/>
               <a:t>…</a:t>
             </a:r>
             <a:endParaRPr lang="nl-BE" dirty="0"/>
@@ -8750,7 +8758,7 @@
           <a:graphicData uri="http://schemas.openxmlformats.org/presentationml/2006/ole">
             <mc:AlternateContent xmlns:mc="http://schemas.openxmlformats.org/markup-compatibility/2006">
               <mc:Choice xmlns:v="urn:schemas-microsoft-com:vml" Requires="v">
-                <p:oleObj spid="_x0000_s1128" name="Equation" r:id="rId3" imgW="812520" imgH="393480" progId="Equation.3">
+                <p:oleObj spid="_x0000_s1146" name="Equation" r:id="rId3" imgW="812520" imgH="393480" progId="Equation.3">
                   <p:embed/>
                 </p:oleObj>
               </mc:Choice>
@@ -8807,7 +8815,7 @@
           <a:graphicData uri="http://schemas.openxmlformats.org/presentationml/2006/ole">
             <mc:AlternateContent xmlns:mc="http://schemas.openxmlformats.org/markup-compatibility/2006">
               <mc:Choice xmlns:v="urn:schemas-microsoft-com:vml" Requires="v">
-                <p:oleObj spid="_x0000_s1129" name="Equation" r:id="rId5" imgW="2489040" imgH="431640" progId="Equation.3">
+                <p:oleObj spid="_x0000_s1147" name="Equation" r:id="rId5" imgW="2489040" imgH="431640" progId="Equation.3">
                   <p:embed/>
                 </p:oleObj>
               </mc:Choice>
@@ -19341,7 +19349,15 @@
           <a:p>
             <a:r>
               <a:rPr lang="en-US" dirty="0" smtClean="0"/>
-              <a:t>Ordering of 2D arrays</a:t>
+              <a:t>Ordering of </a:t>
+            </a:r>
+            <a:r>
+              <a:rPr lang="en-US" dirty="0" smtClean="0"/>
+              <a:t>2D/3D/… </a:t>
+            </a:r>
+            <a:r>
+              <a:rPr lang="en-US" dirty="0" smtClean="0"/>
+              <a:t>arrays</a:t>
             </a:r>
           </a:p>
           <a:p>
@@ -19410,7 +19426,7 @@
           <a:graphicData uri="http://schemas.openxmlformats.org/presentationml/2006/ole">
             <mc:AlternateContent xmlns:mc="http://schemas.openxmlformats.org/markup-compatibility/2006">
               <mc:Choice xmlns:v="urn:schemas-microsoft-com:vml" Requires="v">
-                <p:oleObj spid="_x0000_s2117" name="Equation" r:id="rId3" imgW="1091880" imgH="1041120" progId="Equation.3">
+                <p:oleObj spid="_x0000_s2137" name="Equation" r:id="rId3" imgW="1091880" imgH="1041120" progId="Equation.3">
                   <p:embed/>
                 </p:oleObj>
               </mc:Choice>
@@ -20781,7 +20797,7 @@
           <a:graphicData uri="http://schemas.openxmlformats.org/presentationml/2006/ole">
             <mc:AlternateContent xmlns:mc="http://schemas.openxmlformats.org/markup-compatibility/2006">
               <mc:Choice xmlns:v="urn:schemas-microsoft-com:vml" Requires="v">
-                <p:oleObj spid="_x0000_s2118" name="Equation" r:id="rId5" imgW="1091880" imgH="1041120" progId="Equation.3">
+                <p:oleObj spid="_x0000_s2138" name="Equation" r:id="rId5" imgW="1091880" imgH="1041120" progId="Equation.3">
                   <p:embed/>
                 </p:oleObj>
               </mc:Choice>
@@ -21148,6 +21164,48 @@
           </p:txBody>
         </p:sp>
       </p:grpSp>
+      <p:sp>
+        <p:nvSpPr>
+          <p:cNvPr id="46" name="TextBox 45"/>
+          <p:cNvSpPr txBox="1"/>
+          <p:nvPr/>
+        </p:nvSpPr>
+        <p:spPr>
+          <a:xfrm>
+            <a:off x="5255625" y="4412827"/>
+            <a:ext cx="3485634" cy="830997"/>
+          </a:xfrm>
+          <a:prstGeom prst="rect">
+            <a:avLst/>
+          </a:prstGeom>
+          <a:noFill/>
+          <a:ln>
+            <a:solidFill>
+              <a:schemeClr val="tx1"/>
+            </a:solidFill>
+          </a:ln>
+        </p:spPr>
+        <p:txBody>
+          <a:bodyPr wrap="none" rtlCol="0">
+            <a:spAutoFit/>
+          </a:bodyPr>
+          <a:lstStyle/>
+          <a:p>
+            <a:r>
+              <a:rPr lang="en-US" sz="2400" dirty="0" smtClean="0"/>
+              <a:t>Access in "wrong" order:</a:t>
+            </a:r>
+            <a:br>
+              <a:rPr lang="en-US" sz="2400" dirty="0" smtClean="0"/>
+            </a:br>
+            <a:r>
+              <a:rPr lang="en-US" sz="2400" dirty="0" smtClean="0"/>
+              <a:t>performance degradation!</a:t>
+            </a:r>
+            <a:endParaRPr lang="nl-BE" sz="2400" dirty="0"/>
+          </a:p>
+        </p:txBody>
+      </p:sp>
     </p:spTree>
     <p:extLst>
       <p:ext uri="{BB962C8B-B14F-4D97-AF65-F5344CB8AC3E}">
@@ -21436,6 +21494,51 @@
                       </p:childTnLst>
                     </p:cTn>
                   </p:par>
+                  <p:par>
+                    <p:cTn id="27" fill="hold">
+                      <p:stCondLst>
+                        <p:cond delay="indefinite"/>
+                      </p:stCondLst>
+                      <p:childTnLst>
+                        <p:par>
+                          <p:cTn id="28" fill="hold">
+                            <p:stCondLst>
+                              <p:cond delay="0"/>
+                            </p:stCondLst>
+                            <p:childTnLst>
+                              <p:par>
+                                <p:cTn id="29" presetID="1" presetClass="entr" presetSubtype="0" fill="hold" grpId="0" nodeType="clickEffect">
+                                  <p:stCondLst>
+                                    <p:cond delay="0"/>
+                                  </p:stCondLst>
+                                  <p:childTnLst>
+                                    <p:set>
+                                      <p:cBhvr>
+                                        <p:cTn id="30" dur="1" fill="hold">
+                                          <p:stCondLst>
+                                            <p:cond delay="0"/>
+                                          </p:stCondLst>
+                                        </p:cTn>
+                                        <p:tgtEl>
+                                          <p:spTgt spid="46"/>
+                                        </p:tgtEl>
+                                        <p:attrNameLst>
+                                          <p:attrName>style.visibility</p:attrName>
+                                        </p:attrNameLst>
+                                      </p:cBhvr>
+                                      <p:to>
+                                        <p:strVal val="visible"/>
+                                      </p:to>
+                                    </p:set>
+                                  </p:childTnLst>
+                                </p:cTn>
+                              </p:par>
+                            </p:childTnLst>
+                          </p:cTn>
+                        </p:par>
+                      </p:childTnLst>
+                    </p:cTn>
+                  </p:par>
                 </p:childTnLst>
               </p:cTn>
               <p:prevCondLst>
@@ -21457,6 +21560,9 @@
         </p:cTn>
       </p:par>
     </p:tnLst>
+    <p:bldLst>
+      <p:bldP spid="46" grpId="0" animBg="1"/>
+    </p:bldLst>
   </p:timing>
 </p:sld>
 </file>
@@ -23269,6 +23375,56 @@
           </p:sp>
         </p:grpSp>
       </p:grpSp>
+      <p:sp>
+        <p:nvSpPr>
+          <p:cNvPr id="5" name="TextBox 4"/>
+          <p:cNvSpPr txBox="1"/>
+          <p:nvPr/>
+        </p:nvSpPr>
+        <p:spPr>
+          <a:xfrm>
+            <a:off x="5814989" y="3601222"/>
+            <a:ext cx="3072188" cy="707886"/>
+          </a:xfrm>
+          <a:prstGeom prst="rect">
+            <a:avLst/>
+          </a:prstGeom>
+          <a:noFill/>
+          <a:ln>
+            <a:solidFill>
+              <a:schemeClr val="tx1"/>
+            </a:solidFill>
+          </a:ln>
+        </p:spPr>
+        <p:txBody>
+          <a:bodyPr wrap="none" rtlCol="0">
+            <a:spAutoFit/>
+          </a:bodyPr>
+          <a:lstStyle/>
+          <a:p>
+            <a:r>
+              <a:rPr lang="en-US" sz="2000" dirty="0" smtClean="0"/>
+              <a:t>May transport useless </a:t>
+            </a:r>
+            <a:r>
+              <a:rPr lang="nl-BE" sz="2000" dirty="0" smtClean="0"/>
+              <a:t>data:</a:t>
+            </a:r>
+            <a:br>
+              <a:rPr lang="nl-BE" sz="2000" dirty="0" smtClean="0"/>
+            </a:br>
+            <a:r>
+              <a:rPr lang="nl-BE" sz="2000" dirty="0" smtClean="0"/>
+              <a:t>performance </a:t>
+            </a:r>
+            <a:r>
+              <a:rPr lang="nl-BE" sz="2000" dirty="0" err="1" smtClean="0"/>
+              <a:t>degradation</a:t>
+            </a:r>
+            <a:endParaRPr lang="en-US" sz="2000" dirty="0" smtClean="0"/>
+          </a:p>
+        </p:txBody>
+      </p:sp>
     </p:spTree>
     <p:extLst>
       <p:ext uri="{BB962C8B-B14F-4D97-AF65-F5344CB8AC3E}">
@@ -23358,7 +23514,7 @@
                                           </p:stCondLst>
                                         </p:cTn>
                                         <p:tgtEl>
-                                          <p:spTgt spid="25"/>
+                                          <p:spTgt spid="5"/>
                                         </p:tgtEl>
                                         <p:attrNameLst>
                                           <p:attrName>style.visibility</p:attrName>
@@ -23390,7 +23546,7 @@
                             </p:stCondLst>
                             <p:childTnLst>
                               <p:par>
-                                <p:cTn id="13" presetID="1" presetClass="entr" presetSubtype="0" fill="hold" nodeType="clickEffect">
+                                <p:cTn id="13" presetID="1" presetClass="entr" presetSubtype="0" fill="hold" grpId="0" nodeType="clickEffect">
                                   <p:stCondLst>
                                     <p:cond delay="0"/>
                                   </p:stCondLst>
@@ -23398,6 +23554,51 @@
                                     <p:set>
                                       <p:cBhvr>
                                         <p:cTn id="14" dur="1" fill="hold">
+                                          <p:stCondLst>
+                                            <p:cond delay="0"/>
+                                          </p:stCondLst>
+                                        </p:cTn>
+                                        <p:tgtEl>
+                                          <p:spTgt spid="25"/>
+                                        </p:tgtEl>
+                                        <p:attrNameLst>
+                                          <p:attrName>style.visibility</p:attrName>
+                                        </p:attrNameLst>
+                                      </p:cBhvr>
+                                      <p:to>
+                                        <p:strVal val="visible"/>
+                                      </p:to>
+                                    </p:set>
+                                  </p:childTnLst>
+                                </p:cTn>
+                              </p:par>
+                            </p:childTnLst>
+                          </p:cTn>
+                        </p:par>
+                      </p:childTnLst>
+                    </p:cTn>
+                  </p:par>
+                  <p:par>
+                    <p:cTn id="15" fill="hold">
+                      <p:stCondLst>
+                        <p:cond delay="indefinite"/>
+                      </p:stCondLst>
+                      <p:childTnLst>
+                        <p:par>
+                          <p:cTn id="16" fill="hold">
+                            <p:stCondLst>
+                              <p:cond delay="0"/>
+                            </p:stCondLst>
+                            <p:childTnLst>
+                              <p:par>
+                                <p:cTn id="17" presetID="1" presetClass="entr" presetSubtype="0" fill="hold" nodeType="clickEffect">
+                                  <p:stCondLst>
+                                    <p:cond delay="0"/>
+                                  </p:stCondLst>
+                                  <p:childTnLst>
+                                    <p:set>
+                                      <p:cBhvr>
+                                        <p:cTn id="18" dur="1" fill="hold">
                                           <p:stCondLst>
                                             <p:cond delay="0"/>
                                           </p:stCondLst>
@@ -23445,6 +23646,7 @@
     </p:tnLst>
     <p:bldLst>
       <p:bldP spid="25" grpId="0" animBg="1"/>
+      <p:bldP spid="5" grpId="0" animBg="1"/>
     </p:bldLst>
   </p:timing>
 </p:sld>
@@ -23484,7 +23686,11 @@
           <a:p>
             <a:r>
               <a:rPr lang="en-US" dirty="0" smtClean="0"/>
-              <a:t>Cache associativity</a:t>
+              <a:t>Cache </a:t>
+            </a:r>
+            <a:r>
+              <a:rPr lang="en-US" dirty="0" smtClean="0"/>
+              <a:t>associativity: size matters</a:t>
             </a:r>
             <a:endParaRPr lang="nl-BE" dirty="0"/>
           </a:p>
@@ -23505,7 +23711,56 @@
           <a:bodyPr/>
           <a:lstStyle/>
           <a:p>
-            <a:endParaRPr lang="nl-BE"/>
+            <a:r>
+              <a:rPr lang="en-US" dirty="0"/>
+              <a:t>L</a:t>
+            </a:r>
+            <a:r>
+              <a:rPr lang="en-US" dirty="0" smtClean="0"/>
+              <a:t>ower bits of memory address: slot in cache</a:t>
+            </a:r>
+          </a:p>
+          <a:p>
+            <a:r>
+              <a:rPr lang="en-US" dirty="0" smtClean="0"/>
+              <a:t>L2: 8-way associative, 256 kb</a:t>
+            </a:r>
+          </a:p>
+          <a:p>
+            <a:pPr lvl="1"/>
+            <a:r>
+              <a:rPr lang="en-US" dirty="0" smtClean="0"/>
+              <a:t>cache line: 64 byte, </a:t>
+            </a:r>
+            <a:r>
+              <a:rPr lang="en-US" dirty="0" smtClean="0"/>
+              <a:t>so 262144/64 = 4096 slots</a:t>
+            </a:r>
+          </a:p>
+          <a:p>
+            <a:pPr lvl="1"/>
+            <a:r>
+              <a:rPr lang="en-US" dirty="0" smtClean="0"/>
+              <a:t>8-way, so 4096/8 = 512 sets, 8 slots each</a:t>
+            </a:r>
+          </a:p>
+          <a:p>
+            <a:pPr lvl="1"/>
+            <a:r>
+              <a:rPr lang="en-US" dirty="0" smtClean="0"/>
+              <a:t>when slots are full, eviction from cache, so data 512 </a:t>
+            </a:r>
+            <a:r>
+              <a:rPr lang="en-US" dirty="0" smtClean="0">
+                <a:sym typeface="Symbol" panose="05050102010706020507" pitchFamily="18" charset="2"/>
+              </a:rPr>
+              <a:t> </a:t>
+            </a:r>
+            <a:r>
+              <a:rPr lang="en-US" dirty="0" smtClean="0"/>
+              <a:t>64 = 32768 bytes apart competes for slots</a:t>
+            </a:r>
+            <a:endParaRPr lang="nl-BE" dirty="0"/>
           </a:p>
         </p:txBody>
       </p:sp>
@@ -23532,6 +23787,41 @@
           </a:p>
         </p:txBody>
       </p:sp>
+      <p:sp>
+        <p:nvSpPr>
+          <p:cNvPr id="5" name="TextBox 4"/>
+          <p:cNvSpPr txBox="1"/>
+          <p:nvPr/>
+        </p:nvSpPr>
+        <p:spPr>
+          <a:xfrm>
+            <a:off x="1619672" y="5301208"/>
+            <a:ext cx="6429965" cy="461665"/>
+          </a:xfrm>
+          <a:prstGeom prst="rect">
+            <a:avLst/>
+          </a:prstGeom>
+          <a:noFill/>
+          <a:ln>
+            <a:solidFill>
+              <a:schemeClr val="tx1"/>
+            </a:solidFill>
+          </a:ln>
+        </p:spPr>
+        <p:txBody>
+          <a:bodyPr wrap="none" rtlCol="0">
+            <a:spAutoFit/>
+          </a:bodyPr>
+          <a:lstStyle/>
+          <a:p>
+            <a:r>
+              <a:rPr lang="en-US" sz="2400" dirty="0" smtClean="0"/>
+              <a:t>Cache evictions limit reuse, reduces performance!</a:t>
+            </a:r>
+            <a:endParaRPr lang="nl-BE" sz="2400" dirty="0"/>
+          </a:p>
+        </p:txBody>
+      </p:sp>
     </p:spTree>
     <p:extLst>
       <p:ext uri="{BB962C8B-B14F-4D97-AF65-F5344CB8AC3E}">
@@ -23542,6 +23832,333 @@
   <p:clrMapOvr>
     <a:masterClrMapping/>
   </p:clrMapOvr>
+  <p:timing>
+    <p:tnLst>
+      <p:par>
+        <p:cTn id="1" dur="indefinite" restart="never" nodeType="tmRoot">
+          <p:childTnLst>
+            <p:seq concurrent="1" nextAc="seek">
+              <p:cTn id="2" dur="indefinite" nodeType="mainSeq">
+                <p:childTnLst>
+                  <p:par>
+                    <p:cTn id="3" fill="hold">
+                      <p:stCondLst>
+                        <p:cond delay="indefinite"/>
+                        <p:cond evt="onBegin" delay="0">
+                          <p:tn val="2"/>
+                        </p:cond>
+                      </p:stCondLst>
+                      <p:childTnLst>
+                        <p:par>
+                          <p:cTn id="4" fill="hold">
+                            <p:stCondLst>
+                              <p:cond delay="0"/>
+                            </p:stCondLst>
+                            <p:childTnLst>
+                              <p:par>
+                                <p:cTn id="5" presetID="1" presetClass="entr" presetSubtype="0" fill="hold" grpId="0" nodeType="withEffect">
+                                  <p:stCondLst>
+                                    <p:cond delay="0"/>
+                                  </p:stCondLst>
+                                  <p:childTnLst>
+                                    <p:set>
+                                      <p:cBhvr>
+                                        <p:cTn id="6" dur="1" fill="hold">
+                                          <p:stCondLst>
+                                            <p:cond delay="0"/>
+                                          </p:stCondLst>
+                                        </p:cTn>
+                                        <p:tgtEl>
+                                          <p:spTgt spid="3">
+                                            <p:txEl>
+                                              <p:pRg st="0" end="0"/>
+                                            </p:txEl>
+                                          </p:spTgt>
+                                        </p:tgtEl>
+                                        <p:attrNameLst>
+                                          <p:attrName>style.visibility</p:attrName>
+                                        </p:attrNameLst>
+                                      </p:cBhvr>
+                                      <p:to>
+                                        <p:strVal val="visible"/>
+                                      </p:to>
+                                    </p:set>
+                                  </p:childTnLst>
+                                </p:cTn>
+                              </p:par>
+                            </p:childTnLst>
+                          </p:cTn>
+                        </p:par>
+                      </p:childTnLst>
+                    </p:cTn>
+                  </p:par>
+                  <p:par>
+                    <p:cTn id="7" fill="hold">
+                      <p:stCondLst>
+                        <p:cond delay="indefinite"/>
+                      </p:stCondLst>
+                      <p:childTnLst>
+                        <p:par>
+                          <p:cTn id="8" fill="hold">
+                            <p:stCondLst>
+                              <p:cond delay="0"/>
+                            </p:stCondLst>
+                            <p:childTnLst>
+                              <p:par>
+                                <p:cTn id="9" presetID="1" presetClass="entr" presetSubtype="0" fill="hold" grpId="0" nodeType="clickEffect">
+                                  <p:stCondLst>
+                                    <p:cond delay="0"/>
+                                  </p:stCondLst>
+                                  <p:childTnLst>
+                                    <p:set>
+                                      <p:cBhvr>
+                                        <p:cTn id="10" dur="1" fill="hold">
+                                          <p:stCondLst>
+                                            <p:cond delay="0"/>
+                                          </p:stCondLst>
+                                        </p:cTn>
+                                        <p:tgtEl>
+                                          <p:spTgt spid="3">
+                                            <p:txEl>
+                                              <p:pRg st="1" end="1"/>
+                                            </p:txEl>
+                                          </p:spTgt>
+                                        </p:tgtEl>
+                                        <p:attrNameLst>
+                                          <p:attrName>style.visibility</p:attrName>
+                                        </p:attrNameLst>
+                                      </p:cBhvr>
+                                      <p:to>
+                                        <p:strVal val="visible"/>
+                                      </p:to>
+                                    </p:set>
+                                  </p:childTnLst>
+                                </p:cTn>
+                              </p:par>
+                            </p:childTnLst>
+                          </p:cTn>
+                        </p:par>
+                      </p:childTnLst>
+                    </p:cTn>
+                  </p:par>
+                  <p:par>
+                    <p:cTn id="11" fill="hold">
+                      <p:stCondLst>
+                        <p:cond delay="indefinite"/>
+                      </p:stCondLst>
+                      <p:childTnLst>
+                        <p:par>
+                          <p:cTn id="12" fill="hold">
+                            <p:stCondLst>
+                              <p:cond delay="0"/>
+                            </p:stCondLst>
+                            <p:childTnLst>
+                              <p:par>
+                                <p:cTn id="13" presetID="1" presetClass="entr" presetSubtype="0" fill="hold" grpId="0" nodeType="clickEffect">
+                                  <p:stCondLst>
+                                    <p:cond delay="0"/>
+                                  </p:stCondLst>
+                                  <p:childTnLst>
+                                    <p:set>
+                                      <p:cBhvr>
+                                        <p:cTn id="14" dur="1" fill="hold">
+                                          <p:stCondLst>
+                                            <p:cond delay="0"/>
+                                          </p:stCondLst>
+                                        </p:cTn>
+                                        <p:tgtEl>
+                                          <p:spTgt spid="3">
+                                            <p:txEl>
+                                              <p:pRg st="2" end="2"/>
+                                            </p:txEl>
+                                          </p:spTgt>
+                                        </p:tgtEl>
+                                        <p:attrNameLst>
+                                          <p:attrName>style.visibility</p:attrName>
+                                        </p:attrNameLst>
+                                      </p:cBhvr>
+                                      <p:to>
+                                        <p:strVal val="visible"/>
+                                      </p:to>
+                                    </p:set>
+                                  </p:childTnLst>
+                                </p:cTn>
+                              </p:par>
+                            </p:childTnLst>
+                          </p:cTn>
+                        </p:par>
+                      </p:childTnLst>
+                    </p:cTn>
+                  </p:par>
+                  <p:par>
+                    <p:cTn id="15" fill="hold">
+                      <p:stCondLst>
+                        <p:cond delay="indefinite"/>
+                      </p:stCondLst>
+                      <p:childTnLst>
+                        <p:par>
+                          <p:cTn id="16" fill="hold">
+                            <p:stCondLst>
+                              <p:cond delay="0"/>
+                            </p:stCondLst>
+                            <p:childTnLst>
+                              <p:par>
+                                <p:cTn id="17" presetID="1" presetClass="entr" presetSubtype="0" fill="hold" grpId="0" nodeType="clickEffect">
+                                  <p:stCondLst>
+                                    <p:cond delay="0"/>
+                                  </p:stCondLst>
+                                  <p:childTnLst>
+                                    <p:set>
+                                      <p:cBhvr>
+                                        <p:cTn id="18" dur="1" fill="hold">
+                                          <p:stCondLst>
+                                            <p:cond delay="0"/>
+                                          </p:stCondLst>
+                                        </p:cTn>
+                                        <p:tgtEl>
+                                          <p:spTgt spid="3">
+                                            <p:txEl>
+                                              <p:pRg st="3" end="3"/>
+                                            </p:txEl>
+                                          </p:spTgt>
+                                        </p:tgtEl>
+                                        <p:attrNameLst>
+                                          <p:attrName>style.visibility</p:attrName>
+                                        </p:attrNameLst>
+                                      </p:cBhvr>
+                                      <p:to>
+                                        <p:strVal val="visible"/>
+                                      </p:to>
+                                    </p:set>
+                                  </p:childTnLst>
+                                </p:cTn>
+                              </p:par>
+                            </p:childTnLst>
+                          </p:cTn>
+                        </p:par>
+                      </p:childTnLst>
+                    </p:cTn>
+                  </p:par>
+                  <p:par>
+                    <p:cTn id="19" fill="hold">
+                      <p:stCondLst>
+                        <p:cond delay="indefinite"/>
+                      </p:stCondLst>
+                      <p:childTnLst>
+                        <p:par>
+                          <p:cTn id="20" fill="hold">
+                            <p:stCondLst>
+                              <p:cond delay="0"/>
+                            </p:stCondLst>
+                            <p:childTnLst>
+                              <p:par>
+                                <p:cTn id="21" presetID="1" presetClass="entr" presetSubtype="0" fill="hold" grpId="0" nodeType="clickEffect">
+                                  <p:stCondLst>
+                                    <p:cond delay="0"/>
+                                  </p:stCondLst>
+                                  <p:childTnLst>
+                                    <p:set>
+                                      <p:cBhvr>
+                                        <p:cTn id="22" dur="1" fill="hold">
+                                          <p:stCondLst>
+                                            <p:cond delay="0"/>
+                                          </p:stCondLst>
+                                        </p:cTn>
+                                        <p:tgtEl>
+                                          <p:spTgt spid="3">
+                                            <p:txEl>
+                                              <p:pRg st="4" end="4"/>
+                                            </p:txEl>
+                                          </p:spTgt>
+                                        </p:tgtEl>
+                                        <p:attrNameLst>
+                                          <p:attrName>style.visibility</p:attrName>
+                                        </p:attrNameLst>
+                                      </p:cBhvr>
+                                      <p:to>
+                                        <p:strVal val="visible"/>
+                                      </p:to>
+                                    </p:set>
+                                  </p:childTnLst>
+                                </p:cTn>
+                              </p:par>
+                            </p:childTnLst>
+                          </p:cTn>
+                        </p:par>
+                      </p:childTnLst>
+                    </p:cTn>
+                  </p:par>
+                  <p:par>
+                    <p:cTn id="23" fill="hold">
+                      <p:stCondLst>
+                        <p:cond delay="indefinite"/>
+                      </p:stCondLst>
+                      <p:childTnLst>
+                        <p:par>
+                          <p:cTn id="24" fill="hold">
+                            <p:stCondLst>
+                              <p:cond delay="0"/>
+                            </p:stCondLst>
+                            <p:childTnLst>
+                              <p:par>
+                                <p:cTn id="25" presetID="1" presetClass="entr" presetSubtype="0" fill="hold" grpId="0" nodeType="clickEffect">
+                                  <p:stCondLst>
+                                    <p:cond delay="0"/>
+                                  </p:stCondLst>
+                                  <p:childTnLst>
+                                    <p:set>
+                                      <p:cBhvr>
+                                        <p:cTn id="26" dur="1" fill="hold">
+                                          <p:stCondLst>
+                                            <p:cond delay="0"/>
+                                          </p:stCondLst>
+                                        </p:cTn>
+                                        <p:tgtEl>
+                                          <p:spTgt spid="5"/>
+                                        </p:tgtEl>
+                                        <p:attrNameLst>
+                                          <p:attrName>style.visibility</p:attrName>
+                                        </p:attrNameLst>
+                                      </p:cBhvr>
+                                      <p:to>
+                                        <p:strVal val="visible"/>
+                                      </p:to>
+                                    </p:set>
+                                  </p:childTnLst>
+                                </p:cTn>
+                              </p:par>
+                            </p:childTnLst>
+                          </p:cTn>
+                        </p:par>
+                      </p:childTnLst>
+                    </p:cTn>
+                  </p:par>
+                </p:childTnLst>
+              </p:cTn>
+              <p:prevCondLst>
+                <p:cond evt="onPrev" delay="0">
+                  <p:tgtEl>
+                    <p:sldTgt/>
+                  </p:tgtEl>
+                </p:cond>
+              </p:prevCondLst>
+              <p:nextCondLst>
+                <p:cond evt="onNext" delay="0">
+                  <p:tgtEl>
+                    <p:sldTgt/>
+                  </p:tgtEl>
+                </p:cond>
+              </p:nextCondLst>
+            </p:seq>
+          </p:childTnLst>
+        </p:cTn>
+      </p:par>
+    </p:tnLst>
+    <p:bldLst>
+      <p:bldP spid="3" grpId="0" uiExpand="1" build="p" bldLvl="2"/>
+      <p:bldP spid="5" grpId="0" animBg="1"/>
+    </p:bldLst>
+  </p:timing>
 </p:sld>
 </file>
 
@@ -23579,7 +24196,7 @@
           <a:p>
             <a:r>
               <a:rPr lang="en-US" dirty="0" smtClean="0"/>
-              <a:t>CPU</a:t>
+              <a:t>Performance impact</a:t>
             </a:r>
             <a:endParaRPr lang="nl-BE" dirty="0"/>
           </a:p>
@@ -23587,26 +24204,7 @@
       </p:sp>
       <p:sp>
         <p:nvSpPr>
-          <p:cNvPr id="3" name="Text Placeholder 2"/>
-          <p:cNvSpPr>
-            <a:spLocks noGrp="1"/>
-          </p:cNvSpPr>
-          <p:nvPr>
-            <p:ph type="body" idx="1"/>
-          </p:nvPr>
-        </p:nvSpPr>
-        <p:spPr/>
-        <p:txBody>
-          <a:bodyPr/>
-          <a:lstStyle/>
-          <a:p>
-            <a:endParaRPr lang="nl-BE"/>
-          </a:p>
-        </p:txBody>
-      </p:sp>
-      <p:sp>
-        <p:nvSpPr>
-          <p:cNvPr id="4" name="Slide Number Placeholder 3"/>
+          <p:cNvPr id="3" name="Slide Number Placeholder 2"/>
           <p:cNvSpPr>
             <a:spLocks noGrp="1"/>
           </p:cNvSpPr>
@@ -23627,16 +24225,631 @@
           </a:p>
         </p:txBody>
       </p:sp>
+      <p:grpSp>
+        <p:nvGrpSpPr>
+          <p:cNvPr id="7" name="Group 6"/>
+          <p:cNvGrpSpPr/>
+          <p:nvPr/>
+        </p:nvGrpSpPr>
+        <p:grpSpPr>
+          <a:xfrm>
+            <a:off x="735726" y="1412776"/>
+            <a:ext cx="7672548" cy="3611607"/>
+            <a:chOff x="735726" y="1916832"/>
+            <a:chExt cx="7672548" cy="3611607"/>
+          </a:xfrm>
+        </p:grpSpPr>
+        <p:pic>
+          <p:nvPicPr>
+            <p:cNvPr id="4" name="Picture 3"/>
+            <p:cNvPicPr>
+              <a:picLocks noChangeAspect="1"/>
+            </p:cNvPicPr>
+            <p:nvPr/>
+          </p:nvPicPr>
+          <p:blipFill rotWithShape="1">
+            <a:blip r:embed="rId2">
+              <a:extLst>
+                <a:ext uri="{28A0092B-C50C-407E-A947-70E740481C1C}">
+                  <a14:useLocalDpi xmlns:a14="http://schemas.microsoft.com/office/drawing/2010/main" val="0"/>
+                </a:ext>
+              </a:extLst>
+            </a:blip>
+            <a:srcRect t="16624"/>
+            <a:stretch/>
+          </p:blipFill>
+          <p:spPr>
+            <a:xfrm>
+              <a:off x="735726" y="1916832"/>
+              <a:ext cx="7672548" cy="3611607"/>
+            </a:xfrm>
+            <a:prstGeom prst="rect">
+              <a:avLst/>
+            </a:prstGeom>
+          </p:spPr>
+        </p:pic>
+        <p:cxnSp>
+          <p:nvCxnSpPr>
+            <p:cNvPr id="6" name="Straight Connector 5"/>
+            <p:cNvCxnSpPr/>
+            <p:nvPr/>
+          </p:nvCxnSpPr>
+          <p:spPr>
+            <a:xfrm>
+              <a:off x="1259632" y="1916832"/>
+              <a:ext cx="7056784" cy="0"/>
+            </a:xfrm>
+            <a:prstGeom prst="line">
+              <a:avLst/>
+            </a:prstGeom>
+            <a:ln>
+              <a:solidFill>
+                <a:schemeClr val="tx1"/>
+              </a:solidFill>
+            </a:ln>
+          </p:spPr>
+          <p:style>
+            <a:lnRef idx="1">
+              <a:schemeClr val="accent1"/>
+            </a:lnRef>
+            <a:fillRef idx="0">
+              <a:schemeClr val="accent1"/>
+            </a:fillRef>
+            <a:effectRef idx="0">
+              <a:schemeClr val="accent1"/>
+            </a:effectRef>
+            <a:fontRef idx="minor">
+              <a:schemeClr val="tx1"/>
+            </a:fontRef>
+          </p:style>
+        </p:cxnSp>
+      </p:grpSp>
+      <p:grpSp>
+        <p:nvGrpSpPr>
+          <p:cNvPr id="16" name="Group 15"/>
+          <p:cNvGrpSpPr/>
+          <p:nvPr/>
+        </p:nvGrpSpPr>
+        <p:grpSpPr>
+          <a:xfrm>
+            <a:off x="2685330" y="4149080"/>
+            <a:ext cx="4550966" cy="1907254"/>
+            <a:chOff x="2685330" y="4149080"/>
+            <a:chExt cx="4550966" cy="1907254"/>
+          </a:xfrm>
+        </p:grpSpPr>
+        <p:cxnSp>
+          <p:nvCxnSpPr>
+            <p:cNvPr id="9" name="Straight Arrow Connector 8"/>
+            <p:cNvCxnSpPr>
+              <a:stCxn id="12" idx="0"/>
+            </p:cNvCxnSpPr>
+            <p:nvPr/>
+          </p:nvCxnSpPr>
+          <p:spPr>
+            <a:xfrm flipV="1">
+              <a:off x="3628665" y="4149080"/>
+              <a:ext cx="655303" cy="1537922"/>
+            </a:xfrm>
+            <a:prstGeom prst="straightConnector1">
+              <a:avLst/>
+            </a:prstGeom>
+            <a:ln w="19050">
+              <a:solidFill>
+                <a:srgbClr val="C00000"/>
+              </a:solidFill>
+              <a:tailEnd type="stealth" w="lg" len="lg"/>
+            </a:ln>
+          </p:spPr>
+          <p:style>
+            <a:lnRef idx="1">
+              <a:schemeClr val="accent1"/>
+            </a:lnRef>
+            <a:fillRef idx="0">
+              <a:schemeClr val="accent1"/>
+            </a:fillRef>
+            <a:effectRef idx="0">
+              <a:schemeClr val="accent1"/>
+            </a:effectRef>
+            <a:fontRef idx="minor">
+              <a:schemeClr val="tx1"/>
+            </a:fontRef>
+          </p:style>
+        </p:cxnSp>
+        <p:cxnSp>
+          <p:nvCxnSpPr>
+            <p:cNvPr id="10" name="Straight Arrow Connector 9"/>
+            <p:cNvCxnSpPr>
+              <a:stCxn id="12" idx="0"/>
+            </p:cNvCxnSpPr>
+            <p:nvPr/>
+          </p:nvCxnSpPr>
+          <p:spPr>
+            <a:xfrm flipV="1">
+              <a:off x="3628665" y="4149080"/>
+              <a:ext cx="3607631" cy="1537922"/>
+            </a:xfrm>
+            <a:prstGeom prst="straightConnector1">
+              <a:avLst/>
+            </a:prstGeom>
+            <a:ln w="19050">
+              <a:solidFill>
+                <a:srgbClr val="C00000"/>
+              </a:solidFill>
+              <a:tailEnd type="stealth" w="lg" len="lg"/>
+            </a:ln>
+          </p:spPr>
+          <p:style>
+            <a:lnRef idx="1">
+              <a:schemeClr val="accent1"/>
+            </a:lnRef>
+            <a:fillRef idx="0">
+              <a:schemeClr val="accent1"/>
+            </a:fillRef>
+            <a:effectRef idx="0">
+              <a:schemeClr val="accent1"/>
+            </a:effectRef>
+            <a:fontRef idx="minor">
+              <a:schemeClr val="tx1"/>
+            </a:fontRef>
+          </p:style>
+        </p:cxnSp>
+        <p:sp>
+          <p:nvSpPr>
+            <p:cNvPr id="12" name="TextBox 11"/>
+            <p:cNvSpPr txBox="1"/>
+            <p:nvPr/>
+          </p:nvSpPr>
+          <p:spPr>
+            <a:xfrm>
+              <a:off x="2685330" y="5687002"/>
+              <a:ext cx="1886670" cy="369332"/>
+            </a:xfrm>
+            <a:prstGeom prst="rect">
+              <a:avLst/>
+            </a:prstGeom>
+            <a:noFill/>
+            <a:ln>
+              <a:solidFill>
+                <a:srgbClr val="C00000"/>
+              </a:solidFill>
+            </a:ln>
+          </p:spPr>
+          <p:txBody>
+            <a:bodyPr wrap="none" rtlCol="0">
+              <a:spAutoFit/>
+            </a:bodyPr>
+            <a:lstStyle/>
+            <a:p>
+              <a:r>
+                <a:rPr lang="en-US" dirty="0" smtClean="0">
+                  <a:solidFill>
+                    <a:srgbClr val="C00000"/>
+                  </a:solidFill>
+                </a:rPr>
+                <a:t>Performance drop</a:t>
+              </a:r>
+              <a:endParaRPr lang="nl-BE" dirty="0">
+                <a:solidFill>
+                  <a:srgbClr val="C00000"/>
+                </a:solidFill>
+              </a:endParaRPr>
+            </a:p>
+          </p:txBody>
+        </p:sp>
+      </p:grpSp>
+      <p:sp>
+        <p:nvSpPr>
+          <p:cNvPr id="17" name="TextBox 16"/>
+          <p:cNvSpPr txBox="1"/>
+          <p:nvPr/>
+        </p:nvSpPr>
+        <p:spPr>
+          <a:xfrm>
+            <a:off x="5436096" y="5157192"/>
+            <a:ext cx="2994602" cy="954107"/>
+          </a:xfrm>
+          <a:prstGeom prst="rect">
+            <a:avLst/>
+          </a:prstGeom>
+          <a:noFill/>
+          <a:ln>
+            <a:solidFill>
+              <a:schemeClr val="tx1"/>
+            </a:solidFill>
+          </a:ln>
+        </p:spPr>
+        <p:txBody>
+          <a:bodyPr wrap="none" rtlCol="0">
+            <a:spAutoFit/>
+          </a:bodyPr>
+          <a:lstStyle/>
+          <a:p>
+            <a:r>
+              <a:rPr lang="en-US" sz="2800" dirty="0" smtClean="0"/>
+              <a:t>Avoid 2D/3D arrays</a:t>
+            </a:r>
+            <a:br>
+              <a:rPr lang="en-US" sz="2800" dirty="0" smtClean="0"/>
+            </a:br>
+            <a:r>
+              <a:rPr lang="en-US" sz="2800" dirty="0" smtClean="0"/>
+              <a:t>with sizes 2</a:t>
+            </a:r>
+            <a:r>
+              <a:rPr lang="en-US" sz="2800" i="1" baseline="30000" dirty="0" smtClean="0"/>
+              <a:t>n</a:t>
+            </a:r>
+            <a:endParaRPr lang="nl-BE" sz="2800" i="1" baseline="30000" dirty="0"/>
+          </a:p>
+        </p:txBody>
+      </p:sp>
+      <p:grpSp>
+        <p:nvGrpSpPr>
+          <p:cNvPr id="22" name="Group 21"/>
+          <p:cNvGrpSpPr/>
+          <p:nvPr/>
+        </p:nvGrpSpPr>
+        <p:grpSpPr>
+          <a:xfrm>
+            <a:off x="323528" y="620688"/>
+            <a:ext cx="1825783" cy="3913605"/>
+            <a:chOff x="323528" y="620688"/>
+            <a:chExt cx="1825783" cy="3913605"/>
+          </a:xfrm>
+        </p:grpSpPr>
+        <p:sp>
+          <p:nvSpPr>
+            <p:cNvPr id="18" name="Freeform 17"/>
+            <p:cNvSpPr/>
+            <p:nvPr/>
+          </p:nvSpPr>
+          <p:spPr>
+            <a:xfrm>
+              <a:off x="1234911" y="1432874"/>
+              <a:ext cx="914400" cy="3101419"/>
+            </a:xfrm>
+            <a:custGeom>
+              <a:avLst/>
+              <a:gdLst>
+                <a:gd name="connsiteX0" fmla="*/ 0 w 914400"/>
+                <a:gd name="connsiteY0" fmla="*/ 3101419 h 3101419"/>
+                <a:gd name="connsiteX1" fmla="*/ 914400 w 914400"/>
+                <a:gd name="connsiteY1" fmla="*/ 0 h 3101419"/>
+                <a:gd name="connsiteX2" fmla="*/ 47134 w 914400"/>
+                <a:gd name="connsiteY2" fmla="*/ 0 h 3101419"/>
+                <a:gd name="connsiteX3" fmla="*/ 47134 w 914400"/>
+                <a:gd name="connsiteY3" fmla="*/ 2941163 h 3101419"/>
+              </a:gdLst>
+              <a:ahLst/>
+              <a:cxnLst>
+                <a:cxn ang="0">
+                  <a:pos x="connsiteX0" y="connsiteY0"/>
+                </a:cxn>
+                <a:cxn ang="0">
+                  <a:pos x="connsiteX1" y="connsiteY1"/>
+                </a:cxn>
+                <a:cxn ang="0">
+                  <a:pos x="connsiteX2" y="connsiteY2"/>
+                </a:cxn>
+                <a:cxn ang="0">
+                  <a:pos x="connsiteX3" y="connsiteY3"/>
+                </a:cxn>
+              </a:cxnLst>
+              <a:rect l="l" t="t" r="r" b="b"/>
+              <a:pathLst>
+                <a:path w="914400" h="3101419">
+                  <a:moveTo>
+                    <a:pt x="0" y="3101419"/>
+                  </a:moveTo>
+                  <a:lnTo>
+                    <a:pt x="914400" y="0"/>
+                  </a:lnTo>
+                  <a:lnTo>
+                    <a:pt x="47134" y="0"/>
+                  </a:lnTo>
+                  <a:lnTo>
+                    <a:pt x="47134" y="2941163"/>
+                  </a:lnTo>
+                </a:path>
+              </a:pathLst>
+            </a:custGeom>
+            <a:solidFill>
+              <a:srgbClr val="C00000">
+                <a:alpha val="14000"/>
+              </a:srgbClr>
+            </a:solidFill>
+            <a:ln>
+              <a:solidFill>
+                <a:srgbClr val="C00000"/>
+              </a:solidFill>
+            </a:ln>
+          </p:spPr>
+          <p:style>
+            <a:lnRef idx="2">
+              <a:schemeClr val="accent1">
+                <a:shade val="50000"/>
+              </a:schemeClr>
+            </a:lnRef>
+            <a:fillRef idx="1">
+              <a:schemeClr val="accent1"/>
+            </a:fillRef>
+            <a:effectRef idx="0">
+              <a:schemeClr val="accent1"/>
+            </a:effectRef>
+            <a:fontRef idx="minor">
+              <a:schemeClr val="lt1"/>
+            </a:fontRef>
+          </p:style>
+          <p:txBody>
+            <a:bodyPr rtlCol="0" anchor="ctr"/>
+            <a:lstStyle/>
+            <a:p>
+              <a:pPr algn="ctr"/>
+              <a:endParaRPr lang="nl-BE"/>
+            </a:p>
+          </p:txBody>
+        </p:sp>
+        <p:sp>
+          <p:nvSpPr>
+            <p:cNvPr id="19" name="TextBox 18"/>
+            <p:cNvSpPr txBox="1"/>
+            <p:nvPr/>
+          </p:nvSpPr>
+          <p:spPr>
+            <a:xfrm>
+              <a:off x="323528" y="620688"/>
+              <a:ext cx="1150892" cy="369332"/>
+            </a:xfrm>
+            <a:prstGeom prst="rect">
+              <a:avLst/>
+            </a:prstGeom>
+            <a:noFill/>
+            <a:ln>
+              <a:solidFill>
+                <a:srgbClr val="C00000"/>
+              </a:solidFill>
+            </a:ln>
+          </p:spPr>
+          <p:txBody>
+            <a:bodyPr wrap="none" rtlCol="0">
+              <a:spAutoFit/>
+            </a:bodyPr>
+            <a:lstStyle/>
+            <a:p>
+              <a:r>
+                <a:rPr lang="en-US" dirty="0" smtClean="0">
+                  <a:solidFill>
+                    <a:srgbClr val="C00000"/>
+                  </a:solidFill>
+                </a:rPr>
+                <a:t>Cache size</a:t>
+              </a:r>
+              <a:endParaRPr lang="nl-BE" dirty="0">
+                <a:solidFill>
+                  <a:srgbClr val="C00000"/>
+                </a:solidFill>
+              </a:endParaRPr>
+            </a:p>
+          </p:txBody>
+        </p:sp>
+        <p:cxnSp>
+          <p:nvCxnSpPr>
+            <p:cNvPr id="21" name="Straight Arrow Connector 20"/>
+            <p:cNvCxnSpPr>
+              <a:stCxn id="19" idx="2"/>
+            </p:cNvCxnSpPr>
+            <p:nvPr/>
+          </p:nvCxnSpPr>
+          <p:spPr>
+            <a:xfrm>
+              <a:off x="898974" y="990020"/>
+              <a:ext cx="360658" cy="427618"/>
+            </a:xfrm>
+            <a:prstGeom prst="straightConnector1">
+              <a:avLst/>
+            </a:prstGeom>
+            <a:ln w="15875">
+              <a:solidFill>
+                <a:srgbClr val="C00000"/>
+              </a:solidFill>
+              <a:tailEnd type="stealth" w="lg" len="lg"/>
+            </a:ln>
+          </p:spPr>
+          <p:style>
+            <a:lnRef idx="1">
+              <a:schemeClr val="accent1"/>
+            </a:lnRef>
+            <a:fillRef idx="0">
+              <a:schemeClr val="accent1"/>
+            </a:fillRef>
+            <a:effectRef idx="0">
+              <a:schemeClr val="accent1"/>
+            </a:effectRef>
+            <a:fontRef idx="minor">
+              <a:schemeClr val="tx1"/>
+            </a:fontRef>
+          </p:style>
+        </p:cxnSp>
+      </p:grpSp>
     </p:spTree>
     <p:extLst>
       <p:ext uri="{BB962C8B-B14F-4D97-AF65-F5344CB8AC3E}">
-        <p14:creationId xmlns:p14="http://schemas.microsoft.com/office/powerpoint/2010/main" val="818805559"/>
+        <p14:creationId xmlns:p14="http://schemas.microsoft.com/office/powerpoint/2010/main" val="2661177556"/>
       </p:ext>
     </p:extLst>
   </p:cSld>
   <p:clrMapOvr>
     <a:masterClrMapping/>
   </p:clrMapOvr>
+  <p:timing>
+    <p:tnLst>
+      <p:par>
+        <p:cTn id="1" dur="indefinite" restart="never" nodeType="tmRoot">
+          <p:childTnLst>
+            <p:seq concurrent="1" nextAc="seek">
+              <p:cTn id="2" dur="indefinite" nodeType="mainSeq">
+                <p:childTnLst>
+                  <p:par>
+                    <p:cTn id="3" fill="hold">
+                      <p:stCondLst>
+                        <p:cond delay="indefinite"/>
+                      </p:stCondLst>
+                      <p:childTnLst>
+                        <p:par>
+                          <p:cTn id="4" fill="hold">
+                            <p:stCondLst>
+                              <p:cond delay="0"/>
+                            </p:stCondLst>
+                            <p:childTnLst>
+                              <p:par>
+                                <p:cTn id="5" presetID="1" presetClass="entr" presetSubtype="0" fill="hold" nodeType="clickEffect">
+                                  <p:stCondLst>
+                                    <p:cond delay="0"/>
+                                  </p:stCondLst>
+                                  <p:childTnLst>
+                                    <p:set>
+                                      <p:cBhvr>
+                                        <p:cTn id="6" dur="1" fill="hold">
+                                          <p:stCondLst>
+                                            <p:cond delay="0"/>
+                                          </p:stCondLst>
+                                        </p:cTn>
+                                        <p:tgtEl>
+                                          <p:spTgt spid="16"/>
+                                        </p:tgtEl>
+                                        <p:attrNameLst>
+                                          <p:attrName>style.visibility</p:attrName>
+                                        </p:attrNameLst>
+                                      </p:cBhvr>
+                                      <p:to>
+                                        <p:strVal val="visible"/>
+                                      </p:to>
+                                    </p:set>
+                                  </p:childTnLst>
+                                </p:cTn>
+                              </p:par>
+                            </p:childTnLst>
+                          </p:cTn>
+                        </p:par>
+                      </p:childTnLst>
+                    </p:cTn>
+                  </p:par>
+                  <p:par>
+                    <p:cTn id="7" fill="hold">
+                      <p:stCondLst>
+                        <p:cond delay="indefinite"/>
+                      </p:stCondLst>
+                      <p:childTnLst>
+                        <p:par>
+                          <p:cTn id="8" fill="hold">
+                            <p:stCondLst>
+                              <p:cond delay="0"/>
+                            </p:stCondLst>
+                            <p:childTnLst>
+                              <p:par>
+                                <p:cTn id="9" presetID="1" presetClass="entr" presetSubtype="0" fill="hold" grpId="0" nodeType="clickEffect">
+                                  <p:stCondLst>
+                                    <p:cond delay="0"/>
+                                  </p:stCondLst>
+                                  <p:childTnLst>
+                                    <p:set>
+                                      <p:cBhvr>
+                                        <p:cTn id="10" dur="1" fill="hold">
+                                          <p:stCondLst>
+                                            <p:cond delay="0"/>
+                                          </p:stCondLst>
+                                        </p:cTn>
+                                        <p:tgtEl>
+                                          <p:spTgt spid="17"/>
+                                        </p:tgtEl>
+                                        <p:attrNameLst>
+                                          <p:attrName>style.visibility</p:attrName>
+                                        </p:attrNameLst>
+                                      </p:cBhvr>
+                                      <p:to>
+                                        <p:strVal val="visible"/>
+                                      </p:to>
+                                    </p:set>
+                                  </p:childTnLst>
+                                </p:cTn>
+                              </p:par>
+                            </p:childTnLst>
+                          </p:cTn>
+                        </p:par>
+                      </p:childTnLst>
+                    </p:cTn>
+                  </p:par>
+                  <p:par>
+                    <p:cTn id="11" fill="hold">
+                      <p:stCondLst>
+                        <p:cond delay="indefinite"/>
+                      </p:stCondLst>
+                      <p:childTnLst>
+                        <p:par>
+                          <p:cTn id="12" fill="hold">
+                            <p:stCondLst>
+                              <p:cond delay="0"/>
+                            </p:stCondLst>
+                            <p:childTnLst>
+                              <p:par>
+                                <p:cTn id="13" presetID="1" presetClass="entr" presetSubtype="0" fill="hold" nodeType="clickEffect">
+                                  <p:stCondLst>
+                                    <p:cond delay="0"/>
+                                  </p:stCondLst>
+                                  <p:childTnLst>
+                                    <p:set>
+                                      <p:cBhvr>
+                                        <p:cTn id="14" dur="1" fill="hold">
+                                          <p:stCondLst>
+                                            <p:cond delay="0"/>
+                                          </p:stCondLst>
+                                        </p:cTn>
+                                        <p:tgtEl>
+                                          <p:spTgt spid="22"/>
+                                        </p:tgtEl>
+                                        <p:attrNameLst>
+                                          <p:attrName>style.visibility</p:attrName>
+                                        </p:attrNameLst>
+                                      </p:cBhvr>
+                                      <p:to>
+                                        <p:strVal val="visible"/>
+                                      </p:to>
+                                    </p:set>
+                                  </p:childTnLst>
+                                </p:cTn>
+                              </p:par>
+                            </p:childTnLst>
+                          </p:cTn>
+                        </p:par>
+                      </p:childTnLst>
+                    </p:cTn>
+                  </p:par>
+                </p:childTnLst>
+              </p:cTn>
+              <p:prevCondLst>
+                <p:cond evt="onPrev" delay="0">
+                  <p:tgtEl>
+                    <p:sldTgt/>
+                  </p:tgtEl>
+                </p:cond>
+              </p:prevCondLst>
+              <p:nextCondLst>
+                <p:cond evt="onNext" delay="0">
+                  <p:tgtEl>
+                    <p:sldTgt/>
+                  </p:tgtEl>
+                </p:cond>
+              </p:nextCondLst>
+            </p:seq>
+          </p:childTnLst>
+        </p:cTn>
+      </p:par>
+    </p:tnLst>
+    <p:bldLst>
+      <p:bldP spid="17" grpId="0" animBg="1"/>
+    </p:bldLst>
+  </p:timing>
 </p:sld>
 </file>
 
@@ -23674,6 +24887,101 @@
           <a:p>
             <a:r>
               <a:rPr lang="en-US" dirty="0" smtClean="0"/>
+              <a:t>CPU</a:t>
+            </a:r>
+            <a:endParaRPr lang="nl-BE" dirty="0"/>
+          </a:p>
+        </p:txBody>
+      </p:sp>
+      <p:sp>
+        <p:nvSpPr>
+          <p:cNvPr id="3" name="Text Placeholder 2"/>
+          <p:cNvSpPr>
+            <a:spLocks noGrp="1"/>
+          </p:cNvSpPr>
+          <p:nvPr>
+            <p:ph type="body" idx="1"/>
+          </p:nvPr>
+        </p:nvSpPr>
+        <p:spPr/>
+        <p:txBody>
+          <a:bodyPr/>
+          <a:lstStyle/>
+          <a:p>
+            <a:endParaRPr lang="nl-BE"/>
+          </a:p>
+        </p:txBody>
+      </p:sp>
+      <p:sp>
+        <p:nvSpPr>
+          <p:cNvPr id="4" name="Slide Number Placeholder 3"/>
+          <p:cNvSpPr>
+            <a:spLocks noGrp="1"/>
+          </p:cNvSpPr>
+          <p:nvPr>
+            <p:ph type="sldNum" sz="quarter" idx="12"/>
+          </p:nvPr>
+        </p:nvSpPr>
+        <p:spPr/>
+        <p:txBody>
+          <a:bodyPr/>
+          <a:lstStyle/>
+          <a:p>
+            <a:fld id="{6597116C-F94B-4B5B-973A-17F07FB5C418}" type="slidenum">
+              <a:rPr lang="nl-BE" smtClean="0"/>
+              <a:t>27</a:t>
+            </a:fld>
+            <a:endParaRPr lang="nl-BE"/>
+          </a:p>
+        </p:txBody>
+      </p:sp>
+    </p:spTree>
+    <p:extLst>
+      <p:ext uri="{BB962C8B-B14F-4D97-AF65-F5344CB8AC3E}">
+        <p14:creationId xmlns:p14="http://schemas.microsoft.com/office/powerpoint/2010/main" val="818805559"/>
+      </p:ext>
+    </p:extLst>
+  </p:cSld>
+  <p:clrMapOvr>
+    <a:masterClrMapping/>
+  </p:clrMapOvr>
+</p:sld>
+</file>
+
+<file path=ppt/slides/slide28.xml><?xml version="1.0" encoding="utf-8"?>
+<p:sld xmlns:a="http://schemas.openxmlformats.org/drawingml/2006/main" xmlns:r="http://schemas.openxmlformats.org/officeDocument/2006/relationships" xmlns:p="http://schemas.openxmlformats.org/presentationml/2006/main">
+  <p:cSld>
+    <p:spTree>
+      <p:nvGrpSpPr>
+        <p:cNvPr id="1" name=""/>
+        <p:cNvGrpSpPr/>
+        <p:nvPr/>
+      </p:nvGrpSpPr>
+      <p:grpSpPr>
+        <a:xfrm>
+          <a:off x="0" y="0"/>
+          <a:ext cx="0" cy="0"/>
+          <a:chOff x="0" y="0"/>
+          <a:chExt cx="0" cy="0"/>
+        </a:xfrm>
+      </p:grpSpPr>
+      <p:sp>
+        <p:nvSpPr>
+          <p:cNvPr id="2" name="Title 1"/>
+          <p:cNvSpPr>
+            <a:spLocks noGrp="1"/>
+          </p:cNvSpPr>
+          <p:nvPr>
+            <p:ph type="title"/>
+          </p:nvPr>
+        </p:nvSpPr>
+        <p:spPr/>
+        <p:txBody>
+          <a:bodyPr/>
+          <a:lstStyle/>
+          <a:p>
+            <a:r>
+              <a:rPr lang="en-US" dirty="0" smtClean="0"/>
               <a:t>Vectorization</a:t>
             </a:r>
             <a:endParaRPr lang="en-US" dirty="0"/>
@@ -23751,7 +25059,7 @@
           <a:p>
             <a:fld id="{6597116C-F94B-4B5B-973A-17F07FB5C418}" type="slidenum">
               <a:rPr lang="nl-BE" smtClean="0"/>
-              <a:t>27</a:t>
+              <a:t>28</a:t>
             </a:fld>
             <a:endParaRPr lang="nl-BE"/>
           </a:p>
@@ -24531,7 +25839,7 @@
 </p:sld>
 </file>
 
-<file path=ppt/slides/slide28.xml><?xml version="1.0" encoding="utf-8"?>
+<file path=ppt/slides/slide29.xml><?xml version="1.0" encoding="utf-8"?>
 <p:sld xmlns:a="http://schemas.openxmlformats.org/drawingml/2006/main" xmlns:r="http://schemas.openxmlformats.org/officeDocument/2006/relationships" xmlns:p="http://schemas.openxmlformats.org/presentationml/2006/main">
   <p:cSld>
     <p:spTree>
@@ -24635,7 +25943,7 @@
           <a:p>
             <a:fld id="{6597116C-F94B-4B5B-973A-17F07FB5C418}" type="slidenum">
               <a:rPr lang="nl-BE" smtClean="0"/>
-              <a:t>28</a:t>
+              <a:t>29</a:t>
             </a:fld>
             <a:endParaRPr lang="nl-BE"/>
           </a:p>
@@ -25148,423 +26456,334 @@
   <p:clrMapOvr>
     <a:masterClrMapping/>
   </p:clrMapOvr>
-</p:sld>
-</file>
-
-<file path=ppt/slides/slide29.xml><?xml version="1.0" encoding="utf-8"?>
-<p:sld xmlns:a="http://schemas.openxmlformats.org/drawingml/2006/main" xmlns:r="http://schemas.openxmlformats.org/officeDocument/2006/relationships" xmlns:p="http://schemas.openxmlformats.org/presentationml/2006/main">
-  <p:cSld>
-    <p:spTree>
-      <p:nvGrpSpPr>
-        <p:cNvPr id="1" name=""/>
-        <p:cNvGrpSpPr/>
-        <p:nvPr/>
-      </p:nvGrpSpPr>
-      <p:grpSpPr>
-        <a:xfrm>
-          <a:off x="0" y="0"/>
-          <a:ext cx="0" cy="0"/>
-          <a:chOff x="0" y="0"/>
-          <a:chExt cx="0" cy="0"/>
-        </a:xfrm>
-      </p:grpSpPr>
-      <p:sp>
-        <p:nvSpPr>
-          <p:cNvPr id="2" name="Title 1"/>
-          <p:cNvSpPr>
-            <a:spLocks noGrp="1"/>
-          </p:cNvSpPr>
-          <p:nvPr>
-            <p:ph type="title"/>
-          </p:nvPr>
-        </p:nvSpPr>
-        <p:spPr/>
-        <p:txBody>
-          <a:bodyPr/>
-          <a:lstStyle/>
-          <a:p>
-            <a:r>
-              <a:rPr lang="en-US" dirty="0" smtClean="0"/>
-              <a:t>Compiler flags &amp; directives</a:t>
-            </a:r>
-            <a:endParaRPr lang="nl-BE" dirty="0"/>
-          </a:p>
-        </p:txBody>
-      </p:sp>
-      <p:sp>
-        <p:nvSpPr>
-          <p:cNvPr id="3" name="Content Placeholder 2"/>
-          <p:cNvSpPr>
-            <a:spLocks noGrp="1"/>
-          </p:cNvSpPr>
-          <p:nvPr>
-            <p:ph idx="1"/>
-          </p:nvPr>
-        </p:nvSpPr>
-        <p:spPr/>
-        <p:txBody>
-          <a:bodyPr>
-            <a:normAutofit fontScale="92500" lnSpcReduction="20000"/>
-          </a:bodyPr>
-          <a:lstStyle/>
-          <a:p>
-            <a:r>
-              <a:rPr lang="en-US" dirty="0" smtClean="0"/>
-              <a:t>GCC compiler family</a:t>
-            </a:r>
-          </a:p>
-          <a:p>
-            <a:pPr lvl="1"/>
-            <a:r>
-              <a:rPr lang="en-US" dirty="0" err="1" smtClean="0">
-                <a:latin typeface="Courier New" panose="02070309020205020404" pitchFamily="49" charset="0"/>
-                <a:cs typeface="Courier New" panose="02070309020205020404" pitchFamily="49" charset="0"/>
-              </a:rPr>
-              <a:t>gcc</a:t>
-            </a:r>
-            <a:r>
-              <a:rPr lang="en-US" dirty="0" smtClean="0">
-                <a:latin typeface="Courier New" panose="02070309020205020404" pitchFamily="49" charset="0"/>
-                <a:cs typeface="Courier New" panose="02070309020205020404" pitchFamily="49" charset="0"/>
-              </a:rPr>
-              <a:t> </a:t>
-            </a:r>
-            <a:r>
-              <a:rPr lang="en-US" dirty="0">
-                <a:latin typeface="Courier New" panose="02070309020205020404" pitchFamily="49" charset="0"/>
-                <a:cs typeface="Courier New" panose="02070309020205020404" pitchFamily="49" charset="0"/>
-              </a:rPr>
-              <a:t>–march=corei7-avx </a:t>
-            </a:r>
-            <a:r>
-              <a:rPr lang="en-US" dirty="0" smtClean="0">
-                <a:latin typeface="Courier New" panose="02070309020205020404" pitchFamily="49" charset="0"/>
-                <a:cs typeface="Courier New" panose="02070309020205020404" pitchFamily="49" charset="0"/>
-              </a:rPr>
-              <a:t>–O3 …</a:t>
-            </a:r>
-            <a:endParaRPr lang="en-US" dirty="0">
-              <a:latin typeface="Courier New" panose="02070309020205020404" pitchFamily="49" charset="0"/>
-              <a:cs typeface="Courier New" panose="02070309020205020404" pitchFamily="49" charset="0"/>
-            </a:endParaRPr>
-          </a:p>
-          <a:p>
-            <a:pPr lvl="1"/>
-            <a:r>
-              <a:rPr lang="en-US" dirty="0" err="1">
-                <a:latin typeface="Courier New" panose="02070309020205020404" pitchFamily="49" charset="0"/>
-                <a:cs typeface="Courier New" panose="02070309020205020404" pitchFamily="49" charset="0"/>
-              </a:rPr>
-              <a:t>g</a:t>
-            </a:r>
-            <a:r>
-              <a:rPr lang="en-US" dirty="0" err="1" smtClean="0">
-                <a:latin typeface="Courier New" panose="02070309020205020404" pitchFamily="49" charset="0"/>
-                <a:cs typeface="Courier New" panose="02070309020205020404" pitchFamily="49" charset="0"/>
-              </a:rPr>
-              <a:t>cc</a:t>
-            </a:r>
-            <a:r>
-              <a:rPr lang="en-US" dirty="0" smtClean="0">
-                <a:latin typeface="Courier New" panose="02070309020205020404" pitchFamily="49" charset="0"/>
-                <a:cs typeface="Courier New" panose="02070309020205020404" pitchFamily="49" charset="0"/>
-              </a:rPr>
-              <a:t> –</a:t>
-            </a:r>
-            <a:r>
-              <a:rPr lang="en-US" dirty="0" err="1" smtClean="0">
-                <a:latin typeface="Courier New" panose="02070309020205020404" pitchFamily="49" charset="0"/>
-                <a:cs typeface="Courier New" panose="02070309020205020404" pitchFamily="49" charset="0"/>
-              </a:rPr>
-              <a:t>ftree-vectorize</a:t>
-            </a:r>
-            <a:r>
-              <a:rPr lang="en-US" dirty="0" smtClean="0">
-                <a:latin typeface="Courier New" panose="02070309020205020404" pitchFamily="49" charset="0"/>
-                <a:cs typeface="Courier New" panose="02070309020205020404" pitchFamily="49" charset="0"/>
-              </a:rPr>
-              <a:t> \</a:t>
-            </a:r>
-            <a:br>
-              <a:rPr lang="en-US" dirty="0" smtClean="0">
-                <a:latin typeface="Courier New" panose="02070309020205020404" pitchFamily="49" charset="0"/>
-                <a:cs typeface="Courier New" panose="02070309020205020404" pitchFamily="49" charset="0"/>
-              </a:rPr>
-            </a:br>
-            <a:r>
-              <a:rPr lang="en-US" dirty="0" smtClean="0">
-                <a:latin typeface="Courier New" panose="02070309020205020404" pitchFamily="49" charset="0"/>
-                <a:cs typeface="Courier New" panose="02070309020205020404" pitchFamily="49" charset="0"/>
-              </a:rPr>
-              <a:t>    –march=corei7-avx –O2 …</a:t>
-            </a:r>
-          </a:p>
-          <a:p>
-            <a:pPr lvl="1"/>
-            <a:r>
-              <a:rPr lang="en-US" dirty="0" smtClean="0">
-                <a:cs typeface="Courier New" panose="02070309020205020404" pitchFamily="49" charset="0"/>
-              </a:rPr>
-              <a:t>for feedback, use</a:t>
-            </a:r>
-            <a:br>
-              <a:rPr lang="en-US" dirty="0" smtClean="0">
-                <a:cs typeface="Courier New" panose="02070309020205020404" pitchFamily="49" charset="0"/>
-              </a:rPr>
-            </a:br>
-            <a:r>
-              <a:rPr lang="en-US" dirty="0" smtClean="0">
-                <a:cs typeface="Courier New" panose="02070309020205020404" pitchFamily="49" charset="0"/>
-              </a:rPr>
-              <a:t>  </a:t>
-            </a:r>
-            <a:r>
-              <a:rPr lang="nl-BE" dirty="0">
-                <a:latin typeface="Courier New" panose="02070309020205020404" pitchFamily="49" charset="0"/>
-                <a:cs typeface="Courier New" panose="02070309020205020404" pitchFamily="49" charset="0"/>
-              </a:rPr>
-              <a:t>-</a:t>
-            </a:r>
-            <a:r>
-              <a:rPr lang="nl-BE" dirty="0" err="1">
-                <a:latin typeface="Courier New" panose="02070309020205020404" pitchFamily="49" charset="0"/>
-                <a:cs typeface="Courier New" panose="02070309020205020404" pitchFamily="49" charset="0"/>
-              </a:rPr>
-              <a:t>ftree-vectorizer-verbose</a:t>
-            </a:r>
-            <a:r>
-              <a:rPr lang="nl-BE" dirty="0">
-                <a:latin typeface="Courier New" panose="02070309020205020404" pitchFamily="49" charset="0"/>
-                <a:cs typeface="Courier New" panose="02070309020205020404" pitchFamily="49" charset="0"/>
-              </a:rPr>
-              <a:t>=2</a:t>
-            </a:r>
-            <a:endParaRPr lang="en-US" dirty="0" smtClean="0">
-              <a:latin typeface="Courier New" panose="02070309020205020404" pitchFamily="49" charset="0"/>
-              <a:cs typeface="Courier New" panose="02070309020205020404" pitchFamily="49" charset="0"/>
-            </a:endParaRPr>
-          </a:p>
-          <a:p>
-            <a:r>
-              <a:rPr lang="en-US" dirty="0" smtClean="0"/>
-              <a:t>Intel compiler family</a:t>
-            </a:r>
-          </a:p>
-          <a:p>
-            <a:pPr lvl="1"/>
-            <a:r>
-              <a:rPr lang="en-US" dirty="0" err="1" smtClean="0">
-                <a:latin typeface="Courier New" panose="02070309020205020404" pitchFamily="49" charset="0"/>
-                <a:cs typeface="Courier New" panose="02070309020205020404" pitchFamily="49" charset="0"/>
-              </a:rPr>
-              <a:t>icc</a:t>
-            </a:r>
-            <a:r>
-              <a:rPr lang="en-US" dirty="0" smtClean="0">
-                <a:latin typeface="Courier New" panose="02070309020205020404" pitchFamily="49" charset="0"/>
-                <a:cs typeface="Courier New" panose="02070309020205020404" pitchFamily="49" charset="0"/>
-              </a:rPr>
-              <a:t> –</a:t>
-            </a:r>
-            <a:r>
-              <a:rPr lang="en-US" dirty="0" err="1" smtClean="0">
-                <a:latin typeface="Courier New" panose="02070309020205020404" pitchFamily="49" charset="0"/>
-                <a:cs typeface="Courier New" panose="02070309020205020404" pitchFamily="49" charset="0"/>
-              </a:rPr>
-              <a:t>xHost</a:t>
-            </a:r>
-            <a:r>
-              <a:rPr lang="en-US" dirty="0" smtClean="0">
-                <a:latin typeface="Courier New" panose="02070309020205020404" pitchFamily="49" charset="0"/>
-                <a:cs typeface="Courier New" panose="02070309020205020404" pitchFamily="49" charset="0"/>
-              </a:rPr>
-              <a:t> –O2 …</a:t>
-            </a:r>
-          </a:p>
-          <a:p>
-            <a:pPr lvl="1"/>
-            <a:r>
-              <a:rPr lang="en-US" dirty="0" smtClean="0"/>
-              <a:t>for feedback, use</a:t>
-            </a:r>
-            <a:br>
-              <a:rPr lang="en-US" dirty="0" smtClean="0"/>
-            </a:br>
-            <a:r>
-              <a:rPr lang="en-US" dirty="0" smtClean="0">
-                <a:latin typeface="Courier New" panose="02070309020205020404" pitchFamily="49" charset="0"/>
-                <a:cs typeface="Courier New" panose="02070309020205020404" pitchFamily="49" charset="0"/>
-              </a:rPr>
-              <a:t>  -</a:t>
-            </a:r>
-            <a:r>
-              <a:rPr lang="en-US" dirty="0" err="1" smtClean="0">
-                <a:latin typeface="Courier New" panose="02070309020205020404" pitchFamily="49" charset="0"/>
-                <a:cs typeface="Courier New" panose="02070309020205020404" pitchFamily="49" charset="0"/>
-              </a:rPr>
-              <a:t>qopt</a:t>
-            </a:r>
-            <a:r>
-              <a:rPr lang="en-US" dirty="0" smtClean="0">
-                <a:latin typeface="Courier New" panose="02070309020205020404" pitchFamily="49" charset="0"/>
-                <a:cs typeface="Courier New" panose="02070309020205020404" pitchFamily="49" charset="0"/>
-              </a:rPr>
-              <a:t>-report-phase=</a:t>
-            </a:r>
-            <a:r>
-              <a:rPr lang="en-US" dirty="0" err="1" smtClean="0">
-                <a:latin typeface="Courier New" panose="02070309020205020404" pitchFamily="49" charset="0"/>
-                <a:cs typeface="Courier New" panose="02070309020205020404" pitchFamily="49" charset="0"/>
-              </a:rPr>
-              <a:t>vec</a:t>
-            </a:r>
-            <a:r>
-              <a:rPr lang="en-US" dirty="0" smtClean="0">
-                <a:latin typeface="Courier New" panose="02070309020205020404" pitchFamily="49" charset="0"/>
-                <a:cs typeface="Courier New" panose="02070309020205020404" pitchFamily="49" charset="0"/>
-              </a:rPr>
-              <a:t> \</a:t>
-            </a:r>
-            <a:br>
-              <a:rPr lang="en-US" dirty="0" smtClean="0">
-                <a:latin typeface="Courier New" panose="02070309020205020404" pitchFamily="49" charset="0"/>
-                <a:cs typeface="Courier New" panose="02070309020205020404" pitchFamily="49" charset="0"/>
-              </a:rPr>
-            </a:br>
-            <a:r>
-              <a:rPr lang="en-US" dirty="0" smtClean="0">
-                <a:latin typeface="Courier New" panose="02070309020205020404" pitchFamily="49" charset="0"/>
-                <a:cs typeface="Courier New" panose="02070309020205020404" pitchFamily="49" charset="0"/>
-              </a:rPr>
-              <a:t>  -</a:t>
-            </a:r>
-            <a:r>
-              <a:rPr lang="en-US" dirty="0" err="1">
-                <a:latin typeface="Courier New" panose="02070309020205020404" pitchFamily="49" charset="0"/>
-                <a:cs typeface="Courier New" panose="02070309020205020404" pitchFamily="49" charset="0"/>
-              </a:rPr>
-              <a:t>qopt</a:t>
-            </a:r>
-            <a:r>
-              <a:rPr lang="en-US" dirty="0">
-                <a:latin typeface="Courier New" panose="02070309020205020404" pitchFamily="49" charset="0"/>
-                <a:cs typeface="Courier New" panose="02070309020205020404" pitchFamily="49" charset="0"/>
-              </a:rPr>
-              <a:t>-report=3</a:t>
-            </a:r>
-            <a:endParaRPr lang="nl-BE" dirty="0">
-              <a:latin typeface="Courier New" panose="02070309020205020404" pitchFamily="49" charset="0"/>
-              <a:cs typeface="Courier New" panose="02070309020205020404" pitchFamily="49" charset="0"/>
-            </a:endParaRPr>
-          </a:p>
-        </p:txBody>
-      </p:sp>
-      <p:sp>
-        <p:nvSpPr>
-          <p:cNvPr id="4" name="Slide Number Placeholder 3"/>
-          <p:cNvSpPr>
-            <a:spLocks noGrp="1"/>
-          </p:cNvSpPr>
-          <p:nvPr>
-            <p:ph type="sldNum" sz="quarter" idx="12"/>
-          </p:nvPr>
-        </p:nvSpPr>
-        <p:spPr/>
-        <p:txBody>
-          <a:bodyPr/>
-          <a:lstStyle/>
-          <a:p>
-            <a:fld id="{6597116C-F94B-4B5B-973A-17F07FB5C418}" type="slidenum">
-              <a:rPr lang="nl-BE" smtClean="0"/>
-              <a:t>29</a:t>
-            </a:fld>
-            <a:endParaRPr lang="nl-BE"/>
-          </a:p>
-        </p:txBody>
-      </p:sp>
-      <p:sp>
-        <p:nvSpPr>
-          <p:cNvPr id="6" name="TextBox 5"/>
-          <p:cNvSpPr txBox="1"/>
-          <p:nvPr/>
-        </p:nvSpPr>
-        <p:spPr>
-          <a:xfrm>
-            <a:off x="395536" y="5949280"/>
-            <a:ext cx="6727547" cy="461665"/>
-          </a:xfrm>
-          <a:prstGeom prst="rect">
-            <a:avLst/>
-          </a:prstGeom>
-          <a:noFill/>
-          <a:ln>
-            <a:solidFill>
-              <a:schemeClr val="tx1"/>
-            </a:solidFill>
-          </a:ln>
-        </p:spPr>
-        <p:txBody>
-          <a:bodyPr wrap="none" rtlCol="0">
-            <a:spAutoFit/>
-          </a:bodyPr>
-          <a:lstStyle/>
-          <a:p>
-            <a:r>
-              <a:rPr lang="en-US" sz="2400" dirty="0" smtClean="0"/>
-              <a:t>Help compiler using, e.g., </a:t>
-            </a:r>
-            <a:r>
-              <a:rPr lang="en-US" sz="2400" dirty="0" smtClean="0">
-                <a:latin typeface="Courier New" panose="02070309020205020404" pitchFamily="49" charset="0"/>
-                <a:cs typeface="Courier New" panose="02070309020205020404" pitchFamily="49" charset="0"/>
-              </a:rPr>
-              <a:t>#pragma </a:t>
-            </a:r>
-            <a:r>
-              <a:rPr lang="en-US" sz="2400" dirty="0" err="1" smtClean="0">
-                <a:latin typeface="Courier New" panose="02070309020205020404" pitchFamily="49" charset="0"/>
-                <a:cs typeface="Courier New" panose="02070309020205020404" pitchFamily="49" charset="0"/>
-              </a:rPr>
-              <a:t>omp</a:t>
-            </a:r>
-            <a:r>
-              <a:rPr lang="en-US" sz="2400" dirty="0" smtClean="0">
-                <a:latin typeface="Courier New" panose="02070309020205020404" pitchFamily="49" charset="0"/>
-                <a:cs typeface="Courier New" panose="02070309020205020404" pitchFamily="49" charset="0"/>
-              </a:rPr>
-              <a:t> </a:t>
-            </a:r>
-            <a:r>
-              <a:rPr lang="en-US" sz="2400" dirty="0" err="1" smtClean="0">
-                <a:latin typeface="Courier New" panose="02070309020205020404" pitchFamily="49" charset="0"/>
-                <a:cs typeface="Courier New" panose="02070309020205020404" pitchFamily="49" charset="0"/>
-              </a:rPr>
-              <a:t>simd</a:t>
-            </a:r>
-            <a:r>
-              <a:rPr lang="en-US" sz="2400" dirty="0" smtClean="0">
-                <a:latin typeface="Courier New" panose="02070309020205020404" pitchFamily="49" charset="0"/>
-                <a:cs typeface="Courier New" panose="02070309020205020404" pitchFamily="49" charset="0"/>
-              </a:rPr>
-              <a:t> …</a:t>
-            </a:r>
-            <a:endParaRPr lang="nl-BE" sz="2400" dirty="0">
-              <a:latin typeface="Courier New" panose="02070309020205020404" pitchFamily="49" charset="0"/>
-              <a:cs typeface="Courier New" panose="02070309020205020404" pitchFamily="49" charset="0"/>
-            </a:endParaRPr>
-          </a:p>
-        </p:txBody>
-      </p:sp>
-    </p:spTree>
-    <p:extLst>
-      <p:ext uri="{BB962C8B-B14F-4D97-AF65-F5344CB8AC3E}">
-        <p14:creationId xmlns:p14="http://schemas.microsoft.com/office/powerpoint/2010/main" val="1878102497"/>
-      </p:ext>
-    </p:extLst>
-  </p:cSld>
-  <p:clrMapOvr>
-    <a:masterClrMapping/>
-  </p:clrMapOvr>
+  <p:timing>
+    <p:tnLst>
+      <p:par>
+        <p:cTn id="1" dur="indefinite" restart="never" nodeType="tmRoot">
+          <p:childTnLst>
+            <p:seq concurrent="1" nextAc="seek">
+              <p:cTn id="2" dur="indefinite" nodeType="mainSeq">
+                <p:childTnLst>
+                  <p:par>
+                    <p:cTn id="3" fill="hold">
+                      <p:stCondLst>
+                        <p:cond delay="indefinite"/>
+                        <p:cond evt="onBegin" delay="0">
+                          <p:tn val="2"/>
+                        </p:cond>
+                      </p:stCondLst>
+                      <p:childTnLst>
+                        <p:par>
+                          <p:cTn id="4" fill="hold">
+                            <p:stCondLst>
+                              <p:cond delay="0"/>
+                            </p:stCondLst>
+                            <p:childTnLst>
+                              <p:par>
+                                <p:cTn id="5" presetID="1" presetClass="entr" presetSubtype="0" fill="hold" grpId="0" nodeType="withEffect">
+                                  <p:stCondLst>
+                                    <p:cond delay="0"/>
+                                  </p:stCondLst>
+                                  <p:childTnLst>
+                                    <p:set>
+                                      <p:cBhvr>
+                                        <p:cTn id="6" dur="1" fill="hold">
+                                          <p:stCondLst>
+                                            <p:cond delay="0"/>
+                                          </p:stCondLst>
+                                        </p:cTn>
+                                        <p:tgtEl>
+                                          <p:spTgt spid="3">
+                                            <p:txEl>
+                                              <p:pRg st="0" end="0"/>
+                                            </p:txEl>
+                                          </p:spTgt>
+                                        </p:tgtEl>
+                                        <p:attrNameLst>
+                                          <p:attrName>style.visibility</p:attrName>
+                                        </p:attrNameLst>
+                                      </p:cBhvr>
+                                      <p:to>
+                                        <p:strVal val="visible"/>
+                                      </p:to>
+                                    </p:set>
+                                  </p:childTnLst>
+                                </p:cTn>
+                              </p:par>
+                              <p:par>
+                                <p:cTn id="7" presetID="1" presetClass="entr" presetSubtype="0" fill="hold" grpId="0" nodeType="withEffect">
+                                  <p:stCondLst>
+                                    <p:cond delay="0"/>
+                                  </p:stCondLst>
+                                  <p:childTnLst>
+                                    <p:set>
+                                      <p:cBhvr>
+                                        <p:cTn id="8" dur="1" fill="hold">
+                                          <p:stCondLst>
+                                            <p:cond delay="0"/>
+                                          </p:stCondLst>
+                                        </p:cTn>
+                                        <p:tgtEl>
+                                          <p:spTgt spid="5"/>
+                                        </p:tgtEl>
+                                        <p:attrNameLst>
+                                          <p:attrName>style.visibility</p:attrName>
+                                        </p:attrNameLst>
+                                      </p:cBhvr>
+                                      <p:to>
+                                        <p:strVal val="visible"/>
+                                      </p:to>
+                                    </p:set>
+                                  </p:childTnLst>
+                                </p:cTn>
+                              </p:par>
+                            </p:childTnLst>
+                          </p:cTn>
+                        </p:par>
+                      </p:childTnLst>
+                    </p:cTn>
+                  </p:par>
+                  <p:par>
+                    <p:cTn id="9" fill="hold">
+                      <p:stCondLst>
+                        <p:cond delay="indefinite"/>
+                      </p:stCondLst>
+                      <p:childTnLst>
+                        <p:par>
+                          <p:cTn id="10" fill="hold">
+                            <p:stCondLst>
+                              <p:cond delay="0"/>
+                            </p:stCondLst>
+                            <p:childTnLst>
+                              <p:par>
+                                <p:cTn id="11" presetID="1" presetClass="entr" presetSubtype="0" fill="hold" grpId="0" nodeType="clickEffect">
+                                  <p:stCondLst>
+                                    <p:cond delay="0"/>
+                                  </p:stCondLst>
+                                  <p:childTnLst>
+                                    <p:set>
+                                      <p:cBhvr>
+                                        <p:cTn id="12" dur="1" fill="hold">
+                                          <p:stCondLst>
+                                            <p:cond delay="0"/>
+                                          </p:stCondLst>
+                                        </p:cTn>
+                                        <p:tgtEl>
+                                          <p:spTgt spid="7"/>
+                                        </p:tgtEl>
+                                        <p:attrNameLst>
+                                          <p:attrName>style.visibility</p:attrName>
+                                        </p:attrNameLst>
+                                      </p:cBhvr>
+                                      <p:to>
+                                        <p:strVal val="visible"/>
+                                      </p:to>
+                                    </p:set>
+                                  </p:childTnLst>
+                                </p:cTn>
+                              </p:par>
+                            </p:childTnLst>
+                          </p:cTn>
+                        </p:par>
+                      </p:childTnLst>
+                    </p:cTn>
+                  </p:par>
+                  <p:par>
+                    <p:cTn id="13" fill="hold">
+                      <p:stCondLst>
+                        <p:cond delay="indefinite"/>
+                      </p:stCondLst>
+                      <p:childTnLst>
+                        <p:par>
+                          <p:cTn id="14" fill="hold">
+                            <p:stCondLst>
+                              <p:cond delay="0"/>
+                            </p:stCondLst>
+                            <p:childTnLst>
+                              <p:par>
+                                <p:cTn id="15" presetID="1" presetClass="entr" presetSubtype="0" fill="hold" grpId="0" nodeType="clickEffect">
+                                  <p:stCondLst>
+                                    <p:cond delay="0"/>
+                                  </p:stCondLst>
+                                  <p:childTnLst>
+                                    <p:set>
+                                      <p:cBhvr>
+                                        <p:cTn id="16" dur="1" fill="hold">
+                                          <p:stCondLst>
+                                            <p:cond delay="0"/>
+                                          </p:stCondLst>
+                                        </p:cTn>
+                                        <p:tgtEl>
+                                          <p:spTgt spid="9"/>
+                                        </p:tgtEl>
+                                        <p:attrNameLst>
+                                          <p:attrName>style.visibility</p:attrName>
+                                        </p:attrNameLst>
+                                      </p:cBhvr>
+                                      <p:to>
+                                        <p:strVal val="visible"/>
+                                      </p:to>
+                                    </p:set>
+                                  </p:childTnLst>
+                                </p:cTn>
+                              </p:par>
+                            </p:childTnLst>
+                          </p:cTn>
+                        </p:par>
+                      </p:childTnLst>
+                    </p:cTn>
+                  </p:par>
+                  <p:par>
+                    <p:cTn id="17" fill="hold">
+                      <p:stCondLst>
+                        <p:cond delay="indefinite"/>
+                      </p:stCondLst>
+                      <p:childTnLst>
+                        <p:par>
+                          <p:cTn id="18" fill="hold">
+                            <p:stCondLst>
+                              <p:cond delay="0"/>
+                            </p:stCondLst>
+                            <p:childTnLst>
+                              <p:par>
+                                <p:cTn id="19" presetID="1" presetClass="entr" presetSubtype="0" fill="hold" grpId="0" nodeType="clickEffect">
+                                  <p:stCondLst>
+                                    <p:cond delay="0"/>
+                                  </p:stCondLst>
+                                  <p:childTnLst>
+                                    <p:set>
+                                      <p:cBhvr>
+                                        <p:cTn id="20" dur="1" fill="hold">
+                                          <p:stCondLst>
+                                            <p:cond delay="0"/>
+                                          </p:stCondLst>
+                                        </p:cTn>
+                                        <p:tgtEl>
+                                          <p:spTgt spid="3">
+                                            <p:txEl>
+                                              <p:pRg st="4" end="4"/>
+                                            </p:txEl>
+                                          </p:spTgt>
+                                        </p:tgtEl>
+                                        <p:attrNameLst>
+                                          <p:attrName>style.visibility</p:attrName>
+                                        </p:attrNameLst>
+                                      </p:cBhvr>
+                                      <p:to>
+                                        <p:strVal val="visible"/>
+                                      </p:to>
+                                    </p:set>
+                                  </p:childTnLst>
+                                </p:cTn>
+                              </p:par>
+                              <p:par>
+                                <p:cTn id="21" presetID="1" presetClass="entr" presetSubtype="0" fill="hold" grpId="0" nodeType="withEffect">
+                                  <p:stCondLst>
+                                    <p:cond delay="0"/>
+                                  </p:stCondLst>
+                                  <p:childTnLst>
+                                    <p:set>
+                                      <p:cBhvr>
+                                        <p:cTn id="22" dur="1" fill="hold">
+                                          <p:stCondLst>
+                                            <p:cond delay="0"/>
+                                          </p:stCondLst>
+                                        </p:cTn>
+                                        <p:tgtEl>
+                                          <p:spTgt spid="6"/>
+                                        </p:tgtEl>
+                                        <p:attrNameLst>
+                                          <p:attrName>style.visibility</p:attrName>
+                                        </p:attrNameLst>
+                                      </p:cBhvr>
+                                      <p:to>
+                                        <p:strVal val="visible"/>
+                                      </p:to>
+                                    </p:set>
+                                  </p:childTnLst>
+                                </p:cTn>
+                              </p:par>
+                            </p:childTnLst>
+                          </p:cTn>
+                        </p:par>
+                      </p:childTnLst>
+                    </p:cTn>
+                  </p:par>
+                  <p:par>
+                    <p:cTn id="23" fill="hold">
+                      <p:stCondLst>
+                        <p:cond delay="indefinite"/>
+                      </p:stCondLst>
+                      <p:childTnLst>
+                        <p:par>
+                          <p:cTn id="24" fill="hold">
+                            <p:stCondLst>
+                              <p:cond delay="0"/>
+                            </p:stCondLst>
+                            <p:childTnLst>
+                              <p:par>
+                                <p:cTn id="25" presetID="1" presetClass="entr" presetSubtype="0" fill="hold" grpId="0" nodeType="clickEffect">
+                                  <p:stCondLst>
+                                    <p:cond delay="0"/>
+                                  </p:stCondLst>
+                                  <p:childTnLst>
+                                    <p:set>
+                                      <p:cBhvr>
+                                        <p:cTn id="26" dur="1" fill="hold">
+                                          <p:stCondLst>
+                                            <p:cond delay="0"/>
+                                          </p:stCondLst>
+                                        </p:cTn>
+                                        <p:tgtEl>
+                                          <p:spTgt spid="8"/>
+                                        </p:tgtEl>
+                                        <p:attrNameLst>
+                                          <p:attrName>style.visibility</p:attrName>
+                                        </p:attrNameLst>
+                                      </p:cBhvr>
+                                      <p:to>
+                                        <p:strVal val="visible"/>
+                                      </p:to>
+                                    </p:set>
+                                  </p:childTnLst>
+                                </p:cTn>
+                              </p:par>
+                            </p:childTnLst>
+                          </p:cTn>
+                        </p:par>
+                      </p:childTnLst>
+                    </p:cTn>
+                  </p:par>
+                </p:childTnLst>
+              </p:cTn>
+              <p:prevCondLst>
+                <p:cond evt="onPrev" delay="0">
+                  <p:tgtEl>
+                    <p:sldTgt/>
+                  </p:tgtEl>
+                </p:cond>
+              </p:prevCondLst>
+              <p:nextCondLst>
+                <p:cond evt="onNext" delay="0">
+                  <p:tgtEl>
+                    <p:sldTgt/>
+                  </p:tgtEl>
+                </p:cond>
+              </p:nextCondLst>
+            </p:seq>
+          </p:childTnLst>
+        </p:cTn>
+      </p:par>
+    </p:tnLst>
+    <p:bldLst>
+      <p:bldP spid="3" grpId="0" uiExpand="1" build="p"/>
+      <p:bldP spid="5" grpId="0" animBg="1"/>
+      <p:bldP spid="6" grpId="0" animBg="1"/>
+      <p:bldP spid="7" grpId="0" animBg="1"/>
+      <p:bldP spid="8" grpId="0" animBg="1"/>
+      <p:bldP spid="9" grpId="0" animBg="1"/>
+    </p:bldLst>
+  </p:timing>
 </p:sld>
 </file>
 
@@ -25601,7 +26820,7 @@
           <a:lstStyle/>
           <a:p>
             <a:r>
-              <a:rPr lang="en-US" dirty="0" smtClean="0"/>
+              <a:rPr lang="en-US" dirty="0"/>
               <a:t>Moore's law</a:t>
             </a:r>
             <a:endParaRPr lang="nl-BE" dirty="0"/>
@@ -25623,15 +26842,50 @@
           <a:bodyPr/>
           <a:lstStyle/>
           <a:p>
-            <a:endParaRPr lang="en-US" dirty="0"/>
-          </a:p>
-          <a:p>
-            <a:endParaRPr lang="en-US" dirty="0" smtClean="0"/>
-          </a:p>
-          <a:p>
-            <a:endParaRPr lang="en-US" dirty="0"/>
-          </a:p>
-          <a:p>
+            <a:r>
+              <a:rPr lang="en-US" dirty="0" smtClean="0"/>
+              <a:t>In the good, old days…</a:t>
+            </a:r>
+          </a:p>
+          <a:p>
+            <a:pPr lvl="1"/>
+            <a:r>
+              <a:rPr lang="en-US" dirty="0" smtClean="0"/>
+              <a:t>CPU clock frequency increased:</a:t>
+            </a:r>
+            <a:br>
+              <a:rPr lang="en-US" dirty="0" smtClean="0"/>
+            </a:br>
+            <a:r>
+              <a:rPr lang="en-US" dirty="0" smtClean="0"/>
+              <a:t>performance was free lunch</a:t>
+            </a:r>
+          </a:p>
+          <a:p>
+            <a:r>
+              <a:rPr lang="en-US" dirty="0" smtClean="0"/>
+              <a:t>Problems</a:t>
+            </a:r>
+          </a:p>
+          <a:p>
+            <a:pPr lvl="1"/>
+            <a:r>
+              <a:rPr lang="en-US" dirty="0" smtClean="0"/>
+              <a:t>Heat dissipation</a:t>
+            </a:r>
+          </a:p>
+          <a:p>
+            <a:pPr lvl="1"/>
+            <a:r>
+              <a:rPr lang="en-US" dirty="0" smtClean="0"/>
+              <a:t>Power efficiency</a:t>
+            </a:r>
+          </a:p>
+          <a:p>
+            <a:r>
+              <a:rPr lang="en-US" dirty="0" smtClean="0"/>
+              <a:t>However…</a:t>
+            </a:r>
             <a:endParaRPr lang="nl-BE" dirty="0"/>
           </a:p>
         </p:txBody>
@@ -25667,7 +26921,7 @@
         </p:nvSpPr>
         <p:spPr>
           <a:xfrm>
-            <a:off x="683568" y="1826821"/>
+            <a:off x="683568" y="5499229"/>
             <a:ext cx="7704856" cy="954107"/>
           </a:xfrm>
           <a:prstGeom prst="rect">
@@ -25703,20 +26957,1237 @@
           </a:p>
         </p:txBody>
       </p:sp>
+      <p:graphicFrame>
+        <p:nvGraphicFramePr>
+          <p:cNvPr id="6" name="Object 5"/>
+          <p:cNvGraphicFramePr>
+            <a:graphicFrameLocks noChangeAspect="1"/>
+          </p:cNvGraphicFramePr>
+          <p:nvPr>
+            <p:extLst>
+              <p:ext uri="{D42A27DB-BD31-4B8C-83A1-F6EECF244321}">
+                <p14:modId xmlns:p14="http://schemas.microsoft.com/office/powerpoint/2010/main" val="2892907508"/>
+              </p:ext>
+            </p:extLst>
+          </p:nvPr>
+        </p:nvGraphicFramePr>
+        <p:xfrm>
+          <a:off x="4716016" y="4005064"/>
+          <a:ext cx="2609850" cy="619125"/>
+        </p:xfrm>
+        <a:graphic>
+          <a:graphicData uri="http://schemas.openxmlformats.org/presentationml/2006/ole">
+            <mc:AlternateContent xmlns:mc="http://schemas.openxmlformats.org/markup-compatibility/2006">
+              <mc:Choice xmlns:v="urn:schemas-microsoft-com:vml" Requires="v">
+                <p:oleObj spid="_x0000_s3081" name="Equation" r:id="rId3" imgW="965160" imgH="228600" progId="Equation.3">
+                  <p:embed/>
+                </p:oleObj>
+              </mc:Choice>
+              <mc:Fallback>
+                <p:oleObj name="Equation" r:id="rId3" imgW="965160" imgH="228600" progId="Equation.3">
+                  <p:embed/>
+                  <p:pic>
+                    <p:nvPicPr>
+                      <p:cNvPr id="0" name=""/>
+                      <p:cNvPicPr/>
+                      <p:nvPr/>
+                    </p:nvPicPr>
+                    <p:blipFill>
+                      <a:blip r:embed="rId4"/>
+                      <a:stretch>
+                        <a:fillRect/>
+                      </a:stretch>
+                    </p:blipFill>
+                    <p:spPr>
+                      <a:xfrm>
+                        <a:off x="4716016" y="4005064"/>
+                        <a:ext cx="2609850" cy="619125"/>
+                      </a:xfrm>
+                      <a:prstGeom prst="rect">
+                        <a:avLst/>
+                      </a:prstGeom>
+                      <a:ln>
+                        <a:solidFill>
+                          <a:schemeClr val="tx1"/>
+                        </a:solidFill>
+                      </a:ln>
+                    </p:spPr>
+                  </p:pic>
+                </p:oleObj>
+              </mc:Fallback>
+            </mc:AlternateContent>
+          </a:graphicData>
+        </a:graphic>
+      </p:graphicFrame>
     </p:spTree>
     <p:extLst>
       <p:ext uri="{BB962C8B-B14F-4D97-AF65-F5344CB8AC3E}">
-        <p14:creationId xmlns:p14="http://schemas.microsoft.com/office/powerpoint/2010/main" val="140208366"/>
+        <p14:creationId xmlns:p14="http://schemas.microsoft.com/office/powerpoint/2010/main" val="3338152140"/>
       </p:ext>
     </p:extLst>
   </p:cSld>
   <p:clrMapOvr>
     <a:masterClrMapping/>
   </p:clrMapOvr>
+  <p:timing>
+    <p:tnLst>
+      <p:par>
+        <p:cTn id="1" dur="indefinite" restart="never" nodeType="tmRoot">
+          <p:childTnLst>
+            <p:seq concurrent="1" nextAc="seek">
+              <p:cTn id="2" dur="indefinite" nodeType="mainSeq">
+                <p:childTnLst>
+                  <p:par>
+                    <p:cTn id="3" fill="hold">
+                      <p:stCondLst>
+                        <p:cond delay="indefinite"/>
+                        <p:cond evt="onBegin" delay="0">
+                          <p:tn val="2"/>
+                        </p:cond>
+                      </p:stCondLst>
+                      <p:childTnLst>
+                        <p:par>
+                          <p:cTn id="4" fill="hold">
+                            <p:stCondLst>
+                              <p:cond delay="0"/>
+                            </p:stCondLst>
+                            <p:childTnLst>
+                              <p:par>
+                                <p:cTn id="5" presetID="1" presetClass="entr" presetSubtype="0" fill="hold" grpId="0" nodeType="withEffect">
+                                  <p:stCondLst>
+                                    <p:cond delay="0"/>
+                                  </p:stCondLst>
+                                  <p:childTnLst>
+                                    <p:set>
+                                      <p:cBhvr>
+                                        <p:cTn id="6" dur="1" fill="hold">
+                                          <p:stCondLst>
+                                            <p:cond delay="0"/>
+                                          </p:stCondLst>
+                                        </p:cTn>
+                                        <p:tgtEl>
+                                          <p:spTgt spid="3">
+                                            <p:txEl>
+                                              <p:pRg st="0" end="0"/>
+                                            </p:txEl>
+                                          </p:spTgt>
+                                        </p:tgtEl>
+                                        <p:attrNameLst>
+                                          <p:attrName>style.visibility</p:attrName>
+                                        </p:attrNameLst>
+                                      </p:cBhvr>
+                                      <p:to>
+                                        <p:strVal val="visible"/>
+                                      </p:to>
+                                    </p:set>
+                                  </p:childTnLst>
+                                </p:cTn>
+                              </p:par>
+                              <p:par>
+                                <p:cTn id="7" presetID="1" presetClass="entr" presetSubtype="0" fill="hold" grpId="0" nodeType="withEffect">
+                                  <p:stCondLst>
+                                    <p:cond delay="0"/>
+                                  </p:stCondLst>
+                                  <p:childTnLst>
+                                    <p:set>
+                                      <p:cBhvr>
+                                        <p:cTn id="8" dur="1" fill="hold">
+                                          <p:stCondLst>
+                                            <p:cond delay="0"/>
+                                          </p:stCondLst>
+                                        </p:cTn>
+                                        <p:tgtEl>
+                                          <p:spTgt spid="3">
+                                            <p:txEl>
+                                              <p:pRg st="1" end="1"/>
+                                            </p:txEl>
+                                          </p:spTgt>
+                                        </p:tgtEl>
+                                        <p:attrNameLst>
+                                          <p:attrName>style.visibility</p:attrName>
+                                        </p:attrNameLst>
+                                      </p:cBhvr>
+                                      <p:to>
+                                        <p:strVal val="visible"/>
+                                      </p:to>
+                                    </p:set>
+                                  </p:childTnLst>
+                                </p:cTn>
+                              </p:par>
+                            </p:childTnLst>
+                          </p:cTn>
+                        </p:par>
+                      </p:childTnLst>
+                    </p:cTn>
+                  </p:par>
+                  <p:par>
+                    <p:cTn id="9" fill="hold">
+                      <p:stCondLst>
+                        <p:cond delay="indefinite"/>
+                      </p:stCondLst>
+                      <p:childTnLst>
+                        <p:par>
+                          <p:cTn id="10" fill="hold">
+                            <p:stCondLst>
+                              <p:cond delay="0"/>
+                            </p:stCondLst>
+                            <p:childTnLst>
+                              <p:par>
+                                <p:cTn id="11" presetID="1" presetClass="entr" presetSubtype="0" fill="hold" grpId="0" nodeType="clickEffect">
+                                  <p:stCondLst>
+                                    <p:cond delay="0"/>
+                                  </p:stCondLst>
+                                  <p:childTnLst>
+                                    <p:set>
+                                      <p:cBhvr>
+                                        <p:cTn id="12" dur="1" fill="hold">
+                                          <p:stCondLst>
+                                            <p:cond delay="0"/>
+                                          </p:stCondLst>
+                                        </p:cTn>
+                                        <p:tgtEl>
+                                          <p:spTgt spid="3">
+                                            <p:txEl>
+                                              <p:pRg st="2" end="2"/>
+                                            </p:txEl>
+                                          </p:spTgt>
+                                        </p:tgtEl>
+                                        <p:attrNameLst>
+                                          <p:attrName>style.visibility</p:attrName>
+                                        </p:attrNameLst>
+                                      </p:cBhvr>
+                                      <p:to>
+                                        <p:strVal val="visible"/>
+                                      </p:to>
+                                    </p:set>
+                                  </p:childTnLst>
+                                </p:cTn>
+                              </p:par>
+                              <p:par>
+                                <p:cTn id="13" presetID="1" presetClass="entr" presetSubtype="0" fill="hold" grpId="0" nodeType="withEffect">
+                                  <p:stCondLst>
+                                    <p:cond delay="0"/>
+                                  </p:stCondLst>
+                                  <p:childTnLst>
+                                    <p:set>
+                                      <p:cBhvr>
+                                        <p:cTn id="14" dur="1" fill="hold">
+                                          <p:stCondLst>
+                                            <p:cond delay="0"/>
+                                          </p:stCondLst>
+                                        </p:cTn>
+                                        <p:tgtEl>
+                                          <p:spTgt spid="3">
+                                            <p:txEl>
+                                              <p:pRg st="3" end="3"/>
+                                            </p:txEl>
+                                          </p:spTgt>
+                                        </p:tgtEl>
+                                        <p:attrNameLst>
+                                          <p:attrName>style.visibility</p:attrName>
+                                        </p:attrNameLst>
+                                      </p:cBhvr>
+                                      <p:to>
+                                        <p:strVal val="visible"/>
+                                      </p:to>
+                                    </p:set>
+                                  </p:childTnLst>
+                                </p:cTn>
+                              </p:par>
+                              <p:par>
+                                <p:cTn id="15" presetID="1" presetClass="entr" presetSubtype="0" fill="hold" grpId="0" nodeType="withEffect">
+                                  <p:stCondLst>
+                                    <p:cond delay="0"/>
+                                  </p:stCondLst>
+                                  <p:childTnLst>
+                                    <p:set>
+                                      <p:cBhvr>
+                                        <p:cTn id="16" dur="1" fill="hold">
+                                          <p:stCondLst>
+                                            <p:cond delay="0"/>
+                                          </p:stCondLst>
+                                        </p:cTn>
+                                        <p:tgtEl>
+                                          <p:spTgt spid="3">
+                                            <p:txEl>
+                                              <p:pRg st="4" end="4"/>
+                                            </p:txEl>
+                                          </p:spTgt>
+                                        </p:tgtEl>
+                                        <p:attrNameLst>
+                                          <p:attrName>style.visibility</p:attrName>
+                                        </p:attrNameLst>
+                                      </p:cBhvr>
+                                      <p:to>
+                                        <p:strVal val="visible"/>
+                                      </p:to>
+                                    </p:set>
+                                  </p:childTnLst>
+                                </p:cTn>
+                              </p:par>
+                            </p:childTnLst>
+                          </p:cTn>
+                        </p:par>
+                      </p:childTnLst>
+                    </p:cTn>
+                  </p:par>
+                  <p:par>
+                    <p:cTn id="17" fill="hold">
+                      <p:stCondLst>
+                        <p:cond delay="indefinite"/>
+                      </p:stCondLst>
+                      <p:childTnLst>
+                        <p:par>
+                          <p:cTn id="18" fill="hold">
+                            <p:stCondLst>
+                              <p:cond delay="0"/>
+                            </p:stCondLst>
+                            <p:childTnLst>
+                              <p:par>
+                                <p:cTn id="19" presetID="1" presetClass="entr" presetSubtype="0" fill="hold" nodeType="clickEffect">
+                                  <p:stCondLst>
+                                    <p:cond delay="0"/>
+                                  </p:stCondLst>
+                                  <p:childTnLst>
+                                    <p:set>
+                                      <p:cBhvr>
+                                        <p:cTn id="20" dur="1" fill="hold">
+                                          <p:stCondLst>
+                                            <p:cond delay="0"/>
+                                          </p:stCondLst>
+                                        </p:cTn>
+                                        <p:tgtEl>
+                                          <p:spTgt spid="6"/>
+                                        </p:tgtEl>
+                                        <p:attrNameLst>
+                                          <p:attrName>style.visibility</p:attrName>
+                                        </p:attrNameLst>
+                                      </p:cBhvr>
+                                      <p:to>
+                                        <p:strVal val="visible"/>
+                                      </p:to>
+                                    </p:set>
+                                  </p:childTnLst>
+                                </p:cTn>
+                              </p:par>
+                            </p:childTnLst>
+                          </p:cTn>
+                        </p:par>
+                      </p:childTnLst>
+                    </p:cTn>
+                  </p:par>
+                  <p:par>
+                    <p:cTn id="21" fill="hold">
+                      <p:stCondLst>
+                        <p:cond delay="indefinite"/>
+                      </p:stCondLst>
+                      <p:childTnLst>
+                        <p:par>
+                          <p:cTn id="22" fill="hold">
+                            <p:stCondLst>
+                              <p:cond delay="0"/>
+                            </p:stCondLst>
+                            <p:childTnLst>
+                              <p:par>
+                                <p:cTn id="23" presetID="1" presetClass="entr" presetSubtype="0" fill="hold" grpId="0" nodeType="clickEffect">
+                                  <p:stCondLst>
+                                    <p:cond delay="0"/>
+                                  </p:stCondLst>
+                                  <p:childTnLst>
+                                    <p:set>
+                                      <p:cBhvr>
+                                        <p:cTn id="24" dur="1" fill="hold">
+                                          <p:stCondLst>
+                                            <p:cond delay="0"/>
+                                          </p:stCondLst>
+                                        </p:cTn>
+                                        <p:tgtEl>
+                                          <p:spTgt spid="3">
+                                            <p:txEl>
+                                              <p:pRg st="5" end="5"/>
+                                            </p:txEl>
+                                          </p:spTgt>
+                                        </p:tgtEl>
+                                        <p:attrNameLst>
+                                          <p:attrName>style.visibility</p:attrName>
+                                        </p:attrNameLst>
+                                      </p:cBhvr>
+                                      <p:to>
+                                        <p:strVal val="visible"/>
+                                      </p:to>
+                                    </p:set>
+                                  </p:childTnLst>
+                                </p:cTn>
+                              </p:par>
+                              <p:par>
+                                <p:cTn id="25" presetID="1" presetClass="entr" presetSubtype="0" fill="hold" grpId="0" nodeType="withEffect">
+                                  <p:stCondLst>
+                                    <p:cond delay="0"/>
+                                  </p:stCondLst>
+                                  <p:childTnLst>
+                                    <p:set>
+                                      <p:cBhvr>
+                                        <p:cTn id="26" dur="1" fill="hold">
+                                          <p:stCondLst>
+                                            <p:cond delay="0"/>
+                                          </p:stCondLst>
+                                        </p:cTn>
+                                        <p:tgtEl>
+                                          <p:spTgt spid="5"/>
+                                        </p:tgtEl>
+                                        <p:attrNameLst>
+                                          <p:attrName>style.visibility</p:attrName>
+                                        </p:attrNameLst>
+                                      </p:cBhvr>
+                                      <p:to>
+                                        <p:strVal val="visible"/>
+                                      </p:to>
+                                    </p:set>
+                                  </p:childTnLst>
+                                </p:cTn>
+                              </p:par>
+                            </p:childTnLst>
+                          </p:cTn>
+                        </p:par>
+                      </p:childTnLst>
+                    </p:cTn>
+                  </p:par>
+                </p:childTnLst>
+              </p:cTn>
+              <p:prevCondLst>
+                <p:cond evt="onPrev" delay="0">
+                  <p:tgtEl>
+                    <p:sldTgt/>
+                  </p:tgtEl>
+                </p:cond>
+              </p:prevCondLst>
+              <p:nextCondLst>
+                <p:cond evt="onNext" delay="0">
+                  <p:tgtEl>
+                    <p:sldTgt/>
+                  </p:tgtEl>
+                </p:cond>
+              </p:nextCondLst>
+            </p:seq>
+          </p:childTnLst>
+        </p:cTn>
+      </p:par>
+    </p:tnLst>
+    <p:bldLst>
+      <p:bldP spid="3" grpId="0" uiExpand="1" build="p"/>
+      <p:bldP spid="5" grpId="0" animBg="1"/>
+    </p:bldLst>
+  </p:timing>
 </p:sld>
 </file>
 
 <file path=ppt/slides/slide30.xml><?xml version="1.0" encoding="utf-8"?>
+<p:sld xmlns:a="http://schemas.openxmlformats.org/drawingml/2006/main" xmlns:r="http://schemas.openxmlformats.org/officeDocument/2006/relationships" xmlns:p="http://schemas.openxmlformats.org/presentationml/2006/main">
+  <p:cSld>
+    <p:spTree>
+      <p:nvGrpSpPr>
+        <p:cNvPr id="1" name=""/>
+        <p:cNvGrpSpPr/>
+        <p:nvPr/>
+      </p:nvGrpSpPr>
+      <p:grpSpPr>
+        <a:xfrm>
+          <a:off x="0" y="0"/>
+          <a:ext cx="0" cy="0"/>
+          <a:chOff x="0" y="0"/>
+          <a:chExt cx="0" cy="0"/>
+        </a:xfrm>
+      </p:grpSpPr>
+      <p:sp>
+        <p:nvSpPr>
+          <p:cNvPr id="2" name="Title 1"/>
+          <p:cNvSpPr>
+            <a:spLocks noGrp="1"/>
+          </p:cNvSpPr>
+          <p:nvPr>
+            <p:ph type="title"/>
+          </p:nvPr>
+        </p:nvSpPr>
+        <p:spPr/>
+        <p:txBody>
+          <a:bodyPr/>
+          <a:lstStyle/>
+          <a:p>
+            <a:r>
+              <a:rPr lang="en-US" dirty="0" smtClean="0"/>
+              <a:t>Compiler flags &amp; directives</a:t>
+            </a:r>
+            <a:endParaRPr lang="nl-BE" dirty="0"/>
+          </a:p>
+        </p:txBody>
+      </p:sp>
+      <p:sp>
+        <p:nvSpPr>
+          <p:cNvPr id="3" name="Content Placeholder 2"/>
+          <p:cNvSpPr>
+            <a:spLocks noGrp="1"/>
+          </p:cNvSpPr>
+          <p:nvPr>
+            <p:ph idx="1"/>
+          </p:nvPr>
+        </p:nvSpPr>
+        <p:spPr/>
+        <p:txBody>
+          <a:bodyPr>
+            <a:normAutofit fontScale="92500" lnSpcReduction="20000"/>
+          </a:bodyPr>
+          <a:lstStyle/>
+          <a:p>
+            <a:r>
+              <a:rPr lang="en-US" dirty="0" smtClean="0"/>
+              <a:t>GCC compiler family</a:t>
+            </a:r>
+          </a:p>
+          <a:p>
+            <a:pPr lvl="1"/>
+            <a:r>
+              <a:rPr lang="en-US" dirty="0" err="1" smtClean="0">
+                <a:latin typeface="Courier New" panose="02070309020205020404" pitchFamily="49" charset="0"/>
+                <a:cs typeface="Courier New" panose="02070309020205020404" pitchFamily="49" charset="0"/>
+              </a:rPr>
+              <a:t>gcc</a:t>
+            </a:r>
+            <a:r>
+              <a:rPr lang="en-US" dirty="0" smtClean="0">
+                <a:latin typeface="Courier New" panose="02070309020205020404" pitchFamily="49" charset="0"/>
+                <a:cs typeface="Courier New" panose="02070309020205020404" pitchFamily="49" charset="0"/>
+              </a:rPr>
+              <a:t> </a:t>
+            </a:r>
+            <a:r>
+              <a:rPr lang="en-US" dirty="0">
+                <a:latin typeface="Courier New" panose="02070309020205020404" pitchFamily="49" charset="0"/>
+                <a:cs typeface="Courier New" panose="02070309020205020404" pitchFamily="49" charset="0"/>
+              </a:rPr>
+              <a:t>–march=corei7-avx </a:t>
+            </a:r>
+            <a:r>
+              <a:rPr lang="en-US" dirty="0" smtClean="0">
+                <a:latin typeface="Courier New" panose="02070309020205020404" pitchFamily="49" charset="0"/>
+                <a:cs typeface="Courier New" panose="02070309020205020404" pitchFamily="49" charset="0"/>
+              </a:rPr>
+              <a:t>–O3 …</a:t>
+            </a:r>
+            <a:endParaRPr lang="en-US" dirty="0">
+              <a:latin typeface="Courier New" panose="02070309020205020404" pitchFamily="49" charset="0"/>
+              <a:cs typeface="Courier New" panose="02070309020205020404" pitchFamily="49" charset="0"/>
+            </a:endParaRPr>
+          </a:p>
+          <a:p>
+            <a:pPr lvl="1"/>
+            <a:r>
+              <a:rPr lang="en-US" dirty="0" err="1">
+                <a:latin typeface="Courier New" panose="02070309020205020404" pitchFamily="49" charset="0"/>
+                <a:cs typeface="Courier New" panose="02070309020205020404" pitchFamily="49" charset="0"/>
+              </a:rPr>
+              <a:t>g</a:t>
+            </a:r>
+            <a:r>
+              <a:rPr lang="en-US" dirty="0" err="1" smtClean="0">
+                <a:latin typeface="Courier New" panose="02070309020205020404" pitchFamily="49" charset="0"/>
+                <a:cs typeface="Courier New" panose="02070309020205020404" pitchFamily="49" charset="0"/>
+              </a:rPr>
+              <a:t>cc</a:t>
+            </a:r>
+            <a:r>
+              <a:rPr lang="en-US" dirty="0" smtClean="0">
+                <a:latin typeface="Courier New" panose="02070309020205020404" pitchFamily="49" charset="0"/>
+                <a:cs typeface="Courier New" panose="02070309020205020404" pitchFamily="49" charset="0"/>
+              </a:rPr>
+              <a:t> –</a:t>
+            </a:r>
+            <a:r>
+              <a:rPr lang="en-US" dirty="0" err="1" smtClean="0">
+                <a:latin typeface="Courier New" panose="02070309020205020404" pitchFamily="49" charset="0"/>
+                <a:cs typeface="Courier New" panose="02070309020205020404" pitchFamily="49" charset="0"/>
+              </a:rPr>
+              <a:t>ftree-vectorize</a:t>
+            </a:r>
+            <a:r>
+              <a:rPr lang="en-US" dirty="0" smtClean="0">
+                <a:latin typeface="Courier New" panose="02070309020205020404" pitchFamily="49" charset="0"/>
+                <a:cs typeface="Courier New" panose="02070309020205020404" pitchFamily="49" charset="0"/>
+              </a:rPr>
+              <a:t> \</a:t>
+            </a:r>
+            <a:br>
+              <a:rPr lang="en-US" dirty="0" smtClean="0">
+                <a:latin typeface="Courier New" panose="02070309020205020404" pitchFamily="49" charset="0"/>
+                <a:cs typeface="Courier New" panose="02070309020205020404" pitchFamily="49" charset="0"/>
+              </a:rPr>
+            </a:br>
+            <a:r>
+              <a:rPr lang="en-US" dirty="0" smtClean="0">
+                <a:latin typeface="Courier New" panose="02070309020205020404" pitchFamily="49" charset="0"/>
+                <a:cs typeface="Courier New" panose="02070309020205020404" pitchFamily="49" charset="0"/>
+              </a:rPr>
+              <a:t>    –march=corei7-avx –O2 …</a:t>
+            </a:r>
+          </a:p>
+          <a:p>
+            <a:pPr lvl="1"/>
+            <a:r>
+              <a:rPr lang="en-US" dirty="0" smtClean="0">
+                <a:cs typeface="Courier New" panose="02070309020205020404" pitchFamily="49" charset="0"/>
+              </a:rPr>
+              <a:t>for feedback, use</a:t>
+            </a:r>
+            <a:br>
+              <a:rPr lang="en-US" dirty="0" smtClean="0">
+                <a:cs typeface="Courier New" panose="02070309020205020404" pitchFamily="49" charset="0"/>
+              </a:rPr>
+            </a:br>
+            <a:r>
+              <a:rPr lang="en-US" dirty="0" smtClean="0">
+                <a:cs typeface="Courier New" panose="02070309020205020404" pitchFamily="49" charset="0"/>
+              </a:rPr>
+              <a:t>  </a:t>
+            </a:r>
+            <a:r>
+              <a:rPr lang="nl-BE" dirty="0">
+                <a:latin typeface="Courier New" panose="02070309020205020404" pitchFamily="49" charset="0"/>
+                <a:cs typeface="Courier New" panose="02070309020205020404" pitchFamily="49" charset="0"/>
+              </a:rPr>
+              <a:t>-</a:t>
+            </a:r>
+            <a:r>
+              <a:rPr lang="nl-BE" dirty="0" err="1">
+                <a:latin typeface="Courier New" panose="02070309020205020404" pitchFamily="49" charset="0"/>
+                <a:cs typeface="Courier New" panose="02070309020205020404" pitchFamily="49" charset="0"/>
+              </a:rPr>
+              <a:t>ftree-vectorizer-verbose</a:t>
+            </a:r>
+            <a:r>
+              <a:rPr lang="nl-BE" dirty="0">
+                <a:latin typeface="Courier New" panose="02070309020205020404" pitchFamily="49" charset="0"/>
+                <a:cs typeface="Courier New" panose="02070309020205020404" pitchFamily="49" charset="0"/>
+              </a:rPr>
+              <a:t>=2</a:t>
+            </a:r>
+            <a:endParaRPr lang="en-US" dirty="0" smtClean="0">
+              <a:latin typeface="Courier New" panose="02070309020205020404" pitchFamily="49" charset="0"/>
+              <a:cs typeface="Courier New" panose="02070309020205020404" pitchFamily="49" charset="0"/>
+            </a:endParaRPr>
+          </a:p>
+          <a:p>
+            <a:r>
+              <a:rPr lang="en-US" dirty="0" smtClean="0"/>
+              <a:t>Intel compiler family</a:t>
+            </a:r>
+          </a:p>
+          <a:p>
+            <a:pPr lvl="1"/>
+            <a:r>
+              <a:rPr lang="en-US" dirty="0" err="1" smtClean="0">
+                <a:latin typeface="Courier New" panose="02070309020205020404" pitchFamily="49" charset="0"/>
+                <a:cs typeface="Courier New" panose="02070309020205020404" pitchFamily="49" charset="0"/>
+              </a:rPr>
+              <a:t>icc</a:t>
+            </a:r>
+            <a:r>
+              <a:rPr lang="en-US" dirty="0" smtClean="0">
+                <a:latin typeface="Courier New" panose="02070309020205020404" pitchFamily="49" charset="0"/>
+                <a:cs typeface="Courier New" panose="02070309020205020404" pitchFamily="49" charset="0"/>
+              </a:rPr>
+              <a:t> –</a:t>
+            </a:r>
+            <a:r>
+              <a:rPr lang="en-US" dirty="0" err="1" smtClean="0">
+                <a:latin typeface="Courier New" panose="02070309020205020404" pitchFamily="49" charset="0"/>
+                <a:cs typeface="Courier New" panose="02070309020205020404" pitchFamily="49" charset="0"/>
+              </a:rPr>
+              <a:t>xHost</a:t>
+            </a:r>
+            <a:r>
+              <a:rPr lang="en-US" dirty="0" smtClean="0">
+                <a:latin typeface="Courier New" panose="02070309020205020404" pitchFamily="49" charset="0"/>
+                <a:cs typeface="Courier New" panose="02070309020205020404" pitchFamily="49" charset="0"/>
+              </a:rPr>
+              <a:t> –O2 …</a:t>
+            </a:r>
+          </a:p>
+          <a:p>
+            <a:pPr lvl="1"/>
+            <a:r>
+              <a:rPr lang="en-US" dirty="0" smtClean="0"/>
+              <a:t>for feedback, use</a:t>
+            </a:r>
+            <a:br>
+              <a:rPr lang="en-US" dirty="0" smtClean="0"/>
+            </a:br>
+            <a:r>
+              <a:rPr lang="en-US" dirty="0" smtClean="0">
+                <a:latin typeface="Courier New" panose="02070309020205020404" pitchFamily="49" charset="0"/>
+                <a:cs typeface="Courier New" panose="02070309020205020404" pitchFamily="49" charset="0"/>
+              </a:rPr>
+              <a:t>  -</a:t>
+            </a:r>
+            <a:r>
+              <a:rPr lang="en-US" dirty="0" err="1" smtClean="0">
+                <a:latin typeface="Courier New" panose="02070309020205020404" pitchFamily="49" charset="0"/>
+                <a:cs typeface="Courier New" panose="02070309020205020404" pitchFamily="49" charset="0"/>
+              </a:rPr>
+              <a:t>qopt</a:t>
+            </a:r>
+            <a:r>
+              <a:rPr lang="en-US" dirty="0" smtClean="0">
+                <a:latin typeface="Courier New" panose="02070309020205020404" pitchFamily="49" charset="0"/>
+                <a:cs typeface="Courier New" panose="02070309020205020404" pitchFamily="49" charset="0"/>
+              </a:rPr>
+              <a:t>-report-phase=</a:t>
+            </a:r>
+            <a:r>
+              <a:rPr lang="en-US" dirty="0" err="1" smtClean="0">
+                <a:latin typeface="Courier New" panose="02070309020205020404" pitchFamily="49" charset="0"/>
+                <a:cs typeface="Courier New" panose="02070309020205020404" pitchFamily="49" charset="0"/>
+              </a:rPr>
+              <a:t>vec</a:t>
+            </a:r>
+            <a:r>
+              <a:rPr lang="en-US" dirty="0" smtClean="0">
+                <a:latin typeface="Courier New" panose="02070309020205020404" pitchFamily="49" charset="0"/>
+                <a:cs typeface="Courier New" panose="02070309020205020404" pitchFamily="49" charset="0"/>
+              </a:rPr>
+              <a:t> \</a:t>
+            </a:r>
+            <a:br>
+              <a:rPr lang="en-US" dirty="0" smtClean="0">
+                <a:latin typeface="Courier New" panose="02070309020205020404" pitchFamily="49" charset="0"/>
+                <a:cs typeface="Courier New" panose="02070309020205020404" pitchFamily="49" charset="0"/>
+              </a:rPr>
+            </a:br>
+            <a:r>
+              <a:rPr lang="en-US" dirty="0" smtClean="0">
+                <a:latin typeface="Courier New" panose="02070309020205020404" pitchFamily="49" charset="0"/>
+                <a:cs typeface="Courier New" panose="02070309020205020404" pitchFamily="49" charset="0"/>
+              </a:rPr>
+              <a:t>  -</a:t>
+            </a:r>
+            <a:r>
+              <a:rPr lang="en-US" dirty="0" err="1">
+                <a:latin typeface="Courier New" panose="02070309020205020404" pitchFamily="49" charset="0"/>
+                <a:cs typeface="Courier New" panose="02070309020205020404" pitchFamily="49" charset="0"/>
+              </a:rPr>
+              <a:t>qopt</a:t>
+            </a:r>
+            <a:r>
+              <a:rPr lang="en-US" dirty="0">
+                <a:latin typeface="Courier New" panose="02070309020205020404" pitchFamily="49" charset="0"/>
+                <a:cs typeface="Courier New" panose="02070309020205020404" pitchFamily="49" charset="0"/>
+              </a:rPr>
+              <a:t>-report=3</a:t>
+            </a:r>
+            <a:endParaRPr lang="nl-BE" dirty="0">
+              <a:latin typeface="Courier New" panose="02070309020205020404" pitchFamily="49" charset="0"/>
+              <a:cs typeface="Courier New" panose="02070309020205020404" pitchFamily="49" charset="0"/>
+            </a:endParaRPr>
+          </a:p>
+        </p:txBody>
+      </p:sp>
+      <p:sp>
+        <p:nvSpPr>
+          <p:cNvPr id="4" name="Slide Number Placeholder 3"/>
+          <p:cNvSpPr>
+            <a:spLocks noGrp="1"/>
+          </p:cNvSpPr>
+          <p:nvPr>
+            <p:ph type="sldNum" sz="quarter" idx="12"/>
+          </p:nvPr>
+        </p:nvSpPr>
+        <p:spPr/>
+        <p:txBody>
+          <a:bodyPr/>
+          <a:lstStyle/>
+          <a:p>
+            <a:fld id="{6597116C-F94B-4B5B-973A-17F07FB5C418}" type="slidenum">
+              <a:rPr lang="nl-BE" smtClean="0"/>
+              <a:t>30</a:t>
+            </a:fld>
+            <a:endParaRPr lang="nl-BE"/>
+          </a:p>
+        </p:txBody>
+      </p:sp>
+      <p:sp>
+        <p:nvSpPr>
+          <p:cNvPr id="6" name="TextBox 5"/>
+          <p:cNvSpPr txBox="1"/>
+          <p:nvPr/>
+        </p:nvSpPr>
+        <p:spPr>
+          <a:xfrm>
+            <a:off x="395536" y="5949280"/>
+            <a:ext cx="6727547" cy="461665"/>
+          </a:xfrm>
+          <a:prstGeom prst="rect">
+            <a:avLst/>
+          </a:prstGeom>
+          <a:noFill/>
+          <a:ln>
+            <a:solidFill>
+              <a:schemeClr val="tx1"/>
+            </a:solidFill>
+          </a:ln>
+        </p:spPr>
+        <p:txBody>
+          <a:bodyPr wrap="none" rtlCol="0">
+            <a:spAutoFit/>
+          </a:bodyPr>
+          <a:lstStyle/>
+          <a:p>
+            <a:r>
+              <a:rPr lang="en-US" sz="2400" dirty="0" smtClean="0"/>
+              <a:t>Help compiler using, e.g., </a:t>
+            </a:r>
+            <a:r>
+              <a:rPr lang="en-US" sz="2400" dirty="0" smtClean="0">
+                <a:latin typeface="Courier New" panose="02070309020205020404" pitchFamily="49" charset="0"/>
+                <a:cs typeface="Courier New" panose="02070309020205020404" pitchFamily="49" charset="0"/>
+              </a:rPr>
+              <a:t>#pragma </a:t>
+            </a:r>
+            <a:r>
+              <a:rPr lang="en-US" sz="2400" dirty="0" err="1" smtClean="0">
+                <a:latin typeface="Courier New" panose="02070309020205020404" pitchFamily="49" charset="0"/>
+                <a:cs typeface="Courier New" panose="02070309020205020404" pitchFamily="49" charset="0"/>
+              </a:rPr>
+              <a:t>omp</a:t>
+            </a:r>
+            <a:r>
+              <a:rPr lang="en-US" sz="2400" dirty="0" smtClean="0">
+                <a:latin typeface="Courier New" panose="02070309020205020404" pitchFamily="49" charset="0"/>
+                <a:cs typeface="Courier New" panose="02070309020205020404" pitchFamily="49" charset="0"/>
+              </a:rPr>
+              <a:t> </a:t>
+            </a:r>
+            <a:r>
+              <a:rPr lang="en-US" sz="2400" dirty="0" err="1" smtClean="0">
+                <a:latin typeface="Courier New" panose="02070309020205020404" pitchFamily="49" charset="0"/>
+                <a:cs typeface="Courier New" panose="02070309020205020404" pitchFamily="49" charset="0"/>
+              </a:rPr>
+              <a:t>simd</a:t>
+            </a:r>
+            <a:r>
+              <a:rPr lang="en-US" sz="2400" dirty="0" smtClean="0">
+                <a:latin typeface="Courier New" panose="02070309020205020404" pitchFamily="49" charset="0"/>
+                <a:cs typeface="Courier New" panose="02070309020205020404" pitchFamily="49" charset="0"/>
+              </a:rPr>
+              <a:t> …</a:t>
+            </a:r>
+            <a:endParaRPr lang="nl-BE" sz="2400" dirty="0">
+              <a:latin typeface="Courier New" panose="02070309020205020404" pitchFamily="49" charset="0"/>
+              <a:cs typeface="Courier New" panose="02070309020205020404" pitchFamily="49" charset="0"/>
+            </a:endParaRPr>
+          </a:p>
+        </p:txBody>
+      </p:sp>
+    </p:spTree>
+    <p:extLst>
+      <p:ext uri="{BB962C8B-B14F-4D97-AF65-F5344CB8AC3E}">
+        <p14:creationId xmlns:p14="http://schemas.microsoft.com/office/powerpoint/2010/main" val="1878102497"/>
+      </p:ext>
+    </p:extLst>
+  </p:cSld>
+  <p:clrMapOvr>
+    <a:masterClrMapping/>
+  </p:clrMapOvr>
+  <p:timing>
+    <p:tnLst>
+      <p:par>
+        <p:cTn id="1" dur="indefinite" restart="never" nodeType="tmRoot">
+          <p:childTnLst>
+            <p:seq concurrent="1" nextAc="seek">
+              <p:cTn id="2" dur="indefinite" nodeType="mainSeq">
+                <p:childTnLst>
+                  <p:par>
+                    <p:cTn id="3" fill="hold">
+                      <p:stCondLst>
+                        <p:cond delay="indefinite"/>
+                        <p:cond evt="onBegin" delay="0">
+                          <p:tn val="2"/>
+                        </p:cond>
+                      </p:stCondLst>
+                      <p:childTnLst>
+                        <p:par>
+                          <p:cTn id="4" fill="hold">
+                            <p:stCondLst>
+                              <p:cond delay="0"/>
+                            </p:stCondLst>
+                            <p:childTnLst>
+                              <p:par>
+                                <p:cTn id="5" presetID="1" presetClass="entr" presetSubtype="0" fill="hold" grpId="0" nodeType="withEffect">
+                                  <p:stCondLst>
+                                    <p:cond delay="0"/>
+                                  </p:stCondLst>
+                                  <p:childTnLst>
+                                    <p:set>
+                                      <p:cBhvr>
+                                        <p:cTn id="6" dur="1" fill="hold">
+                                          <p:stCondLst>
+                                            <p:cond delay="0"/>
+                                          </p:stCondLst>
+                                        </p:cTn>
+                                        <p:tgtEl>
+                                          <p:spTgt spid="3">
+                                            <p:txEl>
+                                              <p:pRg st="0" end="0"/>
+                                            </p:txEl>
+                                          </p:spTgt>
+                                        </p:tgtEl>
+                                        <p:attrNameLst>
+                                          <p:attrName>style.visibility</p:attrName>
+                                        </p:attrNameLst>
+                                      </p:cBhvr>
+                                      <p:to>
+                                        <p:strVal val="visible"/>
+                                      </p:to>
+                                    </p:set>
+                                  </p:childTnLst>
+                                </p:cTn>
+                              </p:par>
+                              <p:par>
+                                <p:cTn id="7" presetID="1" presetClass="entr" presetSubtype="0" fill="hold" grpId="0" nodeType="withEffect">
+                                  <p:stCondLst>
+                                    <p:cond delay="0"/>
+                                  </p:stCondLst>
+                                  <p:childTnLst>
+                                    <p:set>
+                                      <p:cBhvr>
+                                        <p:cTn id="8" dur="1" fill="hold">
+                                          <p:stCondLst>
+                                            <p:cond delay="0"/>
+                                          </p:stCondLst>
+                                        </p:cTn>
+                                        <p:tgtEl>
+                                          <p:spTgt spid="3">
+                                            <p:txEl>
+                                              <p:pRg st="1" end="1"/>
+                                            </p:txEl>
+                                          </p:spTgt>
+                                        </p:tgtEl>
+                                        <p:attrNameLst>
+                                          <p:attrName>style.visibility</p:attrName>
+                                        </p:attrNameLst>
+                                      </p:cBhvr>
+                                      <p:to>
+                                        <p:strVal val="visible"/>
+                                      </p:to>
+                                    </p:set>
+                                  </p:childTnLst>
+                                </p:cTn>
+                              </p:par>
+                            </p:childTnLst>
+                          </p:cTn>
+                        </p:par>
+                      </p:childTnLst>
+                    </p:cTn>
+                  </p:par>
+                  <p:par>
+                    <p:cTn id="9" fill="hold">
+                      <p:stCondLst>
+                        <p:cond delay="indefinite"/>
+                      </p:stCondLst>
+                      <p:childTnLst>
+                        <p:par>
+                          <p:cTn id="10" fill="hold">
+                            <p:stCondLst>
+                              <p:cond delay="0"/>
+                            </p:stCondLst>
+                            <p:childTnLst>
+                              <p:par>
+                                <p:cTn id="11" presetID="1" presetClass="entr" presetSubtype="0" fill="hold" grpId="0" nodeType="clickEffect">
+                                  <p:stCondLst>
+                                    <p:cond delay="0"/>
+                                  </p:stCondLst>
+                                  <p:childTnLst>
+                                    <p:set>
+                                      <p:cBhvr>
+                                        <p:cTn id="12" dur="1" fill="hold">
+                                          <p:stCondLst>
+                                            <p:cond delay="0"/>
+                                          </p:stCondLst>
+                                        </p:cTn>
+                                        <p:tgtEl>
+                                          <p:spTgt spid="3">
+                                            <p:txEl>
+                                              <p:pRg st="2" end="2"/>
+                                            </p:txEl>
+                                          </p:spTgt>
+                                        </p:tgtEl>
+                                        <p:attrNameLst>
+                                          <p:attrName>style.visibility</p:attrName>
+                                        </p:attrNameLst>
+                                      </p:cBhvr>
+                                      <p:to>
+                                        <p:strVal val="visible"/>
+                                      </p:to>
+                                    </p:set>
+                                  </p:childTnLst>
+                                </p:cTn>
+                              </p:par>
+                            </p:childTnLst>
+                          </p:cTn>
+                        </p:par>
+                      </p:childTnLst>
+                    </p:cTn>
+                  </p:par>
+                  <p:par>
+                    <p:cTn id="13" fill="hold">
+                      <p:stCondLst>
+                        <p:cond delay="indefinite"/>
+                      </p:stCondLst>
+                      <p:childTnLst>
+                        <p:par>
+                          <p:cTn id="14" fill="hold">
+                            <p:stCondLst>
+                              <p:cond delay="0"/>
+                            </p:stCondLst>
+                            <p:childTnLst>
+                              <p:par>
+                                <p:cTn id="15" presetID="1" presetClass="entr" presetSubtype="0" fill="hold" grpId="0" nodeType="clickEffect">
+                                  <p:stCondLst>
+                                    <p:cond delay="0"/>
+                                  </p:stCondLst>
+                                  <p:childTnLst>
+                                    <p:set>
+                                      <p:cBhvr>
+                                        <p:cTn id="16" dur="1" fill="hold">
+                                          <p:stCondLst>
+                                            <p:cond delay="0"/>
+                                          </p:stCondLst>
+                                        </p:cTn>
+                                        <p:tgtEl>
+                                          <p:spTgt spid="3">
+                                            <p:txEl>
+                                              <p:pRg st="3" end="3"/>
+                                            </p:txEl>
+                                          </p:spTgt>
+                                        </p:tgtEl>
+                                        <p:attrNameLst>
+                                          <p:attrName>style.visibility</p:attrName>
+                                        </p:attrNameLst>
+                                      </p:cBhvr>
+                                      <p:to>
+                                        <p:strVal val="visible"/>
+                                      </p:to>
+                                    </p:set>
+                                  </p:childTnLst>
+                                </p:cTn>
+                              </p:par>
+                            </p:childTnLst>
+                          </p:cTn>
+                        </p:par>
+                      </p:childTnLst>
+                    </p:cTn>
+                  </p:par>
+                  <p:par>
+                    <p:cTn id="17" fill="hold">
+                      <p:stCondLst>
+                        <p:cond delay="indefinite"/>
+                      </p:stCondLst>
+                      <p:childTnLst>
+                        <p:par>
+                          <p:cTn id="18" fill="hold">
+                            <p:stCondLst>
+                              <p:cond delay="0"/>
+                            </p:stCondLst>
+                            <p:childTnLst>
+                              <p:par>
+                                <p:cTn id="19" presetID="1" presetClass="entr" presetSubtype="0" fill="hold" grpId="0" nodeType="clickEffect">
+                                  <p:stCondLst>
+                                    <p:cond delay="0"/>
+                                  </p:stCondLst>
+                                  <p:childTnLst>
+                                    <p:set>
+                                      <p:cBhvr>
+                                        <p:cTn id="20" dur="1" fill="hold">
+                                          <p:stCondLst>
+                                            <p:cond delay="0"/>
+                                          </p:stCondLst>
+                                        </p:cTn>
+                                        <p:tgtEl>
+                                          <p:spTgt spid="3">
+                                            <p:txEl>
+                                              <p:pRg st="4" end="4"/>
+                                            </p:txEl>
+                                          </p:spTgt>
+                                        </p:tgtEl>
+                                        <p:attrNameLst>
+                                          <p:attrName>style.visibility</p:attrName>
+                                        </p:attrNameLst>
+                                      </p:cBhvr>
+                                      <p:to>
+                                        <p:strVal val="visible"/>
+                                      </p:to>
+                                    </p:set>
+                                  </p:childTnLst>
+                                </p:cTn>
+                              </p:par>
+                              <p:par>
+                                <p:cTn id="21" presetID="1" presetClass="entr" presetSubtype="0" fill="hold" grpId="0" nodeType="withEffect">
+                                  <p:stCondLst>
+                                    <p:cond delay="0"/>
+                                  </p:stCondLst>
+                                  <p:childTnLst>
+                                    <p:set>
+                                      <p:cBhvr>
+                                        <p:cTn id="22" dur="1" fill="hold">
+                                          <p:stCondLst>
+                                            <p:cond delay="0"/>
+                                          </p:stCondLst>
+                                        </p:cTn>
+                                        <p:tgtEl>
+                                          <p:spTgt spid="3">
+                                            <p:txEl>
+                                              <p:pRg st="5" end="5"/>
+                                            </p:txEl>
+                                          </p:spTgt>
+                                        </p:tgtEl>
+                                        <p:attrNameLst>
+                                          <p:attrName>style.visibility</p:attrName>
+                                        </p:attrNameLst>
+                                      </p:cBhvr>
+                                      <p:to>
+                                        <p:strVal val="visible"/>
+                                      </p:to>
+                                    </p:set>
+                                  </p:childTnLst>
+                                </p:cTn>
+                              </p:par>
+                            </p:childTnLst>
+                          </p:cTn>
+                        </p:par>
+                      </p:childTnLst>
+                    </p:cTn>
+                  </p:par>
+                  <p:par>
+                    <p:cTn id="23" fill="hold">
+                      <p:stCondLst>
+                        <p:cond delay="indefinite"/>
+                      </p:stCondLst>
+                      <p:childTnLst>
+                        <p:par>
+                          <p:cTn id="24" fill="hold">
+                            <p:stCondLst>
+                              <p:cond delay="0"/>
+                            </p:stCondLst>
+                            <p:childTnLst>
+                              <p:par>
+                                <p:cTn id="25" presetID="1" presetClass="entr" presetSubtype="0" fill="hold" grpId="0" nodeType="clickEffect">
+                                  <p:stCondLst>
+                                    <p:cond delay="0"/>
+                                  </p:stCondLst>
+                                  <p:childTnLst>
+                                    <p:set>
+                                      <p:cBhvr>
+                                        <p:cTn id="26" dur="1" fill="hold">
+                                          <p:stCondLst>
+                                            <p:cond delay="0"/>
+                                          </p:stCondLst>
+                                        </p:cTn>
+                                        <p:tgtEl>
+                                          <p:spTgt spid="3">
+                                            <p:txEl>
+                                              <p:pRg st="6" end="6"/>
+                                            </p:txEl>
+                                          </p:spTgt>
+                                        </p:tgtEl>
+                                        <p:attrNameLst>
+                                          <p:attrName>style.visibility</p:attrName>
+                                        </p:attrNameLst>
+                                      </p:cBhvr>
+                                      <p:to>
+                                        <p:strVal val="visible"/>
+                                      </p:to>
+                                    </p:set>
+                                  </p:childTnLst>
+                                </p:cTn>
+                              </p:par>
+                            </p:childTnLst>
+                          </p:cTn>
+                        </p:par>
+                      </p:childTnLst>
+                    </p:cTn>
+                  </p:par>
+                  <p:par>
+                    <p:cTn id="27" fill="hold">
+                      <p:stCondLst>
+                        <p:cond delay="indefinite"/>
+                      </p:stCondLst>
+                      <p:childTnLst>
+                        <p:par>
+                          <p:cTn id="28" fill="hold">
+                            <p:stCondLst>
+                              <p:cond delay="0"/>
+                            </p:stCondLst>
+                            <p:childTnLst>
+                              <p:par>
+                                <p:cTn id="29" presetID="1" presetClass="entr" presetSubtype="0" fill="hold" grpId="0" nodeType="clickEffect">
+                                  <p:stCondLst>
+                                    <p:cond delay="0"/>
+                                  </p:stCondLst>
+                                  <p:childTnLst>
+                                    <p:set>
+                                      <p:cBhvr>
+                                        <p:cTn id="30" dur="1" fill="hold">
+                                          <p:stCondLst>
+                                            <p:cond delay="0"/>
+                                          </p:stCondLst>
+                                        </p:cTn>
+                                        <p:tgtEl>
+                                          <p:spTgt spid="6"/>
+                                        </p:tgtEl>
+                                        <p:attrNameLst>
+                                          <p:attrName>style.visibility</p:attrName>
+                                        </p:attrNameLst>
+                                      </p:cBhvr>
+                                      <p:to>
+                                        <p:strVal val="visible"/>
+                                      </p:to>
+                                    </p:set>
+                                  </p:childTnLst>
+                                </p:cTn>
+                              </p:par>
+                            </p:childTnLst>
+                          </p:cTn>
+                        </p:par>
+                      </p:childTnLst>
+                    </p:cTn>
+                  </p:par>
+                </p:childTnLst>
+              </p:cTn>
+              <p:prevCondLst>
+                <p:cond evt="onPrev" delay="0">
+                  <p:tgtEl>
+                    <p:sldTgt/>
+                  </p:tgtEl>
+                </p:cond>
+              </p:prevCondLst>
+              <p:nextCondLst>
+                <p:cond evt="onNext" delay="0">
+                  <p:tgtEl>
+                    <p:sldTgt/>
+                  </p:tgtEl>
+                </p:cond>
+              </p:nextCondLst>
+            </p:seq>
+          </p:childTnLst>
+        </p:cTn>
+      </p:par>
+    </p:tnLst>
+    <p:bldLst>
+      <p:bldP spid="3" grpId="0" uiExpand="1" build="p" bldLvl="2"/>
+      <p:bldP spid="6" grpId="0" animBg="1"/>
+    </p:bldLst>
+  </p:timing>
+</p:sld>
+</file>
+
+<file path=ppt/slides/slide31.xml><?xml version="1.0" encoding="utf-8"?>
 <p:sld xmlns:a="http://schemas.openxmlformats.org/drawingml/2006/main" xmlns:r="http://schemas.openxmlformats.org/officeDocument/2006/relationships" xmlns:p="http://schemas.openxmlformats.org/presentationml/2006/main">
   <p:cSld>
     <p:spTree>
@@ -26026,7 +28497,7 @@
           <a:p>
             <a:fld id="{6597116C-F94B-4B5B-973A-17F07FB5C418}" type="slidenum">
               <a:rPr lang="nl-BE" smtClean="0"/>
-              <a:t>30</a:t>
+              <a:t>31</a:t>
             </a:fld>
             <a:endParaRPr lang="nl-BE"/>
           </a:p>
@@ -26129,10 +28600,88 @@
   <p:clrMapOvr>
     <a:masterClrMapping/>
   </p:clrMapOvr>
+  <p:timing>
+    <p:tnLst>
+      <p:par>
+        <p:cTn id="1" dur="indefinite" restart="never" nodeType="tmRoot">
+          <p:childTnLst>
+            <p:seq concurrent="1" nextAc="seek">
+              <p:cTn id="2" dur="indefinite" nodeType="mainSeq">
+                <p:childTnLst>
+                  <p:par>
+                    <p:cTn id="3" fill="hold">
+                      <p:stCondLst>
+                        <p:cond delay="indefinite"/>
+                      </p:stCondLst>
+                      <p:childTnLst>
+                        <p:par>
+                          <p:cTn id="4" fill="hold">
+                            <p:stCondLst>
+                              <p:cond delay="0"/>
+                            </p:stCondLst>
+                            <p:childTnLst>
+                              <p:par>
+                                <p:cTn id="5" presetID="1" presetClass="entr" presetSubtype="0" fill="hold" grpId="0" nodeType="clickEffect">
+                                  <p:stCondLst>
+                                    <p:cond delay="0"/>
+                                  </p:stCondLst>
+                                  <p:childTnLst>
+                                    <p:set>
+                                      <p:cBhvr>
+                                        <p:cTn id="6" dur="1" fill="hold">
+                                          <p:stCondLst>
+                                            <p:cond delay="0"/>
+                                          </p:stCondLst>
+                                        </p:cTn>
+                                        <p:tgtEl>
+                                          <p:spTgt spid="7"/>
+                                        </p:tgtEl>
+                                        <p:attrNameLst>
+                                          <p:attrName>style.visibility</p:attrName>
+                                        </p:attrNameLst>
+                                      </p:cBhvr>
+                                      <p:to>
+                                        <p:strVal val="visible"/>
+                                      </p:to>
+                                    </p:set>
+                                  </p:childTnLst>
+                                </p:cTn>
+                              </p:par>
+                            </p:childTnLst>
+                          </p:cTn>
+                        </p:par>
+                      </p:childTnLst>
+                    </p:cTn>
+                  </p:par>
+                </p:childTnLst>
+              </p:cTn>
+              <p:prevCondLst>
+                <p:cond evt="onPrev" delay="0">
+                  <p:tgtEl>
+                    <p:sldTgt/>
+                  </p:tgtEl>
+                </p:cond>
+              </p:prevCondLst>
+              <p:nextCondLst>
+                <p:cond evt="onNext" delay="0">
+                  <p:tgtEl>
+                    <p:sldTgt/>
+                  </p:tgtEl>
+                </p:cond>
+              </p:nextCondLst>
+            </p:seq>
+          </p:childTnLst>
+        </p:cTn>
+      </p:par>
+    </p:tnLst>
+    <p:bldLst>
+      <p:bldP spid="7" grpId="0" animBg="1"/>
+    </p:bldLst>
+  </p:timing>
 </p:sld>
 </file>
 
-<file path=ppt/slides/slide31.xml><?xml version="1.0" encoding="utf-8"?>
+<file path=ppt/slides/slide32.xml><?xml version="1.0" encoding="utf-8"?>
 <p:sld xmlns:a="http://schemas.openxmlformats.org/drawingml/2006/main" xmlns:r="http://schemas.openxmlformats.org/officeDocument/2006/relationships" xmlns:p="http://schemas.openxmlformats.org/presentationml/2006/main">
   <p:cSld>
     <p:spTree>
@@ -26252,7 +28801,7 @@
           <a:p>
             <a:fld id="{6597116C-F94B-4B5B-973A-17F07FB5C418}" type="slidenum">
               <a:rPr lang="nl-BE" smtClean="0"/>
-              <a:t>31</a:t>
+              <a:t>32</a:t>
             </a:fld>
             <a:endParaRPr lang="nl-BE"/>
           </a:p>
@@ -26639,7 +29188,7 @@
 </p:sld>
 </file>
 
-<file path=ppt/slides/slide32.xml><?xml version="1.0" encoding="utf-8"?>
+<file path=ppt/slides/slide33.xml><?xml version="1.0" encoding="utf-8"?>
 <p:sld xmlns:a="http://schemas.openxmlformats.org/drawingml/2006/main" xmlns:r="http://schemas.openxmlformats.org/officeDocument/2006/relationships" xmlns:p="http://schemas.openxmlformats.org/presentationml/2006/main">
   <p:cSld>
     <p:spTree>
@@ -26715,7 +29264,7 @@
           <a:p>
             <a:fld id="{6597116C-F94B-4B5B-973A-17F07FB5C418}" type="slidenum">
               <a:rPr lang="nl-BE" smtClean="0"/>
-              <a:t>32</a:t>
+              <a:t>33</a:t>
             </a:fld>
             <a:endParaRPr lang="nl-BE"/>
           </a:p>
@@ -26734,7 +29283,7 @@
 </p:sld>
 </file>
 
-<file path=ppt/slides/slide33.xml><?xml version="1.0" encoding="utf-8"?>
+<file path=ppt/slides/slide34.xml><?xml version="1.0" encoding="utf-8"?>
 <p:sld xmlns:a="http://schemas.openxmlformats.org/drawingml/2006/main" xmlns:r="http://schemas.openxmlformats.org/officeDocument/2006/relationships" xmlns:p="http://schemas.openxmlformats.org/presentationml/2006/main">
   <p:cSld>
     <p:spTree>
@@ -26786,7 +29335,9 @@
         </p:nvSpPr>
         <p:spPr/>
         <p:txBody>
-          <a:bodyPr/>
+          <a:bodyPr>
+            <a:normAutofit lnSpcReduction="10000"/>
+          </a:bodyPr>
           <a:lstStyle/>
           <a:p>
             <a:r>
@@ -26853,7 +29404,19 @@
             </a:br>
             <a:r>
               <a:rPr lang="nl-BE" dirty="0" smtClean="0"/>
-              <a:t>Georg Hager, </a:t>
+              <a:t>Georg </a:t>
+            </a:r>
+            <a:r>
+              <a:rPr lang="nl-BE" dirty="0" smtClean="0"/>
+              <a:t>Hager &amp; Gerhard </a:t>
+            </a:r>
+            <a:r>
+              <a:rPr lang="nl-BE" dirty="0" err="1" smtClean="0"/>
+              <a:t>Wellein</a:t>
+            </a:r>
+            <a:r>
+              <a:rPr lang="nl-BE" dirty="0" smtClean="0"/>
+              <a:t>, </a:t>
             </a:r>
             <a:r>
               <a:rPr lang="nl-BE" dirty="0" err="1" smtClean="0"/>
@@ -26861,9 +29424,22 @@
             </a:r>
             <a:r>
               <a:rPr lang="nl-BE" dirty="0" smtClean="0"/>
-              <a:t> &amp; Hall, 2010</a:t>
+              <a:t> &amp; Hall, </a:t>
+            </a:r>
+            <a:r>
+              <a:rPr lang="nl-BE" dirty="0" smtClean="0"/>
+              <a:t>2010</a:t>
             </a:r>
             <a:endParaRPr lang="en-US" b="1" dirty="0"/>
+          </a:p>
+          <a:p>
+            <a:r>
+              <a:rPr lang="en-US" dirty="0" smtClean="0">
+                <a:hlinkClick r:id="rId5"/>
+              </a:rPr>
+              <a:t>Why has CPU frequency ceased to grow?</a:t>
+            </a:r>
+            <a:endParaRPr lang="nl-BE" dirty="0" smtClean="0"/>
           </a:p>
         </p:txBody>
       </p:sp>
@@ -26884,7 +29460,7 @@
           <a:p>
             <a:fld id="{6597116C-F94B-4B5B-973A-17F07FB5C418}" type="slidenum">
               <a:rPr lang="nl-BE" smtClean="0"/>
-              <a:t>33</a:t>
+              <a:t>34</a:t>
             </a:fld>
             <a:endParaRPr lang="nl-BE"/>
           </a:p>
@@ -26903,7 +29479,7 @@
 </p:sld>
 </file>
 
-<file path=ppt/slides/slide34.xml><?xml version="1.0" encoding="utf-8"?>
+<file path=ppt/slides/slide35.xml><?xml version="1.0" encoding="utf-8"?>
 <p:sld xmlns:a="http://schemas.openxmlformats.org/drawingml/2006/main" xmlns:r="http://schemas.openxmlformats.org/officeDocument/2006/relationships" xmlns:p="http://schemas.openxmlformats.org/presentationml/2006/main">
   <p:cSld>
     <p:spTree>
@@ -26979,7 +29555,7 @@
           <a:p>
             <a:fld id="{6597116C-F94B-4B5B-973A-17F07FB5C418}" type="slidenum">
               <a:rPr lang="nl-BE" smtClean="0"/>
-              <a:t>34</a:t>
+              <a:t>35</a:t>
             </a:fld>
             <a:endParaRPr lang="nl-BE"/>
           </a:p>
@@ -26998,7 +29574,7 @@
 </p:sld>
 </file>
 
-<file path=ppt/slides/slide35.xml><?xml version="1.0" encoding="utf-8"?>
+<file path=ppt/slides/slide36.xml><?xml version="1.0" encoding="utf-8"?>
 <p:sld xmlns:a="http://schemas.openxmlformats.org/drawingml/2006/main" xmlns:r="http://schemas.openxmlformats.org/officeDocument/2006/relationships" xmlns:p="http://schemas.openxmlformats.org/presentationml/2006/main">
   <p:cSld>
     <p:spTree>
@@ -28782,7 +31358,7 @@
           <a:p>
             <a:fld id="{6597116C-F94B-4B5B-973A-17F07FB5C418}" type="slidenum">
               <a:rPr lang="nl-BE" smtClean="0"/>
-              <a:t>35</a:t>
+              <a:t>36</a:t>
             </a:fld>
             <a:endParaRPr lang="nl-BE"/>
           </a:p>
@@ -28927,7 +31503,7 @@
 </p:sld>
 </file>
 
-<file path=ppt/slides/slide36.xml><?xml version="1.0" encoding="utf-8"?>
+<file path=ppt/slides/slide37.xml><?xml version="1.0" encoding="utf-8"?>
 <p:sld xmlns:a="http://schemas.openxmlformats.org/drawingml/2006/main" xmlns:r="http://schemas.openxmlformats.org/officeDocument/2006/relationships" xmlns:p="http://schemas.openxmlformats.org/presentationml/2006/main">
   <p:cSld>
     <p:spTree>
@@ -29145,9 +31721,54 @@
           <a:p>
             <a:fld id="{6597116C-F94B-4B5B-973A-17F07FB5C418}" type="slidenum">
               <a:rPr lang="nl-BE" smtClean="0"/>
-              <a:t>36</a:t>
+              <a:t>37</a:t>
             </a:fld>
             <a:endParaRPr lang="nl-BE"/>
+          </a:p>
+        </p:txBody>
+      </p:sp>
+      <p:sp>
+        <p:nvSpPr>
+          <p:cNvPr id="5" name="TextBox 4"/>
+          <p:cNvSpPr txBox="1"/>
+          <p:nvPr/>
+        </p:nvSpPr>
+        <p:spPr>
+          <a:xfrm>
+            <a:off x="5076056" y="4653136"/>
+            <a:ext cx="3443443" cy="830997"/>
+          </a:xfrm>
+          <a:prstGeom prst="rect">
+            <a:avLst/>
+          </a:prstGeom>
+          <a:noFill/>
+          <a:ln>
+            <a:solidFill>
+              <a:schemeClr val="tx1"/>
+            </a:solidFill>
+          </a:ln>
+        </p:spPr>
+        <p:txBody>
+          <a:bodyPr wrap="none" rtlCol="0">
+            <a:spAutoFit/>
+          </a:bodyPr>
+          <a:lstStyle/>
+          <a:p>
+            <a:r>
+              <a:rPr lang="en-US" sz="2400" dirty="0" smtClean="0"/>
+              <a:t>Note: bandwidth depends</a:t>
+            </a:r>
+          </a:p>
+          <a:p>
+            <a:r>
+              <a:rPr lang="en-US" sz="2400" dirty="0"/>
+              <a:t> </a:t>
+            </a:r>
+            <a:r>
+              <a:rPr lang="en-US" sz="2400" dirty="0" smtClean="0"/>
+              <a:t>          on message size!</a:t>
+            </a:r>
+            <a:endParaRPr lang="nl-BE" sz="2400" dirty="0"/>
           </a:p>
         </p:txBody>
       </p:sp>
@@ -29161,6 +31782,13 @@
   <p:clrMapOvr>
     <a:masterClrMapping/>
   </p:clrMapOvr>
+  <p:timing>
+    <p:tnLst>
+      <p:par>
+        <p:cTn id="1" dur="indefinite" restart="never" nodeType="tmRoot"/>
+      </p:par>
+    </p:tnLst>
+  </p:timing>
 </p:sld>
 </file>
 
@@ -29235,8 +31863,13 @@
             <a:pPr lvl="2"/>
             <a:r>
               <a:rPr lang="en-US" dirty="0" smtClean="0"/>
-              <a:t>compiler flags, some help needed from programmer</a:t>
-            </a:r>
+              <a:t>compiler flags, </a:t>
+            </a:r>
+            <a:r>
+              <a:rPr lang="en-US" dirty="0" smtClean="0"/>
+              <a:t>programmer can/should help</a:t>
+            </a:r>
+            <a:endParaRPr lang="en-US" dirty="0" smtClean="0"/>
           </a:p>
           <a:p>
             <a:pPr lvl="1"/>
@@ -29268,14 +31901,26 @@
             <a:pPr lvl="1"/>
             <a:r>
               <a:rPr lang="en-US" dirty="0" smtClean="0"/>
-              <a:t>multiple node, i.e., distributed</a:t>
+              <a:t>multiple </a:t>
+            </a:r>
+            <a:r>
+              <a:rPr lang="en-US" dirty="0" smtClean="0"/>
+              <a:t>nodes, </a:t>
+            </a:r>
+            <a:r>
+              <a:rPr lang="en-US" dirty="0" smtClean="0"/>
+              <a:t>i.e., distributed</a:t>
             </a:r>
           </a:p>
           <a:p>
             <a:pPr lvl="2"/>
             <a:r>
               <a:rPr lang="en-US" dirty="0" smtClean="0"/>
-              <a:t>MPI: programmer's job</a:t>
+              <a:t>MPI/CAF/UPC/Chapel: </a:t>
+            </a:r>
+            <a:r>
+              <a:rPr lang="en-US" dirty="0" smtClean="0"/>
+              <a:t>programmer's job</a:t>
             </a:r>
           </a:p>
           <a:p>
@@ -29334,7 +31979,7 @@
         </p:nvGrpSpPr>
         <p:grpSpPr>
           <a:xfrm>
-            <a:off x="6553200" y="3284984"/>
+            <a:off x="6981290" y="3284984"/>
             <a:ext cx="1479142" cy="1656184"/>
             <a:chOff x="6553200" y="3284984"/>
             <a:chExt cx="1479142" cy="1656184"/>

</xml_diff>

<commit_message>
Added L3 cache associativity number; added command to find out
</commit_message>
<xml_diff>
--- a/Optimization/hpc_efficiency.pptx
+++ b/Optimization/hpc_efficiency.pptx
@@ -272,11 +272,11 @@
           <c:showPercent val="0"/>
           <c:showBubbleSize val="0"/>
         </c:dLbls>
-        <c:axId val="182369824"/>
-        <c:axId val="182366152"/>
+        <c:axId val="171381488"/>
+        <c:axId val="170399888"/>
       </c:scatterChart>
       <c:valAx>
-        <c:axId val="182369824"/>
+        <c:axId val="171381488"/>
         <c:scaling>
           <c:logBase val="2"/>
           <c:orientation val="minMax"/>
@@ -288,14 +288,14 @@
         <c:majorTickMark val="out"/>
         <c:minorTickMark val="none"/>
         <c:tickLblPos val="nextTo"/>
-        <c:crossAx val="182366152"/>
+        <c:crossAx val="170399888"/>
         <c:crosses val="autoZero"/>
         <c:crossBetween val="midCat"/>
         <c:majorUnit val="4"/>
         <c:minorUnit val="4"/>
       </c:valAx>
       <c:valAx>
-        <c:axId val="182366152"/>
+        <c:axId val="170399888"/>
         <c:scaling>
           <c:logBase val="2"/>
           <c:orientation val="minMax"/>
@@ -308,7 +308,7 @@
         <c:majorTickMark val="out"/>
         <c:minorTickMark val="none"/>
         <c:tickLblPos val="nextTo"/>
-        <c:crossAx val="182369824"/>
+        <c:crossAx val="171381488"/>
         <c:crosses val="autoZero"/>
         <c:crossBetween val="midCat"/>
         <c:majorUnit val="4"/>
@@ -681,11 +681,11 @@
           <c:showPercent val="0"/>
           <c:showBubbleSize val="0"/>
         </c:dLbls>
-        <c:axId val="182460840"/>
-        <c:axId val="179763856"/>
+        <c:axId val="171368432"/>
+        <c:axId val="170646032"/>
       </c:scatterChart>
       <c:valAx>
-        <c:axId val="182460840"/>
+        <c:axId val="171368432"/>
         <c:scaling>
           <c:logBase val="2"/>
           <c:orientation val="minMax"/>
@@ -698,14 +698,14 @@
         <c:majorTickMark val="out"/>
         <c:minorTickMark val="none"/>
         <c:tickLblPos val="nextTo"/>
-        <c:crossAx val="179763856"/>
+        <c:crossAx val="170646032"/>
         <c:crosses val="autoZero"/>
         <c:crossBetween val="midCat"/>
         <c:majorUnit val="4"/>
         <c:minorUnit val="4"/>
       </c:valAx>
       <c:valAx>
-        <c:axId val="179763856"/>
+        <c:axId val="170646032"/>
         <c:scaling>
           <c:logBase val="2"/>
           <c:orientation val="minMax"/>
@@ -719,7 +719,7 @@
         <c:majorTickMark val="out"/>
         <c:minorTickMark val="none"/>
         <c:tickLblPos val="nextTo"/>
-        <c:crossAx val="182460840"/>
+        <c:crossAx val="171368432"/>
         <c:crosses val="autoZero"/>
         <c:crossBetween val="midCat"/>
         <c:majorUnit val="4"/>
@@ -728,7 +728,6 @@
     </c:plotArea>
     <c:legend>
       <c:legendPos val="r"/>
-      <c:layout/>
       <c:overlay val="0"/>
     </c:legend>
     <c:plotVisOnly val="1"/>
@@ -933,11 +932,11 @@
           <c:showPercent val="0"/>
           <c:showBubbleSize val="0"/>
         </c:dLbls>
-        <c:axId val="179765032"/>
-        <c:axId val="179765424"/>
+        <c:axId val="171790792"/>
+        <c:axId val="171791184"/>
       </c:scatterChart>
       <c:valAx>
-        <c:axId val="179765032"/>
+        <c:axId val="171790792"/>
         <c:scaling>
           <c:logBase val="2"/>
           <c:orientation val="minMax"/>
@@ -950,13 +949,13 @@
         <c:majorTickMark val="out"/>
         <c:minorTickMark val="none"/>
         <c:tickLblPos val="nextTo"/>
-        <c:crossAx val="179765424"/>
+        <c:crossAx val="171791184"/>
         <c:crosses val="autoZero"/>
         <c:crossBetween val="midCat"/>
         <c:minorUnit val="4"/>
       </c:valAx>
       <c:valAx>
-        <c:axId val="179765424"/>
+        <c:axId val="171791184"/>
         <c:scaling>
           <c:logBase val="2"/>
           <c:orientation val="minMax"/>
@@ -970,7 +969,7 @@
         <c:majorTickMark val="out"/>
         <c:minorTickMark val="none"/>
         <c:tickLblPos val="nextTo"/>
-        <c:crossAx val="179765032"/>
+        <c:crossAx val="171790792"/>
         <c:crosses val="autoZero"/>
         <c:crossBetween val="midCat"/>
         <c:majorUnit val="2"/>
@@ -979,7 +978,6 @@
     </c:plotArea>
     <c:legend>
       <c:legendPos val="r"/>
-      <c:layout/>
       <c:overlay val="0"/>
     </c:legend>
     <c:plotVisOnly val="1"/>
@@ -1102,11 +1100,11 @@
           <c:showPercent val="0"/>
           <c:showBubbleSize val="0"/>
         </c:dLbls>
-        <c:axId val="144723744"/>
-        <c:axId val="182608168"/>
+        <c:axId val="171791968"/>
+        <c:axId val="171792360"/>
       </c:scatterChart>
       <c:valAx>
-        <c:axId val="144723744"/>
+        <c:axId val="171791968"/>
         <c:scaling>
           <c:logBase val="2"/>
           <c:orientation val="minMax"/>
@@ -1119,13 +1117,13 @@
         <c:majorTickMark val="out"/>
         <c:minorTickMark val="none"/>
         <c:tickLblPos val="nextTo"/>
-        <c:crossAx val="182608168"/>
+        <c:crossAx val="171792360"/>
         <c:crosses val="autoZero"/>
         <c:crossBetween val="midCat"/>
         <c:majorUnit val="4"/>
       </c:valAx>
       <c:valAx>
-        <c:axId val="182608168"/>
+        <c:axId val="171792360"/>
         <c:scaling>
           <c:logBase val="2"/>
           <c:orientation val="minMax"/>
@@ -1138,7 +1136,7 @@
         <c:majorTickMark val="out"/>
         <c:minorTickMark val="none"/>
         <c:tickLblPos val="nextTo"/>
-        <c:crossAx val="144723744"/>
+        <c:crossAx val="171791968"/>
         <c:crosses val="autoZero"/>
         <c:crossBetween val="midCat"/>
         <c:majorUnit val="2"/>
@@ -1264,11 +1262,11 @@
           <c:showPercent val="0"/>
           <c:showBubbleSize val="0"/>
         </c:dLbls>
-        <c:axId val="182608952"/>
-        <c:axId val="182609344"/>
+        <c:axId val="171793144"/>
+        <c:axId val="171793536"/>
       </c:scatterChart>
       <c:valAx>
-        <c:axId val="182608952"/>
+        <c:axId val="171793144"/>
         <c:scaling>
           <c:logBase val="2"/>
           <c:orientation val="minMax"/>
@@ -1281,14 +1279,14 @@
         <c:majorTickMark val="out"/>
         <c:minorTickMark val="none"/>
         <c:tickLblPos val="nextTo"/>
-        <c:crossAx val="182609344"/>
+        <c:crossAx val="171793536"/>
         <c:crosses val="autoZero"/>
         <c:crossBetween val="midCat"/>
         <c:majorUnit val="4"/>
         <c:minorUnit val="4"/>
       </c:valAx>
       <c:valAx>
-        <c:axId val="182609344"/>
+        <c:axId val="171793536"/>
         <c:scaling>
           <c:orientation val="minMax"/>
           <c:max val="1"/>
@@ -1300,7 +1298,7 @@
         <c:majorTickMark val="out"/>
         <c:minorTickMark val="none"/>
         <c:tickLblPos val="nextTo"/>
-        <c:crossAx val="182608952"/>
+        <c:crossAx val="171793144"/>
         <c:crosses val="autoZero"/>
         <c:crossBetween val="midCat"/>
       </c:valAx>
@@ -1397,7 +1395,7 @@
           <a:p>
             <a:fld id="{2E6AAE95-D4FC-4D00-935A-EAE928727A56}" type="datetimeFigureOut">
               <a:rPr lang="en-US" smtClean="0"/>
-              <a:t>8/2/2016</a:t>
+              <a:t>8/4/2016</a:t>
             </a:fld>
             <a:endParaRPr lang="en-US"/>
           </a:p>
@@ -1930,7 +1928,7 @@
           <a:p>
             <a:fld id="{1CFF3F78-F57F-4409-A41B-5EC46D4F404B}" type="datetime1">
               <a:rPr lang="nl-BE" smtClean="0"/>
-              <a:t>2016-08-02</a:t>
+              <a:t>2016-08-04</a:t>
             </a:fld>
             <a:endParaRPr lang="nl-BE"/>
           </a:p>
@@ -2100,7 +2098,7 @@
           <a:p>
             <a:fld id="{7D029E61-52E3-412C-82EB-2F81B17C0AF1}" type="datetime1">
               <a:rPr lang="nl-BE" smtClean="0"/>
-              <a:t>2016-08-02</a:t>
+              <a:t>2016-08-04</a:t>
             </a:fld>
             <a:endParaRPr lang="nl-BE"/>
           </a:p>
@@ -2280,7 +2278,7 @@
           <a:p>
             <a:fld id="{A83F1CEF-A38E-4001-89C6-F3FC7784F299}" type="datetime1">
               <a:rPr lang="nl-BE" smtClean="0"/>
-              <a:t>2016-08-02</a:t>
+              <a:t>2016-08-04</a:t>
             </a:fld>
             <a:endParaRPr lang="nl-BE"/>
           </a:p>
@@ -2406,7 +2404,7 @@
           <a:p>
             <a:fld id="{1FDE84DB-AADA-4C3F-BF46-CA664A504479}" type="datetime1">
               <a:rPr lang="nl-BE" smtClean="0"/>
-              <a:t>2016-08-02</a:t>
+              <a:t>2016-08-04</a:t>
             </a:fld>
             <a:endParaRPr lang="nl-BE" dirty="0"/>
           </a:p>
@@ -2650,7 +2648,7 @@
           <a:p>
             <a:fld id="{8CD53A43-C15C-4F05-9AD7-DB9DE837084D}" type="datetime1">
               <a:rPr lang="nl-BE" smtClean="0"/>
-              <a:t>2016-08-02</a:t>
+              <a:t>2016-08-04</a:t>
             </a:fld>
             <a:endParaRPr lang="nl-BE"/>
           </a:p>
@@ -2896,7 +2894,7 @@
           <a:p>
             <a:fld id="{8994D238-D949-4AEF-9753-A8B6EFA964A0}" type="datetime1">
               <a:rPr lang="nl-BE" smtClean="0"/>
-              <a:t>2016-08-02</a:t>
+              <a:t>2016-08-04</a:t>
             </a:fld>
             <a:endParaRPr lang="nl-BE"/>
           </a:p>
@@ -3184,7 +3182,7 @@
           <a:p>
             <a:fld id="{4D234023-BF99-4AD0-835E-8125DA2B6664}" type="datetime1">
               <a:rPr lang="nl-BE" smtClean="0"/>
-              <a:t>2016-08-02</a:t>
+              <a:t>2016-08-04</a:t>
             </a:fld>
             <a:endParaRPr lang="nl-BE"/>
           </a:p>
@@ -3606,7 +3604,7 @@
           <a:p>
             <a:fld id="{DB075A73-5C1D-406E-9444-3C5C58580E8E}" type="datetime1">
               <a:rPr lang="nl-BE" smtClean="0"/>
-              <a:t>2016-08-02</a:t>
+              <a:t>2016-08-04</a:t>
             </a:fld>
             <a:endParaRPr lang="nl-BE"/>
           </a:p>
@@ -3724,7 +3722,7 @@
           <a:p>
             <a:fld id="{E111FB2D-2E17-4D8F-A64A-4EB0C3D12494}" type="datetime1">
               <a:rPr lang="nl-BE" smtClean="0"/>
-              <a:t>2016-08-02</a:t>
+              <a:t>2016-08-04</a:t>
             </a:fld>
             <a:endParaRPr lang="nl-BE"/>
           </a:p>
@@ -3819,7 +3817,7 @@
           <a:p>
             <a:fld id="{5BE27D71-2267-4E44-9F33-05B60E5C7D9D}" type="datetime1">
               <a:rPr lang="nl-BE" smtClean="0"/>
-              <a:t>2016-08-02</a:t>
+              <a:t>2016-08-04</a:t>
             </a:fld>
             <a:endParaRPr lang="nl-BE"/>
           </a:p>
@@ -4096,7 +4094,7 @@
           <a:p>
             <a:fld id="{182F587C-96C8-4813-A767-3084061A3229}" type="datetime1">
               <a:rPr lang="nl-BE" smtClean="0"/>
-              <a:t>2016-08-02</a:t>
+              <a:t>2016-08-04</a:t>
             </a:fld>
             <a:endParaRPr lang="nl-BE"/>
           </a:p>
@@ -4349,7 +4347,7 @@
           <a:p>
             <a:fld id="{8B021CF8-BBBB-4DFA-8713-49842AA07274}" type="datetime1">
               <a:rPr lang="nl-BE" smtClean="0"/>
-              <a:t>2016-08-02</a:t>
+              <a:t>2016-08-04</a:t>
             </a:fld>
             <a:endParaRPr lang="nl-BE"/>
           </a:p>
@@ -4562,7 +4560,7 @@
           <a:p>
             <a:fld id="{CDBFABB5-0AB3-4CB6-A705-6887DEB1F9F2}" type="datetime1">
               <a:rPr lang="nl-BE" smtClean="0"/>
-              <a:t>2016-08-02</a:t>
+              <a:t>2016-08-04</a:t>
             </a:fld>
             <a:endParaRPr lang="nl-BE"/>
           </a:p>
@@ -8758,7 +8756,7 @@
           <a:graphicData uri="http://schemas.openxmlformats.org/presentationml/2006/ole">
             <mc:AlternateContent xmlns:mc="http://schemas.openxmlformats.org/markup-compatibility/2006">
               <mc:Choice xmlns:v="urn:schemas-microsoft-com:vml" Requires="v">
-                <p:oleObj spid="_x0000_s1146" name="Equation" r:id="rId3" imgW="812520" imgH="393480" progId="Equation.3">
+                <p:oleObj spid="_x0000_s1148" name="Equation" r:id="rId3" imgW="812520" imgH="393480" progId="Equation.3">
                   <p:embed/>
                 </p:oleObj>
               </mc:Choice>
@@ -8815,7 +8813,7 @@
           <a:graphicData uri="http://schemas.openxmlformats.org/presentationml/2006/ole">
             <mc:AlternateContent xmlns:mc="http://schemas.openxmlformats.org/markup-compatibility/2006">
               <mc:Choice xmlns:v="urn:schemas-microsoft-com:vml" Requires="v">
-                <p:oleObj spid="_x0000_s1147" name="Equation" r:id="rId5" imgW="2489040" imgH="431640" progId="Equation.3">
+                <p:oleObj spid="_x0000_s1149" name="Equation" r:id="rId5" imgW="2489040" imgH="431640" progId="Equation.3">
                   <p:embed/>
                 </p:oleObj>
               </mc:Choice>
@@ -19349,15 +19347,7 @@
           <a:p>
             <a:r>
               <a:rPr lang="en-US" dirty="0" smtClean="0"/>
-              <a:t>Ordering of </a:t>
-            </a:r>
-            <a:r>
-              <a:rPr lang="en-US" dirty="0" smtClean="0"/>
-              <a:t>2D/3D/… </a:t>
-            </a:r>
-            <a:r>
-              <a:rPr lang="en-US" dirty="0" smtClean="0"/>
-              <a:t>arrays</a:t>
+              <a:t>Ordering of 2D/3D/… arrays</a:t>
             </a:r>
           </a:p>
           <a:p>
@@ -19426,7 +19416,7 @@
           <a:graphicData uri="http://schemas.openxmlformats.org/presentationml/2006/ole">
             <mc:AlternateContent xmlns:mc="http://schemas.openxmlformats.org/markup-compatibility/2006">
               <mc:Choice xmlns:v="urn:schemas-microsoft-com:vml" Requires="v">
-                <p:oleObj spid="_x0000_s2137" name="Equation" r:id="rId3" imgW="1091880" imgH="1041120" progId="Equation.3">
+                <p:oleObj spid="_x0000_s2139" name="Equation" r:id="rId3" imgW="1091880" imgH="1041120" progId="Equation.3">
                   <p:embed/>
                 </p:oleObj>
               </mc:Choice>
@@ -20797,7 +20787,7 @@
           <a:graphicData uri="http://schemas.openxmlformats.org/presentationml/2006/ole">
             <mc:AlternateContent xmlns:mc="http://schemas.openxmlformats.org/markup-compatibility/2006">
               <mc:Choice xmlns:v="urn:schemas-microsoft-com:vml" Requires="v">
-                <p:oleObj spid="_x0000_s2138" name="Equation" r:id="rId5" imgW="1091880" imgH="1041120" progId="Equation.3">
+                <p:oleObj spid="_x0000_s2140" name="Equation" r:id="rId5" imgW="1091880" imgH="1041120" progId="Equation.3">
                   <p:embed/>
                 </p:oleObj>
               </mc:Choice>
@@ -23686,11 +23676,7 @@
           <a:p>
             <a:r>
               <a:rPr lang="en-US" dirty="0" smtClean="0"/>
-              <a:t>Cache </a:t>
-            </a:r>
-            <a:r>
-              <a:rPr lang="en-US" dirty="0" smtClean="0"/>
-              <a:t>associativity: size matters</a:t>
+              <a:t>Cache associativity: size matters</a:t>
             </a:r>
             <a:endParaRPr lang="nl-BE" dirty="0"/>
           </a:p>
@@ -23708,7 +23694,9 @@
         </p:nvSpPr>
         <p:spPr/>
         <p:txBody>
-          <a:bodyPr/>
+          <a:bodyPr>
+            <a:normAutofit lnSpcReduction="10000"/>
+          </a:bodyPr>
           <a:lstStyle/>
           <a:p>
             <a:r>
@@ -23730,11 +23718,7 @@
             <a:pPr lvl="1"/>
             <a:r>
               <a:rPr lang="en-US" dirty="0" smtClean="0"/>
-              <a:t>cache line: 64 byte, </a:t>
-            </a:r>
-            <a:r>
-              <a:rPr lang="en-US" dirty="0" smtClean="0"/>
-              <a:t>so 262144/64 = 4096 slots</a:t>
+              <a:t>cache line: 64 byte, so 262144/64 = 4096 slots</a:t>
             </a:r>
           </a:p>
           <a:p>
@@ -23758,7 +23742,28 @@
             </a:r>
             <a:r>
               <a:rPr lang="en-US" dirty="0" smtClean="0"/>
-              <a:t>64 = 32768 bytes apart competes for slots</a:t>
+              <a:t>64 = 32768 bytes apart competes for </a:t>
+            </a:r>
+            <a:r>
+              <a:rPr lang="en-US" dirty="0" smtClean="0"/>
+              <a:t>slots</a:t>
+            </a:r>
+          </a:p>
+          <a:p>
+            <a:pPr lvl="1"/>
+            <a:endParaRPr lang="en-US" dirty="0"/>
+          </a:p>
+          <a:p>
+            <a:r>
+              <a:rPr lang="en-US" dirty="0" smtClean="0"/>
+              <a:t>L1/L2: 8-way associative</a:t>
+            </a:r>
+            <a:br>
+              <a:rPr lang="en-US" dirty="0" smtClean="0"/>
+            </a:br>
+            <a:r>
+              <a:rPr lang="en-US" dirty="0" smtClean="0"/>
+              <a:t>L3: 20-way associative</a:t>
             </a:r>
             <a:endParaRPr lang="nl-BE" dirty="0"/>
           </a:p>
@@ -23795,7 +23800,7 @@
         </p:nvSpPr>
         <p:spPr>
           <a:xfrm>
-            <a:off x="1619672" y="5301208"/>
+            <a:off x="1619672" y="4479503"/>
             <a:ext cx="6429965" cy="461665"/>
           </a:xfrm>
           <a:prstGeom prst="rect">
@@ -23816,9 +23821,71 @@
           <a:p>
             <a:r>
               <a:rPr lang="en-US" sz="2400" dirty="0" smtClean="0"/>
-              <a:t>Cache evictions limit reuse, reduces performance!</a:t>
+              <a:t>Cache evictions limit reuse, </a:t>
+            </a:r>
+            <a:r>
+              <a:rPr lang="en-US" sz="2400" dirty="0" smtClean="0"/>
+              <a:t>reduce </a:t>
+            </a:r>
+            <a:r>
+              <a:rPr lang="en-US" sz="2400" dirty="0" smtClean="0"/>
+              <a:t>performance!</a:t>
             </a:r>
             <a:endParaRPr lang="nl-BE" sz="2400" dirty="0"/>
+          </a:p>
+        </p:txBody>
+      </p:sp>
+      <p:sp>
+        <p:nvSpPr>
+          <p:cNvPr id="6" name="TextBox 5"/>
+          <p:cNvSpPr txBox="1"/>
+          <p:nvPr/>
+        </p:nvSpPr>
+        <p:spPr>
+          <a:xfrm>
+            <a:off x="5523111" y="5479832"/>
+            <a:ext cx="2528256" cy="646331"/>
+          </a:xfrm>
+          <a:prstGeom prst="rect">
+            <a:avLst/>
+          </a:prstGeom>
+          <a:noFill/>
+          <a:ln>
+            <a:solidFill>
+              <a:schemeClr val="tx1"/>
+            </a:solidFill>
+          </a:ln>
+        </p:spPr>
+        <p:txBody>
+          <a:bodyPr wrap="none" rtlCol="0">
+            <a:spAutoFit/>
+          </a:bodyPr>
+          <a:lstStyle/>
+          <a:p>
+            <a:r>
+              <a:rPr lang="en-US" dirty="0" smtClean="0"/>
+              <a:t>Cache info:</a:t>
+            </a:r>
+          </a:p>
+          <a:p>
+            <a:r>
+              <a:rPr lang="en-US" dirty="0" err="1" smtClean="0">
+                <a:latin typeface="Courier New" panose="02070309020205020404" pitchFamily="49" charset="0"/>
+                <a:cs typeface="Courier New" panose="02070309020205020404" pitchFamily="49" charset="0"/>
+              </a:rPr>
+              <a:t>dmidecode</a:t>
+            </a:r>
+            <a:r>
+              <a:rPr lang="en-US" dirty="0" smtClean="0">
+                <a:latin typeface="Courier New" panose="02070309020205020404" pitchFamily="49" charset="0"/>
+                <a:cs typeface="Courier New" panose="02070309020205020404" pitchFamily="49" charset="0"/>
+              </a:rPr>
+              <a:t> –type 7</a:t>
+            </a:r>
+            <a:endParaRPr lang="nl-BE" dirty="0">
+              <a:latin typeface="Courier New" panose="02070309020205020404" pitchFamily="49" charset="0"/>
+              <a:cs typeface="Courier New" panose="02070309020205020404" pitchFamily="49" charset="0"/>
+            </a:endParaRPr>
           </a:p>
         </p:txBody>
       </p:sp>
@@ -24133,6 +24200,100 @@
                       </p:childTnLst>
                     </p:cTn>
                   </p:par>
+                  <p:par>
+                    <p:cTn id="27" fill="hold">
+                      <p:stCondLst>
+                        <p:cond delay="indefinite"/>
+                      </p:stCondLst>
+                      <p:childTnLst>
+                        <p:par>
+                          <p:cTn id="28" fill="hold">
+                            <p:stCondLst>
+                              <p:cond delay="0"/>
+                            </p:stCondLst>
+                            <p:childTnLst>
+                              <p:par>
+                                <p:cTn id="29" presetID="1" presetClass="entr" presetSubtype="0" fill="hold" grpId="0" nodeType="clickEffect">
+                                  <p:stCondLst>
+                                    <p:cond delay="0"/>
+                                  </p:stCondLst>
+                                  <p:childTnLst>
+                                    <p:set>
+                                      <p:cBhvr>
+                                        <p:cTn id="30" dur="1" fill="hold">
+                                          <p:stCondLst>
+                                            <p:cond delay="0"/>
+                                          </p:stCondLst>
+                                        </p:cTn>
+                                        <p:tgtEl>
+                                          <p:spTgt spid="3">
+                                            <p:txEl>
+                                              <p:pRg st="6" end="6"/>
+                                            </p:txEl>
+                                          </p:spTgt>
+                                        </p:tgtEl>
+                                        <p:attrNameLst>
+                                          <p:attrName>style.visibility</p:attrName>
+                                        </p:attrNameLst>
+                                      </p:cBhvr>
+                                      <p:to>
+                                        <p:strVal val="visible"/>
+                                      </p:to>
+                                    </p:set>
+                                  </p:childTnLst>
+                                </p:cTn>
+                              </p:par>
+                            </p:childTnLst>
+                          </p:cTn>
+                        </p:par>
+                      </p:childTnLst>
+                    </p:cTn>
+                  </p:par>
+                  <p:par>
+                    <p:cTn id="31" fill="hold">
+                      <p:stCondLst>
+                        <p:cond delay="indefinite"/>
+                      </p:stCondLst>
+                      <p:childTnLst>
+                        <p:par>
+                          <p:cTn id="32" fill="hold">
+                            <p:stCondLst>
+                              <p:cond delay="0"/>
+                            </p:stCondLst>
+                            <p:childTnLst>
+                              <p:par>
+                                <p:cTn id="33" presetID="1" presetClass="entr" presetSubtype="0" fill="hold" grpId="0" nodeType="clickEffect">
+                                  <p:stCondLst>
+                                    <p:cond delay="0"/>
+                                  </p:stCondLst>
+                                  <p:childTnLst>
+                                    <p:set>
+                                      <p:cBhvr>
+                                        <p:cTn id="34" dur="1" fill="hold">
+                                          <p:stCondLst>
+                                            <p:cond delay="0"/>
+                                          </p:stCondLst>
+                                        </p:cTn>
+                                        <p:tgtEl>
+                                          <p:spTgt spid="6"/>
+                                        </p:tgtEl>
+                                        <p:attrNameLst>
+                                          <p:attrName>style.visibility</p:attrName>
+                                        </p:attrNameLst>
+                                      </p:cBhvr>
+                                      <p:to>
+                                        <p:strVal val="visible"/>
+                                      </p:to>
+                                    </p:set>
+                                  </p:childTnLst>
+                                </p:cTn>
+                              </p:par>
+                            </p:childTnLst>
+                          </p:cTn>
+                        </p:par>
+                      </p:childTnLst>
+                    </p:cTn>
+                  </p:par>
                 </p:childTnLst>
               </p:cTn>
               <p:prevCondLst>
@@ -24157,6 +24318,7 @@
     <p:bldLst>
       <p:bldP spid="3" grpId="0" uiExpand="1" build="p" bldLvl="2"/>
       <p:bldP spid="5" grpId="0" animBg="1"/>
+      <p:bldP spid="6" grpId="0" animBg="1"/>
     </p:bldLst>
   </p:timing>
 </p:sld>
@@ -26979,7 +27141,7 @@
           <a:graphicData uri="http://schemas.openxmlformats.org/presentationml/2006/ole">
             <mc:AlternateContent xmlns:mc="http://schemas.openxmlformats.org/markup-compatibility/2006">
               <mc:Choice xmlns:v="urn:schemas-microsoft-com:vml" Requires="v">
-                <p:oleObj spid="_x0000_s3081" name="Equation" r:id="rId3" imgW="965160" imgH="228600" progId="Equation.3">
+                <p:oleObj spid="_x0000_s3082" name="Equation" r:id="rId3" imgW="965160" imgH="228600" progId="Equation.3">
                   <p:embed/>
                 </p:oleObj>
               </mc:Choice>
@@ -29404,11 +29566,7 @@
             </a:br>
             <a:r>
               <a:rPr lang="nl-BE" dirty="0" smtClean="0"/>
-              <a:t>Georg </a:t>
-            </a:r>
-            <a:r>
-              <a:rPr lang="nl-BE" dirty="0" smtClean="0"/>
-              <a:t>Hager &amp; Gerhard </a:t>
+              <a:t>Georg Hager &amp; Gerhard </a:t>
             </a:r>
             <a:r>
               <a:rPr lang="nl-BE" dirty="0" err="1" smtClean="0"/>
@@ -29424,11 +29582,7 @@
             </a:r>
             <a:r>
               <a:rPr lang="nl-BE" dirty="0" smtClean="0"/>
-              <a:t> &amp; Hall, </a:t>
-            </a:r>
-            <a:r>
-              <a:rPr lang="nl-BE" dirty="0" smtClean="0"/>
-              <a:t>2010</a:t>
+              <a:t> &amp; Hall, 2010</a:t>
             </a:r>
             <a:endParaRPr lang="en-US" b="1" dirty="0"/>
           </a:p>
@@ -31863,13 +32017,8 @@
             <a:pPr lvl="2"/>
             <a:r>
               <a:rPr lang="en-US" dirty="0" smtClean="0"/>
-              <a:t>compiler flags, </a:t>
-            </a:r>
-            <a:r>
-              <a:rPr lang="en-US" dirty="0" smtClean="0"/>
-              <a:t>programmer can/should help</a:t>
-            </a:r>
-            <a:endParaRPr lang="en-US" dirty="0" smtClean="0"/>
+              <a:t>compiler flags, programmer can/should help</a:t>
+            </a:r>
           </a:p>
           <a:p>
             <a:pPr lvl="1"/>
@@ -31901,26 +32050,14 @@
             <a:pPr lvl="1"/>
             <a:r>
               <a:rPr lang="en-US" dirty="0" smtClean="0"/>
-              <a:t>multiple </a:t>
-            </a:r>
+              <a:t>multiple nodes, i.e., distributed</a:t>
+            </a:r>
+          </a:p>
+          <a:p>
+            <a:pPr lvl="2"/>
             <a:r>
               <a:rPr lang="en-US" dirty="0" smtClean="0"/>
-              <a:t>nodes, </a:t>
-            </a:r>
-            <a:r>
-              <a:rPr lang="en-US" dirty="0" smtClean="0"/>
-              <a:t>i.e., distributed</a:t>
-            </a:r>
-          </a:p>
-          <a:p>
-            <a:pPr lvl="2"/>
-            <a:r>
-              <a:rPr lang="en-US" dirty="0" smtClean="0"/>
-              <a:t>MPI/CAF/UPC/Chapel: </a:t>
-            </a:r>
-            <a:r>
-              <a:rPr lang="en-US" dirty="0" smtClean="0"/>
-              <a:t>programmer's job</a:t>
+              <a:t>MPI/CAF/UPC/Chapel: programmer's job</a:t>
             </a:r>
           </a:p>
           <a:p>

</xml_diff>

<commit_message>
Added slides on useful tools
</commit_message>
<xml_diff>
--- a/Optimization/hpc_efficiency.pptx
+++ b/Optimization/hpc_efficiency.pptx
@@ -5,7 +5,7 @@
     <p:sldMasterId id="2147483648" r:id="rId1"/>
   </p:sldMasterIdLst>
   <p:notesMasterIdLst>
-    <p:notesMasterId r:id="rId39"/>
+    <p:notesMasterId r:id="rId40"/>
   </p:notesMasterIdLst>
   <p:sldIdLst>
     <p:sldId id="267" r:id="rId2"/>
@@ -43,8 +43,9 @@
     <p:sldId id="287" r:id="rId34"/>
     <p:sldId id="292" r:id="rId35"/>
     <p:sldId id="286" r:id="rId36"/>
-    <p:sldId id="271" r:id="rId37"/>
-    <p:sldId id="283" r:id="rId38"/>
+    <p:sldId id="297" r:id="rId37"/>
+    <p:sldId id="271" r:id="rId38"/>
+    <p:sldId id="283" r:id="rId39"/>
   </p:sldIdLst>
   <p:sldSz cx="9144000" cy="6858000" type="screen4x3"/>
   <p:notesSz cx="6858000" cy="9144000"/>
@@ -272,11 +273,11 @@
           <c:showPercent val="0"/>
           <c:showBubbleSize val="0"/>
         </c:dLbls>
-        <c:axId val="171381488"/>
-        <c:axId val="170399888"/>
+        <c:axId val="347863360"/>
+        <c:axId val="347865320"/>
       </c:scatterChart>
       <c:valAx>
-        <c:axId val="171381488"/>
+        <c:axId val="347863360"/>
         <c:scaling>
           <c:logBase val="2"/>
           <c:orientation val="minMax"/>
@@ -288,14 +289,14 @@
         <c:majorTickMark val="out"/>
         <c:minorTickMark val="none"/>
         <c:tickLblPos val="nextTo"/>
-        <c:crossAx val="170399888"/>
+        <c:crossAx val="347865320"/>
         <c:crosses val="autoZero"/>
         <c:crossBetween val="midCat"/>
         <c:majorUnit val="4"/>
         <c:minorUnit val="4"/>
       </c:valAx>
       <c:valAx>
-        <c:axId val="170399888"/>
+        <c:axId val="347865320"/>
         <c:scaling>
           <c:logBase val="2"/>
           <c:orientation val="minMax"/>
@@ -308,7 +309,7 @@
         <c:majorTickMark val="out"/>
         <c:minorTickMark val="none"/>
         <c:tickLblPos val="nextTo"/>
-        <c:crossAx val="171381488"/>
+        <c:crossAx val="347863360"/>
         <c:crosses val="autoZero"/>
         <c:crossBetween val="midCat"/>
         <c:majorUnit val="4"/>
@@ -681,11 +682,11 @@
           <c:showPercent val="0"/>
           <c:showBubbleSize val="0"/>
         </c:dLbls>
-        <c:axId val="171368432"/>
-        <c:axId val="170646032"/>
+        <c:axId val="347864928"/>
+        <c:axId val="347861792"/>
       </c:scatterChart>
       <c:valAx>
-        <c:axId val="171368432"/>
+        <c:axId val="347864928"/>
         <c:scaling>
           <c:logBase val="2"/>
           <c:orientation val="minMax"/>
@@ -698,14 +699,14 @@
         <c:majorTickMark val="out"/>
         <c:minorTickMark val="none"/>
         <c:tickLblPos val="nextTo"/>
-        <c:crossAx val="170646032"/>
+        <c:crossAx val="347861792"/>
         <c:crosses val="autoZero"/>
         <c:crossBetween val="midCat"/>
         <c:majorUnit val="4"/>
         <c:minorUnit val="4"/>
       </c:valAx>
       <c:valAx>
-        <c:axId val="170646032"/>
+        <c:axId val="347861792"/>
         <c:scaling>
           <c:logBase val="2"/>
           <c:orientation val="minMax"/>
@@ -719,7 +720,7 @@
         <c:majorTickMark val="out"/>
         <c:minorTickMark val="none"/>
         <c:tickLblPos val="nextTo"/>
-        <c:crossAx val="171368432"/>
+        <c:crossAx val="347864928"/>
         <c:crosses val="autoZero"/>
         <c:crossBetween val="midCat"/>
         <c:majorUnit val="4"/>
@@ -932,11 +933,11 @@
           <c:showPercent val="0"/>
           <c:showBubbleSize val="0"/>
         </c:dLbls>
-        <c:axId val="171790792"/>
-        <c:axId val="171791184"/>
+        <c:axId val="347861400"/>
+        <c:axId val="347859048"/>
       </c:scatterChart>
       <c:valAx>
-        <c:axId val="171790792"/>
+        <c:axId val="347861400"/>
         <c:scaling>
           <c:logBase val="2"/>
           <c:orientation val="minMax"/>
@@ -949,13 +950,13 @@
         <c:majorTickMark val="out"/>
         <c:minorTickMark val="none"/>
         <c:tickLblPos val="nextTo"/>
-        <c:crossAx val="171791184"/>
+        <c:crossAx val="347859048"/>
         <c:crosses val="autoZero"/>
         <c:crossBetween val="midCat"/>
         <c:minorUnit val="4"/>
       </c:valAx>
       <c:valAx>
-        <c:axId val="171791184"/>
+        <c:axId val="347859048"/>
         <c:scaling>
           <c:logBase val="2"/>
           <c:orientation val="minMax"/>
@@ -969,7 +970,7 @@
         <c:majorTickMark val="out"/>
         <c:minorTickMark val="none"/>
         <c:tickLblPos val="nextTo"/>
-        <c:crossAx val="171790792"/>
+        <c:crossAx val="347861400"/>
         <c:crosses val="autoZero"/>
         <c:crossBetween val="midCat"/>
         <c:majorUnit val="2"/>
@@ -1100,11 +1101,11 @@
           <c:showPercent val="0"/>
           <c:showBubbleSize val="0"/>
         </c:dLbls>
-        <c:axId val="171791968"/>
-        <c:axId val="171792360"/>
+        <c:axId val="347862576"/>
+        <c:axId val="347862968"/>
       </c:scatterChart>
       <c:valAx>
-        <c:axId val="171791968"/>
+        <c:axId val="347862576"/>
         <c:scaling>
           <c:logBase val="2"/>
           <c:orientation val="minMax"/>
@@ -1117,13 +1118,13 @@
         <c:majorTickMark val="out"/>
         <c:minorTickMark val="none"/>
         <c:tickLblPos val="nextTo"/>
-        <c:crossAx val="171792360"/>
+        <c:crossAx val="347862968"/>
         <c:crosses val="autoZero"/>
         <c:crossBetween val="midCat"/>
         <c:majorUnit val="4"/>
       </c:valAx>
       <c:valAx>
-        <c:axId val="171792360"/>
+        <c:axId val="347862968"/>
         <c:scaling>
           <c:logBase val="2"/>
           <c:orientation val="minMax"/>
@@ -1136,7 +1137,7 @@
         <c:majorTickMark val="out"/>
         <c:minorTickMark val="none"/>
         <c:tickLblPos val="nextTo"/>
-        <c:crossAx val="171791968"/>
+        <c:crossAx val="347862576"/>
         <c:crosses val="autoZero"/>
         <c:crossBetween val="midCat"/>
         <c:majorUnit val="2"/>
@@ -1262,11 +1263,11 @@
           <c:showPercent val="0"/>
           <c:showBubbleSize val="0"/>
         </c:dLbls>
-        <c:axId val="171793144"/>
-        <c:axId val="171793536"/>
+        <c:axId val="349187992"/>
+        <c:axId val="349190344"/>
       </c:scatterChart>
       <c:valAx>
-        <c:axId val="171793144"/>
+        <c:axId val="349187992"/>
         <c:scaling>
           <c:logBase val="2"/>
           <c:orientation val="minMax"/>
@@ -1279,14 +1280,14 @@
         <c:majorTickMark val="out"/>
         <c:minorTickMark val="none"/>
         <c:tickLblPos val="nextTo"/>
-        <c:crossAx val="171793536"/>
+        <c:crossAx val="349190344"/>
         <c:crosses val="autoZero"/>
         <c:crossBetween val="midCat"/>
         <c:majorUnit val="4"/>
         <c:minorUnit val="4"/>
       </c:valAx>
       <c:valAx>
-        <c:axId val="171793536"/>
+        <c:axId val="349190344"/>
         <c:scaling>
           <c:orientation val="minMax"/>
           <c:max val="1"/>
@@ -1298,7 +1299,7 @@
         <c:majorTickMark val="out"/>
         <c:minorTickMark val="none"/>
         <c:tickLblPos val="nextTo"/>
-        <c:crossAx val="171793144"/>
+        <c:crossAx val="349187992"/>
         <c:crosses val="autoZero"/>
         <c:crossBetween val="midCat"/>
       </c:valAx>
@@ -1395,7 +1396,7 @@
           <a:p>
             <a:fld id="{2E6AAE95-D4FC-4D00-935A-EAE928727A56}" type="datetimeFigureOut">
               <a:rPr lang="en-US" smtClean="0"/>
-              <a:t>8/4/2016</a:t>
+              <a:t>2016-09-02</a:t>
             </a:fld>
             <a:endParaRPr lang="en-US"/>
           </a:p>
@@ -1928,7 +1929,7 @@
           <a:p>
             <a:fld id="{1CFF3F78-F57F-4409-A41B-5EC46D4F404B}" type="datetime1">
               <a:rPr lang="nl-BE" smtClean="0"/>
-              <a:t>2016-08-04</a:t>
+              <a:t>2/09/2016</a:t>
             </a:fld>
             <a:endParaRPr lang="nl-BE"/>
           </a:p>
@@ -2098,7 +2099,7 @@
           <a:p>
             <a:fld id="{7D029E61-52E3-412C-82EB-2F81B17C0AF1}" type="datetime1">
               <a:rPr lang="nl-BE" smtClean="0"/>
-              <a:t>2016-08-04</a:t>
+              <a:t>2/09/2016</a:t>
             </a:fld>
             <a:endParaRPr lang="nl-BE"/>
           </a:p>
@@ -2278,7 +2279,7 @@
           <a:p>
             <a:fld id="{A83F1CEF-A38E-4001-89C6-F3FC7784F299}" type="datetime1">
               <a:rPr lang="nl-BE" smtClean="0"/>
-              <a:t>2016-08-04</a:t>
+              <a:t>2/09/2016</a:t>
             </a:fld>
             <a:endParaRPr lang="nl-BE"/>
           </a:p>
@@ -2404,7 +2405,7 @@
           <a:p>
             <a:fld id="{1FDE84DB-AADA-4C3F-BF46-CA664A504479}" type="datetime1">
               <a:rPr lang="nl-BE" smtClean="0"/>
-              <a:t>2016-08-04</a:t>
+              <a:t>2/09/2016</a:t>
             </a:fld>
             <a:endParaRPr lang="nl-BE" dirty="0"/>
           </a:p>
@@ -2648,7 +2649,7 @@
           <a:p>
             <a:fld id="{8CD53A43-C15C-4F05-9AD7-DB9DE837084D}" type="datetime1">
               <a:rPr lang="nl-BE" smtClean="0"/>
-              <a:t>2016-08-04</a:t>
+              <a:t>2/09/2016</a:t>
             </a:fld>
             <a:endParaRPr lang="nl-BE"/>
           </a:p>
@@ -2894,7 +2895,7 @@
           <a:p>
             <a:fld id="{8994D238-D949-4AEF-9753-A8B6EFA964A0}" type="datetime1">
               <a:rPr lang="nl-BE" smtClean="0"/>
-              <a:t>2016-08-04</a:t>
+              <a:t>2/09/2016</a:t>
             </a:fld>
             <a:endParaRPr lang="nl-BE"/>
           </a:p>
@@ -3182,7 +3183,7 @@
           <a:p>
             <a:fld id="{4D234023-BF99-4AD0-835E-8125DA2B6664}" type="datetime1">
               <a:rPr lang="nl-BE" smtClean="0"/>
-              <a:t>2016-08-04</a:t>
+              <a:t>2/09/2016</a:t>
             </a:fld>
             <a:endParaRPr lang="nl-BE"/>
           </a:p>
@@ -3604,7 +3605,7 @@
           <a:p>
             <a:fld id="{DB075A73-5C1D-406E-9444-3C5C58580E8E}" type="datetime1">
               <a:rPr lang="nl-BE" smtClean="0"/>
-              <a:t>2016-08-04</a:t>
+              <a:t>2/09/2016</a:t>
             </a:fld>
             <a:endParaRPr lang="nl-BE"/>
           </a:p>
@@ -3722,7 +3723,7 @@
           <a:p>
             <a:fld id="{E111FB2D-2E17-4D8F-A64A-4EB0C3D12494}" type="datetime1">
               <a:rPr lang="nl-BE" smtClean="0"/>
-              <a:t>2016-08-04</a:t>
+              <a:t>2/09/2016</a:t>
             </a:fld>
             <a:endParaRPr lang="nl-BE"/>
           </a:p>
@@ -3817,7 +3818,7 @@
           <a:p>
             <a:fld id="{5BE27D71-2267-4E44-9F33-05B60E5C7D9D}" type="datetime1">
               <a:rPr lang="nl-BE" smtClean="0"/>
-              <a:t>2016-08-04</a:t>
+              <a:t>2/09/2016</a:t>
             </a:fld>
             <a:endParaRPr lang="nl-BE"/>
           </a:p>
@@ -4094,7 +4095,7 @@
           <a:p>
             <a:fld id="{182F587C-96C8-4813-A767-3084061A3229}" type="datetime1">
               <a:rPr lang="nl-BE" smtClean="0"/>
-              <a:t>2016-08-04</a:t>
+              <a:t>2/09/2016</a:t>
             </a:fld>
             <a:endParaRPr lang="nl-BE"/>
           </a:p>
@@ -4347,7 +4348,7 @@
           <a:p>
             <a:fld id="{8B021CF8-BBBB-4DFA-8713-49842AA07274}" type="datetime1">
               <a:rPr lang="nl-BE" smtClean="0"/>
-              <a:t>2016-08-04</a:t>
+              <a:t>2/09/2016</a:t>
             </a:fld>
             <a:endParaRPr lang="nl-BE"/>
           </a:p>
@@ -4560,7 +4561,7 @@
           <a:p>
             <a:fld id="{CDBFABB5-0AB3-4CB6-A705-6887DEB1F9F2}" type="datetime1">
               <a:rPr lang="nl-BE" smtClean="0"/>
-              <a:t>2016-08-04</a:t>
+              <a:t>2/09/2016</a:t>
             </a:fld>
             <a:endParaRPr lang="nl-BE"/>
           </a:p>
@@ -8756,7 +8757,7 @@
           <a:graphicData uri="http://schemas.openxmlformats.org/presentationml/2006/ole">
             <mc:AlternateContent xmlns:mc="http://schemas.openxmlformats.org/markup-compatibility/2006">
               <mc:Choice xmlns:v="urn:schemas-microsoft-com:vml" Requires="v">
-                <p:oleObj spid="_x0000_s1148" name="Equation" r:id="rId3" imgW="812520" imgH="393480" progId="Equation.3">
+                <p:oleObj spid="_x0000_s1152" name="Equation" r:id="rId3" imgW="812520" imgH="393480" progId="Equation.3">
                   <p:embed/>
                 </p:oleObj>
               </mc:Choice>
@@ -8813,7 +8814,7 @@
           <a:graphicData uri="http://schemas.openxmlformats.org/presentationml/2006/ole">
             <mc:AlternateContent xmlns:mc="http://schemas.openxmlformats.org/markup-compatibility/2006">
               <mc:Choice xmlns:v="urn:schemas-microsoft-com:vml" Requires="v">
-                <p:oleObj spid="_x0000_s1149" name="Equation" r:id="rId5" imgW="2489040" imgH="431640" progId="Equation.3">
+                <p:oleObj spid="_x0000_s1153" name="Equation" r:id="rId5" imgW="2489040" imgH="431640" progId="Equation.3">
                   <p:embed/>
                 </p:oleObj>
               </mc:Choice>
@@ -19416,7 +19417,7 @@
           <a:graphicData uri="http://schemas.openxmlformats.org/presentationml/2006/ole">
             <mc:AlternateContent xmlns:mc="http://schemas.openxmlformats.org/markup-compatibility/2006">
               <mc:Choice xmlns:v="urn:schemas-microsoft-com:vml" Requires="v">
-                <p:oleObj spid="_x0000_s2139" name="Equation" r:id="rId3" imgW="1091880" imgH="1041120" progId="Equation.3">
+                <p:oleObj spid="_x0000_s2143" name="Equation" r:id="rId3" imgW="1091880" imgH="1041120" progId="Equation.3">
                   <p:embed/>
                 </p:oleObj>
               </mc:Choice>
@@ -20787,7 +20788,7 @@
           <a:graphicData uri="http://schemas.openxmlformats.org/presentationml/2006/ole">
             <mc:AlternateContent xmlns:mc="http://schemas.openxmlformats.org/markup-compatibility/2006">
               <mc:Choice xmlns:v="urn:schemas-microsoft-com:vml" Requires="v">
-                <p:oleObj spid="_x0000_s2140" name="Equation" r:id="rId5" imgW="1091880" imgH="1041120" progId="Equation.3">
+                <p:oleObj spid="_x0000_s2144" name="Equation" r:id="rId5" imgW="1091880" imgH="1041120" progId="Equation.3">
                   <p:embed/>
                 </p:oleObj>
               </mc:Choice>
@@ -23742,11 +23743,7 @@
             </a:r>
             <a:r>
               <a:rPr lang="en-US" dirty="0" smtClean="0"/>
-              <a:t>64 = 32768 bytes apart competes for </a:t>
-            </a:r>
-            <a:r>
-              <a:rPr lang="en-US" dirty="0" smtClean="0"/>
-              <a:t>slots</a:t>
+              <a:t>64 = 32768 bytes apart competes for slots</a:t>
             </a:r>
           </a:p>
           <a:p>
@@ -23821,15 +23818,7 @@
           <a:p>
             <a:r>
               <a:rPr lang="en-US" sz="2400" dirty="0" smtClean="0"/>
-              <a:t>Cache evictions limit reuse, </a:t>
-            </a:r>
-            <a:r>
-              <a:rPr lang="en-US" sz="2400" dirty="0" smtClean="0"/>
-              <a:t>reduce </a:t>
-            </a:r>
-            <a:r>
-              <a:rPr lang="en-US" sz="2400" dirty="0" smtClean="0"/>
-              <a:t>performance!</a:t>
+              <a:t>Cache evictions limit reuse, reduce performance!</a:t>
             </a:r>
             <a:endParaRPr lang="nl-BE" sz="2400" dirty="0"/>
           </a:p>
@@ -27141,7 +27130,7 @@
           <a:graphicData uri="http://schemas.openxmlformats.org/presentationml/2006/ole">
             <mc:AlternateContent xmlns:mc="http://schemas.openxmlformats.org/markup-compatibility/2006">
               <mc:Choice xmlns:v="urn:schemas-microsoft-com:vml" Requires="v">
-                <p:oleObj spid="_x0000_s3082" name="Equation" r:id="rId3" imgW="965160" imgH="228600" progId="Equation.3">
+                <p:oleObj spid="_x0000_s3084" name="Equation" r:id="rId3" imgW="965160" imgH="228600" progId="Equation.3">
                   <p:embed/>
                 </p:oleObj>
               </mc:Choice>
@@ -29725,10 +29714,640 @@
   <p:clrMapOvr>
     <a:masterClrMapping/>
   </p:clrMapOvr>
+  <p:timing>
+    <p:tnLst>
+      <p:par>
+        <p:cTn id="1" dur="indefinite" restart="never" nodeType="tmRoot"/>
+      </p:par>
+    </p:tnLst>
+  </p:timing>
 </p:sld>
 </file>
 
 <file path=ppt/slides/slide36.xml><?xml version="1.0" encoding="utf-8"?>
+<p:sld xmlns:a="http://schemas.openxmlformats.org/drawingml/2006/main" xmlns:r="http://schemas.openxmlformats.org/officeDocument/2006/relationships" xmlns:p="http://schemas.openxmlformats.org/presentationml/2006/main">
+  <p:cSld>
+    <p:spTree>
+      <p:nvGrpSpPr>
+        <p:cNvPr id="1" name=""/>
+        <p:cNvGrpSpPr/>
+        <p:nvPr/>
+      </p:nvGrpSpPr>
+      <p:grpSpPr>
+        <a:xfrm>
+          <a:off x="0" y="0"/>
+          <a:ext cx="0" cy="0"/>
+          <a:chOff x="0" y="0"/>
+          <a:chExt cx="0" cy="0"/>
+        </a:xfrm>
+      </p:grpSpPr>
+      <p:sp>
+        <p:nvSpPr>
+          <p:cNvPr id="2" name="Title 1"/>
+          <p:cNvSpPr>
+            <a:spLocks noGrp="1"/>
+          </p:cNvSpPr>
+          <p:nvPr>
+            <p:ph type="title"/>
+          </p:nvPr>
+        </p:nvSpPr>
+        <p:spPr/>
+        <p:txBody>
+          <a:bodyPr/>
+          <a:lstStyle/>
+          <a:p>
+            <a:r>
+              <a:rPr lang="en-US" dirty="0" smtClean="0"/>
+              <a:t>Tools</a:t>
+            </a:r>
+            <a:endParaRPr lang="en-US" dirty="0"/>
+          </a:p>
+        </p:txBody>
+      </p:sp>
+      <p:sp>
+        <p:nvSpPr>
+          <p:cNvPr id="3" name="Content Placeholder 2"/>
+          <p:cNvSpPr>
+            <a:spLocks noGrp="1"/>
+          </p:cNvSpPr>
+          <p:nvPr>
+            <p:ph idx="1"/>
+          </p:nvPr>
+        </p:nvSpPr>
+        <p:spPr/>
+        <p:txBody>
+          <a:bodyPr>
+            <a:normAutofit fontScale="92500" lnSpcReduction="10000"/>
+          </a:bodyPr>
+          <a:lstStyle/>
+          <a:p>
+            <a:r>
+              <a:rPr lang="en-US" dirty="0" smtClean="0"/>
+              <a:t>Profilers</a:t>
+            </a:r>
+          </a:p>
+          <a:p>
+            <a:pPr lvl="1"/>
+            <a:r>
+              <a:rPr lang="en-US" dirty="0" err="1" smtClean="0"/>
+              <a:t>gprof</a:t>
+            </a:r>
+            <a:endParaRPr lang="en-US" dirty="0" smtClean="0"/>
+          </a:p>
+          <a:p>
+            <a:pPr lvl="1"/>
+            <a:r>
+              <a:rPr lang="en-US" dirty="0" err="1" smtClean="0"/>
+              <a:t>Scalasca</a:t>
+            </a:r>
+            <a:endParaRPr lang="en-US" dirty="0" smtClean="0"/>
+          </a:p>
+          <a:p>
+            <a:pPr lvl="1"/>
+            <a:r>
+              <a:rPr lang="en-US" dirty="0" err="1" smtClean="0"/>
+              <a:t>AllineaForge</a:t>
+            </a:r>
+            <a:r>
+              <a:rPr lang="en-US" dirty="0" smtClean="0"/>
+              <a:t> MAP</a:t>
+            </a:r>
+          </a:p>
+          <a:p>
+            <a:pPr lvl="1"/>
+            <a:r>
+              <a:rPr lang="en-US" dirty="0" smtClean="0"/>
+              <a:t>Intel </a:t>
+            </a:r>
+            <a:r>
+              <a:rPr lang="en-US" dirty="0" err="1" smtClean="0"/>
+              <a:t>vTune</a:t>
+            </a:r>
+            <a:endParaRPr lang="en-US" dirty="0" smtClean="0"/>
+          </a:p>
+          <a:p>
+            <a:r>
+              <a:rPr lang="en-US" dirty="0" smtClean="0"/>
+              <a:t>Hardware information</a:t>
+            </a:r>
+          </a:p>
+          <a:p>
+            <a:pPr lvl="1"/>
+            <a:r>
+              <a:rPr lang="en-US" dirty="0" err="1" smtClean="0"/>
+              <a:t>lscpu</a:t>
+            </a:r>
+            <a:r>
+              <a:rPr lang="en-US" dirty="0" smtClean="0"/>
+              <a:t>: CPU information, including cache size and NUMA configuration</a:t>
+            </a:r>
+          </a:p>
+          <a:p>
+            <a:pPr lvl="1"/>
+            <a:r>
+              <a:rPr lang="en-US" dirty="0" err="1" smtClean="0"/>
+              <a:t>lstopo</a:t>
+            </a:r>
+            <a:r>
+              <a:rPr lang="en-US" dirty="0" smtClean="0"/>
+              <a:t>-no-graphics: more detailed cache topology</a:t>
+            </a:r>
+          </a:p>
+          <a:p>
+            <a:pPr lvl="1"/>
+            <a:r>
+              <a:rPr lang="en-US" dirty="0" smtClean="0"/>
+              <a:t>Intel </a:t>
+            </a:r>
+            <a:r>
+              <a:rPr lang="en-US" dirty="0" err="1" smtClean="0"/>
+              <a:t>mlc</a:t>
+            </a:r>
+            <a:r>
+              <a:rPr lang="en-US" dirty="0" smtClean="0"/>
+              <a:t>: provides memory bandwidth &amp; latency info</a:t>
+            </a:r>
+            <a:endParaRPr lang="en-US" dirty="0"/>
+          </a:p>
+        </p:txBody>
+      </p:sp>
+      <p:sp>
+        <p:nvSpPr>
+          <p:cNvPr id="4" name="Slide Number Placeholder 3"/>
+          <p:cNvSpPr>
+            <a:spLocks noGrp="1"/>
+          </p:cNvSpPr>
+          <p:nvPr>
+            <p:ph type="sldNum" sz="quarter" idx="12"/>
+          </p:nvPr>
+        </p:nvSpPr>
+        <p:spPr/>
+        <p:txBody>
+          <a:bodyPr/>
+          <a:lstStyle/>
+          <a:p>
+            <a:fld id="{6597116C-F94B-4B5B-973A-17F07FB5C418}" type="slidenum">
+              <a:rPr lang="nl-BE" smtClean="0"/>
+              <a:t>36</a:t>
+            </a:fld>
+            <a:endParaRPr lang="nl-BE"/>
+          </a:p>
+        </p:txBody>
+      </p:sp>
+      <p:sp>
+        <p:nvSpPr>
+          <p:cNvPr id="5" name="TextBox 4"/>
+          <p:cNvSpPr txBox="1"/>
+          <p:nvPr/>
+        </p:nvSpPr>
+        <p:spPr>
+          <a:xfrm>
+            <a:off x="5148064" y="2420888"/>
+            <a:ext cx="2201500" cy="954107"/>
+          </a:xfrm>
+          <a:prstGeom prst="rect">
+            <a:avLst/>
+          </a:prstGeom>
+          <a:noFill/>
+          <a:ln>
+            <a:solidFill>
+              <a:schemeClr val="tx1"/>
+            </a:solidFill>
+          </a:ln>
+        </p:spPr>
+        <p:txBody>
+          <a:bodyPr wrap="none" rtlCol="0">
+            <a:spAutoFit/>
+          </a:bodyPr>
+          <a:lstStyle/>
+          <a:p>
+            <a:pPr algn="ctr"/>
+            <a:r>
+              <a:rPr lang="en-US" sz="2800" dirty="0" smtClean="0"/>
+              <a:t>Use a profiler,</a:t>
+            </a:r>
+            <a:br>
+              <a:rPr lang="en-US" sz="2800" dirty="0" smtClean="0"/>
+            </a:br>
+            <a:r>
+              <a:rPr lang="en-US" sz="2800" dirty="0" smtClean="0"/>
+              <a:t>it is the law!</a:t>
+            </a:r>
+            <a:endParaRPr lang="en-US" sz="2800" dirty="0"/>
+          </a:p>
+        </p:txBody>
+      </p:sp>
+    </p:spTree>
+    <p:extLst>
+      <p:ext uri="{BB962C8B-B14F-4D97-AF65-F5344CB8AC3E}">
+        <p14:creationId xmlns:p14="http://schemas.microsoft.com/office/powerpoint/2010/main" val="1031716690"/>
+      </p:ext>
+    </p:extLst>
+  </p:cSld>
+  <p:clrMapOvr>
+    <a:masterClrMapping/>
+  </p:clrMapOvr>
+  <p:timing>
+    <p:tnLst>
+      <p:par>
+        <p:cTn id="1" dur="indefinite" restart="never" nodeType="tmRoot">
+          <p:childTnLst>
+            <p:seq concurrent="1" nextAc="seek">
+              <p:cTn id="2" dur="indefinite" nodeType="mainSeq">
+                <p:childTnLst>
+                  <p:par>
+                    <p:cTn id="3" fill="hold">
+                      <p:stCondLst>
+                        <p:cond delay="indefinite"/>
+                        <p:cond evt="onBegin" delay="0">
+                          <p:tn val="2"/>
+                        </p:cond>
+                      </p:stCondLst>
+                      <p:childTnLst>
+                        <p:par>
+                          <p:cTn id="4" fill="hold">
+                            <p:stCondLst>
+                              <p:cond delay="0"/>
+                            </p:stCondLst>
+                            <p:childTnLst>
+                              <p:par>
+                                <p:cTn id="5" presetID="1" presetClass="entr" presetSubtype="0" fill="hold" grpId="0" nodeType="withEffect">
+                                  <p:stCondLst>
+                                    <p:cond delay="0"/>
+                                  </p:stCondLst>
+                                  <p:childTnLst>
+                                    <p:set>
+                                      <p:cBhvr>
+                                        <p:cTn id="6" dur="1" fill="hold">
+                                          <p:stCondLst>
+                                            <p:cond delay="0"/>
+                                          </p:stCondLst>
+                                        </p:cTn>
+                                        <p:tgtEl>
+                                          <p:spTgt spid="3">
+                                            <p:txEl>
+                                              <p:pRg st="0" end="0"/>
+                                            </p:txEl>
+                                          </p:spTgt>
+                                        </p:tgtEl>
+                                        <p:attrNameLst>
+                                          <p:attrName>style.visibility</p:attrName>
+                                        </p:attrNameLst>
+                                      </p:cBhvr>
+                                      <p:to>
+                                        <p:strVal val="visible"/>
+                                      </p:to>
+                                    </p:set>
+                                  </p:childTnLst>
+                                </p:cTn>
+                              </p:par>
+                              <p:par>
+                                <p:cTn id="7" presetID="1" presetClass="entr" presetSubtype="0" fill="hold" grpId="0" nodeType="withEffect">
+                                  <p:stCondLst>
+                                    <p:cond delay="0"/>
+                                  </p:stCondLst>
+                                  <p:childTnLst>
+                                    <p:set>
+                                      <p:cBhvr>
+                                        <p:cTn id="8" dur="1" fill="hold">
+                                          <p:stCondLst>
+                                            <p:cond delay="0"/>
+                                          </p:stCondLst>
+                                        </p:cTn>
+                                        <p:tgtEl>
+                                          <p:spTgt spid="3">
+                                            <p:txEl>
+                                              <p:pRg st="1" end="1"/>
+                                            </p:txEl>
+                                          </p:spTgt>
+                                        </p:tgtEl>
+                                        <p:attrNameLst>
+                                          <p:attrName>style.visibility</p:attrName>
+                                        </p:attrNameLst>
+                                      </p:cBhvr>
+                                      <p:to>
+                                        <p:strVal val="visible"/>
+                                      </p:to>
+                                    </p:set>
+                                  </p:childTnLst>
+                                </p:cTn>
+                              </p:par>
+                              <p:par>
+                                <p:cTn id="9" presetID="1" presetClass="entr" presetSubtype="0" fill="hold" grpId="0" nodeType="withEffect">
+                                  <p:stCondLst>
+                                    <p:cond delay="0"/>
+                                  </p:stCondLst>
+                                  <p:childTnLst>
+                                    <p:set>
+                                      <p:cBhvr>
+                                        <p:cTn id="10" dur="1" fill="hold">
+                                          <p:stCondLst>
+                                            <p:cond delay="0"/>
+                                          </p:stCondLst>
+                                        </p:cTn>
+                                        <p:tgtEl>
+                                          <p:spTgt spid="3">
+                                            <p:txEl>
+                                              <p:pRg st="2" end="2"/>
+                                            </p:txEl>
+                                          </p:spTgt>
+                                        </p:tgtEl>
+                                        <p:attrNameLst>
+                                          <p:attrName>style.visibility</p:attrName>
+                                        </p:attrNameLst>
+                                      </p:cBhvr>
+                                      <p:to>
+                                        <p:strVal val="visible"/>
+                                      </p:to>
+                                    </p:set>
+                                  </p:childTnLst>
+                                </p:cTn>
+                              </p:par>
+                              <p:par>
+                                <p:cTn id="11" presetID="1" presetClass="entr" presetSubtype="0" fill="hold" grpId="0" nodeType="withEffect">
+                                  <p:stCondLst>
+                                    <p:cond delay="0"/>
+                                  </p:stCondLst>
+                                  <p:childTnLst>
+                                    <p:set>
+                                      <p:cBhvr>
+                                        <p:cTn id="12" dur="1" fill="hold">
+                                          <p:stCondLst>
+                                            <p:cond delay="0"/>
+                                          </p:stCondLst>
+                                        </p:cTn>
+                                        <p:tgtEl>
+                                          <p:spTgt spid="3">
+                                            <p:txEl>
+                                              <p:pRg st="3" end="3"/>
+                                            </p:txEl>
+                                          </p:spTgt>
+                                        </p:tgtEl>
+                                        <p:attrNameLst>
+                                          <p:attrName>style.visibility</p:attrName>
+                                        </p:attrNameLst>
+                                      </p:cBhvr>
+                                      <p:to>
+                                        <p:strVal val="visible"/>
+                                      </p:to>
+                                    </p:set>
+                                  </p:childTnLst>
+                                </p:cTn>
+                              </p:par>
+                              <p:par>
+                                <p:cTn id="13" presetID="1" presetClass="entr" presetSubtype="0" fill="hold" grpId="0" nodeType="withEffect">
+                                  <p:stCondLst>
+                                    <p:cond delay="0"/>
+                                  </p:stCondLst>
+                                  <p:childTnLst>
+                                    <p:set>
+                                      <p:cBhvr>
+                                        <p:cTn id="14" dur="1" fill="hold">
+                                          <p:stCondLst>
+                                            <p:cond delay="0"/>
+                                          </p:stCondLst>
+                                        </p:cTn>
+                                        <p:tgtEl>
+                                          <p:spTgt spid="3">
+                                            <p:txEl>
+                                              <p:pRg st="4" end="4"/>
+                                            </p:txEl>
+                                          </p:spTgt>
+                                        </p:tgtEl>
+                                        <p:attrNameLst>
+                                          <p:attrName>style.visibility</p:attrName>
+                                        </p:attrNameLst>
+                                      </p:cBhvr>
+                                      <p:to>
+                                        <p:strVal val="visible"/>
+                                      </p:to>
+                                    </p:set>
+                                  </p:childTnLst>
+                                </p:cTn>
+                              </p:par>
+                            </p:childTnLst>
+                          </p:cTn>
+                        </p:par>
+                      </p:childTnLst>
+                    </p:cTn>
+                  </p:par>
+                  <p:par>
+                    <p:cTn id="15" fill="hold">
+                      <p:stCondLst>
+                        <p:cond delay="indefinite"/>
+                      </p:stCondLst>
+                      <p:childTnLst>
+                        <p:par>
+                          <p:cTn id="16" fill="hold">
+                            <p:stCondLst>
+                              <p:cond delay="0"/>
+                            </p:stCondLst>
+                            <p:childTnLst>
+                              <p:par>
+                                <p:cTn id="17" presetID="1" presetClass="entr" presetSubtype="0" fill="hold" grpId="0" nodeType="clickEffect">
+                                  <p:stCondLst>
+                                    <p:cond delay="0"/>
+                                  </p:stCondLst>
+                                  <p:childTnLst>
+                                    <p:set>
+                                      <p:cBhvr>
+                                        <p:cTn id="18" dur="1" fill="hold">
+                                          <p:stCondLst>
+                                            <p:cond delay="0"/>
+                                          </p:stCondLst>
+                                        </p:cTn>
+                                        <p:tgtEl>
+                                          <p:spTgt spid="5"/>
+                                        </p:tgtEl>
+                                        <p:attrNameLst>
+                                          <p:attrName>style.visibility</p:attrName>
+                                        </p:attrNameLst>
+                                      </p:cBhvr>
+                                      <p:to>
+                                        <p:strVal val="visible"/>
+                                      </p:to>
+                                    </p:set>
+                                  </p:childTnLst>
+                                </p:cTn>
+                              </p:par>
+                            </p:childTnLst>
+                          </p:cTn>
+                        </p:par>
+                      </p:childTnLst>
+                    </p:cTn>
+                  </p:par>
+                  <p:par>
+                    <p:cTn id="19" fill="hold">
+                      <p:stCondLst>
+                        <p:cond delay="indefinite"/>
+                      </p:stCondLst>
+                      <p:childTnLst>
+                        <p:par>
+                          <p:cTn id="20" fill="hold">
+                            <p:stCondLst>
+                              <p:cond delay="0"/>
+                            </p:stCondLst>
+                            <p:childTnLst>
+                              <p:par>
+                                <p:cTn id="21" presetID="1" presetClass="entr" presetSubtype="0" fill="hold" grpId="0" nodeType="clickEffect">
+                                  <p:stCondLst>
+                                    <p:cond delay="0"/>
+                                  </p:stCondLst>
+                                  <p:childTnLst>
+                                    <p:set>
+                                      <p:cBhvr>
+                                        <p:cTn id="22" dur="1" fill="hold">
+                                          <p:stCondLst>
+                                            <p:cond delay="0"/>
+                                          </p:stCondLst>
+                                        </p:cTn>
+                                        <p:tgtEl>
+                                          <p:spTgt spid="3">
+                                            <p:txEl>
+                                              <p:pRg st="5" end="5"/>
+                                            </p:txEl>
+                                          </p:spTgt>
+                                        </p:tgtEl>
+                                        <p:attrNameLst>
+                                          <p:attrName>style.visibility</p:attrName>
+                                        </p:attrNameLst>
+                                      </p:cBhvr>
+                                      <p:to>
+                                        <p:strVal val="visible"/>
+                                      </p:to>
+                                    </p:set>
+                                  </p:childTnLst>
+                                </p:cTn>
+                              </p:par>
+                              <p:par>
+                                <p:cTn id="23" presetID="1" presetClass="entr" presetSubtype="0" fill="hold" grpId="0" nodeType="withEffect">
+                                  <p:stCondLst>
+                                    <p:cond delay="0"/>
+                                  </p:stCondLst>
+                                  <p:childTnLst>
+                                    <p:set>
+                                      <p:cBhvr>
+                                        <p:cTn id="24" dur="1" fill="hold">
+                                          <p:stCondLst>
+                                            <p:cond delay="0"/>
+                                          </p:stCondLst>
+                                        </p:cTn>
+                                        <p:tgtEl>
+                                          <p:spTgt spid="3">
+                                            <p:txEl>
+                                              <p:pRg st="6" end="6"/>
+                                            </p:txEl>
+                                          </p:spTgt>
+                                        </p:tgtEl>
+                                        <p:attrNameLst>
+                                          <p:attrName>style.visibility</p:attrName>
+                                        </p:attrNameLst>
+                                      </p:cBhvr>
+                                      <p:to>
+                                        <p:strVal val="visible"/>
+                                      </p:to>
+                                    </p:set>
+                                  </p:childTnLst>
+                                </p:cTn>
+                              </p:par>
+                              <p:par>
+                                <p:cTn id="25" presetID="1" presetClass="entr" presetSubtype="0" fill="hold" grpId="0" nodeType="withEffect">
+                                  <p:stCondLst>
+                                    <p:cond delay="0"/>
+                                  </p:stCondLst>
+                                  <p:childTnLst>
+                                    <p:set>
+                                      <p:cBhvr>
+                                        <p:cTn id="26" dur="1" fill="hold">
+                                          <p:stCondLst>
+                                            <p:cond delay="0"/>
+                                          </p:stCondLst>
+                                        </p:cTn>
+                                        <p:tgtEl>
+                                          <p:spTgt spid="3">
+                                            <p:txEl>
+                                              <p:pRg st="7" end="7"/>
+                                            </p:txEl>
+                                          </p:spTgt>
+                                        </p:tgtEl>
+                                        <p:attrNameLst>
+                                          <p:attrName>style.visibility</p:attrName>
+                                        </p:attrNameLst>
+                                      </p:cBhvr>
+                                      <p:to>
+                                        <p:strVal val="visible"/>
+                                      </p:to>
+                                    </p:set>
+                                  </p:childTnLst>
+                                </p:cTn>
+                              </p:par>
+                              <p:par>
+                                <p:cTn id="27" presetID="1" presetClass="entr" presetSubtype="0" fill="hold" grpId="0" nodeType="withEffect">
+                                  <p:stCondLst>
+                                    <p:cond delay="0"/>
+                                  </p:stCondLst>
+                                  <p:childTnLst>
+                                    <p:set>
+                                      <p:cBhvr>
+                                        <p:cTn id="28" dur="1" fill="hold">
+                                          <p:stCondLst>
+                                            <p:cond delay="0"/>
+                                          </p:stCondLst>
+                                        </p:cTn>
+                                        <p:tgtEl>
+                                          <p:spTgt spid="3">
+                                            <p:txEl>
+                                              <p:pRg st="8" end="8"/>
+                                            </p:txEl>
+                                          </p:spTgt>
+                                        </p:tgtEl>
+                                        <p:attrNameLst>
+                                          <p:attrName>style.visibility</p:attrName>
+                                        </p:attrNameLst>
+                                      </p:cBhvr>
+                                      <p:to>
+                                        <p:strVal val="visible"/>
+                                      </p:to>
+                                    </p:set>
+                                  </p:childTnLst>
+                                </p:cTn>
+                              </p:par>
+                            </p:childTnLst>
+                          </p:cTn>
+                        </p:par>
+                      </p:childTnLst>
+                    </p:cTn>
+                  </p:par>
+                </p:childTnLst>
+              </p:cTn>
+              <p:prevCondLst>
+                <p:cond evt="onPrev" delay="0">
+                  <p:tgtEl>
+                    <p:sldTgt/>
+                  </p:tgtEl>
+                </p:cond>
+              </p:prevCondLst>
+              <p:nextCondLst>
+                <p:cond evt="onNext" delay="0">
+                  <p:tgtEl>
+                    <p:sldTgt/>
+                  </p:tgtEl>
+                </p:cond>
+              </p:nextCondLst>
+            </p:seq>
+          </p:childTnLst>
+        </p:cTn>
+      </p:par>
+    </p:tnLst>
+    <p:bldLst>
+      <p:bldP spid="3" grpId="0" uiExpand="1" build="p"/>
+      <p:bldP spid="5" grpId="0" animBg="1"/>
+    </p:bldLst>
+  </p:timing>
+</p:sld>
+</file>
+
+<file path=ppt/slides/slide37.xml><?xml version="1.0" encoding="utf-8"?>
 <p:sld xmlns:a="http://schemas.openxmlformats.org/drawingml/2006/main" xmlns:r="http://schemas.openxmlformats.org/officeDocument/2006/relationships" xmlns:p="http://schemas.openxmlformats.org/presentationml/2006/main">
   <p:cSld>
     <p:spTree>
@@ -31512,7 +32131,7 @@
           <a:p>
             <a:fld id="{6597116C-F94B-4B5B-973A-17F07FB5C418}" type="slidenum">
               <a:rPr lang="nl-BE" smtClean="0"/>
-              <a:t>36</a:t>
+              <a:t>37</a:t>
             </a:fld>
             <a:endParaRPr lang="nl-BE"/>
           </a:p>
@@ -31657,7 +32276,7 @@
 </p:sld>
 </file>
 
-<file path=ppt/slides/slide37.xml><?xml version="1.0" encoding="utf-8"?>
+<file path=ppt/slides/slide38.xml><?xml version="1.0" encoding="utf-8"?>
 <p:sld xmlns:a="http://schemas.openxmlformats.org/drawingml/2006/main" xmlns:r="http://schemas.openxmlformats.org/officeDocument/2006/relationships" xmlns:p="http://schemas.openxmlformats.org/presentationml/2006/main">
   <p:cSld>
     <p:spTree>
@@ -31875,7 +32494,7 @@
           <a:p>
             <a:fld id="{6597116C-F94B-4B5B-973A-17F07FB5C418}" type="slidenum">
               <a:rPr lang="nl-BE" smtClean="0"/>
-              <a:t>37</a:t>
+              <a:t>38</a:t>
             </a:fld>
             <a:endParaRPr lang="nl-BE"/>
           </a:p>

</xml_diff>

<commit_message>
Added slide on floating point model option
</commit_message>
<xml_diff>
--- a/Optimization/hpc_efficiency.pptx
+++ b/Optimization/hpc_efficiency.pptx
@@ -5,7 +5,7 @@
     <p:sldMasterId id="2147483648" r:id="rId1"/>
   </p:sldMasterIdLst>
   <p:notesMasterIdLst>
-    <p:notesMasterId r:id="rId40"/>
+    <p:notesMasterId r:id="rId41"/>
   </p:notesMasterIdLst>
   <p:sldIdLst>
     <p:sldId id="267" r:id="rId2"/>
@@ -40,12 +40,13 @@
     <p:sldId id="290" r:id="rId31"/>
     <p:sldId id="289" r:id="rId32"/>
     <p:sldId id="281" r:id="rId33"/>
-    <p:sldId id="287" r:id="rId34"/>
-    <p:sldId id="292" r:id="rId35"/>
-    <p:sldId id="286" r:id="rId36"/>
-    <p:sldId id="297" r:id="rId37"/>
-    <p:sldId id="271" r:id="rId38"/>
-    <p:sldId id="283" r:id="rId39"/>
+    <p:sldId id="298" r:id="rId34"/>
+    <p:sldId id="287" r:id="rId35"/>
+    <p:sldId id="292" r:id="rId36"/>
+    <p:sldId id="286" r:id="rId37"/>
+    <p:sldId id="297" r:id="rId38"/>
+    <p:sldId id="271" r:id="rId39"/>
+    <p:sldId id="283" r:id="rId40"/>
   </p:sldIdLst>
   <p:sldSz cx="9144000" cy="6858000" type="screen4x3"/>
   <p:notesSz cx="6858000" cy="9144000"/>
@@ -273,11 +274,11 @@
           <c:showPercent val="0"/>
           <c:showBubbleSize val="0"/>
         </c:dLbls>
-        <c:axId val="347863360"/>
-        <c:axId val="347865320"/>
+        <c:axId val="189102376"/>
+        <c:axId val="187634672"/>
       </c:scatterChart>
       <c:valAx>
-        <c:axId val="347863360"/>
+        <c:axId val="189102376"/>
         <c:scaling>
           <c:logBase val="2"/>
           <c:orientation val="minMax"/>
@@ -289,14 +290,14 @@
         <c:majorTickMark val="out"/>
         <c:minorTickMark val="none"/>
         <c:tickLblPos val="nextTo"/>
-        <c:crossAx val="347865320"/>
+        <c:crossAx val="187634672"/>
         <c:crosses val="autoZero"/>
         <c:crossBetween val="midCat"/>
         <c:majorUnit val="4"/>
         <c:minorUnit val="4"/>
       </c:valAx>
       <c:valAx>
-        <c:axId val="347865320"/>
+        <c:axId val="187634672"/>
         <c:scaling>
           <c:logBase val="2"/>
           <c:orientation val="minMax"/>
@@ -309,7 +310,7 @@
         <c:majorTickMark val="out"/>
         <c:minorTickMark val="none"/>
         <c:tickLblPos val="nextTo"/>
-        <c:crossAx val="347863360"/>
+        <c:crossAx val="189102376"/>
         <c:crosses val="autoZero"/>
         <c:crossBetween val="midCat"/>
         <c:majorUnit val="4"/>
@@ -682,11 +683,11 @@
           <c:showPercent val="0"/>
           <c:showBubbleSize val="0"/>
         </c:dLbls>
-        <c:axId val="347864928"/>
-        <c:axId val="347861792"/>
+        <c:axId val="187599792"/>
+        <c:axId val="187600176"/>
       </c:scatterChart>
       <c:valAx>
-        <c:axId val="347864928"/>
+        <c:axId val="187599792"/>
         <c:scaling>
           <c:logBase val="2"/>
           <c:orientation val="minMax"/>
@@ -699,14 +700,14 @@
         <c:majorTickMark val="out"/>
         <c:minorTickMark val="none"/>
         <c:tickLblPos val="nextTo"/>
-        <c:crossAx val="347861792"/>
+        <c:crossAx val="187600176"/>
         <c:crosses val="autoZero"/>
         <c:crossBetween val="midCat"/>
         <c:majorUnit val="4"/>
         <c:minorUnit val="4"/>
       </c:valAx>
       <c:valAx>
-        <c:axId val="347861792"/>
+        <c:axId val="187600176"/>
         <c:scaling>
           <c:logBase val="2"/>
           <c:orientation val="minMax"/>
@@ -720,7 +721,7 @@
         <c:majorTickMark val="out"/>
         <c:minorTickMark val="none"/>
         <c:tickLblPos val="nextTo"/>
-        <c:crossAx val="347864928"/>
+        <c:crossAx val="187599792"/>
         <c:crosses val="autoZero"/>
         <c:crossBetween val="midCat"/>
         <c:majorUnit val="4"/>
@@ -933,11 +934,11 @@
           <c:showPercent val="0"/>
           <c:showBubbleSize val="0"/>
         </c:dLbls>
-        <c:axId val="347861400"/>
-        <c:axId val="347859048"/>
+        <c:axId val="186886720"/>
+        <c:axId val="189461368"/>
       </c:scatterChart>
       <c:valAx>
-        <c:axId val="347861400"/>
+        <c:axId val="186886720"/>
         <c:scaling>
           <c:logBase val="2"/>
           <c:orientation val="minMax"/>
@@ -950,13 +951,13 @@
         <c:majorTickMark val="out"/>
         <c:minorTickMark val="none"/>
         <c:tickLblPos val="nextTo"/>
-        <c:crossAx val="347859048"/>
+        <c:crossAx val="189461368"/>
         <c:crosses val="autoZero"/>
         <c:crossBetween val="midCat"/>
         <c:minorUnit val="4"/>
       </c:valAx>
       <c:valAx>
-        <c:axId val="347859048"/>
+        <c:axId val="189461368"/>
         <c:scaling>
           <c:logBase val="2"/>
           <c:orientation val="minMax"/>
@@ -970,7 +971,7 @@
         <c:majorTickMark val="out"/>
         <c:minorTickMark val="none"/>
         <c:tickLblPos val="nextTo"/>
-        <c:crossAx val="347861400"/>
+        <c:crossAx val="186886720"/>
         <c:crosses val="autoZero"/>
         <c:crossBetween val="midCat"/>
         <c:majorUnit val="2"/>
@@ -1101,11 +1102,11 @@
           <c:showPercent val="0"/>
           <c:showBubbleSize val="0"/>
         </c:dLbls>
-        <c:axId val="347862576"/>
-        <c:axId val="347862968"/>
+        <c:axId val="187103752"/>
+        <c:axId val="187103360"/>
       </c:scatterChart>
       <c:valAx>
-        <c:axId val="347862576"/>
+        <c:axId val="187103752"/>
         <c:scaling>
           <c:logBase val="2"/>
           <c:orientation val="minMax"/>
@@ -1118,13 +1119,13 @@
         <c:majorTickMark val="out"/>
         <c:minorTickMark val="none"/>
         <c:tickLblPos val="nextTo"/>
-        <c:crossAx val="347862968"/>
+        <c:crossAx val="187103360"/>
         <c:crosses val="autoZero"/>
         <c:crossBetween val="midCat"/>
         <c:majorUnit val="4"/>
       </c:valAx>
       <c:valAx>
-        <c:axId val="347862968"/>
+        <c:axId val="187103360"/>
         <c:scaling>
           <c:logBase val="2"/>
           <c:orientation val="minMax"/>
@@ -1137,7 +1138,7 @@
         <c:majorTickMark val="out"/>
         <c:minorTickMark val="none"/>
         <c:tickLblPos val="nextTo"/>
-        <c:crossAx val="347862576"/>
+        <c:crossAx val="187103752"/>
         <c:crosses val="autoZero"/>
         <c:crossBetween val="midCat"/>
         <c:majorUnit val="2"/>
@@ -1263,11 +1264,11 @@
           <c:showPercent val="0"/>
           <c:showBubbleSize val="0"/>
         </c:dLbls>
-        <c:axId val="349187992"/>
-        <c:axId val="349190344"/>
+        <c:axId val="187105320"/>
+        <c:axId val="164520440"/>
       </c:scatterChart>
       <c:valAx>
-        <c:axId val="349187992"/>
+        <c:axId val="187105320"/>
         <c:scaling>
           <c:logBase val="2"/>
           <c:orientation val="minMax"/>
@@ -1280,14 +1281,14 @@
         <c:majorTickMark val="out"/>
         <c:minorTickMark val="none"/>
         <c:tickLblPos val="nextTo"/>
-        <c:crossAx val="349190344"/>
+        <c:crossAx val="164520440"/>
         <c:crosses val="autoZero"/>
         <c:crossBetween val="midCat"/>
         <c:majorUnit val="4"/>
         <c:minorUnit val="4"/>
       </c:valAx>
       <c:valAx>
-        <c:axId val="349190344"/>
+        <c:axId val="164520440"/>
         <c:scaling>
           <c:orientation val="minMax"/>
           <c:max val="1"/>
@@ -1299,7 +1300,7 @@
         <c:majorTickMark val="out"/>
         <c:minorTickMark val="none"/>
         <c:tickLblPos val="nextTo"/>
-        <c:crossAx val="349187992"/>
+        <c:crossAx val="187105320"/>
         <c:crosses val="autoZero"/>
         <c:crossBetween val="midCat"/>
       </c:valAx>
@@ -1396,7 +1397,7 @@
           <a:p>
             <a:fld id="{2E6AAE95-D4FC-4D00-935A-EAE928727A56}" type="datetimeFigureOut">
               <a:rPr lang="en-US" smtClean="0"/>
-              <a:t>2016-09-02</a:t>
+              <a:t>10/11/2016</a:t>
             </a:fld>
             <a:endParaRPr lang="en-US"/>
           </a:p>
@@ -1929,7 +1930,7 @@
           <a:p>
             <a:fld id="{1CFF3F78-F57F-4409-A41B-5EC46D4F404B}" type="datetime1">
               <a:rPr lang="nl-BE" smtClean="0"/>
-              <a:t>2/09/2016</a:t>
+              <a:t>2016-10-11</a:t>
             </a:fld>
             <a:endParaRPr lang="nl-BE"/>
           </a:p>
@@ -2099,7 +2100,7 @@
           <a:p>
             <a:fld id="{7D029E61-52E3-412C-82EB-2F81B17C0AF1}" type="datetime1">
               <a:rPr lang="nl-BE" smtClean="0"/>
-              <a:t>2/09/2016</a:t>
+              <a:t>2016-10-11</a:t>
             </a:fld>
             <a:endParaRPr lang="nl-BE"/>
           </a:p>
@@ -2279,7 +2280,7 @@
           <a:p>
             <a:fld id="{A83F1CEF-A38E-4001-89C6-F3FC7784F299}" type="datetime1">
               <a:rPr lang="nl-BE" smtClean="0"/>
-              <a:t>2/09/2016</a:t>
+              <a:t>2016-10-11</a:t>
             </a:fld>
             <a:endParaRPr lang="nl-BE"/>
           </a:p>
@@ -2405,7 +2406,7 @@
           <a:p>
             <a:fld id="{1FDE84DB-AADA-4C3F-BF46-CA664A504479}" type="datetime1">
               <a:rPr lang="nl-BE" smtClean="0"/>
-              <a:t>2/09/2016</a:t>
+              <a:t>2016-10-11</a:t>
             </a:fld>
             <a:endParaRPr lang="nl-BE" dirty="0"/>
           </a:p>
@@ -2649,7 +2650,7 @@
           <a:p>
             <a:fld id="{8CD53A43-C15C-4F05-9AD7-DB9DE837084D}" type="datetime1">
               <a:rPr lang="nl-BE" smtClean="0"/>
-              <a:t>2/09/2016</a:t>
+              <a:t>2016-10-11</a:t>
             </a:fld>
             <a:endParaRPr lang="nl-BE"/>
           </a:p>
@@ -2895,7 +2896,7 @@
           <a:p>
             <a:fld id="{8994D238-D949-4AEF-9753-A8B6EFA964A0}" type="datetime1">
               <a:rPr lang="nl-BE" smtClean="0"/>
-              <a:t>2/09/2016</a:t>
+              <a:t>2016-10-11</a:t>
             </a:fld>
             <a:endParaRPr lang="nl-BE"/>
           </a:p>
@@ -3183,7 +3184,7 @@
           <a:p>
             <a:fld id="{4D234023-BF99-4AD0-835E-8125DA2B6664}" type="datetime1">
               <a:rPr lang="nl-BE" smtClean="0"/>
-              <a:t>2/09/2016</a:t>
+              <a:t>2016-10-11</a:t>
             </a:fld>
             <a:endParaRPr lang="nl-BE"/>
           </a:p>
@@ -3605,7 +3606,7 @@
           <a:p>
             <a:fld id="{DB075A73-5C1D-406E-9444-3C5C58580E8E}" type="datetime1">
               <a:rPr lang="nl-BE" smtClean="0"/>
-              <a:t>2/09/2016</a:t>
+              <a:t>2016-10-11</a:t>
             </a:fld>
             <a:endParaRPr lang="nl-BE"/>
           </a:p>
@@ -3723,7 +3724,7 @@
           <a:p>
             <a:fld id="{E111FB2D-2E17-4D8F-A64A-4EB0C3D12494}" type="datetime1">
               <a:rPr lang="nl-BE" smtClean="0"/>
-              <a:t>2/09/2016</a:t>
+              <a:t>2016-10-11</a:t>
             </a:fld>
             <a:endParaRPr lang="nl-BE"/>
           </a:p>
@@ -3818,7 +3819,7 @@
           <a:p>
             <a:fld id="{5BE27D71-2267-4E44-9F33-05B60E5C7D9D}" type="datetime1">
               <a:rPr lang="nl-BE" smtClean="0"/>
-              <a:t>2/09/2016</a:t>
+              <a:t>2016-10-11</a:t>
             </a:fld>
             <a:endParaRPr lang="nl-BE"/>
           </a:p>
@@ -4095,7 +4096,7 @@
           <a:p>
             <a:fld id="{182F587C-96C8-4813-A767-3084061A3229}" type="datetime1">
               <a:rPr lang="nl-BE" smtClean="0"/>
-              <a:t>2/09/2016</a:t>
+              <a:t>2016-10-11</a:t>
             </a:fld>
             <a:endParaRPr lang="nl-BE"/>
           </a:p>
@@ -4348,7 +4349,7 @@
           <a:p>
             <a:fld id="{8B021CF8-BBBB-4DFA-8713-49842AA07274}" type="datetime1">
               <a:rPr lang="nl-BE" smtClean="0"/>
-              <a:t>2/09/2016</a:t>
+              <a:t>2016-10-11</a:t>
             </a:fld>
             <a:endParaRPr lang="nl-BE"/>
           </a:p>
@@ -4561,7 +4562,7 @@
           <a:p>
             <a:fld id="{CDBFABB5-0AB3-4CB6-A705-6887DEB1F9F2}" type="datetime1">
               <a:rPr lang="nl-BE" smtClean="0"/>
-              <a:t>2/09/2016</a:t>
+              <a:t>2016-10-11</a:t>
             </a:fld>
             <a:endParaRPr lang="nl-BE"/>
           </a:p>
@@ -8757,7 +8758,7 @@
           <a:graphicData uri="http://schemas.openxmlformats.org/presentationml/2006/ole">
             <mc:AlternateContent xmlns:mc="http://schemas.openxmlformats.org/markup-compatibility/2006">
               <mc:Choice xmlns:v="urn:schemas-microsoft-com:vml" Requires="v">
-                <p:oleObj spid="_x0000_s1152" name="Equation" r:id="rId3" imgW="812520" imgH="393480" progId="Equation.3">
+                <p:oleObj spid="_x0000_s1156" name="Equation" r:id="rId3" imgW="812520" imgH="393480" progId="Equation.3">
                   <p:embed/>
                 </p:oleObj>
               </mc:Choice>
@@ -8814,7 +8815,7 @@
           <a:graphicData uri="http://schemas.openxmlformats.org/presentationml/2006/ole">
             <mc:AlternateContent xmlns:mc="http://schemas.openxmlformats.org/markup-compatibility/2006">
               <mc:Choice xmlns:v="urn:schemas-microsoft-com:vml" Requires="v">
-                <p:oleObj spid="_x0000_s1153" name="Equation" r:id="rId5" imgW="2489040" imgH="431640" progId="Equation.3">
+                <p:oleObj spid="_x0000_s1157" name="Equation" r:id="rId5" imgW="2489040" imgH="431640" progId="Equation.3">
                   <p:embed/>
                 </p:oleObj>
               </mc:Choice>
@@ -19417,7 +19418,7 @@
           <a:graphicData uri="http://schemas.openxmlformats.org/presentationml/2006/ole">
             <mc:AlternateContent xmlns:mc="http://schemas.openxmlformats.org/markup-compatibility/2006">
               <mc:Choice xmlns:v="urn:schemas-microsoft-com:vml" Requires="v">
-                <p:oleObj spid="_x0000_s2143" name="Equation" r:id="rId3" imgW="1091880" imgH="1041120" progId="Equation.3">
+                <p:oleObj spid="_x0000_s2147" name="Equation" r:id="rId3" imgW="1091880" imgH="1041120" progId="Equation.3">
                   <p:embed/>
                 </p:oleObj>
               </mc:Choice>
@@ -20788,7 +20789,7 @@
           <a:graphicData uri="http://schemas.openxmlformats.org/presentationml/2006/ole">
             <mc:AlternateContent xmlns:mc="http://schemas.openxmlformats.org/markup-compatibility/2006">
               <mc:Choice xmlns:v="urn:schemas-microsoft-com:vml" Requires="v">
-                <p:oleObj spid="_x0000_s2144" name="Equation" r:id="rId5" imgW="1091880" imgH="1041120" progId="Equation.3">
+                <p:oleObj spid="_x0000_s2148" name="Equation" r:id="rId5" imgW="1091880" imgH="1041120" progId="Equation.3">
                   <p:embed/>
                 </p:oleObj>
               </mc:Choice>
@@ -27130,7 +27131,7 @@
           <a:graphicData uri="http://schemas.openxmlformats.org/presentationml/2006/ole">
             <mc:AlternateContent xmlns:mc="http://schemas.openxmlformats.org/markup-compatibility/2006">
               <mc:Choice xmlns:v="urn:schemas-microsoft-com:vml" Requires="v">
-                <p:oleObj spid="_x0000_s3084" name="Equation" r:id="rId3" imgW="965160" imgH="228600" progId="Equation.3">
+                <p:oleObj spid="_x0000_s3086" name="Equation" r:id="rId3" imgW="965160" imgH="228600" progId="Equation.3">
                   <p:embed/>
                 </p:oleObj>
               </mc:Choice>
@@ -29373,6 +29374,538 @@
           <a:p>
             <a:r>
               <a:rPr lang="en-US" dirty="0" smtClean="0"/>
+              <a:t>Note of caution</a:t>
+            </a:r>
+            <a:endParaRPr lang="nl-BE" dirty="0"/>
+          </a:p>
+        </p:txBody>
+      </p:sp>
+      <p:sp>
+        <p:nvSpPr>
+          <p:cNvPr id="3" name="Content Placeholder 2"/>
+          <p:cNvSpPr>
+            <a:spLocks noGrp="1"/>
+          </p:cNvSpPr>
+          <p:nvPr>
+            <p:ph idx="1"/>
+          </p:nvPr>
+        </p:nvSpPr>
+        <p:spPr/>
+        <p:txBody>
+          <a:bodyPr/>
+          <a:lstStyle/>
+          <a:p>
+            <a:r>
+              <a:rPr lang="en-US" dirty="0" smtClean="0"/>
+              <a:t>Intel compilers: aggressive optimization</a:t>
+            </a:r>
+          </a:p>
+          <a:p>
+            <a:pPr lvl="1"/>
+            <a:r>
+              <a:rPr lang="en-US" dirty="0" smtClean="0"/>
+              <a:t>Even at </a:t>
+            </a:r>
+            <a:r>
+              <a:rPr lang="en-US" dirty="0" smtClean="0">
+                <a:latin typeface="Courier New" panose="02070309020205020404" pitchFamily="49" charset="0"/>
+                <a:cs typeface="Courier New" panose="02070309020205020404" pitchFamily="49" charset="0"/>
+              </a:rPr>
+              <a:t>–O2</a:t>
+            </a:r>
+          </a:p>
+          <a:p>
+            <a:pPr lvl="1"/>
+            <a:r>
+              <a:rPr lang="en-US" dirty="0" smtClean="0"/>
+              <a:t>Reordering of operations/operands</a:t>
+            </a:r>
+          </a:p>
+          <a:p>
+            <a:pPr lvl="2"/>
+            <a:r>
+              <a:rPr lang="en-US" dirty="0" smtClean="0"/>
+              <a:t>May impact precision</a:t>
+            </a:r>
+          </a:p>
+          <a:p>
+            <a:pPr lvl="1"/>
+            <a:r>
+              <a:rPr lang="en-US" dirty="0" smtClean="0"/>
+              <a:t>Verify results with</a:t>
+            </a:r>
+            <a:br>
+              <a:rPr lang="en-US" dirty="0" smtClean="0"/>
+            </a:br>
+            <a:r>
+              <a:rPr lang="en-US" dirty="0" smtClean="0">
+                <a:latin typeface="Courier New" panose="02070309020205020404" pitchFamily="49" charset="0"/>
+                <a:cs typeface="Courier New" panose="02070309020205020404" pitchFamily="49" charset="0"/>
+              </a:rPr>
+              <a:t>-</a:t>
+            </a:r>
+            <a:r>
+              <a:rPr lang="en-US" dirty="0" err="1" smtClean="0">
+                <a:latin typeface="Courier New" panose="02070309020205020404" pitchFamily="49" charset="0"/>
+                <a:cs typeface="Courier New" panose="02070309020205020404" pitchFamily="49" charset="0"/>
+              </a:rPr>
+              <a:t>fp</a:t>
+            </a:r>
+            <a:r>
+              <a:rPr lang="en-US" dirty="0" smtClean="0">
+                <a:latin typeface="Courier New" panose="02070309020205020404" pitchFamily="49" charset="0"/>
+                <a:cs typeface="Courier New" panose="02070309020205020404" pitchFamily="49" charset="0"/>
+              </a:rPr>
+              <a:t>-model precise</a:t>
+            </a:r>
+            <a:br>
+              <a:rPr lang="en-US" dirty="0" smtClean="0">
+                <a:latin typeface="Courier New" panose="02070309020205020404" pitchFamily="49" charset="0"/>
+                <a:cs typeface="Courier New" panose="02070309020205020404" pitchFamily="49" charset="0"/>
+              </a:rPr>
+            </a:br>
+            <a:r>
+              <a:rPr lang="en-US" dirty="0" smtClean="0">
+                <a:latin typeface="Courier New" panose="02070309020205020404" pitchFamily="49" charset="0"/>
+                <a:cs typeface="Courier New" panose="02070309020205020404" pitchFamily="49" charset="0"/>
+              </a:rPr>
+              <a:t>–</a:t>
+            </a:r>
+            <a:r>
+              <a:rPr lang="en-US" dirty="0" err="1" smtClean="0">
+                <a:latin typeface="Courier New" panose="02070309020205020404" pitchFamily="49" charset="0"/>
+                <a:cs typeface="Courier New" panose="02070309020205020404" pitchFamily="49" charset="0"/>
+              </a:rPr>
+              <a:t>fp</a:t>
+            </a:r>
+            <a:r>
+              <a:rPr lang="en-US" dirty="0" smtClean="0">
+                <a:latin typeface="Courier New" panose="02070309020205020404" pitchFamily="49" charset="0"/>
+                <a:cs typeface="Courier New" panose="02070309020205020404" pitchFamily="49" charset="0"/>
+              </a:rPr>
+              <a:t>-model source</a:t>
+            </a:r>
+            <a:endParaRPr lang="nl-BE" dirty="0">
+              <a:latin typeface="Courier New" panose="02070309020205020404" pitchFamily="49" charset="0"/>
+              <a:cs typeface="Courier New" panose="02070309020205020404" pitchFamily="49" charset="0"/>
+            </a:endParaRPr>
+          </a:p>
+        </p:txBody>
+      </p:sp>
+      <p:sp>
+        <p:nvSpPr>
+          <p:cNvPr id="4" name="Slide Number Placeholder 3"/>
+          <p:cNvSpPr>
+            <a:spLocks noGrp="1"/>
+          </p:cNvSpPr>
+          <p:nvPr>
+            <p:ph type="sldNum" sz="quarter" idx="12"/>
+          </p:nvPr>
+        </p:nvSpPr>
+        <p:spPr/>
+        <p:txBody>
+          <a:bodyPr/>
+          <a:lstStyle/>
+          <a:p>
+            <a:fld id="{6597116C-F94B-4B5B-973A-17F07FB5C418}" type="slidenum">
+              <a:rPr lang="nl-BE" smtClean="0"/>
+              <a:t>33</a:t>
+            </a:fld>
+            <a:endParaRPr lang="nl-BE"/>
+          </a:p>
+        </p:txBody>
+      </p:sp>
+      <p:sp>
+        <p:nvSpPr>
+          <p:cNvPr id="5" name="TextBox 4"/>
+          <p:cNvSpPr txBox="1"/>
+          <p:nvPr/>
+        </p:nvSpPr>
+        <p:spPr>
+          <a:xfrm>
+            <a:off x="1475656" y="5210036"/>
+            <a:ext cx="5933163" cy="523220"/>
+          </a:xfrm>
+          <a:prstGeom prst="rect">
+            <a:avLst/>
+          </a:prstGeom>
+          <a:noFill/>
+          <a:ln>
+            <a:solidFill>
+              <a:schemeClr val="tx1"/>
+            </a:solidFill>
+          </a:ln>
+        </p:spPr>
+        <p:txBody>
+          <a:bodyPr wrap="none" rtlCol="0">
+            <a:spAutoFit/>
+          </a:bodyPr>
+          <a:lstStyle/>
+          <a:p>
+            <a:r>
+              <a:rPr lang="en-US" sz="2800" dirty="0" smtClean="0"/>
+              <a:t>Potentially severe performance impact!</a:t>
+            </a:r>
+            <a:endParaRPr lang="nl-BE" sz="2800" dirty="0"/>
+          </a:p>
+        </p:txBody>
+      </p:sp>
+    </p:spTree>
+    <p:extLst>
+      <p:ext uri="{BB962C8B-B14F-4D97-AF65-F5344CB8AC3E}">
+        <p14:creationId xmlns:p14="http://schemas.microsoft.com/office/powerpoint/2010/main" val="2538437520"/>
+      </p:ext>
+    </p:extLst>
+  </p:cSld>
+  <p:clrMapOvr>
+    <a:masterClrMapping/>
+  </p:clrMapOvr>
+  <p:timing>
+    <p:tnLst>
+      <p:par>
+        <p:cTn id="1" dur="indefinite" restart="never" nodeType="tmRoot">
+          <p:childTnLst>
+            <p:seq concurrent="1" nextAc="seek">
+              <p:cTn id="2" dur="indefinite" nodeType="mainSeq">
+                <p:childTnLst>
+                  <p:par>
+                    <p:cTn id="3" fill="hold">
+                      <p:stCondLst>
+                        <p:cond delay="indefinite"/>
+                        <p:cond evt="onBegin" delay="0">
+                          <p:tn val="2"/>
+                        </p:cond>
+                      </p:stCondLst>
+                      <p:childTnLst>
+                        <p:par>
+                          <p:cTn id="4" fill="hold">
+                            <p:stCondLst>
+                              <p:cond delay="0"/>
+                            </p:stCondLst>
+                            <p:childTnLst>
+                              <p:par>
+                                <p:cTn id="5" presetID="1" presetClass="entr" presetSubtype="0" fill="hold" grpId="0" nodeType="withEffect">
+                                  <p:stCondLst>
+                                    <p:cond delay="0"/>
+                                  </p:stCondLst>
+                                  <p:childTnLst>
+                                    <p:set>
+                                      <p:cBhvr>
+                                        <p:cTn id="6" dur="1" fill="hold">
+                                          <p:stCondLst>
+                                            <p:cond delay="0"/>
+                                          </p:stCondLst>
+                                        </p:cTn>
+                                        <p:tgtEl>
+                                          <p:spTgt spid="3">
+                                            <p:txEl>
+                                              <p:pRg st="0" end="0"/>
+                                            </p:txEl>
+                                          </p:spTgt>
+                                        </p:tgtEl>
+                                        <p:attrNameLst>
+                                          <p:attrName>style.visibility</p:attrName>
+                                        </p:attrNameLst>
+                                      </p:cBhvr>
+                                      <p:to>
+                                        <p:strVal val="visible"/>
+                                      </p:to>
+                                    </p:set>
+                                  </p:childTnLst>
+                                </p:cTn>
+                              </p:par>
+                            </p:childTnLst>
+                          </p:cTn>
+                        </p:par>
+                      </p:childTnLst>
+                    </p:cTn>
+                  </p:par>
+                  <p:par>
+                    <p:cTn id="7" fill="hold">
+                      <p:stCondLst>
+                        <p:cond delay="indefinite"/>
+                      </p:stCondLst>
+                      <p:childTnLst>
+                        <p:par>
+                          <p:cTn id="8" fill="hold">
+                            <p:stCondLst>
+                              <p:cond delay="0"/>
+                            </p:stCondLst>
+                            <p:childTnLst>
+                              <p:par>
+                                <p:cTn id="9" presetID="1" presetClass="entr" presetSubtype="0" fill="hold" grpId="0" nodeType="clickEffect">
+                                  <p:stCondLst>
+                                    <p:cond delay="0"/>
+                                  </p:stCondLst>
+                                  <p:childTnLst>
+                                    <p:set>
+                                      <p:cBhvr>
+                                        <p:cTn id="10" dur="1" fill="hold">
+                                          <p:stCondLst>
+                                            <p:cond delay="0"/>
+                                          </p:stCondLst>
+                                        </p:cTn>
+                                        <p:tgtEl>
+                                          <p:spTgt spid="3">
+                                            <p:txEl>
+                                              <p:pRg st="1" end="1"/>
+                                            </p:txEl>
+                                          </p:spTgt>
+                                        </p:tgtEl>
+                                        <p:attrNameLst>
+                                          <p:attrName>style.visibility</p:attrName>
+                                        </p:attrNameLst>
+                                      </p:cBhvr>
+                                      <p:to>
+                                        <p:strVal val="visible"/>
+                                      </p:to>
+                                    </p:set>
+                                  </p:childTnLst>
+                                </p:cTn>
+                              </p:par>
+                            </p:childTnLst>
+                          </p:cTn>
+                        </p:par>
+                      </p:childTnLst>
+                    </p:cTn>
+                  </p:par>
+                  <p:par>
+                    <p:cTn id="11" fill="hold">
+                      <p:stCondLst>
+                        <p:cond delay="indefinite"/>
+                      </p:stCondLst>
+                      <p:childTnLst>
+                        <p:par>
+                          <p:cTn id="12" fill="hold">
+                            <p:stCondLst>
+                              <p:cond delay="0"/>
+                            </p:stCondLst>
+                            <p:childTnLst>
+                              <p:par>
+                                <p:cTn id="13" presetID="1" presetClass="entr" presetSubtype="0" fill="hold" grpId="0" nodeType="clickEffect">
+                                  <p:stCondLst>
+                                    <p:cond delay="0"/>
+                                  </p:stCondLst>
+                                  <p:childTnLst>
+                                    <p:set>
+                                      <p:cBhvr>
+                                        <p:cTn id="14" dur="1" fill="hold">
+                                          <p:stCondLst>
+                                            <p:cond delay="0"/>
+                                          </p:stCondLst>
+                                        </p:cTn>
+                                        <p:tgtEl>
+                                          <p:spTgt spid="3">
+                                            <p:txEl>
+                                              <p:pRg st="2" end="2"/>
+                                            </p:txEl>
+                                          </p:spTgt>
+                                        </p:tgtEl>
+                                        <p:attrNameLst>
+                                          <p:attrName>style.visibility</p:attrName>
+                                        </p:attrNameLst>
+                                      </p:cBhvr>
+                                      <p:to>
+                                        <p:strVal val="visible"/>
+                                      </p:to>
+                                    </p:set>
+                                  </p:childTnLst>
+                                </p:cTn>
+                              </p:par>
+                              <p:par>
+                                <p:cTn id="15" presetID="1" presetClass="entr" presetSubtype="0" fill="hold" grpId="0" nodeType="withEffect">
+                                  <p:stCondLst>
+                                    <p:cond delay="0"/>
+                                  </p:stCondLst>
+                                  <p:childTnLst>
+                                    <p:set>
+                                      <p:cBhvr>
+                                        <p:cTn id="16" dur="1" fill="hold">
+                                          <p:stCondLst>
+                                            <p:cond delay="0"/>
+                                          </p:stCondLst>
+                                        </p:cTn>
+                                        <p:tgtEl>
+                                          <p:spTgt spid="3">
+                                            <p:txEl>
+                                              <p:pRg st="3" end="3"/>
+                                            </p:txEl>
+                                          </p:spTgt>
+                                        </p:tgtEl>
+                                        <p:attrNameLst>
+                                          <p:attrName>style.visibility</p:attrName>
+                                        </p:attrNameLst>
+                                      </p:cBhvr>
+                                      <p:to>
+                                        <p:strVal val="visible"/>
+                                      </p:to>
+                                    </p:set>
+                                  </p:childTnLst>
+                                </p:cTn>
+                              </p:par>
+                            </p:childTnLst>
+                          </p:cTn>
+                        </p:par>
+                      </p:childTnLst>
+                    </p:cTn>
+                  </p:par>
+                  <p:par>
+                    <p:cTn id="17" fill="hold">
+                      <p:stCondLst>
+                        <p:cond delay="indefinite"/>
+                      </p:stCondLst>
+                      <p:childTnLst>
+                        <p:par>
+                          <p:cTn id="18" fill="hold">
+                            <p:stCondLst>
+                              <p:cond delay="0"/>
+                            </p:stCondLst>
+                            <p:childTnLst>
+                              <p:par>
+                                <p:cTn id="19" presetID="1" presetClass="entr" presetSubtype="0" fill="hold" grpId="0" nodeType="clickEffect">
+                                  <p:stCondLst>
+                                    <p:cond delay="0"/>
+                                  </p:stCondLst>
+                                  <p:childTnLst>
+                                    <p:set>
+                                      <p:cBhvr>
+                                        <p:cTn id="20" dur="1" fill="hold">
+                                          <p:stCondLst>
+                                            <p:cond delay="0"/>
+                                          </p:stCondLst>
+                                        </p:cTn>
+                                        <p:tgtEl>
+                                          <p:spTgt spid="3">
+                                            <p:txEl>
+                                              <p:pRg st="4" end="4"/>
+                                            </p:txEl>
+                                          </p:spTgt>
+                                        </p:tgtEl>
+                                        <p:attrNameLst>
+                                          <p:attrName>style.visibility</p:attrName>
+                                        </p:attrNameLst>
+                                      </p:cBhvr>
+                                      <p:to>
+                                        <p:strVal val="visible"/>
+                                      </p:to>
+                                    </p:set>
+                                  </p:childTnLst>
+                                </p:cTn>
+                              </p:par>
+                            </p:childTnLst>
+                          </p:cTn>
+                        </p:par>
+                      </p:childTnLst>
+                    </p:cTn>
+                  </p:par>
+                  <p:par>
+                    <p:cTn id="21" fill="hold">
+                      <p:stCondLst>
+                        <p:cond delay="indefinite"/>
+                      </p:stCondLst>
+                      <p:childTnLst>
+                        <p:par>
+                          <p:cTn id="22" fill="hold">
+                            <p:stCondLst>
+                              <p:cond delay="0"/>
+                            </p:stCondLst>
+                            <p:childTnLst>
+                              <p:par>
+                                <p:cTn id="23" presetID="1" presetClass="entr" presetSubtype="0" fill="hold" grpId="0" nodeType="clickEffect">
+                                  <p:stCondLst>
+                                    <p:cond delay="0"/>
+                                  </p:stCondLst>
+                                  <p:childTnLst>
+                                    <p:set>
+                                      <p:cBhvr>
+                                        <p:cTn id="24" dur="1" fill="hold">
+                                          <p:stCondLst>
+                                            <p:cond delay="0"/>
+                                          </p:stCondLst>
+                                        </p:cTn>
+                                        <p:tgtEl>
+                                          <p:spTgt spid="5"/>
+                                        </p:tgtEl>
+                                        <p:attrNameLst>
+                                          <p:attrName>style.visibility</p:attrName>
+                                        </p:attrNameLst>
+                                      </p:cBhvr>
+                                      <p:to>
+                                        <p:strVal val="visible"/>
+                                      </p:to>
+                                    </p:set>
+                                  </p:childTnLst>
+                                </p:cTn>
+                              </p:par>
+                            </p:childTnLst>
+                          </p:cTn>
+                        </p:par>
+                      </p:childTnLst>
+                    </p:cTn>
+                  </p:par>
+                </p:childTnLst>
+              </p:cTn>
+              <p:prevCondLst>
+                <p:cond evt="onPrev" delay="0">
+                  <p:tgtEl>
+                    <p:sldTgt/>
+                  </p:tgtEl>
+                </p:cond>
+              </p:prevCondLst>
+              <p:nextCondLst>
+                <p:cond evt="onNext" delay="0">
+                  <p:tgtEl>
+                    <p:sldTgt/>
+                  </p:tgtEl>
+                </p:cond>
+              </p:nextCondLst>
+            </p:seq>
+          </p:childTnLst>
+        </p:cTn>
+      </p:par>
+    </p:tnLst>
+    <p:bldLst>
+      <p:bldP spid="3" grpId="0" uiExpand="1" build="p" bldLvl="2"/>
+      <p:bldP spid="5" grpId="0" animBg="1"/>
+    </p:bldLst>
+  </p:timing>
+</p:sld>
+</file>
+
+<file path=ppt/slides/slide34.xml><?xml version="1.0" encoding="utf-8"?>
+<p:sld xmlns:a="http://schemas.openxmlformats.org/drawingml/2006/main" xmlns:r="http://schemas.openxmlformats.org/officeDocument/2006/relationships" xmlns:p="http://schemas.openxmlformats.org/presentationml/2006/main">
+  <p:cSld>
+    <p:spTree>
+      <p:nvGrpSpPr>
+        <p:cNvPr id="1" name=""/>
+        <p:cNvGrpSpPr/>
+        <p:nvPr/>
+      </p:nvGrpSpPr>
+      <p:grpSpPr>
+        <a:xfrm>
+          <a:off x="0" y="0"/>
+          <a:ext cx="0" cy="0"/>
+          <a:chOff x="0" y="0"/>
+          <a:chExt cx="0" cy="0"/>
+        </a:xfrm>
+      </p:grpSpPr>
+      <p:sp>
+        <p:nvSpPr>
+          <p:cNvPr id="2" name="Title 1"/>
+          <p:cNvSpPr>
+            <a:spLocks noGrp="1"/>
+          </p:cNvSpPr>
+          <p:nvPr>
+            <p:ph type="title"/>
+          </p:nvPr>
+        </p:nvSpPr>
+        <p:spPr/>
+        <p:txBody>
+          <a:bodyPr/>
+          <a:lstStyle/>
+          <a:p>
+            <a:r>
+              <a:rPr lang="en-US" dirty="0" smtClean="0"/>
               <a:t>Conclusion</a:t>
             </a:r>
             <a:endParaRPr lang="nl-BE" dirty="0"/>
@@ -29415,7 +29948,7 @@
           <a:p>
             <a:fld id="{6597116C-F94B-4B5B-973A-17F07FB5C418}" type="slidenum">
               <a:rPr lang="nl-BE" smtClean="0"/>
-              <a:t>33</a:t>
+              <a:t>34</a:t>
             </a:fld>
             <a:endParaRPr lang="nl-BE"/>
           </a:p>
@@ -29434,7 +29967,7 @@
 </p:sld>
 </file>
 
-<file path=ppt/slides/slide34.xml><?xml version="1.0" encoding="utf-8"?>
+<file path=ppt/slides/slide35.xml><?xml version="1.0" encoding="utf-8"?>
 <p:sld xmlns:a="http://schemas.openxmlformats.org/drawingml/2006/main" xmlns:r="http://schemas.openxmlformats.org/officeDocument/2006/relationships" xmlns:p="http://schemas.openxmlformats.org/presentationml/2006/main">
   <p:cSld>
     <p:spTree>
@@ -29603,7 +30136,7 @@
           <a:p>
             <a:fld id="{6597116C-F94B-4B5B-973A-17F07FB5C418}" type="slidenum">
               <a:rPr lang="nl-BE" smtClean="0"/>
-              <a:t>34</a:t>
+              <a:t>35</a:t>
             </a:fld>
             <a:endParaRPr lang="nl-BE"/>
           </a:p>
@@ -29619,108 +30152,6 @@
   <p:clrMapOvr>
     <a:masterClrMapping/>
   </p:clrMapOvr>
-</p:sld>
-</file>
-
-<file path=ppt/slides/slide35.xml><?xml version="1.0" encoding="utf-8"?>
-<p:sld xmlns:a="http://schemas.openxmlformats.org/drawingml/2006/main" xmlns:r="http://schemas.openxmlformats.org/officeDocument/2006/relationships" xmlns:p="http://schemas.openxmlformats.org/presentationml/2006/main">
-  <p:cSld>
-    <p:spTree>
-      <p:nvGrpSpPr>
-        <p:cNvPr id="1" name=""/>
-        <p:cNvGrpSpPr/>
-        <p:nvPr/>
-      </p:nvGrpSpPr>
-      <p:grpSpPr>
-        <a:xfrm>
-          <a:off x="0" y="0"/>
-          <a:ext cx="0" cy="0"/>
-          <a:chOff x="0" y="0"/>
-          <a:chExt cx="0" cy="0"/>
-        </a:xfrm>
-      </p:grpSpPr>
-      <p:sp>
-        <p:nvSpPr>
-          <p:cNvPr id="2" name="Title 1"/>
-          <p:cNvSpPr>
-            <a:spLocks noGrp="1"/>
-          </p:cNvSpPr>
-          <p:nvPr>
-            <p:ph type="title"/>
-          </p:nvPr>
-        </p:nvSpPr>
-        <p:spPr/>
-        <p:txBody>
-          <a:bodyPr/>
-          <a:lstStyle/>
-          <a:p>
-            <a:r>
-              <a:rPr lang="en-US" dirty="0" smtClean="0"/>
-              <a:t>Appendix</a:t>
-            </a:r>
-            <a:endParaRPr lang="nl-BE" dirty="0"/>
-          </a:p>
-        </p:txBody>
-      </p:sp>
-      <p:sp>
-        <p:nvSpPr>
-          <p:cNvPr id="3" name="Text Placeholder 2"/>
-          <p:cNvSpPr>
-            <a:spLocks noGrp="1"/>
-          </p:cNvSpPr>
-          <p:nvPr>
-            <p:ph type="body" idx="1"/>
-          </p:nvPr>
-        </p:nvSpPr>
-        <p:spPr/>
-        <p:txBody>
-          <a:bodyPr/>
-          <a:lstStyle/>
-          <a:p>
-            <a:endParaRPr lang="nl-BE"/>
-          </a:p>
-        </p:txBody>
-      </p:sp>
-      <p:sp>
-        <p:nvSpPr>
-          <p:cNvPr id="4" name="Slide Number Placeholder 3"/>
-          <p:cNvSpPr>
-            <a:spLocks noGrp="1"/>
-          </p:cNvSpPr>
-          <p:nvPr>
-            <p:ph type="sldNum" sz="quarter" idx="12"/>
-          </p:nvPr>
-        </p:nvSpPr>
-        <p:spPr/>
-        <p:txBody>
-          <a:bodyPr/>
-          <a:lstStyle/>
-          <a:p>
-            <a:fld id="{6597116C-F94B-4B5B-973A-17F07FB5C418}" type="slidenum">
-              <a:rPr lang="nl-BE" smtClean="0"/>
-              <a:t>35</a:t>
-            </a:fld>
-            <a:endParaRPr lang="nl-BE"/>
-          </a:p>
-        </p:txBody>
-      </p:sp>
-    </p:spTree>
-    <p:extLst>
-      <p:ext uri="{BB962C8B-B14F-4D97-AF65-F5344CB8AC3E}">
-        <p14:creationId xmlns:p14="http://schemas.microsoft.com/office/powerpoint/2010/main" val="3118825235"/>
-      </p:ext>
-    </p:extLst>
-  </p:cSld>
-  <p:clrMapOvr>
-    <a:masterClrMapping/>
-  </p:clrMapOvr>
-  <p:timing>
-    <p:tnLst>
-      <p:par>
-        <p:cTn id="1" dur="indefinite" restart="never" nodeType="tmRoot"/>
-      </p:par>
-    </p:tnLst>
-  </p:timing>
 </p:sld>
 </file>
 
@@ -29758,6 +30189,108 @@
           <a:p>
             <a:r>
               <a:rPr lang="en-US" dirty="0" smtClean="0"/>
+              <a:t>Appendix</a:t>
+            </a:r>
+            <a:endParaRPr lang="nl-BE" dirty="0"/>
+          </a:p>
+        </p:txBody>
+      </p:sp>
+      <p:sp>
+        <p:nvSpPr>
+          <p:cNvPr id="3" name="Text Placeholder 2"/>
+          <p:cNvSpPr>
+            <a:spLocks noGrp="1"/>
+          </p:cNvSpPr>
+          <p:nvPr>
+            <p:ph type="body" idx="1"/>
+          </p:nvPr>
+        </p:nvSpPr>
+        <p:spPr/>
+        <p:txBody>
+          <a:bodyPr/>
+          <a:lstStyle/>
+          <a:p>
+            <a:endParaRPr lang="nl-BE"/>
+          </a:p>
+        </p:txBody>
+      </p:sp>
+      <p:sp>
+        <p:nvSpPr>
+          <p:cNvPr id="4" name="Slide Number Placeholder 3"/>
+          <p:cNvSpPr>
+            <a:spLocks noGrp="1"/>
+          </p:cNvSpPr>
+          <p:nvPr>
+            <p:ph type="sldNum" sz="quarter" idx="12"/>
+          </p:nvPr>
+        </p:nvSpPr>
+        <p:spPr/>
+        <p:txBody>
+          <a:bodyPr/>
+          <a:lstStyle/>
+          <a:p>
+            <a:fld id="{6597116C-F94B-4B5B-973A-17F07FB5C418}" type="slidenum">
+              <a:rPr lang="nl-BE" smtClean="0"/>
+              <a:t>36</a:t>
+            </a:fld>
+            <a:endParaRPr lang="nl-BE"/>
+          </a:p>
+        </p:txBody>
+      </p:sp>
+    </p:spTree>
+    <p:extLst>
+      <p:ext uri="{BB962C8B-B14F-4D97-AF65-F5344CB8AC3E}">
+        <p14:creationId xmlns:p14="http://schemas.microsoft.com/office/powerpoint/2010/main" val="3118825235"/>
+      </p:ext>
+    </p:extLst>
+  </p:cSld>
+  <p:clrMapOvr>
+    <a:masterClrMapping/>
+  </p:clrMapOvr>
+  <p:timing>
+    <p:tnLst>
+      <p:par>
+        <p:cTn id="1" dur="indefinite" restart="never" nodeType="tmRoot"/>
+      </p:par>
+    </p:tnLst>
+  </p:timing>
+</p:sld>
+</file>
+
+<file path=ppt/slides/slide37.xml><?xml version="1.0" encoding="utf-8"?>
+<p:sld xmlns:a="http://schemas.openxmlformats.org/drawingml/2006/main" xmlns:r="http://schemas.openxmlformats.org/officeDocument/2006/relationships" xmlns:p="http://schemas.openxmlformats.org/presentationml/2006/main">
+  <p:cSld>
+    <p:spTree>
+      <p:nvGrpSpPr>
+        <p:cNvPr id="1" name=""/>
+        <p:cNvGrpSpPr/>
+        <p:nvPr/>
+      </p:nvGrpSpPr>
+      <p:grpSpPr>
+        <a:xfrm>
+          <a:off x="0" y="0"/>
+          <a:ext cx="0" cy="0"/>
+          <a:chOff x="0" y="0"/>
+          <a:chExt cx="0" cy="0"/>
+        </a:xfrm>
+      </p:grpSpPr>
+      <p:sp>
+        <p:nvSpPr>
+          <p:cNvPr id="2" name="Title 1"/>
+          <p:cNvSpPr>
+            <a:spLocks noGrp="1"/>
+          </p:cNvSpPr>
+          <p:nvPr>
+            <p:ph type="title"/>
+          </p:nvPr>
+        </p:nvSpPr>
+        <p:spPr/>
+        <p:txBody>
+          <a:bodyPr/>
+          <a:lstStyle/>
+          <a:p>
+            <a:r>
+              <a:rPr lang="en-US" dirty="0" smtClean="0"/>
               <a:t>Tools</a:t>
             </a:r>
             <a:endParaRPr lang="en-US" dirty="0"/>
@@ -29888,7 +30421,7 @@
           <a:p>
             <a:fld id="{6597116C-F94B-4B5B-973A-17F07FB5C418}" type="slidenum">
               <a:rPr lang="nl-BE" smtClean="0"/>
-              <a:t>36</a:t>
+              <a:t>37</a:t>
             </a:fld>
             <a:endParaRPr lang="nl-BE"/>
           </a:p>
@@ -30347,7 +30880,7 @@
 </p:sld>
 </file>
 
-<file path=ppt/slides/slide37.xml><?xml version="1.0" encoding="utf-8"?>
+<file path=ppt/slides/slide38.xml><?xml version="1.0" encoding="utf-8"?>
 <p:sld xmlns:a="http://schemas.openxmlformats.org/drawingml/2006/main" xmlns:r="http://schemas.openxmlformats.org/officeDocument/2006/relationships" xmlns:p="http://schemas.openxmlformats.org/presentationml/2006/main">
   <p:cSld>
     <p:spTree>
@@ -32131,7 +32664,7 @@
           <a:p>
             <a:fld id="{6597116C-F94B-4B5B-973A-17F07FB5C418}" type="slidenum">
               <a:rPr lang="nl-BE" smtClean="0"/>
-              <a:t>37</a:t>
+              <a:t>38</a:t>
             </a:fld>
             <a:endParaRPr lang="nl-BE"/>
           </a:p>
@@ -32276,7 +32809,7 @@
 </p:sld>
 </file>
 
-<file path=ppt/slides/slide38.xml><?xml version="1.0" encoding="utf-8"?>
+<file path=ppt/slides/slide39.xml><?xml version="1.0" encoding="utf-8"?>
 <p:sld xmlns:a="http://schemas.openxmlformats.org/drawingml/2006/main" xmlns:r="http://schemas.openxmlformats.org/officeDocument/2006/relationships" xmlns:p="http://schemas.openxmlformats.org/presentationml/2006/main">
   <p:cSld>
     <p:spTree>
@@ -32494,7 +33027,7 @@
           <a:p>
             <a:fld id="{6597116C-F94B-4B5B-973A-17F07FB5C418}" type="slidenum">
               <a:rPr lang="nl-BE" smtClean="0"/>
-              <a:t>38</a:t>
+              <a:t>39</a:t>
             </a:fld>
             <a:endParaRPr lang="nl-BE"/>
           </a:p>

</xml_diff>

<commit_message>
Add slide on AVX-512
</commit_message>
<xml_diff>
--- a/Optimization/hpc_efficiency.pptx
+++ b/Optimization/hpc_efficiency.pptx
@@ -5,7 +5,7 @@
     <p:sldMasterId id="2147483648" r:id="rId1"/>
   </p:sldMasterIdLst>
   <p:notesMasterIdLst>
-    <p:notesMasterId r:id="rId45"/>
+    <p:notesMasterId r:id="rId46"/>
   </p:notesMasterIdLst>
   <p:sldIdLst>
     <p:sldId id="267" r:id="rId2"/>
@@ -40,17 +40,18 @@
     <p:sldId id="290" r:id="rId31"/>
     <p:sldId id="289" r:id="rId32"/>
     <p:sldId id="281" r:id="rId33"/>
-    <p:sldId id="298" r:id="rId34"/>
-    <p:sldId id="299" r:id="rId35"/>
-    <p:sldId id="300" r:id="rId36"/>
-    <p:sldId id="301" r:id="rId37"/>
-    <p:sldId id="302" r:id="rId38"/>
-    <p:sldId id="287" r:id="rId39"/>
-    <p:sldId id="292" r:id="rId40"/>
-    <p:sldId id="286" r:id="rId41"/>
-    <p:sldId id="297" r:id="rId42"/>
-    <p:sldId id="271" r:id="rId43"/>
-    <p:sldId id="283" r:id="rId44"/>
+    <p:sldId id="304" r:id="rId34"/>
+    <p:sldId id="298" r:id="rId35"/>
+    <p:sldId id="299" r:id="rId36"/>
+    <p:sldId id="300" r:id="rId37"/>
+    <p:sldId id="301" r:id="rId38"/>
+    <p:sldId id="302" r:id="rId39"/>
+    <p:sldId id="287" r:id="rId40"/>
+    <p:sldId id="292" r:id="rId41"/>
+    <p:sldId id="286" r:id="rId42"/>
+    <p:sldId id="297" r:id="rId43"/>
+    <p:sldId id="271" r:id="rId44"/>
+    <p:sldId id="283" r:id="rId45"/>
   </p:sldIdLst>
   <p:sldSz cx="9144000" cy="6858000" type="screen4x3"/>
   <p:notesSz cx="6858000" cy="9144000"/>
@@ -206,6 +207,7 @@
             <p14:sldId id="290"/>
             <p14:sldId id="289"/>
             <p14:sldId id="281"/>
+            <p14:sldId id="304"/>
             <p14:sldId id="298"/>
           </p14:sldIdLst>
         </p14:section>
@@ -357,11 +359,11 @@
           <c:showPercent val="0"/>
           <c:showBubbleSize val="0"/>
         </c:dLbls>
-        <c:axId val="332600408"/>
-        <c:axId val="332597272"/>
+        <c:axId val="323927472"/>
+        <c:axId val="386653944"/>
       </c:scatterChart>
       <c:valAx>
-        <c:axId val="332600408"/>
+        <c:axId val="323927472"/>
         <c:scaling>
           <c:logBase val="2"/>
           <c:orientation val="minMax"/>
@@ -373,14 +375,14 @@
         <c:majorTickMark val="out"/>
         <c:minorTickMark val="none"/>
         <c:tickLblPos val="nextTo"/>
-        <c:crossAx val="332597272"/>
+        <c:crossAx val="386653944"/>
         <c:crosses val="autoZero"/>
         <c:crossBetween val="midCat"/>
         <c:majorUnit val="4"/>
         <c:minorUnit val="4"/>
       </c:valAx>
       <c:valAx>
-        <c:axId val="332597272"/>
+        <c:axId val="386653944"/>
         <c:scaling>
           <c:logBase val="2"/>
           <c:orientation val="minMax"/>
@@ -393,7 +395,7 @@
         <c:majorTickMark val="out"/>
         <c:minorTickMark val="none"/>
         <c:tickLblPos val="nextTo"/>
-        <c:crossAx val="332600408"/>
+        <c:crossAx val="323927472"/>
         <c:crosses val="autoZero"/>
         <c:crossBetween val="midCat"/>
         <c:majorUnit val="4"/>
@@ -766,11 +768,11 @@
           <c:showPercent val="0"/>
           <c:showBubbleSize val="0"/>
         </c:dLbls>
-        <c:axId val="335830656"/>
-        <c:axId val="335826344"/>
+        <c:axId val="386651984"/>
+        <c:axId val="386657864"/>
       </c:scatterChart>
       <c:valAx>
-        <c:axId val="335830656"/>
+        <c:axId val="386651984"/>
         <c:scaling>
           <c:logBase val="2"/>
           <c:orientation val="minMax"/>
@@ -783,14 +785,14 @@
         <c:majorTickMark val="out"/>
         <c:minorTickMark val="none"/>
         <c:tickLblPos val="nextTo"/>
-        <c:crossAx val="335826344"/>
+        <c:crossAx val="386657864"/>
         <c:crosses val="autoZero"/>
         <c:crossBetween val="midCat"/>
         <c:majorUnit val="4"/>
         <c:minorUnit val="4"/>
       </c:valAx>
       <c:valAx>
-        <c:axId val="335826344"/>
+        <c:axId val="386657864"/>
         <c:scaling>
           <c:logBase val="2"/>
           <c:orientation val="minMax"/>
@@ -804,7 +806,7 @@
         <c:majorTickMark val="out"/>
         <c:minorTickMark val="none"/>
         <c:tickLblPos val="nextTo"/>
-        <c:crossAx val="335830656"/>
+        <c:crossAx val="386651984"/>
         <c:crosses val="autoZero"/>
         <c:crossBetween val="midCat"/>
         <c:majorUnit val="4"/>
@@ -1017,11 +1019,11 @@
           <c:showPercent val="0"/>
           <c:showBubbleSize val="0"/>
         </c:dLbls>
-        <c:axId val="335828696"/>
-        <c:axId val="335828304"/>
+        <c:axId val="386652768"/>
+        <c:axId val="386656296"/>
       </c:scatterChart>
       <c:valAx>
-        <c:axId val="335828696"/>
+        <c:axId val="386652768"/>
         <c:scaling>
           <c:logBase val="2"/>
           <c:orientation val="minMax"/>
@@ -1034,13 +1036,13 @@
         <c:majorTickMark val="out"/>
         <c:minorTickMark val="none"/>
         <c:tickLblPos val="nextTo"/>
-        <c:crossAx val="335828304"/>
+        <c:crossAx val="386656296"/>
         <c:crosses val="autoZero"/>
         <c:crossBetween val="midCat"/>
         <c:minorUnit val="4"/>
       </c:valAx>
       <c:valAx>
-        <c:axId val="335828304"/>
+        <c:axId val="386656296"/>
         <c:scaling>
           <c:logBase val="2"/>
           <c:orientation val="minMax"/>
@@ -1054,7 +1056,7 @@
         <c:majorTickMark val="out"/>
         <c:minorTickMark val="none"/>
         <c:tickLblPos val="nextTo"/>
-        <c:crossAx val="335828696"/>
+        <c:crossAx val="386652768"/>
         <c:crosses val="autoZero"/>
         <c:crossBetween val="midCat"/>
         <c:majorUnit val="2"/>
@@ -1185,11 +1187,11 @@
           <c:showPercent val="0"/>
           <c:showBubbleSize val="0"/>
         </c:dLbls>
-        <c:axId val="335827912"/>
-        <c:axId val="335823992"/>
+        <c:axId val="386650416"/>
+        <c:axId val="386650808"/>
       </c:scatterChart>
       <c:valAx>
-        <c:axId val="335827912"/>
+        <c:axId val="386650416"/>
         <c:scaling>
           <c:logBase val="2"/>
           <c:orientation val="minMax"/>
@@ -1202,13 +1204,13 @@
         <c:majorTickMark val="out"/>
         <c:minorTickMark val="none"/>
         <c:tickLblPos val="nextTo"/>
-        <c:crossAx val="335823992"/>
+        <c:crossAx val="386650808"/>
         <c:crosses val="autoZero"/>
         <c:crossBetween val="midCat"/>
         <c:majorUnit val="4"/>
       </c:valAx>
       <c:valAx>
-        <c:axId val="335823992"/>
+        <c:axId val="386650808"/>
         <c:scaling>
           <c:logBase val="2"/>
           <c:orientation val="minMax"/>
@@ -1221,7 +1223,7 @@
         <c:majorTickMark val="out"/>
         <c:minorTickMark val="none"/>
         <c:tickLblPos val="nextTo"/>
-        <c:crossAx val="335827912"/>
+        <c:crossAx val="386650416"/>
         <c:crosses val="autoZero"/>
         <c:crossBetween val="midCat"/>
         <c:majorUnit val="2"/>
@@ -1347,11 +1349,11 @@
           <c:showPercent val="0"/>
           <c:showBubbleSize val="0"/>
         </c:dLbls>
-        <c:axId val="335829088"/>
-        <c:axId val="335830264"/>
+        <c:axId val="386654336"/>
+        <c:axId val="386654728"/>
       </c:scatterChart>
       <c:valAx>
-        <c:axId val="335829088"/>
+        <c:axId val="386654336"/>
         <c:scaling>
           <c:logBase val="2"/>
           <c:orientation val="minMax"/>
@@ -1364,14 +1366,14 @@
         <c:majorTickMark val="out"/>
         <c:minorTickMark val="none"/>
         <c:tickLblPos val="nextTo"/>
-        <c:crossAx val="335830264"/>
+        <c:crossAx val="386654728"/>
         <c:crosses val="autoZero"/>
         <c:crossBetween val="midCat"/>
         <c:majorUnit val="4"/>
         <c:minorUnit val="4"/>
       </c:valAx>
       <c:valAx>
-        <c:axId val="335830264"/>
+        <c:axId val="386654728"/>
         <c:scaling>
           <c:orientation val="minMax"/>
           <c:max val="1"/>
@@ -1383,7 +1385,7 @@
         <c:majorTickMark val="out"/>
         <c:minorTickMark val="none"/>
         <c:tickLblPos val="nextTo"/>
-        <c:crossAx val="335829088"/>
+        <c:crossAx val="386654336"/>
         <c:crosses val="autoZero"/>
         <c:crossBetween val="midCat"/>
       </c:valAx>
@@ -1480,7 +1482,7 @@
           <a:p>
             <a:fld id="{2E6AAE95-D4FC-4D00-935A-EAE928727A56}" type="datetimeFigureOut">
               <a:rPr lang="en-US" smtClean="0"/>
-              <a:t>2017-08-21</a:t>
+              <a:t>2017-08-25</a:t>
             </a:fld>
             <a:endParaRPr lang="en-US"/>
           </a:p>
@@ -2013,7 +2015,7 @@
           <a:p>
             <a:fld id="{1CFF3F78-F57F-4409-A41B-5EC46D4F404B}" type="datetime1">
               <a:rPr lang="nl-BE" smtClean="0"/>
-              <a:t>21/08/2017</a:t>
+              <a:t>25/08/2017</a:t>
             </a:fld>
             <a:endParaRPr lang="nl-BE"/>
           </a:p>
@@ -2183,7 +2185,7 @@
           <a:p>
             <a:fld id="{7D029E61-52E3-412C-82EB-2F81B17C0AF1}" type="datetime1">
               <a:rPr lang="nl-BE" smtClean="0"/>
-              <a:t>21/08/2017</a:t>
+              <a:t>25/08/2017</a:t>
             </a:fld>
             <a:endParaRPr lang="nl-BE"/>
           </a:p>
@@ -2363,7 +2365,7 @@
           <a:p>
             <a:fld id="{A83F1CEF-A38E-4001-89C6-F3FC7784F299}" type="datetime1">
               <a:rPr lang="nl-BE" smtClean="0"/>
-              <a:t>21/08/2017</a:t>
+              <a:t>25/08/2017</a:t>
             </a:fld>
             <a:endParaRPr lang="nl-BE"/>
           </a:p>
@@ -2489,7 +2491,7 @@
           <a:p>
             <a:fld id="{1FDE84DB-AADA-4C3F-BF46-CA664A504479}" type="datetime1">
               <a:rPr lang="nl-BE" smtClean="0"/>
-              <a:t>21/08/2017</a:t>
+              <a:t>25/08/2017</a:t>
             </a:fld>
             <a:endParaRPr lang="nl-BE" dirty="0"/>
           </a:p>
@@ -2733,7 +2735,7 @@
           <a:p>
             <a:fld id="{8CD53A43-C15C-4F05-9AD7-DB9DE837084D}" type="datetime1">
               <a:rPr lang="nl-BE" smtClean="0"/>
-              <a:t>21/08/2017</a:t>
+              <a:t>25/08/2017</a:t>
             </a:fld>
             <a:endParaRPr lang="nl-BE"/>
           </a:p>
@@ -2979,7 +2981,7 @@
           <a:p>
             <a:fld id="{8994D238-D949-4AEF-9753-A8B6EFA964A0}" type="datetime1">
               <a:rPr lang="nl-BE" smtClean="0"/>
-              <a:t>21/08/2017</a:t>
+              <a:t>25/08/2017</a:t>
             </a:fld>
             <a:endParaRPr lang="nl-BE"/>
           </a:p>
@@ -3267,7 +3269,7 @@
           <a:p>
             <a:fld id="{4D234023-BF99-4AD0-835E-8125DA2B6664}" type="datetime1">
               <a:rPr lang="nl-BE" smtClean="0"/>
-              <a:t>21/08/2017</a:t>
+              <a:t>25/08/2017</a:t>
             </a:fld>
             <a:endParaRPr lang="nl-BE"/>
           </a:p>
@@ -3689,7 +3691,7 @@
           <a:p>
             <a:fld id="{DB075A73-5C1D-406E-9444-3C5C58580E8E}" type="datetime1">
               <a:rPr lang="nl-BE" smtClean="0"/>
-              <a:t>21/08/2017</a:t>
+              <a:t>25/08/2017</a:t>
             </a:fld>
             <a:endParaRPr lang="nl-BE"/>
           </a:p>
@@ -3807,7 +3809,7 @@
           <a:p>
             <a:fld id="{E111FB2D-2E17-4D8F-A64A-4EB0C3D12494}" type="datetime1">
               <a:rPr lang="nl-BE" smtClean="0"/>
-              <a:t>21/08/2017</a:t>
+              <a:t>25/08/2017</a:t>
             </a:fld>
             <a:endParaRPr lang="nl-BE"/>
           </a:p>
@@ -3902,7 +3904,7 @@
           <a:p>
             <a:fld id="{5BE27D71-2267-4E44-9F33-05B60E5C7D9D}" type="datetime1">
               <a:rPr lang="nl-BE" smtClean="0"/>
-              <a:t>21/08/2017</a:t>
+              <a:t>25/08/2017</a:t>
             </a:fld>
             <a:endParaRPr lang="nl-BE"/>
           </a:p>
@@ -4179,7 +4181,7 @@
           <a:p>
             <a:fld id="{182F587C-96C8-4813-A767-3084061A3229}" type="datetime1">
               <a:rPr lang="nl-BE" smtClean="0"/>
-              <a:t>21/08/2017</a:t>
+              <a:t>25/08/2017</a:t>
             </a:fld>
             <a:endParaRPr lang="nl-BE"/>
           </a:p>
@@ -4432,7 +4434,7 @@
           <a:p>
             <a:fld id="{8B021CF8-BBBB-4DFA-8713-49842AA07274}" type="datetime1">
               <a:rPr lang="nl-BE" smtClean="0"/>
-              <a:t>21/08/2017</a:t>
+              <a:t>25/08/2017</a:t>
             </a:fld>
             <a:endParaRPr lang="nl-BE"/>
           </a:p>
@@ -4645,7 +4647,7 @@
           <a:p>
             <a:fld id="{CDBFABB5-0AB3-4CB6-A705-6887DEB1F9F2}" type="datetime1">
               <a:rPr lang="nl-BE" smtClean="0"/>
-              <a:t>21/08/2017</a:t>
+              <a:t>25/08/2017</a:t>
             </a:fld>
             <a:endParaRPr lang="nl-BE"/>
           </a:p>
@@ -8841,7 +8843,7 @@
           <a:graphicData uri="http://schemas.openxmlformats.org/presentationml/2006/ole">
             <mc:AlternateContent xmlns:mc="http://schemas.openxmlformats.org/markup-compatibility/2006">
               <mc:Choice xmlns:v="urn:schemas-microsoft-com:vml" Requires="v">
-                <p:oleObj spid="_x0000_s1208" name="Equation" r:id="rId3" imgW="812520" imgH="393480" progId="Equation.3">
+                <p:oleObj spid="_x0000_s1210" name="Equation" r:id="rId3" imgW="812520" imgH="393480" progId="Equation.3">
                   <p:embed/>
                 </p:oleObj>
               </mc:Choice>
@@ -8898,7 +8900,7 @@
           <a:graphicData uri="http://schemas.openxmlformats.org/presentationml/2006/ole">
             <mc:AlternateContent xmlns:mc="http://schemas.openxmlformats.org/markup-compatibility/2006">
               <mc:Choice xmlns:v="urn:schemas-microsoft-com:vml" Requires="v">
-                <p:oleObj spid="_x0000_s1209" name="Equation" r:id="rId5" imgW="2489040" imgH="431640" progId="Equation.3">
+                <p:oleObj spid="_x0000_s1211" name="Equation" r:id="rId5" imgW="2489040" imgH="431640" progId="Equation.3">
                   <p:embed/>
                 </p:oleObj>
               </mc:Choice>
@@ -19560,7 +19562,7 @@
           <a:graphicData uri="http://schemas.openxmlformats.org/presentationml/2006/ole">
             <mc:AlternateContent xmlns:mc="http://schemas.openxmlformats.org/markup-compatibility/2006">
               <mc:Choice xmlns:v="urn:schemas-microsoft-com:vml" Requires="v">
-                <p:oleObj spid="_x0000_s2199" name="Equation" r:id="rId3" imgW="1091880" imgH="1041120" progId="Equation.3">
+                <p:oleObj spid="_x0000_s2201" name="Equation" r:id="rId3" imgW="1091880" imgH="1041120" progId="Equation.3">
                   <p:embed/>
                 </p:oleObj>
               </mc:Choice>
@@ -20931,7 +20933,7 @@
           <a:graphicData uri="http://schemas.openxmlformats.org/presentationml/2006/ole">
             <mc:AlternateContent xmlns:mc="http://schemas.openxmlformats.org/markup-compatibility/2006">
               <mc:Choice xmlns:v="urn:schemas-microsoft-com:vml" Requires="v">
-                <p:oleObj spid="_x0000_s2200" name="Equation" r:id="rId5" imgW="1091880" imgH="1041120" progId="Equation.3">
+                <p:oleObj spid="_x0000_s2202" name="Equation" r:id="rId5" imgW="1091880" imgH="1041120" progId="Equation.3">
                   <p:embed/>
                 </p:oleObj>
               </mc:Choice>
@@ -27280,7 +27282,7 @@
           <a:graphicData uri="http://schemas.openxmlformats.org/presentationml/2006/ole">
             <mc:AlternateContent xmlns:mc="http://schemas.openxmlformats.org/markup-compatibility/2006">
               <mc:Choice xmlns:v="urn:schemas-microsoft-com:vml" Requires="v">
-                <p:oleObj spid="_x0000_s3112" name="Equation" r:id="rId3" imgW="965160" imgH="228600" progId="Equation.3">
+                <p:oleObj spid="_x0000_s3113" name="Equation" r:id="rId3" imgW="965160" imgH="228600" progId="Equation.3">
                   <p:embed/>
                 </p:oleObj>
               </mc:Choice>
@@ -29523,9 +29525,9 @@
           <a:p>
             <a:r>
               <a:rPr lang="en-US" dirty="0" smtClean="0"/>
-              <a:t>Note of caution</a:t>
-            </a:r>
-            <a:endParaRPr lang="nl-BE" dirty="0"/>
+              <a:t>AVX-512</a:t>
+            </a:r>
+            <a:endParaRPr lang="en-US" dirty="0"/>
           </a:p>
         </p:txBody>
       </p:sp>
@@ -29546,98 +29548,62 @@
           <a:p>
             <a:r>
               <a:rPr lang="en-US" dirty="0" smtClean="0"/>
-              <a:t>Intel compilers: aggressive optimization</a:t>
-            </a:r>
-          </a:p>
-          <a:p>
-            <a:pPr lvl="1"/>
+              <a:t>Vector </a:t>
+            </a:r>
             <a:r>
               <a:rPr lang="en-US" dirty="0" smtClean="0"/>
-              <a:t>Even at </a:t>
-            </a:r>
-            <a:r>
-              <a:rPr lang="en-US" dirty="0" smtClean="0">
-                <a:latin typeface="Courier New" panose="02070309020205020404" pitchFamily="49" charset="0"/>
-                <a:cs typeface="Courier New" panose="02070309020205020404" pitchFamily="49" charset="0"/>
-              </a:rPr>
-              <a:t>–O2</a:t>
-            </a:r>
-          </a:p>
-          <a:p>
-            <a:pPr lvl="1"/>
-            <a:r>
-              <a:rPr lang="en-US" dirty="0" smtClean="0"/>
-              <a:t>Reordering of operations/operands</a:t>
-            </a:r>
-          </a:p>
-          <a:p>
-            <a:pPr lvl="2"/>
-            <a:r>
-              <a:rPr lang="en-US" dirty="0" smtClean="0"/>
-              <a:t>May impact precision</a:t>
-            </a:r>
-          </a:p>
-          <a:p>
-            <a:pPr lvl="1"/>
-            <a:r>
-              <a:rPr lang="en-US" dirty="0" smtClean="0"/>
-              <a:t>Verify results with</a:t>
+              <a:t>registers for floating point operands:</a:t>
             </a:r>
             <a:br>
               <a:rPr lang="en-US" dirty="0" smtClean="0"/>
             </a:br>
             <a:r>
-              <a:rPr lang="en-US" dirty="0" smtClean="0">
-                <a:latin typeface="Courier New" panose="02070309020205020404" pitchFamily="49" charset="0"/>
-                <a:cs typeface="Courier New" panose="02070309020205020404" pitchFamily="49" charset="0"/>
-              </a:rPr>
-              <a:t>-</a:t>
-            </a:r>
-            <a:r>
-              <a:rPr lang="en-US" dirty="0" err="1" smtClean="0">
-                <a:latin typeface="Courier New" panose="02070309020205020404" pitchFamily="49" charset="0"/>
-                <a:cs typeface="Courier New" panose="02070309020205020404" pitchFamily="49" charset="0"/>
-              </a:rPr>
-              <a:t>fp</a:t>
-            </a:r>
-            <a:r>
-              <a:rPr lang="en-US" dirty="0" smtClean="0">
-                <a:latin typeface="Courier New" panose="02070309020205020404" pitchFamily="49" charset="0"/>
-                <a:cs typeface="Courier New" panose="02070309020205020404" pitchFamily="49" charset="0"/>
-              </a:rPr>
-              <a:t>-model precise</a:t>
-            </a:r>
-            <a:br>
-              <a:rPr lang="en-US" dirty="0" smtClean="0">
-                <a:latin typeface="Courier New" panose="02070309020205020404" pitchFamily="49" charset="0"/>
-                <a:cs typeface="Courier New" panose="02070309020205020404" pitchFamily="49" charset="0"/>
-              </a:rPr>
-            </a:br>
-            <a:r>
-              <a:rPr lang="en-US" dirty="0" smtClean="0">
-                <a:latin typeface="Courier New" panose="02070309020205020404" pitchFamily="49" charset="0"/>
-                <a:cs typeface="Courier New" panose="02070309020205020404" pitchFamily="49" charset="0"/>
-              </a:rPr>
-              <a:t>–</a:t>
-            </a:r>
-            <a:r>
-              <a:rPr lang="en-US" dirty="0" err="1" smtClean="0">
-                <a:latin typeface="Courier New" panose="02070309020205020404" pitchFamily="49" charset="0"/>
-                <a:cs typeface="Courier New" panose="02070309020205020404" pitchFamily="49" charset="0"/>
-              </a:rPr>
-              <a:t>fp</a:t>
-            </a:r>
-            <a:r>
-              <a:rPr lang="en-US" dirty="0" smtClean="0">
-                <a:latin typeface="Courier New" panose="02070309020205020404" pitchFamily="49" charset="0"/>
-                <a:cs typeface="Courier New" panose="02070309020205020404" pitchFamily="49" charset="0"/>
-              </a:rPr>
-              <a:t>-model source</a:t>
-            </a:r>
-            <a:endParaRPr lang="nl-BE" dirty="0">
-              <a:latin typeface="Courier New" panose="02070309020205020404" pitchFamily="49" charset="0"/>
-              <a:cs typeface="Courier New" panose="02070309020205020404" pitchFamily="49" charset="0"/>
-            </a:endParaRPr>
+              <a:rPr lang="en-US" dirty="0" smtClean="0"/>
+              <a:t>512 </a:t>
+            </a:r>
+            <a:r>
+              <a:rPr lang="en-US" dirty="0" smtClean="0"/>
+              <a:t>bit </a:t>
+            </a:r>
+            <a:r>
+              <a:rPr lang="en-US" dirty="0" smtClean="0"/>
+              <a:t>wide</a:t>
+            </a:r>
+          </a:p>
+          <a:p>
+            <a:pPr lvl="1"/>
+            <a:r>
+              <a:rPr lang="en-US" dirty="0"/>
+              <a:t>8</a:t>
+            </a:r>
+            <a:r>
+              <a:rPr lang="en-US" dirty="0" smtClean="0"/>
+              <a:t> </a:t>
+            </a:r>
+            <a:r>
+              <a:rPr lang="en-US" dirty="0" smtClean="0"/>
+              <a:t>double precision</a:t>
+            </a:r>
+          </a:p>
+          <a:p>
+            <a:pPr lvl="1"/>
+            <a:endParaRPr lang="en-US" dirty="0" smtClean="0"/>
+          </a:p>
+          <a:p>
+            <a:pPr lvl="1"/>
+            <a:r>
+              <a:rPr lang="en-US" dirty="0" smtClean="0"/>
+              <a:t>16</a:t>
+            </a:r>
+            <a:r>
+              <a:rPr lang="en-US" dirty="0" smtClean="0"/>
+              <a:t> </a:t>
+            </a:r>
+            <a:r>
+              <a:rPr lang="en-US" dirty="0" smtClean="0"/>
+              <a:t>single precision</a:t>
+            </a:r>
+            <a:endParaRPr lang="en-US" dirty="0"/>
           </a:p>
         </p:txBody>
       </p:sp>
@@ -29659,6 +29625,742 @@
             <a:fld id="{6597116C-F94B-4B5B-973A-17F07FB5C418}" type="slidenum">
               <a:rPr lang="nl-BE" smtClean="0"/>
               <a:t>33</a:t>
+            </a:fld>
+            <a:endParaRPr lang="nl-BE"/>
+          </a:p>
+        </p:txBody>
+      </p:sp>
+      <p:grpSp>
+        <p:nvGrpSpPr>
+          <p:cNvPr id="7" name="Group 6"/>
+          <p:cNvGrpSpPr/>
+          <p:nvPr/>
+        </p:nvGrpSpPr>
+        <p:grpSpPr>
+          <a:xfrm>
+            <a:off x="4283968" y="3260180"/>
+            <a:ext cx="4667572" cy="523220"/>
+            <a:chOff x="4355976" y="3260180"/>
+            <a:chExt cx="4667572" cy="523220"/>
+          </a:xfrm>
+        </p:grpSpPr>
+        <p:sp>
+          <p:nvSpPr>
+            <p:cNvPr id="5" name="TextBox 4"/>
+            <p:cNvSpPr txBox="1"/>
+            <p:nvPr/>
+          </p:nvSpPr>
+          <p:spPr>
+            <a:xfrm>
+              <a:off x="5148063" y="3260180"/>
+              <a:ext cx="3875485" cy="523220"/>
+            </a:xfrm>
+            <a:prstGeom prst="rect">
+              <a:avLst/>
+            </a:prstGeom>
+            <a:noFill/>
+            <a:ln>
+              <a:solidFill>
+                <a:schemeClr val="tx1"/>
+              </a:solidFill>
+            </a:ln>
+          </p:spPr>
+          <p:txBody>
+            <a:bodyPr wrap="square" rtlCol="0">
+              <a:spAutoFit/>
+            </a:bodyPr>
+            <a:lstStyle/>
+            <a:p>
+              <a:r>
+                <a:rPr lang="en-US" sz="2800" dirty="0" smtClean="0"/>
+                <a:t>8 </a:t>
+              </a:r>
+              <a:r>
+                <a:rPr lang="en-US" sz="2800" dirty="0" smtClean="0"/>
+                <a:t>concurrent operations</a:t>
+              </a:r>
+              <a:endParaRPr lang="en-US" sz="2800" dirty="0"/>
+            </a:p>
+          </p:txBody>
+        </p:sp>
+        <p:sp>
+          <p:nvSpPr>
+            <p:cNvPr id="6" name="Right Arrow 5"/>
+            <p:cNvSpPr/>
+            <p:nvPr/>
+          </p:nvSpPr>
+          <p:spPr>
+            <a:xfrm>
+              <a:off x="4355976" y="3377774"/>
+              <a:ext cx="648072" cy="288032"/>
+            </a:xfrm>
+            <a:prstGeom prst="rightArrow">
+              <a:avLst/>
+            </a:prstGeom>
+            <a:solidFill>
+              <a:schemeClr val="tx1"/>
+            </a:solidFill>
+            <a:ln>
+              <a:solidFill>
+                <a:schemeClr val="tx1"/>
+              </a:solidFill>
+            </a:ln>
+          </p:spPr>
+          <p:style>
+            <a:lnRef idx="2">
+              <a:schemeClr val="accent1">
+                <a:shade val="50000"/>
+              </a:schemeClr>
+            </a:lnRef>
+            <a:fillRef idx="1">
+              <a:schemeClr val="accent1"/>
+            </a:fillRef>
+            <a:effectRef idx="0">
+              <a:schemeClr val="accent1"/>
+            </a:effectRef>
+            <a:fontRef idx="minor">
+              <a:schemeClr val="lt1"/>
+            </a:fontRef>
+          </p:style>
+          <p:txBody>
+            <a:bodyPr rtlCol="0" anchor="ctr"/>
+            <a:lstStyle/>
+            <a:p>
+              <a:pPr algn="ctr"/>
+              <a:endParaRPr lang="en-US"/>
+            </a:p>
+          </p:txBody>
+        </p:sp>
+      </p:grpSp>
+      <p:grpSp>
+        <p:nvGrpSpPr>
+          <p:cNvPr id="8" name="Group 7"/>
+          <p:cNvGrpSpPr/>
+          <p:nvPr/>
+        </p:nvGrpSpPr>
+        <p:grpSpPr>
+          <a:xfrm>
+            <a:off x="4283968" y="4221088"/>
+            <a:ext cx="4667573" cy="523220"/>
+            <a:chOff x="4355976" y="3236009"/>
+            <a:chExt cx="4667573" cy="523220"/>
+          </a:xfrm>
+        </p:grpSpPr>
+        <p:sp>
+          <p:nvSpPr>
+            <p:cNvPr id="9" name="TextBox 8"/>
+            <p:cNvSpPr txBox="1"/>
+            <p:nvPr/>
+          </p:nvSpPr>
+          <p:spPr>
+            <a:xfrm>
+              <a:off x="5148064" y="3236009"/>
+              <a:ext cx="3875485" cy="523220"/>
+            </a:xfrm>
+            <a:prstGeom prst="rect">
+              <a:avLst/>
+            </a:prstGeom>
+            <a:noFill/>
+            <a:ln>
+              <a:solidFill>
+                <a:schemeClr val="tx1"/>
+              </a:solidFill>
+            </a:ln>
+          </p:spPr>
+          <p:txBody>
+            <a:bodyPr wrap="none" rtlCol="0">
+              <a:spAutoFit/>
+            </a:bodyPr>
+            <a:lstStyle/>
+            <a:p>
+              <a:r>
+                <a:rPr lang="en-US" sz="2800" dirty="0" smtClean="0"/>
+                <a:t>16</a:t>
+              </a:r>
+              <a:r>
+                <a:rPr lang="en-US" sz="2800" dirty="0" smtClean="0"/>
+                <a:t> </a:t>
+              </a:r>
+              <a:r>
+                <a:rPr lang="en-US" sz="2800" dirty="0" smtClean="0"/>
+                <a:t>concurrent operations</a:t>
+              </a:r>
+              <a:endParaRPr lang="en-US" sz="2800" dirty="0"/>
+            </a:p>
+          </p:txBody>
+        </p:sp>
+        <p:sp>
+          <p:nvSpPr>
+            <p:cNvPr id="10" name="Right Arrow 9"/>
+            <p:cNvSpPr/>
+            <p:nvPr/>
+          </p:nvSpPr>
+          <p:spPr>
+            <a:xfrm>
+              <a:off x="4355976" y="3377774"/>
+              <a:ext cx="648072" cy="288032"/>
+            </a:xfrm>
+            <a:prstGeom prst="rightArrow">
+              <a:avLst/>
+            </a:prstGeom>
+            <a:solidFill>
+              <a:schemeClr val="tx1"/>
+            </a:solidFill>
+            <a:ln>
+              <a:solidFill>
+                <a:schemeClr val="tx1"/>
+              </a:solidFill>
+            </a:ln>
+          </p:spPr>
+          <p:style>
+            <a:lnRef idx="2">
+              <a:schemeClr val="accent1">
+                <a:shade val="50000"/>
+              </a:schemeClr>
+            </a:lnRef>
+            <a:fillRef idx="1">
+              <a:schemeClr val="accent1"/>
+            </a:fillRef>
+            <a:effectRef idx="0">
+              <a:schemeClr val="accent1"/>
+            </a:effectRef>
+            <a:fontRef idx="minor">
+              <a:schemeClr val="lt1"/>
+            </a:fontRef>
+          </p:style>
+          <p:txBody>
+            <a:bodyPr rtlCol="0" anchor="ctr"/>
+            <a:lstStyle/>
+            <a:p>
+              <a:pPr algn="ctr"/>
+              <a:endParaRPr lang="en-US"/>
+            </a:p>
+          </p:txBody>
+        </p:sp>
+      </p:grpSp>
+      <p:sp>
+        <p:nvSpPr>
+          <p:cNvPr id="13" name="TextBox 12"/>
+          <p:cNvSpPr txBox="1"/>
+          <p:nvPr/>
+        </p:nvSpPr>
+        <p:spPr>
+          <a:xfrm>
+            <a:off x="1907704" y="5292497"/>
+            <a:ext cx="5386026" cy="584775"/>
+          </a:xfrm>
+          <a:prstGeom prst="rect">
+            <a:avLst/>
+          </a:prstGeom>
+          <a:noFill/>
+          <a:ln>
+            <a:solidFill>
+              <a:schemeClr val="tx1"/>
+            </a:solidFill>
+          </a:ln>
+        </p:spPr>
+        <p:txBody>
+          <a:bodyPr wrap="none" rtlCol="0">
+            <a:spAutoFit/>
+          </a:bodyPr>
+          <a:lstStyle/>
+          <a:p>
+            <a:r>
+              <a:rPr lang="en-US" sz="3200" dirty="0" smtClean="0"/>
+              <a:t>Even more worth </a:t>
+            </a:r>
+            <a:r>
+              <a:rPr lang="en-US" sz="3200" dirty="0" smtClean="0"/>
+              <a:t>to recompile!</a:t>
+            </a:r>
+            <a:endParaRPr lang="en-US" sz="3200" dirty="0"/>
+          </a:p>
+        </p:txBody>
+      </p:sp>
+    </p:spTree>
+    <p:extLst>
+      <p:ext uri="{BB962C8B-B14F-4D97-AF65-F5344CB8AC3E}">
+        <p14:creationId xmlns:p14="http://schemas.microsoft.com/office/powerpoint/2010/main" val="489583834"/>
+      </p:ext>
+    </p:extLst>
+  </p:cSld>
+  <p:clrMapOvr>
+    <a:masterClrMapping/>
+  </p:clrMapOvr>
+  <p:timing>
+    <p:tnLst>
+      <p:par>
+        <p:cTn id="1" dur="indefinite" restart="never" nodeType="tmRoot">
+          <p:childTnLst>
+            <p:seq concurrent="1" nextAc="seek">
+              <p:cTn id="2" dur="indefinite" nodeType="mainSeq">
+                <p:childTnLst>
+                  <p:par>
+                    <p:cTn id="3" fill="hold">
+                      <p:stCondLst>
+                        <p:cond delay="indefinite"/>
+                        <p:cond evt="onBegin" delay="0">
+                          <p:tn val="2"/>
+                        </p:cond>
+                      </p:stCondLst>
+                      <p:childTnLst>
+                        <p:par>
+                          <p:cTn id="4" fill="hold">
+                            <p:stCondLst>
+                              <p:cond delay="0"/>
+                            </p:stCondLst>
+                            <p:childTnLst>
+                              <p:par>
+                                <p:cTn id="5" presetID="1" presetClass="entr" presetSubtype="0" fill="hold" grpId="0" nodeType="withEffect">
+                                  <p:stCondLst>
+                                    <p:cond delay="0"/>
+                                  </p:stCondLst>
+                                  <p:childTnLst>
+                                    <p:set>
+                                      <p:cBhvr>
+                                        <p:cTn id="6" dur="1" fill="hold">
+                                          <p:stCondLst>
+                                            <p:cond delay="0"/>
+                                          </p:stCondLst>
+                                        </p:cTn>
+                                        <p:tgtEl>
+                                          <p:spTgt spid="3">
+                                            <p:txEl>
+                                              <p:pRg st="0" end="0"/>
+                                            </p:txEl>
+                                          </p:spTgt>
+                                        </p:tgtEl>
+                                        <p:attrNameLst>
+                                          <p:attrName>style.visibility</p:attrName>
+                                        </p:attrNameLst>
+                                      </p:cBhvr>
+                                      <p:to>
+                                        <p:strVal val="visible"/>
+                                      </p:to>
+                                    </p:set>
+                                  </p:childTnLst>
+                                </p:cTn>
+                              </p:par>
+                              <p:par>
+                                <p:cTn id="7" presetID="1" presetClass="entr" presetSubtype="0" fill="hold" grpId="0" nodeType="withEffect">
+                                  <p:stCondLst>
+                                    <p:cond delay="0"/>
+                                  </p:stCondLst>
+                                  <p:childTnLst>
+                                    <p:set>
+                                      <p:cBhvr>
+                                        <p:cTn id="8" dur="1" fill="hold">
+                                          <p:stCondLst>
+                                            <p:cond delay="0"/>
+                                          </p:stCondLst>
+                                        </p:cTn>
+                                        <p:tgtEl>
+                                          <p:spTgt spid="3">
+                                            <p:txEl>
+                                              <p:pRg st="1" end="1"/>
+                                            </p:txEl>
+                                          </p:spTgt>
+                                        </p:tgtEl>
+                                        <p:attrNameLst>
+                                          <p:attrName>style.visibility</p:attrName>
+                                        </p:attrNameLst>
+                                      </p:cBhvr>
+                                      <p:to>
+                                        <p:strVal val="visible"/>
+                                      </p:to>
+                                    </p:set>
+                                  </p:childTnLst>
+                                </p:cTn>
+                              </p:par>
+                            </p:childTnLst>
+                          </p:cTn>
+                        </p:par>
+                      </p:childTnLst>
+                    </p:cTn>
+                  </p:par>
+                  <p:par>
+                    <p:cTn id="9" fill="hold">
+                      <p:stCondLst>
+                        <p:cond delay="indefinite"/>
+                      </p:stCondLst>
+                      <p:childTnLst>
+                        <p:par>
+                          <p:cTn id="10" fill="hold">
+                            <p:stCondLst>
+                              <p:cond delay="0"/>
+                            </p:stCondLst>
+                            <p:childTnLst>
+                              <p:par>
+                                <p:cTn id="11" presetID="1" presetClass="entr" presetSubtype="0" fill="hold" nodeType="clickEffect">
+                                  <p:stCondLst>
+                                    <p:cond delay="0"/>
+                                  </p:stCondLst>
+                                  <p:childTnLst>
+                                    <p:set>
+                                      <p:cBhvr>
+                                        <p:cTn id="12" dur="1" fill="hold">
+                                          <p:stCondLst>
+                                            <p:cond delay="0"/>
+                                          </p:stCondLst>
+                                        </p:cTn>
+                                        <p:tgtEl>
+                                          <p:spTgt spid="7"/>
+                                        </p:tgtEl>
+                                        <p:attrNameLst>
+                                          <p:attrName>style.visibility</p:attrName>
+                                        </p:attrNameLst>
+                                      </p:cBhvr>
+                                      <p:to>
+                                        <p:strVal val="visible"/>
+                                      </p:to>
+                                    </p:set>
+                                  </p:childTnLst>
+                                </p:cTn>
+                              </p:par>
+                            </p:childTnLst>
+                          </p:cTn>
+                        </p:par>
+                      </p:childTnLst>
+                    </p:cTn>
+                  </p:par>
+                  <p:par>
+                    <p:cTn id="13" fill="hold">
+                      <p:stCondLst>
+                        <p:cond delay="indefinite"/>
+                      </p:stCondLst>
+                      <p:childTnLst>
+                        <p:par>
+                          <p:cTn id="14" fill="hold">
+                            <p:stCondLst>
+                              <p:cond delay="0"/>
+                            </p:stCondLst>
+                            <p:childTnLst>
+                              <p:par>
+                                <p:cTn id="15" presetID="1" presetClass="entr" presetSubtype="0" fill="hold" grpId="0" nodeType="clickEffect">
+                                  <p:stCondLst>
+                                    <p:cond delay="0"/>
+                                  </p:stCondLst>
+                                  <p:childTnLst>
+                                    <p:set>
+                                      <p:cBhvr>
+                                        <p:cTn id="16" dur="1" fill="hold">
+                                          <p:stCondLst>
+                                            <p:cond delay="0"/>
+                                          </p:stCondLst>
+                                        </p:cTn>
+                                        <p:tgtEl>
+                                          <p:spTgt spid="3">
+                                            <p:txEl>
+                                              <p:pRg st="3" end="3"/>
+                                            </p:txEl>
+                                          </p:spTgt>
+                                        </p:tgtEl>
+                                        <p:attrNameLst>
+                                          <p:attrName>style.visibility</p:attrName>
+                                        </p:attrNameLst>
+                                      </p:cBhvr>
+                                      <p:to>
+                                        <p:strVal val="visible"/>
+                                      </p:to>
+                                    </p:set>
+                                  </p:childTnLst>
+                                </p:cTn>
+                              </p:par>
+                            </p:childTnLst>
+                          </p:cTn>
+                        </p:par>
+                      </p:childTnLst>
+                    </p:cTn>
+                  </p:par>
+                  <p:par>
+                    <p:cTn id="17" fill="hold">
+                      <p:stCondLst>
+                        <p:cond delay="indefinite"/>
+                      </p:stCondLst>
+                      <p:childTnLst>
+                        <p:par>
+                          <p:cTn id="18" fill="hold">
+                            <p:stCondLst>
+                              <p:cond delay="0"/>
+                            </p:stCondLst>
+                            <p:childTnLst>
+                              <p:par>
+                                <p:cTn id="19" presetID="1" presetClass="entr" presetSubtype="0" fill="hold" nodeType="clickEffect">
+                                  <p:stCondLst>
+                                    <p:cond delay="0"/>
+                                  </p:stCondLst>
+                                  <p:childTnLst>
+                                    <p:set>
+                                      <p:cBhvr>
+                                        <p:cTn id="20" dur="1" fill="hold">
+                                          <p:stCondLst>
+                                            <p:cond delay="0"/>
+                                          </p:stCondLst>
+                                        </p:cTn>
+                                        <p:tgtEl>
+                                          <p:spTgt spid="8"/>
+                                        </p:tgtEl>
+                                        <p:attrNameLst>
+                                          <p:attrName>style.visibility</p:attrName>
+                                        </p:attrNameLst>
+                                      </p:cBhvr>
+                                      <p:to>
+                                        <p:strVal val="visible"/>
+                                      </p:to>
+                                    </p:set>
+                                  </p:childTnLst>
+                                </p:cTn>
+                              </p:par>
+                            </p:childTnLst>
+                          </p:cTn>
+                        </p:par>
+                      </p:childTnLst>
+                    </p:cTn>
+                  </p:par>
+                  <p:par>
+                    <p:cTn id="21" fill="hold">
+                      <p:stCondLst>
+                        <p:cond delay="indefinite"/>
+                      </p:stCondLst>
+                      <p:childTnLst>
+                        <p:par>
+                          <p:cTn id="22" fill="hold">
+                            <p:stCondLst>
+                              <p:cond delay="0"/>
+                            </p:stCondLst>
+                            <p:childTnLst>
+                              <p:par>
+                                <p:cTn id="23" presetID="1" presetClass="entr" presetSubtype="0" fill="hold" grpId="0" nodeType="clickEffect">
+                                  <p:stCondLst>
+                                    <p:cond delay="0"/>
+                                  </p:stCondLst>
+                                  <p:childTnLst>
+                                    <p:set>
+                                      <p:cBhvr>
+                                        <p:cTn id="24" dur="1" fill="hold">
+                                          <p:stCondLst>
+                                            <p:cond delay="0"/>
+                                          </p:stCondLst>
+                                        </p:cTn>
+                                        <p:tgtEl>
+                                          <p:spTgt spid="13"/>
+                                        </p:tgtEl>
+                                        <p:attrNameLst>
+                                          <p:attrName>style.visibility</p:attrName>
+                                        </p:attrNameLst>
+                                      </p:cBhvr>
+                                      <p:to>
+                                        <p:strVal val="visible"/>
+                                      </p:to>
+                                    </p:set>
+                                  </p:childTnLst>
+                                </p:cTn>
+                              </p:par>
+                            </p:childTnLst>
+                          </p:cTn>
+                        </p:par>
+                      </p:childTnLst>
+                    </p:cTn>
+                  </p:par>
+                </p:childTnLst>
+              </p:cTn>
+              <p:prevCondLst>
+                <p:cond evt="onPrev" delay="0">
+                  <p:tgtEl>
+                    <p:sldTgt/>
+                  </p:tgtEl>
+                </p:cond>
+              </p:prevCondLst>
+              <p:nextCondLst>
+                <p:cond evt="onNext" delay="0">
+                  <p:tgtEl>
+                    <p:sldTgt/>
+                  </p:tgtEl>
+                </p:cond>
+              </p:nextCondLst>
+            </p:seq>
+          </p:childTnLst>
+        </p:cTn>
+      </p:par>
+    </p:tnLst>
+    <p:bldLst>
+      <p:bldP spid="3" grpId="0" build="p"/>
+      <p:bldP spid="13" grpId="0" animBg="1"/>
+    </p:bldLst>
+  </p:timing>
+</p:sld>
+</file>
+
+<file path=ppt/slides/slide34.xml><?xml version="1.0" encoding="utf-8"?>
+<p:sld xmlns:a="http://schemas.openxmlformats.org/drawingml/2006/main" xmlns:r="http://schemas.openxmlformats.org/officeDocument/2006/relationships" xmlns:p="http://schemas.openxmlformats.org/presentationml/2006/main">
+  <p:cSld>
+    <p:spTree>
+      <p:nvGrpSpPr>
+        <p:cNvPr id="1" name=""/>
+        <p:cNvGrpSpPr/>
+        <p:nvPr/>
+      </p:nvGrpSpPr>
+      <p:grpSpPr>
+        <a:xfrm>
+          <a:off x="0" y="0"/>
+          <a:ext cx="0" cy="0"/>
+          <a:chOff x="0" y="0"/>
+          <a:chExt cx="0" cy="0"/>
+        </a:xfrm>
+      </p:grpSpPr>
+      <p:sp>
+        <p:nvSpPr>
+          <p:cNvPr id="2" name="Title 1"/>
+          <p:cNvSpPr>
+            <a:spLocks noGrp="1"/>
+          </p:cNvSpPr>
+          <p:nvPr>
+            <p:ph type="title"/>
+          </p:nvPr>
+        </p:nvSpPr>
+        <p:spPr/>
+        <p:txBody>
+          <a:bodyPr/>
+          <a:lstStyle/>
+          <a:p>
+            <a:r>
+              <a:rPr lang="en-US" dirty="0" smtClean="0"/>
+              <a:t>Note of caution</a:t>
+            </a:r>
+            <a:endParaRPr lang="nl-BE" dirty="0"/>
+          </a:p>
+        </p:txBody>
+      </p:sp>
+      <p:sp>
+        <p:nvSpPr>
+          <p:cNvPr id="3" name="Content Placeholder 2"/>
+          <p:cNvSpPr>
+            <a:spLocks noGrp="1"/>
+          </p:cNvSpPr>
+          <p:nvPr>
+            <p:ph idx="1"/>
+          </p:nvPr>
+        </p:nvSpPr>
+        <p:spPr/>
+        <p:txBody>
+          <a:bodyPr/>
+          <a:lstStyle/>
+          <a:p>
+            <a:r>
+              <a:rPr lang="en-US" dirty="0" smtClean="0"/>
+              <a:t>Intel compilers: aggressive optimization</a:t>
+            </a:r>
+          </a:p>
+          <a:p>
+            <a:pPr lvl="1"/>
+            <a:r>
+              <a:rPr lang="en-US" dirty="0" smtClean="0"/>
+              <a:t>Even at </a:t>
+            </a:r>
+            <a:r>
+              <a:rPr lang="en-US" dirty="0" smtClean="0">
+                <a:latin typeface="Courier New" panose="02070309020205020404" pitchFamily="49" charset="0"/>
+                <a:cs typeface="Courier New" panose="02070309020205020404" pitchFamily="49" charset="0"/>
+              </a:rPr>
+              <a:t>–O2</a:t>
+            </a:r>
+          </a:p>
+          <a:p>
+            <a:pPr lvl="1"/>
+            <a:r>
+              <a:rPr lang="en-US" dirty="0" smtClean="0"/>
+              <a:t>Reordering of operations/operands</a:t>
+            </a:r>
+          </a:p>
+          <a:p>
+            <a:pPr lvl="2"/>
+            <a:r>
+              <a:rPr lang="en-US" dirty="0" smtClean="0"/>
+              <a:t>May impact precision</a:t>
+            </a:r>
+          </a:p>
+          <a:p>
+            <a:pPr lvl="1"/>
+            <a:r>
+              <a:rPr lang="en-US" dirty="0" smtClean="0"/>
+              <a:t>Verify results with</a:t>
+            </a:r>
+            <a:br>
+              <a:rPr lang="en-US" dirty="0" smtClean="0"/>
+            </a:br>
+            <a:r>
+              <a:rPr lang="en-US" dirty="0" smtClean="0">
+                <a:latin typeface="Courier New" panose="02070309020205020404" pitchFamily="49" charset="0"/>
+                <a:cs typeface="Courier New" panose="02070309020205020404" pitchFamily="49" charset="0"/>
+              </a:rPr>
+              <a:t>-</a:t>
+            </a:r>
+            <a:r>
+              <a:rPr lang="en-US" dirty="0" err="1" smtClean="0">
+                <a:latin typeface="Courier New" panose="02070309020205020404" pitchFamily="49" charset="0"/>
+                <a:cs typeface="Courier New" panose="02070309020205020404" pitchFamily="49" charset="0"/>
+              </a:rPr>
+              <a:t>fp</a:t>
+            </a:r>
+            <a:r>
+              <a:rPr lang="en-US" dirty="0" smtClean="0">
+                <a:latin typeface="Courier New" panose="02070309020205020404" pitchFamily="49" charset="0"/>
+                <a:cs typeface="Courier New" panose="02070309020205020404" pitchFamily="49" charset="0"/>
+              </a:rPr>
+              <a:t>-model precise</a:t>
+            </a:r>
+            <a:br>
+              <a:rPr lang="en-US" dirty="0" smtClean="0">
+                <a:latin typeface="Courier New" panose="02070309020205020404" pitchFamily="49" charset="0"/>
+                <a:cs typeface="Courier New" panose="02070309020205020404" pitchFamily="49" charset="0"/>
+              </a:rPr>
+            </a:br>
+            <a:r>
+              <a:rPr lang="en-US" dirty="0" smtClean="0">
+                <a:latin typeface="Courier New" panose="02070309020205020404" pitchFamily="49" charset="0"/>
+                <a:cs typeface="Courier New" panose="02070309020205020404" pitchFamily="49" charset="0"/>
+              </a:rPr>
+              <a:t>–</a:t>
+            </a:r>
+            <a:r>
+              <a:rPr lang="en-US" dirty="0" err="1" smtClean="0">
+                <a:latin typeface="Courier New" panose="02070309020205020404" pitchFamily="49" charset="0"/>
+                <a:cs typeface="Courier New" panose="02070309020205020404" pitchFamily="49" charset="0"/>
+              </a:rPr>
+              <a:t>fp</a:t>
+            </a:r>
+            <a:r>
+              <a:rPr lang="en-US" dirty="0" smtClean="0">
+                <a:latin typeface="Courier New" panose="02070309020205020404" pitchFamily="49" charset="0"/>
+                <a:cs typeface="Courier New" panose="02070309020205020404" pitchFamily="49" charset="0"/>
+              </a:rPr>
+              <a:t>-model source</a:t>
+            </a:r>
+            <a:endParaRPr lang="nl-BE" dirty="0">
+              <a:latin typeface="Courier New" panose="02070309020205020404" pitchFamily="49" charset="0"/>
+              <a:cs typeface="Courier New" panose="02070309020205020404" pitchFamily="49" charset="0"/>
+            </a:endParaRPr>
+          </a:p>
+        </p:txBody>
+      </p:sp>
+      <p:sp>
+        <p:nvSpPr>
+          <p:cNvPr id="4" name="Slide Number Placeholder 3"/>
+          <p:cNvSpPr>
+            <a:spLocks noGrp="1"/>
+          </p:cNvSpPr>
+          <p:nvPr>
+            <p:ph type="sldNum" sz="quarter" idx="12"/>
+          </p:nvPr>
+        </p:nvSpPr>
+        <p:spPr/>
+        <p:txBody>
+          <a:bodyPr/>
+          <a:lstStyle/>
+          <a:p>
+            <a:fld id="{6597116C-F94B-4B5B-973A-17F07FB5C418}" type="slidenum">
+              <a:rPr lang="nl-BE" smtClean="0"/>
+              <a:t>34</a:t>
             </a:fld>
             <a:endParaRPr lang="nl-BE"/>
           </a:p>
@@ -30021,112 +30723,6 @@
 </p:sld>
 </file>
 
-<file path=ppt/slides/slide34.xml><?xml version="1.0" encoding="utf-8"?>
-<p:sld xmlns:a="http://schemas.openxmlformats.org/drawingml/2006/main" xmlns:r="http://schemas.openxmlformats.org/officeDocument/2006/relationships" xmlns:p="http://schemas.openxmlformats.org/presentationml/2006/main">
-  <p:cSld>
-    <p:spTree>
-      <p:nvGrpSpPr>
-        <p:cNvPr id="1" name=""/>
-        <p:cNvGrpSpPr/>
-        <p:nvPr/>
-      </p:nvGrpSpPr>
-      <p:grpSpPr>
-        <a:xfrm>
-          <a:off x="0" y="0"/>
-          <a:ext cx="0" cy="0"/>
-          <a:chOff x="0" y="0"/>
-          <a:chExt cx="0" cy="0"/>
-        </a:xfrm>
-      </p:grpSpPr>
-      <p:sp>
-        <p:nvSpPr>
-          <p:cNvPr id="2" name="Title 1"/>
-          <p:cNvSpPr>
-            <a:spLocks noGrp="1"/>
-          </p:cNvSpPr>
-          <p:nvPr>
-            <p:ph type="title"/>
-          </p:nvPr>
-        </p:nvSpPr>
-        <p:spPr/>
-        <p:txBody>
-          <a:bodyPr/>
-          <a:lstStyle/>
-          <a:p>
-            <a:r>
-              <a:rPr lang="en-US" dirty="0" smtClean="0"/>
-              <a:t>Multithreading: false </a:t>
-            </a:r>
-            <a:r>
-              <a:rPr lang="en-US" dirty="0" smtClean="0"/>
-              <a:t>sharing</a:t>
-            </a:r>
-            <a:endParaRPr lang="en-US" dirty="0"/>
-          </a:p>
-        </p:txBody>
-      </p:sp>
-      <p:sp>
-        <p:nvSpPr>
-          <p:cNvPr id="3" name="Text Placeholder 2"/>
-          <p:cNvSpPr>
-            <a:spLocks noGrp="1"/>
-          </p:cNvSpPr>
-          <p:nvPr>
-            <p:ph type="body" idx="1"/>
-          </p:nvPr>
-        </p:nvSpPr>
-        <p:spPr/>
-        <p:txBody>
-          <a:bodyPr/>
-          <a:lstStyle/>
-          <a:p>
-            <a:endParaRPr lang="en-US"/>
-          </a:p>
-        </p:txBody>
-      </p:sp>
-      <p:sp>
-        <p:nvSpPr>
-          <p:cNvPr id="4" name="Slide Number Placeholder 3"/>
-          <p:cNvSpPr>
-            <a:spLocks noGrp="1"/>
-          </p:cNvSpPr>
-          <p:nvPr>
-            <p:ph type="sldNum" sz="quarter" idx="12"/>
-          </p:nvPr>
-        </p:nvSpPr>
-        <p:spPr/>
-        <p:txBody>
-          <a:bodyPr/>
-          <a:lstStyle/>
-          <a:p>
-            <a:fld id="{6597116C-F94B-4B5B-973A-17F07FB5C418}" type="slidenum">
-              <a:rPr lang="nl-BE" smtClean="0"/>
-              <a:t>34</a:t>
-            </a:fld>
-            <a:endParaRPr lang="nl-BE"/>
-          </a:p>
-        </p:txBody>
-      </p:sp>
-    </p:spTree>
-    <p:extLst>
-      <p:ext uri="{BB962C8B-B14F-4D97-AF65-F5344CB8AC3E}">
-        <p14:creationId xmlns:p14="http://schemas.microsoft.com/office/powerpoint/2010/main" val="3424948925"/>
-      </p:ext>
-    </p:extLst>
-  </p:cSld>
-  <p:clrMapOvr>
-    <a:masterClrMapping/>
-  </p:clrMapOvr>
-  <p:timing>
-    <p:tnLst>
-      <p:par>
-        <p:cTn id="1" dur="indefinite" restart="never" nodeType="tmRoot"/>
-      </p:par>
-    </p:tnLst>
-  </p:timing>
-</p:sld>
-</file>
-
 <file path=ppt/slides/slide35.xml><?xml version="1.0" encoding="utf-8"?>
 <p:sld xmlns:a="http://schemas.openxmlformats.org/drawingml/2006/main" xmlns:r="http://schemas.openxmlformats.org/officeDocument/2006/relationships" xmlns:p="http://schemas.openxmlformats.org/presentationml/2006/main">
   <p:cSld>
@@ -30161,9 +30757,28 @@
           <a:p>
             <a:r>
               <a:rPr lang="en-US" dirty="0" smtClean="0"/>
-              <a:t>Cache lines, again</a:t>
+              <a:t>Multithreading: false sharing</a:t>
             </a:r>
             <a:endParaRPr lang="en-US" dirty="0"/>
+          </a:p>
+        </p:txBody>
+      </p:sp>
+      <p:sp>
+        <p:nvSpPr>
+          <p:cNvPr id="3" name="Text Placeholder 2"/>
+          <p:cNvSpPr>
+            <a:spLocks noGrp="1"/>
+          </p:cNvSpPr>
+          <p:nvPr>
+            <p:ph type="body" idx="1"/>
+          </p:nvPr>
+        </p:nvSpPr>
+        <p:spPr/>
+        <p:txBody>
+          <a:bodyPr/>
+          <a:lstStyle/>
+          <a:p>
+            <a:endParaRPr lang="en-US"/>
           </a:p>
         </p:txBody>
       </p:sp>
@@ -30185,6 +30800,89 @@
             <a:fld id="{6597116C-F94B-4B5B-973A-17F07FB5C418}" type="slidenum">
               <a:rPr lang="nl-BE" smtClean="0"/>
               <a:t>35</a:t>
+            </a:fld>
+            <a:endParaRPr lang="nl-BE"/>
+          </a:p>
+        </p:txBody>
+      </p:sp>
+    </p:spTree>
+    <p:extLst>
+      <p:ext uri="{BB962C8B-B14F-4D97-AF65-F5344CB8AC3E}">
+        <p14:creationId xmlns:p14="http://schemas.microsoft.com/office/powerpoint/2010/main" val="3424948925"/>
+      </p:ext>
+    </p:extLst>
+  </p:cSld>
+  <p:clrMapOvr>
+    <a:masterClrMapping/>
+  </p:clrMapOvr>
+  <p:timing>
+    <p:tnLst>
+      <p:par>
+        <p:cTn id="1" dur="indefinite" restart="never" nodeType="tmRoot"/>
+      </p:par>
+    </p:tnLst>
+  </p:timing>
+</p:sld>
+</file>
+
+<file path=ppt/slides/slide36.xml><?xml version="1.0" encoding="utf-8"?>
+<p:sld xmlns:a="http://schemas.openxmlformats.org/drawingml/2006/main" xmlns:r="http://schemas.openxmlformats.org/officeDocument/2006/relationships" xmlns:p="http://schemas.openxmlformats.org/presentationml/2006/main">
+  <p:cSld>
+    <p:spTree>
+      <p:nvGrpSpPr>
+        <p:cNvPr id="1" name=""/>
+        <p:cNvGrpSpPr/>
+        <p:nvPr/>
+      </p:nvGrpSpPr>
+      <p:grpSpPr>
+        <a:xfrm>
+          <a:off x="0" y="0"/>
+          <a:ext cx="0" cy="0"/>
+          <a:chOff x="0" y="0"/>
+          <a:chExt cx="0" cy="0"/>
+        </a:xfrm>
+      </p:grpSpPr>
+      <p:sp>
+        <p:nvSpPr>
+          <p:cNvPr id="2" name="Title 1"/>
+          <p:cNvSpPr>
+            <a:spLocks noGrp="1"/>
+          </p:cNvSpPr>
+          <p:nvPr>
+            <p:ph type="title"/>
+          </p:nvPr>
+        </p:nvSpPr>
+        <p:spPr/>
+        <p:txBody>
+          <a:bodyPr/>
+          <a:lstStyle/>
+          <a:p>
+            <a:r>
+              <a:rPr lang="en-US" dirty="0" smtClean="0"/>
+              <a:t>Cache lines, again</a:t>
+            </a:r>
+            <a:endParaRPr lang="en-US" dirty="0"/>
+          </a:p>
+        </p:txBody>
+      </p:sp>
+      <p:sp>
+        <p:nvSpPr>
+          <p:cNvPr id="4" name="Slide Number Placeholder 3"/>
+          <p:cNvSpPr>
+            <a:spLocks noGrp="1"/>
+          </p:cNvSpPr>
+          <p:nvPr>
+            <p:ph type="sldNum" sz="quarter" idx="12"/>
+          </p:nvPr>
+        </p:nvSpPr>
+        <p:spPr/>
+        <p:txBody>
+          <a:bodyPr/>
+          <a:lstStyle/>
+          <a:p>
+            <a:fld id="{6597116C-F94B-4B5B-973A-17F07FB5C418}" type="slidenum">
+              <a:rPr lang="nl-BE" smtClean="0"/>
+              <a:t>36</a:t>
             </a:fld>
             <a:endParaRPr lang="nl-BE"/>
           </a:p>
@@ -34859,7 +35557,7 @@
 </p:sld>
 </file>
 
-<file path=ppt/slides/slide36.xml><?xml version="1.0" encoding="utf-8"?>
+<file path=ppt/slides/slide37.xml><?xml version="1.0" encoding="utf-8"?>
 <p:sld xmlns:a="http://schemas.openxmlformats.org/drawingml/2006/main" xmlns:r="http://schemas.openxmlformats.org/officeDocument/2006/relationships" xmlns:p="http://schemas.openxmlformats.org/presentationml/2006/main">
   <p:cSld>
     <p:spTree>
@@ -34893,19 +35591,7 @@
           <a:p>
             <a:r>
               <a:rPr lang="en-US" dirty="0" smtClean="0"/>
-              <a:t>B</a:t>
-            </a:r>
-            <a:r>
-              <a:rPr lang="en-US" dirty="0" smtClean="0"/>
-              <a:t>ad news </a:t>
-            </a:r>
-            <a:r>
-              <a:rPr lang="en-US" dirty="0" smtClean="0"/>
-              <a:t>and </a:t>
-            </a:r>
-            <a:r>
-              <a:rPr lang="en-US" dirty="0" smtClean="0"/>
-              <a:t>good news</a:t>
+              <a:t>Bad news and good news</a:t>
             </a:r>
             <a:endParaRPr lang="en-US" dirty="0"/>
           </a:p>
@@ -34930,24 +35616,15 @@
           <a:p>
             <a:r>
               <a:rPr lang="en-US" dirty="0" smtClean="0"/>
-              <a:t>Bad news: </a:t>
-            </a:r>
+              <a:t>Bad news: performance</a:t>
+            </a:r>
+          </a:p>
+          <a:p>
+            <a:pPr lvl="1"/>
             <a:r>
               <a:rPr lang="en-US" dirty="0" smtClean="0"/>
-              <a:t>performance</a:t>
-            </a:r>
-          </a:p>
-          <a:p>
-            <a:pPr lvl="1"/>
-            <a:r>
-              <a:rPr lang="en-US" dirty="0" smtClean="0"/>
-              <a:t>degraded by </a:t>
-            </a:r>
-            <a:r>
-              <a:rPr lang="en-US" dirty="0" smtClean="0"/>
-              <a:t>1.5 to 4</a:t>
-            </a:r>
-            <a:endParaRPr lang="en-US" dirty="0" smtClean="0"/>
+              <a:t>degraded by 1.5 to 4</a:t>
+            </a:r>
           </a:p>
           <a:p>
             <a:pPr lvl="1"/>
@@ -34959,15 +35636,7 @@
           <a:p>
             <a:r>
               <a:rPr lang="en-US" dirty="0" smtClean="0"/>
-              <a:t>G</a:t>
-            </a:r>
-            <a:r>
-              <a:rPr lang="en-US" dirty="0" smtClean="0"/>
-              <a:t>ood news: </a:t>
-            </a:r>
-            <a:r>
-              <a:rPr lang="en-US" dirty="0" smtClean="0"/>
-              <a:t>compilers</a:t>
+              <a:t>Good news: compilers</a:t>
             </a:r>
           </a:p>
           <a:p>
@@ -35033,7 +35702,7 @@
           <a:p>
             <a:fld id="{6597116C-F94B-4B5B-973A-17F07FB5C418}" type="slidenum">
               <a:rPr lang="nl-BE" smtClean="0"/>
-              <a:t>36</a:t>
+              <a:t>37</a:t>
             </a:fld>
             <a:endParaRPr lang="nl-BE"/>
           </a:p>
@@ -35501,7 +36170,7 @@
 </p:sld>
 </file>
 
-<file path=ppt/slides/slide37.xml><?xml version="1.0" encoding="utf-8"?>
+<file path=ppt/slides/slide38.xml><?xml version="1.0" encoding="utf-8"?>
 <p:sld xmlns:a="http://schemas.openxmlformats.org/drawingml/2006/main" xmlns:r="http://schemas.openxmlformats.org/officeDocument/2006/relationships" xmlns:p="http://schemas.openxmlformats.org/presentationml/2006/main">
   <p:cSld>
     <p:spTree>
@@ -35566,11 +36235,7 @@
           <a:p>
             <a:r>
               <a:rPr lang="en-US" dirty="0" smtClean="0"/>
-              <a:t>Align C </a:t>
-            </a:r>
-            <a:r>
-              <a:rPr lang="en-US" dirty="0" smtClean="0"/>
-              <a:t>global variables at cache boundaries, e.g.,</a:t>
+              <a:t>Align C global variables at cache boundaries, e.g.,</a:t>
             </a:r>
             <a:br>
               <a:rPr lang="en-US" dirty="0" smtClean="0"/>
@@ -35587,21 +36252,7 @@
                 <a:latin typeface="Courier New" panose="02070309020205020404" pitchFamily="49" charset="0"/>
                 <a:cs typeface="Courier New" panose="02070309020205020404" pitchFamily="49" charset="0"/>
               </a:rPr>
-              <a:t> counter_t0 __</a:t>
-            </a:r>
-            <a:r>
-              <a:rPr lang="en-US" sz="2200" dirty="0" smtClean="0">
-                <a:latin typeface="Courier New" panose="02070309020205020404" pitchFamily="49" charset="0"/>
-                <a:cs typeface="Courier New" panose="02070309020205020404" pitchFamily="49" charset="0"/>
-              </a:rPr>
-              <a:t>attribute__((aligned(64</a:t>
-            </a:r>
-            <a:r>
-              <a:rPr lang="en-US" sz="2200" dirty="0" smtClean="0">
-                <a:latin typeface="Courier New" panose="02070309020205020404" pitchFamily="49" charset="0"/>
-                <a:cs typeface="Courier New" panose="02070309020205020404" pitchFamily="49" charset="0"/>
-              </a:rPr>
-              <a:t>)));</a:t>
+              <a:t> counter_t0 __attribute__((aligned(64)));</a:t>
             </a:r>
             <a:br>
               <a:rPr lang="en-US" sz="2200" dirty="0" smtClean="0">
@@ -35713,11 +36364,7 @@
             </a:r>
             <a:r>
               <a:rPr lang="en-US" dirty="0" smtClean="0"/>
-              <a:t> </a:t>
-            </a:r>
-            <a:r>
-              <a:rPr lang="en-US" dirty="0" smtClean="0"/>
-              <a:t>to multiples of cache line length, e.g.,</a:t>
+              <a:t> to multiples of cache line length, e.g.,</a:t>
             </a:r>
             <a:br>
               <a:rPr lang="en-US" dirty="0" smtClean="0"/>
@@ -35807,14 +36454,7 @@
                 <a:latin typeface="Courier New" panose="02070309020205020404" pitchFamily="49" charset="0"/>
                 <a:cs typeface="Courier New" panose="02070309020205020404" pitchFamily="49" charset="0"/>
               </a:rPr>
-              <a:t>[20</a:t>
-            </a:r>
-            <a:r>
-              <a:rPr lang="en-US" sz="2200" dirty="0" smtClean="0">
-                <a:latin typeface="Courier New" panose="02070309020205020404" pitchFamily="49" charset="0"/>
-                <a:cs typeface="Courier New" panose="02070309020205020404" pitchFamily="49" charset="0"/>
-              </a:rPr>
-              <a:t>]</a:t>
+              <a:t>[20]</a:t>
             </a:r>
             <a:r>
               <a:rPr lang="en-US" sz="2200" dirty="0">
@@ -35916,7 +36556,7 @@
           <a:p>
             <a:fld id="{6597116C-F94B-4B5B-973A-17F07FB5C418}" type="slidenum">
               <a:rPr lang="nl-BE" smtClean="0"/>
-              <a:t>37</a:t>
+              <a:t>38</a:t>
             </a:fld>
             <a:endParaRPr lang="nl-BE"/>
           </a:p>
@@ -36359,7 +36999,7 @@
 </p:sld>
 </file>
 
-<file path=ppt/slides/slide38.xml><?xml version="1.0" encoding="utf-8"?>
+<file path=ppt/slides/slide39.xml><?xml version="1.0" encoding="utf-8"?>
 <p:sld xmlns:a="http://schemas.openxmlformats.org/drawingml/2006/main" xmlns:r="http://schemas.openxmlformats.org/officeDocument/2006/relationships" xmlns:p="http://schemas.openxmlformats.org/presentationml/2006/main">
   <p:cSld>
     <p:spTree>
@@ -36435,7 +37075,7 @@
           <a:p>
             <a:fld id="{6597116C-F94B-4B5B-973A-17F07FB5C418}" type="slidenum">
               <a:rPr lang="nl-BE" smtClean="0"/>
-              <a:t>38</a:t>
+              <a:t>39</a:t>
             </a:fld>
             <a:endParaRPr lang="nl-BE"/>
           </a:p>
@@ -36445,208 +37085,6 @@
     <p:extLst>
       <p:ext uri="{BB962C8B-B14F-4D97-AF65-F5344CB8AC3E}">
         <p14:creationId xmlns:p14="http://schemas.microsoft.com/office/powerpoint/2010/main" val="1387657132"/>
-      </p:ext>
-    </p:extLst>
-  </p:cSld>
-  <p:clrMapOvr>
-    <a:masterClrMapping/>
-  </p:clrMapOvr>
-  <p:timing>
-    <p:tnLst>
-      <p:par>
-        <p:cTn id="1" dur="indefinite" restart="never" nodeType="tmRoot"/>
-      </p:par>
-    </p:tnLst>
-  </p:timing>
-</p:sld>
-</file>
-
-<file path=ppt/slides/slide39.xml><?xml version="1.0" encoding="utf-8"?>
-<p:sld xmlns:a="http://schemas.openxmlformats.org/drawingml/2006/main" xmlns:r="http://schemas.openxmlformats.org/officeDocument/2006/relationships" xmlns:p="http://schemas.openxmlformats.org/presentationml/2006/main">
-  <p:cSld>
-    <p:spTree>
-      <p:nvGrpSpPr>
-        <p:cNvPr id="1" name=""/>
-        <p:cNvGrpSpPr/>
-        <p:nvPr/>
-      </p:nvGrpSpPr>
-      <p:grpSpPr>
-        <a:xfrm>
-          <a:off x="0" y="0"/>
-          <a:ext cx="0" cy="0"/>
-          <a:chOff x="0" y="0"/>
-          <a:chExt cx="0" cy="0"/>
-        </a:xfrm>
-      </p:grpSpPr>
-      <p:sp>
-        <p:nvSpPr>
-          <p:cNvPr id="5" name="Title 4"/>
-          <p:cNvSpPr>
-            <a:spLocks noGrp="1"/>
-          </p:cNvSpPr>
-          <p:nvPr>
-            <p:ph type="title"/>
-          </p:nvPr>
-        </p:nvSpPr>
-        <p:spPr/>
-        <p:txBody>
-          <a:bodyPr/>
-          <a:lstStyle/>
-          <a:p>
-            <a:r>
-              <a:rPr lang="en-US" dirty="0" smtClean="0"/>
-              <a:t>Useful references</a:t>
-            </a:r>
-            <a:endParaRPr lang="nl-BE" dirty="0"/>
-          </a:p>
-        </p:txBody>
-      </p:sp>
-      <p:sp>
-        <p:nvSpPr>
-          <p:cNvPr id="6" name="Content Placeholder 5"/>
-          <p:cNvSpPr>
-            <a:spLocks noGrp="1"/>
-          </p:cNvSpPr>
-          <p:nvPr>
-            <p:ph idx="1"/>
-          </p:nvPr>
-        </p:nvSpPr>
-        <p:spPr/>
-        <p:txBody>
-          <a:bodyPr>
-            <a:normAutofit fontScale="85000" lnSpcReduction="10000"/>
-          </a:bodyPr>
-          <a:lstStyle/>
-          <a:p>
-            <a:r>
-              <a:rPr lang="en-US" dirty="0" smtClean="0">
-                <a:hlinkClick r:id="rId2"/>
-              </a:rPr>
-              <a:t>Gallery of processor cache effects</a:t>
-            </a:r>
-            <a:endParaRPr lang="en-US" dirty="0" smtClean="0"/>
-          </a:p>
-          <a:p>
-            <a:r>
-              <a:rPr lang="en-US" dirty="0">
-                <a:hlinkClick r:id="rId3"/>
-              </a:rPr>
-              <a:t>Avoiding and Identifying False Sharing Among </a:t>
-            </a:r>
-            <a:r>
-              <a:rPr lang="en-US" dirty="0" smtClean="0">
-                <a:hlinkClick r:id="rId3"/>
-              </a:rPr>
-              <a:t>Threads</a:t>
-            </a:r>
-            <a:endParaRPr lang="en-US" dirty="0" smtClean="0"/>
-          </a:p>
-          <a:p>
-            <a:r>
-              <a:rPr lang="en-US" dirty="0" smtClean="0"/>
-              <a:t>Vectorization</a:t>
-            </a:r>
-            <a:endParaRPr lang="en-US" dirty="0" smtClean="0"/>
-          </a:p>
-          <a:p>
-            <a:pPr lvl="1"/>
-            <a:r>
-              <a:rPr lang="en-US" dirty="0" smtClean="0">
-                <a:hlinkClick r:id="rId4"/>
-              </a:rPr>
-              <a:t>A guide to vectorization with Intel C++ compilers</a:t>
-            </a:r>
-            <a:endParaRPr lang="en-US" dirty="0" smtClean="0"/>
-          </a:p>
-          <a:p>
-            <a:pPr lvl="1"/>
-            <a:r>
-              <a:rPr lang="en-US" dirty="0" smtClean="0">
-                <a:hlinkClick r:id="rId5"/>
-              </a:rPr>
-              <a:t>Auto-vectorization with </a:t>
-            </a:r>
-            <a:r>
-              <a:rPr lang="en-US" dirty="0" err="1" smtClean="0">
-                <a:hlinkClick r:id="rId5"/>
-              </a:rPr>
-              <a:t>gcc</a:t>
-            </a:r>
-            <a:r>
-              <a:rPr lang="en-US" dirty="0" smtClean="0">
-                <a:hlinkClick r:id="rId5"/>
-              </a:rPr>
-              <a:t> 4.7</a:t>
-            </a:r>
-            <a:endParaRPr lang="en-US" dirty="0" smtClean="0"/>
-          </a:p>
-          <a:p>
-            <a:r>
-              <a:rPr lang="en-US" dirty="0"/>
-              <a:t>Introduction to High Performance Computing for Scientists and </a:t>
-            </a:r>
-            <a:r>
-              <a:rPr lang="en-US" dirty="0" smtClean="0"/>
-              <a:t>Engineers</a:t>
-            </a:r>
-            <a:r>
-              <a:rPr lang="nl-BE" dirty="0" smtClean="0"/>
-              <a:t/>
-            </a:r>
-            <a:br>
-              <a:rPr lang="nl-BE" dirty="0" smtClean="0"/>
-            </a:br>
-            <a:r>
-              <a:rPr lang="nl-BE" dirty="0" smtClean="0"/>
-              <a:t>Georg Hager &amp; Gerhard Wellein</a:t>
-            </a:r>
-            <a:br>
-              <a:rPr lang="nl-BE" dirty="0" smtClean="0"/>
-            </a:br>
-            <a:r>
-              <a:rPr lang="nl-BE" dirty="0" smtClean="0"/>
-              <a:t>Chapman &amp; Hall, 2010</a:t>
-            </a:r>
-            <a:endParaRPr lang="en-US" b="1" dirty="0"/>
-          </a:p>
-          <a:p>
-            <a:r>
-              <a:rPr lang="en-US" dirty="0" smtClean="0">
-                <a:hlinkClick r:id="rId6"/>
-              </a:rPr>
-              <a:t>Why has CPU frequency ceased to grow?</a:t>
-            </a:r>
-            <a:endParaRPr lang="nl-BE" dirty="0" smtClean="0"/>
-          </a:p>
-        </p:txBody>
-      </p:sp>
-      <p:sp>
-        <p:nvSpPr>
-          <p:cNvPr id="4" name="Slide Number Placeholder 3"/>
-          <p:cNvSpPr>
-            <a:spLocks noGrp="1"/>
-          </p:cNvSpPr>
-          <p:nvPr>
-            <p:ph type="sldNum" sz="quarter" idx="12"/>
-          </p:nvPr>
-        </p:nvSpPr>
-        <p:spPr/>
-        <p:txBody>
-          <a:bodyPr/>
-          <a:lstStyle/>
-          <a:p>
-            <a:fld id="{6597116C-F94B-4B5B-973A-17F07FB5C418}" type="slidenum">
-              <a:rPr lang="nl-BE" smtClean="0"/>
-              <a:t>39</a:t>
-            </a:fld>
-            <a:endParaRPr lang="nl-BE"/>
-          </a:p>
-        </p:txBody>
-      </p:sp>
-    </p:spTree>
-    <p:extLst>
-      <p:ext uri="{BB962C8B-B14F-4D97-AF65-F5344CB8AC3E}">
-        <p14:creationId xmlns:p14="http://schemas.microsoft.com/office/powerpoint/2010/main" val="2653023660"/>
       </p:ext>
     </p:extLst>
   </p:cSld>
@@ -37395,7 +37833,7 @@
       </p:grpSpPr>
       <p:sp>
         <p:nvSpPr>
-          <p:cNvPr id="2" name="Title 1"/>
+          <p:cNvPr id="5" name="Title 4"/>
           <p:cNvSpPr>
             <a:spLocks noGrp="1"/>
           </p:cNvSpPr>
@@ -37410,7 +37848,7 @@
           <a:p>
             <a:r>
               <a:rPr lang="en-US" dirty="0" smtClean="0"/>
-              <a:t>Appendix</a:t>
+              <a:t>Useful references</a:t>
             </a:r>
             <a:endParaRPr lang="nl-BE" dirty="0"/>
           </a:p>
@@ -37418,20 +37856,119 @@
       </p:sp>
       <p:sp>
         <p:nvSpPr>
-          <p:cNvPr id="3" name="Text Placeholder 2"/>
+          <p:cNvPr id="6" name="Content Placeholder 5"/>
           <p:cNvSpPr>
             <a:spLocks noGrp="1"/>
           </p:cNvSpPr>
           <p:nvPr>
-            <p:ph type="body" idx="1"/>
+            <p:ph idx="1"/>
           </p:nvPr>
         </p:nvSpPr>
         <p:spPr/>
         <p:txBody>
-          <a:bodyPr/>
+          <a:bodyPr>
+            <a:normAutofit fontScale="85000" lnSpcReduction="10000"/>
+          </a:bodyPr>
           <a:lstStyle/>
           <a:p>
-            <a:endParaRPr lang="nl-BE"/>
+            <a:r>
+              <a:rPr lang="en-US" dirty="0" smtClean="0">
+                <a:hlinkClick r:id="rId2"/>
+              </a:rPr>
+              <a:t>Gallery of processor cache effects</a:t>
+            </a:r>
+            <a:endParaRPr lang="en-US" dirty="0" smtClean="0"/>
+          </a:p>
+          <a:p>
+            <a:r>
+              <a:rPr lang="en-US" dirty="0">
+                <a:hlinkClick r:id="rId3"/>
+              </a:rPr>
+              <a:t>Avoiding and Identifying False Sharing Among </a:t>
+            </a:r>
+            <a:r>
+              <a:rPr lang="en-US" dirty="0" smtClean="0">
+                <a:hlinkClick r:id="rId3"/>
+              </a:rPr>
+              <a:t>Threads</a:t>
+            </a:r>
+            <a:endParaRPr lang="en-US" dirty="0" smtClean="0"/>
+          </a:p>
+          <a:p>
+            <a:r>
+              <a:rPr lang="en-US" dirty="0" smtClean="0"/>
+              <a:t>Vectorization</a:t>
+            </a:r>
+          </a:p>
+          <a:p>
+            <a:pPr lvl="1"/>
+            <a:r>
+              <a:rPr lang="en-US" dirty="0" smtClean="0">
+                <a:hlinkClick r:id="rId4"/>
+              </a:rPr>
+              <a:t>A guide to vectorization with Intel C++ compilers</a:t>
+            </a:r>
+            <a:endParaRPr lang="en-US" dirty="0" smtClean="0"/>
+          </a:p>
+          <a:p>
+            <a:pPr lvl="1"/>
+            <a:r>
+              <a:rPr lang="en-US" dirty="0" smtClean="0">
+                <a:hlinkClick r:id="rId5"/>
+              </a:rPr>
+              <a:t>Auto-vectorization with </a:t>
+            </a:r>
+            <a:r>
+              <a:rPr lang="en-US" dirty="0" err="1" smtClean="0">
+                <a:hlinkClick r:id="rId5"/>
+              </a:rPr>
+              <a:t>gcc</a:t>
+            </a:r>
+            <a:r>
+              <a:rPr lang="en-US" dirty="0" smtClean="0">
+                <a:hlinkClick r:id="rId5"/>
+              </a:rPr>
+              <a:t> 4.7</a:t>
+            </a:r>
+            <a:endParaRPr lang="en-US" dirty="0" smtClean="0"/>
+          </a:p>
+          <a:p>
+            <a:r>
+              <a:rPr lang="en-US" dirty="0"/>
+              <a:t>Introduction to High Performance Computing for Scientists and </a:t>
+            </a:r>
+            <a:r>
+              <a:rPr lang="en-US" dirty="0" smtClean="0"/>
+              <a:t>Engineers</a:t>
+            </a:r>
+            <a:r>
+              <a:rPr lang="nl-BE" dirty="0" smtClean="0"/>
+              <a:t/>
+            </a:r>
+            <a:br>
+              <a:rPr lang="nl-BE" dirty="0" smtClean="0"/>
+            </a:br>
+            <a:r>
+              <a:rPr lang="nl-BE" dirty="0" smtClean="0"/>
+              <a:t>Georg Hager &amp; Gerhard Wellein</a:t>
+            </a:r>
+            <a:br>
+              <a:rPr lang="nl-BE" dirty="0" smtClean="0"/>
+            </a:br>
+            <a:r>
+              <a:rPr lang="nl-BE" dirty="0" smtClean="0"/>
+              <a:t>Chapman &amp; Hall, 2010</a:t>
+            </a:r>
+            <a:endParaRPr lang="en-US" b="1" dirty="0"/>
+          </a:p>
+          <a:p>
+            <a:r>
+              <a:rPr lang="en-US" dirty="0" smtClean="0">
+                <a:hlinkClick r:id="rId6"/>
+              </a:rPr>
+              <a:t>Why has CPU frequency ceased to grow?</a:t>
+            </a:r>
+            <a:endParaRPr lang="nl-BE" dirty="0" smtClean="0"/>
           </a:p>
         </p:txBody>
       </p:sp>
@@ -37461,7 +37998,7 @@
     </p:spTree>
     <p:extLst>
       <p:ext uri="{BB962C8B-B14F-4D97-AF65-F5344CB8AC3E}">
-        <p14:creationId xmlns:p14="http://schemas.microsoft.com/office/powerpoint/2010/main" val="3118825235"/>
+        <p14:creationId xmlns:p14="http://schemas.microsoft.com/office/powerpoint/2010/main" val="2653023660"/>
       </p:ext>
     </p:extLst>
   </p:cSld>
@@ -37512,6 +38049,108 @@
           <a:p>
             <a:r>
               <a:rPr lang="en-US" dirty="0" smtClean="0"/>
+              <a:t>Appendix</a:t>
+            </a:r>
+            <a:endParaRPr lang="nl-BE" dirty="0"/>
+          </a:p>
+        </p:txBody>
+      </p:sp>
+      <p:sp>
+        <p:nvSpPr>
+          <p:cNvPr id="3" name="Text Placeholder 2"/>
+          <p:cNvSpPr>
+            <a:spLocks noGrp="1"/>
+          </p:cNvSpPr>
+          <p:nvPr>
+            <p:ph type="body" idx="1"/>
+          </p:nvPr>
+        </p:nvSpPr>
+        <p:spPr/>
+        <p:txBody>
+          <a:bodyPr/>
+          <a:lstStyle/>
+          <a:p>
+            <a:endParaRPr lang="nl-BE"/>
+          </a:p>
+        </p:txBody>
+      </p:sp>
+      <p:sp>
+        <p:nvSpPr>
+          <p:cNvPr id="4" name="Slide Number Placeholder 3"/>
+          <p:cNvSpPr>
+            <a:spLocks noGrp="1"/>
+          </p:cNvSpPr>
+          <p:nvPr>
+            <p:ph type="sldNum" sz="quarter" idx="12"/>
+          </p:nvPr>
+        </p:nvSpPr>
+        <p:spPr/>
+        <p:txBody>
+          <a:bodyPr/>
+          <a:lstStyle/>
+          <a:p>
+            <a:fld id="{6597116C-F94B-4B5B-973A-17F07FB5C418}" type="slidenum">
+              <a:rPr lang="nl-BE" smtClean="0"/>
+              <a:t>41</a:t>
+            </a:fld>
+            <a:endParaRPr lang="nl-BE"/>
+          </a:p>
+        </p:txBody>
+      </p:sp>
+    </p:spTree>
+    <p:extLst>
+      <p:ext uri="{BB962C8B-B14F-4D97-AF65-F5344CB8AC3E}">
+        <p14:creationId xmlns:p14="http://schemas.microsoft.com/office/powerpoint/2010/main" val="3118825235"/>
+      </p:ext>
+    </p:extLst>
+  </p:cSld>
+  <p:clrMapOvr>
+    <a:masterClrMapping/>
+  </p:clrMapOvr>
+  <p:timing>
+    <p:tnLst>
+      <p:par>
+        <p:cTn id="1" dur="indefinite" restart="never" nodeType="tmRoot"/>
+      </p:par>
+    </p:tnLst>
+  </p:timing>
+</p:sld>
+</file>
+
+<file path=ppt/slides/slide42.xml><?xml version="1.0" encoding="utf-8"?>
+<p:sld xmlns:a="http://schemas.openxmlformats.org/drawingml/2006/main" xmlns:r="http://schemas.openxmlformats.org/officeDocument/2006/relationships" xmlns:p="http://schemas.openxmlformats.org/presentationml/2006/main">
+  <p:cSld>
+    <p:spTree>
+      <p:nvGrpSpPr>
+        <p:cNvPr id="1" name=""/>
+        <p:cNvGrpSpPr/>
+        <p:nvPr/>
+      </p:nvGrpSpPr>
+      <p:grpSpPr>
+        <a:xfrm>
+          <a:off x="0" y="0"/>
+          <a:ext cx="0" cy="0"/>
+          <a:chOff x="0" y="0"/>
+          <a:chExt cx="0" cy="0"/>
+        </a:xfrm>
+      </p:grpSpPr>
+      <p:sp>
+        <p:nvSpPr>
+          <p:cNvPr id="2" name="Title 1"/>
+          <p:cNvSpPr>
+            <a:spLocks noGrp="1"/>
+          </p:cNvSpPr>
+          <p:nvPr>
+            <p:ph type="title"/>
+          </p:nvPr>
+        </p:nvSpPr>
+        <p:spPr/>
+        <p:txBody>
+          <a:bodyPr/>
+          <a:lstStyle/>
+          <a:p>
+            <a:r>
+              <a:rPr lang="en-US" dirty="0" smtClean="0"/>
               <a:t>Tools</a:t>
             </a:r>
             <a:endParaRPr lang="en-US" dirty="0"/>
@@ -37642,7 +38281,7 @@
           <a:p>
             <a:fld id="{6597116C-F94B-4B5B-973A-17F07FB5C418}" type="slidenum">
               <a:rPr lang="nl-BE" smtClean="0"/>
-              <a:t>41</a:t>
+              <a:t>42</a:t>
             </a:fld>
             <a:endParaRPr lang="nl-BE"/>
           </a:p>
@@ -38101,7 +38740,7 @@
 </p:sld>
 </file>
 
-<file path=ppt/slides/slide42.xml><?xml version="1.0" encoding="utf-8"?>
+<file path=ppt/slides/slide43.xml><?xml version="1.0" encoding="utf-8"?>
 <p:sld xmlns:a="http://schemas.openxmlformats.org/drawingml/2006/main" xmlns:r="http://schemas.openxmlformats.org/officeDocument/2006/relationships" xmlns:p="http://schemas.openxmlformats.org/presentationml/2006/main">
   <p:cSld>
     <p:spTree>
@@ -39885,7 +40524,7 @@
           <a:p>
             <a:fld id="{6597116C-F94B-4B5B-973A-17F07FB5C418}" type="slidenum">
               <a:rPr lang="nl-BE" smtClean="0"/>
-              <a:t>42</a:t>
+              <a:t>43</a:t>
             </a:fld>
             <a:endParaRPr lang="nl-BE"/>
           </a:p>
@@ -40030,7 +40669,7 @@
 </p:sld>
 </file>
 
-<file path=ppt/slides/slide43.xml><?xml version="1.0" encoding="utf-8"?>
+<file path=ppt/slides/slide44.xml><?xml version="1.0" encoding="utf-8"?>
 <p:sld xmlns:a="http://schemas.openxmlformats.org/drawingml/2006/main" xmlns:r="http://schemas.openxmlformats.org/officeDocument/2006/relationships" xmlns:p="http://schemas.openxmlformats.org/presentationml/2006/main">
   <p:cSld>
     <p:spTree>
@@ -40248,7 +40887,7 @@
           <a:p>
             <a:fld id="{6597116C-F94B-4B5B-973A-17F07FB5C418}" type="slidenum">
               <a:rPr lang="nl-BE" smtClean="0"/>
-              <a:t>43</a:t>
+              <a:t>44</a:t>
             </a:fld>
             <a:endParaRPr lang="nl-BE"/>
           </a:p>

</xml_diff>

<commit_message>
Add double promotion slide
</commit_message>
<xml_diff>
--- a/Optimization/hpc_efficiency.pptx
+++ b/Optimization/hpc_efficiency.pptx
@@ -5,7 +5,7 @@
     <p:sldMasterId id="2147483648" r:id="rId1"/>
   </p:sldMasterIdLst>
   <p:notesMasterIdLst>
-    <p:notesMasterId r:id="rId46"/>
+    <p:notesMasterId r:id="rId47"/>
   </p:notesMasterIdLst>
   <p:sldIdLst>
     <p:sldId id="267" r:id="rId2"/>
@@ -41,17 +41,18 @@
     <p:sldId id="289" r:id="rId32"/>
     <p:sldId id="281" r:id="rId33"/>
     <p:sldId id="304" r:id="rId34"/>
-    <p:sldId id="298" r:id="rId35"/>
-    <p:sldId id="299" r:id="rId36"/>
-    <p:sldId id="300" r:id="rId37"/>
-    <p:sldId id="301" r:id="rId38"/>
-    <p:sldId id="302" r:id="rId39"/>
-    <p:sldId id="287" r:id="rId40"/>
-    <p:sldId id="292" r:id="rId41"/>
-    <p:sldId id="286" r:id="rId42"/>
-    <p:sldId id="297" r:id="rId43"/>
-    <p:sldId id="271" r:id="rId44"/>
-    <p:sldId id="283" r:id="rId45"/>
+    <p:sldId id="305" r:id="rId35"/>
+    <p:sldId id="298" r:id="rId36"/>
+    <p:sldId id="299" r:id="rId37"/>
+    <p:sldId id="300" r:id="rId38"/>
+    <p:sldId id="301" r:id="rId39"/>
+    <p:sldId id="302" r:id="rId40"/>
+    <p:sldId id="287" r:id="rId41"/>
+    <p:sldId id="292" r:id="rId42"/>
+    <p:sldId id="286" r:id="rId43"/>
+    <p:sldId id="297" r:id="rId44"/>
+    <p:sldId id="271" r:id="rId45"/>
+    <p:sldId id="283" r:id="rId46"/>
   </p:sldIdLst>
   <p:sldSz cx="9144000" cy="6858000" type="screen4x3"/>
   <p:notesSz cx="6858000" cy="9144000"/>
@@ -208,6 +209,7 @@
             <p14:sldId id="289"/>
             <p14:sldId id="281"/>
             <p14:sldId id="304"/>
+            <p14:sldId id="305"/>
             <p14:sldId id="298"/>
           </p14:sldIdLst>
         </p14:section>
@@ -8843,7 +8845,7 @@
           <a:graphicData uri="http://schemas.openxmlformats.org/presentationml/2006/ole">
             <mc:AlternateContent xmlns:mc="http://schemas.openxmlformats.org/markup-compatibility/2006">
               <mc:Choice xmlns:v="urn:schemas-microsoft-com:vml" Requires="v">
-                <p:oleObj spid="_x0000_s1210" name="Equation" r:id="rId3" imgW="812520" imgH="393480" progId="Equation.3">
+                <p:oleObj spid="_x0000_s1216" name="Equation" r:id="rId3" imgW="812520" imgH="393480" progId="Equation.3">
                   <p:embed/>
                 </p:oleObj>
               </mc:Choice>
@@ -8900,7 +8902,7 @@
           <a:graphicData uri="http://schemas.openxmlformats.org/presentationml/2006/ole">
             <mc:AlternateContent xmlns:mc="http://schemas.openxmlformats.org/markup-compatibility/2006">
               <mc:Choice xmlns:v="urn:schemas-microsoft-com:vml" Requires="v">
-                <p:oleObj spid="_x0000_s1211" name="Equation" r:id="rId5" imgW="2489040" imgH="431640" progId="Equation.3">
+                <p:oleObj spid="_x0000_s1217" name="Equation" r:id="rId5" imgW="2489040" imgH="431640" progId="Equation.3">
                   <p:embed/>
                 </p:oleObj>
               </mc:Choice>
@@ -19562,7 +19564,7 @@
           <a:graphicData uri="http://schemas.openxmlformats.org/presentationml/2006/ole">
             <mc:AlternateContent xmlns:mc="http://schemas.openxmlformats.org/markup-compatibility/2006">
               <mc:Choice xmlns:v="urn:schemas-microsoft-com:vml" Requires="v">
-                <p:oleObj spid="_x0000_s2201" name="Equation" r:id="rId3" imgW="1091880" imgH="1041120" progId="Equation.3">
+                <p:oleObj spid="_x0000_s2207" name="Equation" r:id="rId3" imgW="1091880" imgH="1041120" progId="Equation.3">
                   <p:embed/>
                 </p:oleObj>
               </mc:Choice>
@@ -20933,7 +20935,7 @@
           <a:graphicData uri="http://schemas.openxmlformats.org/presentationml/2006/ole">
             <mc:AlternateContent xmlns:mc="http://schemas.openxmlformats.org/markup-compatibility/2006">
               <mc:Choice xmlns:v="urn:schemas-microsoft-com:vml" Requires="v">
-                <p:oleObj spid="_x0000_s2202" name="Equation" r:id="rId5" imgW="1091880" imgH="1041120" progId="Equation.3">
+                <p:oleObj spid="_x0000_s2208" name="Equation" r:id="rId5" imgW="1091880" imgH="1041120" progId="Equation.3">
                   <p:embed/>
                 </p:oleObj>
               </mc:Choice>
@@ -27282,7 +27284,7 @@
           <a:graphicData uri="http://schemas.openxmlformats.org/presentationml/2006/ole">
             <mc:AlternateContent xmlns:mc="http://schemas.openxmlformats.org/markup-compatibility/2006">
               <mc:Choice xmlns:v="urn:schemas-microsoft-com:vml" Requires="v">
-                <p:oleObj spid="_x0000_s3113" name="Equation" r:id="rId3" imgW="965160" imgH="228600" progId="Equation.3">
+                <p:oleObj spid="_x0000_s3116" name="Equation" r:id="rId3" imgW="965160" imgH="228600" progId="Equation.3">
                   <p:embed/>
                 </p:oleObj>
               </mc:Choice>
@@ -30225,6 +30227,738 @@
           <a:p>
             <a:r>
               <a:rPr lang="en-US" dirty="0" smtClean="0"/>
+              <a:t>Helpful compiler options</a:t>
+            </a:r>
+            <a:endParaRPr lang="en-US" dirty="0"/>
+          </a:p>
+        </p:txBody>
+      </p:sp>
+      <p:sp>
+        <p:nvSpPr>
+          <p:cNvPr id="3" name="Content Placeholder 2"/>
+          <p:cNvSpPr>
+            <a:spLocks noGrp="1"/>
+          </p:cNvSpPr>
+          <p:nvPr>
+            <p:ph idx="1"/>
+          </p:nvPr>
+        </p:nvSpPr>
+        <p:spPr>
+          <a:xfrm>
+            <a:off x="488179" y="1624012"/>
+            <a:ext cx="8229600" cy="4525963"/>
+          </a:xfrm>
+        </p:spPr>
+        <p:txBody>
+          <a:bodyPr/>
+          <a:lstStyle/>
+          <a:p>
+            <a:r>
+              <a:rPr lang="en-US" dirty="0" smtClean="0"/>
+              <a:t>GCC </a:t>
+            </a:r>
+            <a:r>
+              <a:rPr lang="en-US" dirty="0" err="1" smtClean="0"/>
+              <a:t>gcc</a:t>
+            </a:r>
+            <a:r>
+              <a:rPr lang="en-US" dirty="0" smtClean="0"/>
+              <a:t>/g++</a:t>
+            </a:r>
+          </a:p>
+          <a:p>
+            <a:pPr lvl="1"/>
+            <a:r>
+              <a:rPr lang="en-US" dirty="0" smtClean="0">
+                <a:latin typeface="Courier New" panose="02070309020205020404" pitchFamily="49" charset="0"/>
+                <a:cs typeface="Courier New" panose="02070309020205020404" pitchFamily="49" charset="0"/>
+              </a:rPr>
+              <a:t>-</a:t>
+            </a:r>
+            <a:r>
+              <a:rPr lang="en-US" dirty="0" err="1" smtClean="0">
+                <a:latin typeface="Courier New" panose="02070309020205020404" pitchFamily="49" charset="0"/>
+                <a:cs typeface="Courier New" panose="02070309020205020404" pitchFamily="49" charset="0"/>
+              </a:rPr>
+              <a:t>Wdouble</a:t>
+            </a:r>
+            <a:r>
+              <a:rPr lang="en-US" dirty="0" smtClean="0">
+                <a:latin typeface="Courier New" panose="02070309020205020404" pitchFamily="49" charset="0"/>
+                <a:cs typeface="Courier New" panose="02070309020205020404" pitchFamily="49" charset="0"/>
+              </a:rPr>
+              <a:t>-promotion</a:t>
+            </a:r>
+            <a:endParaRPr lang="en-US" dirty="0">
+              <a:latin typeface="Courier New" panose="02070309020205020404" pitchFamily="49" charset="0"/>
+              <a:cs typeface="Courier New" panose="02070309020205020404" pitchFamily="49" charset="0"/>
+            </a:endParaRPr>
+          </a:p>
+        </p:txBody>
+      </p:sp>
+      <p:sp>
+        <p:nvSpPr>
+          <p:cNvPr id="4" name="Slide Number Placeholder 3"/>
+          <p:cNvSpPr>
+            <a:spLocks noGrp="1"/>
+          </p:cNvSpPr>
+          <p:nvPr>
+            <p:ph type="sldNum" sz="quarter" idx="12"/>
+          </p:nvPr>
+        </p:nvSpPr>
+        <p:spPr/>
+        <p:txBody>
+          <a:bodyPr/>
+          <a:lstStyle/>
+          <a:p>
+            <a:fld id="{6597116C-F94B-4B5B-973A-17F07FB5C418}" type="slidenum">
+              <a:rPr lang="nl-BE" smtClean="0"/>
+              <a:t>34</a:t>
+            </a:fld>
+            <a:endParaRPr lang="nl-BE"/>
+          </a:p>
+        </p:txBody>
+      </p:sp>
+      <p:sp>
+        <p:nvSpPr>
+          <p:cNvPr id="5" name="TextBox 4"/>
+          <p:cNvSpPr txBox="1"/>
+          <p:nvPr/>
+        </p:nvSpPr>
+        <p:spPr>
+          <a:xfrm>
+            <a:off x="1907704" y="2780928"/>
+            <a:ext cx="5009705" cy="923330"/>
+          </a:xfrm>
+          <a:prstGeom prst="rect">
+            <a:avLst/>
+          </a:prstGeom>
+          <a:solidFill>
+            <a:schemeClr val="bg1">
+              <a:lumMod val="85000"/>
+            </a:schemeClr>
+          </a:solidFill>
+          <a:ln>
+            <a:solidFill>
+              <a:schemeClr val="tx1"/>
+            </a:solidFill>
+          </a:ln>
+        </p:spPr>
+        <p:txBody>
+          <a:bodyPr wrap="none" rtlCol="0">
+            <a:spAutoFit/>
+          </a:bodyPr>
+          <a:lstStyle/>
+          <a:p>
+            <a:r>
+              <a:rPr lang="en-US" dirty="0" smtClean="0">
+                <a:latin typeface="Courier New" panose="02070309020205020404" pitchFamily="49" charset="0"/>
+                <a:cs typeface="Courier New" panose="02070309020205020404" pitchFamily="49" charset="0"/>
+              </a:rPr>
+              <a:t>float area(float radius) {</a:t>
+            </a:r>
+          </a:p>
+          <a:p>
+            <a:r>
+              <a:rPr lang="en-US" dirty="0">
+                <a:latin typeface="Courier New" panose="02070309020205020404" pitchFamily="49" charset="0"/>
+                <a:cs typeface="Courier New" panose="02070309020205020404" pitchFamily="49" charset="0"/>
+              </a:rPr>
+              <a:t> </a:t>
+            </a:r>
+            <a:r>
+              <a:rPr lang="en-US" dirty="0" smtClean="0">
+                <a:latin typeface="Courier New" panose="02070309020205020404" pitchFamily="49" charset="0"/>
+                <a:cs typeface="Courier New" panose="02070309020205020404" pitchFamily="49" charset="0"/>
+              </a:rPr>
+              <a:t>   return 3.1425927*radius*radius;</a:t>
+            </a:r>
+          </a:p>
+          <a:p>
+            <a:r>
+              <a:rPr lang="en-US" dirty="0">
+                <a:latin typeface="Courier New" panose="02070309020205020404" pitchFamily="49" charset="0"/>
+                <a:cs typeface="Courier New" panose="02070309020205020404" pitchFamily="49" charset="0"/>
+              </a:rPr>
+              <a:t>}</a:t>
+            </a:r>
+            <a:endParaRPr lang="nl-BE" dirty="0">
+              <a:latin typeface="Courier New" panose="02070309020205020404" pitchFamily="49" charset="0"/>
+              <a:cs typeface="Courier New" panose="02070309020205020404" pitchFamily="49" charset="0"/>
+            </a:endParaRPr>
+          </a:p>
+        </p:txBody>
+      </p:sp>
+      <p:grpSp>
+        <p:nvGrpSpPr>
+          <p:cNvPr id="6" name="Group 5"/>
+          <p:cNvGrpSpPr/>
+          <p:nvPr/>
+        </p:nvGrpSpPr>
+        <p:grpSpPr>
+          <a:xfrm>
+            <a:off x="4686059" y="3389104"/>
+            <a:ext cx="2248885" cy="1017404"/>
+            <a:chOff x="4686059" y="3389104"/>
+            <a:chExt cx="2248885" cy="1017404"/>
+          </a:xfrm>
+        </p:grpSpPr>
+        <p:cxnSp>
+          <p:nvCxnSpPr>
+            <p:cNvPr id="7" name="Straight Arrow Connector 6"/>
+            <p:cNvCxnSpPr>
+              <a:stCxn id="9" idx="0"/>
+            </p:cNvCxnSpPr>
+            <p:nvPr/>
+          </p:nvCxnSpPr>
+          <p:spPr>
+            <a:xfrm flipH="1" flipV="1">
+              <a:off x="5364089" y="3389104"/>
+              <a:ext cx="446413" cy="648072"/>
+            </a:xfrm>
+            <a:prstGeom prst="straightConnector1">
+              <a:avLst/>
+            </a:prstGeom>
+            <a:ln w="19050">
+              <a:solidFill>
+                <a:srgbClr val="C00000"/>
+              </a:solidFill>
+              <a:tailEnd type="stealth" w="lg" len="lg"/>
+            </a:ln>
+          </p:spPr>
+          <p:style>
+            <a:lnRef idx="1">
+              <a:schemeClr val="accent1"/>
+            </a:lnRef>
+            <a:fillRef idx="0">
+              <a:schemeClr val="accent1"/>
+            </a:fillRef>
+            <a:effectRef idx="0">
+              <a:schemeClr val="accent1"/>
+            </a:effectRef>
+            <a:fontRef idx="minor">
+              <a:schemeClr val="tx1"/>
+            </a:fontRef>
+          </p:style>
+        </p:cxnSp>
+        <p:cxnSp>
+          <p:nvCxnSpPr>
+            <p:cNvPr id="8" name="Straight Arrow Connector 7"/>
+            <p:cNvCxnSpPr>
+              <a:stCxn id="9" idx="0"/>
+            </p:cNvCxnSpPr>
+            <p:nvPr/>
+          </p:nvCxnSpPr>
+          <p:spPr>
+            <a:xfrm flipV="1">
+              <a:off x="5810502" y="3389104"/>
+              <a:ext cx="445684" cy="648072"/>
+            </a:xfrm>
+            <a:prstGeom prst="straightConnector1">
+              <a:avLst/>
+            </a:prstGeom>
+            <a:ln w="19050">
+              <a:solidFill>
+                <a:srgbClr val="C00000"/>
+              </a:solidFill>
+              <a:tailEnd type="stealth" w="lg" len="lg"/>
+            </a:ln>
+          </p:spPr>
+          <p:style>
+            <a:lnRef idx="1">
+              <a:schemeClr val="accent1"/>
+            </a:lnRef>
+            <a:fillRef idx="0">
+              <a:schemeClr val="accent1"/>
+            </a:fillRef>
+            <a:effectRef idx="0">
+              <a:schemeClr val="accent1"/>
+            </a:effectRef>
+            <a:fontRef idx="minor">
+              <a:schemeClr val="tx1"/>
+            </a:fontRef>
+          </p:style>
+        </p:cxnSp>
+        <p:sp>
+          <p:nvSpPr>
+            <p:cNvPr id="9" name="TextBox 8"/>
+            <p:cNvSpPr txBox="1"/>
+            <p:nvPr/>
+          </p:nvSpPr>
+          <p:spPr>
+            <a:xfrm>
+              <a:off x="4686059" y="4037176"/>
+              <a:ext cx="2248885" cy="369332"/>
+            </a:xfrm>
+            <a:prstGeom prst="rect">
+              <a:avLst/>
+            </a:prstGeom>
+            <a:noFill/>
+            <a:ln>
+              <a:solidFill>
+                <a:srgbClr val="C00000"/>
+              </a:solidFill>
+            </a:ln>
+          </p:spPr>
+          <p:txBody>
+            <a:bodyPr wrap="none" rtlCol="0">
+              <a:spAutoFit/>
+            </a:bodyPr>
+            <a:lstStyle/>
+            <a:p>
+              <a:r>
+                <a:rPr lang="en-US" dirty="0" smtClean="0">
+                  <a:solidFill>
+                    <a:srgbClr val="C00000"/>
+                  </a:solidFill>
+                </a:rPr>
+                <a:t>Promoted to </a:t>
+              </a:r>
+              <a:r>
+                <a:rPr lang="en-US" dirty="0" smtClean="0">
+                  <a:solidFill>
+                    <a:srgbClr val="C00000"/>
+                  </a:solidFill>
+                  <a:latin typeface="Courier New" panose="02070309020205020404" pitchFamily="49" charset="0"/>
+                  <a:cs typeface="Courier New" panose="02070309020205020404" pitchFamily="49" charset="0"/>
+                </a:rPr>
+                <a:t>double</a:t>
+              </a:r>
+              <a:endParaRPr lang="nl-BE" dirty="0">
+                <a:solidFill>
+                  <a:srgbClr val="C00000"/>
+                </a:solidFill>
+                <a:latin typeface="Courier New" panose="02070309020205020404" pitchFamily="49" charset="0"/>
+                <a:cs typeface="Courier New" panose="02070309020205020404" pitchFamily="49" charset="0"/>
+              </a:endParaRPr>
+            </a:p>
+          </p:txBody>
+        </p:sp>
+      </p:grpSp>
+      <p:sp>
+        <p:nvSpPr>
+          <p:cNvPr id="13" name="TextBox 12"/>
+          <p:cNvSpPr txBox="1"/>
+          <p:nvPr/>
+        </p:nvSpPr>
+        <p:spPr>
+          <a:xfrm>
+            <a:off x="1907704" y="4658097"/>
+            <a:ext cx="5147563" cy="923330"/>
+          </a:xfrm>
+          <a:prstGeom prst="rect">
+            <a:avLst/>
+          </a:prstGeom>
+          <a:solidFill>
+            <a:schemeClr val="bg1">
+              <a:lumMod val="85000"/>
+            </a:schemeClr>
+          </a:solidFill>
+          <a:ln>
+            <a:solidFill>
+              <a:schemeClr val="tx1"/>
+            </a:solidFill>
+          </a:ln>
+        </p:spPr>
+        <p:txBody>
+          <a:bodyPr wrap="none" rtlCol="0">
+            <a:spAutoFit/>
+          </a:bodyPr>
+          <a:lstStyle/>
+          <a:p>
+            <a:r>
+              <a:rPr lang="en-US" dirty="0" smtClean="0">
+                <a:latin typeface="Courier New" panose="02070309020205020404" pitchFamily="49" charset="0"/>
+                <a:cs typeface="Courier New" panose="02070309020205020404" pitchFamily="49" charset="0"/>
+              </a:rPr>
+              <a:t>float area(float radius) {</a:t>
+            </a:r>
+          </a:p>
+          <a:p>
+            <a:r>
+              <a:rPr lang="en-US" dirty="0">
+                <a:latin typeface="Courier New" panose="02070309020205020404" pitchFamily="49" charset="0"/>
+                <a:cs typeface="Courier New" panose="02070309020205020404" pitchFamily="49" charset="0"/>
+              </a:rPr>
+              <a:t> </a:t>
+            </a:r>
+            <a:r>
+              <a:rPr lang="en-US" dirty="0" smtClean="0">
+                <a:latin typeface="Courier New" panose="02070309020205020404" pitchFamily="49" charset="0"/>
+                <a:cs typeface="Courier New" panose="02070309020205020404" pitchFamily="49" charset="0"/>
+              </a:rPr>
+              <a:t>   return 3.1425927f*radius*radius;</a:t>
+            </a:r>
+          </a:p>
+          <a:p>
+            <a:r>
+              <a:rPr lang="en-US" dirty="0">
+                <a:latin typeface="Courier New" panose="02070309020205020404" pitchFamily="49" charset="0"/>
+                <a:cs typeface="Courier New" panose="02070309020205020404" pitchFamily="49" charset="0"/>
+              </a:rPr>
+              <a:t>}</a:t>
+            </a:r>
+            <a:endParaRPr lang="nl-BE" dirty="0">
+              <a:latin typeface="Courier New" panose="02070309020205020404" pitchFamily="49" charset="0"/>
+              <a:cs typeface="Courier New" panose="02070309020205020404" pitchFamily="49" charset="0"/>
+            </a:endParaRPr>
+          </a:p>
+        </p:txBody>
+      </p:sp>
+      <p:grpSp>
+        <p:nvGrpSpPr>
+          <p:cNvPr id="14" name="Group 13"/>
+          <p:cNvGrpSpPr/>
+          <p:nvPr/>
+        </p:nvGrpSpPr>
+        <p:grpSpPr>
+          <a:xfrm>
+            <a:off x="4686059" y="5360348"/>
+            <a:ext cx="1165704" cy="981370"/>
+            <a:chOff x="4686059" y="3425138"/>
+            <a:chExt cx="1165704" cy="981370"/>
+          </a:xfrm>
+        </p:grpSpPr>
+        <p:cxnSp>
+          <p:nvCxnSpPr>
+            <p:cNvPr id="15" name="Straight Arrow Connector 14"/>
+            <p:cNvCxnSpPr>
+              <a:stCxn id="17" idx="0"/>
+            </p:cNvCxnSpPr>
+            <p:nvPr/>
+          </p:nvCxnSpPr>
+          <p:spPr>
+            <a:xfrm flipH="1" flipV="1">
+              <a:off x="5139613" y="3425138"/>
+              <a:ext cx="129298" cy="612038"/>
+            </a:xfrm>
+            <a:prstGeom prst="straightConnector1">
+              <a:avLst/>
+            </a:prstGeom>
+            <a:ln w="19050">
+              <a:solidFill>
+                <a:srgbClr val="00B050"/>
+              </a:solidFill>
+              <a:tailEnd type="stealth" w="lg" len="lg"/>
+            </a:ln>
+          </p:spPr>
+          <p:style>
+            <a:lnRef idx="1">
+              <a:schemeClr val="accent1"/>
+            </a:lnRef>
+            <a:fillRef idx="0">
+              <a:schemeClr val="accent1"/>
+            </a:fillRef>
+            <a:effectRef idx="0">
+              <a:schemeClr val="accent1"/>
+            </a:effectRef>
+            <a:fontRef idx="minor">
+              <a:schemeClr val="tx1"/>
+            </a:fontRef>
+          </p:style>
+        </p:cxnSp>
+        <p:sp>
+          <p:nvSpPr>
+            <p:cNvPr id="17" name="TextBox 16"/>
+            <p:cNvSpPr txBox="1"/>
+            <p:nvPr/>
+          </p:nvSpPr>
+          <p:spPr>
+            <a:xfrm>
+              <a:off x="4686059" y="4037176"/>
+              <a:ext cx="1165704" cy="369332"/>
+            </a:xfrm>
+            <a:prstGeom prst="rect">
+              <a:avLst/>
+            </a:prstGeom>
+            <a:noFill/>
+            <a:ln>
+              <a:solidFill>
+                <a:srgbClr val="00B050"/>
+              </a:solidFill>
+            </a:ln>
+          </p:spPr>
+          <p:txBody>
+            <a:bodyPr wrap="none" rtlCol="0">
+              <a:spAutoFit/>
+            </a:bodyPr>
+            <a:lstStyle/>
+            <a:p>
+              <a:r>
+                <a:rPr lang="en-US" dirty="0" smtClean="0">
+                  <a:solidFill>
+                    <a:srgbClr val="00B050"/>
+                  </a:solidFill>
+                </a:rPr>
+                <a:t>All </a:t>
+              </a:r>
+              <a:r>
+                <a:rPr lang="en-US" dirty="0" smtClean="0">
+                  <a:solidFill>
+                    <a:srgbClr val="00B050"/>
+                  </a:solidFill>
+                  <a:latin typeface="Courier New" panose="02070309020205020404" pitchFamily="49" charset="0"/>
+                  <a:cs typeface="Courier New" panose="02070309020205020404" pitchFamily="49" charset="0"/>
+                </a:rPr>
+                <a:t>float</a:t>
+              </a:r>
+              <a:endParaRPr lang="nl-BE" dirty="0">
+                <a:solidFill>
+                  <a:srgbClr val="00B050"/>
+                </a:solidFill>
+                <a:latin typeface="Courier New" panose="02070309020205020404" pitchFamily="49" charset="0"/>
+                <a:cs typeface="Courier New" panose="02070309020205020404" pitchFamily="49" charset="0"/>
+              </a:endParaRPr>
+            </a:p>
+          </p:txBody>
+        </p:sp>
+      </p:grpSp>
+    </p:spTree>
+    <p:extLst>
+      <p:ext uri="{BB962C8B-B14F-4D97-AF65-F5344CB8AC3E}">
+        <p14:creationId xmlns:p14="http://schemas.microsoft.com/office/powerpoint/2010/main" val="495038373"/>
+      </p:ext>
+    </p:extLst>
+  </p:cSld>
+  <p:clrMapOvr>
+    <a:masterClrMapping/>
+  </p:clrMapOvr>
+  <p:timing>
+    <p:tnLst>
+      <p:par>
+        <p:cTn id="1" dur="indefinite" restart="never" nodeType="tmRoot">
+          <p:childTnLst>
+            <p:seq concurrent="1" nextAc="seek">
+              <p:cTn id="2" dur="indefinite" nodeType="mainSeq">
+                <p:childTnLst>
+                  <p:par>
+                    <p:cTn id="3" fill="hold">
+                      <p:stCondLst>
+                        <p:cond delay="indefinite"/>
+                        <p:cond evt="onBegin" delay="0">
+                          <p:tn val="2"/>
+                        </p:cond>
+                      </p:stCondLst>
+                      <p:childTnLst>
+                        <p:par>
+                          <p:cTn id="4" fill="hold">
+                            <p:stCondLst>
+                              <p:cond delay="0"/>
+                            </p:stCondLst>
+                            <p:childTnLst>
+                              <p:par>
+                                <p:cTn id="5" presetID="1" presetClass="entr" presetSubtype="0" fill="hold" grpId="0" nodeType="withEffect">
+                                  <p:stCondLst>
+                                    <p:cond delay="0"/>
+                                  </p:stCondLst>
+                                  <p:childTnLst>
+                                    <p:set>
+                                      <p:cBhvr>
+                                        <p:cTn id="6" dur="1" fill="hold">
+                                          <p:stCondLst>
+                                            <p:cond delay="0"/>
+                                          </p:stCondLst>
+                                        </p:cTn>
+                                        <p:tgtEl>
+                                          <p:spTgt spid="5"/>
+                                        </p:tgtEl>
+                                        <p:attrNameLst>
+                                          <p:attrName>style.visibility</p:attrName>
+                                        </p:attrNameLst>
+                                      </p:cBhvr>
+                                      <p:to>
+                                        <p:strVal val="visible"/>
+                                      </p:to>
+                                    </p:set>
+                                  </p:childTnLst>
+                                </p:cTn>
+                              </p:par>
+                            </p:childTnLst>
+                          </p:cTn>
+                        </p:par>
+                      </p:childTnLst>
+                    </p:cTn>
+                  </p:par>
+                  <p:par>
+                    <p:cTn id="7" fill="hold">
+                      <p:stCondLst>
+                        <p:cond delay="indefinite"/>
+                      </p:stCondLst>
+                      <p:childTnLst>
+                        <p:par>
+                          <p:cTn id="8" fill="hold">
+                            <p:stCondLst>
+                              <p:cond delay="0"/>
+                            </p:stCondLst>
+                            <p:childTnLst>
+                              <p:par>
+                                <p:cTn id="9" presetID="1" presetClass="entr" presetSubtype="0" fill="hold" nodeType="clickEffect">
+                                  <p:stCondLst>
+                                    <p:cond delay="0"/>
+                                  </p:stCondLst>
+                                  <p:childTnLst>
+                                    <p:set>
+                                      <p:cBhvr>
+                                        <p:cTn id="10" dur="1" fill="hold">
+                                          <p:stCondLst>
+                                            <p:cond delay="0"/>
+                                          </p:stCondLst>
+                                        </p:cTn>
+                                        <p:tgtEl>
+                                          <p:spTgt spid="6"/>
+                                        </p:tgtEl>
+                                        <p:attrNameLst>
+                                          <p:attrName>style.visibility</p:attrName>
+                                        </p:attrNameLst>
+                                      </p:cBhvr>
+                                      <p:to>
+                                        <p:strVal val="visible"/>
+                                      </p:to>
+                                    </p:set>
+                                  </p:childTnLst>
+                                </p:cTn>
+                              </p:par>
+                              <p:par>
+                                <p:cTn id="11" presetID="1" presetClass="entr" presetSubtype="0" fill="hold" grpId="0" nodeType="withEffect">
+                                  <p:stCondLst>
+                                    <p:cond delay="0"/>
+                                  </p:stCondLst>
+                                  <p:childTnLst>
+                                    <p:set>
+                                      <p:cBhvr>
+                                        <p:cTn id="12" dur="1" fill="hold">
+                                          <p:stCondLst>
+                                            <p:cond delay="0"/>
+                                          </p:stCondLst>
+                                        </p:cTn>
+                                        <p:tgtEl>
+                                          <p:spTgt spid="13"/>
+                                        </p:tgtEl>
+                                        <p:attrNameLst>
+                                          <p:attrName>style.visibility</p:attrName>
+                                        </p:attrNameLst>
+                                      </p:cBhvr>
+                                      <p:to>
+                                        <p:strVal val="visible"/>
+                                      </p:to>
+                                    </p:set>
+                                  </p:childTnLst>
+                                </p:cTn>
+                              </p:par>
+                            </p:childTnLst>
+                          </p:cTn>
+                        </p:par>
+                      </p:childTnLst>
+                    </p:cTn>
+                  </p:par>
+                  <p:par>
+                    <p:cTn id="13" fill="hold">
+                      <p:stCondLst>
+                        <p:cond delay="indefinite"/>
+                      </p:stCondLst>
+                      <p:childTnLst>
+                        <p:par>
+                          <p:cTn id="14" fill="hold">
+                            <p:stCondLst>
+                              <p:cond delay="0"/>
+                            </p:stCondLst>
+                            <p:childTnLst>
+                              <p:par>
+                                <p:cTn id="15" presetID="1" presetClass="entr" presetSubtype="0" fill="hold" nodeType="clickEffect">
+                                  <p:stCondLst>
+                                    <p:cond delay="0"/>
+                                  </p:stCondLst>
+                                  <p:childTnLst>
+                                    <p:set>
+                                      <p:cBhvr>
+                                        <p:cTn id="16" dur="1" fill="hold">
+                                          <p:stCondLst>
+                                            <p:cond delay="0"/>
+                                          </p:stCondLst>
+                                        </p:cTn>
+                                        <p:tgtEl>
+                                          <p:spTgt spid="14"/>
+                                        </p:tgtEl>
+                                        <p:attrNameLst>
+                                          <p:attrName>style.visibility</p:attrName>
+                                        </p:attrNameLst>
+                                      </p:cBhvr>
+                                      <p:to>
+                                        <p:strVal val="visible"/>
+                                      </p:to>
+                                    </p:set>
+                                  </p:childTnLst>
+                                </p:cTn>
+                              </p:par>
+                            </p:childTnLst>
+                          </p:cTn>
+                        </p:par>
+                      </p:childTnLst>
+                    </p:cTn>
+                  </p:par>
+                </p:childTnLst>
+              </p:cTn>
+              <p:prevCondLst>
+                <p:cond evt="onPrev" delay="0">
+                  <p:tgtEl>
+                    <p:sldTgt/>
+                  </p:tgtEl>
+                </p:cond>
+              </p:prevCondLst>
+              <p:nextCondLst>
+                <p:cond evt="onNext" delay="0">
+                  <p:tgtEl>
+                    <p:sldTgt/>
+                  </p:tgtEl>
+                </p:cond>
+              </p:nextCondLst>
+            </p:seq>
+          </p:childTnLst>
+        </p:cTn>
+      </p:par>
+    </p:tnLst>
+    <p:bldLst>
+      <p:bldP spid="5" grpId="0" animBg="1"/>
+      <p:bldP spid="13" grpId="0" animBg="1"/>
+    </p:bldLst>
+  </p:timing>
+</p:sld>
+</file>
+
+<file path=ppt/slides/slide35.xml><?xml version="1.0" encoding="utf-8"?>
+<p:sld xmlns:a="http://schemas.openxmlformats.org/drawingml/2006/main" xmlns:r="http://schemas.openxmlformats.org/officeDocument/2006/relationships" xmlns:p="http://schemas.openxmlformats.org/presentationml/2006/main">
+  <p:cSld>
+    <p:spTree>
+      <p:nvGrpSpPr>
+        <p:cNvPr id="1" name=""/>
+        <p:cNvGrpSpPr/>
+        <p:nvPr/>
+      </p:nvGrpSpPr>
+      <p:grpSpPr>
+        <a:xfrm>
+          <a:off x="0" y="0"/>
+          <a:ext cx="0" cy="0"/>
+          <a:chOff x="0" y="0"/>
+          <a:chExt cx="0" cy="0"/>
+        </a:xfrm>
+      </p:grpSpPr>
+      <p:sp>
+        <p:nvSpPr>
+          <p:cNvPr id="2" name="Title 1"/>
+          <p:cNvSpPr>
+            <a:spLocks noGrp="1"/>
+          </p:cNvSpPr>
+          <p:nvPr>
+            <p:ph type="title"/>
+          </p:nvPr>
+        </p:nvSpPr>
+        <p:spPr/>
+        <p:txBody>
+          <a:bodyPr/>
+          <a:lstStyle/>
+          <a:p>
+            <a:r>
+              <a:rPr lang="en-US" dirty="0" smtClean="0"/>
               <a:t>Note of caution</a:t>
             </a:r>
             <a:endParaRPr lang="nl-BE" dirty="0"/>
@@ -30360,7 +31094,7 @@
           <a:p>
             <a:fld id="{6597116C-F94B-4B5B-973A-17F07FB5C418}" type="slidenum">
               <a:rPr lang="nl-BE" smtClean="0"/>
-              <a:t>34</a:t>
+              <a:t>35</a:t>
             </a:fld>
             <a:endParaRPr lang="nl-BE"/>
           </a:p>
@@ -30723,108 +31457,6 @@
 </p:sld>
 </file>
 
-<file path=ppt/slides/slide35.xml><?xml version="1.0" encoding="utf-8"?>
-<p:sld xmlns:a="http://schemas.openxmlformats.org/drawingml/2006/main" xmlns:r="http://schemas.openxmlformats.org/officeDocument/2006/relationships" xmlns:p="http://schemas.openxmlformats.org/presentationml/2006/main">
-  <p:cSld>
-    <p:spTree>
-      <p:nvGrpSpPr>
-        <p:cNvPr id="1" name=""/>
-        <p:cNvGrpSpPr/>
-        <p:nvPr/>
-      </p:nvGrpSpPr>
-      <p:grpSpPr>
-        <a:xfrm>
-          <a:off x="0" y="0"/>
-          <a:ext cx="0" cy="0"/>
-          <a:chOff x="0" y="0"/>
-          <a:chExt cx="0" cy="0"/>
-        </a:xfrm>
-      </p:grpSpPr>
-      <p:sp>
-        <p:nvSpPr>
-          <p:cNvPr id="2" name="Title 1"/>
-          <p:cNvSpPr>
-            <a:spLocks noGrp="1"/>
-          </p:cNvSpPr>
-          <p:nvPr>
-            <p:ph type="title"/>
-          </p:nvPr>
-        </p:nvSpPr>
-        <p:spPr/>
-        <p:txBody>
-          <a:bodyPr/>
-          <a:lstStyle/>
-          <a:p>
-            <a:r>
-              <a:rPr lang="en-US" dirty="0" smtClean="0"/>
-              <a:t>Multithreading: false sharing</a:t>
-            </a:r>
-            <a:endParaRPr lang="en-US" dirty="0"/>
-          </a:p>
-        </p:txBody>
-      </p:sp>
-      <p:sp>
-        <p:nvSpPr>
-          <p:cNvPr id="3" name="Text Placeholder 2"/>
-          <p:cNvSpPr>
-            <a:spLocks noGrp="1"/>
-          </p:cNvSpPr>
-          <p:nvPr>
-            <p:ph type="body" idx="1"/>
-          </p:nvPr>
-        </p:nvSpPr>
-        <p:spPr/>
-        <p:txBody>
-          <a:bodyPr/>
-          <a:lstStyle/>
-          <a:p>
-            <a:endParaRPr lang="en-US"/>
-          </a:p>
-        </p:txBody>
-      </p:sp>
-      <p:sp>
-        <p:nvSpPr>
-          <p:cNvPr id="4" name="Slide Number Placeholder 3"/>
-          <p:cNvSpPr>
-            <a:spLocks noGrp="1"/>
-          </p:cNvSpPr>
-          <p:nvPr>
-            <p:ph type="sldNum" sz="quarter" idx="12"/>
-          </p:nvPr>
-        </p:nvSpPr>
-        <p:spPr/>
-        <p:txBody>
-          <a:bodyPr/>
-          <a:lstStyle/>
-          <a:p>
-            <a:fld id="{6597116C-F94B-4B5B-973A-17F07FB5C418}" type="slidenum">
-              <a:rPr lang="nl-BE" smtClean="0"/>
-              <a:t>35</a:t>
-            </a:fld>
-            <a:endParaRPr lang="nl-BE"/>
-          </a:p>
-        </p:txBody>
-      </p:sp>
-    </p:spTree>
-    <p:extLst>
-      <p:ext uri="{BB962C8B-B14F-4D97-AF65-F5344CB8AC3E}">
-        <p14:creationId xmlns:p14="http://schemas.microsoft.com/office/powerpoint/2010/main" val="3424948925"/>
-      </p:ext>
-    </p:extLst>
-  </p:cSld>
-  <p:clrMapOvr>
-    <a:masterClrMapping/>
-  </p:clrMapOvr>
-  <p:timing>
-    <p:tnLst>
-      <p:par>
-        <p:cTn id="1" dur="indefinite" restart="never" nodeType="tmRoot"/>
-      </p:par>
-    </p:tnLst>
-  </p:timing>
-</p:sld>
-</file>
-
 <file path=ppt/slides/slide36.xml><?xml version="1.0" encoding="utf-8"?>
 <p:sld xmlns:a="http://schemas.openxmlformats.org/drawingml/2006/main" xmlns:r="http://schemas.openxmlformats.org/officeDocument/2006/relationships" xmlns:p="http://schemas.openxmlformats.org/presentationml/2006/main">
   <p:cSld>
@@ -30859,9 +31491,28 @@
           <a:p>
             <a:r>
               <a:rPr lang="en-US" dirty="0" smtClean="0"/>
-              <a:t>Cache lines, again</a:t>
+              <a:t>Multithreading: false sharing</a:t>
             </a:r>
             <a:endParaRPr lang="en-US" dirty="0"/>
+          </a:p>
+        </p:txBody>
+      </p:sp>
+      <p:sp>
+        <p:nvSpPr>
+          <p:cNvPr id="3" name="Text Placeholder 2"/>
+          <p:cNvSpPr>
+            <a:spLocks noGrp="1"/>
+          </p:cNvSpPr>
+          <p:nvPr>
+            <p:ph type="body" idx="1"/>
+          </p:nvPr>
+        </p:nvSpPr>
+        <p:spPr/>
+        <p:txBody>
+          <a:bodyPr/>
+          <a:lstStyle/>
+          <a:p>
+            <a:endParaRPr lang="en-US"/>
           </a:p>
         </p:txBody>
       </p:sp>
@@ -30883,6 +31534,89 @@
             <a:fld id="{6597116C-F94B-4B5B-973A-17F07FB5C418}" type="slidenum">
               <a:rPr lang="nl-BE" smtClean="0"/>
               <a:t>36</a:t>
+            </a:fld>
+            <a:endParaRPr lang="nl-BE"/>
+          </a:p>
+        </p:txBody>
+      </p:sp>
+    </p:spTree>
+    <p:extLst>
+      <p:ext uri="{BB962C8B-B14F-4D97-AF65-F5344CB8AC3E}">
+        <p14:creationId xmlns:p14="http://schemas.microsoft.com/office/powerpoint/2010/main" val="3424948925"/>
+      </p:ext>
+    </p:extLst>
+  </p:cSld>
+  <p:clrMapOvr>
+    <a:masterClrMapping/>
+  </p:clrMapOvr>
+  <p:timing>
+    <p:tnLst>
+      <p:par>
+        <p:cTn id="1" dur="indefinite" restart="never" nodeType="tmRoot"/>
+      </p:par>
+    </p:tnLst>
+  </p:timing>
+</p:sld>
+</file>
+
+<file path=ppt/slides/slide37.xml><?xml version="1.0" encoding="utf-8"?>
+<p:sld xmlns:a="http://schemas.openxmlformats.org/drawingml/2006/main" xmlns:r="http://schemas.openxmlformats.org/officeDocument/2006/relationships" xmlns:p="http://schemas.openxmlformats.org/presentationml/2006/main">
+  <p:cSld>
+    <p:spTree>
+      <p:nvGrpSpPr>
+        <p:cNvPr id="1" name=""/>
+        <p:cNvGrpSpPr/>
+        <p:nvPr/>
+      </p:nvGrpSpPr>
+      <p:grpSpPr>
+        <a:xfrm>
+          <a:off x="0" y="0"/>
+          <a:ext cx="0" cy="0"/>
+          <a:chOff x="0" y="0"/>
+          <a:chExt cx="0" cy="0"/>
+        </a:xfrm>
+      </p:grpSpPr>
+      <p:sp>
+        <p:nvSpPr>
+          <p:cNvPr id="2" name="Title 1"/>
+          <p:cNvSpPr>
+            <a:spLocks noGrp="1"/>
+          </p:cNvSpPr>
+          <p:nvPr>
+            <p:ph type="title"/>
+          </p:nvPr>
+        </p:nvSpPr>
+        <p:spPr/>
+        <p:txBody>
+          <a:bodyPr/>
+          <a:lstStyle/>
+          <a:p>
+            <a:r>
+              <a:rPr lang="en-US" dirty="0" smtClean="0"/>
+              <a:t>Cache lines, again</a:t>
+            </a:r>
+            <a:endParaRPr lang="en-US" dirty="0"/>
+          </a:p>
+        </p:txBody>
+      </p:sp>
+      <p:sp>
+        <p:nvSpPr>
+          <p:cNvPr id="4" name="Slide Number Placeholder 3"/>
+          <p:cNvSpPr>
+            <a:spLocks noGrp="1"/>
+          </p:cNvSpPr>
+          <p:nvPr>
+            <p:ph type="sldNum" sz="quarter" idx="12"/>
+          </p:nvPr>
+        </p:nvSpPr>
+        <p:spPr/>
+        <p:txBody>
+          <a:bodyPr/>
+          <a:lstStyle/>
+          <a:p>
+            <a:fld id="{6597116C-F94B-4B5B-973A-17F07FB5C418}" type="slidenum">
+              <a:rPr lang="nl-BE" smtClean="0"/>
+              <a:t>37</a:t>
             </a:fld>
             <a:endParaRPr lang="nl-BE"/>
           </a:p>
@@ -35557,7 +36291,7 @@
 </p:sld>
 </file>
 
-<file path=ppt/slides/slide37.xml><?xml version="1.0" encoding="utf-8"?>
+<file path=ppt/slides/slide38.xml><?xml version="1.0" encoding="utf-8"?>
 <p:sld xmlns:a="http://schemas.openxmlformats.org/drawingml/2006/main" xmlns:r="http://schemas.openxmlformats.org/officeDocument/2006/relationships" xmlns:p="http://schemas.openxmlformats.org/presentationml/2006/main">
   <p:cSld>
     <p:spTree>
@@ -35702,7 +36436,7 @@
           <a:p>
             <a:fld id="{6597116C-F94B-4B5B-973A-17F07FB5C418}" type="slidenum">
               <a:rPr lang="nl-BE" smtClean="0"/>
-              <a:t>37</a:t>
+              <a:t>38</a:t>
             </a:fld>
             <a:endParaRPr lang="nl-BE"/>
           </a:p>
@@ -36170,7 +36904,7 @@
 </p:sld>
 </file>
 
-<file path=ppt/slides/slide38.xml><?xml version="1.0" encoding="utf-8"?>
+<file path=ppt/slides/slide39.xml><?xml version="1.0" encoding="utf-8"?>
 <p:sld xmlns:a="http://schemas.openxmlformats.org/drawingml/2006/main" xmlns:r="http://schemas.openxmlformats.org/officeDocument/2006/relationships" xmlns:p="http://schemas.openxmlformats.org/presentationml/2006/main">
   <p:cSld>
     <p:spTree>
@@ -36556,7 +37290,7 @@
           <a:p>
             <a:fld id="{6597116C-F94B-4B5B-973A-17F07FB5C418}" type="slidenum">
               <a:rPr lang="nl-BE" smtClean="0"/>
-              <a:t>38</a:t>
+              <a:t>39</a:t>
             </a:fld>
             <a:endParaRPr lang="nl-BE"/>
           </a:p>
@@ -36995,108 +37729,6 @@
       <p:bldP spid="3" grpId="0" uiExpand="1" build="p"/>
       <p:bldP spid="5" grpId="0" animBg="1"/>
     </p:bldLst>
-  </p:timing>
-</p:sld>
-</file>
-
-<file path=ppt/slides/slide39.xml><?xml version="1.0" encoding="utf-8"?>
-<p:sld xmlns:a="http://schemas.openxmlformats.org/drawingml/2006/main" xmlns:r="http://schemas.openxmlformats.org/officeDocument/2006/relationships" xmlns:p="http://schemas.openxmlformats.org/presentationml/2006/main">
-  <p:cSld>
-    <p:spTree>
-      <p:nvGrpSpPr>
-        <p:cNvPr id="1" name=""/>
-        <p:cNvGrpSpPr/>
-        <p:nvPr/>
-      </p:nvGrpSpPr>
-      <p:grpSpPr>
-        <a:xfrm>
-          <a:off x="0" y="0"/>
-          <a:ext cx="0" cy="0"/>
-          <a:chOff x="0" y="0"/>
-          <a:chExt cx="0" cy="0"/>
-        </a:xfrm>
-      </p:grpSpPr>
-      <p:sp>
-        <p:nvSpPr>
-          <p:cNvPr id="2" name="Title 1"/>
-          <p:cNvSpPr>
-            <a:spLocks noGrp="1"/>
-          </p:cNvSpPr>
-          <p:nvPr>
-            <p:ph type="title"/>
-          </p:nvPr>
-        </p:nvSpPr>
-        <p:spPr/>
-        <p:txBody>
-          <a:bodyPr/>
-          <a:lstStyle/>
-          <a:p>
-            <a:r>
-              <a:rPr lang="en-US" dirty="0" smtClean="0"/>
-              <a:t>Conclusion</a:t>
-            </a:r>
-            <a:endParaRPr lang="nl-BE" dirty="0"/>
-          </a:p>
-        </p:txBody>
-      </p:sp>
-      <p:sp>
-        <p:nvSpPr>
-          <p:cNvPr id="3" name="Text Placeholder 2"/>
-          <p:cNvSpPr>
-            <a:spLocks noGrp="1"/>
-          </p:cNvSpPr>
-          <p:nvPr>
-            <p:ph type="body" idx="1"/>
-          </p:nvPr>
-        </p:nvSpPr>
-        <p:spPr/>
-        <p:txBody>
-          <a:bodyPr/>
-          <a:lstStyle/>
-          <a:p>
-            <a:endParaRPr lang="nl-BE"/>
-          </a:p>
-        </p:txBody>
-      </p:sp>
-      <p:sp>
-        <p:nvSpPr>
-          <p:cNvPr id="4" name="Slide Number Placeholder 3"/>
-          <p:cNvSpPr>
-            <a:spLocks noGrp="1"/>
-          </p:cNvSpPr>
-          <p:nvPr>
-            <p:ph type="sldNum" sz="quarter" idx="12"/>
-          </p:nvPr>
-        </p:nvSpPr>
-        <p:spPr/>
-        <p:txBody>
-          <a:bodyPr/>
-          <a:lstStyle/>
-          <a:p>
-            <a:fld id="{6597116C-F94B-4B5B-973A-17F07FB5C418}" type="slidenum">
-              <a:rPr lang="nl-BE" smtClean="0"/>
-              <a:t>39</a:t>
-            </a:fld>
-            <a:endParaRPr lang="nl-BE"/>
-          </a:p>
-        </p:txBody>
-      </p:sp>
-    </p:spTree>
-    <p:extLst>
-      <p:ext uri="{BB962C8B-B14F-4D97-AF65-F5344CB8AC3E}">
-        <p14:creationId xmlns:p14="http://schemas.microsoft.com/office/powerpoint/2010/main" val="1387657132"/>
-      </p:ext>
-    </p:extLst>
-  </p:cSld>
-  <p:clrMapOvr>
-    <a:masterClrMapping/>
-  </p:clrMapOvr>
-  <p:timing>
-    <p:tnLst>
-      <p:par>
-        <p:cTn id="1" dur="indefinite" restart="never" nodeType="tmRoot"/>
-      </p:par>
-    </p:tnLst>
   </p:timing>
 </p:sld>
 </file>
@@ -37833,7 +38465,7 @@
       </p:grpSpPr>
       <p:sp>
         <p:nvSpPr>
-          <p:cNvPr id="5" name="Title 4"/>
+          <p:cNvPr id="2" name="Title 1"/>
           <p:cNvSpPr>
             <a:spLocks noGrp="1"/>
           </p:cNvSpPr>
@@ -37848,7 +38480,7 @@
           <a:p>
             <a:r>
               <a:rPr lang="en-US" dirty="0" smtClean="0"/>
-              <a:t>Useful references</a:t>
+              <a:t>Conclusion</a:t>
             </a:r>
             <a:endParaRPr lang="nl-BE" dirty="0"/>
           </a:p>
@@ -37856,119 +38488,20 @@
       </p:sp>
       <p:sp>
         <p:nvSpPr>
-          <p:cNvPr id="6" name="Content Placeholder 5"/>
+          <p:cNvPr id="3" name="Text Placeholder 2"/>
           <p:cNvSpPr>
             <a:spLocks noGrp="1"/>
           </p:cNvSpPr>
           <p:nvPr>
-            <p:ph idx="1"/>
+            <p:ph type="body" idx="1"/>
           </p:nvPr>
         </p:nvSpPr>
         <p:spPr/>
         <p:txBody>
-          <a:bodyPr>
-            <a:normAutofit fontScale="85000" lnSpcReduction="10000"/>
-          </a:bodyPr>
+          <a:bodyPr/>
           <a:lstStyle/>
           <a:p>
-            <a:r>
-              <a:rPr lang="en-US" dirty="0" smtClean="0">
-                <a:hlinkClick r:id="rId2"/>
-              </a:rPr>
-              <a:t>Gallery of processor cache effects</a:t>
-            </a:r>
-            <a:endParaRPr lang="en-US" dirty="0" smtClean="0"/>
-          </a:p>
-          <a:p>
-            <a:r>
-              <a:rPr lang="en-US" dirty="0">
-                <a:hlinkClick r:id="rId3"/>
-              </a:rPr>
-              <a:t>Avoiding and Identifying False Sharing Among </a:t>
-            </a:r>
-            <a:r>
-              <a:rPr lang="en-US" dirty="0" smtClean="0">
-                <a:hlinkClick r:id="rId3"/>
-              </a:rPr>
-              <a:t>Threads</a:t>
-            </a:r>
-            <a:endParaRPr lang="en-US" dirty="0" smtClean="0"/>
-          </a:p>
-          <a:p>
-            <a:r>
-              <a:rPr lang="en-US" dirty="0" smtClean="0"/>
-              <a:t>Vectorization</a:t>
-            </a:r>
-          </a:p>
-          <a:p>
-            <a:pPr lvl="1"/>
-            <a:r>
-              <a:rPr lang="en-US" dirty="0" smtClean="0">
-                <a:hlinkClick r:id="rId4"/>
-              </a:rPr>
-              <a:t>A guide to vectorization with Intel C++ compilers</a:t>
-            </a:r>
-            <a:endParaRPr lang="en-US" dirty="0" smtClean="0"/>
-          </a:p>
-          <a:p>
-            <a:pPr lvl="1"/>
-            <a:r>
-              <a:rPr lang="en-US" dirty="0" smtClean="0">
-                <a:hlinkClick r:id="rId5"/>
-              </a:rPr>
-              <a:t>Auto-vectorization with </a:t>
-            </a:r>
-            <a:r>
-              <a:rPr lang="en-US" dirty="0" err="1" smtClean="0">
-                <a:hlinkClick r:id="rId5"/>
-              </a:rPr>
-              <a:t>gcc</a:t>
-            </a:r>
-            <a:r>
-              <a:rPr lang="en-US" dirty="0" smtClean="0">
-                <a:hlinkClick r:id="rId5"/>
-              </a:rPr>
-              <a:t> 4.7</a:t>
-            </a:r>
-            <a:endParaRPr lang="en-US" dirty="0" smtClean="0"/>
-          </a:p>
-          <a:p>
-            <a:r>
-              <a:rPr lang="en-US" dirty="0"/>
-              <a:t>Introduction to High Performance Computing for Scientists and </a:t>
-            </a:r>
-            <a:r>
-              <a:rPr lang="en-US" dirty="0" smtClean="0"/>
-              <a:t>Engineers</a:t>
-            </a:r>
-            <a:r>
-              <a:rPr lang="nl-BE" dirty="0" smtClean="0"/>
-              <a:t/>
-            </a:r>
-            <a:br>
-              <a:rPr lang="nl-BE" dirty="0" smtClean="0"/>
-            </a:br>
-            <a:r>
-              <a:rPr lang="nl-BE" dirty="0" smtClean="0"/>
-              <a:t>Georg Hager &amp; Gerhard Wellein</a:t>
-            </a:r>
-            <a:br>
-              <a:rPr lang="nl-BE" dirty="0" smtClean="0"/>
-            </a:br>
-            <a:r>
-              <a:rPr lang="nl-BE" dirty="0" smtClean="0"/>
-              <a:t>Chapman &amp; Hall, 2010</a:t>
-            </a:r>
-            <a:endParaRPr lang="en-US" b="1" dirty="0"/>
-          </a:p>
-          <a:p>
-            <a:r>
-              <a:rPr lang="en-US" dirty="0" smtClean="0">
-                <a:hlinkClick r:id="rId6"/>
-              </a:rPr>
-              <a:t>Why has CPU frequency ceased to grow?</a:t>
-            </a:r>
-            <a:endParaRPr lang="nl-BE" dirty="0" smtClean="0"/>
+            <a:endParaRPr lang="nl-BE"/>
           </a:p>
         </p:txBody>
       </p:sp>
@@ -37998,7 +38531,7 @@
     </p:spTree>
     <p:extLst>
       <p:ext uri="{BB962C8B-B14F-4D97-AF65-F5344CB8AC3E}">
-        <p14:creationId xmlns:p14="http://schemas.microsoft.com/office/powerpoint/2010/main" val="2653023660"/>
+        <p14:creationId xmlns:p14="http://schemas.microsoft.com/office/powerpoint/2010/main" val="1387657132"/>
       </p:ext>
     </p:extLst>
   </p:cSld>
@@ -38034,7 +38567,7 @@
       </p:grpSpPr>
       <p:sp>
         <p:nvSpPr>
-          <p:cNvPr id="2" name="Title 1"/>
+          <p:cNvPr id="5" name="Title 4"/>
           <p:cNvSpPr>
             <a:spLocks noGrp="1"/>
           </p:cNvSpPr>
@@ -38049,7 +38582,7 @@
           <a:p>
             <a:r>
               <a:rPr lang="en-US" dirty="0" smtClean="0"/>
-              <a:t>Appendix</a:t>
+              <a:t>Useful references</a:t>
             </a:r>
             <a:endParaRPr lang="nl-BE" dirty="0"/>
           </a:p>
@@ -38057,20 +38590,119 @@
       </p:sp>
       <p:sp>
         <p:nvSpPr>
-          <p:cNvPr id="3" name="Text Placeholder 2"/>
+          <p:cNvPr id="6" name="Content Placeholder 5"/>
           <p:cNvSpPr>
             <a:spLocks noGrp="1"/>
           </p:cNvSpPr>
           <p:nvPr>
-            <p:ph type="body" idx="1"/>
+            <p:ph idx="1"/>
           </p:nvPr>
         </p:nvSpPr>
         <p:spPr/>
         <p:txBody>
-          <a:bodyPr/>
+          <a:bodyPr>
+            <a:normAutofit fontScale="85000" lnSpcReduction="10000"/>
+          </a:bodyPr>
           <a:lstStyle/>
           <a:p>
-            <a:endParaRPr lang="nl-BE"/>
+            <a:r>
+              <a:rPr lang="en-US" dirty="0" smtClean="0">
+                <a:hlinkClick r:id="rId2"/>
+              </a:rPr>
+              <a:t>Gallery of processor cache effects</a:t>
+            </a:r>
+            <a:endParaRPr lang="en-US" dirty="0" smtClean="0"/>
+          </a:p>
+          <a:p>
+            <a:r>
+              <a:rPr lang="en-US" dirty="0">
+                <a:hlinkClick r:id="rId3"/>
+              </a:rPr>
+              <a:t>Avoiding and Identifying False Sharing Among </a:t>
+            </a:r>
+            <a:r>
+              <a:rPr lang="en-US" dirty="0" smtClean="0">
+                <a:hlinkClick r:id="rId3"/>
+              </a:rPr>
+              <a:t>Threads</a:t>
+            </a:r>
+            <a:endParaRPr lang="en-US" dirty="0" smtClean="0"/>
+          </a:p>
+          <a:p>
+            <a:r>
+              <a:rPr lang="en-US" dirty="0" smtClean="0"/>
+              <a:t>Vectorization</a:t>
+            </a:r>
+          </a:p>
+          <a:p>
+            <a:pPr lvl="1"/>
+            <a:r>
+              <a:rPr lang="en-US" dirty="0" smtClean="0">
+                <a:hlinkClick r:id="rId4"/>
+              </a:rPr>
+              <a:t>A guide to vectorization with Intel C++ compilers</a:t>
+            </a:r>
+            <a:endParaRPr lang="en-US" dirty="0" smtClean="0"/>
+          </a:p>
+          <a:p>
+            <a:pPr lvl="1"/>
+            <a:r>
+              <a:rPr lang="en-US" dirty="0" smtClean="0">
+                <a:hlinkClick r:id="rId5"/>
+              </a:rPr>
+              <a:t>Auto-vectorization with </a:t>
+            </a:r>
+            <a:r>
+              <a:rPr lang="en-US" dirty="0" err="1" smtClean="0">
+                <a:hlinkClick r:id="rId5"/>
+              </a:rPr>
+              <a:t>gcc</a:t>
+            </a:r>
+            <a:r>
+              <a:rPr lang="en-US" dirty="0" smtClean="0">
+                <a:hlinkClick r:id="rId5"/>
+              </a:rPr>
+              <a:t> 4.7</a:t>
+            </a:r>
+            <a:endParaRPr lang="en-US" dirty="0" smtClean="0"/>
+          </a:p>
+          <a:p>
+            <a:r>
+              <a:rPr lang="en-US" dirty="0"/>
+              <a:t>Introduction to High Performance Computing for Scientists and </a:t>
+            </a:r>
+            <a:r>
+              <a:rPr lang="en-US" dirty="0" smtClean="0"/>
+              <a:t>Engineers</a:t>
+            </a:r>
+            <a:r>
+              <a:rPr lang="nl-BE" dirty="0" smtClean="0"/>
+              <a:t/>
+            </a:r>
+            <a:br>
+              <a:rPr lang="nl-BE" dirty="0" smtClean="0"/>
+            </a:br>
+            <a:r>
+              <a:rPr lang="nl-BE" dirty="0" smtClean="0"/>
+              <a:t>Georg Hager &amp; Gerhard Wellein</a:t>
+            </a:r>
+            <a:br>
+              <a:rPr lang="nl-BE" dirty="0" smtClean="0"/>
+            </a:br>
+            <a:r>
+              <a:rPr lang="nl-BE" dirty="0" smtClean="0"/>
+              <a:t>Chapman &amp; Hall, 2010</a:t>
+            </a:r>
+            <a:endParaRPr lang="en-US" b="1" dirty="0"/>
+          </a:p>
+          <a:p>
+            <a:r>
+              <a:rPr lang="en-US" dirty="0" smtClean="0">
+                <a:hlinkClick r:id="rId6"/>
+              </a:rPr>
+              <a:t>Why has CPU frequency ceased to grow?</a:t>
+            </a:r>
+            <a:endParaRPr lang="nl-BE" dirty="0" smtClean="0"/>
           </a:p>
         </p:txBody>
       </p:sp>
@@ -38100,7 +38732,7 @@
     </p:spTree>
     <p:extLst>
       <p:ext uri="{BB962C8B-B14F-4D97-AF65-F5344CB8AC3E}">
-        <p14:creationId xmlns:p14="http://schemas.microsoft.com/office/powerpoint/2010/main" val="3118825235"/>
+        <p14:creationId xmlns:p14="http://schemas.microsoft.com/office/powerpoint/2010/main" val="2653023660"/>
       </p:ext>
     </p:extLst>
   </p:cSld>
@@ -38151,6 +38783,108 @@
           <a:p>
             <a:r>
               <a:rPr lang="en-US" dirty="0" smtClean="0"/>
+              <a:t>Appendix</a:t>
+            </a:r>
+            <a:endParaRPr lang="nl-BE" dirty="0"/>
+          </a:p>
+        </p:txBody>
+      </p:sp>
+      <p:sp>
+        <p:nvSpPr>
+          <p:cNvPr id="3" name="Text Placeholder 2"/>
+          <p:cNvSpPr>
+            <a:spLocks noGrp="1"/>
+          </p:cNvSpPr>
+          <p:nvPr>
+            <p:ph type="body" idx="1"/>
+          </p:nvPr>
+        </p:nvSpPr>
+        <p:spPr/>
+        <p:txBody>
+          <a:bodyPr/>
+          <a:lstStyle/>
+          <a:p>
+            <a:endParaRPr lang="nl-BE"/>
+          </a:p>
+        </p:txBody>
+      </p:sp>
+      <p:sp>
+        <p:nvSpPr>
+          <p:cNvPr id="4" name="Slide Number Placeholder 3"/>
+          <p:cNvSpPr>
+            <a:spLocks noGrp="1"/>
+          </p:cNvSpPr>
+          <p:nvPr>
+            <p:ph type="sldNum" sz="quarter" idx="12"/>
+          </p:nvPr>
+        </p:nvSpPr>
+        <p:spPr/>
+        <p:txBody>
+          <a:bodyPr/>
+          <a:lstStyle/>
+          <a:p>
+            <a:fld id="{6597116C-F94B-4B5B-973A-17F07FB5C418}" type="slidenum">
+              <a:rPr lang="nl-BE" smtClean="0"/>
+              <a:t>42</a:t>
+            </a:fld>
+            <a:endParaRPr lang="nl-BE"/>
+          </a:p>
+        </p:txBody>
+      </p:sp>
+    </p:spTree>
+    <p:extLst>
+      <p:ext uri="{BB962C8B-B14F-4D97-AF65-F5344CB8AC3E}">
+        <p14:creationId xmlns:p14="http://schemas.microsoft.com/office/powerpoint/2010/main" val="3118825235"/>
+      </p:ext>
+    </p:extLst>
+  </p:cSld>
+  <p:clrMapOvr>
+    <a:masterClrMapping/>
+  </p:clrMapOvr>
+  <p:timing>
+    <p:tnLst>
+      <p:par>
+        <p:cTn id="1" dur="indefinite" restart="never" nodeType="tmRoot"/>
+      </p:par>
+    </p:tnLst>
+  </p:timing>
+</p:sld>
+</file>
+
+<file path=ppt/slides/slide43.xml><?xml version="1.0" encoding="utf-8"?>
+<p:sld xmlns:a="http://schemas.openxmlformats.org/drawingml/2006/main" xmlns:r="http://schemas.openxmlformats.org/officeDocument/2006/relationships" xmlns:p="http://schemas.openxmlformats.org/presentationml/2006/main">
+  <p:cSld>
+    <p:spTree>
+      <p:nvGrpSpPr>
+        <p:cNvPr id="1" name=""/>
+        <p:cNvGrpSpPr/>
+        <p:nvPr/>
+      </p:nvGrpSpPr>
+      <p:grpSpPr>
+        <a:xfrm>
+          <a:off x="0" y="0"/>
+          <a:ext cx="0" cy="0"/>
+          <a:chOff x="0" y="0"/>
+          <a:chExt cx="0" cy="0"/>
+        </a:xfrm>
+      </p:grpSpPr>
+      <p:sp>
+        <p:nvSpPr>
+          <p:cNvPr id="2" name="Title 1"/>
+          <p:cNvSpPr>
+            <a:spLocks noGrp="1"/>
+          </p:cNvSpPr>
+          <p:nvPr>
+            <p:ph type="title"/>
+          </p:nvPr>
+        </p:nvSpPr>
+        <p:spPr/>
+        <p:txBody>
+          <a:bodyPr/>
+          <a:lstStyle/>
+          <a:p>
+            <a:r>
+              <a:rPr lang="en-US" dirty="0" smtClean="0"/>
               <a:t>Tools</a:t>
             </a:r>
             <a:endParaRPr lang="en-US" dirty="0"/>
@@ -38281,7 +39015,7 @@
           <a:p>
             <a:fld id="{6597116C-F94B-4B5B-973A-17F07FB5C418}" type="slidenum">
               <a:rPr lang="nl-BE" smtClean="0"/>
-              <a:t>42</a:t>
+              <a:t>43</a:t>
             </a:fld>
             <a:endParaRPr lang="nl-BE"/>
           </a:p>
@@ -38740,7 +39474,7 @@
 </p:sld>
 </file>
 
-<file path=ppt/slides/slide43.xml><?xml version="1.0" encoding="utf-8"?>
+<file path=ppt/slides/slide44.xml><?xml version="1.0" encoding="utf-8"?>
 <p:sld xmlns:a="http://schemas.openxmlformats.org/drawingml/2006/main" xmlns:r="http://schemas.openxmlformats.org/officeDocument/2006/relationships" xmlns:p="http://schemas.openxmlformats.org/presentationml/2006/main">
   <p:cSld>
     <p:spTree>
@@ -40524,7 +41258,7 @@
           <a:p>
             <a:fld id="{6597116C-F94B-4B5B-973A-17F07FB5C418}" type="slidenum">
               <a:rPr lang="nl-BE" smtClean="0"/>
-              <a:t>43</a:t>
+              <a:t>44</a:t>
             </a:fld>
             <a:endParaRPr lang="nl-BE"/>
           </a:p>
@@ -40669,7 +41403,7 @@
 </p:sld>
 </file>
 
-<file path=ppt/slides/slide44.xml><?xml version="1.0" encoding="utf-8"?>
+<file path=ppt/slides/slide45.xml><?xml version="1.0" encoding="utf-8"?>
 <p:sld xmlns:a="http://schemas.openxmlformats.org/drawingml/2006/main" xmlns:r="http://schemas.openxmlformats.org/officeDocument/2006/relationships" xmlns:p="http://schemas.openxmlformats.org/presentationml/2006/main">
   <p:cSld>
     <p:spTree>
@@ -40887,7 +41621,7 @@
           <a:p>
             <a:fld id="{6597116C-F94B-4B5B-973A-17F07FB5C418}" type="slidenum">
               <a:rPr lang="nl-BE" smtClean="0"/>
-              <a:t>44</a:t>
+              <a:t>45</a:t>
             </a:fld>
             <a:endParaRPr lang="nl-BE"/>
           </a:p>

</xml_diff>

<commit_message>
Add slide on double promotion
</commit_message>
<xml_diff>
--- a/Optimization/hpc_efficiency.pptx
+++ b/Optimization/hpc_efficiency.pptx
@@ -361,11 +361,11 @@
           <c:showPercent val="0"/>
           <c:showBubbleSize val="0"/>
         </c:dLbls>
-        <c:axId val="323927472"/>
-        <c:axId val="386653944"/>
+        <c:axId val="377340656"/>
+        <c:axId val="377343792"/>
       </c:scatterChart>
       <c:valAx>
-        <c:axId val="323927472"/>
+        <c:axId val="377340656"/>
         <c:scaling>
           <c:logBase val="2"/>
           <c:orientation val="minMax"/>
@@ -377,14 +377,14 @@
         <c:majorTickMark val="out"/>
         <c:minorTickMark val="none"/>
         <c:tickLblPos val="nextTo"/>
-        <c:crossAx val="386653944"/>
+        <c:crossAx val="377343792"/>
         <c:crosses val="autoZero"/>
         <c:crossBetween val="midCat"/>
         <c:majorUnit val="4"/>
         <c:minorUnit val="4"/>
       </c:valAx>
       <c:valAx>
-        <c:axId val="386653944"/>
+        <c:axId val="377343792"/>
         <c:scaling>
           <c:logBase val="2"/>
           <c:orientation val="minMax"/>
@@ -397,7 +397,7 @@
         <c:majorTickMark val="out"/>
         <c:minorTickMark val="none"/>
         <c:tickLblPos val="nextTo"/>
-        <c:crossAx val="323927472"/>
+        <c:crossAx val="377340656"/>
         <c:crosses val="autoZero"/>
         <c:crossBetween val="midCat"/>
         <c:majorUnit val="4"/>
@@ -770,11 +770,11 @@
           <c:showPercent val="0"/>
           <c:showBubbleSize val="0"/>
         </c:dLbls>
-        <c:axId val="386651984"/>
-        <c:axId val="386657864"/>
+        <c:axId val="377339480"/>
+        <c:axId val="377344576"/>
       </c:scatterChart>
       <c:valAx>
-        <c:axId val="386651984"/>
+        <c:axId val="377339480"/>
         <c:scaling>
           <c:logBase val="2"/>
           <c:orientation val="minMax"/>
@@ -787,14 +787,14 @@
         <c:majorTickMark val="out"/>
         <c:minorTickMark val="none"/>
         <c:tickLblPos val="nextTo"/>
-        <c:crossAx val="386657864"/>
+        <c:crossAx val="377344576"/>
         <c:crosses val="autoZero"/>
         <c:crossBetween val="midCat"/>
         <c:majorUnit val="4"/>
         <c:minorUnit val="4"/>
       </c:valAx>
       <c:valAx>
-        <c:axId val="386657864"/>
+        <c:axId val="377344576"/>
         <c:scaling>
           <c:logBase val="2"/>
           <c:orientation val="minMax"/>
@@ -808,7 +808,7 @@
         <c:majorTickMark val="out"/>
         <c:minorTickMark val="none"/>
         <c:tickLblPos val="nextTo"/>
-        <c:crossAx val="386651984"/>
+        <c:crossAx val="377339480"/>
         <c:crosses val="autoZero"/>
         <c:crossBetween val="midCat"/>
         <c:majorUnit val="4"/>
@@ -1021,11 +1021,11 @@
           <c:showPercent val="0"/>
           <c:showBubbleSize val="0"/>
         </c:dLbls>
-        <c:axId val="386652768"/>
-        <c:axId val="386656296"/>
+        <c:axId val="377343008"/>
+        <c:axId val="377341832"/>
       </c:scatterChart>
       <c:valAx>
-        <c:axId val="386652768"/>
+        <c:axId val="377343008"/>
         <c:scaling>
           <c:logBase val="2"/>
           <c:orientation val="minMax"/>
@@ -1038,13 +1038,13 @@
         <c:majorTickMark val="out"/>
         <c:minorTickMark val="none"/>
         <c:tickLblPos val="nextTo"/>
-        <c:crossAx val="386656296"/>
+        <c:crossAx val="377341832"/>
         <c:crosses val="autoZero"/>
         <c:crossBetween val="midCat"/>
         <c:minorUnit val="4"/>
       </c:valAx>
       <c:valAx>
-        <c:axId val="386656296"/>
+        <c:axId val="377341832"/>
         <c:scaling>
           <c:logBase val="2"/>
           <c:orientation val="minMax"/>
@@ -1058,7 +1058,7 @@
         <c:majorTickMark val="out"/>
         <c:minorTickMark val="none"/>
         <c:tickLblPos val="nextTo"/>
-        <c:crossAx val="386652768"/>
+        <c:crossAx val="377343008"/>
         <c:crosses val="autoZero"/>
         <c:crossBetween val="midCat"/>
         <c:majorUnit val="2"/>
@@ -1189,11 +1189,11 @@
           <c:showPercent val="0"/>
           <c:showBubbleSize val="0"/>
         </c:dLbls>
-        <c:axId val="386650416"/>
-        <c:axId val="386650808"/>
+        <c:axId val="377340264"/>
+        <c:axId val="377341048"/>
       </c:scatterChart>
       <c:valAx>
-        <c:axId val="386650416"/>
+        <c:axId val="377340264"/>
         <c:scaling>
           <c:logBase val="2"/>
           <c:orientation val="minMax"/>
@@ -1206,13 +1206,13 @@
         <c:majorTickMark val="out"/>
         <c:minorTickMark val="none"/>
         <c:tickLblPos val="nextTo"/>
-        <c:crossAx val="386650808"/>
+        <c:crossAx val="377341048"/>
         <c:crosses val="autoZero"/>
         <c:crossBetween val="midCat"/>
         <c:majorUnit val="4"/>
       </c:valAx>
       <c:valAx>
-        <c:axId val="386650808"/>
+        <c:axId val="377341048"/>
         <c:scaling>
           <c:logBase val="2"/>
           <c:orientation val="minMax"/>
@@ -1225,7 +1225,7 @@
         <c:majorTickMark val="out"/>
         <c:minorTickMark val="none"/>
         <c:tickLblPos val="nextTo"/>
-        <c:crossAx val="386650416"/>
+        <c:crossAx val="377340264"/>
         <c:crosses val="autoZero"/>
         <c:crossBetween val="midCat"/>
         <c:majorUnit val="2"/>
@@ -1351,11 +1351,11 @@
           <c:showPercent val="0"/>
           <c:showBubbleSize val="0"/>
         </c:dLbls>
-        <c:axId val="386654336"/>
-        <c:axId val="386654728"/>
+        <c:axId val="377337912"/>
+        <c:axId val="377338304"/>
       </c:scatterChart>
       <c:valAx>
-        <c:axId val="386654336"/>
+        <c:axId val="377337912"/>
         <c:scaling>
           <c:logBase val="2"/>
           <c:orientation val="minMax"/>
@@ -1368,14 +1368,14 @@
         <c:majorTickMark val="out"/>
         <c:minorTickMark val="none"/>
         <c:tickLblPos val="nextTo"/>
-        <c:crossAx val="386654728"/>
+        <c:crossAx val="377338304"/>
         <c:crosses val="autoZero"/>
         <c:crossBetween val="midCat"/>
         <c:majorUnit val="4"/>
         <c:minorUnit val="4"/>
       </c:valAx>
       <c:valAx>
-        <c:axId val="386654728"/>
+        <c:axId val="377338304"/>
         <c:scaling>
           <c:orientation val="minMax"/>
           <c:max val="1"/>
@@ -1387,7 +1387,7 @@
         <c:majorTickMark val="out"/>
         <c:minorTickMark val="none"/>
         <c:tickLblPos val="nextTo"/>
-        <c:crossAx val="386654336"/>
+        <c:crossAx val="377337912"/>
         <c:crosses val="autoZero"/>
         <c:crossBetween val="midCat"/>
       </c:valAx>
@@ -8845,7 +8845,7 @@
           <a:graphicData uri="http://schemas.openxmlformats.org/presentationml/2006/ole">
             <mc:AlternateContent xmlns:mc="http://schemas.openxmlformats.org/markup-compatibility/2006">
               <mc:Choice xmlns:v="urn:schemas-microsoft-com:vml" Requires="v">
-                <p:oleObj spid="_x0000_s1216" name="Equation" r:id="rId3" imgW="812520" imgH="393480" progId="Equation.3">
+                <p:oleObj spid="_x0000_s1224" name="Equation" r:id="rId3" imgW="812520" imgH="393480" progId="Equation.3">
                   <p:embed/>
                 </p:oleObj>
               </mc:Choice>
@@ -8902,7 +8902,7 @@
           <a:graphicData uri="http://schemas.openxmlformats.org/presentationml/2006/ole">
             <mc:AlternateContent xmlns:mc="http://schemas.openxmlformats.org/markup-compatibility/2006">
               <mc:Choice xmlns:v="urn:schemas-microsoft-com:vml" Requires="v">
-                <p:oleObj spid="_x0000_s1217" name="Equation" r:id="rId5" imgW="2489040" imgH="431640" progId="Equation.3">
+                <p:oleObj spid="_x0000_s1225" name="Equation" r:id="rId5" imgW="2489040" imgH="431640" progId="Equation.3">
                   <p:embed/>
                 </p:oleObj>
               </mc:Choice>
@@ -19564,7 +19564,7 @@
           <a:graphicData uri="http://schemas.openxmlformats.org/presentationml/2006/ole">
             <mc:AlternateContent xmlns:mc="http://schemas.openxmlformats.org/markup-compatibility/2006">
               <mc:Choice xmlns:v="urn:schemas-microsoft-com:vml" Requires="v">
-                <p:oleObj spid="_x0000_s2207" name="Equation" r:id="rId3" imgW="1091880" imgH="1041120" progId="Equation.3">
+                <p:oleObj spid="_x0000_s2215" name="Equation" r:id="rId3" imgW="1091880" imgH="1041120" progId="Equation.3">
                   <p:embed/>
                 </p:oleObj>
               </mc:Choice>
@@ -20935,7 +20935,7 @@
           <a:graphicData uri="http://schemas.openxmlformats.org/presentationml/2006/ole">
             <mc:AlternateContent xmlns:mc="http://schemas.openxmlformats.org/markup-compatibility/2006">
               <mc:Choice xmlns:v="urn:schemas-microsoft-com:vml" Requires="v">
-                <p:oleObj spid="_x0000_s2208" name="Equation" r:id="rId5" imgW="1091880" imgH="1041120" progId="Equation.3">
+                <p:oleObj spid="_x0000_s2216" name="Equation" r:id="rId5" imgW="1091880" imgH="1041120" progId="Equation.3">
                   <p:embed/>
                 </p:oleObj>
               </mc:Choice>
@@ -27284,7 +27284,7 @@
           <a:graphicData uri="http://schemas.openxmlformats.org/presentationml/2006/ole">
             <mc:AlternateContent xmlns:mc="http://schemas.openxmlformats.org/markup-compatibility/2006">
               <mc:Choice xmlns:v="urn:schemas-microsoft-com:vml" Requires="v">
-                <p:oleObj spid="_x0000_s3116" name="Equation" r:id="rId3" imgW="965160" imgH="228600" progId="Equation.3">
+                <p:oleObj spid="_x0000_s3120" name="Equation" r:id="rId3" imgW="965160" imgH="228600" progId="Equation.3">
                   <p:embed/>
                 </p:oleObj>
               </mc:Choice>
@@ -29550,26 +29550,14 @@
           <a:p>
             <a:r>
               <a:rPr lang="en-US" dirty="0" smtClean="0"/>
-              <a:t>Vector </a:t>
-            </a:r>
-            <a:r>
-              <a:rPr lang="en-US" dirty="0" smtClean="0"/>
-              <a:t>registers for floating point operands:</a:t>
+              <a:t>Vector registers for floating point operands:</a:t>
             </a:r>
             <a:br>
               <a:rPr lang="en-US" dirty="0" smtClean="0"/>
             </a:br>
             <a:r>
               <a:rPr lang="en-US" dirty="0" smtClean="0"/>
-              <a:t>512 </a:t>
-            </a:r>
-            <a:r>
-              <a:rPr lang="en-US" dirty="0" smtClean="0"/>
-              <a:t>bit </a:t>
-            </a:r>
-            <a:r>
-              <a:rPr lang="en-US" dirty="0" smtClean="0"/>
-              <a:t>wide</a:t>
+              <a:t>512 bit wide</a:t>
             </a:r>
           </a:p>
           <a:p>
@@ -29580,11 +29568,7 @@
             </a:r>
             <a:r>
               <a:rPr lang="en-US" dirty="0" smtClean="0"/>
-              <a:t> </a:t>
-            </a:r>
-            <a:r>
-              <a:rPr lang="en-US" dirty="0" smtClean="0"/>
-              <a:t>double precision</a:t>
+              <a:t> double precision</a:t>
             </a:r>
           </a:p>
           <a:p>
@@ -29595,15 +29579,7 @@
             <a:pPr lvl="1"/>
             <a:r>
               <a:rPr lang="en-US" dirty="0" smtClean="0"/>
-              <a:t>16</a:t>
-            </a:r>
-            <a:r>
-              <a:rPr lang="en-US" dirty="0" smtClean="0"/>
-              <a:t> </a:t>
-            </a:r>
-            <a:r>
-              <a:rPr lang="en-US" dirty="0" smtClean="0"/>
-              <a:t>single precision</a:t>
+              <a:t>16 single precision</a:t>
             </a:r>
             <a:endParaRPr lang="en-US" dirty="0"/>
           </a:p>
@@ -29675,11 +29651,7 @@
             <a:p>
               <a:r>
                 <a:rPr lang="en-US" sz="2800" dirty="0" smtClean="0"/>
-                <a:t>8 </a:t>
-              </a:r>
-              <a:r>
-                <a:rPr lang="en-US" sz="2800" dirty="0" smtClean="0"/>
-                <a:t>concurrent operations</a:t>
+                <a:t>8 concurrent operations</a:t>
               </a:r>
               <a:endParaRPr lang="en-US" sz="2800" dirty="0"/>
             </a:p>
@@ -29777,15 +29749,7 @@
             <a:p>
               <a:r>
                 <a:rPr lang="en-US" sz="2800" dirty="0" smtClean="0"/>
-                <a:t>16</a:t>
-              </a:r>
-              <a:r>
-                <a:rPr lang="en-US" sz="2800" dirty="0" smtClean="0"/>
-                <a:t> </a:t>
-              </a:r>
-              <a:r>
-                <a:rPr lang="en-US" sz="2800" dirty="0" smtClean="0"/>
-                <a:t>concurrent operations</a:t>
+                <a:t>16 concurrent operations</a:t>
               </a:r>
               <a:endParaRPr lang="en-US" sz="2800" dirty="0"/>
             </a:p>
@@ -29869,11 +29833,7 @@
           <a:p>
             <a:r>
               <a:rPr lang="en-US" sz="3200" dirty="0" smtClean="0"/>
-              <a:t>Even more worth </a:t>
-            </a:r>
-            <a:r>
-              <a:rPr lang="en-US" sz="3200" dirty="0" smtClean="0"/>
-              <a:t>to recompile!</a:t>
+              <a:t>Even more worth to recompile!</a:t>
             </a:r>
             <a:endParaRPr lang="en-US" sz="3200" dirty="0"/>
           </a:p>
@@ -30227,7 +30187,7 @@
           <a:p>
             <a:r>
               <a:rPr lang="en-US" dirty="0" smtClean="0"/>
-              <a:t>Helpful compiler options</a:t>
+              <a:t>Double promotion</a:t>
             </a:r>
             <a:endParaRPr lang="en-US" dirty="0"/>
           </a:p>

</xml_diff>

<commit_message>
Add processor type for AVX-512 instruction set
</commit_message>
<xml_diff>
--- a/Optimization/hpc_efficiency.pptx
+++ b/Optimization/hpc_efficiency.pptx
@@ -361,11 +361,11 @@
           <c:showPercent val="0"/>
           <c:showBubbleSize val="0"/>
         </c:dLbls>
-        <c:axId val="377340656"/>
-        <c:axId val="377343792"/>
+        <c:axId val="26024064"/>
+        <c:axId val="26026416"/>
       </c:scatterChart>
       <c:valAx>
-        <c:axId val="377340656"/>
+        <c:axId val="26024064"/>
         <c:scaling>
           <c:logBase val="2"/>
           <c:orientation val="minMax"/>
@@ -377,14 +377,14 @@
         <c:majorTickMark val="out"/>
         <c:minorTickMark val="none"/>
         <c:tickLblPos val="nextTo"/>
-        <c:crossAx val="377343792"/>
+        <c:crossAx val="26026416"/>
         <c:crosses val="autoZero"/>
         <c:crossBetween val="midCat"/>
         <c:majorUnit val="4"/>
         <c:minorUnit val="4"/>
       </c:valAx>
       <c:valAx>
-        <c:axId val="377343792"/>
+        <c:axId val="26026416"/>
         <c:scaling>
           <c:logBase val="2"/>
           <c:orientation val="minMax"/>
@@ -397,7 +397,7 @@
         <c:majorTickMark val="out"/>
         <c:minorTickMark val="none"/>
         <c:tickLblPos val="nextTo"/>
-        <c:crossAx val="377340656"/>
+        <c:crossAx val="26024064"/>
         <c:crosses val="autoZero"/>
         <c:crossBetween val="midCat"/>
         <c:majorUnit val="4"/>
@@ -770,11 +770,11 @@
           <c:showPercent val="0"/>
           <c:showBubbleSize val="0"/>
         </c:dLbls>
-        <c:axId val="377339480"/>
-        <c:axId val="377344576"/>
+        <c:axId val="26023672"/>
+        <c:axId val="26026024"/>
       </c:scatterChart>
       <c:valAx>
-        <c:axId val="377339480"/>
+        <c:axId val="26023672"/>
         <c:scaling>
           <c:logBase val="2"/>
           <c:orientation val="minMax"/>
@@ -787,14 +787,14 @@
         <c:majorTickMark val="out"/>
         <c:minorTickMark val="none"/>
         <c:tickLblPos val="nextTo"/>
-        <c:crossAx val="377344576"/>
+        <c:crossAx val="26026024"/>
         <c:crosses val="autoZero"/>
         <c:crossBetween val="midCat"/>
         <c:majorUnit val="4"/>
         <c:minorUnit val="4"/>
       </c:valAx>
       <c:valAx>
-        <c:axId val="377344576"/>
+        <c:axId val="26026024"/>
         <c:scaling>
           <c:logBase val="2"/>
           <c:orientation val="minMax"/>
@@ -808,7 +808,7 @@
         <c:majorTickMark val="out"/>
         <c:minorTickMark val="none"/>
         <c:tickLblPos val="nextTo"/>
-        <c:crossAx val="377339480"/>
+        <c:crossAx val="26023672"/>
         <c:crosses val="autoZero"/>
         <c:crossBetween val="midCat"/>
         <c:majorUnit val="4"/>
@@ -1021,11 +1021,11 @@
           <c:showPercent val="0"/>
           <c:showBubbleSize val="0"/>
         </c:dLbls>
-        <c:axId val="377343008"/>
-        <c:axId val="377341832"/>
+        <c:axId val="26024848"/>
+        <c:axId val="26024456"/>
       </c:scatterChart>
       <c:valAx>
-        <c:axId val="377343008"/>
+        <c:axId val="26024848"/>
         <c:scaling>
           <c:logBase val="2"/>
           <c:orientation val="minMax"/>
@@ -1038,13 +1038,13 @@
         <c:majorTickMark val="out"/>
         <c:minorTickMark val="none"/>
         <c:tickLblPos val="nextTo"/>
-        <c:crossAx val="377341832"/>
+        <c:crossAx val="26024456"/>
         <c:crosses val="autoZero"/>
         <c:crossBetween val="midCat"/>
         <c:minorUnit val="4"/>
       </c:valAx>
       <c:valAx>
-        <c:axId val="377341832"/>
+        <c:axId val="26024456"/>
         <c:scaling>
           <c:logBase val="2"/>
           <c:orientation val="minMax"/>
@@ -1058,7 +1058,7 @@
         <c:majorTickMark val="out"/>
         <c:minorTickMark val="none"/>
         <c:tickLblPos val="nextTo"/>
-        <c:crossAx val="377343008"/>
+        <c:crossAx val="26024848"/>
         <c:crosses val="autoZero"/>
         <c:crossBetween val="midCat"/>
         <c:majorUnit val="2"/>
@@ -1189,11 +1189,11 @@
           <c:showPercent val="0"/>
           <c:showBubbleSize val="0"/>
         </c:dLbls>
-        <c:axId val="377340264"/>
-        <c:axId val="377341048"/>
+        <c:axId val="26025240"/>
+        <c:axId val="26025632"/>
       </c:scatterChart>
       <c:valAx>
-        <c:axId val="377340264"/>
+        <c:axId val="26025240"/>
         <c:scaling>
           <c:logBase val="2"/>
           <c:orientation val="minMax"/>
@@ -1206,13 +1206,13 @@
         <c:majorTickMark val="out"/>
         <c:minorTickMark val="none"/>
         <c:tickLblPos val="nextTo"/>
-        <c:crossAx val="377341048"/>
+        <c:crossAx val="26025632"/>
         <c:crosses val="autoZero"/>
         <c:crossBetween val="midCat"/>
         <c:majorUnit val="4"/>
       </c:valAx>
       <c:valAx>
-        <c:axId val="377341048"/>
+        <c:axId val="26025632"/>
         <c:scaling>
           <c:logBase val="2"/>
           <c:orientation val="minMax"/>
@@ -1225,7 +1225,7 @@
         <c:majorTickMark val="out"/>
         <c:minorTickMark val="none"/>
         <c:tickLblPos val="nextTo"/>
-        <c:crossAx val="377340264"/>
+        <c:crossAx val="26025240"/>
         <c:crosses val="autoZero"/>
         <c:crossBetween val="midCat"/>
         <c:majorUnit val="2"/>
@@ -1351,11 +1351,11 @@
           <c:showPercent val="0"/>
           <c:showBubbleSize val="0"/>
         </c:dLbls>
-        <c:axId val="377337912"/>
-        <c:axId val="377338304"/>
+        <c:axId val="26027592"/>
+        <c:axId val="26028376"/>
       </c:scatterChart>
       <c:valAx>
-        <c:axId val="377337912"/>
+        <c:axId val="26027592"/>
         <c:scaling>
           <c:logBase val="2"/>
           <c:orientation val="minMax"/>
@@ -1368,14 +1368,14 @@
         <c:majorTickMark val="out"/>
         <c:minorTickMark val="none"/>
         <c:tickLblPos val="nextTo"/>
-        <c:crossAx val="377338304"/>
+        <c:crossAx val="26028376"/>
         <c:crosses val="autoZero"/>
         <c:crossBetween val="midCat"/>
         <c:majorUnit val="4"/>
         <c:minorUnit val="4"/>
       </c:valAx>
       <c:valAx>
-        <c:axId val="377338304"/>
+        <c:axId val="26028376"/>
         <c:scaling>
           <c:orientation val="minMax"/>
           <c:max val="1"/>
@@ -1387,7 +1387,7 @@
         <c:majorTickMark val="out"/>
         <c:minorTickMark val="none"/>
         <c:tickLblPos val="nextTo"/>
-        <c:crossAx val="377337912"/>
+        <c:crossAx val="26027592"/>
         <c:crosses val="autoZero"/>
         <c:crossBetween val="midCat"/>
       </c:valAx>
@@ -1484,7 +1484,7 @@
           <a:p>
             <a:fld id="{2E6AAE95-D4FC-4D00-935A-EAE928727A56}" type="datetimeFigureOut">
               <a:rPr lang="en-US" smtClean="0"/>
-              <a:t>2017-08-25</a:t>
+              <a:t>2017-08-30</a:t>
             </a:fld>
             <a:endParaRPr lang="en-US"/>
           </a:p>
@@ -2017,7 +2017,7 @@
           <a:p>
             <a:fld id="{1CFF3F78-F57F-4409-A41B-5EC46D4F404B}" type="datetime1">
               <a:rPr lang="nl-BE" smtClean="0"/>
-              <a:t>25/08/2017</a:t>
+              <a:t>30/08/2017</a:t>
             </a:fld>
             <a:endParaRPr lang="nl-BE"/>
           </a:p>
@@ -2187,7 +2187,7 @@
           <a:p>
             <a:fld id="{7D029E61-52E3-412C-82EB-2F81B17C0AF1}" type="datetime1">
               <a:rPr lang="nl-BE" smtClean="0"/>
-              <a:t>25/08/2017</a:t>
+              <a:t>30/08/2017</a:t>
             </a:fld>
             <a:endParaRPr lang="nl-BE"/>
           </a:p>
@@ -2367,7 +2367,7 @@
           <a:p>
             <a:fld id="{A83F1CEF-A38E-4001-89C6-F3FC7784F299}" type="datetime1">
               <a:rPr lang="nl-BE" smtClean="0"/>
-              <a:t>25/08/2017</a:t>
+              <a:t>30/08/2017</a:t>
             </a:fld>
             <a:endParaRPr lang="nl-BE"/>
           </a:p>
@@ -2493,7 +2493,7 @@
           <a:p>
             <a:fld id="{1FDE84DB-AADA-4C3F-BF46-CA664A504479}" type="datetime1">
               <a:rPr lang="nl-BE" smtClean="0"/>
-              <a:t>25/08/2017</a:t>
+              <a:t>30/08/2017</a:t>
             </a:fld>
             <a:endParaRPr lang="nl-BE" dirty="0"/>
           </a:p>
@@ -2737,7 +2737,7 @@
           <a:p>
             <a:fld id="{8CD53A43-C15C-4F05-9AD7-DB9DE837084D}" type="datetime1">
               <a:rPr lang="nl-BE" smtClean="0"/>
-              <a:t>25/08/2017</a:t>
+              <a:t>30/08/2017</a:t>
             </a:fld>
             <a:endParaRPr lang="nl-BE"/>
           </a:p>
@@ -2983,7 +2983,7 @@
           <a:p>
             <a:fld id="{8994D238-D949-4AEF-9753-A8B6EFA964A0}" type="datetime1">
               <a:rPr lang="nl-BE" smtClean="0"/>
-              <a:t>25/08/2017</a:t>
+              <a:t>30/08/2017</a:t>
             </a:fld>
             <a:endParaRPr lang="nl-BE"/>
           </a:p>
@@ -3271,7 +3271,7 @@
           <a:p>
             <a:fld id="{4D234023-BF99-4AD0-835E-8125DA2B6664}" type="datetime1">
               <a:rPr lang="nl-BE" smtClean="0"/>
-              <a:t>25/08/2017</a:t>
+              <a:t>30/08/2017</a:t>
             </a:fld>
             <a:endParaRPr lang="nl-BE"/>
           </a:p>
@@ -3693,7 +3693,7 @@
           <a:p>
             <a:fld id="{DB075A73-5C1D-406E-9444-3C5C58580E8E}" type="datetime1">
               <a:rPr lang="nl-BE" smtClean="0"/>
-              <a:t>25/08/2017</a:t>
+              <a:t>30/08/2017</a:t>
             </a:fld>
             <a:endParaRPr lang="nl-BE"/>
           </a:p>
@@ -3811,7 +3811,7 @@
           <a:p>
             <a:fld id="{E111FB2D-2E17-4D8F-A64A-4EB0C3D12494}" type="datetime1">
               <a:rPr lang="nl-BE" smtClean="0"/>
-              <a:t>25/08/2017</a:t>
+              <a:t>30/08/2017</a:t>
             </a:fld>
             <a:endParaRPr lang="nl-BE"/>
           </a:p>
@@ -3906,7 +3906,7 @@
           <a:p>
             <a:fld id="{5BE27D71-2267-4E44-9F33-05B60E5C7D9D}" type="datetime1">
               <a:rPr lang="nl-BE" smtClean="0"/>
-              <a:t>25/08/2017</a:t>
+              <a:t>30/08/2017</a:t>
             </a:fld>
             <a:endParaRPr lang="nl-BE"/>
           </a:p>
@@ -4183,7 +4183,7 @@
           <a:p>
             <a:fld id="{182F587C-96C8-4813-A767-3084061A3229}" type="datetime1">
               <a:rPr lang="nl-BE" smtClean="0"/>
-              <a:t>25/08/2017</a:t>
+              <a:t>30/08/2017</a:t>
             </a:fld>
             <a:endParaRPr lang="nl-BE"/>
           </a:p>
@@ -4436,7 +4436,7 @@
           <a:p>
             <a:fld id="{8B021CF8-BBBB-4DFA-8713-49842AA07274}" type="datetime1">
               <a:rPr lang="nl-BE" smtClean="0"/>
-              <a:t>25/08/2017</a:t>
+              <a:t>30/08/2017</a:t>
             </a:fld>
             <a:endParaRPr lang="nl-BE"/>
           </a:p>
@@ -4649,7 +4649,7 @@
           <a:p>
             <a:fld id="{CDBFABB5-0AB3-4CB6-A705-6887DEB1F9F2}" type="datetime1">
               <a:rPr lang="nl-BE" smtClean="0"/>
-              <a:t>25/08/2017</a:t>
+              <a:t>30/08/2017</a:t>
             </a:fld>
             <a:endParaRPr lang="nl-BE"/>
           </a:p>
@@ -8845,7 +8845,7 @@
           <a:graphicData uri="http://schemas.openxmlformats.org/presentationml/2006/ole">
             <mc:AlternateContent xmlns:mc="http://schemas.openxmlformats.org/markup-compatibility/2006">
               <mc:Choice xmlns:v="urn:schemas-microsoft-com:vml" Requires="v">
-                <p:oleObj spid="_x0000_s1224" name="Equation" r:id="rId3" imgW="812520" imgH="393480" progId="Equation.3">
+                <p:oleObj spid="_x0000_s1226" name="Equation" r:id="rId3" imgW="812520" imgH="393480" progId="Equation.3">
                   <p:embed/>
                 </p:oleObj>
               </mc:Choice>
@@ -8902,7 +8902,7 @@
           <a:graphicData uri="http://schemas.openxmlformats.org/presentationml/2006/ole">
             <mc:AlternateContent xmlns:mc="http://schemas.openxmlformats.org/markup-compatibility/2006">
               <mc:Choice xmlns:v="urn:schemas-microsoft-com:vml" Requires="v">
-                <p:oleObj spid="_x0000_s1225" name="Equation" r:id="rId5" imgW="2489040" imgH="431640" progId="Equation.3">
+                <p:oleObj spid="_x0000_s1227" name="Equation" r:id="rId5" imgW="2489040" imgH="431640" progId="Equation.3">
                   <p:embed/>
                 </p:oleObj>
               </mc:Choice>
@@ -19564,7 +19564,7 @@
           <a:graphicData uri="http://schemas.openxmlformats.org/presentationml/2006/ole">
             <mc:AlternateContent xmlns:mc="http://schemas.openxmlformats.org/markup-compatibility/2006">
               <mc:Choice xmlns:v="urn:schemas-microsoft-com:vml" Requires="v">
-                <p:oleObj spid="_x0000_s2215" name="Equation" r:id="rId3" imgW="1091880" imgH="1041120" progId="Equation.3">
+                <p:oleObj spid="_x0000_s2217" name="Equation" r:id="rId3" imgW="1091880" imgH="1041120" progId="Equation.3">
                   <p:embed/>
                 </p:oleObj>
               </mc:Choice>
@@ -20935,7 +20935,7 @@
           <a:graphicData uri="http://schemas.openxmlformats.org/presentationml/2006/ole">
             <mc:AlternateContent xmlns:mc="http://schemas.openxmlformats.org/markup-compatibility/2006">
               <mc:Choice xmlns:v="urn:schemas-microsoft-com:vml" Requires="v">
-                <p:oleObj spid="_x0000_s2216" name="Equation" r:id="rId5" imgW="1091880" imgH="1041120" progId="Equation.3">
+                <p:oleObj spid="_x0000_s2218" name="Equation" r:id="rId5" imgW="1091880" imgH="1041120" progId="Equation.3">
                   <p:embed/>
                 </p:oleObj>
               </mc:Choice>
@@ -27284,7 +27284,7 @@
           <a:graphicData uri="http://schemas.openxmlformats.org/presentationml/2006/ole">
             <mc:AlternateContent xmlns:mc="http://schemas.openxmlformats.org/markup-compatibility/2006">
               <mc:Choice xmlns:v="urn:schemas-microsoft-com:vml" Requires="v">
-                <p:oleObj spid="_x0000_s3120" name="Equation" r:id="rId3" imgW="965160" imgH="228600" progId="Equation.3">
+                <p:oleObj spid="_x0000_s3121" name="Equation" r:id="rId3" imgW="965160" imgH="228600" progId="Equation.3">
                   <p:embed/>
                 </p:oleObj>
               </mc:Choice>
@@ -29549,8 +29549,16 @@
           <a:lstStyle/>
           <a:p>
             <a:r>
+              <a:rPr lang="en-US" dirty="0" err="1" smtClean="0"/>
+              <a:t>Skylake</a:t>
+            </a:r>
+            <a:r>
               <a:rPr lang="en-US" dirty="0" smtClean="0"/>
-              <a:t>Vector registers for floating point operands:</a:t>
+              <a:t> CPUs: vector </a:t>
+            </a:r>
+            <a:r>
+              <a:rPr lang="en-US" dirty="0" smtClean="0"/>
+              <a:t>registers for floating point operands:</a:t>
             </a:r>
             <a:br>
               <a:rPr lang="en-US" dirty="0" smtClean="0"/>

</xml_diff>

<commit_message>
Add reference to numastat, mpstat
</commit_message>
<xml_diff>
--- a/Optimization/hpc_efficiency.pptx
+++ b/Optimization/hpc_efficiency.pptx
@@ -375,11 +375,11 @@
           <c:showPercent val="0"/>
           <c:showBubbleSize val="0"/>
         </c:dLbls>
-        <c:axId val="26024064"/>
-        <c:axId val="26026416"/>
+        <c:axId val="229364240"/>
+        <c:axId val="229368552"/>
       </c:scatterChart>
       <c:valAx>
-        <c:axId val="26024064"/>
+        <c:axId val="229364240"/>
         <c:scaling>
           <c:logBase val="2"/>
           <c:orientation val="minMax"/>
@@ -391,14 +391,14 @@
         <c:majorTickMark val="out"/>
         <c:minorTickMark val="none"/>
         <c:tickLblPos val="nextTo"/>
-        <c:crossAx val="26026416"/>
+        <c:crossAx val="229368552"/>
         <c:crosses val="autoZero"/>
         <c:crossBetween val="midCat"/>
         <c:majorUnit val="4"/>
         <c:minorUnit val="4"/>
       </c:valAx>
       <c:valAx>
-        <c:axId val="26026416"/>
+        <c:axId val="229368552"/>
         <c:scaling>
           <c:logBase val="2"/>
           <c:orientation val="minMax"/>
@@ -411,7 +411,7 @@
         <c:majorTickMark val="out"/>
         <c:minorTickMark val="none"/>
         <c:tickLblPos val="nextTo"/>
-        <c:crossAx val="26024064"/>
+        <c:crossAx val="229364240"/>
         <c:crosses val="autoZero"/>
         <c:crossBetween val="midCat"/>
         <c:majorUnit val="4"/>
@@ -784,11 +784,11 @@
           <c:showPercent val="0"/>
           <c:showBubbleSize val="0"/>
         </c:dLbls>
-        <c:axId val="26023672"/>
-        <c:axId val="26026024"/>
+        <c:axId val="229364632"/>
+        <c:axId val="229368160"/>
       </c:scatterChart>
       <c:valAx>
-        <c:axId val="26023672"/>
+        <c:axId val="229364632"/>
         <c:scaling>
           <c:logBase val="2"/>
           <c:orientation val="minMax"/>
@@ -801,14 +801,14 @@
         <c:majorTickMark val="out"/>
         <c:minorTickMark val="none"/>
         <c:tickLblPos val="nextTo"/>
-        <c:crossAx val="26026024"/>
+        <c:crossAx val="229368160"/>
         <c:crosses val="autoZero"/>
         <c:crossBetween val="midCat"/>
         <c:majorUnit val="4"/>
         <c:minorUnit val="4"/>
       </c:valAx>
       <c:valAx>
-        <c:axId val="26026024"/>
+        <c:axId val="229368160"/>
         <c:scaling>
           <c:logBase val="2"/>
           <c:orientation val="minMax"/>
@@ -822,7 +822,7 @@
         <c:majorTickMark val="out"/>
         <c:minorTickMark val="none"/>
         <c:tickLblPos val="nextTo"/>
-        <c:crossAx val="26023672"/>
+        <c:crossAx val="229364632"/>
         <c:crosses val="autoZero"/>
         <c:crossBetween val="midCat"/>
         <c:majorUnit val="4"/>
@@ -1035,11 +1035,11 @@
           <c:showPercent val="0"/>
           <c:showBubbleSize val="0"/>
         </c:dLbls>
-        <c:axId val="26024848"/>
-        <c:axId val="26024456"/>
+        <c:axId val="229369728"/>
+        <c:axId val="229370512"/>
       </c:scatterChart>
       <c:valAx>
-        <c:axId val="26024848"/>
+        <c:axId val="229369728"/>
         <c:scaling>
           <c:logBase val="2"/>
           <c:orientation val="minMax"/>
@@ -1052,13 +1052,13 @@
         <c:majorTickMark val="out"/>
         <c:minorTickMark val="none"/>
         <c:tickLblPos val="nextTo"/>
-        <c:crossAx val="26024456"/>
+        <c:crossAx val="229370512"/>
         <c:crosses val="autoZero"/>
         <c:crossBetween val="midCat"/>
         <c:minorUnit val="4"/>
       </c:valAx>
       <c:valAx>
-        <c:axId val="26024456"/>
+        <c:axId val="229370512"/>
         <c:scaling>
           <c:logBase val="2"/>
           <c:orientation val="minMax"/>
@@ -1072,7 +1072,7 @@
         <c:majorTickMark val="out"/>
         <c:minorTickMark val="none"/>
         <c:tickLblPos val="nextTo"/>
-        <c:crossAx val="26024848"/>
+        <c:crossAx val="229369728"/>
         <c:crosses val="autoZero"/>
         <c:crossBetween val="midCat"/>
         <c:majorUnit val="2"/>
@@ -1203,11 +1203,11 @@
           <c:showPercent val="0"/>
           <c:showBubbleSize val="0"/>
         </c:dLbls>
-        <c:axId val="26025240"/>
-        <c:axId val="26025632"/>
+        <c:axId val="229368944"/>
+        <c:axId val="229370904"/>
       </c:scatterChart>
       <c:valAx>
-        <c:axId val="26025240"/>
+        <c:axId val="229368944"/>
         <c:scaling>
           <c:logBase val="2"/>
           <c:orientation val="minMax"/>
@@ -1220,13 +1220,13 @@
         <c:majorTickMark val="out"/>
         <c:minorTickMark val="none"/>
         <c:tickLblPos val="nextTo"/>
-        <c:crossAx val="26025632"/>
+        <c:crossAx val="229370904"/>
         <c:crosses val="autoZero"/>
         <c:crossBetween val="midCat"/>
         <c:majorUnit val="4"/>
       </c:valAx>
       <c:valAx>
-        <c:axId val="26025632"/>
+        <c:axId val="229370904"/>
         <c:scaling>
           <c:logBase val="2"/>
           <c:orientation val="minMax"/>
@@ -1239,7 +1239,7 @@
         <c:majorTickMark val="out"/>
         <c:minorTickMark val="none"/>
         <c:tickLblPos val="nextTo"/>
-        <c:crossAx val="26025240"/>
+        <c:crossAx val="229368944"/>
         <c:crosses val="autoZero"/>
         <c:crossBetween val="midCat"/>
         <c:majorUnit val="2"/>
@@ -1365,11 +1365,11 @@
           <c:showPercent val="0"/>
           <c:showBubbleSize val="0"/>
         </c:dLbls>
-        <c:axId val="26027592"/>
-        <c:axId val="26028376"/>
+        <c:axId val="229371688"/>
+        <c:axId val="229365416"/>
       </c:scatterChart>
       <c:valAx>
-        <c:axId val="26027592"/>
+        <c:axId val="229371688"/>
         <c:scaling>
           <c:logBase val="2"/>
           <c:orientation val="minMax"/>
@@ -1382,14 +1382,14 @@
         <c:majorTickMark val="out"/>
         <c:minorTickMark val="none"/>
         <c:tickLblPos val="nextTo"/>
-        <c:crossAx val="26028376"/>
+        <c:crossAx val="229365416"/>
         <c:crosses val="autoZero"/>
         <c:crossBetween val="midCat"/>
         <c:majorUnit val="4"/>
         <c:minorUnit val="4"/>
       </c:valAx>
       <c:valAx>
-        <c:axId val="26028376"/>
+        <c:axId val="229365416"/>
         <c:scaling>
           <c:orientation val="minMax"/>
           <c:max val="1"/>
@@ -1401,7 +1401,7 @@
         <c:majorTickMark val="out"/>
         <c:minorTickMark val="none"/>
         <c:tickLblPos val="nextTo"/>
-        <c:crossAx val="26027592"/>
+        <c:crossAx val="229371688"/>
         <c:crosses val="autoZero"/>
         <c:crossBetween val="midCat"/>
       </c:valAx>
@@ -1498,7 +1498,7 @@
           <a:p>
             <a:fld id="{2E6AAE95-D4FC-4D00-935A-EAE928727A56}" type="datetimeFigureOut">
               <a:rPr lang="en-US" smtClean="0"/>
-              <a:t>2017-08-30</a:t>
+              <a:t>2017-09-21</a:t>
             </a:fld>
             <a:endParaRPr lang="en-US"/>
           </a:p>
@@ -2031,7 +2031,7 @@
           <a:p>
             <a:fld id="{1CFF3F78-F57F-4409-A41B-5EC46D4F404B}" type="datetime1">
               <a:rPr lang="nl-BE" smtClean="0"/>
-              <a:t>30/08/2017</a:t>
+              <a:t>21/09/2017</a:t>
             </a:fld>
             <a:endParaRPr lang="nl-BE"/>
           </a:p>
@@ -2201,7 +2201,7 @@
           <a:p>
             <a:fld id="{7D029E61-52E3-412C-82EB-2F81B17C0AF1}" type="datetime1">
               <a:rPr lang="nl-BE" smtClean="0"/>
-              <a:t>30/08/2017</a:t>
+              <a:t>21/09/2017</a:t>
             </a:fld>
             <a:endParaRPr lang="nl-BE"/>
           </a:p>
@@ -2381,7 +2381,7 @@
           <a:p>
             <a:fld id="{A83F1CEF-A38E-4001-89C6-F3FC7784F299}" type="datetime1">
               <a:rPr lang="nl-BE" smtClean="0"/>
-              <a:t>30/08/2017</a:t>
+              <a:t>21/09/2017</a:t>
             </a:fld>
             <a:endParaRPr lang="nl-BE"/>
           </a:p>
@@ -2507,7 +2507,7 @@
           <a:p>
             <a:fld id="{1FDE84DB-AADA-4C3F-BF46-CA664A504479}" type="datetime1">
               <a:rPr lang="nl-BE" smtClean="0"/>
-              <a:t>30/08/2017</a:t>
+              <a:t>21/09/2017</a:t>
             </a:fld>
             <a:endParaRPr lang="nl-BE" dirty="0"/>
           </a:p>
@@ -2751,7 +2751,7 @@
           <a:p>
             <a:fld id="{8CD53A43-C15C-4F05-9AD7-DB9DE837084D}" type="datetime1">
               <a:rPr lang="nl-BE" smtClean="0"/>
-              <a:t>30/08/2017</a:t>
+              <a:t>21/09/2017</a:t>
             </a:fld>
             <a:endParaRPr lang="nl-BE"/>
           </a:p>
@@ -2997,7 +2997,7 @@
           <a:p>
             <a:fld id="{8994D238-D949-4AEF-9753-A8B6EFA964A0}" type="datetime1">
               <a:rPr lang="nl-BE" smtClean="0"/>
-              <a:t>30/08/2017</a:t>
+              <a:t>21/09/2017</a:t>
             </a:fld>
             <a:endParaRPr lang="nl-BE"/>
           </a:p>
@@ -3285,7 +3285,7 @@
           <a:p>
             <a:fld id="{4D234023-BF99-4AD0-835E-8125DA2B6664}" type="datetime1">
               <a:rPr lang="nl-BE" smtClean="0"/>
-              <a:t>30/08/2017</a:t>
+              <a:t>21/09/2017</a:t>
             </a:fld>
             <a:endParaRPr lang="nl-BE"/>
           </a:p>
@@ -3707,7 +3707,7 @@
           <a:p>
             <a:fld id="{DB075A73-5C1D-406E-9444-3C5C58580E8E}" type="datetime1">
               <a:rPr lang="nl-BE" smtClean="0"/>
-              <a:t>30/08/2017</a:t>
+              <a:t>21/09/2017</a:t>
             </a:fld>
             <a:endParaRPr lang="nl-BE"/>
           </a:p>
@@ -3825,7 +3825,7 @@
           <a:p>
             <a:fld id="{E111FB2D-2E17-4D8F-A64A-4EB0C3D12494}" type="datetime1">
               <a:rPr lang="nl-BE" smtClean="0"/>
-              <a:t>30/08/2017</a:t>
+              <a:t>21/09/2017</a:t>
             </a:fld>
             <a:endParaRPr lang="nl-BE"/>
           </a:p>
@@ -3920,7 +3920,7 @@
           <a:p>
             <a:fld id="{5BE27D71-2267-4E44-9F33-05B60E5C7D9D}" type="datetime1">
               <a:rPr lang="nl-BE" smtClean="0"/>
-              <a:t>30/08/2017</a:t>
+              <a:t>21/09/2017</a:t>
             </a:fld>
             <a:endParaRPr lang="nl-BE"/>
           </a:p>
@@ -4197,7 +4197,7 @@
           <a:p>
             <a:fld id="{182F587C-96C8-4813-A767-3084061A3229}" type="datetime1">
               <a:rPr lang="nl-BE" smtClean="0"/>
-              <a:t>30/08/2017</a:t>
+              <a:t>21/09/2017</a:t>
             </a:fld>
             <a:endParaRPr lang="nl-BE"/>
           </a:p>
@@ -4450,7 +4450,7 @@
           <a:p>
             <a:fld id="{8B021CF8-BBBB-4DFA-8713-49842AA07274}" type="datetime1">
               <a:rPr lang="nl-BE" smtClean="0"/>
-              <a:t>30/08/2017</a:t>
+              <a:t>21/09/2017</a:t>
             </a:fld>
             <a:endParaRPr lang="nl-BE"/>
           </a:p>
@@ -4663,7 +4663,7 @@
           <a:p>
             <a:fld id="{CDBFABB5-0AB3-4CB6-A705-6887DEB1F9F2}" type="datetime1">
               <a:rPr lang="nl-BE" smtClean="0"/>
-              <a:t>30/08/2017</a:t>
+              <a:t>21/09/2017</a:t>
             </a:fld>
             <a:endParaRPr lang="nl-BE"/>
           </a:p>
@@ -8859,7 +8859,7 @@
           <a:graphicData uri="http://schemas.openxmlformats.org/presentationml/2006/ole">
             <mc:AlternateContent xmlns:mc="http://schemas.openxmlformats.org/markup-compatibility/2006">
               <mc:Choice xmlns:v="urn:schemas-microsoft-com:vml" Requires="v">
-                <p:oleObj spid="_x0000_s1232" name="Equation" r:id="rId3" imgW="812520" imgH="393480" progId="Equation.3">
+                <p:oleObj spid="_x0000_s1234" name="Equation" r:id="rId3" imgW="812520" imgH="393480" progId="Equation.3">
                   <p:embed/>
                 </p:oleObj>
               </mc:Choice>
@@ -8916,7 +8916,7 @@
           <a:graphicData uri="http://schemas.openxmlformats.org/presentationml/2006/ole">
             <mc:AlternateContent xmlns:mc="http://schemas.openxmlformats.org/markup-compatibility/2006">
               <mc:Choice xmlns:v="urn:schemas-microsoft-com:vml" Requires="v">
-                <p:oleObj spid="_x0000_s1233" name="Equation" r:id="rId5" imgW="2489040" imgH="431640" progId="Equation.3">
+                <p:oleObj spid="_x0000_s1235" name="Equation" r:id="rId5" imgW="2489040" imgH="431640" progId="Equation.3">
                   <p:embed/>
                 </p:oleObj>
               </mc:Choice>
@@ -19578,7 +19578,7 @@
           <a:graphicData uri="http://schemas.openxmlformats.org/presentationml/2006/ole">
             <mc:AlternateContent xmlns:mc="http://schemas.openxmlformats.org/markup-compatibility/2006">
               <mc:Choice xmlns:v="urn:schemas-microsoft-com:vml" Requires="v">
-                <p:oleObj spid="_x0000_s2223" name="Equation" r:id="rId3" imgW="1091880" imgH="1041120" progId="Equation.3">
+                <p:oleObj spid="_x0000_s2225" name="Equation" r:id="rId3" imgW="1091880" imgH="1041120" progId="Equation.3">
                   <p:embed/>
                 </p:oleObj>
               </mc:Choice>
@@ -20949,7 +20949,7 @@
           <a:graphicData uri="http://schemas.openxmlformats.org/presentationml/2006/ole">
             <mc:AlternateContent xmlns:mc="http://schemas.openxmlformats.org/markup-compatibility/2006">
               <mc:Choice xmlns:v="urn:schemas-microsoft-com:vml" Requires="v">
-                <p:oleObj spid="_x0000_s2224" name="Equation" r:id="rId5" imgW="1091880" imgH="1041120" progId="Equation.3">
+                <p:oleObj spid="_x0000_s2226" name="Equation" r:id="rId5" imgW="1091880" imgH="1041120" progId="Equation.3">
                   <p:embed/>
                 </p:oleObj>
               </mc:Choice>
@@ -27298,7 +27298,7 @@
           <a:graphicData uri="http://schemas.openxmlformats.org/presentationml/2006/ole">
             <mc:AlternateContent xmlns:mc="http://schemas.openxmlformats.org/markup-compatibility/2006">
               <mc:Choice xmlns:v="urn:schemas-microsoft-com:vml" Requires="v">
-                <p:oleObj spid="_x0000_s3124" name="Equation" r:id="rId3" imgW="965160" imgH="228600" progId="Equation.3">
+                <p:oleObj spid="_x0000_s3125" name="Equation" r:id="rId3" imgW="965160" imgH="228600" progId="Equation.3">
                   <p:embed/>
                 </p:oleObj>
               </mc:Choice>
@@ -29568,11 +29568,7 @@
             </a:r>
             <a:r>
               <a:rPr lang="en-US" dirty="0" smtClean="0"/>
-              <a:t> CPUs: vector </a:t>
-            </a:r>
-            <a:r>
-              <a:rPr lang="en-US" dirty="0" smtClean="0"/>
-              <a:t>registers for floating point operands:</a:t>
+              <a:t> CPUs: vector registers for floating point operands:</a:t>
             </a:r>
             <a:br>
               <a:rPr lang="en-US" dirty="0" smtClean="0"/>
@@ -40996,7 +40992,7 @@
         <p:spPr/>
         <p:txBody>
           <a:bodyPr>
-            <a:normAutofit fontScale="92500" lnSpcReduction="10000"/>
+            <a:normAutofit fontScale="77500" lnSpcReduction="20000"/>
           </a:bodyPr>
           <a:lstStyle/>
           <a:p>
@@ -41041,6 +41037,28 @@
             <a:r>
               <a:rPr lang="en-US" dirty="0" err="1" smtClean="0"/>
               <a:t>vTune</a:t>
+            </a:r>
+            <a:endParaRPr lang="en-US" dirty="0" smtClean="0"/>
+          </a:p>
+          <a:p>
+            <a:r>
+              <a:rPr lang="en-US" dirty="0" smtClean="0"/>
+              <a:t>Monitoring</a:t>
+            </a:r>
+          </a:p>
+          <a:p>
+            <a:pPr lvl="1"/>
+            <a:r>
+              <a:rPr lang="en-US" dirty="0" err="1" smtClean="0"/>
+              <a:t>numastat</a:t>
+            </a:r>
+            <a:endParaRPr lang="en-US" dirty="0" smtClean="0"/>
+          </a:p>
+          <a:p>
+            <a:pPr lvl="1"/>
+            <a:r>
+              <a:rPr lang="en-US" dirty="0" err="1" smtClean="0"/>
+              <a:t>mpstat</a:t>
             </a:r>
             <a:endParaRPr lang="en-US" dirty="0" smtClean="0"/>
           </a:p>
@@ -41376,51 +41394,6 @@
                                           </p:stCondLst>
                                         </p:cTn>
                                         <p:tgtEl>
-                                          <p:spTgt spid="5"/>
-                                        </p:tgtEl>
-                                        <p:attrNameLst>
-                                          <p:attrName>style.visibility</p:attrName>
-                                        </p:attrNameLst>
-                                      </p:cBhvr>
-                                      <p:to>
-                                        <p:strVal val="visible"/>
-                                      </p:to>
-                                    </p:set>
-                                  </p:childTnLst>
-                                </p:cTn>
-                              </p:par>
-                            </p:childTnLst>
-                          </p:cTn>
-                        </p:par>
-                      </p:childTnLst>
-                    </p:cTn>
-                  </p:par>
-                  <p:par>
-                    <p:cTn id="19" fill="hold">
-                      <p:stCondLst>
-                        <p:cond delay="indefinite"/>
-                      </p:stCondLst>
-                      <p:childTnLst>
-                        <p:par>
-                          <p:cTn id="20" fill="hold">
-                            <p:stCondLst>
-                              <p:cond delay="0"/>
-                            </p:stCondLst>
-                            <p:childTnLst>
-                              <p:par>
-                                <p:cTn id="21" presetID="1" presetClass="entr" presetSubtype="0" fill="hold" grpId="0" nodeType="clickEffect">
-                                  <p:stCondLst>
-                                    <p:cond delay="0"/>
-                                  </p:stCondLst>
-                                  <p:childTnLst>
-                                    <p:set>
-                                      <p:cBhvr>
-                                        <p:cTn id="22" dur="1" fill="hold">
-                                          <p:stCondLst>
-                                            <p:cond delay="0"/>
-                                          </p:stCondLst>
-                                        </p:cTn>
-                                        <p:tgtEl>
                                           <p:spTgt spid="3">
                                             <p:txEl>
                                               <p:pRg st="5" end="5"/>
@@ -41439,14 +41412,14 @@
                                 </p:cTn>
                               </p:par>
                               <p:par>
-                                <p:cTn id="23" presetID="1" presetClass="entr" presetSubtype="0" fill="hold" grpId="0" nodeType="withEffect">
+                                <p:cTn id="19" presetID="1" presetClass="entr" presetSubtype="0" fill="hold" grpId="0" nodeType="withEffect">
                                   <p:stCondLst>
                                     <p:cond delay="0"/>
                                   </p:stCondLst>
                                   <p:childTnLst>
                                     <p:set>
                                       <p:cBhvr>
-                                        <p:cTn id="24" dur="1" fill="hold">
+                                        <p:cTn id="20" dur="1" fill="hold">
                                           <p:stCondLst>
                                             <p:cond delay="0"/>
                                           </p:stCondLst>
@@ -41470,14 +41443,14 @@
                                 </p:cTn>
                               </p:par>
                               <p:par>
-                                <p:cTn id="25" presetID="1" presetClass="entr" presetSubtype="0" fill="hold" grpId="0" nodeType="withEffect">
+                                <p:cTn id="21" presetID="1" presetClass="entr" presetSubtype="0" fill="hold" grpId="0" nodeType="withEffect">
                                   <p:stCondLst>
                                     <p:cond delay="0"/>
                                   </p:stCondLst>
                                   <p:childTnLst>
                                     <p:set>
                                       <p:cBhvr>
-                                        <p:cTn id="26" dur="1" fill="hold">
+                                        <p:cTn id="22" dur="1" fill="hold">
                                           <p:stCondLst>
                                             <p:cond delay="0"/>
                                           </p:stCondLst>
@@ -41500,15 +41473,78 @@
                                   </p:childTnLst>
                                 </p:cTn>
                               </p:par>
+                            </p:childTnLst>
+                          </p:cTn>
+                        </p:par>
+                      </p:childTnLst>
+                    </p:cTn>
+                  </p:par>
+                  <p:par>
+                    <p:cTn id="23" fill="hold">
+                      <p:stCondLst>
+                        <p:cond delay="indefinite"/>
+                      </p:stCondLst>
+                      <p:childTnLst>
+                        <p:par>
+                          <p:cTn id="24" fill="hold">
+                            <p:stCondLst>
+                              <p:cond delay="0"/>
+                            </p:stCondLst>
+                            <p:childTnLst>
                               <p:par>
-                                <p:cTn id="27" presetID="1" presetClass="entr" presetSubtype="0" fill="hold" grpId="0" nodeType="withEffect">
+                                <p:cTn id="25" presetID="1" presetClass="entr" presetSubtype="0" fill="hold" grpId="0" nodeType="clickEffect">
                                   <p:stCondLst>
                                     <p:cond delay="0"/>
                                   </p:stCondLst>
                                   <p:childTnLst>
                                     <p:set>
                                       <p:cBhvr>
-                                        <p:cTn id="28" dur="1" fill="hold">
+                                        <p:cTn id="26" dur="1" fill="hold">
+                                          <p:stCondLst>
+                                            <p:cond delay="0"/>
+                                          </p:stCondLst>
+                                        </p:cTn>
+                                        <p:tgtEl>
+                                          <p:spTgt spid="5"/>
+                                        </p:tgtEl>
+                                        <p:attrNameLst>
+                                          <p:attrName>style.visibility</p:attrName>
+                                        </p:attrNameLst>
+                                      </p:cBhvr>
+                                      <p:to>
+                                        <p:strVal val="visible"/>
+                                      </p:to>
+                                    </p:set>
+                                  </p:childTnLst>
+                                </p:cTn>
+                              </p:par>
+                            </p:childTnLst>
+                          </p:cTn>
+                        </p:par>
+                      </p:childTnLst>
+                    </p:cTn>
+                  </p:par>
+                  <p:par>
+                    <p:cTn id="27" fill="hold">
+                      <p:stCondLst>
+                        <p:cond delay="indefinite"/>
+                      </p:stCondLst>
+                      <p:childTnLst>
+                        <p:par>
+                          <p:cTn id="28" fill="hold">
+                            <p:stCondLst>
+                              <p:cond delay="0"/>
+                            </p:stCondLst>
+                            <p:childTnLst>
+                              <p:par>
+                                <p:cTn id="29" presetID="1" presetClass="entr" presetSubtype="0" fill="hold" grpId="0" nodeType="clickEffect">
+                                  <p:stCondLst>
+                                    <p:cond delay="0"/>
+                                  </p:stCondLst>
+                                  <p:childTnLst>
+                                    <p:set>
+                                      <p:cBhvr>
+                                        <p:cTn id="30" dur="1" fill="hold">
                                           <p:stCondLst>
                                             <p:cond delay="0"/>
                                           </p:stCondLst>
@@ -41517,6 +41553,99 @@
                                           <p:spTgt spid="3">
                                             <p:txEl>
                                               <p:pRg st="8" end="8"/>
+                                            </p:txEl>
+                                          </p:spTgt>
+                                        </p:tgtEl>
+                                        <p:attrNameLst>
+                                          <p:attrName>style.visibility</p:attrName>
+                                        </p:attrNameLst>
+                                      </p:cBhvr>
+                                      <p:to>
+                                        <p:strVal val="visible"/>
+                                      </p:to>
+                                    </p:set>
+                                  </p:childTnLst>
+                                </p:cTn>
+                              </p:par>
+                              <p:par>
+                                <p:cTn id="31" presetID="1" presetClass="entr" presetSubtype="0" fill="hold" grpId="0" nodeType="withEffect">
+                                  <p:stCondLst>
+                                    <p:cond delay="0"/>
+                                  </p:stCondLst>
+                                  <p:childTnLst>
+                                    <p:set>
+                                      <p:cBhvr>
+                                        <p:cTn id="32" dur="1" fill="hold">
+                                          <p:stCondLst>
+                                            <p:cond delay="0"/>
+                                          </p:stCondLst>
+                                        </p:cTn>
+                                        <p:tgtEl>
+                                          <p:spTgt spid="3">
+                                            <p:txEl>
+                                              <p:pRg st="9" end="9"/>
+                                            </p:txEl>
+                                          </p:spTgt>
+                                        </p:tgtEl>
+                                        <p:attrNameLst>
+                                          <p:attrName>style.visibility</p:attrName>
+                                        </p:attrNameLst>
+                                      </p:cBhvr>
+                                      <p:to>
+                                        <p:strVal val="visible"/>
+                                      </p:to>
+                                    </p:set>
+                                  </p:childTnLst>
+                                </p:cTn>
+                              </p:par>
+                              <p:par>
+                                <p:cTn id="33" presetID="1" presetClass="entr" presetSubtype="0" fill="hold" grpId="0" nodeType="withEffect">
+                                  <p:stCondLst>
+                                    <p:cond delay="0"/>
+                                  </p:stCondLst>
+                                  <p:childTnLst>
+                                    <p:set>
+                                      <p:cBhvr>
+                                        <p:cTn id="34" dur="1" fill="hold">
+                                          <p:stCondLst>
+                                            <p:cond delay="0"/>
+                                          </p:stCondLst>
+                                        </p:cTn>
+                                        <p:tgtEl>
+                                          <p:spTgt spid="3">
+                                            <p:txEl>
+                                              <p:pRg st="10" end="10"/>
+                                            </p:txEl>
+                                          </p:spTgt>
+                                        </p:tgtEl>
+                                        <p:attrNameLst>
+                                          <p:attrName>style.visibility</p:attrName>
+                                        </p:attrNameLst>
+                                      </p:cBhvr>
+                                      <p:to>
+                                        <p:strVal val="visible"/>
+                                      </p:to>
+                                    </p:set>
+                                  </p:childTnLst>
+                                </p:cTn>
+                              </p:par>
+                              <p:par>
+                                <p:cTn id="35" presetID="1" presetClass="entr" presetSubtype="0" fill="hold" grpId="0" nodeType="withEffect">
+                                  <p:stCondLst>
+                                    <p:cond delay="0"/>
+                                  </p:stCondLst>
+                                  <p:childTnLst>
+                                    <p:set>
+                                      <p:cBhvr>
+                                        <p:cTn id="36" dur="1" fill="hold">
+                                          <p:stCondLst>
+                                            <p:cond delay="0"/>
+                                          </p:stCondLst>
+                                        </p:cTn>
+                                        <p:tgtEl>
+                                          <p:spTgt spid="3">
+                                            <p:txEl>
+                                              <p:pRg st="11" end="11"/>
                                             </p:txEl>
                                           </p:spTgt>
                                         </p:tgtEl>

</xml_diff>

<commit_message>
Fix for actual Tier-1 broadwell CPU peak performance
</commit_message>
<xml_diff>
--- a/Optimization/hpc_efficiency.pptx
+++ b/Optimization/hpc_efficiency.pptx
@@ -856,7 +856,6 @@
     </c:plotArea>
     <c:legend>
       <c:legendPos val="r"/>
-      <c:layout/>
       <c:overlay val="0"/>
     </c:legend>
     <c:plotVisOnly val="1"/>
@@ -1117,7 +1116,6 @@
     </c:plotArea>
     <c:legend>
       <c:legendPos val="r"/>
-      <c:layout/>
       <c:overlay val="0"/>
     </c:legend>
     <c:plotVisOnly val="1"/>
@@ -8905,7 +8903,7 @@
           <a:graphicData uri="http://schemas.openxmlformats.org/presentationml/2006/ole">
             <mc:AlternateContent xmlns:mc="http://schemas.openxmlformats.org/markup-compatibility/2006">
               <mc:Choice xmlns:v="urn:schemas-microsoft-com:vml" Requires="v">
-                <p:oleObj spid="_x0000_s1240" name="Equation" r:id="rId3" imgW="812520" imgH="393480" progId="Equation.3">
+                <p:oleObj spid="_x0000_s1242" name="Equation" r:id="rId3" imgW="812520" imgH="393480" progId="Equation.3">
                   <p:embed/>
                 </p:oleObj>
               </mc:Choice>
@@ -8962,7 +8960,7 @@
           <a:graphicData uri="http://schemas.openxmlformats.org/presentationml/2006/ole">
             <mc:AlternateContent xmlns:mc="http://schemas.openxmlformats.org/markup-compatibility/2006">
               <mc:Choice xmlns:v="urn:schemas-microsoft-com:vml" Requires="v">
-                <p:oleObj spid="_x0000_s1241" name="Equation" r:id="rId5" imgW="2489040" imgH="431640" progId="Equation.3">
+                <p:oleObj spid="_x0000_s1243" name="Equation" r:id="rId5" imgW="2489040" imgH="431640" progId="Equation.3">
                   <p:embed/>
                 </p:oleObj>
               </mc:Choice>
@@ -19624,7 +19622,7 @@
           <a:graphicData uri="http://schemas.openxmlformats.org/presentationml/2006/ole">
             <mc:AlternateContent xmlns:mc="http://schemas.openxmlformats.org/markup-compatibility/2006">
               <mc:Choice xmlns:v="urn:schemas-microsoft-com:vml" Requires="v">
-                <p:oleObj spid="_x0000_s2231" name="Equation" r:id="rId3" imgW="1091880" imgH="1041120" progId="Equation.3">
+                <p:oleObj spid="_x0000_s2233" name="Equation" r:id="rId3" imgW="1091880" imgH="1041120" progId="Equation.3">
                   <p:embed/>
                 </p:oleObj>
               </mc:Choice>
@@ -20995,7 +20993,7 @@
           <a:graphicData uri="http://schemas.openxmlformats.org/presentationml/2006/ole">
             <mc:AlternateContent xmlns:mc="http://schemas.openxmlformats.org/markup-compatibility/2006">
               <mc:Choice xmlns:v="urn:schemas-microsoft-com:vml" Requires="v">
-                <p:oleObj spid="_x0000_s2232" name="Equation" r:id="rId5" imgW="1091880" imgH="1041120" progId="Equation.3">
+                <p:oleObj spid="_x0000_s2234" name="Equation" r:id="rId5" imgW="1091880" imgH="1041120" progId="Equation.3">
                   <p:embed/>
                 </p:oleObj>
               </mc:Choice>
@@ -25658,31 +25656,35 @@
             </a:r>
             <a:r>
               <a:rPr lang="en-US" sz="2400" dirty="0" smtClean="0"/>
-              <a:t>/</a:t>
+              <a:t>/register  </a:t>
+            </a:r>
+            <a:r>
+              <a:rPr lang="en-US" sz="2400" smtClean="0"/>
+              <a:t>× </a:t>
+            </a:r>
+            <a:r>
+              <a:rPr lang="en-US" sz="2400" smtClean="0"/>
+              <a:t>2.4</a:t>
+            </a:r>
+            <a:r>
+              <a:rPr lang="en-US" sz="2400" baseline="30000" smtClean="0"/>
+              <a:t>.</a:t>
+            </a:r>
+            <a:r>
+              <a:rPr lang="en-US" sz="2400" smtClean="0"/>
+              <a:t>10</a:t>
+            </a:r>
+            <a:r>
+              <a:rPr lang="en-US" sz="2400" baseline="30000" smtClean="0"/>
+              <a:t>9</a:t>
+            </a:r>
+            <a:r>
+              <a:rPr lang="en-US" sz="2400" smtClean="0"/>
+              <a:t> </a:t>
             </a:r>
             <a:r>
               <a:rPr lang="en-US" sz="2400" dirty="0" smtClean="0"/>
-              <a:t>register  </a:t>
-            </a:r>
-            <a:r>
-              <a:rPr lang="en-US" sz="2400" dirty="0" smtClean="0"/>
-              <a:t>× 2.5</a:t>
-            </a:r>
-            <a:r>
-              <a:rPr lang="en-US" sz="2400" baseline="30000" dirty="0" smtClean="0"/>
-              <a:t>.</a:t>
-            </a:r>
-            <a:r>
-              <a:rPr lang="en-US" sz="2400" dirty="0" smtClean="0"/>
-              <a:t>10</a:t>
-            </a:r>
-            <a:r>
-              <a:rPr lang="en-US" sz="2400" baseline="30000" dirty="0" smtClean="0"/>
-              <a:t>9</a:t>
-            </a:r>
-            <a:r>
-              <a:rPr lang="en-US" sz="2400" dirty="0" smtClean="0"/>
-              <a:t> additions </a:t>
+              <a:t>additions </a:t>
             </a:r>
             <a:r>
               <a:rPr lang="en-US" sz="2400" dirty="0"/>
@@ -25690,15 +25692,7 @@
             </a:r>
             <a:r>
               <a:rPr lang="en-US" sz="2400" dirty="0" smtClean="0"/>
-              <a:t> </a:t>
-            </a:r>
-            <a:r>
-              <a:rPr lang="en-US" sz="2400" dirty="0" smtClean="0"/>
-              <a:t>14 </a:t>
-            </a:r>
-            <a:r>
-              <a:rPr lang="en-US" sz="2400" dirty="0" smtClean="0"/>
-              <a:t>cores </a:t>
+              <a:t> 14 cores </a:t>
             </a:r>
             <a:r>
               <a:rPr lang="en-US" sz="2400" dirty="0"/>
@@ -25713,11 +25707,15 @@
             </a:br>
             <a:r>
               <a:rPr lang="en-US" sz="2400" dirty="0" smtClean="0"/>
-              <a:t>                                = </a:t>
-            </a:r>
-            <a:r>
-              <a:rPr lang="en-US" sz="2400" dirty="0" smtClean="0"/>
-              <a:t>280 </a:t>
+              <a:t>                                </a:t>
+            </a:r>
+            <a:r>
+              <a:rPr lang="en-US" sz="2400" smtClean="0"/>
+              <a:t>= </a:t>
+            </a:r>
+            <a:r>
+              <a:rPr lang="en-US" sz="2400" smtClean="0"/>
+              <a:t>269 </a:t>
             </a:r>
             <a:r>
               <a:rPr lang="en-US" sz="2400" dirty="0" smtClean="0"/>
@@ -27376,7 +27374,7 @@
           <a:graphicData uri="http://schemas.openxmlformats.org/presentationml/2006/ole">
             <mc:AlternateContent xmlns:mc="http://schemas.openxmlformats.org/markup-compatibility/2006">
               <mc:Choice xmlns:v="urn:schemas-microsoft-com:vml" Requires="v">
-                <p:oleObj spid="_x0000_s3128" name="Equation" r:id="rId3" imgW="965160" imgH="228600" progId="Equation.3">
+                <p:oleObj spid="_x0000_s3129" name="Equation" r:id="rId3" imgW="965160" imgH="228600" progId="Equation.3">
                   <p:embed/>
                 </p:oleObj>
               </mc:Choice>

</xml_diff>

<commit_message>
Add fast math remark for GCC
</commit_message>
<xml_diff>
--- a/Optimization/hpc_efficiency.pptx
+++ b/Optimization/hpc_efficiency.pptx
@@ -5,7 +5,7 @@
     <p:sldMasterId id="2147483648" r:id="rId1"/>
   </p:sldMasterIdLst>
   <p:notesMasterIdLst>
-    <p:notesMasterId r:id="rId58"/>
+    <p:notesMasterId r:id="rId59"/>
   </p:notesMasterIdLst>
   <p:sldIdLst>
     <p:sldId id="267" r:id="rId2"/>
@@ -44,26 +44,27 @@
     <p:sldId id="304" r:id="rId35"/>
     <p:sldId id="305" r:id="rId36"/>
     <p:sldId id="298" r:id="rId37"/>
-    <p:sldId id="299" r:id="rId38"/>
-    <p:sldId id="300" r:id="rId39"/>
-    <p:sldId id="301" r:id="rId40"/>
-    <p:sldId id="302" r:id="rId41"/>
-    <p:sldId id="313" r:id="rId42"/>
-    <p:sldId id="314" r:id="rId43"/>
-    <p:sldId id="315" r:id="rId44"/>
-    <p:sldId id="316" r:id="rId45"/>
-    <p:sldId id="317" r:id="rId46"/>
-    <p:sldId id="306" r:id="rId47"/>
-    <p:sldId id="307" r:id="rId48"/>
-    <p:sldId id="308" r:id="rId49"/>
-    <p:sldId id="309" r:id="rId50"/>
-    <p:sldId id="310" r:id="rId51"/>
-    <p:sldId id="287" r:id="rId52"/>
-    <p:sldId id="292" r:id="rId53"/>
-    <p:sldId id="286" r:id="rId54"/>
-    <p:sldId id="297" r:id="rId55"/>
-    <p:sldId id="271" r:id="rId56"/>
-    <p:sldId id="283" r:id="rId57"/>
+    <p:sldId id="318" r:id="rId38"/>
+    <p:sldId id="299" r:id="rId39"/>
+    <p:sldId id="300" r:id="rId40"/>
+    <p:sldId id="301" r:id="rId41"/>
+    <p:sldId id="302" r:id="rId42"/>
+    <p:sldId id="313" r:id="rId43"/>
+    <p:sldId id="314" r:id="rId44"/>
+    <p:sldId id="315" r:id="rId45"/>
+    <p:sldId id="316" r:id="rId46"/>
+    <p:sldId id="317" r:id="rId47"/>
+    <p:sldId id="306" r:id="rId48"/>
+    <p:sldId id="307" r:id="rId49"/>
+    <p:sldId id="308" r:id="rId50"/>
+    <p:sldId id="309" r:id="rId51"/>
+    <p:sldId id="310" r:id="rId52"/>
+    <p:sldId id="287" r:id="rId53"/>
+    <p:sldId id="292" r:id="rId54"/>
+    <p:sldId id="286" r:id="rId55"/>
+    <p:sldId id="297" r:id="rId56"/>
+    <p:sldId id="271" r:id="rId57"/>
+    <p:sldId id="283" r:id="rId58"/>
   </p:sldIdLst>
   <p:sldSz cx="9144000" cy="6858000" type="screen4x3"/>
   <p:notesSz cx="6858000" cy="9144000"/>
@@ -223,6 +224,7 @@
             <p14:sldId id="304"/>
             <p14:sldId id="305"/>
             <p14:sldId id="298"/>
+            <p14:sldId id="318"/>
           </p14:sldIdLst>
         </p14:section>
         <p14:section name="false sharing" id="{D4ED262D-72D1-4270-88D0-B864D2A60662}">
@@ -1555,7 +1557,7 @@
           <a:p>
             <a:fld id="{2E6AAE95-D4FC-4D00-935A-EAE928727A56}" type="datetimeFigureOut">
               <a:rPr lang="en-US" smtClean="0"/>
-              <a:t>1/19/2018</a:t>
+              <a:t>7/13/2018</a:t>
             </a:fld>
             <a:endParaRPr lang="en-US"/>
           </a:p>
@@ -2088,7 +2090,7 @@
           <a:p>
             <a:fld id="{1CFF3F78-F57F-4409-A41B-5EC46D4F404B}" type="datetime1">
               <a:rPr lang="nl-BE" smtClean="0"/>
-              <a:t>19/01/2018</a:t>
+              <a:t>13/07/2018</a:t>
             </a:fld>
             <a:endParaRPr lang="nl-BE"/>
           </a:p>
@@ -2258,7 +2260,7 @@
           <a:p>
             <a:fld id="{7D029E61-52E3-412C-82EB-2F81B17C0AF1}" type="datetime1">
               <a:rPr lang="nl-BE" smtClean="0"/>
-              <a:t>19/01/2018</a:t>
+              <a:t>13/07/2018</a:t>
             </a:fld>
             <a:endParaRPr lang="nl-BE"/>
           </a:p>
@@ -2438,7 +2440,7 @@
           <a:p>
             <a:fld id="{A83F1CEF-A38E-4001-89C6-F3FC7784F299}" type="datetime1">
               <a:rPr lang="nl-BE" smtClean="0"/>
-              <a:t>19/01/2018</a:t>
+              <a:t>13/07/2018</a:t>
             </a:fld>
             <a:endParaRPr lang="nl-BE"/>
           </a:p>
@@ -2564,7 +2566,7 @@
           <a:p>
             <a:fld id="{1FDE84DB-AADA-4C3F-BF46-CA664A504479}" type="datetime1">
               <a:rPr lang="nl-BE" smtClean="0"/>
-              <a:t>19/01/2018</a:t>
+              <a:t>13/07/2018</a:t>
             </a:fld>
             <a:endParaRPr lang="nl-BE" dirty="0"/>
           </a:p>
@@ -2808,7 +2810,7 @@
           <a:p>
             <a:fld id="{8CD53A43-C15C-4F05-9AD7-DB9DE837084D}" type="datetime1">
               <a:rPr lang="nl-BE" smtClean="0"/>
-              <a:t>19/01/2018</a:t>
+              <a:t>13/07/2018</a:t>
             </a:fld>
             <a:endParaRPr lang="nl-BE"/>
           </a:p>
@@ -3054,7 +3056,7 @@
           <a:p>
             <a:fld id="{8994D238-D949-4AEF-9753-A8B6EFA964A0}" type="datetime1">
               <a:rPr lang="nl-BE" smtClean="0"/>
-              <a:t>19/01/2018</a:t>
+              <a:t>13/07/2018</a:t>
             </a:fld>
             <a:endParaRPr lang="nl-BE"/>
           </a:p>
@@ -3342,7 +3344,7 @@
           <a:p>
             <a:fld id="{4D234023-BF99-4AD0-835E-8125DA2B6664}" type="datetime1">
               <a:rPr lang="nl-BE" smtClean="0"/>
-              <a:t>19/01/2018</a:t>
+              <a:t>13/07/2018</a:t>
             </a:fld>
             <a:endParaRPr lang="nl-BE"/>
           </a:p>
@@ -3764,7 +3766,7 @@
           <a:p>
             <a:fld id="{DB075A73-5C1D-406E-9444-3C5C58580E8E}" type="datetime1">
               <a:rPr lang="nl-BE" smtClean="0"/>
-              <a:t>19/01/2018</a:t>
+              <a:t>13/07/2018</a:t>
             </a:fld>
             <a:endParaRPr lang="nl-BE"/>
           </a:p>
@@ -3882,7 +3884,7 @@
           <a:p>
             <a:fld id="{E111FB2D-2E17-4D8F-A64A-4EB0C3D12494}" type="datetime1">
               <a:rPr lang="nl-BE" smtClean="0"/>
-              <a:t>19/01/2018</a:t>
+              <a:t>13/07/2018</a:t>
             </a:fld>
             <a:endParaRPr lang="nl-BE"/>
           </a:p>
@@ -3977,7 +3979,7 @@
           <a:p>
             <a:fld id="{5BE27D71-2267-4E44-9F33-05B60E5C7D9D}" type="datetime1">
               <a:rPr lang="nl-BE" smtClean="0"/>
-              <a:t>19/01/2018</a:t>
+              <a:t>13/07/2018</a:t>
             </a:fld>
             <a:endParaRPr lang="nl-BE"/>
           </a:p>
@@ -4254,7 +4256,7 @@
           <a:p>
             <a:fld id="{182F587C-96C8-4813-A767-3084061A3229}" type="datetime1">
               <a:rPr lang="nl-BE" smtClean="0"/>
-              <a:t>19/01/2018</a:t>
+              <a:t>13/07/2018</a:t>
             </a:fld>
             <a:endParaRPr lang="nl-BE"/>
           </a:p>
@@ -4507,7 +4509,7 @@
           <a:p>
             <a:fld id="{8B021CF8-BBBB-4DFA-8713-49842AA07274}" type="datetime1">
               <a:rPr lang="nl-BE" smtClean="0"/>
-              <a:t>19/01/2018</a:t>
+              <a:t>13/07/2018</a:t>
             </a:fld>
             <a:endParaRPr lang="nl-BE"/>
           </a:p>
@@ -4720,7 +4722,7 @@
           <a:p>
             <a:fld id="{CDBFABB5-0AB3-4CB6-A705-6887DEB1F9F2}" type="datetime1">
               <a:rPr lang="nl-BE" smtClean="0"/>
-              <a:t>19/01/2018</a:t>
+              <a:t>13/07/2018</a:t>
             </a:fld>
             <a:endParaRPr lang="nl-BE"/>
           </a:p>
@@ -10101,7 +10103,7 @@
           <a:graphicData uri="http://schemas.openxmlformats.org/presentationml/2006/ole">
             <mc:AlternateContent xmlns:mc="http://schemas.openxmlformats.org/markup-compatibility/2006">
               <mc:Choice xmlns:v="urn:schemas-microsoft-com:vml" Requires="v">
-                <p:oleObj spid="_x0000_s1246" name="Equation" r:id="rId3" imgW="812520" imgH="393480" progId="Equation.3">
+                <p:oleObj spid="_x0000_s1250" name="Equation" r:id="rId3" imgW="812520" imgH="393480" progId="Equation.3">
                   <p:embed/>
                 </p:oleObj>
               </mc:Choice>
@@ -10158,7 +10160,7 @@
           <a:graphicData uri="http://schemas.openxmlformats.org/presentationml/2006/ole">
             <mc:AlternateContent xmlns:mc="http://schemas.openxmlformats.org/markup-compatibility/2006">
               <mc:Choice xmlns:v="urn:schemas-microsoft-com:vml" Requires="v">
-                <p:oleObj spid="_x0000_s1247" name="Equation" r:id="rId5" imgW="2489040" imgH="431640" progId="Equation.3">
+                <p:oleObj spid="_x0000_s1251" name="Equation" r:id="rId5" imgW="2489040" imgH="431640" progId="Equation.3">
                   <p:embed/>
                 </p:oleObj>
               </mc:Choice>
@@ -20820,7 +20822,7 @@
           <a:graphicData uri="http://schemas.openxmlformats.org/presentationml/2006/ole">
             <mc:AlternateContent xmlns:mc="http://schemas.openxmlformats.org/markup-compatibility/2006">
               <mc:Choice xmlns:v="urn:schemas-microsoft-com:vml" Requires="v">
-                <p:oleObj spid="_x0000_s2237" name="Equation" r:id="rId3" imgW="1091880" imgH="1041120" progId="Equation.3">
+                <p:oleObj spid="_x0000_s2241" name="Equation" r:id="rId3" imgW="1091880" imgH="1041120" progId="Equation.3">
                   <p:embed/>
                 </p:oleObj>
               </mc:Choice>
@@ -22191,7 +22193,7 @@
           <a:graphicData uri="http://schemas.openxmlformats.org/presentationml/2006/ole">
             <mc:AlternateContent xmlns:mc="http://schemas.openxmlformats.org/markup-compatibility/2006">
               <mc:Choice xmlns:v="urn:schemas-microsoft-com:vml" Requires="v">
-                <p:oleObj spid="_x0000_s2238" name="Equation" r:id="rId5" imgW="1091880" imgH="1041120" progId="Equation.3">
+                <p:oleObj spid="_x0000_s2242" name="Equation" r:id="rId5" imgW="1091880" imgH="1041120" progId="Equation.3">
                   <p:embed/>
                 </p:oleObj>
               </mc:Choice>
@@ -27616,7 +27618,7 @@
           <a:graphicData uri="http://schemas.openxmlformats.org/presentationml/2006/ole">
             <mc:AlternateContent xmlns:mc="http://schemas.openxmlformats.org/markup-compatibility/2006">
               <mc:Choice xmlns:v="urn:schemas-microsoft-com:vml" Requires="v">
-                <p:oleObj spid="_x0000_s3131" name="Equation" r:id="rId3" imgW="965160" imgH="228600" progId="Equation.3">
+                <p:oleObj spid="_x0000_s3133" name="Equation" r:id="rId3" imgW="965160" imgH="228600" progId="Equation.3">
                   <p:embed/>
                 </p:oleObj>
               </mc:Choice>
@@ -32304,7 +32306,11 @@
             <a:pPr lvl="1"/>
             <a:r>
               <a:rPr lang="en-US" dirty="0" smtClean="0"/>
-              <a:t>Verify results with</a:t>
+              <a:t>Verify </a:t>
+            </a:r>
+            <a:r>
+              <a:rPr lang="en-US" dirty="0" smtClean="0"/>
+              <a:t>results with</a:t>
             </a:r>
             <a:br>
               <a:rPr lang="en-US" dirty="0" smtClean="0"/>
@@ -32778,7 +32784,7 @@
           <a:p>
             <a:r>
               <a:rPr lang="en-US" dirty="0" smtClean="0"/>
-              <a:t>Multithreading: false sharing</a:t>
+              <a:t>Math &amp; GCC</a:t>
             </a:r>
             <a:endParaRPr lang="en-US" dirty="0"/>
           </a:p>
@@ -32786,12 +32792,12 @@
       </p:sp>
       <p:sp>
         <p:nvSpPr>
-          <p:cNvPr id="3" name="Text Placeholder 2"/>
+          <p:cNvPr id="3" name="Content Placeholder 2"/>
           <p:cNvSpPr>
             <a:spLocks noGrp="1"/>
           </p:cNvSpPr>
           <p:nvPr>
-            <p:ph type="body" idx="1"/>
+            <p:ph idx="1"/>
           </p:nvPr>
         </p:nvSpPr>
         <p:spPr/>
@@ -32799,7 +32805,296 @@
           <a:bodyPr/>
           <a:lstStyle/>
           <a:p>
-            <a:endParaRPr lang="en-US"/>
+            <a:r>
+              <a:rPr lang="en-US" dirty="0" smtClean="0"/>
+              <a:t>GCC more conservative</a:t>
+            </a:r>
+          </a:p>
+          <a:p>
+            <a:pPr lvl="1"/>
+            <a:r>
+              <a:rPr lang="en-US" dirty="0"/>
+              <a:t>L</a:t>
+            </a:r>
+            <a:r>
+              <a:rPr lang="en-US" dirty="0" smtClean="0"/>
+              <a:t>ess optimized code than Intel compilers</a:t>
+            </a:r>
+          </a:p>
+          <a:p>
+            <a:pPr lvl="1"/>
+            <a:r>
+              <a:rPr lang="en-US" dirty="0"/>
+              <a:t>T</a:t>
+            </a:r>
+            <a:r>
+              <a:rPr lang="en-US" dirty="0" smtClean="0"/>
+              <a:t>ry </a:t>
+            </a:r>
+            <a:r>
+              <a:rPr lang="en-US" dirty="0" smtClean="0">
+                <a:latin typeface="Courier New" panose="02070309020205020404" pitchFamily="49" charset="0"/>
+                <a:cs typeface="Courier New" panose="02070309020205020404" pitchFamily="49" charset="0"/>
+              </a:rPr>
+              <a:t>–</a:t>
+            </a:r>
+            <a:r>
+              <a:rPr lang="en-US" dirty="0" err="1" smtClean="0">
+                <a:latin typeface="Courier New" panose="02070309020205020404" pitchFamily="49" charset="0"/>
+                <a:cs typeface="Courier New" panose="02070309020205020404" pitchFamily="49" charset="0"/>
+              </a:rPr>
+              <a:t>ffast</a:t>
+            </a:r>
+            <a:r>
+              <a:rPr lang="en-US" dirty="0" smtClean="0">
+                <a:latin typeface="Courier New" panose="02070309020205020404" pitchFamily="49" charset="0"/>
+                <a:cs typeface="Courier New" panose="02070309020205020404" pitchFamily="49" charset="0"/>
+              </a:rPr>
+              <a:t>-math</a:t>
+            </a:r>
+            <a:r>
+              <a:rPr lang="en-US" dirty="0" smtClean="0">
+                <a:cs typeface="Courier New" panose="02070309020205020404" pitchFamily="49" charset="0"/>
+              </a:rPr>
+              <a:t>, implies</a:t>
+            </a:r>
+          </a:p>
+          <a:p>
+            <a:pPr lvl="2"/>
+            <a:r>
+              <a:rPr lang="en-US" altLang="en-US" dirty="0">
+                <a:solidFill>
+                  <a:srgbClr val="000000"/>
+                </a:solidFill>
+                <a:latin typeface="Courier New" panose="02070309020205020404" pitchFamily="49" charset="0"/>
+                <a:cs typeface="Courier New" panose="02070309020205020404" pitchFamily="49" charset="0"/>
+              </a:rPr>
+              <a:t>-</a:t>
+            </a:r>
+            <a:r>
+              <a:rPr lang="en-US" altLang="en-US" dirty="0" err="1" smtClean="0">
+                <a:solidFill>
+                  <a:srgbClr val="000000"/>
+                </a:solidFill>
+                <a:latin typeface="Courier New" panose="02070309020205020404" pitchFamily="49" charset="0"/>
+                <a:cs typeface="Courier New" panose="02070309020205020404" pitchFamily="49" charset="0"/>
+              </a:rPr>
+              <a:t>fno</a:t>
+            </a:r>
+            <a:r>
+              <a:rPr lang="en-US" altLang="en-US" dirty="0" smtClean="0">
+                <a:solidFill>
+                  <a:srgbClr val="000000"/>
+                </a:solidFill>
+                <a:latin typeface="Courier New" panose="02070309020205020404" pitchFamily="49" charset="0"/>
+                <a:cs typeface="Courier New" panose="02070309020205020404" pitchFamily="49" charset="0"/>
+              </a:rPr>
+              <a:t>-math-</a:t>
+            </a:r>
+            <a:r>
+              <a:rPr lang="en-US" altLang="en-US" dirty="0" err="1" smtClean="0">
+                <a:solidFill>
+                  <a:srgbClr val="000000"/>
+                </a:solidFill>
+                <a:latin typeface="Courier New" panose="02070309020205020404" pitchFamily="49" charset="0"/>
+                <a:cs typeface="Courier New" panose="02070309020205020404" pitchFamily="49" charset="0"/>
+              </a:rPr>
+              <a:t>errno</a:t>
+            </a:r>
+            <a:endParaRPr lang="en-US" altLang="en-US" dirty="0" smtClean="0">
+              <a:solidFill>
+                <a:srgbClr val="000000"/>
+              </a:solidFill>
+              <a:latin typeface="Courier New" panose="02070309020205020404" pitchFamily="49" charset="0"/>
+              <a:cs typeface="Courier New" panose="02070309020205020404" pitchFamily="49" charset="0"/>
+            </a:endParaRPr>
+          </a:p>
+          <a:p>
+            <a:pPr lvl="2"/>
+            <a:r>
+              <a:rPr lang="en-US" altLang="en-US" dirty="0">
+                <a:solidFill>
+                  <a:srgbClr val="000000"/>
+                </a:solidFill>
+                <a:latin typeface="Courier New" panose="02070309020205020404" pitchFamily="49" charset="0"/>
+                <a:cs typeface="Courier New" panose="02070309020205020404" pitchFamily="49" charset="0"/>
+              </a:rPr>
+              <a:t>-</a:t>
+            </a:r>
+            <a:r>
+              <a:rPr lang="en-US" altLang="en-US" dirty="0" err="1" smtClean="0">
+                <a:solidFill>
+                  <a:srgbClr val="000000"/>
+                </a:solidFill>
+                <a:latin typeface="Courier New" panose="02070309020205020404" pitchFamily="49" charset="0"/>
+                <a:cs typeface="Courier New" panose="02070309020205020404" pitchFamily="49" charset="0"/>
+              </a:rPr>
+              <a:t>funsafe</a:t>
+            </a:r>
+            <a:r>
+              <a:rPr lang="en-US" altLang="en-US" dirty="0" smtClean="0">
+                <a:solidFill>
+                  <a:srgbClr val="000000"/>
+                </a:solidFill>
+                <a:latin typeface="Courier New" panose="02070309020205020404" pitchFamily="49" charset="0"/>
+                <a:cs typeface="Courier New" panose="02070309020205020404" pitchFamily="49" charset="0"/>
+              </a:rPr>
+              <a:t>-math-optimizations</a:t>
+            </a:r>
+          </a:p>
+          <a:p>
+            <a:pPr lvl="2"/>
+            <a:r>
+              <a:rPr lang="en-US" altLang="en-US" dirty="0">
+                <a:solidFill>
+                  <a:srgbClr val="000000"/>
+                </a:solidFill>
+                <a:latin typeface="Courier New" panose="02070309020205020404" pitchFamily="49" charset="0"/>
+                <a:cs typeface="Courier New" panose="02070309020205020404" pitchFamily="49" charset="0"/>
+              </a:rPr>
+              <a:t>-</a:t>
+            </a:r>
+            <a:r>
+              <a:rPr lang="en-US" altLang="en-US" dirty="0" err="1" smtClean="0">
+                <a:solidFill>
+                  <a:srgbClr val="000000"/>
+                </a:solidFill>
+                <a:latin typeface="Courier New" panose="02070309020205020404" pitchFamily="49" charset="0"/>
+                <a:cs typeface="Courier New" panose="02070309020205020404" pitchFamily="49" charset="0"/>
+              </a:rPr>
+              <a:t>ffinite</a:t>
+            </a:r>
+            <a:r>
+              <a:rPr lang="en-US" altLang="en-US" dirty="0" smtClean="0">
+                <a:solidFill>
+                  <a:srgbClr val="000000"/>
+                </a:solidFill>
+                <a:latin typeface="Courier New" panose="02070309020205020404" pitchFamily="49" charset="0"/>
+                <a:cs typeface="Courier New" panose="02070309020205020404" pitchFamily="49" charset="0"/>
+              </a:rPr>
+              <a:t>-math-only</a:t>
+            </a:r>
+          </a:p>
+          <a:p>
+            <a:pPr lvl="2"/>
+            <a:r>
+              <a:rPr lang="en-US" altLang="en-US" dirty="0">
+                <a:solidFill>
+                  <a:srgbClr val="000000"/>
+                </a:solidFill>
+                <a:latin typeface="Courier New" panose="02070309020205020404" pitchFamily="49" charset="0"/>
+                <a:cs typeface="Courier New" panose="02070309020205020404" pitchFamily="49" charset="0"/>
+              </a:rPr>
+              <a:t>-</a:t>
+            </a:r>
+            <a:r>
+              <a:rPr lang="en-US" altLang="en-US" dirty="0" err="1" smtClean="0">
+                <a:solidFill>
+                  <a:srgbClr val="000000"/>
+                </a:solidFill>
+                <a:latin typeface="Courier New" panose="02070309020205020404" pitchFamily="49" charset="0"/>
+                <a:cs typeface="Courier New" panose="02070309020205020404" pitchFamily="49" charset="0"/>
+              </a:rPr>
+              <a:t>fno</a:t>
+            </a:r>
+            <a:r>
+              <a:rPr lang="en-US" altLang="en-US" dirty="0" smtClean="0">
+                <a:solidFill>
+                  <a:srgbClr val="000000"/>
+                </a:solidFill>
+                <a:latin typeface="Courier New" panose="02070309020205020404" pitchFamily="49" charset="0"/>
+                <a:cs typeface="Courier New" panose="02070309020205020404" pitchFamily="49" charset="0"/>
+              </a:rPr>
+              <a:t>-rounding-math</a:t>
+            </a:r>
+          </a:p>
+          <a:p>
+            <a:pPr lvl="2"/>
+            <a:r>
+              <a:rPr lang="en-US" altLang="en-US" dirty="0">
+                <a:solidFill>
+                  <a:srgbClr val="000000"/>
+                </a:solidFill>
+                <a:latin typeface="Courier New" panose="02070309020205020404" pitchFamily="49" charset="0"/>
+                <a:cs typeface="Courier New" panose="02070309020205020404" pitchFamily="49" charset="0"/>
+              </a:rPr>
+              <a:t>-</a:t>
+            </a:r>
+            <a:r>
+              <a:rPr lang="en-US" altLang="en-US" dirty="0" err="1" smtClean="0">
+                <a:solidFill>
+                  <a:srgbClr val="000000"/>
+                </a:solidFill>
+                <a:latin typeface="Courier New" panose="02070309020205020404" pitchFamily="49" charset="0"/>
+                <a:cs typeface="Courier New" panose="02070309020205020404" pitchFamily="49" charset="0"/>
+              </a:rPr>
+              <a:t>fno</a:t>
+            </a:r>
+            <a:r>
+              <a:rPr lang="en-US" altLang="en-US" dirty="0" smtClean="0">
+                <a:solidFill>
+                  <a:srgbClr val="000000"/>
+                </a:solidFill>
+                <a:latin typeface="Courier New" panose="02070309020205020404" pitchFamily="49" charset="0"/>
+                <a:cs typeface="Courier New" panose="02070309020205020404" pitchFamily="49" charset="0"/>
+              </a:rPr>
+              <a:t>-signaling-nans</a:t>
+            </a:r>
+          </a:p>
+          <a:p>
+            <a:pPr lvl="2"/>
+            <a:r>
+              <a:rPr lang="en-US" altLang="en-US" dirty="0">
+                <a:solidFill>
+                  <a:srgbClr val="000000"/>
+                </a:solidFill>
+                <a:latin typeface="Courier New" panose="02070309020205020404" pitchFamily="49" charset="0"/>
+                <a:cs typeface="Courier New" panose="02070309020205020404" pitchFamily="49" charset="0"/>
+              </a:rPr>
+              <a:t>-</a:t>
+            </a:r>
+            <a:r>
+              <a:rPr lang="en-US" altLang="en-US" dirty="0" err="1">
+                <a:solidFill>
+                  <a:srgbClr val="000000"/>
+                </a:solidFill>
+                <a:latin typeface="Courier New" panose="02070309020205020404" pitchFamily="49" charset="0"/>
+                <a:cs typeface="Courier New" panose="02070309020205020404" pitchFamily="49" charset="0"/>
+              </a:rPr>
+              <a:t>fcx</a:t>
+            </a:r>
+            <a:r>
+              <a:rPr lang="en-US" altLang="en-US" dirty="0">
+                <a:solidFill>
+                  <a:srgbClr val="000000"/>
+                </a:solidFill>
+                <a:latin typeface="Courier New" panose="02070309020205020404" pitchFamily="49" charset="0"/>
+                <a:cs typeface="Courier New" panose="02070309020205020404" pitchFamily="49" charset="0"/>
+              </a:rPr>
+              <a:t>-limited-range</a:t>
+            </a:r>
+            <a:endParaRPr lang="en-US" altLang="en-US" dirty="0" smtClean="0">
+              <a:solidFill>
+                <a:srgbClr val="000000"/>
+              </a:solidFill>
+              <a:latin typeface="Courier New" panose="02070309020205020404" pitchFamily="49" charset="0"/>
+              <a:cs typeface="Courier New" panose="02070309020205020404" pitchFamily="49" charset="0"/>
+            </a:endParaRPr>
+          </a:p>
+          <a:p>
+            <a:pPr lvl="2"/>
+            <a:endParaRPr lang="en-US" altLang="en-US" dirty="0" smtClean="0">
+              <a:solidFill>
+                <a:srgbClr val="000000"/>
+              </a:solidFill>
+              <a:latin typeface="Arial Unicode MS"/>
+            </a:endParaRPr>
+          </a:p>
+          <a:p>
+            <a:pPr lvl="2"/>
+            <a:endParaRPr lang="en-US" dirty="0" smtClean="0">
+              <a:cs typeface="Courier New" panose="02070309020205020404" pitchFamily="49" charset="0"/>
+            </a:endParaRPr>
           </a:p>
         </p:txBody>
       </p:sp>
@@ -32826,10 +33121,49 @@
           </a:p>
         </p:txBody>
       </p:sp>
+      <p:sp>
+        <p:nvSpPr>
+          <p:cNvPr id="5" name="TextBox 4"/>
+          <p:cNvSpPr txBox="1"/>
+          <p:nvPr/>
+        </p:nvSpPr>
+        <p:spPr>
+          <a:xfrm>
+            <a:off x="5724128" y="4869160"/>
+            <a:ext cx="2411494" cy="523220"/>
+          </a:xfrm>
+          <a:prstGeom prst="rect">
+            <a:avLst/>
+          </a:prstGeom>
+          <a:noFill/>
+          <a:ln>
+            <a:solidFill>
+              <a:schemeClr val="tx1"/>
+            </a:solidFill>
+          </a:ln>
+        </p:spPr>
+        <p:txBody>
+          <a:bodyPr wrap="none" rtlCol="0">
+            <a:spAutoFit/>
+          </a:bodyPr>
+          <a:lstStyle/>
+          <a:p>
+            <a:r>
+              <a:rPr lang="en-US" sz="2800" i="1" dirty="0">
+                <a:solidFill>
+                  <a:srgbClr val="C00000"/>
+                </a:solidFill>
+              </a:rPr>
+              <a:t>Verify results!!!</a:t>
+            </a:r>
+            <a:endParaRPr lang="en-US" sz="2800" dirty="0"/>
+          </a:p>
+        </p:txBody>
+      </p:sp>
     </p:spTree>
     <p:extLst>
       <p:ext uri="{BB962C8B-B14F-4D97-AF65-F5344CB8AC3E}">
-        <p14:creationId xmlns:p14="http://schemas.microsoft.com/office/powerpoint/2010/main" val="3424948925"/>
+        <p14:creationId xmlns:p14="http://schemas.microsoft.com/office/powerpoint/2010/main" val="2386774650"/>
       </p:ext>
     </p:extLst>
   </p:cSld>
@@ -32839,9 +33173,444 @@
   <p:timing>
     <p:tnLst>
       <p:par>
-        <p:cTn id="1" dur="indefinite" restart="never" nodeType="tmRoot"/>
+        <p:cTn id="1" dur="indefinite" restart="never" nodeType="tmRoot">
+          <p:childTnLst>
+            <p:seq concurrent="1" nextAc="seek">
+              <p:cTn id="2" dur="indefinite" nodeType="mainSeq">
+                <p:childTnLst>
+                  <p:par>
+                    <p:cTn id="3" fill="hold">
+                      <p:stCondLst>
+                        <p:cond delay="indefinite"/>
+                        <p:cond evt="onBegin" delay="0">
+                          <p:tn val="2"/>
+                        </p:cond>
+                      </p:stCondLst>
+                      <p:childTnLst>
+                        <p:par>
+                          <p:cTn id="4" fill="hold">
+                            <p:stCondLst>
+                              <p:cond delay="0"/>
+                            </p:stCondLst>
+                            <p:childTnLst>
+                              <p:par>
+                                <p:cTn id="5" presetID="1" presetClass="entr" presetSubtype="0" fill="hold" grpId="0" nodeType="withEffect">
+                                  <p:stCondLst>
+                                    <p:cond delay="0"/>
+                                  </p:stCondLst>
+                                  <p:childTnLst>
+                                    <p:set>
+                                      <p:cBhvr>
+                                        <p:cTn id="6" dur="1" fill="hold">
+                                          <p:stCondLst>
+                                            <p:cond delay="0"/>
+                                          </p:stCondLst>
+                                        </p:cTn>
+                                        <p:tgtEl>
+                                          <p:spTgt spid="3">
+                                            <p:txEl>
+                                              <p:pRg st="0" end="0"/>
+                                            </p:txEl>
+                                          </p:spTgt>
+                                        </p:tgtEl>
+                                        <p:attrNameLst>
+                                          <p:attrName>style.visibility</p:attrName>
+                                        </p:attrNameLst>
+                                      </p:cBhvr>
+                                      <p:to>
+                                        <p:strVal val="visible"/>
+                                      </p:to>
+                                    </p:set>
+                                  </p:childTnLst>
+                                </p:cTn>
+                              </p:par>
+                            </p:childTnLst>
+                          </p:cTn>
+                        </p:par>
+                      </p:childTnLst>
+                    </p:cTn>
+                  </p:par>
+                  <p:par>
+                    <p:cTn id="7" fill="hold">
+                      <p:stCondLst>
+                        <p:cond delay="indefinite"/>
+                      </p:stCondLst>
+                      <p:childTnLst>
+                        <p:par>
+                          <p:cTn id="8" fill="hold">
+                            <p:stCondLst>
+                              <p:cond delay="0"/>
+                            </p:stCondLst>
+                            <p:childTnLst>
+                              <p:par>
+                                <p:cTn id="9" presetID="1" presetClass="entr" presetSubtype="0" fill="hold" grpId="0" nodeType="clickEffect">
+                                  <p:stCondLst>
+                                    <p:cond delay="0"/>
+                                  </p:stCondLst>
+                                  <p:childTnLst>
+                                    <p:set>
+                                      <p:cBhvr>
+                                        <p:cTn id="10" dur="1" fill="hold">
+                                          <p:stCondLst>
+                                            <p:cond delay="0"/>
+                                          </p:stCondLst>
+                                        </p:cTn>
+                                        <p:tgtEl>
+                                          <p:spTgt spid="3">
+                                            <p:txEl>
+                                              <p:pRg st="1" end="1"/>
+                                            </p:txEl>
+                                          </p:spTgt>
+                                        </p:tgtEl>
+                                        <p:attrNameLst>
+                                          <p:attrName>style.visibility</p:attrName>
+                                        </p:attrNameLst>
+                                      </p:cBhvr>
+                                      <p:to>
+                                        <p:strVal val="visible"/>
+                                      </p:to>
+                                    </p:set>
+                                  </p:childTnLst>
+                                </p:cTn>
+                              </p:par>
+                            </p:childTnLst>
+                          </p:cTn>
+                        </p:par>
+                      </p:childTnLst>
+                    </p:cTn>
+                  </p:par>
+                  <p:par>
+                    <p:cTn id="11" fill="hold">
+                      <p:stCondLst>
+                        <p:cond delay="indefinite"/>
+                      </p:stCondLst>
+                      <p:childTnLst>
+                        <p:par>
+                          <p:cTn id="12" fill="hold">
+                            <p:stCondLst>
+                              <p:cond delay="0"/>
+                            </p:stCondLst>
+                            <p:childTnLst>
+                              <p:par>
+                                <p:cTn id="13" presetID="1" presetClass="entr" presetSubtype="0" fill="hold" grpId="0" nodeType="clickEffect">
+                                  <p:stCondLst>
+                                    <p:cond delay="0"/>
+                                  </p:stCondLst>
+                                  <p:childTnLst>
+                                    <p:set>
+                                      <p:cBhvr>
+                                        <p:cTn id="14" dur="1" fill="hold">
+                                          <p:stCondLst>
+                                            <p:cond delay="0"/>
+                                          </p:stCondLst>
+                                        </p:cTn>
+                                        <p:tgtEl>
+                                          <p:spTgt spid="3">
+                                            <p:txEl>
+                                              <p:pRg st="2" end="2"/>
+                                            </p:txEl>
+                                          </p:spTgt>
+                                        </p:tgtEl>
+                                        <p:attrNameLst>
+                                          <p:attrName>style.visibility</p:attrName>
+                                        </p:attrNameLst>
+                                      </p:cBhvr>
+                                      <p:to>
+                                        <p:strVal val="visible"/>
+                                      </p:to>
+                                    </p:set>
+                                  </p:childTnLst>
+                                </p:cTn>
+                              </p:par>
+                            </p:childTnLst>
+                          </p:cTn>
+                        </p:par>
+                      </p:childTnLst>
+                    </p:cTn>
+                  </p:par>
+                  <p:par>
+                    <p:cTn id="15" fill="hold">
+                      <p:stCondLst>
+                        <p:cond delay="indefinite"/>
+                      </p:stCondLst>
+                      <p:childTnLst>
+                        <p:par>
+                          <p:cTn id="16" fill="hold">
+                            <p:stCondLst>
+                              <p:cond delay="0"/>
+                            </p:stCondLst>
+                            <p:childTnLst>
+                              <p:par>
+                                <p:cTn id="17" presetID="1" presetClass="entr" presetSubtype="0" fill="hold" grpId="0" nodeType="clickEffect">
+                                  <p:stCondLst>
+                                    <p:cond delay="0"/>
+                                  </p:stCondLst>
+                                  <p:childTnLst>
+                                    <p:set>
+                                      <p:cBhvr>
+                                        <p:cTn id="18" dur="1" fill="hold">
+                                          <p:stCondLst>
+                                            <p:cond delay="0"/>
+                                          </p:stCondLst>
+                                        </p:cTn>
+                                        <p:tgtEl>
+                                          <p:spTgt spid="3">
+                                            <p:txEl>
+                                              <p:pRg st="3" end="3"/>
+                                            </p:txEl>
+                                          </p:spTgt>
+                                        </p:tgtEl>
+                                        <p:attrNameLst>
+                                          <p:attrName>style.visibility</p:attrName>
+                                        </p:attrNameLst>
+                                      </p:cBhvr>
+                                      <p:to>
+                                        <p:strVal val="visible"/>
+                                      </p:to>
+                                    </p:set>
+                                  </p:childTnLst>
+                                </p:cTn>
+                              </p:par>
+                              <p:par>
+                                <p:cTn id="19" presetID="1" presetClass="entr" presetSubtype="0" fill="hold" grpId="0" nodeType="withEffect">
+                                  <p:stCondLst>
+                                    <p:cond delay="0"/>
+                                  </p:stCondLst>
+                                  <p:childTnLst>
+                                    <p:set>
+                                      <p:cBhvr>
+                                        <p:cTn id="20" dur="1" fill="hold">
+                                          <p:stCondLst>
+                                            <p:cond delay="0"/>
+                                          </p:stCondLst>
+                                        </p:cTn>
+                                        <p:tgtEl>
+                                          <p:spTgt spid="3">
+                                            <p:txEl>
+                                              <p:pRg st="4" end="4"/>
+                                            </p:txEl>
+                                          </p:spTgt>
+                                        </p:tgtEl>
+                                        <p:attrNameLst>
+                                          <p:attrName>style.visibility</p:attrName>
+                                        </p:attrNameLst>
+                                      </p:cBhvr>
+                                      <p:to>
+                                        <p:strVal val="visible"/>
+                                      </p:to>
+                                    </p:set>
+                                  </p:childTnLst>
+                                </p:cTn>
+                              </p:par>
+                            </p:childTnLst>
+                          </p:cTn>
+                        </p:par>
+                        <p:par>
+                          <p:cTn id="21" fill="hold">
+                            <p:stCondLst>
+                              <p:cond delay="0"/>
+                            </p:stCondLst>
+                            <p:childTnLst>
+                              <p:par>
+                                <p:cTn id="22" presetID="1" presetClass="entr" presetSubtype="0" fill="hold" grpId="0" nodeType="afterEffect">
+                                  <p:stCondLst>
+                                    <p:cond delay="0"/>
+                                  </p:stCondLst>
+                                  <p:childTnLst>
+                                    <p:set>
+                                      <p:cBhvr>
+                                        <p:cTn id="23" dur="1" fill="hold">
+                                          <p:stCondLst>
+                                            <p:cond delay="0"/>
+                                          </p:stCondLst>
+                                        </p:cTn>
+                                        <p:tgtEl>
+                                          <p:spTgt spid="3">
+                                            <p:txEl>
+                                              <p:pRg st="5" end="5"/>
+                                            </p:txEl>
+                                          </p:spTgt>
+                                        </p:tgtEl>
+                                        <p:attrNameLst>
+                                          <p:attrName>style.visibility</p:attrName>
+                                        </p:attrNameLst>
+                                      </p:cBhvr>
+                                      <p:to>
+                                        <p:strVal val="visible"/>
+                                      </p:to>
+                                    </p:set>
+                                  </p:childTnLst>
+                                </p:cTn>
+                              </p:par>
+                              <p:par>
+                                <p:cTn id="24" presetID="1" presetClass="entr" presetSubtype="0" fill="hold" grpId="0" nodeType="withEffect">
+                                  <p:stCondLst>
+                                    <p:cond delay="0"/>
+                                  </p:stCondLst>
+                                  <p:childTnLst>
+                                    <p:set>
+                                      <p:cBhvr>
+                                        <p:cTn id="25" dur="1" fill="hold">
+                                          <p:stCondLst>
+                                            <p:cond delay="0"/>
+                                          </p:stCondLst>
+                                        </p:cTn>
+                                        <p:tgtEl>
+                                          <p:spTgt spid="3">
+                                            <p:txEl>
+                                              <p:pRg st="6" end="6"/>
+                                            </p:txEl>
+                                          </p:spTgt>
+                                        </p:tgtEl>
+                                        <p:attrNameLst>
+                                          <p:attrName>style.visibility</p:attrName>
+                                        </p:attrNameLst>
+                                      </p:cBhvr>
+                                      <p:to>
+                                        <p:strVal val="visible"/>
+                                      </p:to>
+                                    </p:set>
+                                  </p:childTnLst>
+                                </p:cTn>
+                              </p:par>
+                              <p:par>
+                                <p:cTn id="26" presetID="1" presetClass="entr" presetSubtype="0" fill="hold" grpId="0" nodeType="withEffect">
+                                  <p:stCondLst>
+                                    <p:cond delay="0"/>
+                                  </p:stCondLst>
+                                  <p:childTnLst>
+                                    <p:set>
+                                      <p:cBhvr>
+                                        <p:cTn id="27" dur="1" fill="hold">
+                                          <p:stCondLst>
+                                            <p:cond delay="0"/>
+                                          </p:stCondLst>
+                                        </p:cTn>
+                                        <p:tgtEl>
+                                          <p:spTgt spid="3">
+                                            <p:txEl>
+                                              <p:pRg st="7" end="7"/>
+                                            </p:txEl>
+                                          </p:spTgt>
+                                        </p:tgtEl>
+                                        <p:attrNameLst>
+                                          <p:attrName>style.visibility</p:attrName>
+                                        </p:attrNameLst>
+                                      </p:cBhvr>
+                                      <p:to>
+                                        <p:strVal val="visible"/>
+                                      </p:to>
+                                    </p:set>
+                                  </p:childTnLst>
+                                </p:cTn>
+                              </p:par>
+                              <p:par>
+                                <p:cTn id="28" presetID="1" presetClass="entr" presetSubtype="0" fill="hold" grpId="0" nodeType="withEffect">
+                                  <p:stCondLst>
+                                    <p:cond delay="0"/>
+                                  </p:stCondLst>
+                                  <p:childTnLst>
+                                    <p:set>
+                                      <p:cBhvr>
+                                        <p:cTn id="29" dur="1" fill="hold">
+                                          <p:stCondLst>
+                                            <p:cond delay="0"/>
+                                          </p:stCondLst>
+                                        </p:cTn>
+                                        <p:tgtEl>
+                                          <p:spTgt spid="3">
+                                            <p:txEl>
+                                              <p:pRg st="8" end="8"/>
+                                            </p:txEl>
+                                          </p:spTgt>
+                                        </p:tgtEl>
+                                        <p:attrNameLst>
+                                          <p:attrName>style.visibility</p:attrName>
+                                        </p:attrNameLst>
+                                      </p:cBhvr>
+                                      <p:to>
+                                        <p:strVal val="visible"/>
+                                      </p:to>
+                                    </p:set>
+                                  </p:childTnLst>
+                                </p:cTn>
+                              </p:par>
+                            </p:childTnLst>
+                          </p:cTn>
+                        </p:par>
+                      </p:childTnLst>
+                    </p:cTn>
+                  </p:par>
+                  <p:par>
+                    <p:cTn id="30" fill="hold">
+                      <p:stCondLst>
+                        <p:cond delay="indefinite"/>
+                      </p:stCondLst>
+                      <p:childTnLst>
+                        <p:par>
+                          <p:cTn id="31" fill="hold">
+                            <p:stCondLst>
+                              <p:cond delay="0"/>
+                            </p:stCondLst>
+                            <p:childTnLst>
+                              <p:par>
+                                <p:cTn id="32" presetID="1" presetClass="entr" presetSubtype="0" fill="hold" grpId="0" nodeType="clickEffect">
+                                  <p:stCondLst>
+                                    <p:cond delay="0"/>
+                                  </p:stCondLst>
+                                  <p:childTnLst>
+                                    <p:set>
+                                      <p:cBhvr>
+                                        <p:cTn id="33" dur="1" fill="hold">
+                                          <p:stCondLst>
+                                            <p:cond delay="0"/>
+                                          </p:stCondLst>
+                                        </p:cTn>
+                                        <p:tgtEl>
+                                          <p:spTgt spid="5"/>
+                                        </p:tgtEl>
+                                        <p:attrNameLst>
+                                          <p:attrName>style.visibility</p:attrName>
+                                        </p:attrNameLst>
+                                      </p:cBhvr>
+                                      <p:to>
+                                        <p:strVal val="visible"/>
+                                      </p:to>
+                                    </p:set>
+                                  </p:childTnLst>
+                                </p:cTn>
+                              </p:par>
+                            </p:childTnLst>
+                          </p:cTn>
+                        </p:par>
+                      </p:childTnLst>
+                    </p:cTn>
+                  </p:par>
+                </p:childTnLst>
+              </p:cTn>
+              <p:prevCondLst>
+                <p:cond evt="onPrev" delay="0">
+                  <p:tgtEl>
+                    <p:sldTgt/>
+                  </p:tgtEl>
+                </p:cond>
+              </p:prevCondLst>
+              <p:nextCondLst>
+                <p:cond evt="onNext" delay="0">
+                  <p:tgtEl>
+                    <p:sldTgt/>
+                  </p:tgtEl>
+                </p:cond>
+              </p:nextCondLst>
+            </p:seq>
+          </p:childTnLst>
+        </p:cTn>
       </p:par>
     </p:tnLst>
+    <p:bldLst>
+      <p:bldP spid="3" grpId="0" uiExpand="1" build="p" bldLvl="3"/>
+      <p:bldP spid="5" grpId="0" animBg="1"/>
+    </p:bldLst>
   </p:timing>
 </p:sld>
 </file>
@@ -32880,9 +33649,28 @@
           <a:p>
             <a:r>
               <a:rPr lang="en-US" dirty="0" smtClean="0"/>
-              <a:t>Cache lines, again</a:t>
+              <a:t>Multithreading: false sharing</a:t>
             </a:r>
             <a:endParaRPr lang="en-US" dirty="0"/>
+          </a:p>
+        </p:txBody>
+      </p:sp>
+      <p:sp>
+        <p:nvSpPr>
+          <p:cNvPr id="3" name="Text Placeholder 2"/>
+          <p:cNvSpPr>
+            <a:spLocks noGrp="1"/>
+          </p:cNvSpPr>
+          <p:nvPr>
+            <p:ph type="body" idx="1"/>
+          </p:nvPr>
+        </p:nvSpPr>
+        <p:spPr/>
+        <p:txBody>
+          <a:bodyPr/>
+          <a:lstStyle/>
+          <a:p>
+            <a:endParaRPr lang="en-US"/>
           </a:p>
         </p:txBody>
       </p:sp>
@@ -32904,6 +33692,89 @@
             <a:fld id="{6597116C-F94B-4B5B-973A-17F07FB5C418}" type="slidenum">
               <a:rPr lang="nl-BE" smtClean="0"/>
               <a:t>38</a:t>
+            </a:fld>
+            <a:endParaRPr lang="nl-BE"/>
+          </a:p>
+        </p:txBody>
+      </p:sp>
+    </p:spTree>
+    <p:extLst>
+      <p:ext uri="{BB962C8B-B14F-4D97-AF65-F5344CB8AC3E}">
+        <p14:creationId xmlns:p14="http://schemas.microsoft.com/office/powerpoint/2010/main" val="3424948925"/>
+      </p:ext>
+    </p:extLst>
+  </p:cSld>
+  <p:clrMapOvr>
+    <a:masterClrMapping/>
+  </p:clrMapOvr>
+  <p:timing>
+    <p:tnLst>
+      <p:par>
+        <p:cTn id="1" dur="indefinite" restart="never" nodeType="tmRoot"/>
+      </p:par>
+    </p:tnLst>
+  </p:timing>
+</p:sld>
+</file>
+
+<file path=ppt/slides/slide39.xml><?xml version="1.0" encoding="utf-8"?>
+<p:sld xmlns:a="http://schemas.openxmlformats.org/drawingml/2006/main" xmlns:r="http://schemas.openxmlformats.org/officeDocument/2006/relationships" xmlns:p="http://schemas.openxmlformats.org/presentationml/2006/main">
+  <p:cSld>
+    <p:spTree>
+      <p:nvGrpSpPr>
+        <p:cNvPr id="1" name=""/>
+        <p:cNvGrpSpPr/>
+        <p:nvPr/>
+      </p:nvGrpSpPr>
+      <p:grpSpPr>
+        <a:xfrm>
+          <a:off x="0" y="0"/>
+          <a:ext cx="0" cy="0"/>
+          <a:chOff x="0" y="0"/>
+          <a:chExt cx="0" cy="0"/>
+        </a:xfrm>
+      </p:grpSpPr>
+      <p:sp>
+        <p:nvSpPr>
+          <p:cNvPr id="2" name="Title 1"/>
+          <p:cNvSpPr>
+            <a:spLocks noGrp="1"/>
+          </p:cNvSpPr>
+          <p:nvPr>
+            <p:ph type="title"/>
+          </p:nvPr>
+        </p:nvSpPr>
+        <p:spPr/>
+        <p:txBody>
+          <a:bodyPr/>
+          <a:lstStyle/>
+          <a:p>
+            <a:r>
+              <a:rPr lang="en-US" dirty="0" smtClean="0"/>
+              <a:t>Cache lines, again</a:t>
+            </a:r>
+            <a:endParaRPr lang="en-US" dirty="0"/>
+          </a:p>
+        </p:txBody>
+      </p:sp>
+      <p:sp>
+        <p:nvSpPr>
+          <p:cNvPr id="4" name="Slide Number Placeholder 3"/>
+          <p:cNvSpPr>
+            <a:spLocks noGrp="1"/>
+          </p:cNvSpPr>
+          <p:nvPr>
+            <p:ph type="sldNum" sz="quarter" idx="12"/>
+          </p:nvPr>
+        </p:nvSpPr>
+        <p:spPr/>
+        <p:txBody>
+          <a:bodyPr/>
+          <a:lstStyle/>
+          <a:p>
+            <a:fld id="{6597116C-F94B-4B5B-973A-17F07FB5C418}" type="slidenum">
+              <a:rPr lang="nl-BE" smtClean="0"/>
+              <a:t>39</a:t>
             </a:fld>
             <a:endParaRPr lang="nl-BE"/>
           </a:p>
@@ -37669,619 +38540,6 @@
 </p:sld>
 </file>
 
-<file path=ppt/slides/slide39.xml><?xml version="1.0" encoding="utf-8"?>
-<p:sld xmlns:a="http://schemas.openxmlformats.org/drawingml/2006/main" xmlns:r="http://schemas.openxmlformats.org/officeDocument/2006/relationships" xmlns:p="http://schemas.openxmlformats.org/presentationml/2006/main">
-  <p:cSld>
-    <p:spTree>
-      <p:nvGrpSpPr>
-        <p:cNvPr id="1" name=""/>
-        <p:cNvGrpSpPr/>
-        <p:nvPr/>
-      </p:nvGrpSpPr>
-      <p:grpSpPr>
-        <a:xfrm>
-          <a:off x="0" y="0"/>
-          <a:ext cx="0" cy="0"/>
-          <a:chOff x="0" y="0"/>
-          <a:chExt cx="0" cy="0"/>
-        </a:xfrm>
-      </p:grpSpPr>
-      <p:sp>
-        <p:nvSpPr>
-          <p:cNvPr id="2" name="Title 1"/>
-          <p:cNvSpPr>
-            <a:spLocks noGrp="1"/>
-          </p:cNvSpPr>
-          <p:nvPr>
-            <p:ph type="title"/>
-          </p:nvPr>
-        </p:nvSpPr>
-        <p:spPr/>
-        <p:txBody>
-          <a:bodyPr/>
-          <a:lstStyle/>
-          <a:p>
-            <a:r>
-              <a:rPr lang="en-US" dirty="0" smtClean="0"/>
-              <a:t>Bad news and good news</a:t>
-            </a:r>
-            <a:endParaRPr lang="en-US" dirty="0"/>
-          </a:p>
-        </p:txBody>
-      </p:sp>
-      <p:sp>
-        <p:nvSpPr>
-          <p:cNvPr id="3" name="Content Placeholder 2"/>
-          <p:cNvSpPr>
-            <a:spLocks noGrp="1"/>
-          </p:cNvSpPr>
-          <p:nvPr>
-            <p:ph idx="1"/>
-          </p:nvPr>
-        </p:nvSpPr>
-        <p:spPr/>
-        <p:txBody>
-          <a:bodyPr>
-            <a:normAutofit lnSpcReduction="10000"/>
-          </a:bodyPr>
-          <a:lstStyle/>
-          <a:p>
-            <a:r>
-              <a:rPr lang="en-US" dirty="0" smtClean="0"/>
-              <a:t>Bad news: performance</a:t>
-            </a:r>
-          </a:p>
-          <a:p>
-            <a:pPr lvl="1"/>
-            <a:r>
-              <a:rPr lang="en-US" dirty="0" smtClean="0"/>
-              <a:t>degraded by 1.5 to 4</a:t>
-            </a:r>
-          </a:p>
-          <a:p>
-            <a:pPr lvl="1"/>
-            <a:r>
-              <a:rPr lang="en-US" dirty="0" smtClean="0"/>
-              <a:t>can be hard to spot, e.g., global variables close in memory</a:t>
-            </a:r>
-          </a:p>
-          <a:p>
-            <a:r>
-              <a:rPr lang="en-US" dirty="0" smtClean="0"/>
-              <a:t>Good news: compilers</a:t>
-            </a:r>
-          </a:p>
-          <a:p>
-            <a:pPr lvl="1"/>
-            <a:r>
-              <a:rPr lang="en-US" dirty="0" smtClean="0"/>
-              <a:t>compilers detect many cases, make variables implicitly thread-private</a:t>
-            </a:r>
-          </a:p>
-          <a:p>
-            <a:pPr lvl="1"/>
-            <a:r>
-              <a:rPr lang="en-US" dirty="0" smtClean="0"/>
-              <a:t>GCC: </a:t>
-            </a:r>
-            <a:r>
-              <a:rPr lang="en-US" dirty="0" smtClean="0">
-                <a:latin typeface="Courier New" panose="02070309020205020404" pitchFamily="49" charset="0"/>
-                <a:cs typeface="Courier New" panose="02070309020205020404" pitchFamily="49" charset="0"/>
-              </a:rPr>
-              <a:t>-O2</a:t>
-            </a:r>
-            <a:r>
-              <a:rPr lang="en-US" dirty="0" smtClean="0"/>
-              <a:t> or more</a:t>
-            </a:r>
-          </a:p>
-          <a:p>
-            <a:pPr lvl="1"/>
-            <a:r>
-              <a:rPr lang="en-US" dirty="0" smtClean="0"/>
-              <a:t>Intel: </a:t>
-            </a:r>
-            <a:r>
-              <a:rPr lang="en-US" dirty="0" smtClean="0">
-                <a:latin typeface="Courier New" panose="02070309020205020404" pitchFamily="49" charset="0"/>
-                <a:cs typeface="Courier New" panose="02070309020205020404" pitchFamily="49" charset="0"/>
-              </a:rPr>
-              <a:t>-O1</a:t>
-            </a:r>
-            <a:r>
-              <a:rPr lang="en-US" dirty="0" smtClean="0"/>
-              <a:t> or more</a:t>
-            </a:r>
-            <a:endParaRPr lang="en-US" dirty="0"/>
-          </a:p>
-        </p:txBody>
-      </p:sp>
-      <p:sp>
-        <p:nvSpPr>
-          <p:cNvPr id="4" name="Slide Number Placeholder 3"/>
-          <p:cNvSpPr>
-            <a:spLocks noGrp="1"/>
-          </p:cNvSpPr>
-          <p:nvPr>
-            <p:ph type="sldNum" sz="quarter" idx="12"/>
-          </p:nvPr>
-        </p:nvSpPr>
-        <p:spPr/>
-        <p:txBody>
-          <a:bodyPr/>
-          <a:lstStyle/>
-          <a:p>
-            <a:fld id="{6597116C-F94B-4B5B-973A-17F07FB5C418}" type="slidenum">
-              <a:rPr lang="nl-BE" smtClean="0"/>
-              <a:t>39</a:t>
-            </a:fld>
-            <a:endParaRPr lang="nl-BE"/>
-          </a:p>
-        </p:txBody>
-      </p:sp>
-      <p:sp>
-        <p:nvSpPr>
-          <p:cNvPr id="6" name="TextBox 5"/>
-          <p:cNvSpPr txBox="1"/>
-          <p:nvPr/>
-        </p:nvSpPr>
-        <p:spPr>
-          <a:xfrm>
-            <a:off x="1906206" y="5838363"/>
-            <a:ext cx="5285614" cy="830997"/>
-          </a:xfrm>
-          <a:prstGeom prst="rect">
-            <a:avLst/>
-          </a:prstGeom>
-          <a:noFill/>
-          <a:ln>
-            <a:solidFill>
-              <a:schemeClr val="tx1"/>
-            </a:solidFill>
-          </a:ln>
-        </p:spPr>
-        <p:txBody>
-          <a:bodyPr wrap="none" rtlCol="0">
-            <a:spAutoFit/>
-          </a:bodyPr>
-          <a:lstStyle/>
-          <a:p>
-            <a:r>
-              <a:rPr lang="en-US" sz="2400" dirty="0" smtClean="0"/>
-              <a:t>However, compiler won't always remedy,</a:t>
-            </a:r>
-          </a:p>
-          <a:p>
-            <a:pPr algn="ctr"/>
-            <a:r>
-              <a:rPr lang="en-US" sz="2400" dirty="0" smtClean="0"/>
-              <a:t>so avoid false sharing!</a:t>
-            </a:r>
-            <a:endParaRPr lang="en-US" sz="2400" dirty="0"/>
-          </a:p>
-        </p:txBody>
-      </p:sp>
-    </p:spTree>
-    <p:extLst>
-      <p:ext uri="{BB962C8B-B14F-4D97-AF65-F5344CB8AC3E}">
-        <p14:creationId xmlns:p14="http://schemas.microsoft.com/office/powerpoint/2010/main" val="1244630990"/>
-      </p:ext>
-    </p:extLst>
-  </p:cSld>
-  <p:clrMapOvr>
-    <a:masterClrMapping/>
-  </p:clrMapOvr>
-  <p:timing>
-    <p:tnLst>
-      <p:par>
-        <p:cTn id="1" dur="indefinite" restart="never" nodeType="tmRoot">
-          <p:childTnLst>
-            <p:seq concurrent="1" nextAc="seek">
-              <p:cTn id="2" dur="indefinite" nodeType="mainSeq">
-                <p:childTnLst>
-                  <p:par>
-                    <p:cTn id="3" fill="hold">
-                      <p:stCondLst>
-                        <p:cond delay="indefinite"/>
-                        <p:cond evt="onBegin" delay="0">
-                          <p:tn val="2"/>
-                        </p:cond>
-                      </p:stCondLst>
-                      <p:childTnLst>
-                        <p:par>
-                          <p:cTn id="4" fill="hold">
-                            <p:stCondLst>
-                              <p:cond delay="0"/>
-                            </p:stCondLst>
-                            <p:childTnLst>
-                              <p:par>
-                                <p:cTn id="5" presetID="1" presetClass="entr" presetSubtype="0" fill="hold" grpId="0" nodeType="withEffect">
-                                  <p:stCondLst>
-                                    <p:cond delay="0"/>
-                                  </p:stCondLst>
-                                  <p:childTnLst>
-                                    <p:set>
-                                      <p:cBhvr>
-                                        <p:cTn id="6" dur="1" fill="hold">
-                                          <p:stCondLst>
-                                            <p:cond delay="0"/>
-                                          </p:stCondLst>
-                                        </p:cTn>
-                                        <p:tgtEl>
-                                          <p:spTgt spid="3">
-                                            <p:txEl>
-                                              <p:pRg st="0" end="0"/>
-                                            </p:txEl>
-                                          </p:spTgt>
-                                        </p:tgtEl>
-                                        <p:attrNameLst>
-                                          <p:attrName>style.visibility</p:attrName>
-                                        </p:attrNameLst>
-                                      </p:cBhvr>
-                                      <p:to>
-                                        <p:strVal val="visible"/>
-                                      </p:to>
-                                    </p:set>
-                                  </p:childTnLst>
-                                </p:cTn>
-                              </p:par>
-                            </p:childTnLst>
-                          </p:cTn>
-                        </p:par>
-                      </p:childTnLst>
-                    </p:cTn>
-                  </p:par>
-                  <p:par>
-                    <p:cTn id="7" fill="hold">
-                      <p:stCondLst>
-                        <p:cond delay="indefinite"/>
-                      </p:stCondLst>
-                      <p:childTnLst>
-                        <p:par>
-                          <p:cTn id="8" fill="hold">
-                            <p:stCondLst>
-                              <p:cond delay="0"/>
-                            </p:stCondLst>
-                            <p:childTnLst>
-                              <p:par>
-                                <p:cTn id="9" presetID="1" presetClass="entr" presetSubtype="0" fill="hold" grpId="0" nodeType="clickEffect">
-                                  <p:stCondLst>
-                                    <p:cond delay="0"/>
-                                  </p:stCondLst>
-                                  <p:childTnLst>
-                                    <p:set>
-                                      <p:cBhvr>
-                                        <p:cTn id="10" dur="1" fill="hold">
-                                          <p:stCondLst>
-                                            <p:cond delay="0"/>
-                                          </p:stCondLst>
-                                        </p:cTn>
-                                        <p:tgtEl>
-                                          <p:spTgt spid="3">
-                                            <p:txEl>
-                                              <p:pRg st="1" end="1"/>
-                                            </p:txEl>
-                                          </p:spTgt>
-                                        </p:tgtEl>
-                                        <p:attrNameLst>
-                                          <p:attrName>style.visibility</p:attrName>
-                                        </p:attrNameLst>
-                                      </p:cBhvr>
-                                      <p:to>
-                                        <p:strVal val="visible"/>
-                                      </p:to>
-                                    </p:set>
-                                  </p:childTnLst>
-                                </p:cTn>
-                              </p:par>
-                            </p:childTnLst>
-                          </p:cTn>
-                        </p:par>
-                      </p:childTnLst>
-                    </p:cTn>
-                  </p:par>
-                  <p:par>
-                    <p:cTn id="11" fill="hold">
-                      <p:stCondLst>
-                        <p:cond delay="indefinite"/>
-                      </p:stCondLst>
-                      <p:childTnLst>
-                        <p:par>
-                          <p:cTn id="12" fill="hold">
-                            <p:stCondLst>
-                              <p:cond delay="0"/>
-                            </p:stCondLst>
-                            <p:childTnLst>
-                              <p:par>
-                                <p:cTn id="13" presetID="1" presetClass="entr" presetSubtype="0" fill="hold" grpId="0" nodeType="clickEffect">
-                                  <p:stCondLst>
-                                    <p:cond delay="0"/>
-                                  </p:stCondLst>
-                                  <p:childTnLst>
-                                    <p:set>
-                                      <p:cBhvr>
-                                        <p:cTn id="14" dur="1" fill="hold">
-                                          <p:stCondLst>
-                                            <p:cond delay="0"/>
-                                          </p:stCondLst>
-                                        </p:cTn>
-                                        <p:tgtEl>
-                                          <p:spTgt spid="3">
-                                            <p:txEl>
-                                              <p:pRg st="2" end="2"/>
-                                            </p:txEl>
-                                          </p:spTgt>
-                                        </p:tgtEl>
-                                        <p:attrNameLst>
-                                          <p:attrName>style.visibility</p:attrName>
-                                        </p:attrNameLst>
-                                      </p:cBhvr>
-                                      <p:to>
-                                        <p:strVal val="visible"/>
-                                      </p:to>
-                                    </p:set>
-                                  </p:childTnLst>
-                                </p:cTn>
-                              </p:par>
-                            </p:childTnLst>
-                          </p:cTn>
-                        </p:par>
-                      </p:childTnLst>
-                    </p:cTn>
-                  </p:par>
-                  <p:par>
-                    <p:cTn id="15" fill="hold">
-                      <p:stCondLst>
-                        <p:cond delay="indefinite"/>
-                      </p:stCondLst>
-                      <p:childTnLst>
-                        <p:par>
-                          <p:cTn id="16" fill="hold">
-                            <p:stCondLst>
-                              <p:cond delay="0"/>
-                            </p:stCondLst>
-                            <p:childTnLst>
-                              <p:par>
-                                <p:cTn id="17" presetID="1" presetClass="entr" presetSubtype="0" fill="hold" grpId="0" nodeType="clickEffect">
-                                  <p:stCondLst>
-                                    <p:cond delay="0"/>
-                                  </p:stCondLst>
-                                  <p:childTnLst>
-                                    <p:set>
-                                      <p:cBhvr>
-                                        <p:cTn id="18" dur="1" fill="hold">
-                                          <p:stCondLst>
-                                            <p:cond delay="0"/>
-                                          </p:stCondLst>
-                                        </p:cTn>
-                                        <p:tgtEl>
-                                          <p:spTgt spid="3">
-                                            <p:txEl>
-                                              <p:pRg st="3" end="3"/>
-                                            </p:txEl>
-                                          </p:spTgt>
-                                        </p:tgtEl>
-                                        <p:attrNameLst>
-                                          <p:attrName>style.visibility</p:attrName>
-                                        </p:attrNameLst>
-                                      </p:cBhvr>
-                                      <p:to>
-                                        <p:strVal val="visible"/>
-                                      </p:to>
-                                    </p:set>
-                                  </p:childTnLst>
-                                </p:cTn>
-                              </p:par>
-                              <p:par>
-                                <p:cTn id="19" presetID="1" presetClass="entr" presetSubtype="0" fill="hold" grpId="0" nodeType="withEffect">
-                                  <p:stCondLst>
-                                    <p:cond delay="0"/>
-                                  </p:stCondLst>
-                                  <p:childTnLst>
-                                    <p:set>
-                                      <p:cBhvr>
-                                        <p:cTn id="20" dur="1" fill="hold">
-                                          <p:stCondLst>
-                                            <p:cond delay="0"/>
-                                          </p:stCondLst>
-                                        </p:cTn>
-                                        <p:tgtEl>
-                                          <p:spTgt spid="3">
-                                            <p:txEl>
-                                              <p:pRg st="4" end="4"/>
-                                            </p:txEl>
-                                          </p:spTgt>
-                                        </p:tgtEl>
-                                        <p:attrNameLst>
-                                          <p:attrName>style.visibility</p:attrName>
-                                        </p:attrNameLst>
-                                      </p:cBhvr>
-                                      <p:to>
-                                        <p:strVal val="visible"/>
-                                      </p:to>
-                                    </p:set>
-                                  </p:childTnLst>
-                                </p:cTn>
-                              </p:par>
-                            </p:childTnLst>
-                          </p:cTn>
-                        </p:par>
-                      </p:childTnLst>
-                    </p:cTn>
-                  </p:par>
-                  <p:par>
-                    <p:cTn id="21" fill="hold">
-                      <p:stCondLst>
-                        <p:cond delay="indefinite"/>
-                      </p:stCondLst>
-                      <p:childTnLst>
-                        <p:par>
-                          <p:cTn id="22" fill="hold">
-                            <p:stCondLst>
-                              <p:cond delay="0"/>
-                            </p:stCondLst>
-                            <p:childTnLst>
-                              <p:par>
-                                <p:cTn id="23" presetID="1" presetClass="entr" presetSubtype="0" fill="hold" grpId="0" nodeType="clickEffect">
-                                  <p:stCondLst>
-                                    <p:cond delay="0"/>
-                                  </p:stCondLst>
-                                  <p:childTnLst>
-                                    <p:set>
-                                      <p:cBhvr>
-                                        <p:cTn id="24" dur="1" fill="hold">
-                                          <p:stCondLst>
-                                            <p:cond delay="0"/>
-                                          </p:stCondLst>
-                                        </p:cTn>
-                                        <p:tgtEl>
-                                          <p:spTgt spid="3">
-                                            <p:txEl>
-                                              <p:pRg st="5" end="5"/>
-                                            </p:txEl>
-                                          </p:spTgt>
-                                        </p:tgtEl>
-                                        <p:attrNameLst>
-                                          <p:attrName>style.visibility</p:attrName>
-                                        </p:attrNameLst>
-                                      </p:cBhvr>
-                                      <p:to>
-                                        <p:strVal val="visible"/>
-                                      </p:to>
-                                    </p:set>
-                                  </p:childTnLst>
-                                </p:cTn>
-                              </p:par>
-                            </p:childTnLst>
-                          </p:cTn>
-                        </p:par>
-                      </p:childTnLst>
-                    </p:cTn>
-                  </p:par>
-                  <p:par>
-                    <p:cTn id="25" fill="hold">
-                      <p:stCondLst>
-                        <p:cond delay="indefinite"/>
-                      </p:stCondLst>
-                      <p:childTnLst>
-                        <p:par>
-                          <p:cTn id="26" fill="hold">
-                            <p:stCondLst>
-                              <p:cond delay="0"/>
-                            </p:stCondLst>
-                            <p:childTnLst>
-                              <p:par>
-                                <p:cTn id="27" presetID="1" presetClass="entr" presetSubtype="0" fill="hold" grpId="0" nodeType="clickEffect">
-                                  <p:stCondLst>
-                                    <p:cond delay="0"/>
-                                  </p:stCondLst>
-                                  <p:childTnLst>
-                                    <p:set>
-                                      <p:cBhvr>
-                                        <p:cTn id="28" dur="1" fill="hold">
-                                          <p:stCondLst>
-                                            <p:cond delay="0"/>
-                                          </p:stCondLst>
-                                        </p:cTn>
-                                        <p:tgtEl>
-                                          <p:spTgt spid="3">
-                                            <p:txEl>
-                                              <p:pRg st="6" end="6"/>
-                                            </p:txEl>
-                                          </p:spTgt>
-                                        </p:tgtEl>
-                                        <p:attrNameLst>
-                                          <p:attrName>style.visibility</p:attrName>
-                                        </p:attrNameLst>
-                                      </p:cBhvr>
-                                      <p:to>
-                                        <p:strVal val="visible"/>
-                                      </p:to>
-                                    </p:set>
-                                  </p:childTnLst>
-                                </p:cTn>
-                              </p:par>
-                            </p:childTnLst>
-                          </p:cTn>
-                        </p:par>
-                      </p:childTnLst>
-                    </p:cTn>
-                  </p:par>
-                  <p:par>
-                    <p:cTn id="29" fill="hold">
-                      <p:stCondLst>
-                        <p:cond delay="indefinite"/>
-                      </p:stCondLst>
-                      <p:childTnLst>
-                        <p:par>
-                          <p:cTn id="30" fill="hold">
-                            <p:stCondLst>
-                              <p:cond delay="0"/>
-                            </p:stCondLst>
-                            <p:childTnLst>
-                              <p:par>
-                                <p:cTn id="31" presetID="1" presetClass="entr" presetSubtype="0" fill="hold" grpId="0" nodeType="clickEffect">
-                                  <p:stCondLst>
-                                    <p:cond delay="0"/>
-                                  </p:stCondLst>
-                                  <p:childTnLst>
-                                    <p:set>
-                                      <p:cBhvr>
-                                        <p:cTn id="32" dur="1" fill="hold">
-                                          <p:stCondLst>
-                                            <p:cond delay="0"/>
-                                          </p:stCondLst>
-                                        </p:cTn>
-                                        <p:tgtEl>
-                                          <p:spTgt spid="6"/>
-                                        </p:tgtEl>
-                                        <p:attrNameLst>
-                                          <p:attrName>style.visibility</p:attrName>
-                                        </p:attrNameLst>
-                                      </p:cBhvr>
-                                      <p:to>
-                                        <p:strVal val="visible"/>
-                                      </p:to>
-                                    </p:set>
-                                  </p:childTnLst>
-                                </p:cTn>
-                              </p:par>
-                            </p:childTnLst>
-                          </p:cTn>
-                        </p:par>
-                      </p:childTnLst>
-                    </p:cTn>
-                  </p:par>
-                </p:childTnLst>
-              </p:cTn>
-              <p:prevCondLst>
-                <p:cond evt="onPrev" delay="0">
-                  <p:tgtEl>
-                    <p:sldTgt/>
-                  </p:tgtEl>
-                </p:cond>
-              </p:prevCondLst>
-              <p:nextCondLst>
-                <p:cond evt="onNext" delay="0">
-                  <p:tgtEl>
-                    <p:sldTgt/>
-                  </p:tgtEl>
-                </p:cond>
-              </p:nextCondLst>
-            </p:seq>
-          </p:childTnLst>
-        </p:cTn>
-      </p:par>
-    </p:tnLst>
-    <p:bldLst>
-      <p:bldP spid="3" grpId="0" uiExpand="1" build="p" bldLvl="2"/>
-      <p:bldP spid="6" grpId="0" animBg="1"/>
-    </p:bldLst>
-  </p:timing>
-</p:sld>
-</file>
-
 <file path=ppt/slides/slide4.xml><?xml version="1.0" encoding="utf-8"?>
 <p:sld xmlns:a="http://schemas.openxmlformats.org/drawingml/2006/main" xmlns:r="http://schemas.openxmlformats.org/officeDocument/2006/relationships" xmlns:p="http://schemas.openxmlformats.org/presentationml/2006/main">
   <p:cSld>
@@ -39256,6 +39514,619 @@
           <a:p>
             <a:r>
               <a:rPr lang="en-US" dirty="0" smtClean="0"/>
+              <a:t>Bad news and good news</a:t>
+            </a:r>
+            <a:endParaRPr lang="en-US" dirty="0"/>
+          </a:p>
+        </p:txBody>
+      </p:sp>
+      <p:sp>
+        <p:nvSpPr>
+          <p:cNvPr id="3" name="Content Placeholder 2"/>
+          <p:cNvSpPr>
+            <a:spLocks noGrp="1"/>
+          </p:cNvSpPr>
+          <p:nvPr>
+            <p:ph idx="1"/>
+          </p:nvPr>
+        </p:nvSpPr>
+        <p:spPr/>
+        <p:txBody>
+          <a:bodyPr>
+            <a:normAutofit lnSpcReduction="10000"/>
+          </a:bodyPr>
+          <a:lstStyle/>
+          <a:p>
+            <a:r>
+              <a:rPr lang="en-US" dirty="0" smtClean="0"/>
+              <a:t>Bad news: performance</a:t>
+            </a:r>
+          </a:p>
+          <a:p>
+            <a:pPr lvl="1"/>
+            <a:r>
+              <a:rPr lang="en-US" dirty="0" smtClean="0"/>
+              <a:t>degraded by 1.5 to 4</a:t>
+            </a:r>
+          </a:p>
+          <a:p>
+            <a:pPr lvl="1"/>
+            <a:r>
+              <a:rPr lang="en-US" dirty="0" smtClean="0"/>
+              <a:t>can be hard to spot, e.g., global variables close in memory</a:t>
+            </a:r>
+          </a:p>
+          <a:p>
+            <a:r>
+              <a:rPr lang="en-US" dirty="0" smtClean="0"/>
+              <a:t>Good news: compilers</a:t>
+            </a:r>
+          </a:p>
+          <a:p>
+            <a:pPr lvl="1"/>
+            <a:r>
+              <a:rPr lang="en-US" dirty="0" smtClean="0"/>
+              <a:t>compilers detect many cases, make variables implicitly thread-private</a:t>
+            </a:r>
+          </a:p>
+          <a:p>
+            <a:pPr lvl="1"/>
+            <a:r>
+              <a:rPr lang="en-US" dirty="0" smtClean="0"/>
+              <a:t>GCC: </a:t>
+            </a:r>
+            <a:r>
+              <a:rPr lang="en-US" dirty="0" smtClean="0">
+                <a:latin typeface="Courier New" panose="02070309020205020404" pitchFamily="49" charset="0"/>
+                <a:cs typeface="Courier New" panose="02070309020205020404" pitchFamily="49" charset="0"/>
+              </a:rPr>
+              <a:t>-O2</a:t>
+            </a:r>
+            <a:r>
+              <a:rPr lang="en-US" dirty="0" smtClean="0"/>
+              <a:t> or more</a:t>
+            </a:r>
+          </a:p>
+          <a:p>
+            <a:pPr lvl="1"/>
+            <a:r>
+              <a:rPr lang="en-US" dirty="0" smtClean="0"/>
+              <a:t>Intel: </a:t>
+            </a:r>
+            <a:r>
+              <a:rPr lang="en-US" dirty="0" smtClean="0">
+                <a:latin typeface="Courier New" panose="02070309020205020404" pitchFamily="49" charset="0"/>
+                <a:cs typeface="Courier New" panose="02070309020205020404" pitchFamily="49" charset="0"/>
+              </a:rPr>
+              <a:t>-O1</a:t>
+            </a:r>
+            <a:r>
+              <a:rPr lang="en-US" dirty="0" smtClean="0"/>
+              <a:t> or more</a:t>
+            </a:r>
+            <a:endParaRPr lang="en-US" dirty="0"/>
+          </a:p>
+        </p:txBody>
+      </p:sp>
+      <p:sp>
+        <p:nvSpPr>
+          <p:cNvPr id="4" name="Slide Number Placeholder 3"/>
+          <p:cNvSpPr>
+            <a:spLocks noGrp="1"/>
+          </p:cNvSpPr>
+          <p:nvPr>
+            <p:ph type="sldNum" sz="quarter" idx="12"/>
+          </p:nvPr>
+        </p:nvSpPr>
+        <p:spPr/>
+        <p:txBody>
+          <a:bodyPr/>
+          <a:lstStyle/>
+          <a:p>
+            <a:fld id="{6597116C-F94B-4B5B-973A-17F07FB5C418}" type="slidenum">
+              <a:rPr lang="nl-BE" smtClean="0"/>
+              <a:t>40</a:t>
+            </a:fld>
+            <a:endParaRPr lang="nl-BE"/>
+          </a:p>
+        </p:txBody>
+      </p:sp>
+      <p:sp>
+        <p:nvSpPr>
+          <p:cNvPr id="6" name="TextBox 5"/>
+          <p:cNvSpPr txBox="1"/>
+          <p:nvPr/>
+        </p:nvSpPr>
+        <p:spPr>
+          <a:xfrm>
+            <a:off x="1906206" y="5838363"/>
+            <a:ext cx="5285614" cy="830997"/>
+          </a:xfrm>
+          <a:prstGeom prst="rect">
+            <a:avLst/>
+          </a:prstGeom>
+          <a:noFill/>
+          <a:ln>
+            <a:solidFill>
+              <a:schemeClr val="tx1"/>
+            </a:solidFill>
+          </a:ln>
+        </p:spPr>
+        <p:txBody>
+          <a:bodyPr wrap="none" rtlCol="0">
+            <a:spAutoFit/>
+          </a:bodyPr>
+          <a:lstStyle/>
+          <a:p>
+            <a:r>
+              <a:rPr lang="en-US" sz="2400" dirty="0" smtClean="0"/>
+              <a:t>However, compiler won't always remedy,</a:t>
+            </a:r>
+          </a:p>
+          <a:p>
+            <a:pPr algn="ctr"/>
+            <a:r>
+              <a:rPr lang="en-US" sz="2400" dirty="0" smtClean="0"/>
+              <a:t>so avoid false sharing!</a:t>
+            </a:r>
+            <a:endParaRPr lang="en-US" sz="2400" dirty="0"/>
+          </a:p>
+        </p:txBody>
+      </p:sp>
+    </p:spTree>
+    <p:extLst>
+      <p:ext uri="{BB962C8B-B14F-4D97-AF65-F5344CB8AC3E}">
+        <p14:creationId xmlns:p14="http://schemas.microsoft.com/office/powerpoint/2010/main" val="1244630990"/>
+      </p:ext>
+    </p:extLst>
+  </p:cSld>
+  <p:clrMapOvr>
+    <a:masterClrMapping/>
+  </p:clrMapOvr>
+  <p:timing>
+    <p:tnLst>
+      <p:par>
+        <p:cTn id="1" dur="indefinite" restart="never" nodeType="tmRoot">
+          <p:childTnLst>
+            <p:seq concurrent="1" nextAc="seek">
+              <p:cTn id="2" dur="indefinite" nodeType="mainSeq">
+                <p:childTnLst>
+                  <p:par>
+                    <p:cTn id="3" fill="hold">
+                      <p:stCondLst>
+                        <p:cond delay="indefinite"/>
+                        <p:cond evt="onBegin" delay="0">
+                          <p:tn val="2"/>
+                        </p:cond>
+                      </p:stCondLst>
+                      <p:childTnLst>
+                        <p:par>
+                          <p:cTn id="4" fill="hold">
+                            <p:stCondLst>
+                              <p:cond delay="0"/>
+                            </p:stCondLst>
+                            <p:childTnLst>
+                              <p:par>
+                                <p:cTn id="5" presetID="1" presetClass="entr" presetSubtype="0" fill="hold" grpId="0" nodeType="withEffect">
+                                  <p:stCondLst>
+                                    <p:cond delay="0"/>
+                                  </p:stCondLst>
+                                  <p:childTnLst>
+                                    <p:set>
+                                      <p:cBhvr>
+                                        <p:cTn id="6" dur="1" fill="hold">
+                                          <p:stCondLst>
+                                            <p:cond delay="0"/>
+                                          </p:stCondLst>
+                                        </p:cTn>
+                                        <p:tgtEl>
+                                          <p:spTgt spid="3">
+                                            <p:txEl>
+                                              <p:pRg st="0" end="0"/>
+                                            </p:txEl>
+                                          </p:spTgt>
+                                        </p:tgtEl>
+                                        <p:attrNameLst>
+                                          <p:attrName>style.visibility</p:attrName>
+                                        </p:attrNameLst>
+                                      </p:cBhvr>
+                                      <p:to>
+                                        <p:strVal val="visible"/>
+                                      </p:to>
+                                    </p:set>
+                                  </p:childTnLst>
+                                </p:cTn>
+                              </p:par>
+                            </p:childTnLst>
+                          </p:cTn>
+                        </p:par>
+                      </p:childTnLst>
+                    </p:cTn>
+                  </p:par>
+                  <p:par>
+                    <p:cTn id="7" fill="hold">
+                      <p:stCondLst>
+                        <p:cond delay="indefinite"/>
+                      </p:stCondLst>
+                      <p:childTnLst>
+                        <p:par>
+                          <p:cTn id="8" fill="hold">
+                            <p:stCondLst>
+                              <p:cond delay="0"/>
+                            </p:stCondLst>
+                            <p:childTnLst>
+                              <p:par>
+                                <p:cTn id="9" presetID="1" presetClass="entr" presetSubtype="0" fill="hold" grpId="0" nodeType="clickEffect">
+                                  <p:stCondLst>
+                                    <p:cond delay="0"/>
+                                  </p:stCondLst>
+                                  <p:childTnLst>
+                                    <p:set>
+                                      <p:cBhvr>
+                                        <p:cTn id="10" dur="1" fill="hold">
+                                          <p:stCondLst>
+                                            <p:cond delay="0"/>
+                                          </p:stCondLst>
+                                        </p:cTn>
+                                        <p:tgtEl>
+                                          <p:spTgt spid="3">
+                                            <p:txEl>
+                                              <p:pRg st="1" end="1"/>
+                                            </p:txEl>
+                                          </p:spTgt>
+                                        </p:tgtEl>
+                                        <p:attrNameLst>
+                                          <p:attrName>style.visibility</p:attrName>
+                                        </p:attrNameLst>
+                                      </p:cBhvr>
+                                      <p:to>
+                                        <p:strVal val="visible"/>
+                                      </p:to>
+                                    </p:set>
+                                  </p:childTnLst>
+                                </p:cTn>
+                              </p:par>
+                            </p:childTnLst>
+                          </p:cTn>
+                        </p:par>
+                      </p:childTnLst>
+                    </p:cTn>
+                  </p:par>
+                  <p:par>
+                    <p:cTn id="11" fill="hold">
+                      <p:stCondLst>
+                        <p:cond delay="indefinite"/>
+                      </p:stCondLst>
+                      <p:childTnLst>
+                        <p:par>
+                          <p:cTn id="12" fill="hold">
+                            <p:stCondLst>
+                              <p:cond delay="0"/>
+                            </p:stCondLst>
+                            <p:childTnLst>
+                              <p:par>
+                                <p:cTn id="13" presetID="1" presetClass="entr" presetSubtype="0" fill="hold" grpId="0" nodeType="clickEffect">
+                                  <p:stCondLst>
+                                    <p:cond delay="0"/>
+                                  </p:stCondLst>
+                                  <p:childTnLst>
+                                    <p:set>
+                                      <p:cBhvr>
+                                        <p:cTn id="14" dur="1" fill="hold">
+                                          <p:stCondLst>
+                                            <p:cond delay="0"/>
+                                          </p:stCondLst>
+                                        </p:cTn>
+                                        <p:tgtEl>
+                                          <p:spTgt spid="3">
+                                            <p:txEl>
+                                              <p:pRg st="2" end="2"/>
+                                            </p:txEl>
+                                          </p:spTgt>
+                                        </p:tgtEl>
+                                        <p:attrNameLst>
+                                          <p:attrName>style.visibility</p:attrName>
+                                        </p:attrNameLst>
+                                      </p:cBhvr>
+                                      <p:to>
+                                        <p:strVal val="visible"/>
+                                      </p:to>
+                                    </p:set>
+                                  </p:childTnLst>
+                                </p:cTn>
+                              </p:par>
+                            </p:childTnLst>
+                          </p:cTn>
+                        </p:par>
+                      </p:childTnLst>
+                    </p:cTn>
+                  </p:par>
+                  <p:par>
+                    <p:cTn id="15" fill="hold">
+                      <p:stCondLst>
+                        <p:cond delay="indefinite"/>
+                      </p:stCondLst>
+                      <p:childTnLst>
+                        <p:par>
+                          <p:cTn id="16" fill="hold">
+                            <p:stCondLst>
+                              <p:cond delay="0"/>
+                            </p:stCondLst>
+                            <p:childTnLst>
+                              <p:par>
+                                <p:cTn id="17" presetID="1" presetClass="entr" presetSubtype="0" fill="hold" grpId="0" nodeType="clickEffect">
+                                  <p:stCondLst>
+                                    <p:cond delay="0"/>
+                                  </p:stCondLst>
+                                  <p:childTnLst>
+                                    <p:set>
+                                      <p:cBhvr>
+                                        <p:cTn id="18" dur="1" fill="hold">
+                                          <p:stCondLst>
+                                            <p:cond delay="0"/>
+                                          </p:stCondLst>
+                                        </p:cTn>
+                                        <p:tgtEl>
+                                          <p:spTgt spid="3">
+                                            <p:txEl>
+                                              <p:pRg st="3" end="3"/>
+                                            </p:txEl>
+                                          </p:spTgt>
+                                        </p:tgtEl>
+                                        <p:attrNameLst>
+                                          <p:attrName>style.visibility</p:attrName>
+                                        </p:attrNameLst>
+                                      </p:cBhvr>
+                                      <p:to>
+                                        <p:strVal val="visible"/>
+                                      </p:to>
+                                    </p:set>
+                                  </p:childTnLst>
+                                </p:cTn>
+                              </p:par>
+                              <p:par>
+                                <p:cTn id="19" presetID="1" presetClass="entr" presetSubtype="0" fill="hold" grpId="0" nodeType="withEffect">
+                                  <p:stCondLst>
+                                    <p:cond delay="0"/>
+                                  </p:stCondLst>
+                                  <p:childTnLst>
+                                    <p:set>
+                                      <p:cBhvr>
+                                        <p:cTn id="20" dur="1" fill="hold">
+                                          <p:stCondLst>
+                                            <p:cond delay="0"/>
+                                          </p:stCondLst>
+                                        </p:cTn>
+                                        <p:tgtEl>
+                                          <p:spTgt spid="3">
+                                            <p:txEl>
+                                              <p:pRg st="4" end="4"/>
+                                            </p:txEl>
+                                          </p:spTgt>
+                                        </p:tgtEl>
+                                        <p:attrNameLst>
+                                          <p:attrName>style.visibility</p:attrName>
+                                        </p:attrNameLst>
+                                      </p:cBhvr>
+                                      <p:to>
+                                        <p:strVal val="visible"/>
+                                      </p:to>
+                                    </p:set>
+                                  </p:childTnLst>
+                                </p:cTn>
+                              </p:par>
+                            </p:childTnLst>
+                          </p:cTn>
+                        </p:par>
+                      </p:childTnLst>
+                    </p:cTn>
+                  </p:par>
+                  <p:par>
+                    <p:cTn id="21" fill="hold">
+                      <p:stCondLst>
+                        <p:cond delay="indefinite"/>
+                      </p:stCondLst>
+                      <p:childTnLst>
+                        <p:par>
+                          <p:cTn id="22" fill="hold">
+                            <p:stCondLst>
+                              <p:cond delay="0"/>
+                            </p:stCondLst>
+                            <p:childTnLst>
+                              <p:par>
+                                <p:cTn id="23" presetID="1" presetClass="entr" presetSubtype="0" fill="hold" grpId="0" nodeType="clickEffect">
+                                  <p:stCondLst>
+                                    <p:cond delay="0"/>
+                                  </p:stCondLst>
+                                  <p:childTnLst>
+                                    <p:set>
+                                      <p:cBhvr>
+                                        <p:cTn id="24" dur="1" fill="hold">
+                                          <p:stCondLst>
+                                            <p:cond delay="0"/>
+                                          </p:stCondLst>
+                                        </p:cTn>
+                                        <p:tgtEl>
+                                          <p:spTgt spid="3">
+                                            <p:txEl>
+                                              <p:pRg st="5" end="5"/>
+                                            </p:txEl>
+                                          </p:spTgt>
+                                        </p:tgtEl>
+                                        <p:attrNameLst>
+                                          <p:attrName>style.visibility</p:attrName>
+                                        </p:attrNameLst>
+                                      </p:cBhvr>
+                                      <p:to>
+                                        <p:strVal val="visible"/>
+                                      </p:to>
+                                    </p:set>
+                                  </p:childTnLst>
+                                </p:cTn>
+                              </p:par>
+                            </p:childTnLst>
+                          </p:cTn>
+                        </p:par>
+                      </p:childTnLst>
+                    </p:cTn>
+                  </p:par>
+                  <p:par>
+                    <p:cTn id="25" fill="hold">
+                      <p:stCondLst>
+                        <p:cond delay="indefinite"/>
+                      </p:stCondLst>
+                      <p:childTnLst>
+                        <p:par>
+                          <p:cTn id="26" fill="hold">
+                            <p:stCondLst>
+                              <p:cond delay="0"/>
+                            </p:stCondLst>
+                            <p:childTnLst>
+                              <p:par>
+                                <p:cTn id="27" presetID="1" presetClass="entr" presetSubtype="0" fill="hold" grpId="0" nodeType="clickEffect">
+                                  <p:stCondLst>
+                                    <p:cond delay="0"/>
+                                  </p:stCondLst>
+                                  <p:childTnLst>
+                                    <p:set>
+                                      <p:cBhvr>
+                                        <p:cTn id="28" dur="1" fill="hold">
+                                          <p:stCondLst>
+                                            <p:cond delay="0"/>
+                                          </p:stCondLst>
+                                        </p:cTn>
+                                        <p:tgtEl>
+                                          <p:spTgt spid="3">
+                                            <p:txEl>
+                                              <p:pRg st="6" end="6"/>
+                                            </p:txEl>
+                                          </p:spTgt>
+                                        </p:tgtEl>
+                                        <p:attrNameLst>
+                                          <p:attrName>style.visibility</p:attrName>
+                                        </p:attrNameLst>
+                                      </p:cBhvr>
+                                      <p:to>
+                                        <p:strVal val="visible"/>
+                                      </p:to>
+                                    </p:set>
+                                  </p:childTnLst>
+                                </p:cTn>
+                              </p:par>
+                            </p:childTnLst>
+                          </p:cTn>
+                        </p:par>
+                      </p:childTnLst>
+                    </p:cTn>
+                  </p:par>
+                  <p:par>
+                    <p:cTn id="29" fill="hold">
+                      <p:stCondLst>
+                        <p:cond delay="indefinite"/>
+                      </p:stCondLst>
+                      <p:childTnLst>
+                        <p:par>
+                          <p:cTn id="30" fill="hold">
+                            <p:stCondLst>
+                              <p:cond delay="0"/>
+                            </p:stCondLst>
+                            <p:childTnLst>
+                              <p:par>
+                                <p:cTn id="31" presetID="1" presetClass="entr" presetSubtype="0" fill="hold" grpId="0" nodeType="clickEffect">
+                                  <p:stCondLst>
+                                    <p:cond delay="0"/>
+                                  </p:stCondLst>
+                                  <p:childTnLst>
+                                    <p:set>
+                                      <p:cBhvr>
+                                        <p:cTn id="32" dur="1" fill="hold">
+                                          <p:stCondLst>
+                                            <p:cond delay="0"/>
+                                          </p:stCondLst>
+                                        </p:cTn>
+                                        <p:tgtEl>
+                                          <p:spTgt spid="6"/>
+                                        </p:tgtEl>
+                                        <p:attrNameLst>
+                                          <p:attrName>style.visibility</p:attrName>
+                                        </p:attrNameLst>
+                                      </p:cBhvr>
+                                      <p:to>
+                                        <p:strVal val="visible"/>
+                                      </p:to>
+                                    </p:set>
+                                  </p:childTnLst>
+                                </p:cTn>
+                              </p:par>
+                            </p:childTnLst>
+                          </p:cTn>
+                        </p:par>
+                      </p:childTnLst>
+                    </p:cTn>
+                  </p:par>
+                </p:childTnLst>
+              </p:cTn>
+              <p:prevCondLst>
+                <p:cond evt="onPrev" delay="0">
+                  <p:tgtEl>
+                    <p:sldTgt/>
+                  </p:tgtEl>
+                </p:cond>
+              </p:prevCondLst>
+              <p:nextCondLst>
+                <p:cond evt="onNext" delay="0">
+                  <p:tgtEl>
+                    <p:sldTgt/>
+                  </p:tgtEl>
+                </p:cond>
+              </p:nextCondLst>
+            </p:seq>
+          </p:childTnLst>
+        </p:cTn>
+      </p:par>
+    </p:tnLst>
+    <p:bldLst>
+      <p:bldP spid="3" grpId="0" uiExpand="1" build="p" bldLvl="2"/>
+      <p:bldP spid="6" grpId="0" animBg="1"/>
+    </p:bldLst>
+  </p:timing>
+</p:sld>
+</file>
+
+<file path=ppt/slides/slide41.xml><?xml version="1.0" encoding="utf-8"?>
+<p:sld xmlns:a="http://schemas.openxmlformats.org/drawingml/2006/main" xmlns:r="http://schemas.openxmlformats.org/officeDocument/2006/relationships" xmlns:p="http://schemas.openxmlformats.org/presentationml/2006/main">
+  <p:cSld>
+    <p:spTree>
+      <p:nvGrpSpPr>
+        <p:cNvPr id="1" name=""/>
+        <p:cNvGrpSpPr/>
+        <p:nvPr/>
+      </p:nvGrpSpPr>
+      <p:grpSpPr>
+        <a:xfrm>
+          <a:off x="0" y="0"/>
+          <a:ext cx="0" cy="0"/>
+          <a:chOff x="0" y="0"/>
+          <a:chExt cx="0" cy="0"/>
+        </a:xfrm>
+      </p:grpSpPr>
+      <p:sp>
+        <p:nvSpPr>
+          <p:cNvPr id="2" name="Title 1"/>
+          <p:cNvSpPr>
+            <a:spLocks noGrp="1"/>
+          </p:cNvSpPr>
+          <p:nvPr>
+            <p:ph type="title"/>
+          </p:nvPr>
+        </p:nvSpPr>
+        <p:spPr/>
+        <p:txBody>
+          <a:bodyPr/>
+          <a:lstStyle/>
+          <a:p>
+            <a:r>
+              <a:rPr lang="en-US" dirty="0" smtClean="0"/>
               <a:t>How to avoid?</a:t>
             </a:r>
             <a:endParaRPr lang="en-US" dirty="0"/>
@@ -39608,7 +40479,7 @@
           <a:p>
             <a:fld id="{6597116C-F94B-4B5B-973A-17F07FB5C418}" type="slidenum">
               <a:rPr lang="nl-BE" smtClean="0"/>
-              <a:t>40</a:t>
+              <a:t>41</a:t>
             </a:fld>
             <a:endParaRPr lang="nl-BE"/>
           </a:p>
@@ -40051,7 +40922,7 @@
 </p:sld>
 </file>
 
-<file path=ppt/slides/slide41.xml><?xml version="1.0" encoding="utf-8"?>
+<file path=ppt/slides/slide42.xml><?xml version="1.0" encoding="utf-8"?>
 <p:sld xmlns:a="http://schemas.openxmlformats.org/drawingml/2006/main" xmlns:r="http://schemas.openxmlformats.org/officeDocument/2006/relationships" xmlns:p="http://schemas.openxmlformats.org/presentationml/2006/main">
   <p:cSld>
     <p:spTree>
@@ -40106,237 +40977,6 @@
           <a:bodyPr/>
           <a:lstStyle/>
           <a:p>
-            <a:endParaRPr lang="nl-BE" dirty="0"/>
-          </a:p>
-        </p:txBody>
-      </p:sp>
-      <p:sp>
-        <p:nvSpPr>
-          <p:cNvPr id="4" name="Slide Number Placeholder 3"/>
-          <p:cNvSpPr>
-            <a:spLocks noGrp="1"/>
-          </p:cNvSpPr>
-          <p:nvPr>
-            <p:ph type="sldNum" sz="quarter" idx="12"/>
-          </p:nvPr>
-        </p:nvSpPr>
-        <p:spPr/>
-        <p:txBody>
-          <a:bodyPr/>
-          <a:lstStyle/>
-          <a:p>
-            <a:pPr marL="0" marR="0" lvl="0" indent="0" algn="r" defTabSz="914400" rtl="0" eaLnBrk="1" fontAlgn="auto" latinLnBrk="0" hangingPunct="1">
-              <a:lnSpc>
-                <a:spcPct val="100000"/>
-              </a:lnSpc>
-              <a:spcBef>
-                <a:spcPts val="0"/>
-              </a:spcBef>
-              <a:spcAft>
-                <a:spcPts val="0"/>
-              </a:spcAft>
-              <a:buClrTx/>
-              <a:buSzTx/>
-              <a:buFontTx/>
-              <a:buNone/>
-              <a:tabLst/>
-              <a:defRPr/>
-            </a:pPr>
-            <a:fld id="{6597116C-F94B-4B5B-973A-17F07FB5C418}" type="slidenum">
-              <a:rPr kumimoji="0" lang="nl-BE" sz="1200" b="0" i="0" u="none" strike="noStrike" kern="1200" cap="none" spc="0" normalizeH="0" baseline="0" noProof="0" smtClean="0">
-                <a:ln>
-                  <a:noFill/>
-                </a:ln>
-                <a:solidFill>
-                  <a:prstClr val="black">
-                    <a:tint val="75000"/>
-                  </a:prstClr>
-                </a:solidFill>
-                <a:effectLst/>
-                <a:uLnTx/>
-                <a:uFillTx/>
-                <a:latin typeface="Calibri"/>
-                <a:ea typeface="+mn-ea"/>
-                <a:cs typeface="+mn-cs"/>
-              </a:rPr>
-              <a:pPr marL="0" marR="0" lvl="0" indent="0" algn="r" defTabSz="914400" rtl="0" eaLnBrk="1" fontAlgn="auto" latinLnBrk="0" hangingPunct="1">
-                <a:lnSpc>
-                  <a:spcPct val="100000"/>
-                </a:lnSpc>
-                <a:spcBef>
-                  <a:spcPts val="0"/>
-                </a:spcBef>
-                <a:spcAft>
-                  <a:spcPts val="0"/>
-                </a:spcAft>
-                <a:buClrTx/>
-                <a:buSzTx/>
-                <a:buFontTx/>
-                <a:buNone/>
-                <a:tabLst/>
-                <a:defRPr/>
-              </a:pPr>
-              <a:t>41</a:t>
-            </a:fld>
-            <a:endParaRPr kumimoji="0" lang="nl-BE" sz="1200" b="0" i="0" u="none" strike="noStrike" kern="1200" cap="none" spc="0" normalizeH="0" baseline="0" noProof="0">
-              <a:ln>
-                <a:noFill/>
-              </a:ln>
-              <a:solidFill>
-                <a:prstClr val="black">
-                  <a:tint val="75000"/>
-                </a:prstClr>
-              </a:solidFill>
-              <a:effectLst/>
-              <a:uLnTx/>
-              <a:uFillTx/>
-              <a:latin typeface="Calibri"/>
-              <a:ea typeface="+mn-ea"/>
-              <a:cs typeface="+mn-cs"/>
-            </a:endParaRPr>
-          </a:p>
-        </p:txBody>
-      </p:sp>
-    </p:spTree>
-    <p:extLst>
-      <p:ext uri="{BB962C8B-B14F-4D97-AF65-F5344CB8AC3E}">
-        <p14:creationId xmlns:p14="http://schemas.microsoft.com/office/powerpoint/2010/main" val="4264251986"/>
-      </p:ext>
-    </p:extLst>
-  </p:cSld>
-  <p:clrMapOvr>
-    <a:masterClrMapping/>
-  </p:clrMapOvr>
-  <p:timing>
-    <p:tnLst>
-      <p:par>
-        <p:cTn id="1" dur="indefinite" restart="never" nodeType="tmRoot"/>
-      </p:par>
-    </p:tnLst>
-  </p:timing>
-</p:sld>
-</file>
-
-<file path=ppt/slides/slide42.xml><?xml version="1.0" encoding="utf-8"?>
-<p:sld xmlns:a="http://schemas.openxmlformats.org/drawingml/2006/main" xmlns:r="http://schemas.openxmlformats.org/officeDocument/2006/relationships" xmlns:p="http://schemas.openxmlformats.org/presentationml/2006/main">
-  <p:cSld>
-    <p:spTree>
-      <p:nvGrpSpPr>
-        <p:cNvPr id="1" name=""/>
-        <p:cNvGrpSpPr/>
-        <p:nvPr/>
-      </p:nvGrpSpPr>
-      <p:grpSpPr>
-        <a:xfrm>
-          <a:off x="0" y="0"/>
-          <a:ext cx="0" cy="0"/>
-          <a:chOff x="0" y="0"/>
-          <a:chExt cx="0" cy="0"/>
-        </a:xfrm>
-      </p:grpSpPr>
-      <p:sp>
-        <p:nvSpPr>
-          <p:cNvPr id="2" name="Title 1"/>
-          <p:cNvSpPr>
-            <a:spLocks noGrp="1"/>
-          </p:cNvSpPr>
-          <p:nvPr>
-            <p:ph type="title"/>
-          </p:nvPr>
-        </p:nvSpPr>
-        <p:spPr>
-          <a:xfrm>
-            <a:off x="457200" y="249924"/>
-            <a:ext cx="8229600" cy="1143000"/>
-          </a:xfrm>
-        </p:spPr>
-        <p:txBody>
-          <a:bodyPr/>
-          <a:lstStyle/>
-          <a:p>
-            <a:r>
-              <a:rPr lang="en-US" dirty="0" smtClean="0"/>
-              <a:t>Machine balance</a:t>
-            </a:r>
-            <a:endParaRPr lang="nl-BE" dirty="0"/>
-          </a:p>
-        </p:txBody>
-      </p:sp>
-      <p:sp>
-        <p:nvSpPr>
-          <p:cNvPr id="3" name="Content Placeholder 2"/>
-          <p:cNvSpPr>
-            <a:spLocks noGrp="1"/>
-          </p:cNvSpPr>
-          <p:nvPr>
-            <p:ph idx="1"/>
-          </p:nvPr>
-        </p:nvSpPr>
-        <p:spPr/>
-        <p:txBody>
-          <a:bodyPr/>
-          <a:lstStyle/>
-          <a:p>
-            <a:r>
-              <a:rPr lang="nl-BE" dirty="0"/>
-              <a:t>Memory access</a:t>
-            </a:r>
-          </a:p>
-          <a:p>
-            <a:pPr lvl="1"/>
-            <a:r>
-              <a:rPr lang="nl-BE" dirty="0"/>
-              <a:t>bandwidth</a:t>
-            </a:r>
-          </a:p>
-          <a:p>
-            <a:pPr lvl="1"/>
-            <a:r>
-              <a:rPr lang="nl-BE" dirty="0"/>
-              <a:t>Gwords/s </a:t>
-            </a:r>
-            <a:r>
-              <a:rPr lang="nl-BE" dirty="0" smtClean="0"/>
-              <a:t>(double precision gigawords </a:t>
-            </a:r>
-            <a:r>
-              <a:rPr lang="nl-BE" dirty="0"/>
-              <a:t>per </a:t>
-            </a:r>
-            <a:r>
-              <a:rPr lang="nl-BE" dirty="0" smtClean="0"/>
-              <a:t>second)</a:t>
-            </a:r>
-          </a:p>
-          <a:p>
-            <a:r>
-              <a:rPr lang="nl-BE" dirty="0" smtClean="0"/>
-              <a:t>Computation</a:t>
-            </a:r>
-          </a:p>
-          <a:p>
-            <a:pPr lvl="1"/>
-            <a:r>
-              <a:rPr lang="nl-BE" dirty="0" smtClean="0"/>
-              <a:t>peak performance</a:t>
-            </a:r>
-          </a:p>
-          <a:p>
-            <a:pPr lvl="1"/>
-            <a:r>
-              <a:rPr lang="nl-BE" dirty="0"/>
-              <a:t>d</a:t>
-            </a:r>
-            <a:r>
-              <a:rPr lang="nl-BE" dirty="0" smtClean="0"/>
-              <a:t>ouble precision FLOPS/s (FLOating point OPerationS per second)</a:t>
-            </a:r>
-          </a:p>
-          <a:p>
-            <a:r>
-              <a:rPr lang="nl-BE" dirty="0" smtClean="0"/>
-              <a:t>Machine balance</a:t>
-            </a:r>
             <a:endParaRPr lang="nl-BE" dirty="0"/>
           </a:p>
         </p:txBody>
@@ -40408,6 +41048,237 @@
                 <a:defRPr/>
               </a:pPr>
               <a:t>42</a:t>
+            </a:fld>
+            <a:endParaRPr kumimoji="0" lang="nl-BE" sz="1200" b="0" i="0" u="none" strike="noStrike" kern="1200" cap="none" spc="0" normalizeH="0" baseline="0" noProof="0">
+              <a:ln>
+                <a:noFill/>
+              </a:ln>
+              <a:solidFill>
+                <a:prstClr val="black">
+                  <a:tint val="75000"/>
+                </a:prstClr>
+              </a:solidFill>
+              <a:effectLst/>
+              <a:uLnTx/>
+              <a:uFillTx/>
+              <a:latin typeface="Calibri"/>
+              <a:ea typeface="+mn-ea"/>
+              <a:cs typeface="+mn-cs"/>
+            </a:endParaRPr>
+          </a:p>
+        </p:txBody>
+      </p:sp>
+    </p:spTree>
+    <p:extLst>
+      <p:ext uri="{BB962C8B-B14F-4D97-AF65-F5344CB8AC3E}">
+        <p14:creationId xmlns:p14="http://schemas.microsoft.com/office/powerpoint/2010/main" val="4264251986"/>
+      </p:ext>
+    </p:extLst>
+  </p:cSld>
+  <p:clrMapOvr>
+    <a:masterClrMapping/>
+  </p:clrMapOvr>
+  <p:timing>
+    <p:tnLst>
+      <p:par>
+        <p:cTn id="1" dur="indefinite" restart="never" nodeType="tmRoot"/>
+      </p:par>
+    </p:tnLst>
+  </p:timing>
+</p:sld>
+</file>
+
+<file path=ppt/slides/slide43.xml><?xml version="1.0" encoding="utf-8"?>
+<p:sld xmlns:a="http://schemas.openxmlformats.org/drawingml/2006/main" xmlns:r="http://schemas.openxmlformats.org/officeDocument/2006/relationships" xmlns:p="http://schemas.openxmlformats.org/presentationml/2006/main">
+  <p:cSld>
+    <p:spTree>
+      <p:nvGrpSpPr>
+        <p:cNvPr id="1" name=""/>
+        <p:cNvGrpSpPr/>
+        <p:nvPr/>
+      </p:nvGrpSpPr>
+      <p:grpSpPr>
+        <a:xfrm>
+          <a:off x="0" y="0"/>
+          <a:ext cx="0" cy="0"/>
+          <a:chOff x="0" y="0"/>
+          <a:chExt cx="0" cy="0"/>
+        </a:xfrm>
+      </p:grpSpPr>
+      <p:sp>
+        <p:nvSpPr>
+          <p:cNvPr id="2" name="Title 1"/>
+          <p:cNvSpPr>
+            <a:spLocks noGrp="1"/>
+          </p:cNvSpPr>
+          <p:nvPr>
+            <p:ph type="title"/>
+          </p:nvPr>
+        </p:nvSpPr>
+        <p:spPr>
+          <a:xfrm>
+            <a:off x="457200" y="249924"/>
+            <a:ext cx="8229600" cy="1143000"/>
+          </a:xfrm>
+        </p:spPr>
+        <p:txBody>
+          <a:bodyPr/>
+          <a:lstStyle/>
+          <a:p>
+            <a:r>
+              <a:rPr lang="en-US" dirty="0" smtClean="0"/>
+              <a:t>Machine balance</a:t>
+            </a:r>
+            <a:endParaRPr lang="nl-BE" dirty="0"/>
+          </a:p>
+        </p:txBody>
+      </p:sp>
+      <p:sp>
+        <p:nvSpPr>
+          <p:cNvPr id="3" name="Content Placeholder 2"/>
+          <p:cNvSpPr>
+            <a:spLocks noGrp="1"/>
+          </p:cNvSpPr>
+          <p:nvPr>
+            <p:ph idx="1"/>
+          </p:nvPr>
+        </p:nvSpPr>
+        <p:spPr/>
+        <p:txBody>
+          <a:bodyPr/>
+          <a:lstStyle/>
+          <a:p>
+            <a:r>
+              <a:rPr lang="nl-BE" dirty="0"/>
+              <a:t>Memory access</a:t>
+            </a:r>
+          </a:p>
+          <a:p>
+            <a:pPr lvl="1"/>
+            <a:r>
+              <a:rPr lang="nl-BE" dirty="0"/>
+              <a:t>bandwidth</a:t>
+            </a:r>
+          </a:p>
+          <a:p>
+            <a:pPr lvl="1"/>
+            <a:r>
+              <a:rPr lang="nl-BE" dirty="0"/>
+              <a:t>Gwords/s </a:t>
+            </a:r>
+            <a:r>
+              <a:rPr lang="nl-BE" dirty="0" smtClean="0"/>
+              <a:t>(double precision gigawords </a:t>
+            </a:r>
+            <a:r>
+              <a:rPr lang="nl-BE" dirty="0"/>
+              <a:t>per </a:t>
+            </a:r>
+            <a:r>
+              <a:rPr lang="nl-BE" dirty="0" smtClean="0"/>
+              <a:t>second)</a:t>
+            </a:r>
+          </a:p>
+          <a:p>
+            <a:r>
+              <a:rPr lang="nl-BE" dirty="0" smtClean="0"/>
+              <a:t>Computation</a:t>
+            </a:r>
+          </a:p>
+          <a:p>
+            <a:pPr lvl="1"/>
+            <a:r>
+              <a:rPr lang="nl-BE" dirty="0" smtClean="0"/>
+              <a:t>peak performance</a:t>
+            </a:r>
+          </a:p>
+          <a:p>
+            <a:pPr lvl="1"/>
+            <a:r>
+              <a:rPr lang="nl-BE" dirty="0"/>
+              <a:t>d</a:t>
+            </a:r>
+            <a:r>
+              <a:rPr lang="nl-BE" dirty="0" smtClean="0"/>
+              <a:t>ouble precision FLOPS/s (FLOating point OPerationS per second)</a:t>
+            </a:r>
+          </a:p>
+          <a:p>
+            <a:r>
+              <a:rPr lang="nl-BE" dirty="0" smtClean="0"/>
+              <a:t>Machine balance</a:t>
+            </a:r>
+            <a:endParaRPr lang="nl-BE" dirty="0"/>
+          </a:p>
+        </p:txBody>
+      </p:sp>
+      <p:sp>
+        <p:nvSpPr>
+          <p:cNvPr id="4" name="Slide Number Placeholder 3"/>
+          <p:cNvSpPr>
+            <a:spLocks noGrp="1"/>
+          </p:cNvSpPr>
+          <p:nvPr>
+            <p:ph type="sldNum" sz="quarter" idx="12"/>
+          </p:nvPr>
+        </p:nvSpPr>
+        <p:spPr/>
+        <p:txBody>
+          <a:bodyPr/>
+          <a:lstStyle/>
+          <a:p>
+            <a:pPr marL="0" marR="0" lvl="0" indent="0" algn="r" defTabSz="914400" rtl="0" eaLnBrk="1" fontAlgn="auto" latinLnBrk="0" hangingPunct="1">
+              <a:lnSpc>
+                <a:spcPct val="100000"/>
+              </a:lnSpc>
+              <a:spcBef>
+                <a:spcPts val="0"/>
+              </a:spcBef>
+              <a:spcAft>
+                <a:spcPts val="0"/>
+              </a:spcAft>
+              <a:buClrTx/>
+              <a:buSzTx/>
+              <a:buFontTx/>
+              <a:buNone/>
+              <a:tabLst/>
+              <a:defRPr/>
+            </a:pPr>
+            <a:fld id="{6597116C-F94B-4B5B-973A-17F07FB5C418}" type="slidenum">
+              <a:rPr kumimoji="0" lang="nl-BE" sz="1200" b="0" i="0" u="none" strike="noStrike" kern="1200" cap="none" spc="0" normalizeH="0" baseline="0" noProof="0" smtClean="0">
+                <a:ln>
+                  <a:noFill/>
+                </a:ln>
+                <a:solidFill>
+                  <a:prstClr val="black">
+                    <a:tint val="75000"/>
+                  </a:prstClr>
+                </a:solidFill>
+                <a:effectLst/>
+                <a:uLnTx/>
+                <a:uFillTx/>
+                <a:latin typeface="Calibri"/>
+                <a:ea typeface="+mn-ea"/>
+                <a:cs typeface="+mn-cs"/>
+              </a:rPr>
+              <a:pPr marL="0" marR="0" lvl="0" indent="0" algn="r" defTabSz="914400" rtl="0" eaLnBrk="1" fontAlgn="auto" latinLnBrk="0" hangingPunct="1">
+                <a:lnSpc>
+                  <a:spcPct val="100000"/>
+                </a:lnSpc>
+                <a:spcBef>
+                  <a:spcPts val="0"/>
+                </a:spcBef>
+                <a:spcAft>
+                  <a:spcPts val="0"/>
+                </a:spcAft>
+                <a:buClrTx/>
+                <a:buSzTx/>
+                <a:buFontTx/>
+                <a:buNone/>
+                <a:tabLst/>
+                <a:defRPr/>
+              </a:pPr>
+              <a:t>43</a:t>
             </a:fld>
             <a:endParaRPr kumimoji="0" lang="nl-BE" sz="1200" b="0" i="0" u="none" strike="noStrike" kern="1200" cap="none" spc="0" normalizeH="0" baseline="0" noProof="0">
               <a:ln>
@@ -40957,7 +41828,7 @@
 </p:sld>
 </file>
 
-<file path=ppt/slides/slide43.xml><?xml version="1.0" encoding="utf-8"?>
+<file path=ppt/slides/slide44.xml><?xml version="1.0" encoding="utf-8"?>
 <p:sld xmlns:a="http://schemas.openxmlformats.org/drawingml/2006/main" xmlns:r="http://schemas.openxmlformats.org/officeDocument/2006/relationships" xmlns:p="http://schemas.openxmlformats.org/presentationml/2006/main">
   <p:cSld>
     <p:spTree>
@@ -41072,7 +41943,7 @@
           <a:p>
             <a:fld id="{6597116C-F94B-4B5B-973A-17F07FB5C418}" type="slidenum">
               <a:rPr lang="nl-BE" smtClean="0"/>
-              <a:t>43</a:t>
+              <a:t>44</a:t>
             </a:fld>
             <a:endParaRPr lang="nl-BE"/>
           </a:p>
@@ -41745,7 +42616,7 @@
 </p:sld>
 </file>
 
-<file path=ppt/slides/slide44.xml><?xml version="1.0" encoding="utf-8"?>
+<file path=ppt/slides/slide45.xml><?xml version="1.0" encoding="utf-8"?>
 <p:sld xmlns:a="http://schemas.openxmlformats.org/drawingml/2006/main" xmlns:r="http://schemas.openxmlformats.org/officeDocument/2006/relationships" xmlns:p="http://schemas.openxmlformats.org/presentationml/2006/main">
   <p:cSld>
     <p:spTree>
@@ -41915,7 +42786,7 @@
           <a:p>
             <a:fld id="{6597116C-F94B-4B5B-973A-17F07FB5C418}" type="slidenum">
               <a:rPr lang="nl-BE" smtClean="0"/>
-              <a:t>44</a:t>
+              <a:t>45</a:t>
             </a:fld>
             <a:endParaRPr lang="nl-BE"/>
           </a:p>
@@ -42524,7 +43395,7 @@
 </p:sld>
 </file>
 
-<file path=ppt/slides/slide45.xml><?xml version="1.0" encoding="utf-8"?>
+<file path=ppt/slides/slide46.xml><?xml version="1.0" encoding="utf-8"?>
 <p:sld xmlns:a="http://schemas.openxmlformats.org/drawingml/2006/main" xmlns:r="http://schemas.openxmlformats.org/officeDocument/2006/relationships" xmlns:p="http://schemas.openxmlformats.org/presentationml/2006/main">
   <p:cSld>
     <p:spTree>
@@ -42858,7 +43729,7 @@
           <a:p>
             <a:fld id="{6597116C-F94B-4B5B-973A-17F07FB5C418}" type="slidenum">
               <a:rPr lang="nl-BE" smtClean="0"/>
-              <a:t>45</a:t>
+              <a:t>46</a:t>
             </a:fld>
             <a:endParaRPr lang="nl-BE"/>
           </a:p>
@@ -44359,108 +45230,6 @@
 </p:sld>
 </file>
 
-<file path=ppt/slides/slide46.xml><?xml version="1.0" encoding="utf-8"?>
-<p:sld xmlns:a="http://schemas.openxmlformats.org/drawingml/2006/main" xmlns:r="http://schemas.openxmlformats.org/officeDocument/2006/relationships" xmlns:p="http://schemas.openxmlformats.org/presentationml/2006/main">
-  <p:cSld>
-    <p:spTree>
-      <p:nvGrpSpPr>
-        <p:cNvPr id="1" name=""/>
-        <p:cNvGrpSpPr/>
-        <p:nvPr/>
-      </p:nvGrpSpPr>
-      <p:grpSpPr>
-        <a:xfrm>
-          <a:off x="0" y="0"/>
-          <a:ext cx="0" cy="0"/>
-          <a:chOff x="0" y="0"/>
-          <a:chExt cx="0" cy="0"/>
-        </a:xfrm>
-      </p:grpSpPr>
-      <p:sp>
-        <p:nvSpPr>
-          <p:cNvPr id="2" name="Title 1"/>
-          <p:cNvSpPr>
-            <a:spLocks noGrp="1"/>
-          </p:cNvSpPr>
-          <p:nvPr>
-            <p:ph type="title"/>
-          </p:nvPr>
-        </p:nvSpPr>
-        <p:spPr/>
-        <p:txBody>
-          <a:bodyPr/>
-          <a:lstStyle/>
-          <a:p>
-            <a:r>
-              <a:rPr lang="en-US" dirty="0" smtClean="0"/>
-              <a:t>Feedback-guided optimization</a:t>
-            </a:r>
-            <a:endParaRPr lang="en-US" dirty="0"/>
-          </a:p>
-        </p:txBody>
-      </p:sp>
-      <p:sp>
-        <p:nvSpPr>
-          <p:cNvPr id="3" name="Text Placeholder 2"/>
-          <p:cNvSpPr>
-            <a:spLocks noGrp="1"/>
-          </p:cNvSpPr>
-          <p:nvPr>
-            <p:ph type="body" idx="1"/>
-          </p:nvPr>
-        </p:nvSpPr>
-        <p:spPr/>
-        <p:txBody>
-          <a:bodyPr/>
-          <a:lstStyle/>
-          <a:p>
-            <a:endParaRPr lang="en-US"/>
-          </a:p>
-        </p:txBody>
-      </p:sp>
-      <p:sp>
-        <p:nvSpPr>
-          <p:cNvPr id="4" name="Slide Number Placeholder 3"/>
-          <p:cNvSpPr>
-            <a:spLocks noGrp="1"/>
-          </p:cNvSpPr>
-          <p:nvPr>
-            <p:ph type="sldNum" sz="quarter" idx="12"/>
-          </p:nvPr>
-        </p:nvSpPr>
-        <p:spPr/>
-        <p:txBody>
-          <a:bodyPr/>
-          <a:lstStyle/>
-          <a:p>
-            <a:fld id="{6597116C-F94B-4B5B-973A-17F07FB5C418}" type="slidenum">
-              <a:rPr lang="nl-BE" smtClean="0"/>
-              <a:t>46</a:t>
-            </a:fld>
-            <a:endParaRPr lang="nl-BE"/>
-          </a:p>
-        </p:txBody>
-      </p:sp>
-    </p:spTree>
-    <p:extLst>
-      <p:ext uri="{BB962C8B-B14F-4D97-AF65-F5344CB8AC3E}">
-        <p14:creationId xmlns:p14="http://schemas.microsoft.com/office/powerpoint/2010/main" val="3251639006"/>
-      </p:ext>
-    </p:extLst>
-  </p:cSld>
-  <p:clrMapOvr>
-    <a:masterClrMapping/>
-  </p:clrMapOvr>
-  <p:timing>
-    <p:tnLst>
-      <p:par>
-        <p:cTn id="1" dur="indefinite" restart="never" nodeType="tmRoot"/>
-      </p:par>
-    </p:tnLst>
-  </p:timing>
-</p:sld>
-</file>
-
 <file path=ppt/slides/slide47.xml><?xml version="1.0" encoding="utf-8"?>
 <p:sld xmlns:a="http://schemas.openxmlformats.org/drawingml/2006/main" xmlns:r="http://schemas.openxmlformats.org/officeDocument/2006/relationships" xmlns:p="http://schemas.openxmlformats.org/presentationml/2006/main">
   <p:cSld>
@@ -44495,6 +45264,108 @@
           <a:p>
             <a:r>
               <a:rPr lang="en-US" dirty="0" smtClean="0"/>
+              <a:t>Feedback-guided optimization</a:t>
+            </a:r>
+            <a:endParaRPr lang="en-US" dirty="0"/>
+          </a:p>
+        </p:txBody>
+      </p:sp>
+      <p:sp>
+        <p:nvSpPr>
+          <p:cNvPr id="3" name="Text Placeholder 2"/>
+          <p:cNvSpPr>
+            <a:spLocks noGrp="1"/>
+          </p:cNvSpPr>
+          <p:nvPr>
+            <p:ph type="body" idx="1"/>
+          </p:nvPr>
+        </p:nvSpPr>
+        <p:spPr/>
+        <p:txBody>
+          <a:bodyPr/>
+          <a:lstStyle/>
+          <a:p>
+            <a:endParaRPr lang="en-US"/>
+          </a:p>
+        </p:txBody>
+      </p:sp>
+      <p:sp>
+        <p:nvSpPr>
+          <p:cNvPr id="4" name="Slide Number Placeholder 3"/>
+          <p:cNvSpPr>
+            <a:spLocks noGrp="1"/>
+          </p:cNvSpPr>
+          <p:nvPr>
+            <p:ph type="sldNum" sz="quarter" idx="12"/>
+          </p:nvPr>
+        </p:nvSpPr>
+        <p:spPr/>
+        <p:txBody>
+          <a:bodyPr/>
+          <a:lstStyle/>
+          <a:p>
+            <a:fld id="{6597116C-F94B-4B5B-973A-17F07FB5C418}" type="slidenum">
+              <a:rPr lang="nl-BE" smtClean="0"/>
+              <a:t>47</a:t>
+            </a:fld>
+            <a:endParaRPr lang="nl-BE"/>
+          </a:p>
+        </p:txBody>
+      </p:sp>
+    </p:spTree>
+    <p:extLst>
+      <p:ext uri="{BB962C8B-B14F-4D97-AF65-F5344CB8AC3E}">
+        <p14:creationId xmlns:p14="http://schemas.microsoft.com/office/powerpoint/2010/main" val="3251639006"/>
+      </p:ext>
+    </p:extLst>
+  </p:cSld>
+  <p:clrMapOvr>
+    <a:masterClrMapping/>
+  </p:clrMapOvr>
+  <p:timing>
+    <p:tnLst>
+      <p:par>
+        <p:cTn id="1" dur="indefinite" restart="never" nodeType="tmRoot"/>
+      </p:par>
+    </p:tnLst>
+  </p:timing>
+</p:sld>
+</file>
+
+<file path=ppt/slides/slide48.xml><?xml version="1.0" encoding="utf-8"?>
+<p:sld xmlns:a="http://schemas.openxmlformats.org/drawingml/2006/main" xmlns:r="http://schemas.openxmlformats.org/officeDocument/2006/relationships" xmlns:p="http://schemas.openxmlformats.org/presentationml/2006/main">
+  <p:cSld>
+    <p:spTree>
+      <p:nvGrpSpPr>
+        <p:cNvPr id="1" name=""/>
+        <p:cNvGrpSpPr/>
+        <p:nvPr/>
+      </p:nvGrpSpPr>
+      <p:grpSpPr>
+        <a:xfrm>
+          <a:off x="0" y="0"/>
+          <a:ext cx="0" cy="0"/>
+          <a:chOff x="0" y="0"/>
+          <a:chExt cx="0" cy="0"/>
+        </a:xfrm>
+      </p:grpSpPr>
+      <p:sp>
+        <p:nvSpPr>
+          <p:cNvPr id="2" name="Title 1"/>
+          <p:cNvSpPr>
+            <a:spLocks noGrp="1"/>
+          </p:cNvSpPr>
+          <p:nvPr>
+            <p:ph type="title"/>
+          </p:nvPr>
+        </p:nvSpPr>
+        <p:spPr/>
+        <p:txBody>
+          <a:bodyPr/>
+          <a:lstStyle/>
+          <a:p>
+            <a:r>
+              <a:rPr lang="en-US" dirty="0" smtClean="0"/>
               <a:t>Philosophy</a:t>
             </a:r>
             <a:endParaRPr lang="en-US" dirty="0"/>
@@ -44597,7 +45468,7 @@
           <a:p>
             <a:fld id="{6597116C-F94B-4B5B-973A-17F07FB5C418}" type="slidenum">
               <a:rPr lang="nl-BE" smtClean="0"/>
-              <a:t>47</a:t>
+              <a:t>48</a:t>
             </a:fld>
             <a:endParaRPr lang="nl-BE"/>
           </a:p>
@@ -45075,7 +45946,7 @@
 </p:sld>
 </file>
 
-<file path=ppt/slides/slide48.xml><?xml version="1.0" encoding="utf-8"?>
+<file path=ppt/slides/slide49.xml><?xml version="1.0" encoding="utf-8"?>
 <p:sld xmlns:a="http://schemas.openxmlformats.org/drawingml/2006/main" xmlns:r="http://schemas.openxmlformats.org/officeDocument/2006/relationships" xmlns:p="http://schemas.openxmlformats.org/presentationml/2006/main">
   <p:cSld>
     <p:spTree>
@@ -45170,7 +46041,7 @@
           <a:p>
             <a:fld id="{6597116C-F94B-4B5B-973A-17F07FB5C418}" type="slidenum">
               <a:rPr lang="nl-BE" smtClean="0"/>
-              <a:t>48</a:t>
+              <a:t>49</a:t>
             </a:fld>
             <a:endParaRPr lang="nl-BE"/>
           </a:p>
@@ -45354,519 +46225,6 @@
     <p:extLst>
       <p:ext uri="{BB962C8B-B14F-4D97-AF65-F5344CB8AC3E}">
         <p14:creationId xmlns:p14="http://schemas.microsoft.com/office/powerpoint/2010/main" val="2433576050"/>
-      </p:ext>
-    </p:extLst>
-  </p:cSld>
-  <p:clrMapOvr>
-    <a:masterClrMapping/>
-  </p:clrMapOvr>
-  <p:timing>
-    <p:tnLst>
-      <p:par>
-        <p:cTn id="1" dur="indefinite" restart="never" nodeType="tmRoot">
-          <p:childTnLst>
-            <p:seq concurrent="1" nextAc="seek">
-              <p:cTn id="2" dur="indefinite" nodeType="mainSeq">
-                <p:childTnLst>
-                  <p:par>
-                    <p:cTn id="3" fill="hold">
-                      <p:stCondLst>
-                        <p:cond delay="indefinite"/>
-                        <p:cond evt="onBegin" delay="0">
-                          <p:tn val="2"/>
-                        </p:cond>
-                      </p:stCondLst>
-                      <p:childTnLst>
-                        <p:par>
-                          <p:cTn id="4" fill="hold">
-                            <p:stCondLst>
-                              <p:cond delay="0"/>
-                            </p:stCondLst>
-                            <p:childTnLst>
-                              <p:par>
-                                <p:cTn id="5" presetID="1" presetClass="entr" presetSubtype="0" fill="hold" grpId="0" nodeType="withEffect">
-                                  <p:stCondLst>
-                                    <p:cond delay="0"/>
-                                  </p:stCondLst>
-                                  <p:childTnLst>
-                                    <p:set>
-                                      <p:cBhvr>
-                                        <p:cTn id="6" dur="1" fill="hold">
-                                          <p:stCondLst>
-                                            <p:cond delay="0"/>
-                                          </p:stCondLst>
-                                        </p:cTn>
-                                        <p:tgtEl>
-                                          <p:spTgt spid="3">
-                                            <p:txEl>
-                                              <p:pRg st="0" end="0"/>
-                                            </p:txEl>
-                                          </p:spTgt>
-                                        </p:tgtEl>
-                                        <p:attrNameLst>
-                                          <p:attrName>style.visibility</p:attrName>
-                                        </p:attrNameLst>
-                                      </p:cBhvr>
-                                      <p:to>
-                                        <p:strVal val="visible"/>
-                                      </p:to>
-                                    </p:set>
-                                  </p:childTnLst>
-                                </p:cTn>
-                              </p:par>
-                              <p:par>
-                                <p:cTn id="7" presetID="1" presetClass="entr" presetSubtype="0" fill="hold" grpId="0" nodeType="withEffect">
-                                  <p:stCondLst>
-                                    <p:cond delay="0"/>
-                                  </p:stCondLst>
-                                  <p:childTnLst>
-                                    <p:set>
-                                      <p:cBhvr>
-                                        <p:cTn id="8" dur="1" fill="hold">
-                                          <p:stCondLst>
-                                            <p:cond delay="0"/>
-                                          </p:stCondLst>
-                                        </p:cTn>
-                                        <p:tgtEl>
-                                          <p:spTgt spid="5"/>
-                                        </p:tgtEl>
-                                        <p:attrNameLst>
-                                          <p:attrName>style.visibility</p:attrName>
-                                        </p:attrNameLst>
-                                      </p:cBhvr>
-                                      <p:to>
-                                        <p:strVal val="visible"/>
-                                      </p:to>
-                                    </p:set>
-                                  </p:childTnLst>
-                                </p:cTn>
-                              </p:par>
-                            </p:childTnLst>
-                          </p:cTn>
-                        </p:par>
-                      </p:childTnLst>
-                    </p:cTn>
-                  </p:par>
-                  <p:par>
-                    <p:cTn id="9" fill="hold">
-                      <p:stCondLst>
-                        <p:cond delay="indefinite"/>
-                      </p:stCondLst>
-                      <p:childTnLst>
-                        <p:par>
-                          <p:cTn id="10" fill="hold">
-                            <p:stCondLst>
-                              <p:cond delay="0"/>
-                            </p:stCondLst>
-                            <p:childTnLst>
-                              <p:par>
-                                <p:cTn id="11" presetID="1" presetClass="entr" presetSubtype="0" fill="hold" grpId="0" nodeType="clickEffect">
-                                  <p:stCondLst>
-                                    <p:cond delay="0"/>
-                                  </p:stCondLst>
-                                  <p:childTnLst>
-                                    <p:set>
-                                      <p:cBhvr>
-                                        <p:cTn id="12" dur="1" fill="hold">
-                                          <p:stCondLst>
-                                            <p:cond delay="0"/>
-                                          </p:stCondLst>
-                                        </p:cTn>
-                                        <p:tgtEl>
-                                          <p:spTgt spid="3">
-                                            <p:txEl>
-                                              <p:pRg st="2" end="2"/>
-                                            </p:txEl>
-                                          </p:spTgt>
-                                        </p:tgtEl>
-                                        <p:attrNameLst>
-                                          <p:attrName>style.visibility</p:attrName>
-                                        </p:attrNameLst>
-                                      </p:cBhvr>
-                                      <p:to>
-                                        <p:strVal val="visible"/>
-                                      </p:to>
-                                    </p:set>
-                                  </p:childTnLst>
-                                </p:cTn>
-                              </p:par>
-                            </p:childTnLst>
-                          </p:cTn>
-                        </p:par>
-                      </p:childTnLst>
-                    </p:cTn>
-                  </p:par>
-                  <p:par>
-                    <p:cTn id="13" fill="hold">
-                      <p:stCondLst>
-                        <p:cond delay="indefinite"/>
-                      </p:stCondLst>
-                      <p:childTnLst>
-                        <p:par>
-                          <p:cTn id="14" fill="hold">
-                            <p:stCondLst>
-                              <p:cond delay="0"/>
-                            </p:stCondLst>
-                            <p:childTnLst>
-                              <p:par>
-                                <p:cTn id="15" presetID="1" presetClass="entr" presetSubtype="0" fill="hold" grpId="0" nodeType="clickEffect">
-                                  <p:stCondLst>
-                                    <p:cond delay="0"/>
-                                  </p:stCondLst>
-                                  <p:childTnLst>
-                                    <p:set>
-                                      <p:cBhvr>
-                                        <p:cTn id="16" dur="1" fill="hold">
-                                          <p:stCondLst>
-                                            <p:cond delay="0"/>
-                                          </p:stCondLst>
-                                        </p:cTn>
-                                        <p:tgtEl>
-                                          <p:spTgt spid="3">
-                                            <p:txEl>
-                                              <p:pRg st="3" end="3"/>
-                                            </p:txEl>
-                                          </p:spTgt>
-                                        </p:tgtEl>
-                                        <p:attrNameLst>
-                                          <p:attrName>style.visibility</p:attrName>
-                                        </p:attrNameLst>
-                                      </p:cBhvr>
-                                      <p:to>
-                                        <p:strVal val="visible"/>
-                                      </p:to>
-                                    </p:set>
-                                  </p:childTnLst>
-                                </p:cTn>
-                              </p:par>
-                              <p:par>
-                                <p:cTn id="17" presetID="1" presetClass="entr" presetSubtype="0" fill="hold" grpId="0" nodeType="withEffect">
-                                  <p:stCondLst>
-                                    <p:cond delay="0"/>
-                                  </p:stCondLst>
-                                  <p:childTnLst>
-                                    <p:set>
-                                      <p:cBhvr>
-                                        <p:cTn id="18" dur="1" fill="hold">
-                                          <p:stCondLst>
-                                            <p:cond delay="0"/>
-                                          </p:stCondLst>
-                                        </p:cTn>
-                                        <p:tgtEl>
-                                          <p:spTgt spid="6"/>
-                                        </p:tgtEl>
-                                        <p:attrNameLst>
-                                          <p:attrName>style.visibility</p:attrName>
-                                        </p:attrNameLst>
-                                      </p:cBhvr>
-                                      <p:to>
-                                        <p:strVal val="visible"/>
-                                      </p:to>
-                                    </p:set>
-                                  </p:childTnLst>
-                                </p:cTn>
-                              </p:par>
-                            </p:childTnLst>
-                          </p:cTn>
-                        </p:par>
-                      </p:childTnLst>
-                    </p:cTn>
-                  </p:par>
-                </p:childTnLst>
-              </p:cTn>
-              <p:prevCondLst>
-                <p:cond evt="onPrev" delay="0">
-                  <p:tgtEl>
-                    <p:sldTgt/>
-                  </p:tgtEl>
-                </p:cond>
-              </p:prevCondLst>
-              <p:nextCondLst>
-                <p:cond evt="onNext" delay="0">
-                  <p:tgtEl>
-                    <p:sldTgt/>
-                  </p:tgtEl>
-                </p:cond>
-              </p:nextCondLst>
-            </p:seq>
-          </p:childTnLst>
-        </p:cTn>
-      </p:par>
-    </p:tnLst>
-    <p:bldLst>
-      <p:bldP spid="3" grpId="0" uiExpand="1" build="p"/>
-      <p:bldP spid="5" grpId="0" animBg="1"/>
-      <p:bldP spid="6" grpId="0" animBg="1"/>
-    </p:bldLst>
-  </p:timing>
-</p:sld>
-</file>
-
-<file path=ppt/slides/slide49.xml><?xml version="1.0" encoding="utf-8"?>
-<p:sld xmlns:a="http://schemas.openxmlformats.org/drawingml/2006/main" xmlns:r="http://schemas.openxmlformats.org/officeDocument/2006/relationships" xmlns:p="http://schemas.openxmlformats.org/presentationml/2006/main">
-  <p:cSld>
-    <p:spTree>
-      <p:nvGrpSpPr>
-        <p:cNvPr id="1" name=""/>
-        <p:cNvGrpSpPr/>
-        <p:nvPr/>
-      </p:nvGrpSpPr>
-      <p:grpSpPr>
-        <a:xfrm>
-          <a:off x="0" y="0"/>
-          <a:ext cx="0" cy="0"/>
-          <a:chOff x="0" y="0"/>
-          <a:chExt cx="0" cy="0"/>
-        </a:xfrm>
-      </p:grpSpPr>
-      <p:sp>
-        <p:nvSpPr>
-          <p:cNvPr id="2" name="Title 1"/>
-          <p:cNvSpPr>
-            <a:spLocks noGrp="1"/>
-          </p:cNvSpPr>
-          <p:nvPr>
-            <p:ph type="title"/>
-          </p:nvPr>
-        </p:nvSpPr>
-        <p:spPr/>
-        <p:txBody>
-          <a:bodyPr/>
-          <a:lstStyle/>
-          <a:p>
-            <a:r>
-              <a:rPr lang="en-US" dirty="0" smtClean="0"/>
-              <a:t>Intel compilers</a:t>
-            </a:r>
-            <a:endParaRPr lang="en-US" dirty="0"/>
-          </a:p>
-        </p:txBody>
-      </p:sp>
-      <p:sp>
-        <p:nvSpPr>
-          <p:cNvPr id="3" name="Content Placeholder 2"/>
-          <p:cNvSpPr>
-            <a:spLocks noGrp="1"/>
-          </p:cNvSpPr>
-          <p:nvPr>
-            <p:ph idx="1"/>
-          </p:nvPr>
-        </p:nvSpPr>
-        <p:spPr/>
-        <p:txBody>
-          <a:bodyPr/>
-          <a:lstStyle/>
-          <a:p>
-            <a:r>
-              <a:rPr lang="en-US" dirty="0" smtClean="0"/>
-              <a:t>Build with instrumentation</a:t>
-            </a:r>
-          </a:p>
-          <a:p>
-            <a:endParaRPr lang="en-US" dirty="0"/>
-          </a:p>
-          <a:p>
-            <a:r>
-              <a:rPr lang="en-US" dirty="0" smtClean="0"/>
-              <a:t>Run as usual</a:t>
-            </a:r>
-          </a:p>
-          <a:p>
-            <a:r>
-              <a:rPr lang="en-US" dirty="0" smtClean="0"/>
-              <a:t>Build using profile</a:t>
-            </a:r>
-            <a:endParaRPr lang="en-US" dirty="0"/>
-          </a:p>
-        </p:txBody>
-      </p:sp>
-      <p:sp>
-        <p:nvSpPr>
-          <p:cNvPr id="4" name="Slide Number Placeholder 3"/>
-          <p:cNvSpPr>
-            <a:spLocks noGrp="1"/>
-          </p:cNvSpPr>
-          <p:nvPr>
-            <p:ph type="sldNum" sz="quarter" idx="12"/>
-          </p:nvPr>
-        </p:nvSpPr>
-        <p:spPr/>
-        <p:txBody>
-          <a:bodyPr/>
-          <a:lstStyle/>
-          <a:p>
-            <a:fld id="{6597116C-F94B-4B5B-973A-17F07FB5C418}" type="slidenum">
-              <a:rPr lang="nl-BE" smtClean="0"/>
-              <a:t>49</a:t>
-            </a:fld>
-            <a:endParaRPr lang="nl-BE"/>
-          </a:p>
-        </p:txBody>
-      </p:sp>
-      <p:sp>
-        <p:nvSpPr>
-          <p:cNvPr id="5" name="TextBox 4"/>
-          <p:cNvSpPr txBox="1"/>
-          <p:nvPr/>
-        </p:nvSpPr>
-        <p:spPr>
-          <a:xfrm>
-            <a:off x="1187624" y="2276872"/>
-            <a:ext cx="7629012" cy="369332"/>
-          </a:xfrm>
-          <a:prstGeom prst="rect">
-            <a:avLst/>
-          </a:prstGeom>
-          <a:solidFill>
-            <a:schemeClr val="bg1">
-              <a:lumMod val="85000"/>
-            </a:schemeClr>
-          </a:solidFill>
-          <a:ln>
-            <a:solidFill>
-              <a:schemeClr val="tx1"/>
-            </a:solidFill>
-          </a:ln>
-        </p:spPr>
-        <p:txBody>
-          <a:bodyPr wrap="square" rtlCol="0">
-            <a:spAutoFit/>
-          </a:bodyPr>
-          <a:lstStyle/>
-          <a:p>
-            <a:r>
-              <a:rPr lang="en-US" dirty="0" err="1">
-                <a:latin typeface="Courier New" panose="02070309020205020404" pitchFamily="49" charset="0"/>
-                <a:cs typeface="Courier New" panose="02070309020205020404" pitchFamily="49" charset="0"/>
-              </a:rPr>
-              <a:t>i</a:t>
-            </a:r>
-            <a:r>
-              <a:rPr lang="en-US" dirty="0" err="1" smtClean="0">
-                <a:latin typeface="Courier New" panose="02070309020205020404" pitchFamily="49" charset="0"/>
-                <a:cs typeface="Courier New" panose="02070309020205020404" pitchFamily="49" charset="0"/>
-              </a:rPr>
-              <a:t>cc</a:t>
-            </a:r>
-            <a:r>
-              <a:rPr lang="en-US" dirty="0" smtClean="0">
-                <a:latin typeface="Courier New" panose="02070309020205020404" pitchFamily="49" charset="0"/>
-                <a:cs typeface="Courier New" panose="02070309020205020404" pitchFamily="49" charset="0"/>
-              </a:rPr>
-              <a:t>  -prof-gen  -prof-</a:t>
-            </a:r>
-            <a:r>
-              <a:rPr lang="en-US" dirty="0" err="1" smtClean="0">
-                <a:latin typeface="Courier New" panose="02070309020205020404" pitchFamily="49" charset="0"/>
-                <a:cs typeface="Courier New" panose="02070309020205020404" pitchFamily="49" charset="0"/>
-              </a:rPr>
-              <a:t>dir</a:t>
-            </a:r>
-            <a:r>
-              <a:rPr lang="en-US" dirty="0" smtClean="0">
-                <a:latin typeface="Courier New" panose="02070309020205020404" pitchFamily="49" charset="0"/>
-                <a:cs typeface="Courier New" panose="02070309020205020404" pitchFamily="49" charset="0"/>
-              </a:rPr>
-              <a:t>=./profs  -o appl.exe  …</a:t>
-            </a:r>
-            <a:endParaRPr lang="nl-BE" dirty="0">
-              <a:latin typeface="Courier New" panose="02070309020205020404" pitchFamily="49" charset="0"/>
-              <a:cs typeface="Courier New" panose="02070309020205020404" pitchFamily="49" charset="0"/>
-            </a:endParaRPr>
-          </a:p>
-        </p:txBody>
-      </p:sp>
-      <p:sp>
-        <p:nvSpPr>
-          <p:cNvPr id="6" name="TextBox 5"/>
-          <p:cNvSpPr txBox="1"/>
-          <p:nvPr/>
-        </p:nvSpPr>
-        <p:spPr>
-          <a:xfrm>
-            <a:off x="1187624" y="4139788"/>
-            <a:ext cx="7629012" cy="369332"/>
-          </a:xfrm>
-          <a:prstGeom prst="rect">
-            <a:avLst/>
-          </a:prstGeom>
-          <a:solidFill>
-            <a:schemeClr val="bg1">
-              <a:lumMod val="85000"/>
-            </a:schemeClr>
-          </a:solidFill>
-          <a:ln>
-            <a:solidFill>
-              <a:schemeClr val="tx1"/>
-            </a:solidFill>
-          </a:ln>
-        </p:spPr>
-        <p:txBody>
-          <a:bodyPr wrap="none" rtlCol="0">
-            <a:spAutoFit/>
-          </a:bodyPr>
-          <a:lstStyle/>
-          <a:p>
-            <a:r>
-              <a:rPr lang="en-US" dirty="0" err="1">
-                <a:latin typeface="Courier New" panose="02070309020205020404" pitchFamily="49" charset="0"/>
-                <a:cs typeface="Courier New" panose="02070309020205020404" pitchFamily="49" charset="0"/>
-              </a:rPr>
-              <a:t>i</a:t>
-            </a:r>
-            <a:r>
-              <a:rPr lang="en-US" dirty="0" err="1" smtClean="0">
-                <a:latin typeface="Courier New" panose="02070309020205020404" pitchFamily="49" charset="0"/>
-                <a:cs typeface="Courier New" panose="02070309020205020404" pitchFamily="49" charset="0"/>
-              </a:rPr>
-              <a:t>cc</a:t>
-            </a:r>
-            <a:r>
-              <a:rPr lang="en-US" dirty="0" smtClean="0">
-                <a:latin typeface="Courier New" panose="02070309020205020404" pitchFamily="49" charset="0"/>
-                <a:cs typeface="Courier New" panose="02070309020205020404" pitchFamily="49" charset="0"/>
-              </a:rPr>
-              <a:t>  -prof-use  prof-</a:t>
-            </a:r>
-            <a:r>
-              <a:rPr lang="en-US" dirty="0" err="1" smtClean="0">
-                <a:latin typeface="Courier New" panose="02070309020205020404" pitchFamily="49" charset="0"/>
-                <a:cs typeface="Courier New" panose="02070309020205020404" pitchFamily="49" charset="0"/>
-              </a:rPr>
-              <a:t>dir</a:t>
-            </a:r>
-            <a:r>
-              <a:rPr lang="en-US" dirty="0" smtClean="0">
-                <a:latin typeface="Courier New" panose="02070309020205020404" pitchFamily="49" charset="0"/>
-                <a:cs typeface="Courier New" panose="02070309020205020404" pitchFamily="49" charset="0"/>
-              </a:rPr>
-              <a:t>=./profs  -</a:t>
-            </a:r>
-            <a:r>
-              <a:rPr lang="en-US" dirty="0" err="1" smtClean="0">
-                <a:latin typeface="Courier New" panose="02070309020205020404" pitchFamily="49" charset="0"/>
-                <a:cs typeface="Courier New" panose="02070309020205020404" pitchFamily="49" charset="0"/>
-              </a:rPr>
-              <a:t>ipo</a:t>
-            </a:r>
-            <a:r>
-              <a:rPr lang="en-US" dirty="0" smtClean="0">
-                <a:latin typeface="Courier New" panose="02070309020205020404" pitchFamily="49" charset="0"/>
-                <a:cs typeface="Courier New" panose="02070309020205020404" pitchFamily="49" charset="0"/>
-              </a:rPr>
-              <a:t>  -o appl.exe  …</a:t>
-            </a:r>
-            <a:endParaRPr lang="nl-BE" dirty="0">
-              <a:latin typeface="Courier New" panose="02070309020205020404" pitchFamily="49" charset="0"/>
-              <a:cs typeface="Courier New" panose="02070309020205020404" pitchFamily="49" charset="0"/>
-            </a:endParaRPr>
-          </a:p>
-        </p:txBody>
-      </p:sp>
-    </p:spTree>
-    <p:extLst>
-      <p:ext uri="{BB962C8B-B14F-4D97-AF65-F5344CB8AC3E}">
-        <p14:creationId xmlns:p14="http://schemas.microsoft.com/office/powerpoint/2010/main" val="3097815600"/>
       </p:ext>
     </p:extLst>
   </p:cSld>
@@ -46326,7 +46684,7 @@
           <a:p>
             <a:r>
               <a:rPr lang="en-US" dirty="0" smtClean="0"/>
-              <a:t>Example</a:t>
+              <a:t>Intel compilers</a:t>
             </a:r>
             <a:endParaRPr lang="en-US" dirty="0"/>
           </a:p>
@@ -46349,7 +46707,22 @@
           <a:p>
             <a:r>
               <a:rPr lang="en-US" dirty="0" smtClean="0"/>
-              <a:t>Code illustrating cache hierarchy</a:t>
+              <a:t>Build with instrumentation</a:t>
+            </a:r>
+          </a:p>
+          <a:p>
+            <a:endParaRPr lang="en-US" dirty="0"/>
+          </a:p>
+          <a:p>
+            <a:r>
+              <a:rPr lang="en-US" dirty="0" smtClean="0"/>
+              <a:t>Run as usual</a:t>
+            </a:r>
+          </a:p>
+          <a:p>
+            <a:r>
+              <a:rPr lang="en-US" dirty="0" smtClean="0"/>
+              <a:t>Build using profile</a:t>
             </a:r>
             <a:endParaRPr lang="en-US" dirty="0"/>
           </a:p>
@@ -46373,6 +46746,504 @@
             <a:fld id="{6597116C-F94B-4B5B-973A-17F07FB5C418}" type="slidenum">
               <a:rPr lang="nl-BE" smtClean="0"/>
               <a:t>50</a:t>
+            </a:fld>
+            <a:endParaRPr lang="nl-BE"/>
+          </a:p>
+        </p:txBody>
+      </p:sp>
+      <p:sp>
+        <p:nvSpPr>
+          <p:cNvPr id="5" name="TextBox 4"/>
+          <p:cNvSpPr txBox="1"/>
+          <p:nvPr/>
+        </p:nvSpPr>
+        <p:spPr>
+          <a:xfrm>
+            <a:off x="1187624" y="2276872"/>
+            <a:ext cx="7629012" cy="369332"/>
+          </a:xfrm>
+          <a:prstGeom prst="rect">
+            <a:avLst/>
+          </a:prstGeom>
+          <a:solidFill>
+            <a:schemeClr val="bg1">
+              <a:lumMod val="85000"/>
+            </a:schemeClr>
+          </a:solidFill>
+          <a:ln>
+            <a:solidFill>
+              <a:schemeClr val="tx1"/>
+            </a:solidFill>
+          </a:ln>
+        </p:spPr>
+        <p:txBody>
+          <a:bodyPr wrap="square" rtlCol="0">
+            <a:spAutoFit/>
+          </a:bodyPr>
+          <a:lstStyle/>
+          <a:p>
+            <a:r>
+              <a:rPr lang="en-US" dirty="0" err="1">
+                <a:latin typeface="Courier New" panose="02070309020205020404" pitchFamily="49" charset="0"/>
+                <a:cs typeface="Courier New" panose="02070309020205020404" pitchFamily="49" charset="0"/>
+              </a:rPr>
+              <a:t>i</a:t>
+            </a:r>
+            <a:r>
+              <a:rPr lang="en-US" dirty="0" err="1" smtClean="0">
+                <a:latin typeface="Courier New" panose="02070309020205020404" pitchFamily="49" charset="0"/>
+                <a:cs typeface="Courier New" panose="02070309020205020404" pitchFamily="49" charset="0"/>
+              </a:rPr>
+              <a:t>cc</a:t>
+            </a:r>
+            <a:r>
+              <a:rPr lang="en-US" dirty="0" smtClean="0">
+                <a:latin typeface="Courier New" panose="02070309020205020404" pitchFamily="49" charset="0"/>
+                <a:cs typeface="Courier New" panose="02070309020205020404" pitchFamily="49" charset="0"/>
+              </a:rPr>
+              <a:t>  -prof-gen  -prof-</a:t>
+            </a:r>
+            <a:r>
+              <a:rPr lang="en-US" dirty="0" err="1" smtClean="0">
+                <a:latin typeface="Courier New" panose="02070309020205020404" pitchFamily="49" charset="0"/>
+                <a:cs typeface="Courier New" panose="02070309020205020404" pitchFamily="49" charset="0"/>
+              </a:rPr>
+              <a:t>dir</a:t>
+            </a:r>
+            <a:r>
+              <a:rPr lang="en-US" dirty="0" smtClean="0">
+                <a:latin typeface="Courier New" panose="02070309020205020404" pitchFamily="49" charset="0"/>
+                <a:cs typeface="Courier New" panose="02070309020205020404" pitchFamily="49" charset="0"/>
+              </a:rPr>
+              <a:t>=./profs  -o appl.exe  …</a:t>
+            </a:r>
+            <a:endParaRPr lang="nl-BE" dirty="0">
+              <a:latin typeface="Courier New" panose="02070309020205020404" pitchFamily="49" charset="0"/>
+              <a:cs typeface="Courier New" panose="02070309020205020404" pitchFamily="49" charset="0"/>
+            </a:endParaRPr>
+          </a:p>
+        </p:txBody>
+      </p:sp>
+      <p:sp>
+        <p:nvSpPr>
+          <p:cNvPr id="6" name="TextBox 5"/>
+          <p:cNvSpPr txBox="1"/>
+          <p:nvPr/>
+        </p:nvSpPr>
+        <p:spPr>
+          <a:xfrm>
+            <a:off x="1187624" y="4139788"/>
+            <a:ext cx="7629012" cy="369332"/>
+          </a:xfrm>
+          <a:prstGeom prst="rect">
+            <a:avLst/>
+          </a:prstGeom>
+          <a:solidFill>
+            <a:schemeClr val="bg1">
+              <a:lumMod val="85000"/>
+            </a:schemeClr>
+          </a:solidFill>
+          <a:ln>
+            <a:solidFill>
+              <a:schemeClr val="tx1"/>
+            </a:solidFill>
+          </a:ln>
+        </p:spPr>
+        <p:txBody>
+          <a:bodyPr wrap="none" rtlCol="0">
+            <a:spAutoFit/>
+          </a:bodyPr>
+          <a:lstStyle/>
+          <a:p>
+            <a:r>
+              <a:rPr lang="en-US" dirty="0" err="1">
+                <a:latin typeface="Courier New" panose="02070309020205020404" pitchFamily="49" charset="0"/>
+                <a:cs typeface="Courier New" panose="02070309020205020404" pitchFamily="49" charset="0"/>
+              </a:rPr>
+              <a:t>i</a:t>
+            </a:r>
+            <a:r>
+              <a:rPr lang="en-US" dirty="0" err="1" smtClean="0">
+                <a:latin typeface="Courier New" panose="02070309020205020404" pitchFamily="49" charset="0"/>
+                <a:cs typeface="Courier New" panose="02070309020205020404" pitchFamily="49" charset="0"/>
+              </a:rPr>
+              <a:t>cc</a:t>
+            </a:r>
+            <a:r>
+              <a:rPr lang="en-US" dirty="0" smtClean="0">
+                <a:latin typeface="Courier New" panose="02070309020205020404" pitchFamily="49" charset="0"/>
+                <a:cs typeface="Courier New" panose="02070309020205020404" pitchFamily="49" charset="0"/>
+              </a:rPr>
+              <a:t>  -prof-use  prof-</a:t>
+            </a:r>
+            <a:r>
+              <a:rPr lang="en-US" dirty="0" err="1" smtClean="0">
+                <a:latin typeface="Courier New" panose="02070309020205020404" pitchFamily="49" charset="0"/>
+                <a:cs typeface="Courier New" panose="02070309020205020404" pitchFamily="49" charset="0"/>
+              </a:rPr>
+              <a:t>dir</a:t>
+            </a:r>
+            <a:r>
+              <a:rPr lang="en-US" dirty="0" smtClean="0">
+                <a:latin typeface="Courier New" panose="02070309020205020404" pitchFamily="49" charset="0"/>
+                <a:cs typeface="Courier New" panose="02070309020205020404" pitchFamily="49" charset="0"/>
+              </a:rPr>
+              <a:t>=./profs  -</a:t>
+            </a:r>
+            <a:r>
+              <a:rPr lang="en-US" dirty="0" err="1" smtClean="0">
+                <a:latin typeface="Courier New" panose="02070309020205020404" pitchFamily="49" charset="0"/>
+                <a:cs typeface="Courier New" panose="02070309020205020404" pitchFamily="49" charset="0"/>
+              </a:rPr>
+              <a:t>ipo</a:t>
+            </a:r>
+            <a:r>
+              <a:rPr lang="en-US" dirty="0" smtClean="0">
+                <a:latin typeface="Courier New" panose="02070309020205020404" pitchFamily="49" charset="0"/>
+                <a:cs typeface="Courier New" panose="02070309020205020404" pitchFamily="49" charset="0"/>
+              </a:rPr>
+              <a:t>  -o appl.exe  …</a:t>
+            </a:r>
+            <a:endParaRPr lang="nl-BE" dirty="0">
+              <a:latin typeface="Courier New" panose="02070309020205020404" pitchFamily="49" charset="0"/>
+              <a:cs typeface="Courier New" panose="02070309020205020404" pitchFamily="49" charset="0"/>
+            </a:endParaRPr>
+          </a:p>
+        </p:txBody>
+      </p:sp>
+    </p:spTree>
+    <p:extLst>
+      <p:ext uri="{BB962C8B-B14F-4D97-AF65-F5344CB8AC3E}">
+        <p14:creationId xmlns:p14="http://schemas.microsoft.com/office/powerpoint/2010/main" val="3097815600"/>
+      </p:ext>
+    </p:extLst>
+  </p:cSld>
+  <p:clrMapOvr>
+    <a:masterClrMapping/>
+  </p:clrMapOvr>
+  <p:timing>
+    <p:tnLst>
+      <p:par>
+        <p:cTn id="1" dur="indefinite" restart="never" nodeType="tmRoot">
+          <p:childTnLst>
+            <p:seq concurrent="1" nextAc="seek">
+              <p:cTn id="2" dur="indefinite" nodeType="mainSeq">
+                <p:childTnLst>
+                  <p:par>
+                    <p:cTn id="3" fill="hold">
+                      <p:stCondLst>
+                        <p:cond delay="indefinite"/>
+                        <p:cond evt="onBegin" delay="0">
+                          <p:tn val="2"/>
+                        </p:cond>
+                      </p:stCondLst>
+                      <p:childTnLst>
+                        <p:par>
+                          <p:cTn id="4" fill="hold">
+                            <p:stCondLst>
+                              <p:cond delay="0"/>
+                            </p:stCondLst>
+                            <p:childTnLst>
+                              <p:par>
+                                <p:cTn id="5" presetID="1" presetClass="entr" presetSubtype="0" fill="hold" grpId="0" nodeType="withEffect">
+                                  <p:stCondLst>
+                                    <p:cond delay="0"/>
+                                  </p:stCondLst>
+                                  <p:childTnLst>
+                                    <p:set>
+                                      <p:cBhvr>
+                                        <p:cTn id="6" dur="1" fill="hold">
+                                          <p:stCondLst>
+                                            <p:cond delay="0"/>
+                                          </p:stCondLst>
+                                        </p:cTn>
+                                        <p:tgtEl>
+                                          <p:spTgt spid="3">
+                                            <p:txEl>
+                                              <p:pRg st="0" end="0"/>
+                                            </p:txEl>
+                                          </p:spTgt>
+                                        </p:tgtEl>
+                                        <p:attrNameLst>
+                                          <p:attrName>style.visibility</p:attrName>
+                                        </p:attrNameLst>
+                                      </p:cBhvr>
+                                      <p:to>
+                                        <p:strVal val="visible"/>
+                                      </p:to>
+                                    </p:set>
+                                  </p:childTnLst>
+                                </p:cTn>
+                              </p:par>
+                              <p:par>
+                                <p:cTn id="7" presetID="1" presetClass="entr" presetSubtype="0" fill="hold" grpId="0" nodeType="withEffect">
+                                  <p:stCondLst>
+                                    <p:cond delay="0"/>
+                                  </p:stCondLst>
+                                  <p:childTnLst>
+                                    <p:set>
+                                      <p:cBhvr>
+                                        <p:cTn id="8" dur="1" fill="hold">
+                                          <p:stCondLst>
+                                            <p:cond delay="0"/>
+                                          </p:stCondLst>
+                                        </p:cTn>
+                                        <p:tgtEl>
+                                          <p:spTgt spid="5"/>
+                                        </p:tgtEl>
+                                        <p:attrNameLst>
+                                          <p:attrName>style.visibility</p:attrName>
+                                        </p:attrNameLst>
+                                      </p:cBhvr>
+                                      <p:to>
+                                        <p:strVal val="visible"/>
+                                      </p:to>
+                                    </p:set>
+                                  </p:childTnLst>
+                                </p:cTn>
+                              </p:par>
+                            </p:childTnLst>
+                          </p:cTn>
+                        </p:par>
+                      </p:childTnLst>
+                    </p:cTn>
+                  </p:par>
+                  <p:par>
+                    <p:cTn id="9" fill="hold">
+                      <p:stCondLst>
+                        <p:cond delay="indefinite"/>
+                      </p:stCondLst>
+                      <p:childTnLst>
+                        <p:par>
+                          <p:cTn id="10" fill="hold">
+                            <p:stCondLst>
+                              <p:cond delay="0"/>
+                            </p:stCondLst>
+                            <p:childTnLst>
+                              <p:par>
+                                <p:cTn id="11" presetID="1" presetClass="entr" presetSubtype="0" fill="hold" grpId="0" nodeType="clickEffect">
+                                  <p:stCondLst>
+                                    <p:cond delay="0"/>
+                                  </p:stCondLst>
+                                  <p:childTnLst>
+                                    <p:set>
+                                      <p:cBhvr>
+                                        <p:cTn id="12" dur="1" fill="hold">
+                                          <p:stCondLst>
+                                            <p:cond delay="0"/>
+                                          </p:stCondLst>
+                                        </p:cTn>
+                                        <p:tgtEl>
+                                          <p:spTgt spid="3">
+                                            <p:txEl>
+                                              <p:pRg st="2" end="2"/>
+                                            </p:txEl>
+                                          </p:spTgt>
+                                        </p:tgtEl>
+                                        <p:attrNameLst>
+                                          <p:attrName>style.visibility</p:attrName>
+                                        </p:attrNameLst>
+                                      </p:cBhvr>
+                                      <p:to>
+                                        <p:strVal val="visible"/>
+                                      </p:to>
+                                    </p:set>
+                                  </p:childTnLst>
+                                </p:cTn>
+                              </p:par>
+                            </p:childTnLst>
+                          </p:cTn>
+                        </p:par>
+                      </p:childTnLst>
+                    </p:cTn>
+                  </p:par>
+                  <p:par>
+                    <p:cTn id="13" fill="hold">
+                      <p:stCondLst>
+                        <p:cond delay="indefinite"/>
+                      </p:stCondLst>
+                      <p:childTnLst>
+                        <p:par>
+                          <p:cTn id="14" fill="hold">
+                            <p:stCondLst>
+                              <p:cond delay="0"/>
+                            </p:stCondLst>
+                            <p:childTnLst>
+                              <p:par>
+                                <p:cTn id="15" presetID="1" presetClass="entr" presetSubtype="0" fill="hold" grpId="0" nodeType="clickEffect">
+                                  <p:stCondLst>
+                                    <p:cond delay="0"/>
+                                  </p:stCondLst>
+                                  <p:childTnLst>
+                                    <p:set>
+                                      <p:cBhvr>
+                                        <p:cTn id="16" dur="1" fill="hold">
+                                          <p:stCondLst>
+                                            <p:cond delay="0"/>
+                                          </p:stCondLst>
+                                        </p:cTn>
+                                        <p:tgtEl>
+                                          <p:spTgt spid="3">
+                                            <p:txEl>
+                                              <p:pRg st="3" end="3"/>
+                                            </p:txEl>
+                                          </p:spTgt>
+                                        </p:tgtEl>
+                                        <p:attrNameLst>
+                                          <p:attrName>style.visibility</p:attrName>
+                                        </p:attrNameLst>
+                                      </p:cBhvr>
+                                      <p:to>
+                                        <p:strVal val="visible"/>
+                                      </p:to>
+                                    </p:set>
+                                  </p:childTnLst>
+                                </p:cTn>
+                              </p:par>
+                              <p:par>
+                                <p:cTn id="17" presetID="1" presetClass="entr" presetSubtype="0" fill="hold" grpId="0" nodeType="withEffect">
+                                  <p:stCondLst>
+                                    <p:cond delay="0"/>
+                                  </p:stCondLst>
+                                  <p:childTnLst>
+                                    <p:set>
+                                      <p:cBhvr>
+                                        <p:cTn id="18" dur="1" fill="hold">
+                                          <p:stCondLst>
+                                            <p:cond delay="0"/>
+                                          </p:stCondLst>
+                                        </p:cTn>
+                                        <p:tgtEl>
+                                          <p:spTgt spid="6"/>
+                                        </p:tgtEl>
+                                        <p:attrNameLst>
+                                          <p:attrName>style.visibility</p:attrName>
+                                        </p:attrNameLst>
+                                      </p:cBhvr>
+                                      <p:to>
+                                        <p:strVal val="visible"/>
+                                      </p:to>
+                                    </p:set>
+                                  </p:childTnLst>
+                                </p:cTn>
+                              </p:par>
+                            </p:childTnLst>
+                          </p:cTn>
+                        </p:par>
+                      </p:childTnLst>
+                    </p:cTn>
+                  </p:par>
+                </p:childTnLst>
+              </p:cTn>
+              <p:prevCondLst>
+                <p:cond evt="onPrev" delay="0">
+                  <p:tgtEl>
+                    <p:sldTgt/>
+                  </p:tgtEl>
+                </p:cond>
+              </p:prevCondLst>
+              <p:nextCondLst>
+                <p:cond evt="onNext" delay="0">
+                  <p:tgtEl>
+                    <p:sldTgt/>
+                  </p:tgtEl>
+                </p:cond>
+              </p:nextCondLst>
+            </p:seq>
+          </p:childTnLst>
+        </p:cTn>
+      </p:par>
+    </p:tnLst>
+    <p:bldLst>
+      <p:bldP spid="3" grpId="0" uiExpand="1" build="p"/>
+      <p:bldP spid="5" grpId="0" animBg="1"/>
+      <p:bldP spid="6" grpId="0" animBg="1"/>
+    </p:bldLst>
+  </p:timing>
+</p:sld>
+</file>
+
+<file path=ppt/slides/slide51.xml><?xml version="1.0" encoding="utf-8"?>
+<p:sld xmlns:a="http://schemas.openxmlformats.org/drawingml/2006/main" xmlns:r="http://schemas.openxmlformats.org/officeDocument/2006/relationships" xmlns:p="http://schemas.openxmlformats.org/presentationml/2006/main">
+  <p:cSld>
+    <p:spTree>
+      <p:nvGrpSpPr>
+        <p:cNvPr id="1" name=""/>
+        <p:cNvGrpSpPr/>
+        <p:nvPr/>
+      </p:nvGrpSpPr>
+      <p:grpSpPr>
+        <a:xfrm>
+          <a:off x="0" y="0"/>
+          <a:ext cx="0" cy="0"/>
+          <a:chOff x="0" y="0"/>
+          <a:chExt cx="0" cy="0"/>
+        </a:xfrm>
+      </p:grpSpPr>
+      <p:sp>
+        <p:nvSpPr>
+          <p:cNvPr id="2" name="Title 1"/>
+          <p:cNvSpPr>
+            <a:spLocks noGrp="1"/>
+          </p:cNvSpPr>
+          <p:nvPr>
+            <p:ph type="title"/>
+          </p:nvPr>
+        </p:nvSpPr>
+        <p:spPr/>
+        <p:txBody>
+          <a:bodyPr/>
+          <a:lstStyle/>
+          <a:p>
+            <a:r>
+              <a:rPr lang="en-US" dirty="0" smtClean="0"/>
+              <a:t>Example</a:t>
+            </a:r>
+            <a:endParaRPr lang="en-US" dirty="0"/>
+          </a:p>
+        </p:txBody>
+      </p:sp>
+      <p:sp>
+        <p:nvSpPr>
+          <p:cNvPr id="3" name="Content Placeholder 2"/>
+          <p:cNvSpPr>
+            <a:spLocks noGrp="1"/>
+          </p:cNvSpPr>
+          <p:nvPr>
+            <p:ph idx="1"/>
+          </p:nvPr>
+        </p:nvSpPr>
+        <p:spPr/>
+        <p:txBody>
+          <a:bodyPr/>
+          <a:lstStyle/>
+          <a:p>
+            <a:r>
+              <a:rPr lang="en-US" dirty="0" smtClean="0"/>
+              <a:t>Code illustrating cache hierarchy</a:t>
+            </a:r>
+            <a:endParaRPr lang="en-US" dirty="0"/>
+          </a:p>
+        </p:txBody>
+      </p:sp>
+      <p:sp>
+        <p:nvSpPr>
+          <p:cNvPr id="4" name="Slide Number Placeholder 3"/>
+          <p:cNvSpPr>
+            <a:spLocks noGrp="1"/>
+          </p:cNvSpPr>
+          <p:nvPr>
+            <p:ph type="sldNum" sz="quarter" idx="12"/>
+          </p:nvPr>
+        </p:nvSpPr>
+        <p:spPr/>
+        <p:txBody>
+          <a:bodyPr/>
+          <a:lstStyle/>
+          <a:p>
+            <a:fld id="{6597116C-F94B-4B5B-973A-17F07FB5C418}" type="slidenum">
+              <a:rPr lang="nl-BE" smtClean="0"/>
+              <a:t>51</a:t>
             </a:fld>
             <a:endParaRPr lang="nl-BE"/>
           </a:p>
@@ -46646,7 +47517,7 @@
 </p:sld>
 </file>
 
-<file path=ppt/slides/slide51.xml><?xml version="1.0" encoding="utf-8"?>
+<file path=ppt/slides/slide52.xml><?xml version="1.0" encoding="utf-8"?>
 <p:sld xmlns:a="http://schemas.openxmlformats.org/drawingml/2006/main" xmlns:r="http://schemas.openxmlformats.org/officeDocument/2006/relationships" xmlns:p="http://schemas.openxmlformats.org/presentationml/2006/main">
   <p:cSld>
     <p:spTree>
@@ -46722,7 +47593,7 @@
           <a:p>
             <a:fld id="{6597116C-F94B-4B5B-973A-17F07FB5C418}" type="slidenum">
               <a:rPr lang="nl-BE" smtClean="0"/>
-              <a:t>51</a:t>
+              <a:t>52</a:t>
             </a:fld>
             <a:endParaRPr lang="nl-BE"/>
           </a:p>
@@ -46732,207 +47603,6 @@
     <p:extLst>
       <p:ext uri="{BB962C8B-B14F-4D97-AF65-F5344CB8AC3E}">
         <p14:creationId xmlns:p14="http://schemas.microsoft.com/office/powerpoint/2010/main" val="1387657132"/>
-      </p:ext>
-    </p:extLst>
-  </p:cSld>
-  <p:clrMapOvr>
-    <a:masterClrMapping/>
-  </p:clrMapOvr>
-  <p:timing>
-    <p:tnLst>
-      <p:par>
-        <p:cTn id="1" dur="indefinite" restart="never" nodeType="tmRoot"/>
-      </p:par>
-    </p:tnLst>
-  </p:timing>
-</p:sld>
-</file>
-
-<file path=ppt/slides/slide52.xml><?xml version="1.0" encoding="utf-8"?>
-<p:sld xmlns:a="http://schemas.openxmlformats.org/drawingml/2006/main" xmlns:r="http://schemas.openxmlformats.org/officeDocument/2006/relationships" xmlns:p="http://schemas.openxmlformats.org/presentationml/2006/main">
-  <p:cSld>
-    <p:spTree>
-      <p:nvGrpSpPr>
-        <p:cNvPr id="1" name=""/>
-        <p:cNvGrpSpPr/>
-        <p:nvPr/>
-      </p:nvGrpSpPr>
-      <p:grpSpPr>
-        <a:xfrm>
-          <a:off x="0" y="0"/>
-          <a:ext cx="0" cy="0"/>
-          <a:chOff x="0" y="0"/>
-          <a:chExt cx="0" cy="0"/>
-        </a:xfrm>
-      </p:grpSpPr>
-      <p:sp>
-        <p:nvSpPr>
-          <p:cNvPr id="5" name="Title 4"/>
-          <p:cNvSpPr>
-            <a:spLocks noGrp="1"/>
-          </p:cNvSpPr>
-          <p:nvPr>
-            <p:ph type="title"/>
-          </p:nvPr>
-        </p:nvSpPr>
-        <p:spPr/>
-        <p:txBody>
-          <a:bodyPr/>
-          <a:lstStyle/>
-          <a:p>
-            <a:r>
-              <a:rPr lang="en-US" dirty="0" smtClean="0"/>
-              <a:t>Useful references</a:t>
-            </a:r>
-            <a:endParaRPr lang="nl-BE" dirty="0"/>
-          </a:p>
-        </p:txBody>
-      </p:sp>
-      <p:sp>
-        <p:nvSpPr>
-          <p:cNvPr id="6" name="Content Placeholder 5"/>
-          <p:cNvSpPr>
-            <a:spLocks noGrp="1"/>
-          </p:cNvSpPr>
-          <p:nvPr>
-            <p:ph idx="1"/>
-          </p:nvPr>
-        </p:nvSpPr>
-        <p:spPr/>
-        <p:txBody>
-          <a:bodyPr>
-            <a:normAutofit fontScale="85000" lnSpcReduction="10000"/>
-          </a:bodyPr>
-          <a:lstStyle/>
-          <a:p>
-            <a:r>
-              <a:rPr lang="en-US" dirty="0" smtClean="0">
-                <a:hlinkClick r:id="rId2"/>
-              </a:rPr>
-              <a:t>Gallery of processor cache effects</a:t>
-            </a:r>
-            <a:endParaRPr lang="en-US" dirty="0" smtClean="0"/>
-          </a:p>
-          <a:p>
-            <a:r>
-              <a:rPr lang="en-US" dirty="0">
-                <a:hlinkClick r:id="rId3"/>
-              </a:rPr>
-              <a:t>Avoiding and Identifying False Sharing Among </a:t>
-            </a:r>
-            <a:r>
-              <a:rPr lang="en-US" dirty="0" smtClean="0">
-                <a:hlinkClick r:id="rId3"/>
-              </a:rPr>
-              <a:t>Threads</a:t>
-            </a:r>
-            <a:endParaRPr lang="en-US" dirty="0" smtClean="0"/>
-          </a:p>
-          <a:p>
-            <a:r>
-              <a:rPr lang="en-US" dirty="0" smtClean="0"/>
-              <a:t>Vectorization</a:t>
-            </a:r>
-          </a:p>
-          <a:p>
-            <a:pPr lvl="1"/>
-            <a:r>
-              <a:rPr lang="en-US" dirty="0" smtClean="0">
-                <a:hlinkClick r:id="rId4"/>
-              </a:rPr>
-              <a:t>A guide to vectorization with Intel C++ compilers</a:t>
-            </a:r>
-            <a:endParaRPr lang="en-US" dirty="0" smtClean="0"/>
-          </a:p>
-          <a:p>
-            <a:pPr lvl="1"/>
-            <a:r>
-              <a:rPr lang="en-US" dirty="0" smtClean="0">
-                <a:hlinkClick r:id="rId5"/>
-              </a:rPr>
-              <a:t>Auto-vectorization with </a:t>
-            </a:r>
-            <a:r>
-              <a:rPr lang="en-US" dirty="0" err="1" smtClean="0">
-                <a:hlinkClick r:id="rId5"/>
-              </a:rPr>
-              <a:t>gcc</a:t>
-            </a:r>
-            <a:r>
-              <a:rPr lang="en-US" dirty="0" smtClean="0">
-                <a:hlinkClick r:id="rId5"/>
-              </a:rPr>
-              <a:t> 4.7</a:t>
-            </a:r>
-            <a:endParaRPr lang="en-US" dirty="0" smtClean="0"/>
-          </a:p>
-          <a:p>
-            <a:r>
-              <a:rPr lang="en-US" dirty="0"/>
-              <a:t>Introduction to High Performance Computing for Scientists and </a:t>
-            </a:r>
-            <a:r>
-              <a:rPr lang="en-US" dirty="0" smtClean="0"/>
-              <a:t>Engineers</a:t>
-            </a:r>
-            <a:r>
-              <a:rPr lang="nl-BE" dirty="0" smtClean="0"/>
-              <a:t/>
-            </a:r>
-            <a:br>
-              <a:rPr lang="nl-BE" dirty="0" smtClean="0"/>
-            </a:br>
-            <a:r>
-              <a:rPr lang="nl-BE" dirty="0" smtClean="0"/>
-              <a:t>Georg Hager &amp; Gerhard Wellein</a:t>
-            </a:r>
-            <a:br>
-              <a:rPr lang="nl-BE" dirty="0" smtClean="0"/>
-            </a:br>
-            <a:r>
-              <a:rPr lang="nl-BE" dirty="0" smtClean="0"/>
-              <a:t>Chapman &amp; Hall, 2010</a:t>
-            </a:r>
-            <a:endParaRPr lang="en-US" b="1" dirty="0"/>
-          </a:p>
-          <a:p>
-            <a:r>
-              <a:rPr lang="en-US" dirty="0" smtClean="0">
-                <a:hlinkClick r:id="rId6"/>
-              </a:rPr>
-              <a:t>Why has CPU frequency ceased to grow?</a:t>
-            </a:r>
-            <a:endParaRPr lang="nl-BE" dirty="0" smtClean="0"/>
-          </a:p>
-        </p:txBody>
-      </p:sp>
-      <p:sp>
-        <p:nvSpPr>
-          <p:cNvPr id="4" name="Slide Number Placeholder 3"/>
-          <p:cNvSpPr>
-            <a:spLocks noGrp="1"/>
-          </p:cNvSpPr>
-          <p:nvPr>
-            <p:ph type="sldNum" sz="quarter" idx="12"/>
-          </p:nvPr>
-        </p:nvSpPr>
-        <p:spPr/>
-        <p:txBody>
-          <a:bodyPr/>
-          <a:lstStyle/>
-          <a:p>
-            <a:fld id="{6597116C-F94B-4B5B-973A-17F07FB5C418}" type="slidenum">
-              <a:rPr lang="nl-BE" smtClean="0"/>
-              <a:t>52</a:t>
-            </a:fld>
-            <a:endParaRPr lang="nl-BE"/>
-          </a:p>
-        </p:txBody>
-      </p:sp>
-    </p:spTree>
-    <p:extLst>
-      <p:ext uri="{BB962C8B-B14F-4D97-AF65-F5344CB8AC3E}">
-        <p14:creationId xmlns:p14="http://schemas.microsoft.com/office/powerpoint/2010/main" val="2653023660"/>
       </p:ext>
     </p:extLst>
   </p:cSld>
@@ -46968,7 +47638,7 @@
       </p:grpSpPr>
       <p:sp>
         <p:nvSpPr>
-          <p:cNvPr id="2" name="Title 1"/>
+          <p:cNvPr id="5" name="Title 4"/>
           <p:cNvSpPr>
             <a:spLocks noGrp="1"/>
           </p:cNvSpPr>
@@ -46983,7 +47653,7 @@
           <a:p>
             <a:r>
               <a:rPr lang="en-US" dirty="0" smtClean="0"/>
-              <a:t>Appendix</a:t>
+              <a:t>Useful references</a:t>
             </a:r>
             <a:endParaRPr lang="nl-BE" dirty="0"/>
           </a:p>
@@ -46991,20 +47661,119 @@
       </p:sp>
       <p:sp>
         <p:nvSpPr>
-          <p:cNvPr id="3" name="Text Placeholder 2"/>
+          <p:cNvPr id="6" name="Content Placeholder 5"/>
           <p:cNvSpPr>
             <a:spLocks noGrp="1"/>
           </p:cNvSpPr>
           <p:nvPr>
-            <p:ph type="body" idx="1"/>
+            <p:ph idx="1"/>
           </p:nvPr>
         </p:nvSpPr>
         <p:spPr/>
         <p:txBody>
-          <a:bodyPr/>
+          <a:bodyPr>
+            <a:normAutofit fontScale="85000" lnSpcReduction="10000"/>
+          </a:bodyPr>
           <a:lstStyle/>
           <a:p>
-            <a:endParaRPr lang="nl-BE"/>
+            <a:r>
+              <a:rPr lang="en-US" dirty="0" smtClean="0">
+                <a:hlinkClick r:id="rId2"/>
+              </a:rPr>
+              <a:t>Gallery of processor cache effects</a:t>
+            </a:r>
+            <a:endParaRPr lang="en-US" dirty="0" smtClean="0"/>
+          </a:p>
+          <a:p>
+            <a:r>
+              <a:rPr lang="en-US" dirty="0">
+                <a:hlinkClick r:id="rId3"/>
+              </a:rPr>
+              <a:t>Avoiding and Identifying False Sharing Among </a:t>
+            </a:r>
+            <a:r>
+              <a:rPr lang="en-US" dirty="0" smtClean="0">
+                <a:hlinkClick r:id="rId3"/>
+              </a:rPr>
+              <a:t>Threads</a:t>
+            </a:r>
+            <a:endParaRPr lang="en-US" dirty="0" smtClean="0"/>
+          </a:p>
+          <a:p>
+            <a:r>
+              <a:rPr lang="en-US" dirty="0" smtClean="0"/>
+              <a:t>Vectorization</a:t>
+            </a:r>
+          </a:p>
+          <a:p>
+            <a:pPr lvl="1"/>
+            <a:r>
+              <a:rPr lang="en-US" dirty="0" smtClean="0">
+                <a:hlinkClick r:id="rId4"/>
+              </a:rPr>
+              <a:t>A guide to vectorization with Intel C++ compilers</a:t>
+            </a:r>
+            <a:endParaRPr lang="en-US" dirty="0" smtClean="0"/>
+          </a:p>
+          <a:p>
+            <a:pPr lvl="1"/>
+            <a:r>
+              <a:rPr lang="en-US" dirty="0" smtClean="0">
+                <a:hlinkClick r:id="rId5"/>
+              </a:rPr>
+              <a:t>Auto-vectorization with </a:t>
+            </a:r>
+            <a:r>
+              <a:rPr lang="en-US" dirty="0" err="1" smtClean="0">
+                <a:hlinkClick r:id="rId5"/>
+              </a:rPr>
+              <a:t>gcc</a:t>
+            </a:r>
+            <a:r>
+              <a:rPr lang="en-US" dirty="0" smtClean="0">
+                <a:hlinkClick r:id="rId5"/>
+              </a:rPr>
+              <a:t> 4.7</a:t>
+            </a:r>
+            <a:endParaRPr lang="en-US" dirty="0" smtClean="0"/>
+          </a:p>
+          <a:p>
+            <a:r>
+              <a:rPr lang="en-US" dirty="0"/>
+              <a:t>Introduction to High Performance Computing for Scientists and </a:t>
+            </a:r>
+            <a:r>
+              <a:rPr lang="en-US" dirty="0" smtClean="0"/>
+              <a:t>Engineers</a:t>
+            </a:r>
+            <a:r>
+              <a:rPr lang="nl-BE" dirty="0" smtClean="0"/>
+              <a:t/>
+            </a:r>
+            <a:br>
+              <a:rPr lang="nl-BE" dirty="0" smtClean="0"/>
+            </a:br>
+            <a:r>
+              <a:rPr lang="nl-BE" dirty="0" smtClean="0"/>
+              <a:t>Georg Hager &amp; Gerhard Wellein</a:t>
+            </a:r>
+            <a:br>
+              <a:rPr lang="nl-BE" dirty="0" smtClean="0"/>
+            </a:br>
+            <a:r>
+              <a:rPr lang="nl-BE" dirty="0" smtClean="0"/>
+              <a:t>Chapman &amp; Hall, 2010</a:t>
+            </a:r>
+            <a:endParaRPr lang="en-US" b="1" dirty="0"/>
+          </a:p>
+          <a:p>
+            <a:r>
+              <a:rPr lang="en-US" dirty="0" smtClean="0">
+                <a:hlinkClick r:id="rId6"/>
+              </a:rPr>
+              <a:t>Why has CPU frequency ceased to grow?</a:t>
+            </a:r>
+            <a:endParaRPr lang="nl-BE" dirty="0" smtClean="0"/>
           </a:p>
         </p:txBody>
       </p:sp>
@@ -47034,7 +47803,7 @@
     </p:spTree>
     <p:extLst>
       <p:ext uri="{BB962C8B-B14F-4D97-AF65-F5344CB8AC3E}">
-        <p14:creationId xmlns:p14="http://schemas.microsoft.com/office/powerpoint/2010/main" val="3118825235"/>
+        <p14:creationId xmlns:p14="http://schemas.microsoft.com/office/powerpoint/2010/main" val="2653023660"/>
       </p:ext>
     </p:extLst>
   </p:cSld>
@@ -47085,6 +47854,108 @@
           <a:p>
             <a:r>
               <a:rPr lang="en-US" dirty="0" smtClean="0"/>
+              <a:t>Appendix</a:t>
+            </a:r>
+            <a:endParaRPr lang="nl-BE" dirty="0"/>
+          </a:p>
+        </p:txBody>
+      </p:sp>
+      <p:sp>
+        <p:nvSpPr>
+          <p:cNvPr id="3" name="Text Placeholder 2"/>
+          <p:cNvSpPr>
+            <a:spLocks noGrp="1"/>
+          </p:cNvSpPr>
+          <p:nvPr>
+            <p:ph type="body" idx="1"/>
+          </p:nvPr>
+        </p:nvSpPr>
+        <p:spPr/>
+        <p:txBody>
+          <a:bodyPr/>
+          <a:lstStyle/>
+          <a:p>
+            <a:endParaRPr lang="nl-BE"/>
+          </a:p>
+        </p:txBody>
+      </p:sp>
+      <p:sp>
+        <p:nvSpPr>
+          <p:cNvPr id="4" name="Slide Number Placeholder 3"/>
+          <p:cNvSpPr>
+            <a:spLocks noGrp="1"/>
+          </p:cNvSpPr>
+          <p:nvPr>
+            <p:ph type="sldNum" sz="quarter" idx="12"/>
+          </p:nvPr>
+        </p:nvSpPr>
+        <p:spPr/>
+        <p:txBody>
+          <a:bodyPr/>
+          <a:lstStyle/>
+          <a:p>
+            <a:fld id="{6597116C-F94B-4B5B-973A-17F07FB5C418}" type="slidenum">
+              <a:rPr lang="nl-BE" smtClean="0"/>
+              <a:t>54</a:t>
+            </a:fld>
+            <a:endParaRPr lang="nl-BE"/>
+          </a:p>
+        </p:txBody>
+      </p:sp>
+    </p:spTree>
+    <p:extLst>
+      <p:ext uri="{BB962C8B-B14F-4D97-AF65-F5344CB8AC3E}">
+        <p14:creationId xmlns:p14="http://schemas.microsoft.com/office/powerpoint/2010/main" val="3118825235"/>
+      </p:ext>
+    </p:extLst>
+  </p:cSld>
+  <p:clrMapOvr>
+    <a:masterClrMapping/>
+  </p:clrMapOvr>
+  <p:timing>
+    <p:tnLst>
+      <p:par>
+        <p:cTn id="1" dur="indefinite" restart="never" nodeType="tmRoot"/>
+      </p:par>
+    </p:tnLst>
+  </p:timing>
+</p:sld>
+</file>
+
+<file path=ppt/slides/slide55.xml><?xml version="1.0" encoding="utf-8"?>
+<p:sld xmlns:a="http://schemas.openxmlformats.org/drawingml/2006/main" xmlns:r="http://schemas.openxmlformats.org/officeDocument/2006/relationships" xmlns:p="http://schemas.openxmlformats.org/presentationml/2006/main">
+  <p:cSld>
+    <p:spTree>
+      <p:nvGrpSpPr>
+        <p:cNvPr id="1" name=""/>
+        <p:cNvGrpSpPr/>
+        <p:nvPr/>
+      </p:nvGrpSpPr>
+      <p:grpSpPr>
+        <a:xfrm>
+          <a:off x="0" y="0"/>
+          <a:ext cx="0" cy="0"/>
+          <a:chOff x="0" y="0"/>
+          <a:chExt cx="0" cy="0"/>
+        </a:xfrm>
+      </p:grpSpPr>
+      <p:sp>
+        <p:nvSpPr>
+          <p:cNvPr id="2" name="Title 1"/>
+          <p:cNvSpPr>
+            <a:spLocks noGrp="1"/>
+          </p:cNvSpPr>
+          <p:nvPr>
+            <p:ph type="title"/>
+          </p:nvPr>
+        </p:nvSpPr>
+        <p:spPr/>
+        <p:txBody>
+          <a:bodyPr/>
+          <a:lstStyle/>
+          <a:p>
+            <a:r>
+              <a:rPr lang="en-US" dirty="0" smtClean="0"/>
               <a:t>Tools</a:t>
             </a:r>
             <a:endParaRPr lang="en-US" dirty="0"/>
@@ -47237,7 +48108,7 @@
           <a:p>
             <a:fld id="{6597116C-F94B-4B5B-973A-17F07FB5C418}" type="slidenum">
               <a:rPr lang="nl-BE" smtClean="0"/>
-              <a:t>54</a:t>
+              <a:t>55</a:t>
             </a:fld>
             <a:endParaRPr lang="nl-BE"/>
           </a:p>
@@ -47807,7 +48678,7 @@
 </p:sld>
 </file>
 
-<file path=ppt/slides/slide55.xml><?xml version="1.0" encoding="utf-8"?>
+<file path=ppt/slides/slide56.xml><?xml version="1.0" encoding="utf-8"?>
 <p:sld xmlns:a="http://schemas.openxmlformats.org/drawingml/2006/main" xmlns:r="http://schemas.openxmlformats.org/officeDocument/2006/relationships" xmlns:p="http://schemas.openxmlformats.org/presentationml/2006/main">
   <p:cSld>
     <p:spTree>
@@ -49591,7 +50462,7 @@
           <a:p>
             <a:fld id="{6597116C-F94B-4B5B-973A-17F07FB5C418}" type="slidenum">
               <a:rPr lang="nl-BE" smtClean="0"/>
-              <a:t>55</a:t>
+              <a:t>56</a:t>
             </a:fld>
             <a:endParaRPr lang="nl-BE"/>
           </a:p>
@@ -49736,7 +50607,7 @@
 </p:sld>
 </file>
 
-<file path=ppt/slides/slide56.xml><?xml version="1.0" encoding="utf-8"?>
+<file path=ppt/slides/slide57.xml><?xml version="1.0" encoding="utf-8"?>
 <p:sld xmlns:a="http://schemas.openxmlformats.org/drawingml/2006/main" xmlns:r="http://schemas.openxmlformats.org/officeDocument/2006/relationships" xmlns:p="http://schemas.openxmlformats.org/presentationml/2006/main">
   <p:cSld>
     <p:spTree>
@@ -49954,7 +50825,7 @@
           <a:p>
             <a:fld id="{6597116C-F94B-4B5B-973A-17F07FB5C418}" type="slidenum">
               <a:rPr lang="nl-BE" smtClean="0"/>
-              <a:t>56</a:t>
+              <a:t>57</a:t>
             </a:fld>
             <a:endParaRPr lang="nl-BE"/>
           </a:p>

</xml_diff>

<commit_message>
Add reference to Compiler Explorer
</commit_message>
<xml_diff>
--- a/Optimization/hpc_efficiency.pptx
+++ b/Optimization/hpc_efficiency.pptx
@@ -1557,7 +1557,7 @@
           <a:p>
             <a:fld id="{2E6AAE95-D4FC-4D00-935A-EAE928727A56}" type="datetimeFigureOut">
               <a:rPr lang="en-US" smtClean="0"/>
-              <a:t>7/13/2018</a:t>
+              <a:t>8/1/2018</a:t>
             </a:fld>
             <a:endParaRPr lang="en-US"/>
           </a:p>
@@ -2090,7 +2090,7 @@
           <a:p>
             <a:fld id="{1CFF3F78-F57F-4409-A41B-5EC46D4F404B}" type="datetime1">
               <a:rPr lang="nl-BE" smtClean="0"/>
-              <a:t>13/07/2018</a:t>
+              <a:t>1/08/2018</a:t>
             </a:fld>
             <a:endParaRPr lang="nl-BE"/>
           </a:p>
@@ -2260,7 +2260,7 @@
           <a:p>
             <a:fld id="{7D029E61-52E3-412C-82EB-2F81B17C0AF1}" type="datetime1">
               <a:rPr lang="nl-BE" smtClean="0"/>
-              <a:t>13/07/2018</a:t>
+              <a:t>1/08/2018</a:t>
             </a:fld>
             <a:endParaRPr lang="nl-BE"/>
           </a:p>
@@ -2440,7 +2440,7 @@
           <a:p>
             <a:fld id="{A83F1CEF-A38E-4001-89C6-F3FC7784F299}" type="datetime1">
               <a:rPr lang="nl-BE" smtClean="0"/>
-              <a:t>13/07/2018</a:t>
+              <a:t>1/08/2018</a:t>
             </a:fld>
             <a:endParaRPr lang="nl-BE"/>
           </a:p>
@@ -2566,7 +2566,7 @@
           <a:p>
             <a:fld id="{1FDE84DB-AADA-4C3F-BF46-CA664A504479}" type="datetime1">
               <a:rPr lang="nl-BE" smtClean="0"/>
-              <a:t>13/07/2018</a:t>
+              <a:t>1/08/2018</a:t>
             </a:fld>
             <a:endParaRPr lang="nl-BE" dirty="0"/>
           </a:p>
@@ -2810,7 +2810,7 @@
           <a:p>
             <a:fld id="{8CD53A43-C15C-4F05-9AD7-DB9DE837084D}" type="datetime1">
               <a:rPr lang="nl-BE" smtClean="0"/>
-              <a:t>13/07/2018</a:t>
+              <a:t>1/08/2018</a:t>
             </a:fld>
             <a:endParaRPr lang="nl-BE"/>
           </a:p>
@@ -3056,7 +3056,7 @@
           <a:p>
             <a:fld id="{8994D238-D949-4AEF-9753-A8B6EFA964A0}" type="datetime1">
               <a:rPr lang="nl-BE" smtClean="0"/>
-              <a:t>13/07/2018</a:t>
+              <a:t>1/08/2018</a:t>
             </a:fld>
             <a:endParaRPr lang="nl-BE"/>
           </a:p>
@@ -3344,7 +3344,7 @@
           <a:p>
             <a:fld id="{4D234023-BF99-4AD0-835E-8125DA2B6664}" type="datetime1">
               <a:rPr lang="nl-BE" smtClean="0"/>
-              <a:t>13/07/2018</a:t>
+              <a:t>1/08/2018</a:t>
             </a:fld>
             <a:endParaRPr lang="nl-BE"/>
           </a:p>
@@ -3766,7 +3766,7 @@
           <a:p>
             <a:fld id="{DB075A73-5C1D-406E-9444-3C5C58580E8E}" type="datetime1">
               <a:rPr lang="nl-BE" smtClean="0"/>
-              <a:t>13/07/2018</a:t>
+              <a:t>1/08/2018</a:t>
             </a:fld>
             <a:endParaRPr lang="nl-BE"/>
           </a:p>
@@ -3884,7 +3884,7 @@
           <a:p>
             <a:fld id="{E111FB2D-2E17-4D8F-A64A-4EB0C3D12494}" type="datetime1">
               <a:rPr lang="nl-BE" smtClean="0"/>
-              <a:t>13/07/2018</a:t>
+              <a:t>1/08/2018</a:t>
             </a:fld>
             <a:endParaRPr lang="nl-BE"/>
           </a:p>
@@ -3979,7 +3979,7 @@
           <a:p>
             <a:fld id="{5BE27D71-2267-4E44-9F33-05B60E5C7D9D}" type="datetime1">
               <a:rPr lang="nl-BE" smtClean="0"/>
-              <a:t>13/07/2018</a:t>
+              <a:t>1/08/2018</a:t>
             </a:fld>
             <a:endParaRPr lang="nl-BE"/>
           </a:p>
@@ -4256,7 +4256,7 @@
           <a:p>
             <a:fld id="{182F587C-96C8-4813-A767-3084061A3229}" type="datetime1">
               <a:rPr lang="nl-BE" smtClean="0"/>
-              <a:t>13/07/2018</a:t>
+              <a:t>1/08/2018</a:t>
             </a:fld>
             <a:endParaRPr lang="nl-BE"/>
           </a:p>
@@ -4509,7 +4509,7 @@
           <a:p>
             <a:fld id="{8B021CF8-BBBB-4DFA-8713-49842AA07274}" type="datetime1">
               <a:rPr lang="nl-BE" smtClean="0"/>
-              <a:t>13/07/2018</a:t>
+              <a:t>1/08/2018</a:t>
             </a:fld>
             <a:endParaRPr lang="nl-BE"/>
           </a:p>
@@ -4722,7 +4722,7 @@
           <a:p>
             <a:fld id="{CDBFABB5-0AB3-4CB6-A705-6887DEB1F9F2}" type="datetime1">
               <a:rPr lang="nl-BE" smtClean="0"/>
-              <a:t>13/07/2018</a:t>
+              <a:t>1/08/2018</a:t>
             </a:fld>
             <a:endParaRPr lang="nl-BE"/>
           </a:p>
@@ -10103,7 +10103,7 @@
           <a:graphicData uri="http://schemas.openxmlformats.org/presentationml/2006/ole">
             <mc:AlternateContent xmlns:mc="http://schemas.openxmlformats.org/markup-compatibility/2006">
               <mc:Choice xmlns:v="urn:schemas-microsoft-com:vml" Requires="v">
-                <p:oleObj spid="_x0000_s1250" name="Equation" r:id="rId3" imgW="812520" imgH="393480" progId="Equation.3">
+                <p:oleObj spid="_x0000_s1254" name="Equation" r:id="rId3" imgW="812520" imgH="393480" progId="Equation.3">
                   <p:embed/>
                 </p:oleObj>
               </mc:Choice>
@@ -10160,7 +10160,7 @@
           <a:graphicData uri="http://schemas.openxmlformats.org/presentationml/2006/ole">
             <mc:AlternateContent xmlns:mc="http://schemas.openxmlformats.org/markup-compatibility/2006">
               <mc:Choice xmlns:v="urn:schemas-microsoft-com:vml" Requires="v">
-                <p:oleObj spid="_x0000_s1251" name="Equation" r:id="rId5" imgW="2489040" imgH="431640" progId="Equation.3">
+                <p:oleObj spid="_x0000_s1255" name="Equation" r:id="rId5" imgW="2489040" imgH="431640" progId="Equation.3">
                   <p:embed/>
                 </p:oleObj>
               </mc:Choice>
@@ -20822,7 +20822,7 @@
           <a:graphicData uri="http://schemas.openxmlformats.org/presentationml/2006/ole">
             <mc:AlternateContent xmlns:mc="http://schemas.openxmlformats.org/markup-compatibility/2006">
               <mc:Choice xmlns:v="urn:schemas-microsoft-com:vml" Requires="v">
-                <p:oleObj spid="_x0000_s2241" name="Equation" r:id="rId3" imgW="1091880" imgH="1041120" progId="Equation.3">
+                <p:oleObj spid="_x0000_s2245" name="Equation" r:id="rId3" imgW="1091880" imgH="1041120" progId="Equation.3">
                   <p:embed/>
                 </p:oleObj>
               </mc:Choice>
@@ -22193,7 +22193,7 @@
           <a:graphicData uri="http://schemas.openxmlformats.org/presentationml/2006/ole">
             <mc:AlternateContent xmlns:mc="http://schemas.openxmlformats.org/markup-compatibility/2006">
               <mc:Choice xmlns:v="urn:schemas-microsoft-com:vml" Requires="v">
-                <p:oleObj spid="_x0000_s2242" name="Equation" r:id="rId5" imgW="1091880" imgH="1041120" progId="Equation.3">
+                <p:oleObj spid="_x0000_s2246" name="Equation" r:id="rId5" imgW="1091880" imgH="1041120" progId="Equation.3">
                   <p:embed/>
                 </p:oleObj>
               </mc:Choice>
@@ -27618,7 +27618,7 @@
           <a:graphicData uri="http://schemas.openxmlformats.org/presentationml/2006/ole">
             <mc:AlternateContent xmlns:mc="http://schemas.openxmlformats.org/markup-compatibility/2006">
               <mc:Choice xmlns:v="urn:schemas-microsoft-com:vml" Requires="v">
-                <p:oleObj spid="_x0000_s3133" name="Equation" r:id="rId3" imgW="965160" imgH="228600" progId="Equation.3">
+                <p:oleObj spid="_x0000_s3135" name="Equation" r:id="rId3" imgW="965160" imgH="228600" progId="Equation.3">
                   <p:embed/>
                 </p:oleObj>
               </mc:Choice>
@@ -32306,11 +32306,7 @@
             <a:pPr lvl="1"/>
             <a:r>
               <a:rPr lang="en-US" dirty="0" smtClean="0"/>
-              <a:t>Verify </a:t>
-            </a:r>
-            <a:r>
-              <a:rPr lang="en-US" dirty="0" smtClean="0"/>
-              <a:t>results with</a:t>
+              <a:t>Verify results with</a:t>
             </a:r>
             <a:br>
               <a:rPr lang="en-US" dirty="0" smtClean="0"/>
@@ -47672,7 +47668,7 @@
         <p:spPr/>
         <p:txBody>
           <a:bodyPr>
-            <a:normAutofit fontScale="85000" lnSpcReduction="10000"/>
+            <a:normAutofit fontScale="85000" lnSpcReduction="20000"/>
           </a:bodyPr>
           <a:lstStyle/>
           <a:p>
@@ -47771,7 +47767,26 @@
               <a:rPr lang="en-US" dirty="0" smtClean="0">
                 <a:hlinkClick r:id="rId6"/>
               </a:rPr>
-              <a:t>Why has CPU frequency ceased to grow?</a:t>
+              <a:t>Why has CPU frequency ceased to grow</a:t>
+            </a:r>
+            <a:r>
+              <a:rPr lang="en-US" dirty="0" smtClean="0">
+                <a:hlinkClick r:id="rId6"/>
+              </a:rPr>
+              <a:t>?</a:t>
+            </a:r>
+            <a:endParaRPr lang="en-US" dirty="0" smtClean="0"/>
+          </a:p>
+          <a:p>
+            <a:r>
+              <a:rPr lang="en-US" dirty="0" smtClean="0">
+                <a:hlinkClick r:id="rId7"/>
+              </a:rPr>
+              <a:t>Compiler Explorer</a:t>
+            </a:r>
+            <a:r>
+              <a:rPr lang="en-US" dirty="0" smtClean="0"/>
+              <a:t>: interactively shows assembler</a:t>
             </a:r>
             <a:endParaRPr lang="nl-BE" dirty="0" smtClean="0"/>
           </a:p>

</xml_diff>

<commit_message>
Add memory bandwidth skylake
</commit_message>
<xml_diff>
--- a/Optimization/hpc_efficiency.pptx
+++ b/Optimization/hpc_efficiency.pptx
@@ -870,6 +870,7 @@
     </c:plotArea>
     <c:legend>
       <c:legendPos val="r"/>
+      <c:layout/>
       <c:overlay val="0"/>
     </c:legend>
     <c:plotVisOnly val="1"/>
@@ -1130,6 +1131,7 @@
     </c:plotArea>
     <c:legend>
       <c:legendPos val="r"/>
+      <c:layout/>
       <c:overlay val="0"/>
     </c:legend>
     <c:plotVisOnly val="1"/>
@@ -1557,7 +1559,7 @@
           <a:p>
             <a:fld id="{2E6AAE95-D4FC-4D00-935A-EAE928727A56}" type="datetimeFigureOut">
               <a:rPr lang="en-US" smtClean="0"/>
-              <a:t>8/1/2018</a:t>
+              <a:t>1/17/2019</a:t>
             </a:fld>
             <a:endParaRPr lang="en-US"/>
           </a:p>
@@ -2090,7 +2092,7 @@
           <a:p>
             <a:fld id="{1CFF3F78-F57F-4409-A41B-5EC46D4F404B}" type="datetime1">
               <a:rPr lang="nl-BE" smtClean="0"/>
-              <a:t>1/08/2018</a:t>
+              <a:t>17/01/2019</a:t>
             </a:fld>
             <a:endParaRPr lang="nl-BE"/>
           </a:p>
@@ -2260,7 +2262,7 @@
           <a:p>
             <a:fld id="{7D029E61-52E3-412C-82EB-2F81B17C0AF1}" type="datetime1">
               <a:rPr lang="nl-BE" smtClean="0"/>
-              <a:t>1/08/2018</a:t>
+              <a:t>17/01/2019</a:t>
             </a:fld>
             <a:endParaRPr lang="nl-BE"/>
           </a:p>
@@ -2440,7 +2442,7 @@
           <a:p>
             <a:fld id="{A83F1CEF-A38E-4001-89C6-F3FC7784F299}" type="datetime1">
               <a:rPr lang="nl-BE" smtClean="0"/>
-              <a:t>1/08/2018</a:t>
+              <a:t>17/01/2019</a:t>
             </a:fld>
             <a:endParaRPr lang="nl-BE"/>
           </a:p>
@@ -2566,7 +2568,7 @@
           <a:p>
             <a:fld id="{1FDE84DB-AADA-4C3F-BF46-CA664A504479}" type="datetime1">
               <a:rPr lang="nl-BE" smtClean="0"/>
-              <a:t>1/08/2018</a:t>
+              <a:t>17/01/2019</a:t>
             </a:fld>
             <a:endParaRPr lang="nl-BE" dirty="0"/>
           </a:p>
@@ -2810,7 +2812,7 @@
           <a:p>
             <a:fld id="{8CD53A43-C15C-4F05-9AD7-DB9DE837084D}" type="datetime1">
               <a:rPr lang="nl-BE" smtClean="0"/>
-              <a:t>1/08/2018</a:t>
+              <a:t>17/01/2019</a:t>
             </a:fld>
             <a:endParaRPr lang="nl-BE"/>
           </a:p>
@@ -3056,7 +3058,7 @@
           <a:p>
             <a:fld id="{8994D238-D949-4AEF-9753-A8B6EFA964A0}" type="datetime1">
               <a:rPr lang="nl-BE" smtClean="0"/>
-              <a:t>1/08/2018</a:t>
+              <a:t>17/01/2019</a:t>
             </a:fld>
             <a:endParaRPr lang="nl-BE"/>
           </a:p>
@@ -3344,7 +3346,7 @@
           <a:p>
             <a:fld id="{4D234023-BF99-4AD0-835E-8125DA2B6664}" type="datetime1">
               <a:rPr lang="nl-BE" smtClean="0"/>
-              <a:t>1/08/2018</a:t>
+              <a:t>17/01/2019</a:t>
             </a:fld>
             <a:endParaRPr lang="nl-BE"/>
           </a:p>
@@ -3766,7 +3768,7 @@
           <a:p>
             <a:fld id="{DB075A73-5C1D-406E-9444-3C5C58580E8E}" type="datetime1">
               <a:rPr lang="nl-BE" smtClean="0"/>
-              <a:t>1/08/2018</a:t>
+              <a:t>17/01/2019</a:t>
             </a:fld>
             <a:endParaRPr lang="nl-BE"/>
           </a:p>
@@ -3884,7 +3886,7 @@
           <a:p>
             <a:fld id="{E111FB2D-2E17-4D8F-A64A-4EB0C3D12494}" type="datetime1">
               <a:rPr lang="nl-BE" smtClean="0"/>
-              <a:t>1/08/2018</a:t>
+              <a:t>17/01/2019</a:t>
             </a:fld>
             <a:endParaRPr lang="nl-BE"/>
           </a:p>
@@ -3979,7 +3981,7 @@
           <a:p>
             <a:fld id="{5BE27D71-2267-4E44-9F33-05B60E5C7D9D}" type="datetime1">
               <a:rPr lang="nl-BE" smtClean="0"/>
-              <a:t>1/08/2018</a:t>
+              <a:t>17/01/2019</a:t>
             </a:fld>
             <a:endParaRPr lang="nl-BE"/>
           </a:p>
@@ -4256,7 +4258,7 @@
           <a:p>
             <a:fld id="{182F587C-96C8-4813-A767-3084061A3229}" type="datetime1">
               <a:rPr lang="nl-BE" smtClean="0"/>
-              <a:t>1/08/2018</a:t>
+              <a:t>17/01/2019</a:t>
             </a:fld>
             <a:endParaRPr lang="nl-BE"/>
           </a:p>
@@ -4509,7 +4511,7 @@
           <a:p>
             <a:fld id="{8B021CF8-BBBB-4DFA-8713-49842AA07274}" type="datetime1">
               <a:rPr lang="nl-BE" smtClean="0"/>
-              <a:t>1/08/2018</a:t>
+              <a:t>17/01/2019</a:t>
             </a:fld>
             <a:endParaRPr lang="nl-BE"/>
           </a:p>
@@ -4722,7 +4724,7 @@
           <a:p>
             <a:fld id="{CDBFABB5-0AB3-4CB6-A705-6887DEB1F9F2}" type="datetime1">
               <a:rPr lang="nl-BE" smtClean="0"/>
-              <a:t>1/08/2018</a:t>
+              <a:t>17/01/2019</a:t>
             </a:fld>
             <a:endParaRPr lang="nl-BE"/>
           </a:p>
@@ -10103,7 +10105,7 @@
           <a:graphicData uri="http://schemas.openxmlformats.org/presentationml/2006/ole">
             <mc:AlternateContent xmlns:mc="http://schemas.openxmlformats.org/markup-compatibility/2006">
               <mc:Choice xmlns:v="urn:schemas-microsoft-com:vml" Requires="v">
-                <p:oleObj spid="_x0000_s1254" name="Equation" r:id="rId3" imgW="812520" imgH="393480" progId="Equation.3">
+                <p:oleObj spid="_x0000_s1256" name="Equation" r:id="rId3" imgW="812520" imgH="393480" progId="Equation.3">
                   <p:embed/>
                 </p:oleObj>
               </mc:Choice>
@@ -10160,7 +10162,7 @@
           <a:graphicData uri="http://schemas.openxmlformats.org/presentationml/2006/ole">
             <mc:AlternateContent xmlns:mc="http://schemas.openxmlformats.org/markup-compatibility/2006">
               <mc:Choice xmlns:v="urn:schemas-microsoft-com:vml" Requires="v">
-                <p:oleObj spid="_x0000_s1255" name="Equation" r:id="rId5" imgW="2489040" imgH="431640" progId="Equation.3">
+                <p:oleObj spid="_x0000_s1257" name="Equation" r:id="rId5" imgW="2489040" imgH="431640" progId="Equation.3">
                   <p:embed/>
                 </p:oleObj>
               </mc:Choice>
@@ -20822,7 +20824,7 @@
           <a:graphicData uri="http://schemas.openxmlformats.org/presentationml/2006/ole">
             <mc:AlternateContent xmlns:mc="http://schemas.openxmlformats.org/markup-compatibility/2006">
               <mc:Choice xmlns:v="urn:schemas-microsoft-com:vml" Requires="v">
-                <p:oleObj spid="_x0000_s2245" name="Equation" r:id="rId3" imgW="1091880" imgH="1041120" progId="Equation.3">
+                <p:oleObj spid="_x0000_s2247" name="Equation" r:id="rId3" imgW="1091880" imgH="1041120" progId="Equation.3">
                   <p:embed/>
                 </p:oleObj>
               </mc:Choice>
@@ -22193,7 +22195,7 @@
           <a:graphicData uri="http://schemas.openxmlformats.org/presentationml/2006/ole">
             <mc:AlternateContent xmlns:mc="http://schemas.openxmlformats.org/markup-compatibility/2006">
               <mc:Choice xmlns:v="urn:schemas-microsoft-com:vml" Requires="v">
-                <p:oleObj spid="_x0000_s2246" name="Equation" r:id="rId5" imgW="1091880" imgH="1041120" progId="Equation.3">
+                <p:oleObj spid="_x0000_s2248" name="Equation" r:id="rId5" imgW="1091880" imgH="1041120" progId="Equation.3">
                   <p:embed/>
                 </p:oleObj>
               </mc:Choice>
@@ -27618,7 +27620,7 @@
           <a:graphicData uri="http://schemas.openxmlformats.org/presentationml/2006/ole">
             <mc:AlternateContent xmlns:mc="http://schemas.openxmlformats.org/markup-compatibility/2006">
               <mc:Choice xmlns:v="urn:schemas-microsoft-com:vml" Requires="v">
-                <p:oleObj spid="_x0000_s3135" name="Equation" r:id="rId3" imgW="965160" imgH="228600" progId="Equation.3">
+                <p:oleObj spid="_x0000_s3136" name="Equation" r:id="rId3" imgW="965160" imgH="228600" progId="Equation.3">
                   <p:embed/>
                 </p:oleObj>
               </mc:Choice>
@@ -47767,13 +47769,7 @@
               <a:rPr lang="en-US" dirty="0" smtClean="0">
                 <a:hlinkClick r:id="rId6"/>
               </a:rPr>
-              <a:t>Why has CPU frequency ceased to grow</a:t>
-            </a:r>
-            <a:r>
-              <a:rPr lang="en-US" dirty="0" smtClean="0">
-                <a:hlinkClick r:id="rId6"/>
-              </a:rPr>
-              <a:t>?</a:t>
+              <a:t>Why has CPU frequency ceased to grow?</a:t>
             </a:r>
             <a:endParaRPr lang="en-US" dirty="0" smtClean="0"/>
           </a:p>
@@ -50675,7 +50671,7 @@
         <p:spPr/>
         <p:txBody>
           <a:bodyPr>
-            <a:normAutofit fontScale="62500" lnSpcReduction="20000"/>
+            <a:normAutofit fontScale="55000" lnSpcReduction="20000"/>
           </a:bodyPr>
           <a:lstStyle/>
           <a:p>
@@ -50718,8 +50714,24 @@
             </a:r>
             <a:r>
               <a:rPr lang="en-US" dirty="0" smtClean="0"/>
-              <a:t> (dual socket, 14 core): 125 GB/s</a:t>
-            </a:r>
+              <a:t> (dual socket, 14 core): 125 </a:t>
+            </a:r>
+            <a:r>
+              <a:rPr lang="en-US" dirty="0" smtClean="0"/>
+              <a:t>GB/s</a:t>
+            </a:r>
+          </a:p>
+          <a:p>
+            <a:pPr lvl="1"/>
+            <a:r>
+              <a:rPr lang="en-US" dirty="0" err="1" smtClean="0"/>
+              <a:t>skylake</a:t>
+            </a:r>
+            <a:r>
+              <a:rPr lang="en-US" dirty="0" smtClean="0"/>
+              <a:t> (dual socket, 18 core): 256 GB/s</a:t>
+            </a:r>
+            <a:endParaRPr lang="en-US" dirty="0" smtClean="0"/>
           </a:p>
           <a:p>
             <a:r>
@@ -50757,16 +50769,19 @@
           <a:p>
             <a:pPr lvl="1"/>
             <a:r>
-              <a:rPr lang="nl-BE" dirty="0" err="1"/>
-              <a:t>broadwell</a:t>
-            </a:r>
-            <a:r>
               <a:rPr lang="nl-BE" dirty="0"/>
-              <a:t>: 30 </a:t>
+              <a:t>broadwell: 30 </a:t>
             </a:r>
             <a:r>
               <a:rPr lang="nl-BE" dirty="0" smtClean="0"/>
               <a:t>GB/s</a:t>
+            </a:r>
+          </a:p>
+          <a:p>
+            <a:pPr lvl="1"/>
+            <a:r>
+              <a:rPr lang="nl-BE" dirty="0" smtClean="0"/>
+              <a:t>skylake: 80 GB/s</a:t>
             </a:r>
             <a:endParaRPr lang="en-US" dirty="0" smtClean="0"/>
           </a:p>

</xml_diff>

<commit_message>
Add section on profiling
</commit_message>
<xml_diff>
--- a/Optimization/hpc_efficiency.pptx
+++ b/Optimization/hpc_efficiency.pptx
@@ -5,7 +5,7 @@
     <p:sldMasterId id="2147483648" r:id="rId1"/>
   </p:sldMasterIdLst>
   <p:notesMasterIdLst>
-    <p:notesMasterId r:id="rId59"/>
+    <p:notesMasterId r:id="rId61"/>
   </p:notesMasterIdLst>
   <p:sldIdLst>
     <p:sldId id="267" r:id="rId2"/>
@@ -54,17 +54,19 @@
     <p:sldId id="315" r:id="rId45"/>
     <p:sldId id="316" r:id="rId46"/>
     <p:sldId id="317" r:id="rId47"/>
-    <p:sldId id="306" r:id="rId48"/>
-    <p:sldId id="307" r:id="rId49"/>
-    <p:sldId id="308" r:id="rId50"/>
-    <p:sldId id="309" r:id="rId51"/>
-    <p:sldId id="310" r:id="rId52"/>
-    <p:sldId id="287" r:id="rId53"/>
-    <p:sldId id="292" r:id="rId54"/>
-    <p:sldId id="286" r:id="rId55"/>
-    <p:sldId id="297" r:id="rId56"/>
-    <p:sldId id="271" r:id="rId57"/>
-    <p:sldId id="283" r:id="rId58"/>
+    <p:sldId id="320" r:id="rId48"/>
+    <p:sldId id="319" r:id="rId49"/>
+    <p:sldId id="306" r:id="rId50"/>
+    <p:sldId id="307" r:id="rId51"/>
+    <p:sldId id="308" r:id="rId52"/>
+    <p:sldId id="309" r:id="rId53"/>
+    <p:sldId id="310" r:id="rId54"/>
+    <p:sldId id="287" r:id="rId55"/>
+    <p:sldId id="292" r:id="rId56"/>
+    <p:sldId id="286" r:id="rId57"/>
+    <p:sldId id="297" r:id="rId58"/>
+    <p:sldId id="271" r:id="rId59"/>
+    <p:sldId id="283" r:id="rId60"/>
   </p:sldIdLst>
   <p:sldSz cx="9144000" cy="6858000" type="screen4x3"/>
   <p:notesSz cx="6858000" cy="9144000"/>
@@ -238,6 +240,12 @@
             <p14:sldId id="315"/>
             <p14:sldId id="316"/>
             <p14:sldId id="317"/>
+          </p14:sldIdLst>
+        </p14:section>
+        <p14:section name="Profiling" id="{EDEF56BF-D246-4EAF-881D-1CE18707009F}">
+          <p14:sldIdLst>
+            <p14:sldId id="320"/>
+            <p14:sldId id="319"/>
           </p14:sldIdLst>
         </p14:section>
         <p14:section name="FDO" id="{24B1008B-28D6-4913-91F8-721FA958EDD4}">
@@ -870,7 +878,6 @@
     </c:plotArea>
     <c:legend>
       <c:legendPos val="r"/>
-      <c:layout/>
       <c:overlay val="0"/>
     </c:legend>
     <c:plotVisOnly val="1"/>
@@ -1559,7 +1566,7 @@
           <a:p>
             <a:fld id="{2E6AAE95-D4FC-4D00-935A-EAE928727A56}" type="datetimeFigureOut">
               <a:rPr lang="en-US" smtClean="0"/>
-              <a:t>1/17/2019</a:t>
+              <a:t>2019-06-18</a:t>
             </a:fld>
             <a:endParaRPr lang="en-US"/>
           </a:p>
@@ -2092,7 +2099,7 @@
           <a:p>
             <a:fld id="{1CFF3F78-F57F-4409-A41B-5EC46D4F404B}" type="datetime1">
               <a:rPr lang="nl-BE" smtClean="0"/>
-              <a:t>17/01/2019</a:t>
+              <a:t>18/06/2019</a:t>
             </a:fld>
             <a:endParaRPr lang="nl-BE"/>
           </a:p>
@@ -2262,7 +2269,7 @@
           <a:p>
             <a:fld id="{7D029E61-52E3-412C-82EB-2F81B17C0AF1}" type="datetime1">
               <a:rPr lang="nl-BE" smtClean="0"/>
-              <a:t>17/01/2019</a:t>
+              <a:t>18/06/2019</a:t>
             </a:fld>
             <a:endParaRPr lang="nl-BE"/>
           </a:p>
@@ -2442,7 +2449,7 @@
           <a:p>
             <a:fld id="{A83F1CEF-A38E-4001-89C6-F3FC7784F299}" type="datetime1">
               <a:rPr lang="nl-BE" smtClean="0"/>
-              <a:t>17/01/2019</a:t>
+              <a:t>18/06/2019</a:t>
             </a:fld>
             <a:endParaRPr lang="nl-BE"/>
           </a:p>
@@ -2568,7 +2575,7 @@
           <a:p>
             <a:fld id="{1FDE84DB-AADA-4C3F-BF46-CA664A504479}" type="datetime1">
               <a:rPr lang="nl-BE" smtClean="0"/>
-              <a:t>17/01/2019</a:t>
+              <a:t>18/06/2019</a:t>
             </a:fld>
             <a:endParaRPr lang="nl-BE" dirty="0"/>
           </a:p>
@@ -2812,7 +2819,7 @@
           <a:p>
             <a:fld id="{8CD53A43-C15C-4F05-9AD7-DB9DE837084D}" type="datetime1">
               <a:rPr lang="nl-BE" smtClean="0"/>
-              <a:t>17/01/2019</a:t>
+              <a:t>18/06/2019</a:t>
             </a:fld>
             <a:endParaRPr lang="nl-BE"/>
           </a:p>
@@ -3058,7 +3065,7 @@
           <a:p>
             <a:fld id="{8994D238-D949-4AEF-9753-A8B6EFA964A0}" type="datetime1">
               <a:rPr lang="nl-BE" smtClean="0"/>
-              <a:t>17/01/2019</a:t>
+              <a:t>18/06/2019</a:t>
             </a:fld>
             <a:endParaRPr lang="nl-BE"/>
           </a:p>
@@ -3346,7 +3353,7 @@
           <a:p>
             <a:fld id="{4D234023-BF99-4AD0-835E-8125DA2B6664}" type="datetime1">
               <a:rPr lang="nl-BE" smtClean="0"/>
-              <a:t>17/01/2019</a:t>
+              <a:t>18/06/2019</a:t>
             </a:fld>
             <a:endParaRPr lang="nl-BE"/>
           </a:p>
@@ -3768,7 +3775,7 @@
           <a:p>
             <a:fld id="{DB075A73-5C1D-406E-9444-3C5C58580E8E}" type="datetime1">
               <a:rPr lang="nl-BE" smtClean="0"/>
-              <a:t>17/01/2019</a:t>
+              <a:t>18/06/2019</a:t>
             </a:fld>
             <a:endParaRPr lang="nl-BE"/>
           </a:p>
@@ -3886,7 +3893,7 @@
           <a:p>
             <a:fld id="{E111FB2D-2E17-4D8F-A64A-4EB0C3D12494}" type="datetime1">
               <a:rPr lang="nl-BE" smtClean="0"/>
-              <a:t>17/01/2019</a:t>
+              <a:t>18/06/2019</a:t>
             </a:fld>
             <a:endParaRPr lang="nl-BE"/>
           </a:p>
@@ -3981,7 +3988,7 @@
           <a:p>
             <a:fld id="{5BE27D71-2267-4E44-9F33-05B60E5C7D9D}" type="datetime1">
               <a:rPr lang="nl-BE" smtClean="0"/>
-              <a:t>17/01/2019</a:t>
+              <a:t>18/06/2019</a:t>
             </a:fld>
             <a:endParaRPr lang="nl-BE"/>
           </a:p>
@@ -4258,7 +4265,7 @@
           <a:p>
             <a:fld id="{182F587C-96C8-4813-A767-3084061A3229}" type="datetime1">
               <a:rPr lang="nl-BE" smtClean="0"/>
-              <a:t>17/01/2019</a:t>
+              <a:t>18/06/2019</a:t>
             </a:fld>
             <a:endParaRPr lang="nl-BE"/>
           </a:p>
@@ -4511,7 +4518,7 @@
           <a:p>
             <a:fld id="{8B021CF8-BBBB-4DFA-8713-49842AA07274}" type="datetime1">
               <a:rPr lang="nl-BE" smtClean="0"/>
-              <a:t>17/01/2019</a:t>
+              <a:t>18/06/2019</a:t>
             </a:fld>
             <a:endParaRPr lang="nl-BE"/>
           </a:p>
@@ -4724,7 +4731,7 @@
           <a:p>
             <a:fld id="{CDBFABB5-0AB3-4CB6-A705-6887DEB1F9F2}" type="datetime1">
               <a:rPr lang="nl-BE" smtClean="0"/>
-              <a:t>17/01/2019</a:t>
+              <a:t>18/06/2019</a:t>
             </a:fld>
             <a:endParaRPr lang="nl-BE"/>
           </a:p>
@@ -10105,7 +10112,7 @@
           <a:graphicData uri="http://schemas.openxmlformats.org/presentationml/2006/ole">
             <mc:AlternateContent xmlns:mc="http://schemas.openxmlformats.org/markup-compatibility/2006">
               <mc:Choice xmlns:v="urn:schemas-microsoft-com:vml" Requires="v">
-                <p:oleObj spid="_x0000_s1256" name="Equation" r:id="rId3" imgW="812520" imgH="393480" progId="Equation.3">
+                <p:oleObj spid="_x0000_s1262" name="Equation" r:id="rId3" imgW="812520" imgH="393480" progId="Equation.3">
                   <p:embed/>
                 </p:oleObj>
               </mc:Choice>
@@ -10162,7 +10169,7 @@
           <a:graphicData uri="http://schemas.openxmlformats.org/presentationml/2006/ole">
             <mc:AlternateContent xmlns:mc="http://schemas.openxmlformats.org/markup-compatibility/2006">
               <mc:Choice xmlns:v="urn:schemas-microsoft-com:vml" Requires="v">
-                <p:oleObj spid="_x0000_s1257" name="Equation" r:id="rId5" imgW="2489040" imgH="431640" progId="Equation.3">
+                <p:oleObj spid="_x0000_s1263" name="Equation" r:id="rId5" imgW="2489040" imgH="431640" progId="Equation.3">
                   <p:embed/>
                 </p:oleObj>
               </mc:Choice>
@@ -20824,7 +20831,7 @@
           <a:graphicData uri="http://schemas.openxmlformats.org/presentationml/2006/ole">
             <mc:AlternateContent xmlns:mc="http://schemas.openxmlformats.org/markup-compatibility/2006">
               <mc:Choice xmlns:v="urn:schemas-microsoft-com:vml" Requires="v">
-                <p:oleObj spid="_x0000_s2247" name="Equation" r:id="rId3" imgW="1091880" imgH="1041120" progId="Equation.3">
+                <p:oleObj spid="_x0000_s2253" name="Equation" r:id="rId3" imgW="1091880" imgH="1041120" progId="Equation.3">
                   <p:embed/>
                 </p:oleObj>
               </mc:Choice>
@@ -22195,7 +22202,7 @@
           <a:graphicData uri="http://schemas.openxmlformats.org/presentationml/2006/ole">
             <mc:AlternateContent xmlns:mc="http://schemas.openxmlformats.org/markup-compatibility/2006">
               <mc:Choice xmlns:v="urn:schemas-microsoft-com:vml" Requires="v">
-                <p:oleObj spid="_x0000_s2248" name="Equation" r:id="rId5" imgW="1091880" imgH="1041120" progId="Equation.3">
+                <p:oleObj spid="_x0000_s2254" name="Equation" r:id="rId5" imgW="1091880" imgH="1041120" progId="Equation.3">
                   <p:embed/>
                 </p:oleObj>
               </mc:Choice>
@@ -27620,7 +27627,7 @@
           <a:graphicData uri="http://schemas.openxmlformats.org/presentationml/2006/ole">
             <mc:AlternateContent xmlns:mc="http://schemas.openxmlformats.org/markup-compatibility/2006">
               <mc:Choice xmlns:v="urn:schemas-microsoft-com:vml" Requires="v">
-                <p:oleObj spid="_x0000_s3136" name="Equation" r:id="rId3" imgW="965160" imgH="228600" progId="Equation.3">
+                <p:oleObj spid="_x0000_s3139" name="Equation" r:id="rId3" imgW="965160" imgH="228600" progId="Equation.3">
                   <p:embed/>
                 </p:oleObj>
               </mc:Choice>
@@ -45262,7 +45269,7 @@
           <a:p>
             <a:r>
               <a:rPr lang="en-US" dirty="0" smtClean="0"/>
-              <a:t>Feedback-guided optimization</a:t>
+              <a:t>Profiling</a:t>
             </a:r>
             <a:endParaRPr lang="en-US" dirty="0"/>
           </a:p>
@@ -45313,7 +45320,7 @@
     </p:spTree>
     <p:extLst>
       <p:ext uri="{BB962C8B-B14F-4D97-AF65-F5344CB8AC3E}">
-        <p14:creationId xmlns:p14="http://schemas.microsoft.com/office/powerpoint/2010/main" val="3251639006"/>
+        <p14:creationId xmlns:p14="http://schemas.microsoft.com/office/powerpoint/2010/main" val="68835048"/>
       </p:ext>
     </p:extLst>
   </p:cSld>
@@ -45363,8 +45370,260 @@
           <a:lstStyle/>
           <a:p>
             <a:r>
+              <a:rPr lang="en-US" dirty="0" err="1" smtClean="0"/>
+              <a:t>gprof</a:t>
+            </a:r>
+            <a:r>
               <a:rPr lang="en-US" dirty="0" smtClean="0"/>
-              <a:t>Philosophy</a:t>
+              <a:t> with GCC</a:t>
+            </a:r>
+            <a:endParaRPr lang="en-US" dirty="0"/>
+          </a:p>
+        </p:txBody>
+      </p:sp>
+      <p:sp>
+        <p:nvSpPr>
+          <p:cNvPr id="3" name="Content Placeholder 2"/>
+          <p:cNvSpPr>
+            <a:spLocks noGrp="1"/>
+          </p:cNvSpPr>
+          <p:nvPr>
+            <p:ph idx="1"/>
+          </p:nvPr>
+        </p:nvSpPr>
+        <p:spPr/>
+        <p:txBody>
+          <a:bodyPr/>
+          <a:lstStyle/>
+          <a:p>
+            <a:r>
+              <a:rPr lang="en-US" dirty="0" smtClean="0"/>
+              <a:t>Compile/link with </a:t>
+            </a:r>
+            <a:r>
+              <a:rPr lang="en-US" dirty="0" smtClean="0">
+                <a:latin typeface="Courier New" panose="02070309020205020404" pitchFamily="49" charset="0"/>
+                <a:cs typeface="Courier New" panose="02070309020205020404" pitchFamily="49" charset="0"/>
+              </a:rPr>
+              <a:t>–g  -</a:t>
+            </a:r>
+            <a:r>
+              <a:rPr lang="en-US" dirty="0" err="1" smtClean="0">
+                <a:latin typeface="Courier New" panose="02070309020205020404" pitchFamily="49" charset="0"/>
+                <a:cs typeface="Courier New" panose="02070309020205020404" pitchFamily="49" charset="0"/>
+              </a:rPr>
+              <a:t>pg</a:t>
+            </a:r>
+            <a:endParaRPr lang="en-US" dirty="0" smtClean="0">
+              <a:latin typeface="Courier New" panose="02070309020205020404" pitchFamily="49" charset="0"/>
+              <a:cs typeface="Courier New" panose="02070309020205020404" pitchFamily="49" charset="0"/>
+            </a:endParaRPr>
+          </a:p>
+          <a:p>
+            <a:r>
+              <a:rPr lang="en-US" dirty="0" smtClean="0"/>
+              <a:t>Run application with representative data/settings</a:t>
+            </a:r>
+          </a:p>
+          <a:p>
+            <a:r>
+              <a:rPr lang="en-US" dirty="0" smtClean="0"/>
+              <a:t>View profile using </a:t>
+            </a:r>
+            <a:r>
+              <a:rPr lang="en-US" dirty="0" err="1" smtClean="0">
+                <a:latin typeface="Courier New" panose="02070309020205020404" pitchFamily="49" charset="0"/>
+                <a:cs typeface="Courier New" panose="02070309020205020404" pitchFamily="49" charset="0"/>
+              </a:rPr>
+              <a:t>gprof</a:t>
+            </a:r>
+            <a:endParaRPr lang="en-US" dirty="0">
+              <a:latin typeface="Courier New" panose="02070309020205020404" pitchFamily="49" charset="0"/>
+              <a:cs typeface="Courier New" panose="02070309020205020404" pitchFamily="49" charset="0"/>
+            </a:endParaRPr>
+          </a:p>
+        </p:txBody>
+      </p:sp>
+      <p:sp>
+        <p:nvSpPr>
+          <p:cNvPr id="4" name="Slide Number Placeholder 3"/>
+          <p:cNvSpPr>
+            <a:spLocks noGrp="1"/>
+          </p:cNvSpPr>
+          <p:nvPr>
+            <p:ph type="sldNum" sz="quarter" idx="12"/>
+          </p:nvPr>
+        </p:nvSpPr>
+        <p:spPr/>
+        <p:txBody>
+          <a:bodyPr/>
+          <a:lstStyle/>
+          <a:p>
+            <a:fld id="{6597116C-F94B-4B5B-973A-17F07FB5C418}" type="slidenum">
+              <a:rPr lang="nl-BE" smtClean="0"/>
+              <a:t>48</a:t>
+            </a:fld>
+            <a:endParaRPr lang="nl-BE"/>
+          </a:p>
+        </p:txBody>
+      </p:sp>
+    </p:spTree>
+    <p:extLst>
+      <p:ext uri="{BB962C8B-B14F-4D97-AF65-F5344CB8AC3E}">
+        <p14:creationId xmlns:p14="http://schemas.microsoft.com/office/powerpoint/2010/main" val="845156750"/>
+      </p:ext>
+    </p:extLst>
+  </p:cSld>
+  <p:clrMapOvr>
+    <a:masterClrMapping/>
+  </p:clrMapOvr>
+  <p:timing>
+    <p:tnLst>
+      <p:par>
+        <p:cTn id="1" dur="indefinite" restart="never" nodeType="tmRoot"/>
+      </p:par>
+    </p:tnLst>
+  </p:timing>
+</p:sld>
+</file>
+
+<file path=ppt/slides/slide49.xml><?xml version="1.0" encoding="utf-8"?>
+<p:sld xmlns:a="http://schemas.openxmlformats.org/drawingml/2006/main" xmlns:r="http://schemas.openxmlformats.org/officeDocument/2006/relationships" xmlns:p="http://schemas.openxmlformats.org/presentationml/2006/main">
+  <p:cSld>
+    <p:spTree>
+      <p:nvGrpSpPr>
+        <p:cNvPr id="1" name=""/>
+        <p:cNvGrpSpPr/>
+        <p:nvPr/>
+      </p:nvGrpSpPr>
+      <p:grpSpPr>
+        <a:xfrm>
+          <a:off x="0" y="0"/>
+          <a:ext cx="0" cy="0"/>
+          <a:chOff x="0" y="0"/>
+          <a:chExt cx="0" cy="0"/>
+        </a:xfrm>
+      </p:grpSpPr>
+      <p:sp>
+        <p:nvSpPr>
+          <p:cNvPr id="2" name="Title 1"/>
+          <p:cNvSpPr>
+            <a:spLocks noGrp="1"/>
+          </p:cNvSpPr>
+          <p:nvPr>
+            <p:ph type="title"/>
+          </p:nvPr>
+        </p:nvSpPr>
+        <p:spPr/>
+        <p:txBody>
+          <a:bodyPr/>
+          <a:lstStyle/>
+          <a:p>
+            <a:r>
+              <a:rPr lang="en-US" dirty="0" smtClean="0"/>
+              <a:t>Feedback-guided optimization</a:t>
+            </a:r>
+            <a:endParaRPr lang="en-US" dirty="0"/>
+          </a:p>
+        </p:txBody>
+      </p:sp>
+      <p:sp>
+        <p:nvSpPr>
+          <p:cNvPr id="3" name="Text Placeholder 2"/>
+          <p:cNvSpPr>
+            <a:spLocks noGrp="1"/>
+          </p:cNvSpPr>
+          <p:nvPr>
+            <p:ph type="body" idx="1"/>
+          </p:nvPr>
+        </p:nvSpPr>
+        <p:spPr/>
+        <p:txBody>
+          <a:bodyPr/>
+          <a:lstStyle/>
+          <a:p>
+            <a:endParaRPr lang="en-US"/>
+          </a:p>
+        </p:txBody>
+      </p:sp>
+      <p:sp>
+        <p:nvSpPr>
+          <p:cNvPr id="4" name="Slide Number Placeholder 3"/>
+          <p:cNvSpPr>
+            <a:spLocks noGrp="1"/>
+          </p:cNvSpPr>
+          <p:nvPr>
+            <p:ph type="sldNum" sz="quarter" idx="12"/>
+          </p:nvPr>
+        </p:nvSpPr>
+        <p:spPr/>
+        <p:txBody>
+          <a:bodyPr/>
+          <a:lstStyle/>
+          <a:p>
+            <a:fld id="{6597116C-F94B-4B5B-973A-17F07FB5C418}" type="slidenum">
+              <a:rPr lang="nl-BE" smtClean="0"/>
+              <a:t>49</a:t>
+            </a:fld>
+            <a:endParaRPr lang="nl-BE"/>
+          </a:p>
+        </p:txBody>
+      </p:sp>
+    </p:spTree>
+    <p:extLst>
+      <p:ext uri="{BB962C8B-B14F-4D97-AF65-F5344CB8AC3E}">
+        <p14:creationId xmlns:p14="http://schemas.microsoft.com/office/powerpoint/2010/main" val="3251639006"/>
+      </p:ext>
+    </p:extLst>
+  </p:cSld>
+  <p:clrMapOvr>
+    <a:masterClrMapping/>
+  </p:clrMapOvr>
+  <p:timing>
+    <p:tnLst>
+      <p:par>
+        <p:cTn id="1" dur="indefinite" restart="never" nodeType="tmRoot"/>
+      </p:par>
+    </p:tnLst>
+  </p:timing>
+</p:sld>
+</file>
+
+<file path=ppt/slides/slide5.xml><?xml version="1.0" encoding="utf-8"?>
+<p:sld xmlns:a="http://schemas.openxmlformats.org/drawingml/2006/main" xmlns:r="http://schemas.openxmlformats.org/officeDocument/2006/relationships" xmlns:p="http://schemas.openxmlformats.org/presentationml/2006/main">
+  <p:cSld>
+    <p:spTree>
+      <p:nvGrpSpPr>
+        <p:cNvPr id="1" name=""/>
+        <p:cNvGrpSpPr/>
+        <p:nvPr/>
+      </p:nvGrpSpPr>
+      <p:grpSpPr>
+        <a:xfrm>
+          <a:off x="0" y="0"/>
+          <a:ext cx="0" cy="0"/>
+          <a:chOff x="0" y="0"/>
+          <a:chExt cx="0" cy="0"/>
+        </a:xfrm>
+      </p:grpSpPr>
+      <p:sp>
+        <p:nvSpPr>
+          <p:cNvPr id="2" name="Title 1"/>
+          <p:cNvSpPr>
+            <a:spLocks noGrp="1"/>
+          </p:cNvSpPr>
+          <p:nvPr>
+            <p:ph type="title"/>
+          </p:nvPr>
+        </p:nvSpPr>
+        <p:spPr/>
+        <p:txBody>
+          <a:bodyPr/>
+          <a:lstStyle/>
+          <a:p>
+            <a:r>
+              <a:rPr lang="en-US" dirty="0" smtClean="0"/>
+              <a:t>Anatomy</a:t>
             </a:r>
             <a:endParaRPr lang="en-US" dirty="0"/>
           </a:p>
@@ -45389,61 +45648,76 @@
           <a:p>
             <a:r>
               <a:rPr lang="en-US" dirty="0" smtClean="0"/>
-              <a:t>"The proof of the pudding is in the eating"</a:t>
+              <a:t>Applications</a:t>
             </a:r>
           </a:p>
           <a:p>
             <a:pPr lvl="1"/>
             <a:r>
               <a:rPr lang="en-US" dirty="0" smtClean="0"/>
-              <a:t>Build application with instrumentation</a:t>
+              <a:t>Have one or more processes</a:t>
             </a:r>
           </a:p>
           <a:p>
             <a:pPr lvl="1"/>
             <a:r>
               <a:rPr lang="en-US" dirty="0" smtClean="0"/>
-              <a:t>Run application</a:t>
-            </a:r>
-          </a:p>
-          <a:p>
-            <a:pPr lvl="2"/>
+              <a:t>Run on one or more compute nodes</a:t>
+            </a:r>
+          </a:p>
+          <a:p>
             <a:r>
               <a:rPr lang="en-US" dirty="0" smtClean="0"/>
-              <a:t>creates profile</a:t>
+              <a:t>Processes</a:t>
             </a:r>
           </a:p>
           <a:p>
             <a:pPr lvl="1"/>
             <a:r>
               <a:rPr lang="en-US" dirty="0" smtClean="0"/>
-              <a:t>Rebuild application, using profile to guide optimizations</a:t>
-            </a:r>
-          </a:p>
-          <a:p>
+              <a:t>Communicate through message passing (e.g., MPI)</a:t>
+            </a:r>
+          </a:p>
+          <a:p>
+            <a:pPr lvl="1"/>
             <a:r>
               <a:rPr lang="en-US" dirty="0" smtClean="0"/>
-              <a:t>Depends on quality of run: must be representative for general use</a:t>
+              <a:t>Have one or more threads</a:t>
             </a:r>
           </a:p>
           <a:p>
             <a:pPr lvl="1"/>
             <a:r>
               <a:rPr lang="en-US" dirty="0" smtClean="0"/>
-              <a:t>CPU/memory architecture</a:t>
+              <a:t>Run on single compute node, one or more cores</a:t>
+            </a:r>
+          </a:p>
+          <a:p>
+            <a:r>
+              <a:rPr lang="en-US" dirty="0" smtClean="0"/>
+              <a:t>Threads</a:t>
             </a:r>
           </a:p>
           <a:p>
             <a:pPr lvl="1"/>
             <a:r>
               <a:rPr lang="en-US" dirty="0" smtClean="0"/>
-              <a:t>input data/parameters</a:t>
-            </a:r>
-          </a:p>
-          <a:p>
+              <a:t>Communicate through shared memory (e.g., </a:t>
+            </a:r>
+            <a:r>
+              <a:rPr lang="en-US" dirty="0" err="1" smtClean="0"/>
+              <a:t>OpenMP</a:t>
+            </a:r>
             <a:r>
               <a:rPr lang="en-US" dirty="0" smtClean="0"/>
-              <a:t>YMMV: expect &lt; 10 %</a:t>
+              <a:t>)</a:t>
+            </a:r>
+          </a:p>
+          <a:p>
+            <a:pPr lvl="1"/>
+            <a:r>
+              <a:rPr lang="en-US" dirty="0" smtClean="0"/>
+              <a:t>Run on single core</a:t>
             </a:r>
             <a:endParaRPr lang="en-US" dirty="0"/>
           </a:p>
@@ -45466,7 +45740,169 @@
           <a:p>
             <a:fld id="{6597116C-F94B-4B5B-973A-17F07FB5C418}" type="slidenum">
               <a:rPr lang="nl-BE" smtClean="0"/>
-              <a:t>48</a:t>
+              <a:t>5</a:t>
+            </a:fld>
+            <a:endParaRPr lang="nl-BE"/>
+          </a:p>
+        </p:txBody>
+      </p:sp>
+    </p:spTree>
+    <p:extLst>
+      <p:ext uri="{BB962C8B-B14F-4D97-AF65-F5344CB8AC3E}">
+        <p14:creationId xmlns:p14="http://schemas.microsoft.com/office/powerpoint/2010/main" val="2025456779"/>
+      </p:ext>
+    </p:extLst>
+  </p:cSld>
+  <p:clrMapOvr>
+    <a:masterClrMapping/>
+  </p:clrMapOvr>
+  <p:timing>
+    <p:tnLst>
+      <p:par>
+        <p:cTn id="1" dur="indefinite" restart="never" nodeType="tmRoot"/>
+      </p:par>
+    </p:tnLst>
+  </p:timing>
+</p:sld>
+</file>
+
+<file path=ppt/slides/slide50.xml><?xml version="1.0" encoding="utf-8"?>
+<p:sld xmlns:a="http://schemas.openxmlformats.org/drawingml/2006/main" xmlns:r="http://schemas.openxmlformats.org/officeDocument/2006/relationships" xmlns:p="http://schemas.openxmlformats.org/presentationml/2006/main">
+  <p:cSld>
+    <p:spTree>
+      <p:nvGrpSpPr>
+        <p:cNvPr id="1" name=""/>
+        <p:cNvGrpSpPr/>
+        <p:nvPr/>
+      </p:nvGrpSpPr>
+      <p:grpSpPr>
+        <a:xfrm>
+          <a:off x="0" y="0"/>
+          <a:ext cx="0" cy="0"/>
+          <a:chOff x="0" y="0"/>
+          <a:chExt cx="0" cy="0"/>
+        </a:xfrm>
+      </p:grpSpPr>
+      <p:sp>
+        <p:nvSpPr>
+          <p:cNvPr id="2" name="Title 1"/>
+          <p:cNvSpPr>
+            <a:spLocks noGrp="1"/>
+          </p:cNvSpPr>
+          <p:nvPr>
+            <p:ph type="title"/>
+          </p:nvPr>
+        </p:nvSpPr>
+        <p:spPr/>
+        <p:txBody>
+          <a:bodyPr/>
+          <a:lstStyle/>
+          <a:p>
+            <a:r>
+              <a:rPr lang="en-US" dirty="0" smtClean="0"/>
+              <a:t>Philosophy</a:t>
+            </a:r>
+            <a:endParaRPr lang="en-US" dirty="0"/>
+          </a:p>
+        </p:txBody>
+      </p:sp>
+      <p:sp>
+        <p:nvSpPr>
+          <p:cNvPr id="3" name="Content Placeholder 2"/>
+          <p:cNvSpPr>
+            <a:spLocks noGrp="1"/>
+          </p:cNvSpPr>
+          <p:nvPr>
+            <p:ph idx="1"/>
+          </p:nvPr>
+        </p:nvSpPr>
+        <p:spPr/>
+        <p:txBody>
+          <a:bodyPr>
+            <a:normAutofit fontScale="92500" lnSpcReduction="20000"/>
+          </a:bodyPr>
+          <a:lstStyle/>
+          <a:p>
+            <a:r>
+              <a:rPr lang="en-US" dirty="0" smtClean="0"/>
+              <a:t>"The proof of the pudding is in the eating"</a:t>
+            </a:r>
+          </a:p>
+          <a:p>
+            <a:pPr lvl="1"/>
+            <a:r>
+              <a:rPr lang="en-US" dirty="0" smtClean="0"/>
+              <a:t>Build application with instrumentation</a:t>
+            </a:r>
+          </a:p>
+          <a:p>
+            <a:pPr lvl="1"/>
+            <a:r>
+              <a:rPr lang="en-US" dirty="0" smtClean="0"/>
+              <a:t>Run application</a:t>
+            </a:r>
+          </a:p>
+          <a:p>
+            <a:pPr lvl="2"/>
+            <a:r>
+              <a:rPr lang="en-US" dirty="0" smtClean="0"/>
+              <a:t>creates profile</a:t>
+            </a:r>
+          </a:p>
+          <a:p>
+            <a:pPr lvl="1"/>
+            <a:r>
+              <a:rPr lang="en-US" dirty="0" smtClean="0"/>
+              <a:t>Rebuild application, using profile to guide optimizations</a:t>
+            </a:r>
+          </a:p>
+          <a:p>
+            <a:r>
+              <a:rPr lang="en-US" dirty="0" smtClean="0"/>
+              <a:t>Depends on quality of run: must be representative for general use</a:t>
+            </a:r>
+          </a:p>
+          <a:p>
+            <a:pPr lvl="1"/>
+            <a:r>
+              <a:rPr lang="en-US" dirty="0" smtClean="0"/>
+              <a:t>CPU/memory architecture</a:t>
+            </a:r>
+          </a:p>
+          <a:p>
+            <a:pPr lvl="1"/>
+            <a:r>
+              <a:rPr lang="en-US" dirty="0" smtClean="0"/>
+              <a:t>input data/parameters</a:t>
+            </a:r>
+          </a:p>
+          <a:p>
+            <a:r>
+              <a:rPr lang="en-US" dirty="0" smtClean="0"/>
+              <a:t>YMMV: expect &lt; 10 %</a:t>
+            </a:r>
+            <a:endParaRPr lang="en-US" dirty="0"/>
+          </a:p>
+        </p:txBody>
+      </p:sp>
+      <p:sp>
+        <p:nvSpPr>
+          <p:cNvPr id="4" name="Slide Number Placeholder 3"/>
+          <p:cNvSpPr>
+            <a:spLocks noGrp="1"/>
+          </p:cNvSpPr>
+          <p:nvPr>
+            <p:ph type="sldNum" sz="quarter" idx="12"/>
+          </p:nvPr>
+        </p:nvSpPr>
+        <p:spPr/>
+        <p:txBody>
+          <a:bodyPr/>
+          <a:lstStyle/>
+          <a:p>
+            <a:fld id="{6597116C-F94B-4B5B-973A-17F07FB5C418}" type="slidenum">
+              <a:rPr lang="nl-BE" smtClean="0"/>
+              <a:t>50</a:t>
             </a:fld>
             <a:endParaRPr lang="nl-BE"/>
           </a:p>
@@ -45944,7 +46380,7 @@
 </p:sld>
 </file>
 
-<file path=ppt/slides/slide49.xml><?xml version="1.0" encoding="utf-8"?>
+<file path=ppt/slides/slide51.xml><?xml version="1.0" encoding="utf-8"?>
 <p:sld xmlns:a="http://schemas.openxmlformats.org/drawingml/2006/main" xmlns:r="http://schemas.openxmlformats.org/officeDocument/2006/relationships" xmlns:p="http://schemas.openxmlformats.org/presentationml/2006/main">
   <p:cSld>
     <p:spTree>
@@ -46039,7 +46475,7 @@
           <a:p>
             <a:fld id="{6597116C-F94B-4B5B-973A-17F07FB5C418}" type="slidenum">
               <a:rPr lang="nl-BE" smtClean="0"/>
-              <a:t>49</a:t>
+              <a:t>51</a:t>
             </a:fld>
             <a:endParaRPr lang="nl-BE"/>
           </a:p>
@@ -46471,7 +46907,7 @@
 </p:sld>
 </file>
 
-<file path=ppt/slides/slide5.xml><?xml version="1.0" encoding="utf-8"?>
+<file path=ppt/slides/slide52.xml><?xml version="1.0" encoding="utf-8"?>
 <p:sld xmlns:a="http://schemas.openxmlformats.org/drawingml/2006/main" xmlns:r="http://schemas.openxmlformats.org/officeDocument/2006/relationships" xmlns:p="http://schemas.openxmlformats.org/presentationml/2006/main">
   <p:cSld>
     <p:spTree>
@@ -46505,7 +46941,7 @@
           <a:p>
             <a:r>
               <a:rPr lang="en-US" dirty="0" smtClean="0"/>
-              <a:t>Anatomy</a:t>
+              <a:t>Intel compilers</a:t>
             </a:r>
             <a:endParaRPr lang="en-US" dirty="0"/>
           </a:p>
@@ -46523,83 +46959,27 @@
         </p:nvSpPr>
         <p:spPr/>
         <p:txBody>
-          <a:bodyPr>
-            <a:normAutofit fontScale="92500" lnSpcReduction="20000"/>
-          </a:bodyPr>
+          <a:bodyPr/>
           <a:lstStyle/>
           <a:p>
             <a:r>
               <a:rPr lang="en-US" dirty="0" smtClean="0"/>
-              <a:t>Applications</a:t>
-            </a:r>
-          </a:p>
-          <a:p>
-            <a:pPr lvl="1"/>
+              <a:t>Build with instrumentation</a:t>
+            </a:r>
+          </a:p>
+          <a:p>
+            <a:endParaRPr lang="en-US" dirty="0"/>
+          </a:p>
+          <a:p>
             <a:r>
               <a:rPr lang="en-US" dirty="0" smtClean="0"/>
-              <a:t>Have one or more processes</a:t>
-            </a:r>
-          </a:p>
-          <a:p>
-            <a:pPr lvl="1"/>
+              <a:t>Run as usual</a:t>
+            </a:r>
+          </a:p>
+          <a:p>
             <a:r>
               <a:rPr lang="en-US" dirty="0" smtClean="0"/>
-              <a:t>Run on one or more compute nodes</a:t>
-            </a:r>
-          </a:p>
-          <a:p>
-            <a:r>
-              <a:rPr lang="en-US" dirty="0" smtClean="0"/>
-              <a:t>Processes</a:t>
-            </a:r>
-          </a:p>
-          <a:p>
-            <a:pPr lvl="1"/>
-            <a:r>
-              <a:rPr lang="en-US" dirty="0" smtClean="0"/>
-              <a:t>Communicate through message passing (e.g., MPI)</a:t>
-            </a:r>
-          </a:p>
-          <a:p>
-            <a:pPr lvl="1"/>
-            <a:r>
-              <a:rPr lang="en-US" dirty="0" smtClean="0"/>
-              <a:t>Have one or more threads</a:t>
-            </a:r>
-          </a:p>
-          <a:p>
-            <a:pPr lvl="1"/>
-            <a:r>
-              <a:rPr lang="en-US" dirty="0" smtClean="0"/>
-              <a:t>Run on single compute node, one or more cores</a:t>
-            </a:r>
-          </a:p>
-          <a:p>
-            <a:r>
-              <a:rPr lang="en-US" dirty="0" smtClean="0"/>
-              <a:t>Threads</a:t>
-            </a:r>
-          </a:p>
-          <a:p>
-            <a:pPr lvl="1"/>
-            <a:r>
-              <a:rPr lang="en-US" dirty="0" smtClean="0"/>
-              <a:t>Communicate through shared memory (e.g., </a:t>
-            </a:r>
-            <a:r>
-              <a:rPr lang="en-US" dirty="0" err="1" smtClean="0"/>
-              <a:t>OpenMP</a:t>
-            </a:r>
-            <a:r>
-              <a:rPr lang="en-US" dirty="0" smtClean="0"/>
-              <a:t>)</a:t>
-            </a:r>
-          </a:p>
-          <a:p>
-            <a:pPr lvl="1"/>
-            <a:r>
-              <a:rPr lang="en-US" dirty="0" smtClean="0"/>
-              <a:t>Run on single core</a:t>
+              <a:t>Build using profile</a:t>
             </a:r>
             <a:endParaRPr lang="en-US" dirty="0"/>
           </a:p>
@@ -46622,128 +47002,7 @@
           <a:p>
             <a:fld id="{6597116C-F94B-4B5B-973A-17F07FB5C418}" type="slidenum">
               <a:rPr lang="nl-BE" smtClean="0"/>
-              <a:t>5</a:t>
-            </a:fld>
-            <a:endParaRPr lang="nl-BE"/>
-          </a:p>
-        </p:txBody>
-      </p:sp>
-    </p:spTree>
-    <p:extLst>
-      <p:ext uri="{BB962C8B-B14F-4D97-AF65-F5344CB8AC3E}">
-        <p14:creationId xmlns:p14="http://schemas.microsoft.com/office/powerpoint/2010/main" val="2025456779"/>
-      </p:ext>
-    </p:extLst>
-  </p:cSld>
-  <p:clrMapOvr>
-    <a:masterClrMapping/>
-  </p:clrMapOvr>
-  <p:timing>
-    <p:tnLst>
-      <p:par>
-        <p:cTn id="1" dur="indefinite" restart="never" nodeType="tmRoot"/>
-      </p:par>
-    </p:tnLst>
-  </p:timing>
-</p:sld>
-</file>
-
-<file path=ppt/slides/slide50.xml><?xml version="1.0" encoding="utf-8"?>
-<p:sld xmlns:a="http://schemas.openxmlformats.org/drawingml/2006/main" xmlns:r="http://schemas.openxmlformats.org/officeDocument/2006/relationships" xmlns:p="http://schemas.openxmlformats.org/presentationml/2006/main">
-  <p:cSld>
-    <p:spTree>
-      <p:nvGrpSpPr>
-        <p:cNvPr id="1" name=""/>
-        <p:cNvGrpSpPr/>
-        <p:nvPr/>
-      </p:nvGrpSpPr>
-      <p:grpSpPr>
-        <a:xfrm>
-          <a:off x="0" y="0"/>
-          <a:ext cx="0" cy="0"/>
-          <a:chOff x="0" y="0"/>
-          <a:chExt cx="0" cy="0"/>
-        </a:xfrm>
-      </p:grpSpPr>
-      <p:sp>
-        <p:nvSpPr>
-          <p:cNvPr id="2" name="Title 1"/>
-          <p:cNvSpPr>
-            <a:spLocks noGrp="1"/>
-          </p:cNvSpPr>
-          <p:nvPr>
-            <p:ph type="title"/>
-          </p:nvPr>
-        </p:nvSpPr>
-        <p:spPr/>
-        <p:txBody>
-          <a:bodyPr/>
-          <a:lstStyle/>
-          <a:p>
-            <a:r>
-              <a:rPr lang="en-US" dirty="0" smtClean="0"/>
-              <a:t>Intel compilers</a:t>
-            </a:r>
-            <a:endParaRPr lang="en-US" dirty="0"/>
-          </a:p>
-        </p:txBody>
-      </p:sp>
-      <p:sp>
-        <p:nvSpPr>
-          <p:cNvPr id="3" name="Content Placeholder 2"/>
-          <p:cNvSpPr>
-            <a:spLocks noGrp="1"/>
-          </p:cNvSpPr>
-          <p:nvPr>
-            <p:ph idx="1"/>
-          </p:nvPr>
-        </p:nvSpPr>
-        <p:spPr/>
-        <p:txBody>
-          <a:bodyPr/>
-          <a:lstStyle/>
-          <a:p>
-            <a:r>
-              <a:rPr lang="en-US" dirty="0" smtClean="0"/>
-              <a:t>Build with instrumentation</a:t>
-            </a:r>
-          </a:p>
-          <a:p>
-            <a:endParaRPr lang="en-US" dirty="0"/>
-          </a:p>
-          <a:p>
-            <a:r>
-              <a:rPr lang="en-US" dirty="0" smtClean="0"/>
-              <a:t>Run as usual</a:t>
-            </a:r>
-          </a:p>
-          <a:p>
-            <a:r>
-              <a:rPr lang="en-US" dirty="0" smtClean="0"/>
-              <a:t>Build using profile</a:t>
-            </a:r>
-            <a:endParaRPr lang="en-US" dirty="0"/>
-          </a:p>
-        </p:txBody>
-      </p:sp>
-      <p:sp>
-        <p:nvSpPr>
-          <p:cNvPr id="4" name="Slide Number Placeholder 3"/>
-          <p:cNvSpPr>
-            <a:spLocks noGrp="1"/>
-          </p:cNvSpPr>
-          <p:nvPr>
-            <p:ph type="sldNum" sz="quarter" idx="12"/>
-          </p:nvPr>
-        </p:nvSpPr>
-        <p:spPr/>
-        <p:txBody>
-          <a:bodyPr/>
-          <a:lstStyle/>
-          <a:p>
-            <a:fld id="{6597116C-F94B-4B5B-973A-17F07FB5C418}" type="slidenum">
-              <a:rPr lang="nl-BE" smtClean="0"/>
-              <a:t>50</a:t>
+              <a:t>52</a:t>
             </a:fld>
             <a:endParaRPr lang="nl-BE"/>
           </a:p>
@@ -47161,7 +47420,7 @@
 </p:sld>
 </file>
 
-<file path=ppt/slides/slide51.xml><?xml version="1.0" encoding="utf-8"?>
+<file path=ppt/slides/slide53.xml><?xml version="1.0" encoding="utf-8"?>
 <p:sld xmlns:a="http://schemas.openxmlformats.org/drawingml/2006/main" xmlns:r="http://schemas.openxmlformats.org/officeDocument/2006/relationships" xmlns:p="http://schemas.openxmlformats.org/presentationml/2006/main">
   <p:cSld>
     <p:spTree>
@@ -47241,7 +47500,7 @@
           <a:p>
             <a:fld id="{6597116C-F94B-4B5B-973A-17F07FB5C418}" type="slidenum">
               <a:rPr lang="nl-BE" smtClean="0"/>
-              <a:t>51</a:t>
+              <a:t>53</a:t>
             </a:fld>
             <a:endParaRPr lang="nl-BE"/>
           </a:p>
@@ -47515,322 +47774,6 @@
 </p:sld>
 </file>
 
-<file path=ppt/slides/slide52.xml><?xml version="1.0" encoding="utf-8"?>
-<p:sld xmlns:a="http://schemas.openxmlformats.org/drawingml/2006/main" xmlns:r="http://schemas.openxmlformats.org/officeDocument/2006/relationships" xmlns:p="http://schemas.openxmlformats.org/presentationml/2006/main">
-  <p:cSld>
-    <p:spTree>
-      <p:nvGrpSpPr>
-        <p:cNvPr id="1" name=""/>
-        <p:cNvGrpSpPr/>
-        <p:nvPr/>
-      </p:nvGrpSpPr>
-      <p:grpSpPr>
-        <a:xfrm>
-          <a:off x="0" y="0"/>
-          <a:ext cx="0" cy="0"/>
-          <a:chOff x="0" y="0"/>
-          <a:chExt cx="0" cy="0"/>
-        </a:xfrm>
-      </p:grpSpPr>
-      <p:sp>
-        <p:nvSpPr>
-          <p:cNvPr id="2" name="Title 1"/>
-          <p:cNvSpPr>
-            <a:spLocks noGrp="1"/>
-          </p:cNvSpPr>
-          <p:nvPr>
-            <p:ph type="title"/>
-          </p:nvPr>
-        </p:nvSpPr>
-        <p:spPr/>
-        <p:txBody>
-          <a:bodyPr/>
-          <a:lstStyle/>
-          <a:p>
-            <a:r>
-              <a:rPr lang="en-US" dirty="0" smtClean="0"/>
-              <a:t>Conclusion</a:t>
-            </a:r>
-            <a:endParaRPr lang="nl-BE" dirty="0"/>
-          </a:p>
-        </p:txBody>
-      </p:sp>
-      <p:sp>
-        <p:nvSpPr>
-          <p:cNvPr id="3" name="Text Placeholder 2"/>
-          <p:cNvSpPr>
-            <a:spLocks noGrp="1"/>
-          </p:cNvSpPr>
-          <p:nvPr>
-            <p:ph type="body" idx="1"/>
-          </p:nvPr>
-        </p:nvSpPr>
-        <p:spPr/>
-        <p:txBody>
-          <a:bodyPr/>
-          <a:lstStyle/>
-          <a:p>
-            <a:endParaRPr lang="nl-BE"/>
-          </a:p>
-        </p:txBody>
-      </p:sp>
-      <p:sp>
-        <p:nvSpPr>
-          <p:cNvPr id="4" name="Slide Number Placeholder 3"/>
-          <p:cNvSpPr>
-            <a:spLocks noGrp="1"/>
-          </p:cNvSpPr>
-          <p:nvPr>
-            <p:ph type="sldNum" sz="quarter" idx="12"/>
-          </p:nvPr>
-        </p:nvSpPr>
-        <p:spPr/>
-        <p:txBody>
-          <a:bodyPr/>
-          <a:lstStyle/>
-          <a:p>
-            <a:fld id="{6597116C-F94B-4B5B-973A-17F07FB5C418}" type="slidenum">
-              <a:rPr lang="nl-BE" smtClean="0"/>
-              <a:t>52</a:t>
-            </a:fld>
-            <a:endParaRPr lang="nl-BE"/>
-          </a:p>
-        </p:txBody>
-      </p:sp>
-    </p:spTree>
-    <p:extLst>
-      <p:ext uri="{BB962C8B-B14F-4D97-AF65-F5344CB8AC3E}">
-        <p14:creationId xmlns:p14="http://schemas.microsoft.com/office/powerpoint/2010/main" val="1387657132"/>
-      </p:ext>
-    </p:extLst>
-  </p:cSld>
-  <p:clrMapOvr>
-    <a:masterClrMapping/>
-  </p:clrMapOvr>
-  <p:timing>
-    <p:tnLst>
-      <p:par>
-        <p:cTn id="1" dur="indefinite" restart="never" nodeType="tmRoot"/>
-      </p:par>
-    </p:tnLst>
-  </p:timing>
-</p:sld>
-</file>
-
-<file path=ppt/slides/slide53.xml><?xml version="1.0" encoding="utf-8"?>
-<p:sld xmlns:a="http://schemas.openxmlformats.org/drawingml/2006/main" xmlns:r="http://schemas.openxmlformats.org/officeDocument/2006/relationships" xmlns:p="http://schemas.openxmlformats.org/presentationml/2006/main">
-  <p:cSld>
-    <p:spTree>
-      <p:nvGrpSpPr>
-        <p:cNvPr id="1" name=""/>
-        <p:cNvGrpSpPr/>
-        <p:nvPr/>
-      </p:nvGrpSpPr>
-      <p:grpSpPr>
-        <a:xfrm>
-          <a:off x="0" y="0"/>
-          <a:ext cx="0" cy="0"/>
-          <a:chOff x="0" y="0"/>
-          <a:chExt cx="0" cy="0"/>
-        </a:xfrm>
-      </p:grpSpPr>
-      <p:sp>
-        <p:nvSpPr>
-          <p:cNvPr id="5" name="Title 4"/>
-          <p:cNvSpPr>
-            <a:spLocks noGrp="1"/>
-          </p:cNvSpPr>
-          <p:nvPr>
-            <p:ph type="title"/>
-          </p:nvPr>
-        </p:nvSpPr>
-        <p:spPr/>
-        <p:txBody>
-          <a:bodyPr/>
-          <a:lstStyle/>
-          <a:p>
-            <a:r>
-              <a:rPr lang="en-US" dirty="0" smtClean="0"/>
-              <a:t>Useful references</a:t>
-            </a:r>
-            <a:endParaRPr lang="nl-BE" dirty="0"/>
-          </a:p>
-        </p:txBody>
-      </p:sp>
-      <p:sp>
-        <p:nvSpPr>
-          <p:cNvPr id="6" name="Content Placeholder 5"/>
-          <p:cNvSpPr>
-            <a:spLocks noGrp="1"/>
-          </p:cNvSpPr>
-          <p:nvPr>
-            <p:ph idx="1"/>
-          </p:nvPr>
-        </p:nvSpPr>
-        <p:spPr/>
-        <p:txBody>
-          <a:bodyPr>
-            <a:normAutofit fontScale="85000" lnSpcReduction="20000"/>
-          </a:bodyPr>
-          <a:lstStyle/>
-          <a:p>
-            <a:r>
-              <a:rPr lang="en-US" dirty="0" smtClean="0">
-                <a:hlinkClick r:id="rId2"/>
-              </a:rPr>
-              <a:t>Gallery of processor cache effects</a:t>
-            </a:r>
-            <a:endParaRPr lang="en-US" dirty="0" smtClean="0"/>
-          </a:p>
-          <a:p>
-            <a:r>
-              <a:rPr lang="en-US" dirty="0">
-                <a:hlinkClick r:id="rId3"/>
-              </a:rPr>
-              <a:t>Avoiding and Identifying False Sharing Among </a:t>
-            </a:r>
-            <a:r>
-              <a:rPr lang="en-US" dirty="0" smtClean="0">
-                <a:hlinkClick r:id="rId3"/>
-              </a:rPr>
-              <a:t>Threads</a:t>
-            </a:r>
-            <a:endParaRPr lang="en-US" dirty="0" smtClean="0"/>
-          </a:p>
-          <a:p>
-            <a:r>
-              <a:rPr lang="en-US" dirty="0" smtClean="0"/>
-              <a:t>Vectorization</a:t>
-            </a:r>
-          </a:p>
-          <a:p>
-            <a:pPr lvl="1"/>
-            <a:r>
-              <a:rPr lang="en-US" dirty="0" smtClean="0">
-                <a:hlinkClick r:id="rId4"/>
-              </a:rPr>
-              <a:t>A guide to vectorization with Intel C++ compilers</a:t>
-            </a:r>
-            <a:endParaRPr lang="en-US" dirty="0" smtClean="0"/>
-          </a:p>
-          <a:p>
-            <a:pPr lvl="1"/>
-            <a:r>
-              <a:rPr lang="en-US" dirty="0" smtClean="0">
-                <a:hlinkClick r:id="rId5"/>
-              </a:rPr>
-              <a:t>Auto-vectorization with </a:t>
-            </a:r>
-            <a:r>
-              <a:rPr lang="en-US" dirty="0" err="1" smtClean="0">
-                <a:hlinkClick r:id="rId5"/>
-              </a:rPr>
-              <a:t>gcc</a:t>
-            </a:r>
-            <a:r>
-              <a:rPr lang="en-US" dirty="0" smtClean="0">
-                <a:hlinkClick r:id="rId5"/>
-              </a:rPr>
-              <a:t> 4.7</a:t>
-            </a:r>
-            <a:endParaRPr lang="en-US" dirty="0" smtClean="0"/>
-          </a:p>
-          <a:p>
-            <a:r>
-              <a:rPr lang="en-US" dirty="0"/>
-              <a:t>Introduction to High Performance Computing for Scientists and </a:t>
-            </a:r>
-            <a:r>
-              <a:rPr lang="en-US" dirty="0" smtClean="0"/>
-              <a:t>Engineers</a:t>
-            </a:r>
-            <a:r>
-              <a:rPr lang="nl-BE" dirty="0" smtClean="0"/>
-              <a:t/>
-            </a:r>
-            <a:br>
-              <a:rPr lang="nl-BE" dirty="0" smtClean="0"/>
-            </a:br>
-            <a:r>
-              <a:rPr lang="nl-BE" dirty="0" smtClean="0"/>
-              <a:t>Georg Hager &amp; Gerhard Wellein</a:t>
-            </a:r>
-            <a:br>
-              <a:rPr lang="nl-BE" dirty="0" smtClean="0"/>
-            </a:br>
-            <a:r>
-              <a:rPr lang="nl-BE" dirty="0" smtClean="0"/>
-              <a:t>Chapman &amp; Hall, 2010</a:t>
-            </a:r>
-            <a:endParaRPr lang="en-US" b="1" dirty="0"/>
-          </a:p>
-          <a:p>
-            <a:r>
-              <a:rPr lang="en-US" dirty="0" smtClean="0">
-                <a:hlinkClick r:id="rId6"/>
-              </a:rPr>
-              <a:t>Why has CPU frequency ceased to grow?</a:t>
-            </a:r>
-            <a:endParaRPr lang="en-US" dirty="0" smtClean="0"/>
-          </a:p>
-          <a:p>
-            <a:r>
-              <a:rPr lang="en-US" dirty="0" smtClean="0">
-                <a:hlinkClick r:id="rId7"/>
-              </a:rPr>
-              <a:t>Compiler Explorer</a:t>
-            </a:r>
-            <a:r>
-              <a:rPr lang="en-US" dirty="0" smtClean="0"/>
-              <a:t>: interactively shows assembler</a:t>
-            </a:r>
-            <a:endParaRPr lang="nl-BE" dirty="0" smtClean="0"/>
-          </a:p>
-        </p:txBody>
-      </p:sp>
-      <p:sp>
-        <p:nvSpPr>
-          <p:cNvPr id="4" name="Slide Number Placeholder 3"/>
-          <p:cNvSpPr>
-            <a:spLocks noGrp="1"/>
-          </p:cNvSpPr>
-          <p:nvPr>
-            <p:ph type="sldNum" sz="quarter" idx="12"/>
-          </p:nvPr>
-        </p:nvSpPr>
-        <p:spPr/>
-        <p:txBody>
-          <a:bodyPr/>
-          <a:lstStyle/>
-          <a:p>
-            <a:fld id="{6597116C-F94B-4B5B-973A-17F07FB5C418}" type="slidenum">
-              <a:rPr lang="nl-BE" smtClean="0"/>
-              <a:t>53</a:t>
-            </a:fld>
-            <a:endParaRPr lang="nl-BE"/>
-          </a:p>
-        </p:txBody>
-      </p:sp>
-    </p:spTree>
-    <p:extLst>
-      <p:ext uri="{BB962C8B-B14F-4D97-AF65-F5344CB8AC3E}">
-        <p14:creationId xmlns:p14="http://schemas.microsoft.com/office/powerpoint/2010/main" val="2653023660"/>
-      </p:ext>
-    </p:extLst>
-  </p:cSld>
-  <p:clrMapOvr>
-    <a:masterClrMapping/>
-  </p:clrMapOvr>
-  <p:timing>
-    <p:tnLst>
-      <p:par>
-        <p:cTn id="1" dur="indefinite" restart="never" nodeType="tmRoot"/>
-      </p:par>
-    </p:tnLst>
-  </p:timing>
-</p:sld>
-</file>
-
 <file path=ppt/slides/slide54.xml><?xml version="1.0" encoding="utf-8"?>
 <p:sld xmlns:a="http://schemas.openxmlformats.org/drawingml/2006/main" xmlns:r="http://schemas.openxmlformats.org/officeDocument/2006/relationships" xmlns:p="http://schemas.openxmlformats.org/presentationml/2006/main">
   <p:cSld>
@@ -47865,7 +47808,7 @@
           <a:p>
             <a:r>
               <a:rPr lang="en-US" dirty="0" smtClean="0"/>
-              <a:t>Appendix</a:t>
+              <a:t>Conclusion</a:t>
             </a:r>
             <a:endParaRPr lang="nl-BE" dirty="0"/>
           </a:p>
@@ -47916,7 +47859,7 @@
     </p:spTree>
     <p:extLst>
       <p:ext uri="{BB962C8B-B14F-4D97-AF65-F5344CB8AC3E}">
-        <p14:creationId xmlns:p14="http://schemas.microsoft.com/office/powerpoint/2010/main" val="3118825235"/>
+        <p14:creationId xmlns:p14="http://schemas.microsoft.com/office/powerpoint/2010/main" val="1387657132"/>
       </p:ext>
     </p:extLst>
   </p:cSld>
@@ -47952,6 +47895,322 @@
       </p:grpSpPr>
       <p:sp>
         <p:nvSpPr>
+          <p:cNvPr id="5" name="Title 4"/>
+          <p:cNvSpPr>
+            <a:spLocks noGrp="1"/>
+          </p:cNvSpPr>
+          <p:nvPr>
+            <p:ph type="title"/>
+          </p:nvPr>
+        </p:nvSpPr>
+        <p:spPr/>
+        <p:txBody>
+          <a:bodyPr/>
+          <a:lstStyle/>
+          <a:p>
+            <a:r>
+              <a:rPr lang="en-US" dirty="0" smtClean="0"/>
+              <a:t>Useful references</a:t>
+            </a:r>
+            <a:endParaRPr lang="nl-BE" dirty="0"/>
+          </a:p>
+        </p:txBody>
+      </p:sp>
+      <p:sp>
+        <p:nvSpPr>
+          <p:cNvPr id="6" name="Content Placeholder 5"/>
+          <p:cNvSpPr>
+            <a:spLocks noGrp="1"/>
+          </p:cNvSpPr>
+          <p:nvPr>
+            <p:ph idx="1"/>
+          </p:nvPr>
+        </p:nvSpPr>
+        <p:spPr/>
+        <p:txBody>
+          <a:bodyPr>
+            <a:normAutofit fontScale="85000" lnSpcReduction="20000"/>
+          </a:bodyPr>
+          <a:lstStyle/>
+          <a:p>
+            <a:r>
+              <a:rPr lang="en-US" dirty="0" smtClean="0">
+                <a:hlinkClick r:id="rId2"/>
+              </a:rPr>
+              <a:t>Gallery of processor cache effects</a:t>
+            </a:r>
+            <a:endParaRPr lang="en-US" dirty="0" smtClean="0"/>
+          </a:p>
+          <a:p>
+            <a:r>
+              <a:rPr lang="en-US" dirty="0">
+                <a:hlinkClick r:id="rId3"/>
+              </a:rPr>
+              <a:t>Avoiding and Identifying False Sharing Among </a:t>
+            </a:r>
+            <a:r>
+              <a:rPr lang="en-US" dirty="0" smtClean="0">
+                <a:hlinkClick r:id="rId3"/>
+              </a:rPr>
+              <a:t>Threads</a:t>
+            </a:r>
+            <a:endParaRPr lang="en-US" dirty="0" smtClean="0"/>
+          </a:p>
+          <a:p>
+            <a:r>
+              <a:rPr lang="en-US" dirty="0" smtClean="0"/>
+              <a:t>Vectorization</a:t>
+            </a:r>
+          </a:p>
+          <a:p>
+            <a:pPr lvl="1"/>
+            <a:r>
+              <a:rPr lang="en-US" dirty="0" smtClean="0">
+                <a:hlinkClick r:id="rId4"/>
+              </a:rPr>
+              <a:t>A guide to vectorization with Intel C++ compilers</a:t>
+            </a:r>
+            <a:endParaRPr lang="en-US" dirty="0" smtClean="0"/>
+          </a:p>
+          <a:p>
+            <a:pPr lvl="1"/>
+            <a:r>
+              <a:rPr lang="en-US" dirty="0" smtClean="0">
+                <a:hlinkClick r:id="rId5"/>
+              </a:rPr>
+              <a:t>Auto-vectorization with </a:t>
+            </a:r>
+            <a:r>
+              <a:rPr lang="en-US" dirty="0" err="1" smtClean="0">
+                <a:hlinkClick r:id="rId5"/>
+              </a:rPr>
+              <a:t>gcc</a:t>
+            </a:r>
+            <a:r>
+              <a:rPr lang="en-US" dirty="0" smtClean="0">
+                <a:hlinkClick r:id="rId5"/>
+              </a:rPr>
+              <a:t> 4.7</a:t>
+            </a:r>
+            <a:endParaRPr lang="en-US" dirty="0" smtClean="0"/>
+          </a:p>
+          <a:p>
+            <a:r>
+              <a:rPr lang="en-US" dirty="0"/>
+              <a:t>Introduction to High Performance Computing for Scientists and </a:t>
+            </a:r>
+            <a:r>
+              <a:rPr lang="en-US" dirty="0" smtClean="0"/>
+              <a:t>Engineers</a:t>
+            </a:r>
+            <a:r>
+              <a:rPr lang="nl-BE" dirty="0" smtClean="0"/>
+              <a:t/>
+            </a:r>
+            <a:br>
+              <a:rPr lang="nl-BE" dirty="0" smtClean="0"/>
+            </a:br>
+            <a:r>
+              <a:rPr lang="nl-BE" dirty="0" smtClean="0"/>
+              <a:t>Georg Hager &amp; Gerhard Wellein</a:t>
+            </a:r>
+            <a:br>
+              <a:rPr lang="nl-BE" dirty="0" smtClean="0"/>
+            </a:br>
+            <a:r>
+              <a:rPr lang="nl-BE" dirty="0" smtClean="0"/>
+              <a:t>Chapman &amp; Hall, 2010</a:t>
+            </a:r>
+            <a:endParaRPr lang="en-US" b="1" dirty="0"/>
+          </a:p>
+          <a:p>
+            <a:r>
+              <a:rPr lang="en-US" dirty="0" smtClean="0">
+                <a:hlinkClick r:id="rId6"/>
+              </a:rPr>
+              <a:t>Why has CPU frequency ceased to grow?</a:t>
+            </a:r>
+            <a:endParaRPr lang="en-US" dirty="0" smtClean="0"/>
+          </a:p>
+          <a:p>
+            <a:r>
+              <a:rPr lang="en-US" dirty="0" smtClean="0">
+                <a:hlinkClick r:id="rId7"/>
+              </a:rPr>
+              <a:t>Compiler Explorer</a:t>
+            </a:r>
+            <a:r>
+              <a:rPr lang="en-US" dirty="0" smtClean="0"/>
+              <a:t>: interactively shows assembler</a:t>
+            </a:r>
+            <a:endParaRPr lang="nl-BE" dirty="0" smtClean="0"/>
+          </a:p>
+        </p:txBody>
+      </p:sp>
+      <p:sp>
+        <p:nvSpPr>
+          <p:cNvPr id="4" name="Slide Number Placeholder 3"/>
+          <p:cNvSpPr>
+            <a:spLocks noGrp="1"/>
+          </p:cNvSpPr>
+          <p:nvPr>
+            <p:ph type="sldNum" sz="quarter" idx="12"/>
+          </p:nvPr>
+        </p:nvSpPr>
+        <p:spPr/>
+        <p:txBody>
+          <a:bodyPr/>
+          <a:lstStyle/>
+          <a:p>
+            <a:fld id="{6597116C-F94B-4B5B-973A-17F07FB5C418}" type="slidenum">
+              <a:rPr lang="nl-BE" smtClean="0"/>
+              <a:t>55</a:t>
+            </a:fld>
+            <a:endParaRPr lang="nl-BE"/>
+          </a:p>
+        </p:txBody>
+      </p:sp>
+    </p:spTree>
+    <p:extLst>
+      <p:ext uri="{BB962C8B-B14F-4D97-AF65-F5344CB8AC3E}">
+        <p14:creationId xmlns:p14="http://schemas.microsoft.com/office/powerpoint/2010/main" val="2653023660"/>
+      </p:ext>
+    </p:extLst>
+  </p:cSld>
+  <p:clrMapOvr>
+    <a:masterClrMapping/>
+  </p:clrMapOvr>
+  <p:timing>
+    <p:tnLst>
+      <p:par>
+        <p:cTn id="1" dur="indefinite" restart="never" nodeType="tmRoot"/>
+      </p:par>
+    </p:tnLst>
+  </p:timing>
+</p:sld>
+</file>
+
+<file path=ppt/slides/slide56.xml><?xml version="1.0" encoding="utf-8"?>
+<p:sld xmlns:a="http://schemas.openxmlformats.org/drawingml/2006/main" xmlns:r="http://schemas.openxmlformats.org/officeDocument/2006/relationships" xmlns:p="http://schemas.openxmlformats.org/presentationml/2006/main">
+  <p:cSld>
+    <p:spTree>
+      <p:nvGrpSpPr>
+        <p:cNvPr id="1" name=""/>
+        <p:cNvGrpSpPr/>
+        <p:nvPr/>
+      </p:nvGrpSpPr>
+      <p:grpSpPr>
+        <a:xfrm>
+          <a:off x="0" y="0"/>
+          <a:ext cx="0" cy="0"/>
+          <a:chOff x="0" y="0"/>
+          <a:chExt cx="0" cy="0"/>
+        </a:xfrm>
+      </p:grpSpPr>
+      <p:sp>
+        <p:nvSpPr>
+          <p:cNvPr id="2" name="Title 1"/>
+          <p:cNvSpPr>
+            <a:spLocks noGrp="1"/>
+          </p:cNvSpPr>
+          <p:nvPr>
+            <p:ph type="title"/>
+          </p:nvPr>
+        </p:nvSpPr>
+        <p:spPr/>
+        <p:txBody>
+          <a:bodyPr/>
+          <a:lstStyle/>
+          <a:p>
+            <a:r>
+              <a:rPr lang="en-US" dirty="0" smtClean="0"/>
+              <a:t>Appendix</a:t>
+            </a:r>
+            <a:endParaRPr lang="nl-BE" dirty="0"/>
+          </a:p>
+        </p:txBody>
+      </p:sp>
+      <p:sp>
+        <p:nvSpPr>
+          <p:cNvPr id="3" name="Text Placeholder 2"/>
+          <p:cNvSpPr>
+            <a:spLocks noGrp="1"/>
+          </p:cNvSpPr>
+          <p:nvPr>
+            <p:ph type="body" idx="1"/>
+          </p:nvPr>
+        </p:nvSpPr>
+        <p:spPr/>
+        <p:txBody>
+          <a:bodyPr/>
+          <a:lstStyle/>
+          <a:p>
+            <a:endParaRPr lang="nl-BE"/>
+          </a:p>
+        </p:txBody>
+      </p:sp>
+      <p:sp>
+        <p:nvSpPr>
+          <p:cNvPr id="4" name="Slide Number Placeholder 3"/>
+          <p:cNvSpPr>
+            <a:spLocks noGrp="1"/>
+          </p:cNvSpPr>
+          <p:nvPr>
+            <p:ph type="sldNum" sz="quarter" idx="12"/>
+          </p:nvPr>
+        </p:nvSpPr>
+        <p:spPr/>
+        <p:txBody>
+          <a:bodyPr/>
+          <a:lstStyle/>
+          <a:p>
+            <a:fld id="{6597116C-F94B-4B5B-973A-17F07FB5C418}" type="slidenum">
+              <a:rPr lang="nl-BE" smtClean="0"/>
+              <a:t>56</a:t>
+            </a:fld>
+            <a:endParaRPr lang="nl-BE"/>
+          </a:p>
+        </p:txBody>
+      </p:sp>
+    </p:spTree>
+    <p:extLst>
+      <p:ext uri="{BB962C8B-B14F-4D97-AF65-F5344CB8AC3E}">
+        <p14:creationId xmlns:p14="http://schemas.microsoft.com/office/powerpoint/2010/main" val="3118825235"/>
+      </p:ext>
+    </p:extLst>
+  </p:cSld>
+  <p:clrMapOvr>
+    <a:masterClrMapping/>
+  </p:clrMapOvr>
+  <p:timing>
+    <p:tnLst>
+      <p:par>
+        <p:cTn id="1" dur="indefinite" restart="never" nodeType="tmRoot"/>
+      </p:par>
+    </p:tnLst>
+  </p:timing>
+</p:sld>
+</file>
+
+<file path=ppt/slides/slide57.xml><?xml version="1.0" encoding="utf-8"?>
+<p:sld xmlns:a="http://schemas.openxmlformats.org/drawingml/2006/main" xmlns:r="http://schemas.openxmlformats.org/officeDocument/2006/relationships" xmlns:p="http://schemas.openxmlformats.org/presentationml/2006/main">
+  <p:cSld>
+    <p:spTree>
+      <p:nvGrpSpPr>
+        <p:cNvPr id="1" name=""/>
+        <p:cNvGrpSpPr/>
+        <p:nvPr/>
+      </p:nvGrpSpPr>
+      <p:grpSpPr>
+        <a:xfrm>
+          <a:off x="0" y="0"/>
+          <a:ext cx="0" cy="0"/>
+          <a:chOff x="0" y="0"/>
+          <a:chExt cx="0" cy="0"/>
+        </a:xfrm>
+      </p:grpSpPr>
+      <p:sp>
+        <p:nvSpPr>
           <p:cNvPr id="2" name="Title 1"/>
           <p:cNvSpPr>
             <a:spLocks noGrp="1"/>
@@ -48119,7 +48378,7 @@
           <a:p>
             <a:fld id="{6597116C-F94B-4B5B-973A-17F07FB5C418}" type="slidenum">
               <a:rPr lang="nl-BE" smtClean="0"/>
-              <a:t>55</a:t>
+              <a:t>57</a:t>
             </a:fld>
             <a:endParaRPr lang="nl-BE"/>
           </a:p>
@@ -48689,7 +48948,7 @@
 </p:sld>
 </file>
 
-<file path=ppt/slides/slide56.xml><?xml version="1.0" encoding="utf-8"?>
+<file path=ppt/slides/slide58.xml><?xml version="1.0" encoding="utf-8"?>
 <p:sld xmlns:a="http://schemas.openxmlformats.org/drawingml/2006/main" xmlns:r="http://schemas.openxmlformats.org/officeDocument/2006/relationships" xmlns:p="http://schemas.openxmlformats.org/presentationml/2006/main">
   <p:cSld>
     <p:spTree>
@@ -50473,7 +50732,7 @@
           <a:p>
             <a:fld id="{6597116C-F94B-4B5B-973A-17F07FB5C418}" type="slidenum">
               <a:rPr lang="nl-BE" smtClean="0"/>
-              <a:t>56</a:t>
+              <a:t>58</a:t>
             </a:fld>
             <a:endParaRPr lang="nl-BE"/>
           </a:p>
@@ -50618,7 +50877,7 @@
 </p:sld>
 </file>
 
-<file path=ppt/slides/slide57.xml><?xml version="1.0" encoding="utf-8"?>
+<file path=ppt/slides/slide59.xml><?xml version="1.0" encoding="utf-8"?>
 <p:sld xmlns:a="http://schemas.openxmlformats.org/drawingml/2006/main" xmlns:r="http://schemas.openxmlformats.org/officeDocument/2006/relationships" xmlns:p="http://schemas.openxmlformats.org/presentationml/2006/main">
   <p:cSld>
     <p:spTree>
@@ -50714,11 +50973,7 @@
             </a:r>
             <a:r>
               <a:rPr lang="en-US" dirty="0" smtClean="0"/>
-              <a:t> (dual socket, 14 core): 125 </a:t>
-            </a:r>
-            <a:r>
-              <a:rPr lang="en-US" dirty="0" smtClean="0"/>
-              <a:t>GB/s</a:t>
+              <a:t> (dual socket, 14 core): 125 GB/s</a:t>
             </a:r>
           </a:p>
           <a:p>
@@ -50731,7 +50986,6 @@
               <a:rPr lang="en-US" dirty="0" smtClean="0"/>
               <a:t> (dual socket, 18 core): 256 GB/s</a:t>
             </a:r>
-            <a:endParaRPr lang="en-US" dirty="0" smtClean="0"/>
           </a:p>
           <a:p>
             <a:r>
@@ -50855,7 +51109,7 @@
           <a:p>
             <a:fld id="{6597116C-F94B-4B5B-973A-17F07FB5C418}" type="slidenum">
               <a:rPr lang="nl-BE" smtClean="0"/>
-              <a:t>57</a:t>
+              <a:t>59</a:t>
             </a:fld>
             <a:endParaRPr lang="nl-BE"/>
           </a:p>

</xml_diff>